<commit_message>
Array slides are done
</commit_message>
<xml_diff>
--- a/C# Intermediate.pptx
+++ b/C# Intermediate.pptx
@@ -7,6 +7,8 @@
   <p:sldIdLst>
     <p:sldId id="256" r:id="rId2"/>
     <p:sldId id="257" r:id="rId3"/>
+    <p:sldId id="259" r:id="rId4"/>
+    <p:sldId id="258" r:id="rId5"/>
   </p:sldIdLst>
   <p:sldSz cx="12192000" cy="6858000"/>
   <p:notesSz cx="6858000" cy="9144000"/>
@@ -105,6 +107,11 @@
       </a:defRPr>
     </a:lvl9pPr>
   </p:defaultTextStyle>
+  <p:extLst>
+    <p:ext uri="{EFAFB233-063F-42B5-8137-9DF3F51BA10A}">
+      <p15:sldGuideLst xmlns:p15="http://schemas.microsoft.com/office/powerpoint/2012/main"/>
+    </p:ext>
+  </p:extLst>
 </p:presentation>
 </file>
 
@@ -304,7 +311,7 @@
           <a:p>
             <a:fld id="{0BD89023-946D-4914-A444-F66256F52110}" type="datetimeFigureOut">
               <a:rPr lang="bg-BG" smtClean="0"/>
-              <a:t>4.11.2022 г.</a:t>
+              <a:t>8.11.2022 г.</a:t>
             </a:fld>
             <a:endParaRPr lang="bg-BG"/>
           </a:p>
@@ -585,7 +592,7 @@
           <a:p>
             <a:fld id="{0BD89023-946D-4914-A444-F66256F52110}" type="datetimeFigureOut">
               <a:rPr lang="bg-BG" smtClean="0"/>
-              <a:t>4.11.2022 г.</a:t>
+              <a:t>8.11.2022 г.</a:t>
             </a:fld>
             <a:endParaRPr lang="bg-BG"/>
           </a:p>
@@ -777,7 +784,7 @@
           <a:p>
             <a:fld id="{0BD89023-946D-4914-A444-F66256F52110}" type="datetimeFigureOut">
               <a:rPr lang="bg-BG" smtClean="0"/>
-              <a:t>4.11.2022 г.</a:t>
+              <a:t>8.11.2022 г.</a:t>
             </a:fld>
             <a:endParaRPr lang="bg-BG"/>
           </a:p>
@@ -1038,7 +1045,7 @@
           <a:p>
             <a:fld id="{0BD89023-946D-4914-A444-F66256F52110}" type="datetimeFigureOut">
               <a:rPr lang="bg-BG" smtClean="0"/>
-              <a:t>4.11.2022 г.</a:t>
+              <a:t>8.11.2022 г.</a:t>
             </a:fld>
             <a:endParaRPr lang="bg-BG"/>
           </a:p>
@@ -1464,7 +1471,7 @@
           <a:p>
             <a:fld id="{0BD89023-946D-4914-A444-F66256F52110}" type="datetimeFigureOut">
               <a:rPr lang="bg-BG" smtClean="0"/>
-              <a:t>4.11.2022 г.</a:t>
+              <a:t>8.11.2022 г.</a:t>
             </a:fld>
             <a:endParaRPr lang="bg-BG"/>
           </a:p>
@@ -2010,7 +2017,7 @@
           <a:p>
             <a:fld id="{0BD89023-946D-4914-A444-F66256F52110}" type="datetimeFigureOut">
               <a:rPr lang="bg-BG" smtClean="0"/>
-              <a:t>4.11.2022 г.</a:t>
+              <a:t>8.11.2022 г.</a:t>
             </a:fld>
             <a:endParaRPr lang="bg-BG"/>
           </a:p>
@@ -2841,7 +2848,7 @@
           <a:p>
             <a:fld id="{0BD89023-946D-4914-A444-F66256F52110}" type="datetimeFigureOut">
               <a:rPr lang="bg-BG" smtClean="0"/>
-              <a:t>4.11.2022 г.</a:t>
+              <a:t>8.11.2022 г.</a:t>
             </a:fld>
             <a:endParaRPr lang="bg-BG"/>
           </a:p>
@@ -3011,7 +3018,7 @@
           <a:p>
             <a:fld id="{0BD89023-946D-4914-A444-F66256F52110}" type="datetimeFigureOut">
               <a:rPr lang="bg-BG" smtClean="0"/>
-              <a:t>4.11.2022 г.</a:t>
+              <a:t>8.11.2022 г.</a:t>
             </a:fld>
             <a:endParaRPr lang="bg-BG"/>
           </a:p>
@@ -3191,7 +3198,7 @@
           <a:p>
             <a:fld id="{0BD89023-946D-4914-A444-F66256F52110}" type="datetimeFigureOut">
               <a:rPr lang="bg-BG" smtClean="0"/>
-              <a:t>4.11.2022 г.</a:t>
+              <a:t>8.11.2022 г.</a:t>
             </a:fld>
             <a:endParaRPr lang="bg-BG"/>
           </a:p>
@@ -3361,7 +3368,7 @@
           <a:p>
             <a:fld id="{0BD89023-946D-4914-A444-F66256F52110}" type="datetimeFigureOut">
               <a:rPr lang="bg-BG" smtClean="0"/>
-              <a:t>4.11.2022 г.</a:t>
+              <a:t>8.11.2022 г.</a:t>
             </a:fld>
             <a:endParaRPr lang="bg-BG"/>
           </a:p>
@@ -3618,7 +3625,7 @@
           <a:p>
             <a:fld id="{0BD89023-946D-4914-A444-F66256F52110}" type="datetimeFigureOut">
               <a:rPr lang="bg-BG" smtClean="0"/>
-              <a:t>4.11.2022 г.</a:t>
+              <a:t>8.11.2022 г.</a:t>
             </a:fld>
             <a:endParaRPr lang="bg-BG"/>
           </a:p>
@@ -3850,7 +3857,7 @@
           <a:p>
             <a:fld id="{0BD89023-946D-4914-A444-F66256F52110}" type="datetimeFigureOut">
               <a:rPr lang="bg-BG" smtClean="0"/>
-              <a:t>4.11.2022 г.</a:t>
+              <a:t>8.11.2022 г.</a:t>
             </a:fld>
             <a:endParaRPr lang="bg-BG"/>
           </a:p>
@@ -4243,7 +4250,7 @@
           <a:p>
             <a:fld id="{0BD89023-946D-4914-A444-F66256F52110}" type="datetimeFigureOut">
               <a:rPr lang="bg-BG" smtClean="0"/>
-              <a:t>4.11.2022 г.</a:t>
+              <a:t>8.11.2022 г.</a:t>
             </a:fld>
             <a:endParaRPr lang="bg-BG"/>
           </a:p>
@@ -4361,7 +4368,7 @@
           <a:p>
             <a:fld id="{0BD89023-946D-4914-A444-F66256F52110}" type="datetimeFigureOut">
               <a:rPr lang="bg-BG" smtClean="0"/>
-              <a:t>4.11.2022 г.</a:t>
+              <a:t>8.11.2022 г.</a:t>
             </a:fld>
             <a:endParaRPr lang="bg-BG"/>
           </a:p>
@@ -4456,7 +4463,7 @@
           <a:p>
             <a:fld id="{0BD89023-946D-4914-A444-F66256F52110}" type="datetimeFigureOut">
               <a:rPr lang="bg-BG" smtClean="0"/>
-              <a:t>4.11.2022 г.</a:t>
+              <a:t>8.11.2022 г.</a:t>
             </a:fld>
             <a:endParaRPr lang="bg-BG"/>
           </a:p>
@@ -4729,7 +4736,7 @@
           <a:p>
             <a:fld id="{0BD89023-946D-4914-A444-F66256F52110}" type="datetimeFigureOut">
               <a:rPr lang="bg-BG" smtClean="0"/>
-              <a:t>4.11.2022 г.</a:t>
+              <a:t>8.11.2022 г.</a:t>
             </a:fld>
             <a:endParaRPr lang="bg-BG"/>
           </a:p>
@@ -5010,7 +5017,7 @@
           <a:p>
             <a:fld id="{0BD89023-946D-4914-A444-F66256F52110}" type="datetimeFigureOut">
               <a:rPr lang="bg-BG" smtClean="0"/>
-              <a:t>4.11.2022 г.</a:t>
+              <a:t>8.11.2022 г.</a:t>
             </a:fld>
             <a:endParaRPr lang="bg-BG"/>
           </a:p>
@@ -5250,7 +5257,7 @@
           <a:p>
             <a:fld id="{0BD89023-946D-4914-A444-F66256F52110}" type="datetimeFigureOut">
               <a:rPr lang="bg-BG" smtClean="0"/>
-              <a:t>4.11.2022 г.</a:t>
+              <a:t>8.11.2022 г.</a:t>
             </a:fld>
             <a:endParaRPr lang="bg-BG"/>
           </a:p>
@@ -6425,6 +6432,801 @@
 </p:sld>
 </file>
 
+<file path=ppt/slides/slide3.xml><?xml version="1.0" encoding="utf-8"?>
+<p:sld xmlns:a="http://schemas.openxmlformats.org/drawingml/2006/main" xmlns:r="http://schemas.openxmlformats.org/officeDocument/2006/relationships" xmlns:p="http://schemas.openxmlformats.org/presentationml/2006/main">
+  <p:cSld>
+    <p:spTree>
+      <p:nvGrpSpPr>
+        <p:cNvPr id="1" name=""/>
+        <p:cNvGrpSpPr/>
+        <p:nvPr/>
+      </p:nvGrpSpPr>
+      <p:grpSpPr>
+        <a:xfrm>
+          <a:off x="0" y="0"/>
+          <a:ext cx="0" cy="0"/>
+          <a:chOff x="0" y="0"/>
+          <a:chExt cx="0" cy="0"/>
+        </a:xfrm>
+      </p:grpSpPr>
+      <p:sp>
+        <p:nvSpPr>
+          <p:cNvPr id="2" name="Заглавие 1">
+            <a:extLst>
+              <a:ext uri="{FF2B5EF4-FFF2-40B4-BE49-F238E27FC236}">
+                <a16:creationId xmlns:a16="http://schemas.microsoft.com/office/drawing/2014/main" id="{CB7B0C31-9320-4E58-8A8A-D7BFE153DFD9}"/>
+              </a:ext>
+            </a:extLst>
+          </p:cNvPr>
+          <p:cNvSpPr>
+            <a:spLocks noGrp="1"/>
+          </p:cNvSpPr>
+          <p:nvPr>
+            <p:ph type="title"/>
+          </p:nvPr>
+        </p:nvSpPr>
+        <p:spPr/>
+        <p:txBody>
+          <a:bodyPr/>
+          <a:lstStyle/>
+          <a:p>
+            <a:pPr algn="ctr"/>
+            <a:r>
+              <a:rPr lang="en-US" dirty="0"/>
+              <a:t>What is data structure?</a:t>
+            </a:r>
+          </a:p>
+        </p:txBody>
+      </p:sp>
+      <p:sp>
+        <p:nvSpPr>
+          <p:cNvPr id="3" name="Контейнер за съдържание 2">
+            <a:extLst>
+              <a:ext uri="{FF2B5EF4-FFF2-40B4-BE49-F238E27FC236}">
+                <a16:creationId xmlns:a16="http://schemas.microsoft.com/office/drawing/2014/main" id="{11ACFBA5-C402-4177-ACB3-257C3C629ED5}"/>
+              </a:ext>
+            </a:extLst>
+          </p:cNvPr>
+          <p:cNvSpPr>
+            <a:spLocks noGrp="1"/>
+          </p:cNvSpPr>
+          <p:nvPr>
+            <p:ph idx="1"/>
+          </p:nvPr>
+        </p:nvSpPr>
+        <p:spPr>
+          <a:xfrm>
+            <a:off x="1120000" y="1825625"/>
+            <a:ext cx="10233800" cy="4351338"/>
+          </a:xfrm>
+        </p:spPr>
+        <p:txBody>
+          <a:bodyPr/>
+          <a:lstStyle/>
+          <a:p>
+            <a:pPr>
+              <a:buClr>
+                <a:schemeClr val="tx1"/>
+              </a:buClr>
+            </a:pPr>
+            <a:r>
+              <a:rPr lang="en-US" dirty="0">
+                <a:solidFill>
+                  <a:srgbClr val="FFFF00"/>
+                </a:solidFill>
+              </a:rPr>
+              <a:t>Data structure </a:t>
+            </a:r>
+            <a:r>
+              <a:rPr lang="en-US" dirty="0"/>
+              <a:t>is a storage (programmatic way) that is used to store and organize data. It is a way of arranging data on a computer so that it can be accessed and updated efficiently.</a:t>
+            </a:r>
+          </a:p>
+          <a:p>
+            <a:endParaRPr lang="en-US" dirty="0"/>
+          </a:p>
+          <a:p>
+            <a:pPr>
+              <a:buClr>
+                <a:schemeClr val="tx1"/>
+              </a:buClr>
+            </a:pPr>
+            <a:r>
+              <a:rPr lang="en-US" dirty="0">
+                <a:solidFill>
+                  <a:srgbClr val="FFFF00"/>
+                </a:solidFill>
+              </a:rPr>
+              <a:t>Data structures </a:t>
+            </a:r>
+            <a:r>
+              <a:rPr lang="en-US" dirty="0"/>
+              <a:t>are at the core of computer science and they allow programmers to develop </a:t>
+            </a:r>
+            <a:r>
+              <a:rPr lang="en-US" dirty="0">
+                <a:solidFill>
+                  <a:srgbClr val="FFFF00"/>
+                </a:solidFill>
+              </a:rPr>
+              <a:t>algorithms</a:t>
+            </a:r>
+            <a:r>
+              <a:rPr lang="en-US" dirty="0"/>
+              <a:t> that can be used to solve complex problems </a:t>
+            </a:r>
+          </a:p>
+        </p:txBody>
+      </p:sp>
+    </p:spTree>
+    <p:extLst>
+      <p:ext uri="{BB962C8B-B14F-4D97-AF65-F5344CB8AC3E}">
+        <p14:creationId xmlns:p14="http://schemas.microsoft.com/office/powerpoint/2010/main" val="3126285820"/>
+      </p:ext>
+    </p:extLst>
+  </p:cSld>
+  <p:clrMapOvr>
+    <a:masterClrMapping/>
+  </p:clrMapOvr>
+</p:sld>
+</file>
+
+<file path=ppt/slides/slide4.xml><?xml version="1.0" encoding="utf-8"?>
+<p:sld xmlns:a="http://schemas.openxmlformats.org/drawingml/2006/main" xmlns:r="http://schemas.openxmlformats.org/officeDocument/2006/relationships" xmlns:p="http://schemas.openxmlformats.org/presentationml/2006/main">
+  <p:cSld>
+    <p:spTree>
+      <p:nvGrpSpPr>
+        <p:cNvPr id="1" name=""/>
+        <p:cNvGrpSpPr/>
+        <p:nvPr/>
+      </p:nvGrpSpPr>
+      <p:grpSpPr>
+        <a:xfrm>
+          <a:off x="0" y="0"/>
+          <a:ext cx="0" cy="0"/>
+          <a:chOff x="0" y="0"/>
+          <a:chExt cx="0" cy="0"/>
+        </a:xfrm>
+      </p:grpSpPr>
+      <p:sp>
+        <p:nvSpPr>
+          <p:cNvPr id="2" name="Заглавие 1">
+            <a:extLst>
+              <a:ext uri="{FF2B5EF4-FFF2-40B4-BE49-F238E27FC236}">
+                <a16:creationId xmlns:a16="http://schemas.microsoft.com/office/drawing/2014/main" id="{CF7EBFF2-2FF9-4885-BE21-EAA5FBF3CBD9}"/>
+              </a:ext>
+            </a:extLst>
+          </p:cNvPr>
+          <p:cNvSpPr>
+            <a:spLocks noGrp="1"/>
+          </p:cNvSpPr>
+          <p:nvPr>
+            <p:ph type="title"/>
+          </p:nvPr>
+        </p:nvSpPr>
+        <p:spPr/>
+        <p:txBody>
+          <a:bodyPr/>
+          <a:lstStyle/>
+          <a:p>
+            <a:pPr algn="ctr"/>
+            <a:r>
+              <a:rPr lang="en-US" dirty="0">
+                <a:latin typeface="Arial" panose="020B0604020202020204" pitchFamily="34" charset="0"/>
+                <a:cs typeface="Arial" panose="020B0604020202020204" pitchFamily="34" charset="0"/>
+              </a:rPr>
+              <a:t>What is an </a:t>
+            </a:r>
+            <a:r>
+              <a:rPr lang="en-US" dirty="0">
+                <a:solidFill>
+                  <a:srgbClr val="FFFF00"/>
+                </a:solidFill>
+                <a:latin typeface="Arial" panose="020B0604020202020204" pitchFamily="34" charset="0"/>
+                <a:cs typeface="Arial" panose="020B0604020202020204" pitchFamily="34" charset="0"/>
+              </a:rPr>
+              <a:t>array</a:t>
+            </a:r>
+            <a:r>
+              <a:rPr lang="en-US" dirty="0">
+                <a:latin typeface="Arial" panose="020B0604020202020204" pitchFamily="34" charset="0"/>
+                <a:cs typeface="Arial" panose="020B0604020202020204" pitchFamily="34" charset="0"/>
+              </a:rPr>
+              <a:t>?</a:t>
+            </a:r>
+          </a:p>
+        </p:txBody>
+      </p:sp>
+      <p:sp>
+        <p:nvSpPr>
+          <p:cNvPr id="3" name="Контейнер за съдържание 2">
+            <a:extLst>
+              <a:ext uri="{FF2B5EF4-FFF2-40B4-BE49-F238E27FC236}">
+                <a16:creationId xmlns:a16="http://schemas.microsoft.com/office/drawing/2014/main" id="{347C3FD7-A059-4D38-8DCF-54D07C2D7D34}"/>
+              </a:ext>
+            </a:extLst>
+          </p:cNvPr>
+          <p:cNvSpPr>
+            <a:spLocks noGrp="1"/>
+          </p:cNvSpPr>
+          <p:nvPr>
+            <p:ph idx="1"/>
+          </p:nvPr>
+        </p:nvSpPr>
+        <p:spPr>
+          <a:xfrm>
+            <a:off x="670678" y="1825625"/>
+            <a:ext cx="10231102" cy="4351338"/>
+          </a:xfrm>
+        </p:spPr>
+        <p:txBody>
+          <a:bodyPr/>
+          <a:lstStyle/>
+          <a:p>
+            <a:r>
+              <a:rPr lang="en-US" dirty="0"/>
+              <a:t>An </a:t>
+            </a:r>
+            <a:r>
+              <a:rPr lang="en-US" dirty="0">
+                <a:solidFill>
+                  <a:srgbClr val="FFFF00"/>
+                </a:solidFill>
+              </a:rPr>
+              <a:t>array</a:t>
+            </a:r>
+            <a:r>
+              <a:rPr lang="en-US" dirty="0"/>
+              <a:t> is a collection of similar data elements stored at contiguous memory locations. It is the simplest data structure where each data element can be accessed directly by only using its </a:t>
+            </a:r>
+            <a:r>
+              <a:rPr lang="en-US" dirty="0">
+                <a:solidFill>
+                  <a:srgbClr val="FFFF00"/>
+                </a:solidFill>
+              </a:rPr>
+              <a:t>index</a:t>
+            </a:r>
+            <a:r>
+              <a:rPr lang="en-US" dirty="0"/>
+              <a:t> number. They have </a:t>
+            </a:r>
+            <a:r>
+              <a:rPr lang="en-US" dirty="0">
+                <a:solidFill>
+                  <a:srgbClr val="FFFF00"/>
+                </a:solidFill>
+              </a:rPr>
+              <a:t>fixed</a:t>
+            </a:r>
+            <a:r>
+              <a:rPr lang="en-US" dirty="0"/>
+              <a:t> size.</a:t>
+            </a:r>
+          </a:p>
+          <a:p>
+            <a:endParaRPr lang="en-US" dirty="0"/>
+          </a:p>
+        </p:txBody>
+      </p:sp>
+      <p:pic>
+        <p:nvPicPr>
+          <p:cNvPr id="5" name="Картина 4">
+            <a:extLst>
+              <a:ext uri="{FF2B5EF4-FFF2-40B4-BE49-F238E27FC236}">
+                <a16:creationId xmlns:a16="http://schemas.microsoft.com/office/drawing/2014/main" id="{4533BD70-3734-48DD-B228-14E37C520906}"/>
+              </a:ext>
+            </a:extLst>
+          </p:cNvPr>
+          <p:cNvPicPr>
+            <a:picLocks noChangeAspect="1"/>
+          </p:cNvPicPr>
+          <p:nvPr/>
+        </p:nvPicPr>
+        <p:blipFill>
+          <a:blip r:embed="rId2">
+            <a:extLst>
+              <a:ext uri="{28A0092B-C50C-407E-A947-70E740481C1C}">
+                <a14:useLocalDpi xmlns:a14="http://schemas.microsoft.com/office/drawing/2010/main" val="0"/>
+              </a:ext>
+            </a:extLst>
+          </a:blip>
+          <a:stretch>
+            <a:fillRect/>
+          </a:stretch>
+        </p:blipFill>
+        <p:spPr>
+          <a:xfrm>
+            <a:off x="2998466" y="4426997"/>
+            <a:ext cx="6887536" cy="781159"/>
+          </a:xfrm>
+          <a:prstGeom prst="rect">
+            <a:avLst/>
+          </a:prstGeom>
+        </p:spPr>
+      </p:pic>
+      <p:sp>
+        <p:nvSpPr>
+          <p:cNvPr id="6" name="Текстово поле 5">
+            <a:extLst>
+              <a:ext uri="{FF2B5EF4-FFF2-40B4-BE49-F238E27FC236}">
+                <a16:creationId xmlns:a16="http://schemas.microsoft.com/office/drawing/2014/main" id="{61F5E221-EC99-4561-BDAA-51E676DD69F5}"/>
+              </a:ext>
+            </a:extLst>
+          </p:cNvPr>
+          <p:cNvSpPr txBox="1"/>
+          <p:nvPr/>
+        </p:nvSpPr>
+        <p:spPr>
+          <a:xfrm>
+            <a:off x="3231476" y="5195618"/>
+            <a:ext cx="310719" cy="400110"/>
+          </a:xfrm>
+          <a:prstGeom prst="rect">
+            <a:avLst/>
+          </a:prstGeom>
+          <a:noFill/>
+        </p:spPr>
+        <p:txBody>
+          <a:bodyPr wrap="square" rtlCol="0">
+            <a:spAutoFit/>
+          </a:bodyPr>
+          <a:lstStyle/>
+          <a:p>
+            <a:r>
+              <a:rPr lang="en-US" sz="2000" dirty="0"/>
+              <a:t>0</a:t>
+            </a:r>
+          </a:p>
+        </p:txBody>
+      </p:sp>
+      <p:sp>
+        <p:nvSpPr>
+          <p:cNvPr id="9" name="Текстово поле 8">
+            <a:extLst>
+              <a:ext uri="{FF2B5EF4-FFF2-40B4-BE49-F238E27FC236}">
+                <a16:creationId xmlns:a16="http://schemas.microsoft.com/office/drawing/2014/main" id="{9B8AEC9A-8B62-4129-9E67-FC663AA158F9}"/>
+              </a:ext>
+            </a:extLst>
+          </p:cNvPr>
+          <p:cNvSpPr txBox="1"/>
+          <p:nvPr/>
+        </p:nvSpPr>
+        <p:spPr>
+          <a:xfrm>
+            <a:off x="4020760" y="5213858"/>
+            <a:ext cx="324941" cy="400110"/>
+          </a:xfrm>
+          <a:prstGeom prst="rect">
+            <a:avLst/>
+          </a:prstGeom>
+          <a:noFill/>
+        </p:spPr>
+        <p:txBody>
+          <a:bodyPr wrap="square" rtlCol="0">
+            <a:spAutoFit/>
+          </a:bodyPr>
+          <a:lstStyle/>
+          <a:p>
+            <a:r>
+              <a:rPr lang="en-US" sz="2000" dirty="0"/>
+              <a:t>1</a:t>
+            </a:r>
+          </a:p>
+        </p:txBody>
+      </p:sp>
+      <p:sp>
+        <p:nvSpPr>
+          <p:cNvPr id="10" name="Текстово поле 9">
+            <a:extLst>
+              <a:ext uri="{FF2B5EF4-FFF2-40B4-BE49-F238E27FC236}">
+                <a16:creationId xmlns:a16="http://schemas.microsoft.com/office/drawing/2014/main" id="{E55A8CE8-88A4-4373-96F7-8CF42FB72E0A}"/>
+              </a:ext>
+            </a:extLst>
+          </p:cNvPr>
+          <p:cNvSpPr txBox="1"/>
+          <p:nvPr/>
+        </p:nvSpPr>
+        <p:spPr>
+          <a:xfrm>
+            <a:off x="4781244" y="5208156"/>
+            <a:ext cx="310719" cy="400110"/>
+          </a:xfrm>
+          <a:prstGeom prst="rect">
+            <a:avLst/>
+          </a:prstGeom>
+          <a:noFill/>
+        </p:spPr>
+        <p:txBody>
+          <a:bodyPr wrap="square" rtlCol="0">
+            <a:spAutoFit/>
+          </a:bodyPr>
+          <a:lstStyle/>
+          <a:p>
+            <a:r>
+              <a:rPr lang="en-US" sz="2000" dirty="0"/>
+              <a:t>2</a:t>
+            </a:r>
+          </a:p>
+        </p:txBody>
+      </p:sp>
+      <p:sp>
+        <p:nvSpPr>
+          <p:cNvPr id="11" name="Текстово поле 10">
+            <a:extLst>
+              <a:ext uri="{FF2B5EF4-FFF2-40B4-BE49-F238E27FC236}">
+                <a16:creationId xmlns:a16="http://schemas.microsoft.com/office/drawing/2014/main" id="{8ABC9336-D5B2-410D-A3CD-E04E6BAC7512}"/>
+              </a:ext>
+            </a:extLst>
+          </p:cNvPr>
+          <p:cNvSpPr txBox="1"/>
+          <p:nvPr/>
+        </p:nvSpPr>
+        <p:spPr>
+          <a:xfrm>
+            <a:off x="5561794" y="5223545"/>
+            <a:ext cx="310719" cy="338554"/>
+          </a:xfrm>
+          <a:prstGeom prst="rect">
+            <a:avLst/>
+          </a:prstGeom>
+          <a:noFill/>
+        </p:spPr>
+        <p:txBody>
+          <a:bodyPr wrap="square" rtlCol="0">
+            <a:spAutoFit/>
+          </a:bodyPr>
+          <a:lstStyle/>
+          <a:p>
+            <a:r>
+              <a:rPr lang="en-US" sz="1600" dirty="0"/>
+              <a:t>3</a:t>
+            </a:r>
+          </a:p>
+        </p:txBody>
+      </p:sp>
+      <p:sp>
+        <p:nvSpPr>
+          <p:cNvPr id="12" name="Текстово поле 11">
+            <a:extLst>
+              <a:ext uri="{FF2B5EF4-FFF2-40B4-BE49-F238E27FC236}">
+                <a16:creationId xmlns:a16="http://schemas.microsoft.com/office/drawing/2014/main" id="{ECC100D4-DB67-45AD-A720-A6232E147D1D}"/>
+              </a:ext>
+            </a:extLst>
+          </p:cNvPr>
+          <p:cNvSpPr txBox="1"/>
+          <p:nvPr/>
+        </p:nvSpPr>
+        <p:spPr>
+          <a:xfrm>
+            <a:off x="6255857" y="5195618"/>
+            <a:ext cx="255974" cy="381870"/>
+          </a:xfrm>
+          <a:prstGeom prst="rect">
+            <a:avLst/>
+          </a:prstGeom>
+          <a:noFill/>
+        </p:spPr>
+        <p:txBody>
+          <a:bodyPr wrap="square" rtlCol="0">
+            <a:spAutoFit/>
+          </a:bodyPr>
+          <a:lstStyle/>
+          <a:p>
+            <a:r>
+              <a:rPr lang="en-US" dirty="0"/>
+              <a:t>4</a:t>
+            </a:r>
+          </a:p>
+        </p:txBody>
+      </p:sp>
+      <p:sp>
+        <p:nvSpPr>
+          <p:cNvPr id="13" name="Текстово поле 12">
+            <a:extLst>
+              <a:ext uri="{FF2B5EF4-FFF2-40B4-BE49-F238E27FC236}">
+                <a16:creationId xmlns:a16="http://schemas.microsoft.com/office/drawing/2014/main" id="{57D0D5DE-4C06-4AC3-B07E-F2480960E49C}"/>
+              </a:ext>
+            </a:extLst>
+          </p:cNvPr>
+          <p:cNvSpPr txBox="1"/>
+          <p:nvPr/>
+        </p:nvSpPr>
+        <p:spPr>
+          <a:xfrm>
+            <a:off x="7039398" y="5195618"/>
+            <a:ext cx="310719" cy="369332"/>
+          </a:xfrm>
+          <a:prstGeom prst="rect">
+            <a:avLst/>
+          </a:prstGeom>
+          <a:noFill/>
+        </p:spPr>
+        <p:txBody>
+          <a:bodyPr wrap="square" rtlCol="0">
+            <a:spAutoFit/>
+          </a:bodyPr>
+          <a:lstStyle/>
+          <a:p>
+            <a:r>
+              <a:rPr lang="en-US" dirty="0"/>
+              <a:t>5</a:t>
+            </a:r>
+          </a:p>
+        </p:txBody>
+      </p:sp>
+      <p:sp>
+        <p:nvSpPr>
+          <p:cNvPr id="14" name="Текстово поле 13">
+            <a:extLst>
+              <a:ext uri="{FF2B5EF4-FFF2-40B4-BE49-F238E27FC236}">
+                <a16:creationId xmlns:a16="http://schemas.microsoft.com/office/drawing/2014/main" id="{0710AF54-BFB4-4E23-839F-514B17A8C29D}"/>
+              </a:ext>
+            </a:extLst>
+          </p:cNvPr>
+          <p:cNvSpPr txBox="1"/>
+          <p:nvPr/>
+        </p:nvSpPr>
+        <p:spPr>
+          <a:xfrm>
+            <a:off x="7815461" y="5240923"/>
+            <a:ext cx="310719" cy="369332"/>
+          </a:xfrm>
+          <a:prstGeom prst="rect">
+            <a:avLst/>
+          </a:prstGeom>
+          <a:noFill/>
+        </p:spPr>
+        <p:txBody>
+          <a:bodyPr wrap="square" rtlCol="0">
+            <a:spAutoFit/>
+          </a:bodyPr>
+          <a:lstStyle/>
+          <a:p>
+            <a:r>
+              <a:rPr lang="en-US" dirty="0"/>
+              <a:t>6</a:t>
+            </a:r>
+          </a:p>
+        </p:txBody>
+      </p:sp>
+      <p:sp>
+        <p:nvSpPr>
+          <p:cNvPr id="15" name="Текстово поле 14">
+            <a:extLst>
+              <a:ext uri="{FF2B5EF4-FFF2-40B4-BE49-F238E27FC236}">
+                <a16:creationId xmlns:a16="http://schemas.microsoft.com/office/drawing/2014/main" id="{EB944A65-5263-411A-A004-64C499694CE1}"/>
+              </a:ext>
+            </a:extLst>
+          </p:cNvPr>
+          <p:cNvSpPr txBox="1"/>
+          <p:nvPr/>
+        </p:nvSpPr>
+        <p:spPr>
+          <a:xfrm>
+            <a:off x="8623239" y="5208156"/>
+            <a:ext cx="310719" cy="369332"/>
+          </a:xfrm>
+          <a:prstGeom prst="rect">
+            <a:avLst/>
+          </a:prstGeom>
+          <a:noFill/>
+        </p:spPr>
+        <p:txBody>
+          <a:bodyPr wrap="square" rtlCol="0">
+            <a:spAutoFit/>
+          </a:bodyPr>
+          <a:lstStyle/>
+          <a:p>
+            <a:r>
+              <a:rPr lang="en-US" dirty="0"/>
+              <a:t>7</a:t>
+            </a:r>
+          </a:p>
+        </p:txBody>
+      </p:sp>
+      <p:sp>
+        <p:nvSpPr>
+          <p:cNvPr id="16" name="Текстово поле 15">
+            <a:extLst>
+              <a:ext uri="{FF2B5EF4-FFF2-40B4-BE49-F238E27FC236}">
+                <a16:creationId xmlns:a16="http://schemas.microsoft.com/office/drawing/2014/main" id="{B61FB75F-D90E-434E-84D3-311B422BA15C}"/>
+              </a:ext>
+            </a:extLst>
+          </p:cNvPr>
+          <p:cNvSpPr txBox="1"/>
+          <p:nvPr/>
+        </p:nvSpPr>
+        <p:spPr>
+          <a:xfrm>
+            <a:off x="9342273" y="5240923"/>
+            <a:ext cx="310719" cy="369332"/>
+          </a:xfrm>
+          <a:prstGeom prst="rect">
+            <a:avLst/>
+          </a:prstGeom>
+          <a:noFill/>
+        </p:spPr>
+        <p:txBody>
+          <a:bodyPr wrap="square" rtlCol="0">
+            <a:spAutoFit/>
+          </a:bodyPr>
+          <a:lstStyle/>
+          <a:p>
+            <a:r>
+              <a:rPr lang="en-US" dirty="0"/>
+              <a:t>8</a:t>
+            </a:r>
+          </a:p>
+        </p:txBody>
+      </p:sp>
+      <p:sp>
+        <p:nvSpPr>
+          <p:cNvPr id="17" name="Текстово поле 16">
+            <a:extLst>
+              <a:ext uri="{FF2B5EF4-FFF2-40B4-BE49-F238E27FC236}">
+                <a16:creationId xmlns:a16="http://schemas.microsoft.com/office/drawing/2014/main" id="{5A390467-CDE2-4B35-89F9-995C4DEB4905}"/>
+              </a:ext>
+            </a:extLst>
+          </p:cNvPr>
+          <p:cNvSpPr txBox="1"/>
+          <p:nvPr/>
+        </p:nvSpPr>
+        <p:spPr>
+          <a:xfrm>
+            <a:off x="1016912" y="5240923"/>
+            <a:ext cx="998471" cy="369332"/>
+          </a:xfrm>
+          <a:prstGeom prst="rect">
+            <a:avLst/>
+          </a:prstGeom>
+          <a:noFill/>
+        </p:spPr>
+        <p:txBody>
+          <a:bodyPr wrap="square" rtlCol="0">
+            <a:spAutoFit/>
+          </a:bodyPr>
+          <a:lstStyle/>
+          <a:p>
+            <a:r>
+              <a:rPr lang="en-US" dirty="0"/>
+              <a:t>Indexes</a:t>
+            </a:r>
+          </a:p>
+        </p:txBody>
+      </p:sp>
+      <p:sp>
+        <p:nvSpPr>
+          <p:cNvPr id="18" name="Текстово поле 17">
+            <a:extLst>
+              <a:ext uri="{FF2B5EF4-FFF2-40B4-BE49-F238E27FC236}">
+                <a16:creationId xmlns:a16="http://schemas.microsoft.com/office/drawing/2014/main" id="{6BDE82C3-79B4-4E1D-BE69-1BC7EA9D3390}"/>
+              </a:ext>
+            </a:extLst>
+          </p:cNvPr>
+          <p:cNvSpPr txBox="1"/>
+          <p:nvPr/>
+        </p:nvSpPr>
+        <p:spPr>
+          <a:xfrm>
+            <a:off x="1016911" y="4656447"/>
+            <a:ext cx="1122611" cy="369332"/>
+          </a:xfrm>
+          <a:prstGeom prst="rect">
+            <a:avLst/>
+          </a:prstGeom>
+          <a:noFill/>
+        </p:spPr>
+        <p:txBody>
+          <a:bodyPr wrap="square" rtlCol="0">
+            <a:spAutoFit/>
+          </a:bodyPr>
+          <a:lstStyle/>
+          <a:p>
+            <a:r>
+              <a:rPr lang="en-US" dirty="0"/>
+              <a:t>elements</a:t>
+            </a:r>
+          </a:p>
+        </p:txBody>
+      </p:sp>
+      <p:cxnSp>
+        <p:nvCxnSpPr>
+          <p:cNvPr id="22" name="Съединител &quot;права стрелка&quot; 21">
+            <a:extLst>
+              <a:ext uri="{FF2B5EF4-FFF2-40B4-BE49-F238E27FC236}">
+                <a16:creationId xmlns:a16="http://schemas.microsoft.com/office/drawing/2014/main" id="{5D9BEDF3-2091-4886-BFEF-7C4B3422EBC1}"/>
+              </a:ext>
+            </a:extLst>
+          </p:cNvPr>
+          <p:cNvCxnSpPr/>
+          <p:nvPr/>
+        </p:nvCxnSpPr>
+        <p:spPr>
+          <a:xfrm>
+            <a:off x="2254933" y="4875320"/>
+            <a:ext cx="621437" cy="0"/>
+          </a:xfrm>
+          <a:prstGeom prst="straightConnector1">
+            <a:avLst/>
+          </a:prstGeom>
+          <a:ln>
+            <a:solidFill>
+              <a:schemeClr val="tx1"/>
+            </a:solidFill>
+            <a:tailEnd type="triangle"/>
+          </a:ln>
+        </p:spPr>
+        <p:style>
+          <a:lnRef idx="1">
+            <a:schemeClr val="accent1"/>
+          </a:lnRef>
+          <a:fillRef idx="0">
+            <a:schemeClr val="accent1"/>
+          </a:fillRef>
+          <a:effectRef idx="0">
+            <a:schemeClr val="accent1"/>
+          </a:effectRef>
+          <a:fontRef idx="minor">
+            <a:schemeClr val="tx1"/>
+          </a:fontRef>
+        </p:style>
+      </p:cxnSp>
+      <p:cxnSp>
+        <p:nvCxnSpPr>
+          <p:cNvPr id="24" name="Съединител &quot;права стрелка&quot; 23">
+            <a:extLst>
+              <a:ext uri="{FF2B5EF4-FFF2-40B4-BE49-F238E27FC236}">
+                <a16:creationId xmlns:a16="http://schemas.microsoft.com/office/drawing/2014/main" id="{A8B258F6-CF7A-404A-96B7-125B853FDE2E}"/>
+              </a:ext>
+            </a:extLst>
+          </p:cNvPr>
+          <p:cNvCxnSpPr/>
+          <p:nvPr/>
+        </p:nvCxnSpPr>
+        <p:spPr>
+          <a:xfrm>
+            <a:off x="2254933" y="5434613"/>
+            <a:ext cx="621437" cy="0"/>
+          </a:xfrm>
+          <a:prstGeom prst="straightConnector1">
+            <a:avLst/>
+          </a:prstGeom>
+          <a:ln>
+            <a:solidFill>
+              <a:schemeClr val="tx1"/>
+            </a:solidFill>
+            <a:tailEnd type="triangle"/>
+          </a:ln>
+        </p:spPr>
+        <p:style>
+          <a:lnRef idx="1">
+            <a:schemeClr val="accent1"/>
+          </a:lnRef>
+          <a:fillRef idx="0">
+            <a:schemeClr val="accent1"/>
+          </a:fillRef>
+          <a:effectRef idx="0">
+            <a:schemeClr val="accent1"/>
+          </a:effectRef>
+          <a:fontRef idx="minor">
+            <a:schemeClr val="tx1"/>
+          </a:fontRef>
+        </p:style>
+      </p:cxnSp>
+    </p:spTree>
+    <p:extLst>
+      <p:ext uri="{BB962C8B-B14F-4D97-AF65-F5344CB8AC3E}">
+        <p14:creationId xmlns:p14="http://schemas.microsoft.com/office/powerpoint/2010/main" val="2001394900"/>
+      </p:ext>
+    </p:extLst>
+  </p:cSld>
+  <p:clrMapOvr>
+    <a:masterClrMapping/>
+  </p:clrMapOvr>
+</p:sld>
+</file>
+
 <file path=ppt/theme/theme1.xml><?xml version="1.0" encoding="utf-8"?>
 <a:theme xmlns:a="http://schemas.openxmlformats.org/drawingml/2006/main" name="Depth">
   <a:themeElements>

</xml_diff>

<commit_message>
Change in the content slide
</commit_message>
<xml_diff>
--- a/C# Intermediate.pptx
+++ b/C# Intermediate.pptx
@@ -6029,7 +6029,7 @@
         </p:nvSpPr>
         <p:spPr>
           <a:xfrm>
-            <a:off x="6193766" y="1578545"/>
+            <a:off x="6202644" y="1559110"/>
             <a:ext cx="4366400" cy="4351338"/>
           </a:xfrm>
         </p:spPr>
@@ -6041,8 +6041,15 @@
           <a:p>
             <a:r>
               <a:rPr lang="en-US" sz="2400" dirty="0"/>
+              <a:t>Structures</a:t>
+            </a:r>
+          </a:p>
+          <a:p>
+            <a:r>
+              <a:rPr lang="en-US" sz="2400" dirty="0" err="1"/>
               <a:t>Enums</a:t>
             </a:r>
+            <a:endParaRPr lang="en-US" sz="2400" dirty="0"/>
           </a:p>
           <a:p>
             <a:r>
@@ -6082,7 +6089,7 @@
         <p:spPr>
           <a:xfrm>
             <a:off x="1025106" y="1578545"/>
-            <a:ext cx="4366400" cy="5089674"/>
+            <a:ext cx="4366400" cy="5026473"/>
           </a:xfrm>
           <a:prstGeom prst="rect">
             <a:avLst/>
@@ -6378,6 +6385,12 @@
           <a:p>
             <a:r>
               <a:rPr lang="en-US" sz="2400" dirty="0"/>
+              <a:t>LINQ /basics/</a:t>
+            </a:r>
+          </a:p>
+          <a:p>
+            <a:r>
+              <a:rPr lang="en-US" sz="2400" dirty="0"/>
               <a:t>Methods</a:t>
             </a:r>
           </a:p>
@@ -6409,12 +6422,6 @@
             <a:r>
               <a:rPr lang="en-US" sz="2400" dirty="0"/>
               <a:t>Objects and classes /basics/</a:t>
-            </a:r>
-          </a:p>
-          <a:p>
-            <a:r>
-              <a:rPr lang="en-US" sz="2400" dirty="0"/>
-              <a:t>Structures</a:t>
             </a:r>
           </a:p>
         </p:txBody>

</xml_diff>

<commit_message>
C# Intermediate -> new slides
</commit_message>
<xml_diff>
--- a/C# Intermediate.pptx
+++ b/C# Intermediate.pptx
@@ -7,8 +7,14 @@
   <p:sldIdLst>
     <p:sldId id="256" r:id="rId2"/>
     <p:sldId id="257" r:id="rId3"/>
-    <p:sldId id="259" r:id="rId4"/>
-    <p:sldId id="258" r:id="rId5"/>
+    <p:sldId id="260" r:id="rId4"/>
+    <p:sldId id="261" r:id="rId5"/>
+    <p:sldId id="262" r:id="rId6"/>
+    <p:sldId id="264" r:id="rId7"/>
+    <p:sldId id="263" r:id="rId8"/>
+    <p:sldId id="265" r:id="rId9"/>
+    <p:sldId id="259" r:id="rId10"/>
+    <p:sldId id="258" r:id="rId11"/>
   </p:sldIdLst>
   <p:sldSz cx="12192000" cy="6858000"/>
   <p:notesSz cx="6858000" cy="9144000"/>
@@ -311,7 +317,7 @@
           <a:p>
             <a:fld id="{0BD89023-946D-4914-A444-F66256F52110}" type="datetimeFigureOut">
               <a:rPr lang="bg-BG" smtClean="0"/>
-              <a:t>8.11.2022 г.</a:t>
+              <a:t>11.11.2022 г.</a:t>
             </a:fld>
             <a:endParaRPr lang="bg-BG"/>
           </a:p>
@@ -592,7 +598,7 @@
           <a:p>
             <a:fld id="{0BD89023-946D-4914-A444-F66256F52110}" type="datetimeFigureOut">
               <a:rPr lang="bg-BG" smtClean="0"/>
-              <a:t>8.11.2022 г.</a:t>
+              <a:t>11.11.2022 г.</a:t>
             </a:fld>
             <a:endParaRPr lang="bg-BG"/>
           </a:p>
@@ -784,7 +790,7 @@
           <a:p>
             <a:fld id="{0BD89023-946D-4914-A444-F66256F52110}" type="datetimeFigureOut">
               <a:rPr lang="bg-BG" smtClean="0"/>
-              <a:t>8.11.2022 г.</a:t>
+              <a:t>11.11.2022 г.</a:t>
             </a:fld>
             <a:endParaRPr lang="bg-BG"/>
           </a:p>
@@ -1045,7 +1051,7 @@
           <a:p>
             <a:fld id="{0BD89023-946D-4914-A444-F66256F52110}" type="datetimeFigureOut">
               <a:rPr lang="bg-BG" smtClean="0"/>
-              <a:t>8.11.2022 г.</a:t>
+              <a:t>11.11.2022 г.</a:t>
             </a:fld>
             <a:endParaRPr lang="bg-BG"/>
           </a:p>
@@ -1471,7 +1477,7 @@
           <a:p>
             <a:fld id="{0BD89023-946D-4914-A444-F66256F52110}" type="datetimeFigureOut">
               <a:rPr lang="bg-BG" smtClean="0"/>
-              <a:t>8.11.2022 г.</a:t>
+              <a:t>11.11.2022 г.</a:t>
             </a:fld>
             <a:endParaRPr lang="bg-BG"/>
           </a:p>
@@ -2017,7 +2023,7 @@
           <a:p>
             <a:fld id="{0BD89023-946D-4914-A444-F66256F52110}" type="datetimeFigureOut">
               <a:rPr lang="bg-BG" smtClean="0"/>
-              <a:t>8.11.2022 г.</a:t>
+              <a:t>11.11.2022 г.</a:t>
             </a:fld>
             <a:endParaRPr lang="bg-BG"/>
           </a:p>
@@ -2848,7 +2854,7 @@
           <a:p>
             <a:fld id="{0BD89023-946D-4914-A444-F66256F52110}" type="datetimeFigureOut">
               <a:rPr lang="bg-BG" smtClean="0"/>
-              <a:t>8.11.2022 г.</a:t>
+              <a:t>11.11.2022 г.</a:t>
             </a:fld>
             <a:endParaRPr lang="bg-BG"/>
           </a:p>
@@ -3018,7 +3024,7 @@
           <a:p>
             <a:fld id="{0BD89023-946D-4914-A444-F66256F52110}" type="datetimeFigureOut">
               <a:rPr lang="bg-BG" smtClean="0"/>
-              <a:t>8.11.2022 г.</a:t>
+              <a:t>11.11.2022 г.</a:t>
             </a:fld>
             <a:endParaRPr lang="bg-BG"/>
           </a:p>
@@ -3198,7 +3204,7 @@
           <a:p>
             <a:fld id="{0BD89023-946D-4914-A444-F66256F52110}" type="datetimeFigureOut">
               <a:rPr lang="bg-BG" smtClean="0"/>
-              <a:t>8.11.2022 г.</a:t>
+              <a:t>11.11.2022 г.</a:t>
             </a:fld>
             <a:endParaRPr lang="bg-BG"/>
           </a:p>
@@ -3368,7 +3374,7 @@
           <a:p>
             <a:fld id="{0BD89023-946D-4914-A444-F66256F52110}" type="datetimeFigureOut">
               <a:rPr lang="bg-BG" smtClean="0"/>
-              <a:t>8.11.2022 г.</a:t>
+              <a:t>11.11.2022 г.</a:t>
             </a:fld>
             <a:endParaRPr lang="bg-BG"/>
           </a:p>
@@ -3625,7 +3631,7 @@
           <a:p>
             <a:fld id="{0BD89023-946D-4914-A444-F66256F52110}" type="datetimeFigureOut">
               <a:rPr lang="bg-BG" smtClean="0"/>
-              <a:t>8.11.2022 г.</a:t>
+              <a:t>11.11.2022 г.</a:t>
             </a:fld>
             <a:endParaRPr lang="bg-BG"/>
           </a:p>
@@ -3857,7 +3863,7 @@
           <a:p>
             <a:fld id="{0BD89023-946D-4914-A444-F66256F52110}" type="datetimeFigureOut">
               <a:rPr lang="bg-BG" smtClean="0"/>
-              <a:t>8.11.2022 г.</a:t>
+              <a:t>11.11.2022 г.</a:t>
             </a:fld>
             <a:endParaRPr lang="bg-BG"/>
           </a:p>
@@ -4250,7 +4256,7 @@
           <a:p>
             <a:fld id="{0BD89023-946D-4914-A444-F66256F52110}" type="datetimeFigureOut">
               <a:rPr lang="bg-BG" smtClean="0"/>
-              <a:t>8.11.2022 г.</a:t>
+              <a:t>11.11.2022 г.</a:t>
             </a:fld>
             <a:endParaRPr lang="bg-BG"/>
           </a:p>
@@ -4368,7 +4374,7 @@
           <a:p>
             <a:fld id="{0BD89023-946D-4914-A444-F66256F52110}" type="datetimeFigureOut">
               <a:rPr lang="bg-BG" smtClean="0"/>
-              <a:t>8.11.2022 г.</a:t>
+              <a:t>11.11.2022 г.</a:t>
             </a:fld>
             <a:endParaRPr lang="bg-BG"/>
           </a:p>
@@ -4463,7 +4469,7 @@
           <a:p>
             <a:fld id="{0BD89023-946D-4914-A444-F66256F52110}" type="datetimeFigureOut">
               <a:rPr lang="bg-BG" smtClean="0"/>
-              <a:t>8.11.2022 г.</a:t>
+              <a:t>11.11.2022 г.</a:t>
             </a:fld>
             <a:endParaRPr lang="bg-BG"/>
           </a:p>
@@ -4736,7 +4742,7 @@
           <a:p>
             <a:fld id="{0BD89023-946D-4914-A444-F66256F52110}" type="datetimeFigureOut">
               <a:rPr lang="bg-BG" smtClean="0"/>
-              <a:t>8.11.2022 г.</a:t>
+              <a:t>11.11.2022 г.</a:t>
             </a:fld>
             <a:endParaRPr lang="bg-BG"/>
           </a:p>
@@ -5017,7 +5023,7 @@
           <a:p>
             <a:fld id="{0BD89023-946D-4914-A444-F66256F52110}" type="datetimeFigureOut">
               <a:rPr lang="bg-BG" smtClean="0"/>
-              <a:t>8.11.2022 г.</a:t>
+              <a:t>11.11.2022 г.</a:t>
             </a:fld>
             <a:endParaRPr lang="bg-BG"/>
           </a:p>
@@ -5257,7 +5263,7 @@
           <a:p>
             <a:fld id="{0BD89023-946D-4914-A444-F66256F52110}" type="datetimeFigureOut">
               <a:rPr lang="bg-BG" smtClean="0"/>
-              <a:t>8.11.2022 г.</a:t>
+              <a:t>11.11.2022 г.</a:t>
             </a:fld>
             <a:endParaRPr lang="bg-BG"/>
           </a:p>
@@ -5894,6 +5900,8 @@
                     </a:prstClr>
                   </a:outerShdw>
                 </a:effectLst>
+                <a:latin typeface="Arial" panose="020B0604020202020204" pitchFamily="34" charset="0"/>
+                <a:cs typeface="Arial" panose="020B0604020202020204" pitchFamily="34" charset="0"/>
               </a:rPr>
               <a:t>C# Intermediate</a:t>
             </a:r>
@@ -5950,6 +5958,690 @@
 </p:sld>
 </file>
 
+<file path=ppt/slides/slide10.xml><?xml version="1.0" encoding="utf-8"?>
+<p:sld xmlns:a="http://schemas.openxmlformats.org/drawingml/2006/main" xmlns:r="http://schemas.openxmlformats.org/officeDocument/2006/relationships" xmlns:p="http://schemas.openxmlformats.org/presentationml/2006/main">
+  <p:cSld>
+    <p:spTree>
+      <p:nvGrpSpPr>
+        <p:cNvPr id="1" name=""/>
+        <p:cNvGrpSpPr/>
+        <p:nvPr/>
+      </p:nvGrpSpPr>
+      <p:grpSpPr>
+        <a:xfrm>
+          <a:off x="0" y="0"/>
+          <a:ext cx="0" cy="0"/>
+          <a:chOff x="0" y="0"/>
+          <a:chExt cx="0" cy="0"/>
+        </a:xfrm>
+      </p:grpSpPr>
+      <p:sp>
+        <p:nvSpPr>
+          <p:cNvPr id="2" name="Заглавие 1">
+            <a:extLst>
+              <a:ext uri="{FF2B5EF4-FFF2-40B4-BE49-F238E27FC236}">
+                <a16:creationId xmlns:a16="http://schemas.microsoft.com/office/drawing/2014/main" id="{CF7EBFF2-2FF9-4885-BE21-EAA5FBF3CBD9}"/>
+              </a:ext>
+            </a:extLst>
+          </p:cNvPr>
+          <p:cNvSpPr>
+            <a:spLocks noGrp="1"/>
+          </p:cNvSpPr>
+          <p:nvPr>
+            <p:ph type="title"/>
+          </p:nvPr>
+        </p:nvSpPr>
+        <p:spPr/>
+        <p:txBody>
+          <a:bodyPr/>
+          <a:lstStyle/>
+          <a:p>
+            <a:pPr algn="ctr"/>
+            <a:r>
+              <a:rPr lang="bg-BG" dirty="0">
+                <a:latin typeface="Arial" panose="020B0604020202020204" pitchFamily="34" charset="0"/>
+                <a:cs typeface="Arial" panose="020B0604020202020204" pitchFamily="34" charset="0"/>
+              </a:rPr>
+              <a:t>Какво е масив</a:t>
+            </a:r>
+            <a:r>
+              <a:rPr lang="en-US" dirty="0">
+                <a:latin typeface="Arial" panose="020B0604020202020204" pitchFamily="34" charset="0"/>
+                <a:cs typeface="Arial" panose="020B0604020202020204" pitchFamily="34" charset="0"/>
+              </a:rPr>
+              <a:t>?</a:t>
+            </a:r>
+          </a:p>
+        </p:txBody>
+      </p:sp>
+      <p:sp>
+        <p:nvSpPr>
+          <p:cNvPr id="3" name="Контейнер за съдържание 2">
+            <a:extLst>
+              <a:ext uri="{FF2B5EF4-FFF2-40B4-BE49-F238E27FC236}">
+                <a16:creationId xmlns:a16="http://schemas.microsoft.com/office/drawing/2014/main" id="{347C3FD7-A059-4D38-8DCF-54D07C2D7D34}"/>
+              </a:ext>
+            </a:extLst>
+          </p:cNvPr>
+          <p:cNvSpPr>
+            <a:spLocks noGrp="1"/>
+          </p:cNvSpPr>
+          <p:nvPr>
+            <p:ph idx="1"/>
+          </p:nvPr>
+        </p:nvSpPr>
+        <p:spPr>
+          <a:xfrm>
+            <a:off x="670678" y="1799746"/>
+            <a:ext cx="10231102" cy="4351338"/>
+          </a:xfrm>
+        </p:spPr>
+        <p:txBody>
+          <a:bodyPr/>
+          <a:lstStyle/>
+          <a:p>
+            <a:r>
+              <a:rPr lang="bg-BG" dirty="0">
+                <a:solidFill>
+                  <a:srgbClr val="FFFF00"/>
+                </a:solidFill>
+              </a:rPr>
+              <a:t>Масивите</a:t>
+            </a:r>
+            <a:r>
+              <a:rPr lang="bg-BG" dirty="0"/>
+              <a:t> са </a:t>
+            </a:r>
+            <a:r>
+              <a:rPr lang="bg-BG" dirty="0">
+                <a:solidFill>
+                  <a:srgbClr val="FFFF00"/>
+                </a:solidFill>
+              </a:rPr>
+              <a:t>колекция</a:t>
+            </a:r>
+            <a:r>
+              <a:rPr lang="bg-BG" dirty="0"/>
+              <a:t> от данни, която съхранява елементи от един и същи тип в </a:t>
+            </a:r>
+            <a:r>
+              <a:rPr lang="bg-BG" dirty="0">
+                <a:solidFill>
+                  <a:srgbClr val="FFFF00"/>
+                </a:solidFill>
+              </a:rPr>
+              <a:t>съседни</a:t>
+            </a:r>
+            <a:r>
+              <a:rPr lang="bg-BG" dirty="0"/>
+              <a:t> места в паметта</a:t>
+            </a:r>
+            <a:r>
+              <a:rPr lang="en-US" dirty="0"/>
+              <a:t>. </a:t>
+            </a:r>
+            <a:r>
+              <a:rPr lang="bg-BG" dirty="0"/>
+              <a:t>Това е най-простата структура от данни, при която достъпването на елемент от колекцията става чрез </a:t>
+            </a:r>
+            <a:r>
+              <a:rPr lang="bg-BG" dirty="0">
+                <a:solidFill>
+                  <a:srgbClr val="FFFF00"/>
+                </a:solidFill>
+              </a:rPr>
+              <a:t>индекс</a:t>
+            </a:r>
+            <a:r>
+              <a:rPr lang="en-US" dirty="0"/>
+              <a:t>. </a:t>
+            </a:r>
+            <a:r>
+              <a:rPr lang="bg-BG" dirty="0"/>
+              <a:t>Масивите имат </a:t>
+            </a:r>
+            <a:r>
+              <a:rPr lang="bg-BG" dirty="0">
+                <a:solidFill>
+                  <a:srgbClr val="FFFF00"/>
+                </a:solidFill>
+              </a:rPr>
+              <a:t>фиксиран</a:t>
+            </a:r>
+            <a:r>
+              <a:rPr lang="bg-BG" dirty="0"/>
+              <a:t> размер</a:t>
+            </a:r>
+            <a:r>
+              <a:rPr lang="en-US" dirty="0"/>
+              <a:t>.</a:t>
+            </a:r>
+          </a:p>
+          <a:p>
+            <a:endParaRPr lang="en-US" dirty="0"/>
+          </a:p>
+        </p:txBody>
+      </p:sp>
+      <p:pic>
+        <p:nvPicPr>
+          <p:cNvPr id="5" name="Картина 4">
+            <a:extLst>
+              <a:ext uri="{FF2B5EF4-FFF2-40B4-BE49-F238E27FC236}">
+                <a16:creationId xmlns:a16="http://schemas.microsoft.com/office/drawing/2014/main" id="{4533BD70-3734-48DD-B228-14E37C520906}"/>
+              </a:ext>
+            </a:extLst>
+          </p:cNvPr>
+          <p:cNvPicPr>
+            <a:picLocks noChangeAspect="1"/>
+          </p:cNvPicPr>
+          <p:nvPr/>
+        </p:nvPicPr>
+        <p:blipFill>
+          <a:blip r:embed="rId2">
+            <a:extLst>
+              <a:ext uri="{28A0092B-C50C-407E-A947-70E740481C1C}">
+                <a14:useLocalDpi xmlns:a14="http://schemas.microsoft.com/office/drawing/2010/main" val="0"/>
+              </a:ext>
+            </a:extLst>
+          </a:blip>
+          <a:stretch>
+            <a:fillRect/>
+          </a:stretch>
+        </p:blipFill>
+        <p:spPr>
+          <a:xfrm>
+            <a:off x="2998466" y="4426997"/>
+            <a:ext cx="6887536" cy="781159"/>
+          </a:xfrm>
+          <a:prstGeom prst="rect">
+            <a:avLst/>
+          </a:prstGeom>
+        </p:spPr>
+      </p:pic>
+      <p:sp>
+        <p:nvSpPr>
+          <p:cNvPr id="6" name="Текстово поле 5">
+            <a:extLst>
+              <a:ext uri="{FF2B5EF4-FFF2-40B4-BE49-F238E27FC236}">
+                <a16:creationId xmlns:a16="http://schemas.microsoft.com/office/drawing/2014/main" id="{61F5E221-EC99-4561-BDAA-51E676DD69F5}"/>
+              </a:ext>
+            </a:extLst>
+          </p:cNvPr>
+          <p:cNvSpPr txBox="1"/>
+          <p:nvPr/>
+        </p:nvSpPr>
+        <p:spPr>
+          <a:xfrm>
+            <a:off x="3231476" y="5195618"/>
+            <a:ext cx="310719" cy="400110"/>
+          </a:xfrm>
+          <a:prstGeom prst="rect">
+            <a:avLst/>
+          </a:prstGeom>
+          <a:noFill/>
+        </p:spPr>
+        <p:txBody>
+          <a:bodyPr wrap="square" rtlCol="0">
+            <a:spAutoFit/>
+          </a:bodyPr>
+          <a:lstStyle/>
+          <a:p>
+            <a:r>
+              <a:rPr lang="en-US" sz="2000" dirty="0"/>
+              <a:t>0</a:t>
+            </a:r>
+          </a:p>
+        </p:txBody>
+      </p:sp>
+      <p:sp>
+        <p:nvSpPr>
+          <p:cNvPr id="9" name="Текстово поле 8">
+            <a:extLst>
+              <a:ext uri="{FF2B5EF4-FFF2-40B4-BE49-F238E27FC236}">
+                <a16:creationId xmlns:a16="http://schemas.microsoft.com/office/drawing/2014/main" id="{9B8AEC9A-8B62-4129-9E67-FC663AA158F9}"/>
+              </a:ext>
+            </a:extLst>
+          </p:cNvPr>
+          <p:cNvSpPr txBox="1"/>
+          <p:nvPr/>
+        </p:nvSpPr>
+        <p:spPr>
+          <a:xfrm>
+            <a:off x="4020760" y="5213858"/>
+            <a:ext cx="324941" cy="400110"/>
+          </a:xfrm>
+          <a:prstGeom prst="rect">
+            <a:avLst/>
+          </a:prstGeom>
+          <a:noFill/>
+        </p:spPr>
+        <p:txBody>
+          <a:bodyPr wrap="square" rtlCol="0">
+            <a:spAutoFit/>
+          </a:bodyPr>
+          <a:lstStyle/>
+          <a:p>
+            <a:r>
+              <a:rPr lang="en-US" sz="2000" dirty="0"/>
+              <a:t>1</a:t>
+            </a:r>
+          </a:p>
+        </p:txBody>
+      </p:sp>
+      <p:sp>
+        <p:nvSpPr>
+          <p:cNvPr id="10" name="Текстово поле 9">
+            <a:extLst>
+              <a:ext uri="{FF2B5EF4-FFF2-40B4-BE49-F238E27FC236}">
+                <a16:creationId xmlns:a16="http://schemas.microsoft.com/office/drawing/2014/main" id="{E55A8CE8-88A4-4373-96F7-8CF42FB72E0A}"/>
+              </a:ext>
+            </a:extLst>
+          </p:cNvPr>
+          <p:cNvSpPr txBox="1"/>
+          <p:nvPr/>
+        </p:nvSpPr>
+        <p:spPr>
+          <a:xfrm>
+            <a:off x="4781244" y="5208156"/>
+            <a:ext cx="310719" cy="400110"/>
+          </a:xfrm>
+          <a:prstGeom prst="rect">
+            <a:avLst/>
+          </a:prstGeom>
+          <a:noFill/>
+        </p:spPr>
+        <p:txBody>
+          <a:bodyPr wrap="square" rtlCol="0">
+            <a:spAutoFit/>
+          </a:bodyPr>
+          <a:lstStyle/>
+          <a:p>
+            <a:r>
+              <a:rPr lang="en-US" sz="2000" dirty="0"/>
+              <a:t>2</a:t>
+            </a:r>
+          </a:p>
+        </p:txBody>
+      </p:sp>
+      <p:sp>
+        <p:nvSpPr>
+          <p:cNvPr id="11" name="Текстово поле 10">
+            <a:extLst>
+              <a:ext uri="{FF2B5EF4-FFF2-40B4-BE49-F238E27FC236}">
+                <a16:creationId xmlns:a16="http://schemas.microsoft.com/office/drawing/2014/main" id="{8ABC9336-D5B2-410D-A3CD-E04E6BAC7512}"/>
+              </a:ext>
+            </a:extLst>
+          </p:cNvPr>
+          <p:cNvSpPr txBox="1"/>
+          <p:nvPr/>
+        </p:nvSpPr>
+        <p:spPr>
+          <a:xfrm>
+            <a:off x="5561794" y="5223545"/>
+            <a:ext cx="310719" cy="338554"/>
+          </a:xfrm>
+          <a:prstGeom prst="rect">
+            <a:avLst/>
+          </a:prstGeom>
+          <a:noFill/>
+        </p:spPr>
+        <p:txBody>
+          <a:bodyPr wrap="square" rtlCol="0">
+            <a:spAutoFit/>
+          </a:bodyPr>
+          <a:lstStyle/>
+          <a:p>
+            <a:r>
+              <a:rPr lang="en-US" sz="1600" dirty="0"/>
+              <a:t>3</a:t>
+            </a:r>
+          </a:p>
+        </p:txBody>
+      </p:sp>
+      <p:sp>
+        <p:nvSpPr>
+          <p:cNvPr id="12" name="Текстово поле 11">
+            <a:extLst>
+              <a:ext uri="{FF2B5EF4-FFF2-40B4-BE49-F238E27FC236}">
+                <a16:creationId xmlns:a16="http://schemas.microsoft.com/office/drawing/2014/main" id="{ECC100D4-DB67-45AD-A720-A6232E147D1D}"/>
+              </a:ext>
+            </a:extLst>
+          </p:cNvPr>
+          <p:cNvSpPr txBox="1"/>
+          <p:nvPr/>
+        </p:nvSpPr>
+        <p:spPr>
+          <a:xfrm>
+            <a:off x="6255857" y="5195618"/>
+            <a:ext cx="255974" cy="381870"/>
+          </a:xfrm>
+          <a:prstGeom prst="rect">
+            <a:avLst/>
+          </a:prstGeom>
+          <a:noFill/>
+        </p:spPr>
+        <p:txBody>
+          <a:bodyPr wrap="square" rtlCol="0">
+            <a:spAutoFit/>
+          </a:bodyPr>
+          <a:lstStyle/>
+          <a:p>
+            <a:r>
+              <a:rPr lang="en-US" dirty="0"/>
+              <a:t>4</a:t>
+            </a:r>
+          </a:p>
+        </p:txBody>
+      </p:sp>
+      <p:sp>
+        <p:nvSpPr>
+          <p:cNvPr id="13" name="Текстово поле 12">
+            <a:extLst>
+              <a:ext uri="{FF2B5EF4-FFF2-40B4-BE49-F238E27FC236}">
+                <a16:creationId xmlns:a16="http://schemas.microsoft.com/office/drawing/2014/main" id="{57D0D5DE-4C06-4AC3-B07E-F2480960E49C}"/>
+              </a:ext>
+            </a:extLst>
+          </p:cNvPr>
+          <p:cNvSpPr txBox="1"/>
+          <p:nvPr/>
+        </p:nvSpPr>
+        <p:spPr>
+          <a:xfrm>
+            <a:off x="7039398" y="5195618"/>
+            <a:ext cx="310719" cy="369332"/>
+          </a:xfrm>
+          <a:prstGeom prst="rect">
+            <a:avLst/>
+          </a:prstGeom>
+          <a:noFill/>
+        </p:spPr>
+        <p:txBody>
+          <a:bodyPr wrap="square" rtlCol="0">
+            <a:spAutoFit/>
+          </a:bodyPr>
+          <a:lstStyle/>
+          <a:p>
+            <a:r>
+              <a:rPr lang="en-US" dirty="0"/>
+              <a:t>5</a:t>
+            </a:r>
+          </a:p>
+        </p:txBody>
+      </p:sp>
+      <p:sp>
+        <p:nvSpPr>
+          <p:cNvPr id="14" name="Текстово поле 13">
+            <a:extLst>
+              <a:ext uri="{FF2B5EF4-FFF2-40B4-BE49-F238E27FC236}">
+                <a16:creationId xmlns:a16="http://schemas.microsoft.com/office/drawing/2014/main" id="{0710AF54-BFB4-4E23-839F-514B17A8C29D}"/>
+              </a:ext>
+            </a:extLst>
+          </p:cNvPr>
+          <p:cNvSpPr txBox="1"/>
+          <p:nvPr/>
+        </p:nvSpPr>
+        <p:spPr>
+          <a:xfrm>
+            <a:off x="7815461" y="5240923"/>
+            <a:ext cx="310719" cy="369332"/>
+          </a:xfrm>
+          <a:prstGeom prst="rect">
+            <a:avLst/>
+          </a:prstGeom>
+          <a:noFill/>
+        </p:spPr>
+        <p:txBody>
+          <a:bodyPr wrap="square" rtlCol="0">
+            <a:spAutoFit/>
+          </a:bodyPr>
+          <a:lstStyle/>
+          <a:p>
+            <a:r>
+              <a:rPr lang="en-US" dirty="0"/>
+              <a:t>6</a:t>
+            </a:r>
+          </a:p>
+        </p:txBody>
+      </p:sp>
+      <p:sp>
+        <p:nvSpPr>
+          <p:cNvPr id="15" name="Текстово поле 14">
+            <a:extLst>
+              <a:ext uri="{FF2B5EF4-FFF2-40B4-BE49-F238E27FC236}">
+                <a16:creationId xmlns:a16="http://schemas.microsoft.com/office/drawing/2014/main" id="{EB944A65-5263-411A-A004-64C499694CE1}"/>
+              </a:ext>
+            </a:extLst>
+          </p:cNvPr>
+          <p:cNvSpPr txBox="1"/>
+          <p:nvPr/>
+        </p:nvSpPr>
+        <p:spPr>
+          <a:xfrm>
+            <a:off x="8623239" y="5208156"/>
+            <a:ext cx="310719" cy="369332"/>
+          </a:xfrm>
+          <a:prstGeom prst="rect">
+            <a:avLst/>
+          </a:prstGeom>
+          <a:noFill/>
+        </p:spPr>
+        <p:txBody>
+          <a:bodyPr wrap="square" rtlCol="0">
+            <a:spAutoFit/>
+          </a:bodyPr>
+          <a:lstStyle/>
+          <a:p>
+            <a:r>
+              <a:rPr lang="en-US" dirty="0"/>
+              <a:t>7</a:t>
+            </a:r>
+          </a:p>
+        </p:txBody>
+      </p:sp>
+      <p:sp>
+        <p:nvSpPr>
+          <p:cNvPr id="16" name="Текстово поле 15">
+            <a:extLst>
+              <a:ext uri="{FF2B5EF4-FFF2-40B4-BE49-F238E27FC236}">
+                <a16:creationId xmlns:a16="http://schemas.microsoft.com/office/drawing/2014/main" id="{B61FB75F-D90E-434E-84D3-311B422BA15C}"/>
+              </a:ext>
+            </a:extLst>
+          </p:cNvPr>
+          <p:cNvSpPr txBox="1"/>
+          <p:nvPr/>
+        </p:nvSpPr>
+        <p:spPr>
+          <a:xfrm>
+            <a:off x="9342273" y="5240923"/>
+            <a:ext cx="310719" cy="369332"/>
+          </a:xfrm>
+          <a:prstGeom prst="rect">
+            <a:avLst/>
+          </a:prstGeom>
+          <a:noFill/>
+        </p:spPr>
+        <p:txBody>
+          <a:bodyPr wrap="square" rtlCol="0">
+            <a:spAutoFit/>
+          </a:bodyPr>
+          <a:lstStyle/>
+          <a:p>
+            <a:r>
+              <a:rPr lang="en-US" dirty="0"/>
+              <a:t>8</a:t>
+            </a:r>
+          </a:p>
+        </p:txBody>
+      </p:sp>
+      <p:sp>
+        <p:nvSpPr>
+          <p:cNvPr id="17" name="Текстово поле 16">
+            <a:extLst>
+              <a:ext uri="{FF2B5EF4-FFF2-40B4-BE49-F238E27FC236}">
+                <a16:creationId xmlns:a16="http://schemas.microsoft.com/office/drawing/2014/main" id="{5A390467-CDE2-4B35-89F9-995C4DEB4905}"/>
+              </a:ext>
+            </a:extLst>
+          </p:cNvPr>
+          <p:cNvSpPr txBox="1"/>
+          <p:nvPr/>
+        </p:nvSpPr>
+        <p:spPr>
+          <a:xfrm>
+            <a:off x="951303" y="5240923"/>
+            <a:ext cx="1152949" cy="369332"/>
+          </a:xfrm>
+          <a:prstGeom prst="rect">
+            <a:avLst/>
+          </a:prstGeom>
+          <a:noFill/>
+        </p:spPr>
+        <p:txBody>
+          <a:bodyPr wrap="square" rtlCol="0">
+            <a:spAutoFit/>
+          </a:bodyPr>
+          <a:lstStyle/>
+          <a:p>
+            <a:r>
+              <a:rPr lang="bg-BG" dirty="0"/>
+              <a:t>индекси</a:t>
+            </a:r>
+            <a:endParaRPr lang="en-US" dirty="0"/>
+          </a:p>
+        </p:txBody>
+      </p:sp>
+      <p:sp>
+        <p:nvSpPr>
+          <p:cNvPr id="18" name="Текстово поле 17">
+            <a:extLst>
+              <a:ext uri="{FF2B5EF4-FFF2-40B4-BE49-F238E27FC236}">
+                <a16:creationId xmlns:a16="http://schemas.microsoft.com/office/drawing/2014/main" id="{6BDE82C3-79B4-4E1D-BE69-1BC7EA9D3390}"/>
+              </a:ext>
+            </a:extLst>
+          </p:cNvPr>
+          <p:cNvSpPr txBox="1"/>
+          <p:nvPr/>
+        </p:nvSpPr>
+        <p:spPr>
+          <a:xfrm>
+            <a:off x="951303" y="4656447"/>
+            <a:ext cx="1188219" cy="369332"/>
+          </a:xfrm>
+          <a:prstGeom prst="rect">
+            <a:avLst/>
+          </a:prstGeom>
+          <a:noFill/>
+        </p:spPr>
+        <p:txBody>
+          <a:bodyPr wrap="square" rtlCol="0">
+            <a:spAutoFit/>
+          </a:bodyPr>
+          <a:lstStyle/>
+          <a:p>
+            <a:r>
+              <a:rPr lang="bg-BG" dirty="0"/>
+              <a:t>елементи</a:t>
+            </a:r>
+            <a:endParaRPr lang="en-US" dirty="0"/>
+          </a:p>
+        </p:txBody>
+      </p:sp>
+      <p:cxnSp>
+        <p:nvCxnSpPr>
+          <p:cNvPr id="22" name="Съединител &quot;права стрелка&quot; 21">
+            <a:extLst>
+              <a:ext uri="{FF2B5EF4-FFF2-40B4-BE49-F238E27FC236}">
+                <a16:creationId xmlns:a16="http://schemas.microsoft.com/office/drawing/2014/main" id="{5D9BEDF3-2091-4886-BFEF-7C4B3422EBC1}"/>
+              </a:ext>
+            </a:extLst>
+          </p:cNvPr>
+          <p:cNvCxnSpPr/>
+          <p:nvPr/>
+        </p:nvCxnSpPr>
+        <p:spPr>
+          <a:xfrm>
+            <a:off x="2254933" y="4875320"/>
+            <a:ext cx="621437" cy="0"/>
+          </a:xfrm>
+          <a:prstGeom prst="straightConnector1">
+            <a:avLst/>
+          </a:prstGeom>
+          <a:ln>
+            <a:solidFill>
+              <a:schemeClr val="tx1"/>
+            </a:solidFill>
+            <a:tailEnd type="triangle"/>
+          </a:ln>
+        </p:spPr>
+        <p:style>
+          <a:lnRef idx="1">
+            <a:schemeClr val="accent1"/>
+          </a:lnRef>
+          <a:fillRef idx="0">
+            <a:schemeClr val="accent1"/>
+          </a:fillRef>
+          <a:effectRef idx="0">
+            <a:schemeClr val="accent1"/>
+          </a:effectRef>
+          <a:fontRef idx="minor">
+            <a:schemeClr val="tx1"/>
+          </a:fontRef>
+        </p:style>
+      </p:cxnSp>
+      <p:cxnSp>
+        <p:nvCxnSpPr>
+          <p:cNvPr id="24" name="Съединител &quot;права стрелка&quot; 23">
+            <a:extLst>
+              <a:ext uri="{FF2B5EF4-FFF2-40B4-BE49-F238E27FC236}">
+                <a16:creationId xmlns:a16="http://schemas.microsoft.com/office/drawing/2014/main" id="{A8B258F6-CF7A-404A-96B7-125B853FDE2E}"/>
+              </a:ext>
+            </a:extLst>
+          </p:cNvPr>
+          <p:cNvCxnSpPr/>
+          <p:nvPr/>
+        </p:nvCxnSpPr>
+        <p:spPr>
+          <a:xfrm>
+            <a:off x="2254933" y="5434613"/>
+            <a:ext cx="621437" cy="0"/>
+          </a:xfrm>
+          <a:prstGeom prst="straightConnector1">
+            <a:avLst/>
+          </a:prstGeom>
+          <a:ln>
+            <a:solidFill>
+              <a:schemeClr val="tx1"/>
+            </a:solidFill>
+            <a:tailEnd type="triangle"/>
+          </a:ln>
+        </p:spPr>
+        <p:style>
+          <a:lnRef idx="1">
+            <a:schemeClr val="accent1"/>
+          </a:lnRef>
+          <a:fillRef idx="0">
+            <a:schemeClr val="accent1"/>
+          </a:fillRef>
+          <a:effectRef idx="0">
+            <a:schemeClr val="accent1"/>
+          </a:effectRef>
+          <a:fontRef idx="minor">
+            <a:schemeClr val="tx1"/>
+          </a:fontRef>
+        </p:style>
+      </p:cxnSp>
+    </p:spTree>
+    <p:extLst>
+      <p:ext uri="{BB962C8B-B14F-4D97-AF65-F5344CB8AC3E}">
+        <p14:creationId xmlns:p14="http://schemas.microsoft.com/office/powerpoint/2010/main" val="2001394900"/>
+      </p:ext>
+    </p:extLst>
+  </p:cSld>
+  <p:clrMapOvr>
+    <a:masterClrMapping/>
+  </p:clrMapOvr>
+</p:sld>
+</file>
+
 <file path=ppt/slides/slide2.xml><?xml version="1.0" encoding="utf-8"?>
 <p:sld xmlns:a="http://schemas.openxmlformats.org/drawingml/2006/main" xmlns:r="http://schemas.openxmlformats.org/officeDocument/2006/relationships" xmlns:p="http://schemas.openxmlformats.org/presentationml/2006/main">
   <p:cSld>
@@ -5995,18 +6687,11 @@
           <a:p>
             <a:pPr algn="ctr"/>
             <a:r>
-              <a:rPr lang="en-US" dirty="0">
-                <a:latin typeface="Arial" panose="020B0604020202020204" pitchFamily="34" charset="0"/>
-                <a:cs typeface="Arial" panose="020B0604020202020204" pitchFamily="34" charset="0"/>
-              </a:rPr>
-              <a:t>What will we learn</a:t>
-            </a:r>
-            <a:r>
               <a:rPr lang="bg-BG" dirty="0">
                 <a:latin typeface="Arial" panose="020B0604020202020204" pitchFamily="34" charset="0"/>
                 <a:cs typeface="Arial" panose="020B0604020202020204" pitchFamily="34" charset="0"/>
               </a:rPr>
-              <a:t>?</a:t>
+              <a:t>Какво ще научим?</a:t>
             </a:r>
           </a:p>
         </p:txBody>
@@ -6030,7 +6715,7 @@
         <p:spPr>
           <a:xfrm>
             <a:off x="6202644" y="1559110"/>
-            <a:ext cx="4366400" cy="4351338"/>
+            <a:ext cx="4366400" cy="4004928"/>
           </a:xfrm>
         </p:spPr>
         <p:txBody>
@@ -6040,35 +6725,80 @@
           <a:lstStyle/>
           <a:p>
             <a:r>
-              <a:rPr lang="en-US" sz="2400" dirty="0"/>
+              <a:rPr lang="en-US" sz="2400" dirty="0">
+                <a:latin typeface="Arial" panose="020B0604020202020204" pitchFamily="34" charset="0"/>
+                <a:cs typeface="Arial" panose="020B0604020202020204" pitchFamily="34" charset="0"/>
+              </a:rPr>
               <a:t>Structures</a:t>
             </a:r>
           </a:p>
           <a:p>
             <a:r>
-              <a:rPr lang="en-US" sz="2400" dirty="0" err="1"/>
+              <a:rPr lang="en-US" sz="2400" dirty="0" err="1">
+                <a:latin typeface="Arial" panose="020B0604020202020204" pitchFamily="34" charset="0"/>
+                <a:cs typeface="Arial" panose="020B0604020202020204" pitchFamily="34" charset="0"/>
+              </a:rPr>
               <a:t>Enums</a:t>
             </a:r>
-            <a:endParaRPr lang="en-US" sz="2400" dirty="0"/>
-          </a:p>
-          <a:p>
-            <a:r>
-              <a:rPr lang="en-US" sz="2400" dirty="0"/>
+            <a:endParaRPr lang="en-US" sz="2400" dirty="0">
+              <a:latin typeface="Arial" panose="020B0604020202020204" pitchFamily="34" charset="0"/>
+              <a:cs typeface="Arial" panose="020B0604020202020204" pitchFamily="34" charset="0"/>
+            </a:endParaRPr>
+          </a:p>
+          <a:p>
+            <a:r>
+              <a:rPr lang="en-US" sz="2400" dirty="0">
+                <a:latin typeface="Arial" panose="020B0604020202020204" pitchFamily="34" charset="0"/>
+                <a:cs typeface="Arial" panose="020B0604020202020204" pitchFamily="34" charset="0"/>
+              </a:rPr>
               <a:t>Bitwise operators</a:t>
             </a:r>
           </a:p>
           <a:p>
             <a:r>
-              <a:rPr lang="en-US" sz="2400" dirty="0"/>
+              <a:rPr lang="en-US" sz="2400" dirty="0">
+                <a:latin typeface="Arial" panose="020B0604020202020204" pitchFamily="34" charset="0"/>
+                <a:cs typeface="Arial" panose="020B0604020202020204" pitchFamily="34" charset="0"/>
+              </a:rPr>
               <a:t>Regular Expressions</a:t>
             </a:r>
           </a:p>
           <a:p>
             <a:r>
-              <a:rPr lang="en-US" sz="2400" dirty="0" err="1"/>
+              <a:rPr lang="en-US" sz="2400" dirty="0" err="1">
+                <a:latin typeface="Arial" panose="020B0604020202020204" pitchFamily="34" charset="0"/>
+                <a:cs typeface="Arial" panose="020B0604020202020204" pitchFamily="34" charset="0"/>
+              </a:rPr>
               <a:t>Nullables</a:t>
             </a:r>
-            <a:endParaRPr lang="en-US" sz="2400" dirty="0"/>
+            <a:endParaRPr lang="en-US" sz="2400" dirty="0">
+              <a:latin typeface="Arial" panose="020B0604020202020204" pitchFamily="34" charset="0"/>
+              <a:cs typeface="Arial" panose="020B0604020202020204" pitchFamily="34" charset="0"/>
+            </a:endParaRPr>
+          </a:p>
+          <a:p>
+            <a:r>
+              <a:rPr lang="en-US" sz="2400" dirty="0">
+                <a:latin typeface="Arial" panose="020B0604020202020204" pitchFamily="34" charset="0"/>
+                <a:cs typeface="Arial" panose="020B0604020202020204" pitchFamily="34" charset="0"/>
+              </a:rPr>
+              <a:t>Call by Value</a:t>
+            </a:r>
+          </a:p>
+          <a:p>
+            <a:r>
+              <a:rPr lang="en-US" sz="2400" dirty="0">
+                <a:latin typeface="Arial" panose="020B0604020202020204" pitchFamily="34" charset="0"/>
+                <a:cs typeface="Arial" panose="020B0604020202020204" pitchFamily="34" charset="0"/>
+              </a:rPr>
+              <a:t>Call by Reference</a:t>
+            </a:r>
+          </a:p>
+          <a:p>
+            <a:endParaRPr lang="en-US" sz="2400" dirty="0">
+              <a:latin typeface="Arial" panose="020B0604020202020204" pitchFamily="34" charset="0"/>
+              <a:cs typeface="Arial" panose="020B0604020202020204" pitchFamily="34" charset="0"/>
+            </a:endParaRPr>
           </a:p>
         </p:txBody>
       </p:sp>
@@ -6089,7 +6819,7 @@
         <p:spPr>
           <a:xfrm>
             <a:off x="1025106" y="1578545"/>
-            <a:ext cx="4366400" cy="5026473"/>
+            <a:ext cx="4366400" cy="4351339"/>
           </a:xfrm>
           <a:prstGeom prst="rect">
             <a:avLst/>
@@ -6360,67 +7090,73 @@
           </a:lstStyle>
           <a:p>
             <a:r>
-              <a:rPr lang="en-US" sz="2400" dirty="0"/>
+              <a:rPr lang="en-US" sz="2400" dirty="0">
+                <a:latin typeface="Arial" panose="020B0604020202020204" pitchFamily="34" charset="0"/>
+                <a:cs typeface="Arial" panose="020B0604020202020204" pitchFamily="34" charset="0"/>
+              </a:rPr>
+              <a:t>Methods</a:t>
+            </a:r>
+          </a:p>
+          <a:p>
+            <a:r>
+              <a:rPr lang="en-US" sz="2400" dirty="0">
+                <a:latin typeface="Arial" panose="020B0604020202020204" pitchFamily="34" charset="0"/>
+                <a:cs typeface="Arial" panose="020B0604020202020204" pitchFamily="34" charset="0"/>
+              </a:rPr>
               <a:t>Arrays</a:t>
             </a:r>
           </a:p>
           <a:p>
             <a:r>
-              <a:rPr lang="en-US" sz="2400" dirty="0"/>
+              <a:rPr lang="en-US" sz="2400" dirty="0">
+                <a:latin typeface="Arial" panose="020B0604020202020204" pitchFamily="34" charset="0"/>
+                <a:cs typeface="Arial" panose="020B0604020202020204" pitchFamily="34" charset="0"/>
+              </a:rPr>
               <a:t>Lists	</a:t>
             </a:r>
           </a:p>
           <a:p>
             <a:r>
-              <a:rPr lang="en-US" sz="2400" dirty="0"/>
+              <a:rPr lang="en-US" sz="2400" dirty="0">
+                <a:latin typeface="Arial" panose="020B0604020202020204" pitchFamily="34" charset="0"/>
+                <a:cs typeface="Arial" panose="020B0604020202020204" pitchFamily="34" charset="0"/>
+              </a:rPr>
               <a:t>Associative arrays</a:t>
             </a:r>
           </a:p>
           <a:p>
             <a:r>
-              <a:rPr lang="en-US" sz="2400" dirty="0"/>
+              <a:rPr lang="en-US" sz="2400" dirty="0">
+                <a:latin typeface="Arial" panose="020B0604020202020204" pitchFamily="34" charset="0"/>
+                <a:cs typeface="Arial" panose="020B0604020202020204" pitchFamily="34" charset="0"/>
+              </a:rPr>
               <a:t>Foreach loop</a:t>
             </a:r>
           </a:p>
           <a:p>
             <a:r>
-              <a:rPr lang="en-US" sz="2400" dirty="0"/>
+              <a:rPr lang="en-US" sz="2400" dirty="0">
+                <a:latin typeface="Arial" panose="020B0604020202020204" pitchFamily="34" charset="0"/>
+                <a:cs typeface="Arial" panose="020B0604020202020204" pitchFamily="34" charset="0"/>
+              </a:rPr>
               <a:t>LINQ /basics/</a:t>
             </a:r>
           </a:p>
           <a:p>
             <a:r>
-              <a:rPr lang="en-US" sz="2400" dirty="0"/>
-              <a:t>Methods</a:t>
-            </a:r>
-          </a:p>
-          <a:p>
-            <a:r>
-              <a:rPr lang="en-US" sz="2400" dirty="0"/>
-              <a:t>Call by Value</a:t>
-            </a:r>
-          </a:p>
-          <a:p>
-            <a:r>
-              <a:rPr lang="en-US" sz="2400" dirty="0"/>
-              <a:t>Call by Reference</a:t>
-            </a:r>
-          </a:p>
-          <a:p>
-            <a:r>
-              <a:rPr lang="en-US" sz="2400" dirty="0"/>
-              <a:t>Out parameter</a:t>
-            </a:r>
-          </a:p>
-          <a:p>
-            <a:r>
-              <a:rPr lang="en-US" sz="2400" dirty="0"/>
+              <a:rPr lang="en-US" sz="2400" dirty="0">
+                <a:latin typeface="Arial" panose="020B0604020202020204" pitchFamily="34" charset="0"/>
+                <a:cs typeface="Arial" panose="020B0604020202020204" pitchFamily="34" charset="0"/>
+              </a:rPr>
               <a:t>Text Processing</a:t>
             </a:r>
           </a:p>
           <a:p>
             <a:r>
-              <a:rPr lang="en-US" sz="2400" dirty="0"/>
+              <a:rPr lang="en-US" sz="2400" dirty="0">
+                <a:latin typeface="Arial" panose="020B0604020202020204" pitchFamily="34" charset="0"/>
+                <a:cs typeface="Arial" panose="020B0604020202020204" pitchFamily="34" charset="0"/>
+              </a:rPr>
               <a:t>Objects and classes /basics/</a:t>
             </a:r>
           </a:p>
@@ -6458,10 +7194,10 @@
       </p:grpSpPr>
       <p:sp>
         <p:nvSpPr>
-          <p:cNvPr id="2" name="Заглавие 1">
+          <p:cNvPr id="2" name="Title 1">
             <a:extLst>
               <a:ext uri="{FF2B5EF4-FFF2-40B4-BE49-F238E27FC236}">
-                <a16:creationId xmlns:a16="http://schemas.microsoft.com/office/drawing/2014/main" id="{CB7B0C31-9320-4E58-8A8A-D7BFE153DFD9}"/>
+                <a16:creationId xmlns:a16="http://schemas.microsoft.com/office/drawing/2014/main" id="{83BABF4D-4588-C93F-5515-8D44E2ED86C7}"/>
               </a:ext>
             </a:extLst>
           </p:cNvPr>
@@ -6479,18 +7215,21 @@
           <a:p>
             <a:pPr algn="ctr"/>
             <a:r>
-              <a:rPr lang="en-US" dirty="0"/>
-              <a:t>What is data structure?</a:t>
-            </a:r>
-          </a:p>
-        </p:txBody>
-      </p:sp>
-      <p:sp>
-        <p:nvSpPr>
-          <p:cNvPr id="3" name="Контейнер за съдържание 2">
+              <a:rPr lang="bg-BG" dirty="0">
+                <a:latin typeface="Arial" panose="020B0604020202020204" pitchFamily="34" charset="0"/>
+                <a:cs typeface="Arial" panose="020B0604020202020204" pitchFamily="34" charset="0"/>
+              </a:rPr>
+              <a:t>Какво са методите?</a:t>
+            </a:r>
+          </a:p>
+        </p:txBody>
+      </p:sp>
+      <p:sp>
+        <p:nvSpPr>
+          <p:cNvPr id="3" name="Content Placeholder 2">
             <a:extLst>
               <a:ext uri="{FF2B5EF4-FFF2-40B4-BE49-F238E27FC236}">
-                <a16:creationId xmlns:a16="http://schemas.microsoft.com/office/drawing/2014/main" id="{11ACFBA5-C402-4177-ACB3-257C3C629ED5}"/>
+                <a16:creationId xmlns:a16="http://schemas.microsoft.com/office/drawing/2014/main" id="{080636AC-6054-B6A9-3A68-6629719C2D64}"/>
               </a:ext>
             </a:extLst>
           </p:cNvPr>
@@ -6501,66 +7240,370 @@
             <p:ph idx="1"/>
           </p:nvPr>
         </p:nvSpPr>
+        <p:spPr/>
+        <p:txBody>
+          <a:bodyPr/>
+          <a:lstStyle/>
+          <a:p>
+            <a:r>
+              <a:rPr lang="bg-BG" dirty="0">
+                <a:solidFill>
+                  <a:srgbClr val="FFFF00"/>
+                </a:solidFill>
+              </a:rPr>
+              <a:t>Методите</a:t>
+            </a:r>
+            <a:r>
+              <a:rPr lang="bg-BG" dirty="0"/>
+              <a:t> са наименуван блок от код, който върши някаква работа и може впоследствие да бъде извикван на много места. Декларират се клас.</a:t>
+            </a:r>
+          </a:p>
+        </p:txBody>
+      </p:sp>
+      <p:sp>
+        <p:nvSpPr>
+          <p:cNvPr id="6" name="TextBox 5">
+            <a:extLst>
+              <a:ext uri="{FF2B5EF4-FFF2-40B4-BE49-F238E27FC236}">
+                <a16:creationId xmlns:a16="http://schemas.microsoft.com/office/drawing/2014/main" id="{B98CD7B0-B043-069D-63C7-B6AC0EDE26A1}"/>
+              </a:ext>
+            </a:extLst>
+          </p:cNvPr>
+          <p:cNvSpPr txBox="1"/>
+          <p:nvPr/>
+        </p:nvSpPr>
         <p:spPr>
           <a:xfrm>
-            <a:off x="1120000" y="1825625"/>
-            <a:ext cx="10233800" cy="4351338"/>
+            <a:off x="1120000" y="3882778"/>
+            <a:ext cx="6029133" cy="2031325"/>
           </a:xfrm>
+          <a:prstGeom prst="rect">
+            <a:avLst/>
+          </a:prstGeom>
+          <a:noFill/>
         </p:spPr>
         <p:txBody>
-          <a:bodyPr/>
-          <a:lstStyle/>
-          <a:p>
-            <a:pPr>
-              <a:buClr>
-                <a:schemeClr val="tx1"/>
-              </a:buClr>
-            </a:pPr>
-            <a:r>
-              <a:rPr lang="en-US" dirty="0">
+          <a:bodyPr wrap="square" rtlCol="0">
+            <a:spAutoFit/>
+          </a:bodyPr>
+          <a:lstStyle/>
+          <a:p>
+            <a:r>
+              <a:rPr lang="en-US" sz="1800" dirty="0">
+                <a:latin typeface="Cascadia Mono" panose="020B0609020000020004" pitchFamily="49" charset="0"/>
+              </a:rPr>
+              <a:t> </a:t>
+            </a:r>
+            <a:r>
+              <a:rPr lang="en-US" sz="1800" dirty="0">
+                <a:solidFill>
+                  <a:schemeClr val="accent6">
+                    <a:lumMod val="75000"/>
+                  </a:schemeClr>
+                </a:solidFill>
+                <a:latin typeface="Consolas" panose="020B0609020204030204" pitchFamily="49" charset="0"/>
+              </a:rPr>
+              <a:t>static</a:t>
+            </a:r>
+            <a:r>
+              <a:rPr lang="en-US" sz="1800" dirty="0">
+                <a:latin typeface="Consolas" panose="020B0609020204030204" pitchFamily="49" charset="0"/>
+              </a:rPr>
+              <a:t> </a:t>
+            </a:r>
+            <a:r>
+              <a:rPr lang="en-US" sz="1800" dirty="0">
+                <a:solidFill>
+                  <a:schemeClr val="accent6">
+                    <a:lumMod val="75000"/>
+                  </a:schemeClr>
+                </a:solidFill>
+                <a:latin typeface="Consolas" panose="020B0609020204030204" pitchFamily="49" charset="0"/>
+              </a:rPr>
+              <a:t>void</a:t>
+            </a:r>
+            <a:r>
+              <a:rPr lang="en-US" sz="1800" dirty="0">
+                <a:latin typeface="Consolas" panose="020B0609020204030204" pitchFamily="49" charset="0"/>
+              </a:rPr>
+              <a:t> </a:t>
+            </a:r>
+            <a:r>
+              <a:rPr lang="en-US" sz="1800" dirty="0" err="1">
                 <a:solidFill>
                   <a:srgbClr val="FFFF00"/>
                 </a:solidFill>
-              </a:rPr>
-              <a:t>Data structure </a:t>
-            </a:r>
-            <a:r>
-              <a:rPr lang="en-US" dirty="0"/>
-              <a:t>is a storage (programmatic way) that is used to store and organize data. It is a way of arranging data on a computer so that it can be accessed and updated efficiently.</a:t>
-            </a:r>
-          </a:p>
-          <a:p>
-            <a:endParaRPr lang="en-US" dirty="0"/>
-          </a:p>
-          <a:p>
-            <a:pPr>
-              <a:buClr>
-                <a:schemeClr val="tx1"/>
-              </a:buClr>
-            </a:pPr>
-            <a:r>
-              <a:rPr lang="en-US" dirty="0">
+                <a:latin typeface="Consolas" panose="020B0609020204030204" pitchFamily="49" charset="0"/>
+              </a:rPr>
+              <a:t>DisplayNumbers</a:t>
+            </a:r>
+            <a:r>
+              <a:rPr lang="en-US" sz="1800" dirty="0">
                 <a:solidFill>
                   <a:srgbClr val="FFFF00"/>
                 </a:solidFill>
-              </a:rPr>
-              <a:t>Data structures </a:t>
-            </a:r>
-            <a:r>
-              <a:rPr lang="en-US" dirty="0"/>
-              <a:t>are at the core of computer science and they allow programmers to develop </a:t>
-            </a:r>
-            <a:r>
-              <a:rPr lang="en-US" dirty="0">
+                <a:latin typeface="Consolas" panose="020B0609020204030204" pitchFamily="49" charset="0"/>
+              </a:rPr>
+              <a:t>()</a:t>
+            </a:r>
+          </a:p>
+          <a:p>
+            <a:r>
+              <a:rPr lang="bg-BG" sz="1800" dirty="0">
+                <a:latin typeface="Consolas" panose="020B0609020204030204" pitchFamily="49" charset="0"/>
+              </a:rPr>
+              <a:t>        </a:t>
+            </a:r>
+            <a:r>
+              <a:rPr lang="bg-BG" sz="1800" dirty="0">
+                <a:solidFill>
+                  <a:schemeClr val="accent4">
+                    <a:lumMod val="20000"/>
+                    <a:lumOff val="80000"/>
+                  </a:schemeClr>
+                </a:solidFill>
+                <a:latin typeface="Consolas" panose="020B0609020204030204" pitchFamily="49" charset="0"/>
+              </a:rPr>
+              <a:t>{</a:t>
+            </a:r>
+          </a:p>
+          <a:p>
+            <a:r>
+              <a:rPr lang="nn-NO" sz="1800" dirty="0">
+                <a:latin typeface="Consolas" panose="020B0609020204030204" pitchFamily="49" charset="0"/>
+              </a:rPr>
+              <a:t>            for (int i = 0; i &lt; 10; i++)</a:t>
+            </a:r>
+          </a:p>
+          <a:p>
+            <a:r>
+              <a:rPr lang="bg-BG" sz="1800" dirty="0">
+                <a:latin typeface="Consolas" panose="020B0609020204030204" pitchFamily="49" charset="0"/>
+              </a:rPr>
+              <a:t>            {</a:t>
+            </a:r>
+          </a:p>
+          <a:p>
+            <a:r>
+              <a:rPr lang="en-US" sz="1800" dirty="0">
+                <a:latin typeface="Consolas" panose="020B0609020204030204" pitchFamily="49" charset="0"/>
+              </a:rPr>
+              <a:t>                </a:t>
+            </a:r>
+            <a:r>
+              <a:rPr lang="en-US" sz="1800" dirty="0" err="1">
+                <a:latin typeface="Consolas" panose="020B0609020204030204" pitchFamily="49" charset="0"/>
+              </a:rPr>
+              <a:t>Console.WriteLine</a:t>
+            </a:r>
+            <a:r>
+              <a:rPr lang="en-US" sz="1800" dirty="0">
+                <a:latin typeface="Consolas" panose="020B0609020204030204" pitchFamily="49" charset="0"/>
+              </a:rPr>
+              <a:t>(</a:t>
+            </a:r>
+            <a:r>
+              <a:rPr lang="en-US" sz="1800" dirty="0" err="1">
+                <a:latin typeface="Consolas" panose="020B0609020204030204" pitchFamily="49" charset="0"/>
+              </a:rPr>
+              <a:t>i</a:t>
+            </a:r>
+            <a:r>
+              <a:rPr lang="en-US" sz="1800" dirty="0">
+                <a:latin typeface="Consolas" panose="020B0609020204030204" pitchFamily="49" charset="0"/>
+              </a:rPr>
+              <a:t>);</a:t>
+            </a:r>
+          </a:p>
+          <a:p>
+            <a:r>
+              <a:rPr lang="bg-BG" sz="1800" dirty="0">
+                <a:latin typeface="Consolas" panose="020B0609020204030204" pitchFamily="49" charset="0"/>
+              </a:rPr>
+              <a:t>            }</a:t>
+            </a:r>
+          </a:p>
+          <a:p>
+            <a:r>
+              <a:rPr lang="bg-BG" sz="1800" dirty="0">
+                <a:latin typeface="Consolas" panose="020B0609020204030204" pitchFamily="49" charset="0"/>
+              </a:rPr>
+              <a:t>        </a:t>
+            </a:r>
+            <a:r>
+              <a:rPr lang="bg-BG" sz="1800" dirty="0">
+                <a:solidFill>
+                  <a:schemeClr val="accent4">
+                    <a:lumMod val="20000"/>
+                    <a:lumOff val="80000"/>
+                  </a:schemeClr>
+                </a:solidFill>
+                <a:latin typeface="Consolas" panose="020B0609020204030204" pitchFamily="49" charset="0"/>
+              </a:rPr>
+              <a:t>}</a:t>
+            </a:r>
+            <a:endParaRPr lang="bg-BG" dirty="0">
+              <a:solidFill>
+                <a:schemeClr val="accent4">
+                  <a:lumMod val="20000"/>
+                  <a:lumOff val="80000"/>
+                </a:schemeClr>
+              </a:solidFill>
+              <a:latin typeface="Consolas" panose="020B0609020204030204" pitchFamily="49" charset="0"/>
+            </a:endParaRPr>
+          </a:p>
+        </p:txBody>
+      </p:sp>
+      <p:sp>
+        <p:nvSpPr>
+          <p:cNvPr id="7" name="TextBox 6">
+            <a:extLst>
+              <a:ext uri="{FF2B5EF4-FFF2-40B4-BE49-F238E27FC236}">
+                <a16:creationId xmlns:a16="http://schemas.microsoft.com/office/drawing/2014/main" id="{DCC7079E-F1C2-DD1B-A9A8-47AFA3C9A2CF}"/>
+              </a:ext>
+            </a:extLst>
+          </p:cNvPr>
+          <p:cNvSpPr txBox="1"/>
+          <p:nvPr/>
+        </p:nvSpPr>
+        <p:spPr>
+          <a:xfrm>
+            <a:off x="7944930" y="3637246"/>
+            <a:ext cx="2467154" cy="646331"/>
+          </a:xfrm>
+          <a:prstGeom prst="rect">
+            <a:avLst/>
+          </a:prstGeom>
+          <a:noFill/>
+        </p:spPr>
+        <p:txBody>
+          <a:bodyPr wrap="square" rtlCol="0">
+            <a:spAutoFit/>
+          </a:bodyPr>
+          <a:lstStyle/>
+          <a:p>
+            <a:endParaRPr lang="bg-BG" dirty="0">
+              <a:solidFill>
+                <a:schemeClr val="accent4">
+                  <a:lumMod val="20000"/>
+                  <a:lumOff val="80000"/>
+                </a:schemeClr>
+              </a:solidFill>
+              <a:latin typeface="Cascadia Mono" panose="020B0609020000020004" pitchFamily="49" charset="0"/>
+            </a:endParaRPr>
+          </a:p>
+          <a:p>
+            <a:r>
+              <a:rPr lang="en-US" sz="1800" dirty="0" err="1">
                 <a:solidFill>
                   <a:srgbClr val="FFFF00"/>
                 </a:solidFill>
-              </a:rPr>
-              <a:t>algorithms</a:t>
-            </a:r>
-            <a:r>
-              <a:rPr lang="en-US" dirty="0"/>
-              <a:t> that can be used to solve complex problems </a:t>
+                <a:latin typeface="Consolas" panose="020B0609020204030204" pitchFamily="49" charset="0"/>
+              </a:rPr>
+              <a:t>DisplayNumbers</a:t>
+            </a:r>
+            <a:r>
+              <a:rPr lang="en-US" sz="1800" dirty="0">
+                <a:solidFill>
+                  <a:srgbClr val="FFFF00"/>
+                </a:solidFill>
+                <a:latin typeface="Consolas" panose="020B0609020204030204" pitchFamily="49" charset="0"/>
+              </a:rPr>
+              <a:t>()</a:t>
+            </a:r>
+            <a:r>
+              <a:rPr lang="bg-BG" sz="1800" dirty="0">
+                <a:solidFill>
+                  <a:srgbClr val="FFFF00"/>
+                </a:solidFill>
+                <a:latin typeface="Consolas" panose="020B0609020204030204" pitchFamily="49" charset="0"/>
+              </a:rPr>
+              <a:t>;</a:t>
+            </a:r>
+            <a:endParaRPr lang="bg-BG" dirty="0">
+              <a:solidFill>
+                <a:schemeClr val="accent4">
+                  <a:lumMod val="20000"/>
+                  <a:lumOff val="80000"/>
+                </a:schemeClr>
+              </a:solidFill>
+              <a:latin typeface="Consolas" panose="020B0609020204030204" pitchFamily="49" charset="0"/>
+            </a:endParaRPr>
+          </a:p>
+        </p:txBody>
+      </p:sp>
+      <p:sp>
+        <p:nvSpPr>
+          <p:cNvPr id="8" name="TextBox 7">
+            <a:extLst>
+              <a:ext uri="{FF2B5EF4-FFF2-40B4-BE49-F238E27FC236}">
+                <a16:creationId xmlns:a16="http://schemas.microsoft.com/office/drawing/2014/main" id="{37CD89A3-9CA9-5C8F-AF1E-9DCF2580CC8D}"/>
+              </a:ext>
+            </a:extLst>
+          </p:cNvPr>
+          <p:cNvSpPr txBox="1"/>
+          <p:nvPr/>
+        </p:nvSpPr>
+        <p:spPr>
+          <a:xfrm>
+            <a:off x="1897811" y="3378509"/>
+            <a:ext cx="2889849" cy="369332"/>
+          </a:xfrm>
+          <a:prstGeom prst="rect">
+            <a:avLst/>
+          </a:prstGeom>
+          <a:noFill/>
+        </p:spPr>
+        <p:txBody>
+          <a:bodyPr wrap="square" rtlCol="0">
+            <a:spAutoFit/>
+          </a:bodyPr>
+          <a:lstStyle/>
+          <a:p>
+            <a:r>
+              <a:rPr lang="bg-BG" dirty="0">
+                <a:latin typeface="Arial" panose="020B0604020202020204" pitchFamily="34" charset="0"/>
+                <a:cs typeface="Arial" panose="020B0604020202020204" pitchFamily="34" charset="0"/>
+              </a:rPr>
+              <a:t>Дефиниция на метода:</a:t>
+            </a:r>
+          </a:p>
+        </p:txBody>
+      </p:sp>
+      <p:sp>
+        <p:nvSpPr>
+          <p:cNvPr id="9" name="TextBox 8">
+            <a:extLst>
+              <a:ext uri="{FF2B5EF4-FFF2-40B4-BE49-F238E27FC236}">
+                <a16:creationId xmlns:a16="http://schemas.microsoft.com/office/drawing/2014/main" id="{3AEED16E-28D8-040A-7D06-8078E3D8F960}"/>
+              </a:ext>
+            </a:extLst>
+          </p:cNvPr>
+          <p:cNvSpPr txBox="1"/>
+          <p:nvPr/>
+        </p:nvSpPr>
+        <p:spPr>
+          <a:xfrm>
+            <a:off x="7733582" y="3407489"/>
+            <a:ext cx="2889849" cy="369332"/>
+          </a:xfrm>
+          <a:prstGeom prst="rect">
+            <a:avLst/>
+          </a:prstGeom>
+          <a:noFill/>
+        </p:spPr>
+        <p:txBody>
+          <a:bodyPr wrap="square" rtlCol="0">
+            <a:spAutoFit/>
+          </a:bodyPr>
+          <a:lstStyle/>
+          <a:p>
+            <a:r>
+              <a:rPr lang="bg-BG" dirty="0">
+                <a:latin typeface="Arial" panose="020B0604020202020204" pitchFamily="34" charset="0"/>
+                <a:cs typeface="Arial" panose="020B0604020202020204" pitchFamily="34" charset="0"/>
+              </a:rPr>
+              <a:t>Извикване на метода:</a:t>
             </a:r>
           </a:p>
         </p:txBody>
@@ -6568,7 +7611,7 @@
     </p:spTree>
     <p:extLst>
       <p:ext uri="{BB962C8B-B14F-4D97-AF65-F5344CB8AC3E}">
-        <p14:creationId xmlns:p14="http://schemas.microsoft.com/office/powerpoint/2010/main" val="3126285820"/>
+        <p14:creationId xmlns:p14="http://schemas.microsoft.com/office/powerpoint/2010/main" val="1503502359"/>
       </p:ext>
     </p:extLst>
   </p:cSld>
@@ -6597,10 +7640,2474 @@
       </p:grpSpPr>
       <p:sp>
         <p:nvSpPr>
+          <p:cNvPr id="2" name="Title 1">
+            <a:extLst>
+              <a:ext uri="{FF2B5EF4-FFF2-40B4-BE49-F238E27FC236}">
+                <a16:creationId xmlns:a16="http://schemas.microsoft.com/office/drawing/2014/main" id="{B7F2C4BC-A990-A0DC-C9E3-B02CBF0EF8D2}"/>
+              </a:ext>
+            </a:extLst>
+          </p:cNvPr>
+          <p:cNvSpPr>
+            <a:spLocks noGrp="1"/>
+          </p:cNvSpPr>
+          <p:nvPr>
+            <p:ph type="title"/>
+          </p:nvPr>
+        </p:nvSpPr>
+        <p:spPr/>
+        <p:txBody>
+          <a:bodyPr/>
+          <a:lstStyle/>
+          <a:p>
+            <a:pPr algn="ctr"/>
+            <a:r>
+              <a:rPr lang="bg-BG" dirty="0">
+                <a:latin typeface="Arial" panose="020B0604020202020204" pitchFamily="34" charset="0"/>
+                <a:cs typeface="Arial" panose="020B0604020202020204" pitchFamily="34" charset="0"/>
+              </a:rPr>
+              <a:t>Защо използваме методи?</a:t>
+            </a:r>
+          </a:p>
+        </p:txBody>
+      </p:sp>
+      <p:sp>
+        <p:nvSpPr>
+          <p:cNvPr id="3" name="Content Placeholder 2">
+            <a:extLst>
+              <a:ext uri="{FF2B5EF4-FFF2-40B4-BE49-F238E27FC236}">
+                <a16:creationId xmlns:a16="http://schemas.microsoft.com/office/drawing/2014/main" id="{49A1CCCA-9D59-BD77-2E9A-37E833095DC2}"/>
+              </a:ext>
+            </a:extLst>
+          </p:cNvPr>
+          <p:cNvSpPr>
+            <a:spLocks noGrp="1"/>
+          </p:cNvSpPr>
+          <p:nvPr>
+            <p:ph idx="1"/>
+          </p:nvPr>
+        </p:nvSpPr>
+        <p:spPr/>
+        <p:txBody>
+          <a:bodyPr/>
+          <a:lstStyle/>
+          <a:p>
+            <a:r>
+              <a:rPr lang="bg-BG" dirty="0">
+                <a:latin typeface="Arial" panose="020B0604020202020204" pitchFamily="34" charset="0"/>
+                <a:cs typeface="Arial" panose="020B0604020202020204" pitchFamily="34" charset="0"/>
+              </a:rPr>
+              <a:t>Подобрява се организацията на кода</a:t>
+            </a:r>
+          </a:p>
+          <a:p>
+            <a:r>
+              <a:rPr lang="bg-BG" dirty="0">
+                <a:latin typeface="Arial" panose="020B0604020202020204" pitchFamily="34" charset="0"/>
+                <a:cs typeface="Arial" panose="020B0604020202020204" pitchFamily="34" charset="0"/>
+              </a:rPr>
+              <a:t>Подобрява се </a:t>
+            </a:r>
+            <a:r>
+              <a:rPr lang="bg-BG" dirty="0" err="1">
+                <a:latin typeface="Arial" panose="020B0604020202020204" pitchFamily="34" charset="0"/>
+                <a:cs typeface="Arial" panose="020B0604020202020204" pitchFamily="34" charset="0"/>
+              </a:rPr>
+              <a:t>четимостта</a:t>
+            </a:r>
+            <a:r>
+              <a:rPr lang="bg-BG" dirty="0">
+                <a:latin typeface="Arial" panose="020B0604020202020204" pitchFamily="34" charset="0"/>
+                <a:cs typeface="Arial" panose="020B0604020202020204" pitchFamily="34" charset="0"/>
+              </a:rPr>
+              <a:t> на кода</a:t>
+            </a:r>
+          </a:p>
+          <a:p>
+            <a:r>
+              <a:rPr lang="bg-BG" dirty="0">
+                <a:latin typeface="Arial" panose="020B0604020202020204" pitchFamily="34" charset="0"/>
+                <a:cs typeface="Arial" panose="020B0604020202020204" pitchFamily="34" charset="0"/>
+              </a:rPr>
+              <a:t>Разделя големи проблеми на по-малки части</a:t>
+            </a:r>
+          </a:p>
+          <a:p>
+            <a:r>
+              <a:rPr lang="bg-BG" dirty="0">
+                <a:latin typeface="Arial" panose="020B0604020202020204" pitchFamily="34" charset="0"/>
+                <a:cs typeface="Arial" panose="020B0604020202020204" pitchFamily="34" charset="0"/>
+              </a:rPr>
+              <a:t>Подобрява се разбираемостта на кода</a:t>
+            </a:r>
+          </a:p>
+          <a:p>
+            <a:r>
+              <a:rPr lang="bg-BG" dirty="0">
+                <a:latin typeface="Arial" panose="020B0604020202020204" pitchFamily="34" charset="0"/>
+                <a:cs typeface="Arial" panose="020B0604020202020204" pitchFamily="34" charset="0"/>
+              </a:rPr>
+              <a:t>Избягва се повтарянето на код</a:t>
+            </a:r>
+          </a:p>
+          <a:p>
+            <a:r>
+              <a:rPr lang="bg-BG" dirty="0">
+                <a:latin typeface="Arial" panose="020B0604020202020204" pitchFamily="34" charset="0"/>
+                <a:cs typeface="Arial" panose="020B0604020202020204" pitchFamily="34" charset="0"/>
+              </a:rPr>
+              <a:t>Има </a:t>
+            </a:r>
+            <a:r>
+              <a:rPr lang="bg-BG" dirty="0" err="1">
+                <a:latin typeface="Arial" panose="020B0604020202020204" pitchFamily="34" charset="0"/>
+                <a:cs typeface="Arial" panose="020B0604020202020204" pitchFamily="34" charset="0"/>
+              </a:rPr>
+              <a:t>преизползваемост</a:t>
+            </a:r>
+            <a:r>
+              <a:rPr lang="bg-BG" dirty="0">
+                <a:latin typeface="Arial" panose="020B0604020202020204" pitchFamily="34" charset="0"/>
+                <a:cs typeface="Arial" panose="020B0604020202020204" pitchFamily="34" charset="0"/>
+              </a:rPr>
+              <a:t> на кода</a:t>
+            </a:r>
+          </a:p>
+        </p:txBody>
+      </p:sp>
+    </p:spTree>
+    <p:extLst>
+      <p:ext uri="{BB962C8B-B14F-4D97-AF65-F5344CB8AC3E}">
+        <p14:creationId xmlns:p14="http://schemas.microsoft.com/office/powerpoint/2010/main" val="115207119"/>
+      </p:ext>
+    </p:extLst>
+  </p:cSld>
+  <p:clrMapOvr>
+    <a:masterClrMapping/>
+  </p:clrMapOvr>
+</p:sld>
+</file>
+
+<file path=ppt/slides/slide5.xml><?xml version="1.0" encoding="utf-8"?>
+<p:sld xmlns:a="http://schemas.openxmlformats.org/drawingml/2006/main" xmlns:r="http://schemas.openxmlformats.org/officeDocument/2006/relationships" xmlns:p="http://schemas.openxmlformats.org/presentationml/2006/main">
+  <p:cSld>
+    <p:spTree>
+      <p:nvGrpSpPr>
+        <p:cNvPr id="1" name=""/>
+        <p:cNvGrpSpPr/>
+        <p:nvPr/>
+      </p:nvGrpSpPr>
+      <p:grpSpPr>
+        <a:xfrm>
+          <a:off x="0" y="0"/>
+          <a:ext cx="0" cy="0"/>
+          <a:chOff x="0" y="0"/>
+          <a:chExt cx="0" cy="0"/>
+        </a:xfrm>
+      </p:grpSpPr>
+      <p:sp>
+        <p:nvSpPr>
+          <p:cNvPr id="2" name="Title 1">
+            <a:extLst>
+              <a:ext uri="{FF2B5EF4-FFF2-40B4-BE49-F238E27FC236}">
+                <a16:creationId xmlns:a16="http://schemas.microsoft.com/office/drawing/2014/main" id="{BC0E1BDB-1AFB-D1AA-CC58-BC8F7A6ADCDA}"/>
+              </a:ext>
+            </a:extLst>
+          </p:cNvPr>
+          <p:cNvSpPr>
+            <a:spLocks noGrp="1"/>
+          </p:cNvSpPr>
+          <p:nvPr>
+            <p:ph type="title"/>
+          </p:nvPr>
+        </p:nvSpPr>
+        <p:spPr/>
+        <p:txBody>
+          <a:bodyPr/>
+          <a:lstStyle/>
+          <a:p>
+            <a:pPr algn="ctr"/>
+            <a:r>
+              <a:rPr lang="en-US" dirty="0">
+                <a:solidFill>
+                  <a:srgbClr val="FFFF00"/>
+                </a:solidFill>
+              </a:rPr>
+              <a:t>Void</a:t>
+            </a:r>
+            <a:r>
+              <a:rPr lang="en-US" dirty="0"/>
+              <a:t> </a:t>
+            </a:r>
+            <a:r>
+              <a:rPr lang="bg-BG" dirty="0"/>
+              <a:t>методи</a:t>
+            </a:r>
+          </a:p>
+        </p:txBody>
+      </p:sp>
+      <p:sp>
+        <p:nvSpPr>
+          <p:cNvPr id="3" name="Content Placeholder 2">
+            <a:extLst>
+              <a:ext uri="{FF2B5EF4-FFF2-40B4-BE49-F238E27FC236}">
+                <a16:creationId xmlns:a16="http://schemas.microsoft.com/office/drawing/2014/main" id="{39C119CB-5E67-BAFB-95E2-337B961D636E}"/>
+              </a:ext>
+            </a:extLst>
+          </p:cNvPr>
+          <p:cNvSpPr>
+            <a:spLocks noGrp="1"/>
+          </p:cNvSpPr>
+          <p:nvPr>
+            <p:ph idx="1"/>
+          </p:nvPr>
+        </p:nvSpPr>
+        <p:spPr/>
+        <p:txBody>
+          <a:bodyPr/>
+          <a:lstStyle/>
+          <a:p>
+            <a:r>
+              <a:rPr lang="en-US" dirty="0">
+                <a:solidFill>
+                  <a:srgbClr val="FFFF00"/>
+                </a:solidFill>
+              </a:rPr>
+              <a:t>Void</a:t>
+            </a:r>
+            <a:r>
+              <a:rPr lang="en-US" dirty="0"/>
+              <a:t> </a:t>
+            </a:r>
+            <a:r>
+              <a:rPr lang="bg-BG" dirty="0"/>
+              <a:t>методите са методи, които не връщат никакъв резултат. Те просто изпълняват кода между къдравите скоби. Могат да приемат един или много параметри.</a:t>
+            </a:r>
+          </a:p>
+        </p:txBody>
+      </p:sp>
+      <p:sp>
+        <p:nvSpPr>
+          <p:cNvPr id="5" name="TextBox 4">
+            <a:extLst>
+              <a:ext uri="{FF2B5EF4-FFF2-40B4-BE49-F238E27FC236}">
+                <a16:creationId xmlns:a16="http://schemas.microsoft.com/office/drawing/2014/main" id="{E206A1DB-A1ED-5276-3696-E848AA0E7905}"/>
+              </a:ext>
+            </a:extLst>
+          </p:cNvPr>
+          <p:cNvSpPr txBox="1"/>
+          <p:nvPr/>
+        </p:nvSpPr>
+        <p:spPr>
+          <a:xfrm>
+            <a:off x="838200" y="4031487"/>
+            <a:ext cx="6094562" cy="2031325"/>
+          </a:xfrm>
+          <a:prstGeom prst="rect">
+            <a:avLst/>
+          </a:prstGeom>
+          <a:noFill/>
+        </p:spPr>
+        <p:txBody>
+          <a:bodyPr wrap="square">
+            <a:spAutoFit/>
+          </a:bodyPr>
+          <a:lstStyle/>
+          <a:p>
+            <a:r>
+              <a:rPr lang="en-US" sz="1800" dirty="0">
+                <a:latin typeface="Cascadia Mono" panose="020B0609020000020004" pitchFamily="49" charset="0"/>
+              </a:rPr>
+              <a:t> </a:t>
+            </a:r>
+            <a:r>
+              <a:rPr lang="en-US" sz="1800" dirty="0">
+                <a:solidFill>
+                  <a:schemeClr val="accent6">
+                    <a:lumMod val="75000"/>
+                  </a:schemeClr>
+                </a:solidFill>
+                <a:latin typeface="Consolas" panose="020B0609020204030204" pitchFamily="49" charset="0"/>
+              </a:rPr>
+              <a:t>static</a:t>
+            </a:r>
+            <a:r>
+              <a:rPr lang="en-US" sz="1800" dirty="0">
+                <a:latin typeface="Consolas" panose="020B0609020204030204" pitchFamily="49" charset="0"/>
+              </a:rPr>
+              <a:t> </a:t>
+            </a:r>
+            <a:r>
+              <a:rPr lang="en-US" sz="1800" dirty="0">
+                <a:solidFill>
+                  <a:schemeClr val="accent6">
+                    <a:lumMod val="75000"/>
+                  </a:schemeClr>
+                </a:solidFill>
+                <a:latin typeface="Consolas" panose="020B0609020204030204" pitchFamily="49" charset="0"/>
+              </a:rPr>
+              <a:t>void</a:t>
+            </a:r>
+            <a:r>
+              <a:rPr lang="en-US" sz="1800" dirty="0">
+                <a:latin typeface="Consolas" panose="020B0609020204030204" pitchFamily="49" charset="0"/>
+              </a:rPr>
+              <a:t> </a:t>
+            </a:r>
+            <a:r>
+              <a:rPr lang="en-US" sz="1800" dirty="0" err="1">
+                <a:solidFill>
+                  <a:srgbClr val="FFFF00"/>
+                </a:solidFill>
+                <a:latin typeface="Consolas" panose="020B0609020204030204" pitchFamily="49" charset="0"/>
+              </a:rPr>
+              <a:t>DisplayNumbers</a:t>
+            </a:r>
+            <a:r>
+              <a:rPr lang="en-US" sz="1800" dirty="0">
+                <a:solidFill>
+                  <a:srgbClr val="FFFF00"/>
+                </a:solidFill>
+                <a:latin typeface="Consolas" panose="020B0609020204030204" pitchFamily="49" charset="0"/>
+              </a:rPr>
+              <a:t>()</a:t>
+            </a:r>
+          </a:p>
+          <a:p>
+            <a:r>
+              <a:rPr lang="bg-BG" sz="1800" dirty="0">
+                <a:latin typeface="Consolas" panose="020B0609020204030204" pitchFamily="49" charset="0"/>
+              </a:rPr>
+              <a:t>        </a:t>
+            </a:r>
+            <a:r>
+              <a:rPr lang="bg-BG" sz="1800" dirty="0">
+                <a:solidFill>
+                  <a:schemeClr val="accent4">
+                    <a:lumMod val="20000"/>
+                    <a:lumOff val="80000"/>
+                  </a:schemeClr>
+                </a:solidFill>
+                <a:latin typeface="Consolas" panose="020B0609020204030204" pitchFamily="49" charset="0"/>
+              </a:rPr>
+              <a:t>{</a:t>
+            </a:r>
+          </a:p>
+          <a:p>
+            <a:r>
+              <a:rPr lang="nn-NO" sz="1800" dirty="0">
+                <a:latin typeface="Consolas" panose="020B0609020204030204" pitchFamily="49" charset="0"/>
+              </a:rPr>
+              <a:t>            for (int i = 0; i &lt; 10; i++)</a:t>
+            </a:r>
+          </a:p>
+          <a:p>
+            <a:r>
+              <a:rPr lang="bg-BG" sz="1800" dirty="0">
+                <a:latin typeface="Consolas" panose="020B0609020204030204" pitchFamily="49" charset="0"/>
+              </a:rPr>
+              <a:t>            {</a:t>
+            </a:r>
+          </a:p>
+          <a:p>
+            <a:r>
+              <a:rPr lang="en-US" sz="1800" dirty="0">
+                <a:latin typeface="Consolas" panose="020B0609020204030204" pitchFamily="49" charset="0"/>
+              </a:rPr>
+              <a:t>                </a:t>
+            </a:r>
+            <a:r>
+              <a:rPr lang="en-US" sz="1800" dirty="0" err="1">
+                <a:latin typeface="Consolas" panose="020B0609020204030204" pitchFamily="49" charset="0"/>
+              </a:rPr>
+              <a:t>Console.WriteLine</a:t>
+            </a:r>
+            <a:r>
+              <a:rPr lang="en-US" sz="1800" dirty="0">
+                <a:latin typeface="Consolas" panose="020B0609020204030204" pitchFamily="49" charset="0"/>
+              </a:rPr>
+              <a:t>(</a:t>
+            </a:r>
+            <a:r>
+              <a:rPr lang="en-US" sz="1800" dirty="0" err="1">
+                <a:latin typeface="Consolas" panose="020B0609020204030204" pitchFamily="49" charset="0"/>
+              </a:rPr>
+              <a:t>i</a:t>
+            </a:r>
+            <a:r>
+              <a:rPr lang="en-US" sz="1800" dirty="0">
+                <a:latin typeface="Consolas" panose="020B0609020204030204" pitchFamily="49" charset="0"/>
+              </a:rPr>
+              <a:t>);</a:t>
+            </a:r>
+          </a:p>
+          <a:p>
+            <a:r>
+              <a:rPr lang="bg-BG" sz="1800" dirty="0">
+                <a:latin typeface="Consolas" panose="020B0609020204030204" pitchFamily="49" charset="0"/>
+              </a:rPr>
+              <a:t>            }</a:t>
+            </a:r>
+          </a:p>
+          <a:p>
+            <a:r>
+              <a:rPr lang="bg-BG" sz="1800" dirty="0">
+                <a:latin typeface="Consolas" panose="020B0609020204030204" pitchFamily="49" charset="0"/>
+              </a:rPr>
+              <a:t>        </a:t>
+            </a:r>
+            <a:r>
+              <a:rPr lang="bg-BG" sz="1800" dirty="0">
+                <a:solidFill>
+                  <a:schemeClr val="accent4">
+                    <a:lumMod val="20000"/>
+                    <a:lumOff val="80000"/>
+                  </a:schemeClr>
+                </a:solidFill>
+                <a:latin typeface="Consolas" panose="020B0609020204030204" pitchFamily="49" charset="0"/>
+              </a:rPr>
+              <a:t>}</a:t>
+            </a:r>
+            <a:endParaRPr lang="bg-BG" dirty="0">
+              <a:solidFill>
+                <a:schemeClr val="accent4">
+                  <a:lumMod val="20000"/>
+                  <a:lumOff val="80000"/>
+                </a:schemeClr>
+              </a:solidFill>
+              <a:latin typeface="Consolas" panose="020B0609020204030204" pitchFamily="49" charset="0"/>
+            </a:endParaRPr>
+          </a:p>
+        </p:txBody>
+      </p:sp>
+      <p:sp>
+        <p:nvSpPr>
+          <p:cNvPr id="6" name="TextBox 5">
+            <a:extLst>
+              <a:ext uri="{FF2B5EF4-FFF2-40B4-BE49-F238E27FC236}">
+                <a16:creationId xmlns:a16="http://schemas.microsoft.com/office/drawing/2014/main" id="{9AF789DC-914A-4DA8-1A2B-8DF866B63D97}"/>
+              </a:ext>
+            </a:extLst>
+          </p:cNvPr>
+          <p:cNvSpPr txBox="1"/>
+          <p:nvPr/>
+        </p:nvSpPr>
+        <p:spPr>
+          <a:xfrm>
+            <a:off x="6236900" y="3948024"/>
+            <a:ext cx="5730815" cy="2031325"/>
+          </a:xfrm>
+          <a:prstGeom prst="rect">
+            <a:avLst/>
+          </a:prstGeom>
+          <a:noFill/>
+        </p:spPr>
+        <p:txBody>
+          <a:bodyPr wrap="square">
+            <a:spAutoFit/>
+          </a:bodyPr>
+          <a:lstStyle/>
+          <a:p>
+            <a:r>
+              <a:rPr lang="en-US" sz="1800" dirty="0">
+                <a:latin typeface="Cascadia Mono" panose="020B0609020000020004" pitchFamily="49" charset="0"/>
+              </a:rPr>
+              <a:t> </a:t>
+            </a:r>
+            <a:r>
+              <a:rPr lang="en-US" sz="1800" dirty="0">
+                <a:solidFill>
+                  <a:schemeClr val="accent6">
+                    <a:lumMod val="75000"/>
+                  </a:schemeClr>
+                </a:solidFill>
+                <a:latin typeface="Consolas" panose="020B0609020204030204" pitchFamily="49" charset="0"/>
+              </a:rPr>
+              <a:t>static</a:t>
+            </a:r>
+            <a:r>
+              <a:rPr lang="en-US" sz="1800" dirty="0">
+                <a:latin typeface="Consolas" panose="020B0609020204030204" pitchFamily="49" charset="0"/>
+              </a:rPr>
+              <a:t> </a:t>
+            </a:r>
+            <a:r>
+              <a:rPr lang="en-US" sz="1800" dirty="0">
+                <a:solidFill>
+                  <a:schemeClr val="accent6">
+                    <a:lumMod val="75000"/>
+                  </a:schemeClr>
+                </a:solidFill>
+                <a:latin typeface="Consolas" panose="020B0609020204030204" pitchFamily="49" charset="0"/>
+              </a:rPr>
+              <a:t>void</a:t>
+            </a:r>
+            <a:r>
+              <a:rPr lang="en-US" sz="1800" dirty="0">
+                <a:latin typeface="Consolas" panose="020B0609020204030204" pitchFamily="49" charset="0"/>
+              </a:rPr>
+              <a:t> </a:t>
+            </a:r>
+            <a:r>
+              <a:rPr lang="en-US" sz="1800" dirty="0" err="1">
+                <a:solidFill>
+                  <a:srgbClr val="FFFF00"/>
+                </a:solidFill>
+                <a:latin typeface="Consolas" panose="020B0609020204030204" pitchFamily="49" charset="0"/>
+              </a:rPr>
+              <a:t>DisplayNumbers</a:t>
+            </a:r>
+            <a:r>
+              <a:rPr lang="en-US" sz="1800" dirty="0">
+                <a:solidFill>
+                  <a:srgbClr val="FFFF00"/>
+                </a:solidFill>
+                <a:latin typeface="Consolas" panose="020B0609020204030204" pitchFamily="49" charset="0"/>
+              </a:rPr>
+              <a:t>(</a:t>
+            </a:r>
+            <a:r>
+              <a:rPr lang="en-US" sz="1800" dirty="0">
+                <a:solidFill>
+                  <a:srgbClr val="00B050"/>
+                </a:solidFill>
+                <a:latin typeface="Consolas" panose="020B0609020204030204" pitchFamily="49" charset="0"/>
+              </a:rPr>
+              <a:t>int</a:t>
+            </a:r>
+            <a:r>
+              <a:rPr lang="en-US" sz="1800" dirty="0">
+                <a:solidFill>
+                  <a:srgbClr val="FFFF00"/>
+                </a:solidFill>
+                <a:latin typeface="Consolas" panose="020B0609020204030204" pitchFamily="49" charset="0"/>
+              </a:rPr>
+              <a:t> </a:t>
+            </a:r>
+            <a:r>
+              <a:rPr lang="en-US" sz="1800" dirty="0">
+                <a:solidFill>
+                  <a:schemeClr val="tx2">
+                    <a:lumMod val="75000"/>
+                  </a:schemeClr>
+                </a:solidFill>
+                <a:latin typeface="Consolas" panose="020B0609020204030204" pitchFamily="49" charset="0"/>
+              </a:rPr>
+              <a:t>limit</a:t>
+            </a:r>
+            <a:r>
+              <a:rPr lang="en-US" sz="1800" dirty="0">
+                <a:solidFill>
+                  <a:srgbClr val="FFFF00"/>
+                </a:solidFill>
+                <a:latin typeface="Consolas" panose="020B0609020204030204" pitchFamily="49" charset="0"/>
+              </a:rPr>
+              <a:t>)</a:t>
+            </a:r>
+          </a:p>
+          <a:p>
+            <a:r>
+              <a:rPr lang="bg-BG" sz="1800" dirty="0">
+                <a:latin typeface="Consolas" panose="020B0609020204030204" pitchFamily="49" charset="0"/>
+              </a:rPr>
+              <a:t>        </a:t>
+            </a:r>
+            <a:r>
+              <a:rPr lang="bg-BG" sz="1800" dirty="0">
+                <a:solidFill>
+                  <a:schemeClr val="accent4">
+                    <a:lumMod val="20000"/>
+                    <a:lumOff val="80000"/>
+                  </a:schemeClr>
+                </a:solidFill>
+                <a:latin typeface="Consolas" panose="020B0609020204030204" pitchFamily="49" charset="0"/>
+              </a:rPr>
+              <a:t>{</a:t>
+            </a:r>
+          </a:p>
+          <a:p>
+            <a:r>
+              <a:rPr lang="nn-NO" sz="1800" dirty="0">
+                <a:latin typeface="Consolas" panose="020B0609020204030204" pitchFamily="49" charset="0"/>
+              </a:rPr>
+              <a:t>            for (int i = 0; i &lt; </a:t>
+            </a:r>
+            <a:r>
+              <a:rPr lang="en-US" sz="1800" dirty="0">
+                <a:solidFill>
+                  <a:schemeClr val="tx2">
+                    <a:lumMod val="75000"/>
+                  </a:schemeClr>
+                </a:solidFill>
+                <a:latin typeface="Consolas" panose="020B0609020204030204" pitchFamily="49" charset="0"/>
+              </a:rPr>
+              <a:t>limit</a:t>
+            </a:r>
+            <a:r>
+              <a:rPr lang="nn-NO" sz="1800" dirty="0">
+                <a:latin typeface="Consolas" panose="020B0609020204030204" pitchFamily="49" charset="0"/>
+              </a:rPr>
+              <a:t>; i++)</a:t>
+            </a:r>
+          </a:p>
+          <a:p>
+            <a:r>
+              <a:rPr lang="bg-BG" sz="1800" dirty="0">
+                <a:latin typeface="Consolas" panose="020B0609020204030204" pitchFamily="49" charset="0"/>
+              </a:rPr>
+              <a:t>            {</a:t>
+            </a:r>
+          </a:p>
+          <a:p>
+            <a:r>
+              <a:rPr lang="en-US" sz="1800" dirty="0">
+                <a:latin typeface="Consolas" panose="020B0609020204030204" pitchFamily="49" charset="0"/>
+              </a:rPr>
+              <a:t>                </a:t>
+            </a:r>
+            <a:r>
+              <a:rPr lang="en-US" sz="1800" dirty="0" err="1">
+                <a:latin typeface="Consolas" panose="020B0609020204030204" pitchFamily="49" charset="0"/>
+              </a:rPr>
+              <a:t>Console.WriteLine</a:t>
+            </a:r>
+            <a:r>
+              <a:rPr lang="en-US" sz="1800" dirty="0">
+                <a:latin typeface="Consolas" panose="020B0609020204030204" pitchFamily="49" charset="0"/>
+              </a:rPr>
+              <a:t>(</a:t>
+            </a:r>
+            <a:r>
+              <a:rPr lang="en-US" sz="1800" dirty="0" err="1">
+                <a:latin typeface="Consolas" panose="020B0609020204030204" pitchFamily="49" charset="0"/>
+              </a:rPr>
+              <a:t>i</a:t>
+            </a:r>
+            <a:r>
+              <a:rPr lang="en-US" sz="1800" dirty="0">
+                <a:latin typeface="Consolas" panose="020B0609020204030204" pitchFamily="49" charset="0"/>
+              </a:rPr>
+              <a:t>);</a:t>
+            </a:r>
+          </a:p>
+          <a:p>
+            <a:r>
+              <a:rPr lang="bg-BG" sz="1800" dirty="0">
+                <a:latin typeface="Consolas" panose="020B0609020204030204" pitchFamily="49" charset="0"/>
+              </a:rPr>
+              <a:t>            }</a:t>
+            </a:r>
+          </a:p>
+          <a:p>
+            <a:r>
+              <a:rPr lang="bg-BG" sz="1800" dirty="0">
+                <a:latin typeface="Consolas" panose="020B0609020204030204" pitchFamily="49" charset="0"/>
+              </a:rPr>
+              <a:t>        </a:t>
+            </a:r>
+            <a:r>
+              <a:rPr lang="bg-BG" sz="1800" dirty="0">
+                <a:solidFill>
+                  <a:schemeClr val="accent4">
+                    <a:lumMod val="20000"/>
+                    <a:lumOff val="80000"/>
+                  </a:schemeClr>
+                </a:solidFill>
+                <a:latin typeface="Consolas" panose="020B0609020204030204" pitchFamily="49" charset="0"/>
+              </a:rPr>
+              <a:t>}</a:t>
+            </a:r>
+            <a:endParaRPr lang="bg-BG" dirty="0">
+              <a:solidFill>
+                <a:schemeClr val="accent4">
+                  <a:lumMod val="20000"/>
+                  <a:lumOff val="80000"/>
+                </a:schemeClr>
+              </a:solidFill>
+              <a:latin typeface="Consolas" panose="020B0609020204030204" pitchFamily="49" charset="0"/>
+            </a:endParaRPr>
+          </a:p>
+        </p:txBody>
+      </p:sp>
+      <p:sp>
+        <p:nvSpPr>
+          <p:cNvPr id="7" name="TextBox 6">
+            <a:extLst>
+              <a:ext uri="{FF2B5EF4-FFF2-40B4-BE49-F238E27FC236}">
+                <a16:creationId xmlns:a16="http://schemas.microsoft.com/office/drawing/2014/main" id="{17F5C5B0-8AEA-F287-FD11-8DBFCB43648D}"/>
+              </a:ext>
+            </a:extLst>
+          </p:cNvPr>
+          <p:cNvSpPr txBox="1"/>
+          <p:nvPr/>
+        </p:nvSpPr>
+        <p:spPr>
+          <a:xfrm>
+            <a:off x="1647645" y="3399184"/>
+            <a:ext cx="3096883" cy="369332"/>
+          </a:xfrm>
+          <a:prstGeom prst="rect">
+            <a:avLst/>
+          </a:prstGeom>
+          <a:noFill/>
+        </p:spPr>
+        <p:txBody>
+          <a:bodyPr wrap="square" rtlCol="0">
+            <a:spAutoFit/>
+          </a:bodyPr>
+          <a:lstStyle/>
+          <a:p>
+            <a:r>
+              <a:rPr lang="en-US" dirty="0">
+                <a:solidFill>
+                  <a:srgbClr val="FFFF00"/>
+                </a:solidFill>
+                <a:latin typeface="Arial" panose="020B0604020202020204" pitchFamily="34" charset="0"/>
+                <a:cs typeface="Arial" panose="020B0604020202020204" pitchFamily="34" charset="0"/>
+              </a:rPr>
+              <a:t>Void</a:t>
+            </a:r>
+            <a:r>
+              <a:rPr lang="en-US" dirty="0">
+                <a:latin typeface="Arial" panose="020B0604020202020204" pitchFamily="34" charset="0"/>
+                <a:cs typeface="Arial" panose="020B0604020202020204" pitchFamily="34" charset="0"/>
+              </a:rPr>
+              <a:t> </a:t>
+            </a:r>
+            <a:r>
+              <a:rPr lang="bg-BG" dirty="0">
+                <a:latin typeface="Arial" panose="020B0604020202020204" pitchFamily="34" charset="0"/>
+                <a:cs typeface="Arial" panose="020B0604020202020204" pitchFamily="34" charset="0"/>
+              </a:rPr>
+              <a:t>метод без параметри:</a:t>
+            </a:r>
+          </a:p>
+        </p:txBody>
+      </p:sp>
+      <p:sp>
+        <p:nvSpPr>
+          <p:cNvPr id="8" name="TextBox 7">
+            <a:extLst>
+              <a:ext uri="{FF2B5EF4-FFF2-40B4-BE49-F238E27FC236}">
+                <a16:creationId xmlns:a16="http://schemas.microsoft.com/office/drawing/2014/main" id="{65EB668B-D82A-5428-F81F-BBD62DD63B3E}"/>
+              </a:ext>
+            </a:extLst>
+          </p:cNvPr>
+          <p:cNvSpPr txBox="1"/>
+          <p:nvPr/>
+        </p:nvSpPr>
+        <p:spPr>
+          <a:xfrm>
+            <a:off x="7015433" y="3399184"/>
+            <a:ext cx="3096883" cy="369332"/>
+          </a:xfrm>
+          <a:prstGeom prst="rect">
+            <a:avLst/>
+          </a:prstGeom>
+          <a:noFill/>
+        </p:spPr>
+        <p:txBody>
+          <a:bodyPr wrap="square" rtlCol="0">
+            <a:spAutoFit/>
+          </a:bodyPr>
+          <a:lstStyle/>
+          <a:p>
+            <a:r>
+              <a:rPr lang="en-US" dirty="0">
+                <a:solidFill>
+                  <a:srgbClr val="FFFF00"/>
+                </a:solidFill>
+                <a:latin typeface="Arial" panose="020B0604020202020204" pitchFamily="34" charset="0"/>
+                <a:cs typeface="Arial" panose="020B0604020202020204" pitchFamily="34" charset="0"/>
+              </a:rPr>
+              <a:t>Void</a:t>
+            </a:r>
+            <a:r>
+              <a:rPr lang="en-US" dirty="0">
+                <a:latin typeface="Arial" panose="020B0604020202020204" pitchFamily="34" charset="0"/>
+                <a:cs typeface="Arial" panose="020B0604020202020204" pitchFamily="34" charset="0"/>
+              </a:rPr>
+              <a:t> </a:t>
+            </a:r>
+            <a:r>
+              <a:rPr lang="bg-BG" dirty="0">
+                <a:latin typeface="Arial" panose="020B0604020202020204" pitchFamily="34" charset="0"/>
+                <a:cs typeface="Arial" panose="020B0604020202020204" pitchFamily="34" charset="0"/>
+              </a:rPr>
+              <a:t>метод със параметър:</a:t>
+            </a:r>
+          </a:p>
+        </p:txBody>
+      </p:sp>
+    </p:spTree>
+    <p:extLst>
+      <p:ext uri="{BB962C8B-B14F-4D97-AF65-F5344CB8AC3E}">
+        <p14:creationId xmlns:p14="http://schemas.microsoft.com/office/powerpoint/2010/main" val="2201331115"/>
+      </p:ext>
+    </p:extLst>
+  </p:cSld>
+  <p:clrMapOvr>
+    <a:masterClrMapping/>
+  </p:clrMapOvr>
+</p:sld>
+</file>
+
+<file path=ppt/slides/slide6.xml><?xml version="1.0" encoding="utf-8"?>
+<p:sld xmlns:a="http://schemas.openxmlformats.org/drawingml/2006/main" xmlns:r="http://schemas.openxmlformats.org/officeDocument/2006/relationships" xmlns:p="http://schemas.openxmlformats.org/presentationml/2006/main">
+  <p:cSld>
+    <p:spTree>
+      <p:nvGrpSpPr>
+        <p:cNvPr id="1" name=""/>
+        <p:cNvGrpSpPr/>
+        <p:nvPr/>
+      </p:nvGrpSpPr>
+      <p:grpSpPr>
+        <a:xfrm>
+          <a:off x="0" y="0"/>
+          <a:ext cx="0" cy="0"/>
+          <a:chOff x="0" y="0"/>
+          <a:chExt cx="0" cy="0"/>
+        </a:xfrm>
+      </p:grpSpPr>
+      <p:sp>
+        <p:nvSpPr>
+          <p:cNvPr id="2" name="Title 1">
+            <a:extLst>
+              <a:ext uri="{FF2B5EF4-FFF2-40B4-BE49-F238E27FC236}">
+                <a16:creationId xmlns:a16="http://schemas.microsoft.com/office/drawing/2014/main" id="{52FB93D2-6474-52C5-377A-6D5CBCDC6B29}"/>
+              </a:ext>
+            </a:extLst>
+          </p:cNvPr>
+          <p:cNvSpPr>
+            <a:spLocks noGrp="1"/>
+          </p:cNvSpPr>
+          <p:nvPr>
+            <p:ph type="title"/>
+          </p:nvPr>
+        </p:nvSpPr>
+        <p:spPr/>
+        <p:txBody>
+          <a:bodyPr/>
+          <a:lstStyle/>
+          <a:p>
+            <a:pPr algn="ctr"/>
+            <a:r>
+              <a:rPr lang="en-US" dirty="0">
+                <a:solidFill>
+                  <a:srgbClr val="FFFF00"/>
+                </a:solidFill>
+                <a:latin typeface="Arial" panose="020B0604020202020204" pitchFamily="34" charset="0"/>
+                <a:cs typeface="Arial" panose="020B0604020202020204" pitchFamily="34" charset="0"/>
+              </a:rPr>
+              <a:t>Void</a:t>
+            </a:r>
+            <a:r>
+              <a:rPr lang="en-US" dirty="0">
+                <a:latin typeface="Arial" panose="020B0604020202020204" pitchFamily="34" charset="0"/>
+                <a:cs typeface="Arial" panose="020B0604020202020204" pitchFamily="34" charset="0"/>
+              </a:rPr>
+              <a:t> </a:t>
+            </a:r>
+            <a:r>
+              <a:rPr lang="bg-BG" dirty="0">
+                <a:latin typeface="Arial" panose="020B0604020202020204" pitchFamily="34" charset="0"/>
+                <a:cs typeface="Arial" panose="020B0604020202020204" pitchFamily="34" charset="0"/>
+              </a:rPr>
+              <a:t>методи, използващи </a:t>
+            </a:r>
+            <a:r>
+              <a:rPr lang="en-US" dirty="0">
+                <a:solidFill>
+                  <a:srgbClr val="FFFF00"/>
+                </a:solidFill>
+                <a:latin typeface="Arial" panose="020B0604020202020204" pitchFamily="34" charset="0"/>
+                <a:cs typeface="Arial" panose="020B0604020202020204" pitchFamily="34" charset="0"/>
+              </a:rPr>
+              <a:t>return</a:t>
+            </a:r>
+            <a:endParaRPr lang="bg-BG" dirty="0">
+              <a:solidFill>
+                <a:srgbClr val="FFFF00"/>
+              </a:solidFill>
+              <a:latin typeface="Arial" panose="020B0604020202020204" pitchFamily="34" charset="0"/>
+              <a:cs typeface="Arial" panose="020B0604020202020204" pitchFamily="34" charset="0"/>
+            </a:endParaRPr>
+          </a:p>
+        </p:txBody>
+      </p:sp>
+      <p:sp>
+        <p:nvSpPr>
+          <p:cNvPr id="3" name="Content Placeholder 2">
+            <a:extLst>
+              <a:ext uri="{FF2B5EF4-FFF2-40B4-BE49-F238E27FC236}">
+                <a16:creationId xmlns:a16="http://schemas.microsoft.com/office/drawing/2014/main" id="{351F129B-932B-74A8-F38C-E5CB322F0D2D}"/>
+              </a:ext>
+            </a:extLst>
+          </p:cNvPr>
+          <p:cNvSpPr>
+            <a:spLocks noGrp="1"/>
+          </p:cNvSpPr>
+          <p:nvPr>
+            <p:ph idx="1"/>
+          </p:nvPr>
+        </p:nvSpPr>
+        <p:spPr>
+          <a:xfrm>
+            <a:off x="1120000" y="1825624"/>
+            <a:ext cx="8921147" cy="4368141"/>
+          </a:xfrm>
+        </p:spPr>
+        <p:txBody>
+          <a:bodyPr>
+            <a:normAutofit fontScale="92500" lnSpcReduction="10000"/>
+          </a:bodyPr>
+          <a:lstStyle/>
+          <a:p>
+            <a:r>
+              <a:rPr lang="en-US" sz="2200" dirty="0">
+                <a:solidFill>
+                  <a:schemeClr val="accent6">
+                    <a:lumMod val="75000"/>
+                  </a:schemeClr>
+                </a:solidFill>
+                <a:latin typeface="Consolas" panose="020B0609020204030204" pitchFamily="49" charset="0"/>
+              </a:rPr>
+              <a:t>static</a:t>
+            </a:r>
+            <a:r>
+              <a:rPr lang="en-US" sz="2200" dirty="0">
+                <a:latin typeface="Consolas" panose="020B0609020204030204" pitchFamily="49" charset="0"/>
+              </a:rPr>
+              <a:t> </a:t>
+            </a:r>
+            <a:r>
+              <a:rPr lang="en-US" sz="2200" dirty="0">
+                <a:solidFill>
+                  <a:schemeClr val="accent6">
+                    <a:lumMod val="75000"/>
+                  </a:schemeClr>
+                </a:solidFill>
+                <a:latin typeface="Consolas" panose="020B0609020204030204" pitchFamily="49" charset="0"/>
+              </a:rPr>
+              <a:t>void</a:t>
+            </a:r>
+            <a:r>
+              <a:rPr lang="en-US" sz="2200" dirty="0">
+                <a:latin typeface="Consolas" panose="020B0609020204030204" pitchFamily="49" charset="0"/>
+              </a:rPr>
+              <a:t> </a:t>
+            </a:r>
+            <a:r>
+              <a:rPr lang="en-US" sz="2200" dirty="0" err="1">
+                <a:solidFill>
+                  <a:srgbClr val="FFFF00"/>
+                </a:solidFill>
+                <a:latin typeface="Consolas" panose="020B0609020204030204" pitchFamily="49" charset="0"/>
+              </a:rPr>
+              <a:t>DisplayNumbers</a:t>
+            </a:r>
+            <a:r>
+              <a:rPr lang="en-US" sz="2200" dirty="0">
+                <a:solidFill>
+                  <a:srgbClr val="FFFF00"/>
+                </a:solidFill>
+                <a:latin typeface="Consolas" panose="020B0609020204030204" pitchFamily="49" charset="0"/>
+              </a:rPr>
+              <a:t>()</a:t>
+            </a:r>
+          </a:p>
+          <a:p>
+            <a:pPr marL="0" indent="0">
+              <a:buNone/>
+            </a:pPr>
+            <a:r>
+              <a:rPr lang="bg-BG" sz="2200" dirty="0">
+                <a:latin typeface="Consolas" panose="020B0609020204030204" pitchFamily="49" charset="0"/>
+              </a:rPr>
+              <a:t>        </a:t>
+            </a:r>
+            <a:r>
+              <a:rPr lang="bg-BG" sz="2200" dirty="0">
+                <a:solidFill>
+                  <a:schemeClr val="accent4">
+                    <a:lumMod val="20000"/>
+                    <a:lumOff val="80000"/>
+                  </a:schemeClr>
+                </a:solidFill>
+                <a:latin typeface="Consolas" panose="020B0609020204030204" pitchFamily="49" charset="0"/>
+              </a:rPr>
+              <a:t>{</a:t>
+            </a:r>
+          </a:p>
+          <a:p>
+            <a:pPr marL="0" indent="0">
+              <a:buNone/>
+            </a:pPr>
+            <a:r>
+              <a:rPr lang="nn-NO" sz="2200" dirty="0">
+                <a:latin typeface="Consolas" panose="020B0609020204030204" pitchFamily="49" charset="0"/>
+              </a:rPr>
+              <a:t>            </a:t>
+            </a:r>
+            <a:r>
+              <a:rPr lang="nn-NO" sz="2200" dirty="0">
+                <a:solidFill>
+                  <a:schemeClr val="tx1"/>
+                </a:solidFill>
+                <a:latin typeface="Consolas" panose="020B0609020204030204" pitchFamily="49" charset="0"/>
+              </a:rPr>
+              <a:t>for (int i = 0; i &lt; 10; i++)</a:t>
+            </a:r>
+          </a:p>
+          <a:p>
+            <a:pPr marL="0" indent="0">
+              <a:buNone/>
+            </a:pPr>
+            <a:r>
+              <a:rPr lang="bg-BG" sz="2200" dirty="0">
+                <a:solidFill>
+                  <a:schemeClr val="tx1"/>
+                </a:solidFill>
+                <a:latin typeface="Consolas" panose="020B0609020204030204" pitchFamily="49" charset="0"/>
+              </a:rPr>
+              <a:t>            {</a:t>
+            </a:r>
+          </a:p>
+          <a:p>
+            <a:pPr marL="3200400" lvl="7" indent="0">
+              <a:buNone/>
+            </a:pPr>
+            <a:r>
+              <a:rPr lang="en-US" sz="2200" dirty="0">
+                <a:latin typeface="Consolas" panose="020B0609020204030204" pitchFamily="49" charset="0"/>
+              </a:rPr>
+              <a:t>if(</a:t>
+            </a:r>
+            <a:r>
+              <a:rPr lang="en-US" sz="2200" dirty="0" err="1">
+                <a:latin typeface="Consolas" panose="020B0609020204030204" pitchFamily="49" charset="0"/>
+              </a:rPr>
+              <a:t>i</a:t>
+            </a:r>
+            <a:r>
+              <a:rPr lang="en-US" sz="2200" dirty="0">
+                <a:latin typeface="Consolas" panose="020B0609020204030204" pitchFamily="49" charset="0"/>
+              </a:rPr>
+              <a:t> == 2)</a:t>
+            </a:r>
+          </a:p>
+          <a:p>
+            <a:pPr marL="3200400" lvl="7" indent="0">
+              <a:buNone/>
+            </a:pPr>
+            <a:r>
+              <a:rPr lang="en-US" sz="2200" dirty="0">
+                <a:latin typeface="Consolas" panose="020B0609020204030204" pitchFamily="49" charset="0"/>
+              </a:rPr>
+              <a:t>{</a:t>
+            </a:r>
+          </a:p>
+          <a:p>
+            <a:pPr marL="3657600" lvl="8" indent="0">
+              <a:buNone/>
+            </a:pPr>
+            <a:r>
+              <a:rPr lang="en-US" sz="2200" dirty="0">
+                <a:solidFill>
+                  <a:srgbClr val="00B0F0"/>
+                </a:solidFill>
+                <a:latin typeface="Consolas" panose="020B0609020204030204" pitchFamily="49" charset="0"/>
+              </a:rPr>
+              <a:t>return</a:t>
+            </a:r>
+            <a:r>
+              <a:rPr lang="en-US" sz="2200" dirty="0">
+                <a:latin typeface="Consolas" panose="020B0609020204030204" pitchFamily="49" charset="0"/>
+              </a:rPr>
+              <a:t>;</a:t>
+            </a:r>
+          </a:p>
+          <a:p>
+            <a:pPr marL="3200400" lvl="7" indent="0">
+              <a:buNone/>
+            </a:pPr>
+            <a:r>
+              <a:rPr lang="en-US" sz="2200" dirty="0">
+                <a:latin typeface="Consolas" panose="020B0609020204030204" pitchFamily="49" charset="0"/>
+              </a:rPr>
+              <a:t>}</a:t>
+            </a:r>
+          </a:p>
+          <a:p>
+            <a:pPr marL="3200400" lvl="7" indent="0">
+              <a:buNone/>
+            </a:pPr>
+            <a:endParaRPr lang="bg-BG" sz="2200" dirty="0">
+              <a:solidFill>
+                <a:schemeClr val="tx2">
+                  <a:lumMod val="60000"/>
+                  <a:lumOff val="40000"/>
+                </a:schemeClr>
+              </a:solidFill>
+              <a:latin typeface="Consolas" panose="020B0609020204030204" pitchFamily="49" charset="0"/>
+            </a:endParaRPr>
+          </a:p>
+          <a:p>
+            <a:pPr marL="0" indent="0">
+              <a:buNone/>
+            </a:pPr>
+            <a:r>
+              <a:rPr lang="en-US" sz="2200" dirty="0">
+                <a:solidFill>
+                  <a:schemeClr val="tx2">
+                    <a:lumMod val="60000"/>
+                    <a:lumOff val="40000"/>
+                  </a:schemeClr>
+                </a:solidFill>
+                <a:latin typeface="Consolas" panose="020B0609020204030204" pitchFamily="49" charset="0"/>
+              </a:rPr>
+              <a:t>                </a:t>
+            </a:r>
+            <a:r>
+              <a:rPr lang="en-US" sz="2200" dirty="0" err="1">
+                <a:solidFill>
+                  <a:schemeClr val="tx1"/>
+                </a:solidFill>
+                <a:latin typeface="Consolas" panose="020B0609020204030204" pitchFamily="49" charset="0"/>
+              </a:rPr>
+              <a:t>Console.WriteLine</a:t>
+            </a:r>
+            <a:r>
+              <a:rPr lang="en-US" sz="2200" dirty="0">
+                <a:solidFill>
+                  <a:schemeClr val="tx1"/>
+                </a:solidFill>
+                <a:latin typeface="Consolas" panose="020B0609020204030204" pitchFamily="49" charset="0"/>
+              </a:rPr>
+              <a:t>(</a:t>
+            </a:r>
+            <a:r>
+              <a:rPr lang="en-US" sz="2200" dirty="0" err="1">
+                <a:solidFill>
+                  <a:schemeClr val="tx1"/>
+                </a:solidFill>
+                <a:latin typeface="Consolas" panose="020B0609020204030204" pitchFamily="49" charset="0"/>
+              </a:rPr>
+              <a:t>i</a:t>
+            </a:r>
+            <a:r>
+              <a:rPr lang="en-US" sz="2200" dirty="0">
+                <a:solidFill>
+                  <a:schemeClr val="tx1"/>
+                </a:solidFill>
+                <a:latin typeface="Consolas" panose="020B0609020204030204" pitchFamily="49" charset="0"/>
+              </a:rPr>
+              <a:t>);</a:t>
+            </a:r>
+          </a:p>
+          <a:p>
+            <a:pPr marL="0" indent="0">
+              <a:buNone/>
+            </a:pPr>
+            <a:r>
+              <a:rPr lang="bg-BG" sz="2200" dirty="0">
+                <a:solidFill>
+                  <a:schemeClr val="tx1"/>
+                </a:solidFill>
+                <a:latin typeface="Consolas" panose="020B0609020204030204" pitchFamily="49" charset="0"/>
+              </a:rPr>
+              <a:t>            }</a:t>
+            </a:r>
+          </a:p>
+          <a:p>
+            <a:pPr marL="0" indent="0">
+              <a:buNone/>
+            </a:pPr>
+            <a:r>
+              <a:rPr lang="bg-BG" sz="2200" dirty="0">
+                <a:latin typeface="Consolas" panose="020B0609020204030204" pitchFamily="49" charset="0"/>
+              </a:rPr>
+              <a:t>        </a:t>
+            </a:r>
+            <a:r>
+              <a:rPr lang="bg-BG" sz="2200" dirty="0">
+                <a:solidFill>
+                  <a:schemeClr val="accent4">
+                    <a:lumMod val="20000"/>
+                    <a:lumOff val="80000"/>
+                  </a:schemeClr>
+                </a:solidFill>
+                <a:latin typeface="Consolas" panose="020B0609020204030204" pitchFamily="49" charset="0"/>
+              </a:rPr>
+              <a:t>}</a:t>
+            </a:r>
+          </a:p>
+          <a:p>
+            <a:endParaRPr lang="bg-BG" dirty="0"/>
+          </a:p>
+        </p:txBody>
+      </p:sp>
+    </p:spTree>
+    <p:extLst>
+      <p:ext uri="{BB962C8B-B14F-4D97-AF65-F5344CB8AC3E}">
+        <p14:creationId xmlns:p14="http://schemas.microsoft.com/office/powerpoint/2010/main" val="1665392063"/>
+      </p:ext>
+    </p:extLst>
+  </p:cSld>
+  <p:clrMapOvr>
+    <a:masterClrMapping/>
+  </p:clrMapOvr>
+</p:sld>
+</file>
+
+<file path=ppt/slides/slide7.xml><?xml version="1.0" encoding="utf-8"?>
+<p:sld xmlns:a="http://schemas.openxmlformats.org/drawingml/2006/main" xmlns:r="http://schemas.openxmlformats.org/officeDocument/2006/relationships" xmlns:p="http://schemas.openxmlformats.org/presentationml/2006/main">
+  <p:cSld>
+    <p:spTree>
+      <p:nvGrpSpPr>
+        <p:cNvPr id="1" name=""/>
+        <p:cNvGrpSpPr/>
+        <p:nvPr/>
+      </p:nvGrpSpPr>
+      <p:grpSpPr>
+        <a:xfrm>
+          <a:off x="0" y="0"/>
+          <a:ext cx="0" cy="0"/>
+          <a:chOff x="0" y="0"/>
+          <a:chExt cx="0" cy="0"/>
+        </a:xfrm>
+      </p:grpSpPr>
+      <p:sp>
+        <p:nvSpPr>
+          <p:cNvPr id="2" name="Title 1">
+            <a:extLst>
+              <a:ext uri="{FF2B5EF4-FFF2-40B4-BE49-F238E27FC236}">
+                <a16:creationId xmlns:a16="http://schemas.microsoft.com/office/drawing/2014/main" id="{4B44E0ED-7B8C-B8F2-F8C7-9A9983B7E5AE}"/>
+              </a:ext>
+            </a:extLst>
+          </p:cNvPr>
+          <p:cNvSpPr>
+            <a:spLocks noGrp="1"/>
+          </p:cNvSpPr>
+          <p:nvPr>
+            <p:ph type="title"/>
+          </p:nvPr>
+        </p:nvSpPr>
+        <p:spPr/>
+        <p:txBody>
+          <a:bodyPr/>
+          <a:lstStyle/>
+          <a:p>
+            <a:pPr algn="ctr"/>
+            <a:r>
+              <a:rPr lang="bg-BG" dirty="0">
+                <a:latin typeface="Arial" panose="020B0604020202020204" pitchFamily="34" charset="0"/>
+                <a:cs typeface="Arial" panose="020B0604020202020204" pitchFamily="34" charset="0"/>
+              </a:rPr>
+              <a:t>Връщане на стойност от метод</a:t>
+            </a:r>
+          </a:p>
+        </p:txBody>
+      </p:sp>
+      <p:sp>
+        <p:nvSpPr>
+          <p:cNvPr id="3" name="Content Placeholder 2">
+            <a:extLst>
+              <a:ext uri="{FF2B5EF4-FFF2-40B4-BE49-F238E27FC236}">
+                <a16:creationId xmlns:a16="http://schemas.microsoft.com/office/drawing/2014/main" id="{608405C8-E35E-6B53-C0E5-6BD1D74E17BF}"/>
+              </a:ext>
+            </a:extLst>
+          </p:cNvPr>
+          <p:cNvSpPr>
+            <a:spLocks noGrp="1"/>
+          </p:cNvSpPr>
+          <p:nvPr>
+            <p:ph idx="1"/>
+          </p:nvPr>
+        </p:nvSpPr>
+        <p:spPr/>
+        <p:txBody>
+          <a:bodyPr/>
+          <a:lstStyle/>
+          <a:p>
+            <a:r>
+              <a:rPr lang="bg-BG" dirty="0"/>
+              <a:t>Освен </a:t>
+            </a:r>
+            <a:r>
+              <a:rPr lang="en-US" dirty="0"/>
+              <a:t>void </a:t>
+            </a:r>
+            <a:r>
+              <a:rPr lang="bg-BG" dirty="0"/>
+              <a:t>методите, съществуват и методи, които могат да връщат дадена стойност.</a:t>
+            </a:r>
+          </a:p>
+          <a:p>
+            <a:endParaRPr lang="bg-BG" dirty="0"/>
+          </a:p>
+          <a:p>
+            <a:endParaRPr lang="bg-BG" dirty="0"/>
+          </a:p>
+          <a:p>
+            <a:pPr lvl="1"/>
+            <a:endParaRPr lang="bg-BG" dirty="0"/>
+          </a:p>
+        </p:txBody>
+      </p:sp>
+      <p:sp>
+        <p:nvSpPr>
+          <p:cNvPr id="4" name="TextBox 3">
+            <a:extLst>
+              <a:ext uri="{FF2B5EF4-FFF2-40B4-BE49-F238E27FC236}">
+                <a16:creationId xmlns:a16="http://schemas.microsoft.com/office/drawing/2014/main" id="{51FA8763-49F6-0C04-1D84-ACDF590615BF}"/>
+              </a:ext>
+            </a:extLst>
+          </p:cNvPr>
+          <p:cNvSpPr txBox="1"/>
+          <p:nvPr/>
+        </p:nvSpPr>
+        <p:spPr>
+          <a:xfrm>
+            <a:off x="442992" y="4109849"/>
+            <a:ext cx="6432593" cy="1754326"/>
+          </a:xfrm>
+          <a:prstGeom prst="rect">
+            <a:avLst/>
+          </a:prstGeom>
+          <a:noFill/>
+        </p:spPr>
+        <p:txBody>
+          <a:bodyPr wrap="square">
+            <a:spAutoFit/>
+          </a:bodyPr>
+          <a:lstStyle/>
+          <a:p>
+            <a:r>
+              <a:rPr lang="en-US" sz="1800" dirty="0">
+                <a:latin typeface="Cascadia Mono" panose="020B0609020000020004" pitchFamily="49" charset="0"/>
+              </a:rPr>
+              <a:t> </a:t>
+            </a:r>
+            <a:r>
+              <a:rPr lang="en-US" sz="1800" dirty="0">
+                <a:solidFill>
+                  <a:schemeClr val="accent6">
+                    <a:lumMod val="75000"/>
+                  </a:schemeClr>
+                </a:solidFill>
+                <a:latin typeface="Consolas" panose="020B0609020204030204" pitchFamily="49" charset="0"/>
+              </a:rPr>
+              <a:t>static</a:t>
+            </a:r>
+            <a:r>
+              <a:rPr lang="en-US" sz="1800" dirty="0">
+                <a:latin typeface="Consolas" panose="020B0609020204030204" pitchFamily="49" charset="0"/>
+              </a:rPr>
+              <a:t> </a:t>
+            </a:r>
+            <a:r>
+              <a:rPr lang="en-US" sz="1800" dirty="0">
+                <a:solidFill>
+                  <a:srgbClr val="00B050"/>
+                </a:solidFill>
+                <a:latin typeface="Consolas" panose="020B0609020204030204" pitchFamily="49" charset="0"/>
+              </a:rPr>
+              <a:t>int</a:t>
+            </a:r>
+            <a:r>
+              <a:rPr lang="en-US" sz="1800" dirty="0">
+                <a:latin typeface="Consolas" panose="020B0609020204030204" pitchFamily="49" charset="0"/>
+              </a:rPr>
+              <a:t> </a:t>
+            </a:r>
+            <a:r>
+              <a:rPr lang="en-US" sz="1800" dirty="0" err="1">
+                <a:solidFill>
+                  <a:srgbClr val="FFFF00"/>
+                </a:solidFill>
+                <a:latin typeface="Consolas" panose="020B0609020204030204" pitchFamily="49" charset="0"/>
+              </a:rPr>
+              <a:t>SumTwoNumbers</a:t>
+            </a:r>
+            <a:r>
+              <a:rPr lang="en-US" sz="1800" dirty="0">
+                <a:solidFill>
+                  <a:srgbClr val="FFFF00"/>
+                </a:solidFill>
+                <a:latin typeface="Consolas" panose="020B0609020204030204" pitchFamily="49" charset="0"/>
+              </a:rPr>
+              <a:t>(</a:t>
+            </a:r>
+            <a:r>
+              <a:rPr lang="en-US" sz="1800" dirty="0">
+                <a:solidFill>
+                  <a:srgbClr val="00B050"/>
+                </a:solidFill>
+                <a:latin typeface="Consolas" panose="020B0609020204030204" pitchFamily="49" charset="0"/>
+              </a:rPr>
+              <a:t>int</a:t>
+            </a:r>
+            <a:r>
+              <a:rPr lang="en-US" sz="1800" dirty="0">
+                <a:solidFill>
+                  <a:srgbClr val="FFFF00"/>
+                </a:solidFill>
+                <a:latin typeface="Consolas" panose="020B0609020204030204" pitchFamily="49" charset="0"/>
+              </a:rPr>
+              <a:t> </a:t>
+            </a:r>
+            <a:r>
+              <a:rPr lang="en-US" sz="1800" dirty="0" err="1">
+                <a:solidFill>
+                  <a:schemeClr val="tx2">
+                    <a:lumMod val="75000"/>
+                  </a:schemeClr>
+                </a:solidFill>
+                <a:latin typeface="Consolas" panose="020B0609020204030204" pitchFamily="49" charset="0"/>
+              </a:rPr>
+              <a:t>numOne</a:t>
+            </a:r>
+            <a:r>
+              <a:rPr lang="en-US" sz="1800" dirty="0">
+                <a:solidFill>
+                  <a:srgbClr val="FFFF00"/>
+                </a:solidFill>
+                <a:latin typeface="Consolas" panose="020B0609020204030204" pitchFamily="49" charset="0"/>
+              </a:rPr>
+              <a:t>, </a:t>
+            </a:r>
+            <a:r>
+              <a:rPr lang="en-US" sz="1800" dirty="0">
+                <a:solidFill>
+                  <a:srgbClr val="00B050"/>
+                </a:solidFill>
+                <a:latin typeface="Consolas" panose="020B0609020204030204" pitchFamily="49" charset="0"/>
+              </a:rPr>
+              <a:t>int</a:t>
+            </a:r>
+            <a:r>
+              <a:rPr lang="en-US" sz="1800" dirty="0">
+                <a:solidFill>
+                  <a:srgbClr val="FFFF00"/>
+                </a:solidFill>
+                <a:latin typeface="Consolas" panose="020B0609020204030204" pitchFamily="49" charset="0"/>
+              </a:rPr>
+              <a:t> </a:t>
+            </a:r>
+            <a:r>
+              <a:rPr lang="en-US" sz="1800" dirty="0" err="1">
+                <a:solidFill>
+                  <a:schemeClr val="tx2">
+                    <a:lumMod val="75000"/>
+                  </a:schemeClr>
+                </a:solidFill>
+                <a:latin typeface="Consolas" panose="020B0609020204030204" pitchFamily="49" charset="0"/>
+              </a:rPr>
+              <a:t>numTwo</a:t>
+            </a:r>
+            <a:r>
+              <a:rPr lang="en-US" sz="1800" dirty="0">
+                <a:solidFill>
+                  <a:srgbClr val="FFFF00"/>
+                </a:solidFill>
+                <a:latin typeface="Consolas" panose="020B0609020204030204" pitchFamily="49" charset="0"/>
+              </a:rPr>
+              <a:t>)</a:t>
+            </a:r>
+          </a:p>
+          <a:p>
+            <a:r>
+              <a:rPr lang="bg-BG" sz="1800" dirty="0">
+                <a:latin typeface="Consolas" panose="020B0609020204030204" pitchFamily="49" charset="0"/>
+              </a:rPr>
+              <a:t>        </a:t>
+            </a:r>
+            <a:r>
+              <a:rPr lang="bg-BG" sz="1800" dirty="0">
+                <a:solidFill>
+                  <a:schemeClr val="accent4">
+                    <a:lumMod val="20000"/>
+                    <a:lumOff val="80000"/>
+                  </a:schemeClr>
+                </a:solidFill>
+                <a:latin typeface="Consolas" panose="020B0609020204030204" pitchFamily="49" charset="0"/>
+              </a:rPr>
+              <a:t>{</a:t>
+            </a:r>
+          </a:p>
+          <a:p>
+            <a:r>
+              <a:rPr lang="nn-NO" sz="1800" dirty="0">
+                <a:latin typeface="Consolas" panose="020B0609020204030204" pitchFamily="49" charset="0"/>
+              </a:rPr>
+              <a:t> 			 </a:t>
+            </a:r>
+            <a:r>
+              <a:rPr lang="en-US" sz="1800" dirty="0">
+                <a:solidFill>
+                  <a:srgbClr val="00B050"/>
+                </a:solidFill>
+                <a:latin typeface="Consolas" panose="020B0609020204030204" pitchFamily="49" charset="0"/>
+              </a:rPr>
+              <a:t>int</a:t>
+            </a:r>
+            <a:r>
+              <a:rPr lang="en-US" sz="1800" dirty="0">
+                <a:solidFill>
+                  <a:schemeClr val="tx2">
+                    <a:lumMod val="60000"/>
+                    <a:lumOff val="40000"/>
+                  </a:schemeClr>
+                </a:solidFill>
+                <a:latin typeface="Consolas" panose="020B0609020204030204" pitchFamily="49" charset="0"/>
+              </a:rPr>
+              <a:t> </a:t>
+            </a:r>
+            <a:r>
+              <a:rPr lang="en-US" sz="1800" dirty="0">
+                <a:solidFill>
+                  <a:srgbClr val="FFC000"/>
+                </a:solidFill>
+                <a:latin typeface="Consolas" panose="020B0609020204030204" pitchFamily="49" charset="0"/>
+              </a:rPr>
+              <a:t>sum</a:t>
+            </a:r>
+            <a:r>
+              <a:rPr lang="en-US" sz="1800" dirty="0">
+                <a:solidFill>
+                  <a:schemeClr val="tx2">
+                    <a:lumMod val="60000"/>
+                    <a:lumOff val="40000"/>
+                  </a:schemeClr>
+                </a:solidFill>
+                <a:latin typeface="Consolas" panose="020B0609020204030204" pitchFamily="49" charset="0"/>
+              </a:rPr>
+              <a:t> = </a:t>
+            </a:r>
+            <a:r>
+              <a:rPr lang="en-US" sz="1800" dirty="0" err="1">
+                <a:solidFill>
+                  <a:schemeClr val="tx2">
+                    <a:lumMod val="75000"/>
+                  </a:schemeClr>
+                </a:solidFill>
+                <a:latin typeface="Consolas" panose="020B0609020204030204" pitchFamily="49" charset="0"/>
+              </a:rPr>
+              <a:t>numOne</a:t>
+            </a:r>
+            <a:r>
+              <a:rPr lang="en-US" sz="1800" dirty="0">
+                <a:solidFill>
+                  <a:schemeClr val="tx2">
+                    <a:lumMod val="60000"/>
+                    <a:lumOff val="40000"/>
+                  </a:schemeClr>
+                </a:solidFill>
+                <a:latin typeface="Consolas" panose="020B0609020204030204" pitchFamily="49" charset="0"/>
+              </a:rPr>
+              <a:t> + </a:t>
+            </a:r>
+            <a:r>
+              <a:rPr lang="en-US" sz="1800" dirty="0" err="1">
+                <a:solidFill>
+                  <a:schemeClr val="tx2">
+                    <a:lumMod val="75000"/>
+                  </a:schemeClr>
+                </a:solidFill>
+                <a:latin typeface="Consolas" panose="020B0609020204030204" pitchFamily="49" charset="0"/>
+              </a:rPr>
+              <a:t>numTwo</a:t>
+            </a:r>
+            <a:r>
+              <a:rPr lang="en-US" sz="1800" dirty="0">
+                <a:solidFill>
+                  <a:schemeClr val="tx2">
+                    <a:lumMod val="60000"/>
+                    <a:lumOff val="40000"/>
+                  </a:schemeClr>
+                </a:solidFill>
+                <a:latin typeface="Consolas" panose="020B0609020204030204" pitchFamily="49" charset="0"/>
+              </a:rPr>
+              <a:t>;</a:t>
+            </a:r>
+          </a:p>
+          <a:p>
+            <a:endParaRPr lang="en-US" dirty="0">
+              <a:solidFill>
+                <a:schemeClr val="tx2">
+                  <a:lumMod val="60000"/>
+                  <a:lumOff val="40000"/>
+                </a:schemeClr>
+              </a:solidFill>
+              <a:latin typeface="Consolas" panose="020B0609020204030204" pitchFamily="49" charset="0"/>
+            </a:endParaRPr>
+          </a:p>
+          <a:p>
+            <a:r>
+              <a:rPr lang="en-US" sz="1800" dirty="0">
+                <a:solidFill>
+                  <a:schemeClr val="tx2">
+                    <a:lumMod val="60000"/>
+                    <a:lumOff val="40000"/>
+                  </a:schemeClr>
+                </a:solidFill>
+                <a:latin typeface="Consolas" panose="020B0609020204030204" pitchFamily="49" charset="0"/>
+              </a:rPr>
+              <a:t>			 </a:t>
+            </a:r>
+            <a:r>
+              <a:rPr lang="en-US" sz="1800" dirty="0">
+                <a:latin typeface="Consolas" panose="020B0609020204030204" pitchFamily="49" charset="0"/>
+              </a:rPr>
+              <a:t>return</a:t>
+            </a:r>
+            <a:r>
+              <a:rPr lang="en-US" sz="1800" dirty="0">
+                <a:solidFill>
+                  <a:schemeClr val="tx2">
+                    <a:lumMod val="60000"/>
+                    <a:lumOff val="40000"/>
+                  </a:schemeClr>
+                </a:solidFill>
+                <a:latin typeface="Consolas" panose="020B0609020204030204" pitchFamily="49" charset="0"/>
+              </a:rPr>
+              <a:t> </a:t>
+            </a:r>
+            <a:r>
+              <a:rPr lang="en-US" sz="1800" dirty="0">
+                <a:solidFill>
+                  <a:srgbClr val="FFC000"/>
+                </a:solidFill>
+                <a:latin typeface="Consolas" panose="020B0609020204030204" pitchFamily="49" charset="0"/>
+              </a:rPr>
+              <a:t>sum</a:t>
+            </a:r>
+            <a:r>
+              <a:rPr lang="en-US" sz="1800" dirty="0">
+                <a:solidFill>
+                  <a:schemeClr val="tx2">
+                    <a:lumMod val="60000"/>
+                    <a:lumOff val="40000"/>
+                  </a:schemeClr>
+                </a:solidFill>
+                <a:latin typeface="Consolas" panose="020B0609020204030204" pitchFamily="49" charset="0"/>
+              </a:rPr>
+              <a:t>; </a:t>
+            </a:r>
+            <a:endParaRPr lang="bg-BG" sz="1800" dirty="0">
+              <a:solidFill>
+                <a:schemeClr val="tx2">
+                  <a:lumMod val="60000"/>
+                  <a:lumOff val="40000"/>
+                </a:schemeClr>
+              </a:solidFill>
+              <a:latin typeface="Consolas" panose="020B0609020204030204" pitchFamily="49" charset="0"/>
+            </a:endParaRPr>
+          </a:p>
+          <a:p>
+            <a:r>
+              <a:rPr lang="bg-BG" sz="1800" dirty="0">
+                <a:latin typeface="Consolas" panose="020B0609020204030204" pitchFamily="49" charset="0"/>
+              </a:rPr>
+              <a:t>        </a:t>
+            </a:r>
+            <a:r>
+              <a:rPr lang="bg-BG" sz="1800" dirty="0">
+                <a:solidFill>
+                  <a:schemeClr val="accent4">
+                    <a:lumMod val="20000"/>
+                    <a:lumOff val="80000"/>
+                  </a:schemeClr>
+                </a:solidFill>
+                <a:latin typeface="Consolas" panose="020B0609020204030204" pitchFamily="49" charset="0"/>
+              </a:rPr>
+              <a:t>}</a:t>
+            </a:r>
+            <a:endParaRPr lang="bg-BG" dirty="0">
+              <a:solidFill>
+                <a:schemeClr val="accent4">
+                  <a:lumMod val="20000"/>
+                  <a:lumOff val="80000"/>
+                </a:schemeClr>
+              </a:solidFill>
+              <a:latin typeface="Consolas" panose="020B0609020204030204" pitchFamily="49" charset="0"/>
+            </a:endParaRPr>
+          </a:p>
+        </p:txBody>
+      </p:sp>
+      <p:sp>
+        <p:nvSpPr>
+          <p:cNvPr id="5" name="TextBox 4">
+            <a:extLst>
+              <a:ext uri="{FF2B5EF4-FFF2-40B4-BE49-F238E27FC236}">
+                <a16:creationId xmlns:a16="http://schemas.microsoft.com/office/drawing/2014/main" id="{F9F3C6E3-7EE2-7C3B-30ED-3435D44FBEE4}"/>
+              </a:ext>
+            </a:extLst>
+          </p:cNvPr>
+          <p:cNvSpPr txBox="1"/>
+          <p:nvPr/>
+        </p:nvSpPr>
+        <p:spPr>
+          <a:xfrm>
+            <a:off x="1337094" y="3171038"/>
+            <a:ext cx="3234906" cy="646331"/>
+          </a:xfrm>
+          <a:prstGeom prst="rect">
+            <a:avLst/>
+          </a:prstGeom>
+          <a:noFill/>
+        </p:spPr>
+        <p:txBody>
+          <a:bodyPr wrap="square" rtlCol="0">
+            <a:spAutoFit/>
+          </a:bodyPr>
+          <a:lstStyle/>
+          <a:p>
+            <a:r>
+              <a:rPr lang="bg-BG" dirty="0">
+                <a:latin typeface="Arial" panose="020B0604020202020204" pitchFamily="34" charset="0"/>
+                <a:cs typeface="Arial" panose="020B0604020202020204" pitchFamily="34" charset="0"/>
+              </a:rPr>
+              <a:t>Със параметри и върната стойност:</a:t>
+            </a:r>
+          </a:p>
+        </p:txBody>
+      </p:sp>
+      <p:sp>
+        <p:nvSpPr>
+          <p:cNvPr id="6" name="TextBox 5">
+            <a:extLst>
+              <a:ext uri="{FF2B5EF4-FFF2-40B4-BE49-F238E27FC236}">
+                <a16:creationId xmlns:a16="http://schemas.microsoft.com/office/drawing/2014/main" id="{648A30F4-1118-B981-2B11-BE236507E031}"/>
+              </a:ext>
+            </a:extLst>
+          </p:cNvPr>
+          <p:cNvSpPr txBox="1"/>
+          <p:nvPr/>
+        </p:nvSpPr>
+        <p:spPr>
+          <a:xfrm>
+            <a:off x="7127745" y="4109849"/>
+            <a:ext cx="5064255" cy="1754326"/>
+          </a:xfrm>
+          <a:prstGeom prst="rect">
+            <a:avLst/>
+          </a:prstGeom>
+          <a:noFill/>
+        </p:spPr>
+        <p:txBody>
+          <a:bodyPr wrap="square">
+            <a:spAutoFit/>
+          </a:bodyPr>
+          <a:lstStyle/>
+          <a:p>
+            <a:r>
+              <a:rPr lang="en-US" sz="1800" dirty="0">
+                <a:latin typeface="Cascadia Mono" panose="020B0609020000020004" pitchFamily="49" charset="0"/>
+              </a:rPr>
+              <a:t> </a:t>
+            </a:r>
+            <a:r>
+              <a:rPr lang="en-US" sz="1800" dirty="0">
+                <a:solidFill>
+                  <a:schemeClr val="accent6">
+                    <a:lumMod val="75000"/>
+                  </a:schemeClr>
+                </a:solidFill>
+                <a:latin typeface="Consolas" panose="020B0609020204030204" pitchFamily="49" charset="0"/>
+              </a:rPr>
+              <a:t>static</a:t>
+            </a:r>
+            <a:r>
+              <a:rPr lang="en-US" sz="1800" dirty="0">
+                <a:latin typeface="Consolas" panose="020B0609020204030204" pitchFamily="49" charset="0"/>
+              </a:rPr>
+              <a:t> </a:t>
+            </a:r>
+            <a:r>
+              <a:rPr lang="en-US" dirty="0">
+                <a:solidFill>
+                  <a:srgbClr val="00B050"/>
+                </a:solidFill>
+                <a:latin typeface="Consolas" panose="020B0609020204030204" pitchFamily="49" charset="0"/>
+              </a:rPr>
+              <a:t>string</a:t>
+            </a:r>
+            <a:r>
+              <a:rPr lang="en-US" sz="1800" dirty="0">
+                <a:latin typeface="Consolas" panose="020B0609020204030204" pitchFamily="49" charset="0"/>
+              </a:rPr>
+              <a:t> </a:t>
+            </a:r>
+            <a:r>
+              <a:rPr lang="en-US" sz="1800" dirty="0" err="1">
+                <a:solidFill>
+                  <a:srgbClr val="FFFF00"/>
+                </a:solidFill>
+                <a:latin typeface="Consolas" panose="020B0609020204030204" pitchFamily="49" charset="0"/>
+              </a:rPr>
+              <a:t>GetText</a:t>
+            </a:r>
+            <a:r>
+              <a:rPr lang="en-US" sz="1800" dirty="0">
+                <a:solidFill>
+                  <a:srgbClr val="FFFF00"/>
+                </a:solidFill>
+                <a:latin typeface="Consolas" panose="020B0609020204030204" pitchFamily="49" charset="0"/>
+              </a:rPr>
+              <a:t>()</a:t>
+            </a:r>
+          </a:p>
+          <a:p>
+            <a:r>
+              <a:rPr lang="bg-BG" sz="1800" dirty="0">
+                <a:latin typeface="Consolas" panose="020B0609020204030204" pitchFamily="49" charset="0"/>
+              </a:rPr>
+              <a:t>        </a:t>
+            </a:r>
+            <a:r>
+              <a:rPr lang="bg-BG" sz="1800" dirty="0">
+                <a:solidFill>
+                  <a:schemeClr val="accent4">
+                    <a:lumMod val="20000"/>
+                    <a:lumOff val="80000"/>
+                  </a:schemeClr>
+                </a:solidFill>
+                <a:latin typeface="Consolas" panose="020B0609020204030204" pitchFamily="49" charset="0"/>
+              </a:rPr>
+              <a:t>{</a:t>
+            </a:r>
+          </a:p>
+          <a:p>
+            <a:r>
+              <a:rPr lang="nn-NO" sz="1800" dirty="0">
+                <a:latin typeface="Consolas" panose="020B0609020204030204" pitchFamily="49" charset="0"/>
+              </a:rPr>
+              <a:t> 			 </a:t>
+            </a:r>
+            <a:r>
+              <a:rPr lang="en-US" sz="1800" dirty="0">
+                <a:solidFill>
+                  <a:srgbClr val="00B050"/>
+                </a:solidFill>
+                <a:latin typeface="Consolas" panose="020B0609020204030204" pitchFamily="49" charset="0"/>
+              </a:rPr>
+              <a:t>string</a:t>
+            </a:r>
+            <a:r>
+              <a:rPr lang="en-US" sz="1800" dirty="0">
+                <a:solidFill>
+                  <a:schemeClr val="tx2">
+                    <a:lumMod val="60000"/>
+                    <a:lumOff val="40000"/>
+                  </a:schemeClr>
+                </a:solidFill>
+                <a:latin typeface="Consolas" panose="020B0609020204030204" pitchFamily="49" charset="0"/>
+              </a:rPr>
+              <a:t> </a:t>
+            </a:r>
+            <a:r>
+              <a:rPr lang="en-US" sz="1800" dirty="0">
+                <a:solidFill>
+                  <a:srgbClr val="FFC000"/>
+                </a:solidFill>
+                <a:latin typeface="Consolas" panose="020B0609020204030204" pitchFamily="49" charset="0"/>
+              </a:rPr>
+              <a:t>text</a:t>
+            </a:r>
+            <a:r>
+              <a:rPr lang="en-US" sz="1800" dirty="0">
+                <a:solidFill>
+                  <a:schemeClr val="tx2">
+                    <a:lumMod val="60000"/>
+                    <a:lumOff val="40000"/>
+                  </a:schemeClr>
+                </a:solidFill>
+                <a:latin typeface="Consolas" panose="020B0609020204030204" pitchFamily="49" charset="0"/>
+              </a:rPr>
+              <a:t> = </a:t>
+            </a:r>
+            <a:r>
+              <a:rPr lang="en-US" sz="1800" dirty="0">
+                <a:latin typeface="Consolas" panose="020B0609020204030204" pitchFamily="49" charset="0"/>
+              </a:rPr>
+              <a:t>“A” </a:t>
+            </a:r>
+            <a:r>
+              <a:rPr lang="en-US" sz="1800" dirty="0">
+                <a:solidFill>
+                  <a:schemeClr val="tx2">
+                    <a:lumMod val="60000"/>
+                    <a:lumOff val="40000"/>
+                  </a:schemeClr>
+                </a:solidFill>
+                <a:latin typeface="Consolas" panose="020B0609020204030204" pitchFamily="49" charset="0"/>
+              </a:rPr>
+              <a:t>+ </a:t>
+            </a:r>
+            <a:r>
+              <a:rPr lang="en-US" sz="1800" dirty="0">
+                <a:latin typeface="Consolas" panose="020B0609020204030204" pitchFamily="49" charset="0"/>
+              </a:rPr>
+              <a:t>“B”</a:t>
+            </a:r>
+            <a:r>
+              <a:rPr lang="en-US" sz="1800" dirty="0">
+                <a:solidFill>
+                  <a:schemeClr val="tx2">
+                    <a:lumMod val="60000"/>
+                    <a:lumOff val="40000"/>
+                  </a:schemeClr>
+                </a:solidFill>
+                <a:latin typeface="Consolas" panose="020B0609020204030204" pitchFamily="49" charset="0"/>
+              </a:rPr>
+              <a:t>;</a:t>
+            </a:r>
+          </a:p>
+          <a:p>
+            <a:endParaRPr lang="en-US" dirty="0">
+              <a:solidFill>
+                <a:schemeClr val="tx2">
+                  <a:lumMod val="60000"/>
+                  <a:lumOff val="40000"/>
+                </a:schemeClr>
+              </a:solidFill>
+              <a:latin typeface="Consolas" panose="020B0609020204030204" pitchFamily="49" charset="0"/>
+            </a:endParaRPr>
+          </a:p>
+          <a:p>
+            <a:r>
+              <a:rPr lang="en-US" sz="1800" dirty="0">
+                <a:solidFill>
+                  <a:schemeClr val="tx2">
+                    <a:lumMod val="60000"/>
+                    <a:lumOff val="40000"/>
+                  </a:schemeClr>
+                </a:solidFill>
+                <a:latin typeface="Consolas" panose="020B0609020204030204" pitchFamily="49" charset="0"/>
+              </a:rPr>
+              <a:t>			 </a:t>
+            </a:r>
+            <a:r>
+              <a:rPr lang="en-US" sz="1800" dirty="0">
+                <a:latin typeface="Consolas" panose="020B0609020204030204" pitchFamily="49" charset="0"/>
+              </a:rPr>
+              <a:t>return</a:t>
+            </a:r>
+            <a:r>
+              <a:rPr lang="en-US" sz="1800" dirty="0">
+                <a:solidFill>
+                  <a:schemeClr val="tx2">
+                    <a:lumMod val="60000"/>
+                    <a:lumOff val="40000"/>
+                  </a:schemeClr>
+                </a:solidFill>
+                <a:latin typeface="Consolas" panose="020B0609020204030204" pitchFamily="49" charset="0"/>
+              </a:rPr>
+              <a:t> </a:t>
+            </a:r>
+            <a:r>
+              <a:rPr lang="en-US" sz="1800" dirty="0">
+                <a:solidFill>
+                  <a:srgbClr val="FFC000"/>
+                </a:solidFill>
+                <a:latin typeface="Consolas" panose="020B0609020204030204" pitchFamily="49" charset="0"/>
+              </a:rPr>
+              <a:t>text</a:t>
+            </a:r>
+            <a:r>
+              <a:rPr lang="en-US" sz="1800" dirty="0">
+                <a:solidFill>
+                  <a:schemeClr val="tx2">
+                    <a:lumMod val="60000"/>
+                    <a:lumOff val="40000"/>
+                  </a:schemeClr>
+                </a:solidFill>
+                <a:latin typeface="Consolas" panose="020B0609020204030204" pitchFamily="49" charset="0"/>
+              </a:rPr>
+              <a:t>; </a:t>
+            </a:r>
+            <a:endParaRPr lang="bg-BG" sz="1800" dirty="0">
+              <a:solidFill>
+                <a:schemeClr val="tx2">
+                  <a:lumMod val="60000"/>
+                  <a:lumOff val="40000"/>
+                </a:schemeClr>
+              </a:solidFill>
+              <a:latin typeface="Consolas" panose="020B0609020204030204" pitchFamily="49" charset="0"/>
+            </a:endParaRPr>
+          </a:p>
+          <a:p>
+            <a:r>
+              <a:rPr lang="bg-BG" sz="1800" dirty="0">
+                <a:latin typeface="Consolas" panose="020B0609020204030204" pitchFamily="49" charset="0"/>
+              </a:rPr>
+              <a:t>        </a:t>
+            </a:r>
+            <a:r>
+              <a:rPr lang="bg-BG" sz="1800" dirty="0">
+                <a:solidFill>
+                  <a:schemeClr val="accent4">
+                    <a:lumMod val="20000"/>
+                    <a:lumOff val="80000"/>
+                  </a:schemeClr>
+                </a:solidFill>
+                <a:latin typeface="Consolas" panose="020B0609020204030204" pitchFamily="49" charset="0"/>
+              </a:rPr>
+              <a:t>}</a:t>
+            </a:r>
+            <a:endParaRPr lang="bg-BG" dirty="0">
+              <a:solidFill>
+                <a:schemeClr val="accent4">
+                  <a:lumMod val="20000"/>
+                  <a:lumOff val="80000"/>
+                </a:schemeClr>
+              </a:solidFill>
+              <a:latin typeface="Consolas" panose="020B0609020204030204" pitchFamily="49" charset="0"/>
+            </a:endParaRPr>
+          </a:p>
+        </p:txBody>
+      </p:sp>
+      <p:sp>
+        <p:nvSpPr>
+          <p:cNvPr id="7" name="TextBox 6">
+            <a:extLst>
+              <a:ext uri="{FF2B5EF4-FFF2-40B4-BE49-F238E27FC236}">
+                <a16:creationId xmlns:a16="http://schemas.microsoft.com/office/drawing/2014/main" id="{437EDD6F-FC3A-9414-BB98-CEAFD6287C91}"/>
+              </a:ext>
+            </a:extLst>
+          </p:cNvPr>
+          <p:cNvSpPr txBox="1"/>
+          <p:nvPr/>
+        </p:nvSpPr>
+        <p:spPr>
+          <a:xfrm>
+            <a:off x="7837094" y="3188568"/>
+            <a:ext cx="3234906" cy="646331"/>
+          </a:xfrm>
+          <a:prstGeom prst="rect">
+            <a:avLst/>
+          </a:prstGeom>
+          <a:noFill/>
+        </p:spPr>
+        <p:txBody>
+          <a:bodyPr wrap="square" rtlCol="0">
+            <a:spAutoFit/>
+          </a:bodyPr>
+          <a:lstStyle/>
+          <a:p>
+            <a:r>
+              <a:rPr lang="bg-BG" dirty="0">
+                <a:latin typeface="Arial" panose="020B0604020202020204" pitchFamily="34" charset="0"/>
+                <a:cs typeface="Arial" panose="020B0604020202020204" pitchFamily="34" charset="0"/>
+              </a:rPr>
+              <a:t>Без параметри със върната стойност:</a:t>
+            </a:r>
+          </a:p>
+        </p:txBody>
+      </p:sp>
+    </p:spTree>
+    <p:extLst>
+      <p:ext uri="{BB962C8B-B14F-4D97-AF65-F5344CB8AC3E}">
+        <p14:creationId xmlns:p14="http://schemas.microsoft.com/office/powerpoint/2010/main" val="2899913095"/>
+      </p:ext>
+    </p:extLst>
+  </p:cSld>
+  <p:clrMapOvr>
+    <a:masterClrMapping/>
+  </p:clrMapOvr>
+</p:sld>
+</file>
+
+<file path=ppt/slides/slide8.xml><?xml version="1.0" encoding="utf-8"?>
+<p:sld xmlns:a="http://schemas.openxmlformats.org/drawingml/2006/main" xmlns:r="http://schemas.openxmlformats.org/officeDocument/2006/relationships" xmlns:p="http://schemas.openxmlformats.org/presentationml/2006/main">
+  <p:cSld>
+    <p:spTree>
+      <p:nvGrpSpPr>
+        <p:cNvPr id="1" name=""/>
+        <p:cNvGrpSpPr/>
+        <p:nvPr/>
+      </p:nvGrpSpPr>
+      <p:grpSpPr>
+        <a:xfrm>
+          <a:off x="0" y="0"/>
+          <a:ext cx="0" cy="0"/>
+          <a:chOff x="0" y="0"/>
+          <a:chExt cx="0" cy="0"/>
+        </a:xfrm>
+      </p:grpSpPr>
+      <p:sp>
+        <p:nvSpPr>
+          <p:cNvPr id="2" name="Title 1">
+            <a:extLst>
+              <a:ext uri="{FF2B5EF4-FFF2-40B4-BE49-F238E27FC236}">
+                <a16:creationId xmlns:a16="http://schemas.microsoft.com/office/drawing/2014/main" id="{692002BF-DECB-FDD9-5597-446129FAFA19}"/>
+              </a:ext>
+            </a:extLst>
+          </p:cNvPr>
+          <p:cNvSpPr>
+            <a:spLocks noGrp="1"/>
+          </p:cNvSpPr>
+          <p:nvPr>
+            <p:ph type="title"/>
+          </p:nvPr>
+        </p:nvSpPr>
+        <p:spPr/>
+        <p:txBody>
+          <a:bodyPr>
+            <a:normAutofit fontScale="90000"/>
+          </a:bodyPr>
+          <a:lstStyle/>
+          <a:p>
+            <a:pPr algn="ctr"/>
+            <a:r>
+              <a:rPr lang="bg-BG" dirty="0">
+                <a:latin typeface="Arial" panose="020B0604020202020204" pitchFamily="34" charset="0"/>
+                <a:cs typeface="Arial" panose="020B0604020202020204" pitchFamily="34" charset="0"/>
+              </a:rPr>
+              <a:t>Връщане на стойност от метод</a:t>
+            </a:r>
+            <a:br>
+              <a:rPr lang="en-US" dirty="0">
+                <a:latin typeface="Arial" panose="020B0604020202020204" pitchFamily="34" charset="0"/>
+                <a:cs typeface="Arial" panose="020B0604020202020204" pitchFamily="34" charset="0"/>
+              </a:rPr>
+            </a:br>
+            <a:r>
+              <a:rPr lang="en-US" dirty="0">
+                <a:latin typeface="Arial" panose="020B0604020202020204" pitchFamily="34" charset="0"/>
+                <a:cs typeface="Arial" panose="020B0604020202020204" pitchFamily="34" charset="0"/>
+              </a:rPr>
+              <a:t>/</a:t>
+            </a:r>
+            <a:r>
+              <a:rPr lang="bg-BG" dirty="0">
+                <a:latin typeface="Arial" panose="020B0604020202020204" pitchFamily="34" charset="0"/>
+                <a:cs typeface="Arial" panose="020B0604020202020204" pitchFamily="34" charset="0"/>
+              </a:rPr>
+              <a:t>извикване на метод</a:t>
+            </a:r>
+            <a:r>
+              <a:rPr lang="en-US" dirty="0">
+                <a:latin typeface="Arial" panose="020B0604020202020204" pitchFamily="34" charset="0"/>
+                <a:cs typeface="Arial" panose="020B0604020202020204" pitchFamily="34" charset="0"/>
+              </a:rPr>
+              <a:t>/</a:t>
+            </a:r>
+            <a:endParaRPr lang="bg-BG" dirty="0"/>
+          </a:p>
+        </p:txBody>
+      </p:sp>
+      <p:sp>
+        <p:nvSpPr>
+          <p:cNvPr id="3" name="Content Placeholder 2">
+            <a:extLst>
+              <a:ext uri="{FF2B5EF4-FFF2-40B4-BE49-F238E27FC236}">
+                <a16:creationId xmlns:a16="http://schemas.microsoft.com/office/drawing/2014/main" id="{AFCB3E2C-64D0-FAA9-034C-767C24C63A29}"/>
+              </a:ext>
+            </a:extLst>
+          </p:cNvPr>
+          <p:cNvSpPr>
+            <a:spLocks noGrp="1"/>
+          </p:cNvSpPr>
+          <p:nvPr>
+            <p:ph idx="1"/>
+          </p:nvPr>
+        </p:nvSpPr>
+        <p:spPr>
+          <a:xfrm>
+            <a:off x="2819404" y="2691441"/>
+            <a:ext cx="10233800" cy="1794744"/>
+          </a:xfrm>
+        </p:spPr>
+        <p:txBody>
+          <a:bodyPr/>
+          <a:lstStyle/>
+          <a:p>
+            <a:pPr marL="0" indent="0">
+              <a:buNone/>
+            </a:pPr>
+            <a:r>
+              <a:rPr lang="en-US" dirty="0">
+                <a:solidFill>
+                  <a:srgbClr val="00B050"/>
+                </a:solidFill>
+                <a:latin typeface="Consolas" panose="020B0609020204030204" pitchFamily="49" charset="0"/>
+              </a:rPr>
+              <a:t>i</a:t>
+            </a:r>
+            <a:r>
+              <a:rPr lang="en-US" sz="2800" dirty="0">
+                <a:solidFill>
+                  <a:srgbClr val="00B050"/>
+                </a:solidFill>
+                <a:latin typeface="Consolas" panose="020B0609020204030204" pitchFamily="49" charset="0"/>
+              </a:rPr>
+              <a:t>nt</a:t>
+            </a:r>
+            <a:r>
+              <a:rPr lang="bg-BG" sz="2800" dirty="0">
+                <a:solidFill>
+                  <a:srgbClr val="00B050"/>
+                </a:solidFill>
+                <a:latin typeface="Consolas" panose="020B0609020204030204" pitchFamily="49" charset="0"/>
+              </a:rPr>
+              <a:t> </a:t>
+            </a:r>
+            <a:r>
+              <a:rPr lang="en-US" sz="2800" dirty="0">
+                <a:solidFill>
+                  <a:schemeClr val="tx2">
+                    <a:lumMod val="75000"/>
+                  </a:schemeClr>
+                </a:solidFill>
+                <a:latin typeface="Consolas" panose="020B0609020204030204" pitchFamily="49" charset="0"/>
+              </a:rPr>
+              <a:t>sum</a:t>
+            </a:r>
+            <a:r>
+              <a:rPr lang="en-US" sz="2800" dirty="0">
+                <a:solidFill>
+                  <a:srgbClr val="00B050"/>
+                </a:solidFill>
+                <a:latin typeface="Consolas" panose="020B0609020204030204" pitchFamily="49" charset="0"/>
+              </a:rPr>
+              <a:t> </a:t>
+            </a:r>
+            <a:r>
+              <a:rPr lang="en-US" sz="2800" dirty="0">
+                <a:solidFill>
+                  <a:schemeClr val="tx1"/>
+                </a:solidFill>
+                <a:latin typeface="Consolas" panose="020B0609020204030204" pitchFamily="49" charset="0"/>
+              </a:rPr>
+              <a:t>=</a:t>
+            </a:r>
+            <a:r>
+              <a:rPr lang="en-US" sz="2800" dirty="0">
+                <a:latin typeface="Consolas" panose="020B0609020204030204" pitchFamily="49" charset="0"/>
+              </a:rPr>
+              <a:t> </a:t>
+            </a:r>
+            <a:r>
+              <a:rPr lang="en-US" sz="2800" dirty="0" err="1">
+                <a:solidFill>
+                  <a:srgbClr val="FFFF00"/>
+                </a:solidFill>
+                <a:latin typeface="Consolas" panose="020B0609020204030204" pitchFamily="49" charset="0"/>
+              </a:rPr>
+              <a:t>SumTwoNumbers</a:t>
+            </a:r>
+            <a:r>
+              <a:rPr lang="en-US" sz="2800" dirty="0">
+                <a:solidFill>
+                  <a:srgbClr val="FFFF00"/>
+                </a:solidFill>
+                <a:latin typeface="Consolas" panose="020B0609020204030204" pitchFamily="49" charset="0"/>
+              </a:rPr>
+              <a:t>(</a:t>
+            </a:r>
+            <a:r>
+              <a:rPr lang="en-US" sz="2800" dirty="0">
+                <a:solidFill>
+                  <a:schemeClr val="tx2">
+                    <a:lumMod val="75000"/>
+                  </a:schemeClr>
+                </a:solidFill>
+                <a:latin typeface="Consolas" panose="020B0609020204030204" pitchFamily="49" charset="0"/>
+              </a:rPr>
+              <a:t>5</a:t>
+            </a:r>
+            <a:r>
+              <a:rPr lang="en-US" sz="2800" dirty="0">
+                <a:solidFill>
+                  <a:srgbClr val="FFFF00"/>
+                </a:solidFill>
+                <a:latin typeface="Consolas" panose="020B0609020204030204" pitchFamily="49" charset="0"/>
+              </a:rPr>
+              <a:t>, </a:t>
+            </a:r>
+            <a:r>
+              <a:rPr lang="en-US" sz="2800" dirty="0">
+                <a:solidFill>
+                  <a:schemeClr val="tx2">
+                    <a:lumMod val="75000"/>
+                  </a:schemeClr>
+                </a:solidFill>
+                <a:latin typeface="Consolas" panose="020B0609020204030204" pitchFamily="49" charset="0"/>
+              </a:rPr>
+              <a:t>10</a:t>
+            </a:r>
+            <a:r>
+              <a:rPr lang="en-US" sz="2800" dirty="0">
+                <a:solidFill>
+                  <a:srgbClr val="FFFF00"/>
+                </a:solidFill>
+                <a:latin typeface="Consolas" panose="020B0609020204030204" pitchFamily="49" charset="0"/>
+              </a:rPr>
+              <a:t>);</a:t>
+            </a:r>
+          </a:p>
+          <a:p>
+            <a:pPr marL="0" indent="0">
+              <a:buNone/>
+            </a:pPr>
+            <a:endParaRPr lang="en-US" sz="2800" dirty="0">
+              <a:solidFill>
+                <a:srgbClr val="FFFF00"/>
+              </a:solidFill>
+              <a:latin typeface="Consolas" panose="020B0609020204030204" pitchFamily="49" charset="0"/>
+            </a:endParaRPr>
+          </a:p>
+          <a:p>
+            <a:pPr marL="0" indent="0">
+              <a:buNone/>
+            </a:pPr>
+            <a:r>
+              <a:rPr lang="en-US" dirty="0">
+                <a:solidFill>
+                  <a:srgbClr val="00B050"/>
+                </a:solidFill>
+                <a:latin typeface="Consolas" panose="020B0609020204030204" pitchFamily="49" charset="0"/>
+              </a:rPr>
+              <a:t>string</a:t>
+            </a:r>
+            <a:r>
+              <a:rPr lang="en-US" dirty="0">
+                <a:solidFill>
+                  <a:srgbClr val="FFFF00"/>
+                </a:solidFill>
+                <a:latin typeface="Consolas" panose="020B0609020204030204" pitchFamily="49" charset="0"/>
+              </a:rPr>
+              <a:t> </a:t>
+            </a:r>
+            <a:r>
+              <a:rPr lang="en-US" dirty="0" err="1">
+                <a:solidFill>
+                  <a:schemeClr val="tx2">
+                    <a:lumMod val="75000"/>
+                  </a:schemeClr>
+                </a:solidFill>
+                <a:latin typeface="Consolas" panose="020B0609020204030204" pitchFamily="49" charset="0"/>
+              </a:rPr>
+              <a:t>resultText</a:t>
+            </a:r>
+            <a:r>
+              <a:rPr lang="en-US" dirty="0">
+                <a:solidFill>
+                  <a:srgbClr val="FFFF00"/>
+                </a:solidFill>
+                <a:latin typeface="Consolas" panose="020B0609020204030204" pitchFamily="49" charset="0"/>
+              </a:rPr>
+              <a:t> </a:t>
+            </a:r>
+            <a:r>
+              <a:rPr lang="en-US" dirty="0">
+                <a:solidFill>
+                  <a:schemeClr val="tx1"/>
+                </a:solidFill>
+                <a:latin typeface="Consolas" panose="020B0609020204030204" pitchFamily="49" charset="0"/>
+              </a:rPr>
+              <a:t>=</a:t>
+            </a:r>
+            <a:r>
+              <a:rPr lang="en-US" dirty="0">
+                <a:solidFill>
+                  <a:srgbClr val="FFFF00"/>
+                </a:solidFill>
+                <a:latin typeface="Consolas" panose="020B0609020204030204" pitchFamily="49" charset="0"/>
+              </a:rPr>
+              <a:t> </a:t>
+            </a:r>
+            <a:r>
+              <a:rPr lang="en-US" sz="2800" dirty="0" err="1">
+                <a:solidFill>
+                  <a:srgbClr val="FFFF00"/>
+                </a:solidFill>
+                <a:latin typeface="Consolas" panose="020B0609020204030204" pitchFamily="49" charset="0"/>
+              </a:rPr>
+              <a:t>GetText</a:t>
+            </a:r>
+            <a:r>
+              <a:rPr lang="en-US" sz="2800" dirty="0">
+                <a:solidFill>
+                  <a:srgbClr val="FFFF00"/>
+                </a:solidFill>
+                <a:latin typeface="Consolas" panose="020B0609020204030204" pitchFamily="49" charset="0"/>
+              </a:rPr>
+              <a:t>()</a:t>
+            </a:r>
+            <a:r>
+              <a:rPr lang="en-US" dirty="0">
+                <a:solidFill>
+                  <a:srgbClr val="FFFF00"/>
+                </a:solidFill>
+                <a:latin typeface="Consolas" panose="020B0609020204030204" pitchFamily="49" charset="0"/>
+              </a:rPr>
+              <a:t>;</a:t>
+            </a:r>
+            <a:endParaRPr lang="en-US" sz="2800" dirty="0">
+              <a:solidFill>
+                <a:srgbClr val="FFFF00"/>
+              </a:solidFill>
+              <a:latin typeface="Consolas" panose="020B0609020204030204" pitchFamily="49" charset="0"/>
+            </a:endParaRPr>
+          </a:p>
+          <a:p>
+            <a:endParaRPr lang="bg-BG" dirty="0"/>
+          </a:p>
+        </p:txBody>
+      </p:sp>
+    </p:spTree>
+    <p:extLst>
+      <p:ext uri="{BB962C8B-B14F-4D97-AF65-F5344CB8AC3E}">
+        <p14:creationId xmlns:p14="http://schemas.microsoft.com/office/powerpoint/2010/main" val="2720964658"/>
+      </p:ext>
+    </p:extLst>
+  </p:cSld>
+  <p:clrMapOvr>
+    <a:masterClrMapping/>
+  </p:clrMapOvr>
+</p:sld>
+</file>
+
+<file path=ppt/slides/slide9.xml><?xml version="1.0" encoding="utf-8"?>
+<p:sld xmlns:a="http://schemas.openxmlformats.org/drawingml/2006/main" xmlns:r="http://schemas.openxmlformats.org/officeDocument/2006/relationships" xmlns:p="http://schemas.openxmlformats.org/presentationml/2006/main">
+  <p:cSld>
+    <p:bg>
+      <p:bgPr>
+        <a:blipFill dpi="0" rotWithShape="1">
+          <a:blip r:embed="rId2">
+            <a:lum/>
+          </a:blip>
+          <a:srcRect/>
+          <a:stretch>
+            <a:fillRect/>
+          </a:stretch>
+        </a:blipFill>
+        <a:effectLst/>
+      </p:bgPr>
+    </p:bg>
+    <p:spTree>
+      <p:nvGrpSpPr>
+        <p:cNvPr id="1" name=""/>
+        <p:cNvGrpSpPr/>
+        <p:nvPr/>
+      </p:nvGrpSpPr>
+      <p:grpSpPr>
+        <a:xfrm>
+          <a:off x="0" y="0"/>
+          <a:ext cx="0" cy="0"/>
+          <a:chOff x="0" y="0"/>
+          <a:chExt cx="0" cy="0"/>
+        </a:xfrm>
+      </p:grpSpPr>
+      <p:sp>
+        <p:nvSpPr>
           <p:cNvPr id="2" name="Заглавие 1">
             <a:extLst>
               <a:ext uri="{FF2B5EF4-FFF2-40B4-BE49-F238E27FC236}">
-                <a16:creationId xmlns:a16="http://schemas.microsoft.com/office/drawing/2014/main" id="{CF7EBFF2-2FF9-4885-BE21-EAA5FBF3CBD9}"/>
+                <a16:creationId xmlns:a16="http://schemas.microsoft.com/office/drawing/2014/main" id="{CB7B0C31-9320-4E58-8A8A-D7BFE153DFD9}"/>
               </a:ext>
             </a:extLst>
           </p:cNvPr>
@@ -6611,34 +10118,31 @@
             <p:ph type="title"/>
           </p:nvPr>
         </p:nvSpPr>
-        <p:spPr/>
-        <p:txBody>
-          <a:bodyPr/>
+        <p:spPr>
+          <a:xfrm>
+            <a:off x="838200" y="365125"/>
+            <a:ext cx="10515600" cy="1325563"/>
+          </a:xfrm>
+        </p:spPr>
+        <p:txBody>
+          <a:bodyPr>
+            <a:normAutofit/>
+          </a:bodyPr>
           <a:lstStyle/>
           <a:p>
             <a:pPr algn="ctr"/>
+            <a:r>
+              <a:rPr lang="bg-BG" dirty="0">
+                <a:latin typeface="Arial" panose="020B0604020202020204" pitchFamily="34" charset="0"/>
+                <a:cs typeface="Arial" panose="020B0604020202020204" pitchFamily="34" charset="0"/>
+              </a:rPr>
+              <a:t>Какво е структура от данни</a:t>
+            </a:r>
             <a:r>
               <a:rPr lang="en-US" dirty="0">
                 <a:latin typeface="Arial" panose="020B0604020202020204" pitchFamily="34" charset="0"/>
                 <a:cs typeface="Arial" panose="020B0604020202020204" pitchFamily="34" charset="0"/>
               </a:rPr>
-              <a:t>What is an </a:t>
-            </a:r>
-            <a:r>
-              <a:rPr lang="en-US" dirty="0">
-                <a:solidFill>
-                  <a:srgbClr val="FFFF00"/>
-                </a:solidFill>
-                <a:latin typeface="Arial" panose="020B0604020202020204" pitchFamily="34" charset="0"/>
-                <a:cs typeface="Arial" panose="020B0604020202020204" pitchFamily="34" charset="0"/>
-              </a:rPr>
-              <a:t>array</a:t>
-            </a:r>
-            <a:r>
-              <a:rPr lang="en-US" dirty="0">
-                <a:latin typeface="Arial" panose="020B0604020202020204" pitchFamily="34" charset="0"/>
-                <a:cs typeface="Arial" panose="020B0604020202020204" pitchFamily="34" charset="0"/>
-              </a:rPr>
               <a:t>?</a:t>
             </a:r>
           </a:p>
@@ -6646,82 +10150,85 @@
       </p:sp>
       <p:sp>
         <p:nvSpPr>
-          <p:cNvPr id="3" name="Контейнер за съдържание 2">
+          <p:cNvPr id="14" name="Rounded Rectangle 17">
             <a:extLst>
               <a:ext uri="{FF2B5EF4-FFF2-40B4-BE49-F238E27FC236}">
-                <a16:creationId xmlns:a16="http://schemas.microsoft.com/office/drawing/2014/main" id="{347C3FD7-A059-4D38-8DCF-54D07C2D7D34}"/>
+                <a16:creationId xmlns:a16="http://schemas.microsoft.com/office/drawing/2014/main" id="{15045B1D-AED4-407C-BC82-BF20E4E4FF38}"/>
+              </a:ext>
+              <a:ext uri="{C183D7F6-B498-43B3-948B-1728B52AA6E4}">
+                <adec:decorative xmlns:adec="http://schemas.microsoft.com/office/drawing/2017/decorative" val="1"/>
               </a:ext>
             </a:extLst>
           </p:cNvPr>
           <p:cNvSpPr>
-            <a:spLocks noGrp="1"/>
-          </p:cNvSpPr>
-          <p:nvPr>
-            <p:ph idx="1"/>
+            <a:spLocks noGrp="1" noRot="1" noChangeAspect="1" noMove="1" noResize="1" noEditPoints="1" noAdjustHandles="1" noChangeArrowheads="1" noChangeShapeType="1" noTextEdit="1"/>
+          </p:cNvSpPr>
+          <p:nvPr>
+            <p:extLst>
+              <p:ext uri="{386F3935-93C4-4BCD-93E2-E3B085C9AB24}">
+                <p16:designElem xmlns:p16="http://schemas.microsoft.com/office/powerpoint/2015/main" val="1"/>
+              </p:ext>
+            </p:extLst>
           </p:nvPr>
         </p:nvSpPr>
         <p:spPr>
           <a:xfrm>
-            <a:off x="670678" y="1825625"/>
-            <a:ext cx="10231102" cy="4351338"/>
+            <a:off x="838200" y="1948070"/>
+            <a:ext cx="4773166" cy="3896140"/>
           </a:xfrm>
+          <a:prstGeom prst="roundRect">
+            <a:avLst>
+              <a:gd name="adj" fmla="val 2028"/>
+            </a:avLst>
+          </a:prstGeom>
+          <a:solidFill>
+            <a:schemeClr val="tx1"/>
+          </a:solidFill>
+          <a:ln>
+            <a:solidFill>
+              <a:schemeClr val="accent1">
+                <a:shade val="50000"/>
+              </a:schemeClr>
+            </a:solidFill>
+          </a:ln>
+          <a:effectLst>
+            <a:innerShdw blurRad="127000" dist="12700">
+              <a:prstClr val="black"/>
+            </a:innerShdw>
+            <a:reflection blurRad="6350" stA="52000" endA="300" endPos="20000" dir="5400000" sy="-100000" algn="bl" rotWithShape="0"/>
+          </a:effectLst>
         </p:spPr>
-        <p:txBody>
-          <a:bodyPr/>
-          <a:lstStyle/>
-          <a:p>
-            <a:r>
-              <a:rPr lang="en-US" dirty="0"/>
-              <a:t>An </a:t>
-            </a:r>
-            <a:r>
-              <a:rPr lang="en-US" dirty="0">
-                <a:solidFill>
-                  <a:srgbClr val="FFFF00"/>
-                </a:solidFill>
-              </a:rPr>
-              <a:t>array</a:t>
-            </a:r>
-            <a:r>
-              <a:rPr lang="en-US" dirty="0"/>
-              <a:t> is a collection of similar data elements stored at contiguous memory locations. It is the simplest data structure where each data element can be accessed directly by only using its </a:t>
-            </a:r>
-            <a:r>
-              <a:rPr lang="en-US" dirty="0">
-                <a:solidFill>
-                  <a:srgbClr val="FFFF00"/>
-                </a:solidFill>
-              </a:rPr>
-              <a:t>index</a:t>
-            </a:r>
-            <a:r>
-              <a:rPr lang="en-US" dirty="0"/>
-              <a:t> number. They have </a:t>
-            </a:r>
-            <a:r>
-              <a:rPr lang="en-US" dirty="0">
-                <a:solidFill>
-                  <a:srgbClr val="FFFF00"/>
-                </a:solidFill>
-              </a:rPr>
-              <a:t>fixed</a:t>
-            </a:r>
-            <a:r>
-              <a:rPr lang="en-US" dirty="0"/>
-              <a:t> size.</a:t>
-            </a:r>
-          </a:p>
-          <a:p>
-            <a:endParaRPr lang="en-US" dirty="0"/>
+        <p:style>
+          <a:lnRef idx="2">
+            <a:schemeClr val="accent1">
+              <a:shade val="50000"/>
+            </a:schemeClr>
+          </a:lnRef>
+          <a:fillRef idx="1">
+            <a:schemeClr val="accent1"/>
+          </a:fillRef>
+          <a:effectRef idx="0">
+            <a:schemeClr val="accent1"/>
+          </a:effectRef>
+          <a:fontRef idx="minor">
+            <a:schemeClr val="lt1"/>
+          </a:fontRef>
+        </p:style>
+        <p:txBody>
+          <a:bodyPr rtlCol="0" anchor="ctr"/>
+          <a:lstStyle/>
+          <a:p>
+            <a:pPr algn="ctr"/>
+            <a:endParaRPr lang="en-US"/>
           </a:p>
         </p:txBody>
       </p:sp>
       <p:pic>
         <p:nvPicPr>
-          <p:cNvPr id="5" name="Картина 4">
+          <p:cNvPr id="5" name="Picture 4" descr="A picture containing graphical user interface">
             <a:extLst>
               <a:ext uri="{FF2B5EF4-FFF2-40B4-BE49-F238E27FC236}">
-                <a16:creationId xmlns:a16="http://schemas.microsoft.com/office/drawing/2014/main" id="{4533BD70-3734-48DD-B228-14E37C520906}"/>
+                <a16:creationId xmlns:a16="http://schemas.microsoft.com/office/drawing/2014/main" id="{CCB6590E-2904-2751-D3E9-40CA9CFD97CE}"/>
               </a:ext>
             </a:extLst>
           </p:cNvPr>
@@ -6730,501 +10237,192 @@
           </p:cNvPicPr>
           <p:nvPr/>
         </p:nvPicPr>
-        <p:blipFill>
-          <a:blip r:embed="rId2">
+        <p:blipFill rotWithShape="1">
+          <a:blip r:embed="rId3">
             <a:extLst>
               <a:ext uri="{28A0092B-C50C-407E-A947-70E740481C1C}">
                 <a14:useLocalDpi xmlns:a14="http://schemas.microsoft.com/office/drawing/2010/main" val="0"/>
               </a:ext>
             </a:extLst>
           </a:blip>
-          <a:stretch>
-            <a:fillRect/>
-          </a:stretch>
+          <a:srcRect r="27662" b="-3"/>
+          <a:stretch/>
         </p:blipFill>
         <p:spPr>
           <a:xfrm>
-            <a:off x="2998466" y="4426997"/>
-            <a:ext cx="6887536" cy="781159"/>
+            <a:off x="976274" y="2147659"/>
+            <a:ext cx="4497018" cy="3496962"/>
           </a:xfrm>
           <a:prstGeom prst="rect">
             <a:avLst/>
           </a:prstGeom>
+          <a:ln>
+            <a:noFill/>
+          </a:ln>
+          <a:effectLst>
+            <a:softEdge rad="112500"/>
+          </a:effectLst>
         </p:spPr>
       </p:pic>
       <p:sp>
         <p:nvSpPr>
-          <p:cNvPr id="6" name="Текстово поле 5">
+          <p:cNvPr id="3" name="Контейнер за съдържание 2">
             <a:extLst>
               <a:ext uri="{FF2B5EF4-FFF2-40B4-BE49-F238E27FC236}">
-                <a16:creationId xmlns:a16="http://schemas.microsoft.com/office/drawing/2014/main" id="{61F5E221-EC99-4561-BDAA-51E676DD69F5}"/>
+                <a16:creationId xmlns:a16="http://schemas.microsoft.com/office/drawing/2014/main" id="{11ACFBA5-C402-4177-ACB3-257C3C629ED5}"/>
               </a:ext>
             </a:extLst>
           </p:cNvPr>
-          <p:cNvSpPr txBox="1"/>
-          <p:nvPr/>
+          <p:cNvSpPr>
+            <a:spLocks noGrp="1"/>
+          </p:cNvSpPr>
+          <p:nvPr>
+            <p:ph idx="1"/>
+          </p:nvPr>
         </p:nvSpPr>
         <p:spPr>
           <a:xfrm>
-            <a:off x="3231476" y="5195618"/>
-            <a:ext cx="310719" cy="400110"/>
+            <a:off x="6096000" y="1948069"/>
+            <a:ext cx="5730815" cy="4228893"/>
           </a:xfrm>
-          <a:prstGeom prst="rect">
-            <a:avLst/>
-          </a:prstGeom>
-          <a:noFill/>
         </p:spPr>
         <p:txBody>
-          <a:bodyPr wrap="square" rtlCol="0">
-            <a:spAutoFit/>
+          <a:bodyPr>
+            <a:normAutofit/>
           </a:bodyPr>
           <a:lstStyle/>
           <a:p>
-            <a:r>
-              <a:rPr lang="en-US" sz="2000" dirty="0"/>
-              <a:t>0</a:t>
-            </a:r>
-          </a:p>
-        </p:txBody>
-      </p:sp>
-      <p:sp>
-        <p:nvSpPr>
-          <p:cNvPr id="9" name="Текстово поле 8">
-            <a:extLst>
-              <a:ext uri="{FF2B5EF4-FFF2-40B4-BE49-F238E27FC236}">
-                <a16:creationId xmlns:a16="http://schemas.microsoft.com/office/drawing/2014/main" id="{9B8AEC9A-8B62-4129-9E67-FC663AA158F9}"/>
-              </a:ext>
-            </a:extLst>
-          </p:cNvPr>
-          <p:cNvSpPr txBox="1"/>
-          <p:nvPr/>
-        </p:nvSpPr>
-        <p:spPr>
-          <a:xfrm>
-            <a:off x="4020760" y="5213858"/>
-            <a:ext cx="324941" cy="400110"/>
-          </a:xfrm>
-          <a:prstGeom prst="rect">
-            <a:avLst/>
-          </a:prstGeom>
-          <a:noFill/>
-        </p:spPr>
-        <p:txBody>
-          <a:bodyPr wrap="square" rtlCol="0">
-            <a:spAutoFit/>
-          </a:bodyPr>
-          <a:lstStyle/>
-          <a:p>
-            <a:r>
-              <a:rPr lang="en-US" sz="2000" dirty="0"/>
-              <a:t>1</a:t>
-            </a:r>
-          </a:p>
-        </p:txBody>
-      </p:sp>
-      <p:sp>
-        <p:nvSpPr>
-          <p:cNvPr id="10" name="Текстово поле 9">
-            <a:extLst>
-              <a:ext uri="{FF2B5EF4-FFF2-40B4-BE49-F238E27FC236}">
-                <a16:creationId xmlns:a16="http://schemas.microsoft.com/office/drawing/2014/main" id="{E55A8CE8-88A4-4373-96F7-8CF42FB72E0A}"/>
-              </a:ext>
-            </a:extLst>
-          </p:cNvPr>
-          <p:cNvSpPr txBox="1"/>
-          <p:nvPr/>
-        </p:nvSpPr>
-        <p:spPr>
-          <a:xfrm>
-            <a:off x="4781244" y="5208156"/>
-            <a:ext cx="310719" cy="400110"/>
-          </a:xfrm>
-          <a:prstGeom prst="rect">
-            <a:avLst/>
-          </a:prstGeom>
-          <a:noFill/>
-        </p:spPr>
-        <p:txBody>
-          <a:bodyPr wrap="square" rtlCol="0">
-            <a:spAutoFit/>
-          </a:bodyPr>
-          <a:lstStyle/>
-          <a:p>
-            <a:r>
-              <a:rPr lang="en-US" sz="2000" dirty="0"/>
-              <a:t>2</a:t>
-            </a:r>
-          </a:p>
-        </p:txBody>
-      </p:sp>
-      <p:sp>
-        <p:nvSpPr>
-          <p:cNvPr id="11" name="Текстово поле 10">
-            <a:extLst>
-              <a:ext uri="{FF2B5EF4-FFF2-40B4-BE49-F238E27FC236}">
-                <a16:creationId xmlns:a16="http://schemas.microsoft.com/office/drawing/2014/main" id="{8ABC9336-D5B2-410D-A3CD-E04E6BAC7512}"/>
-              </a:ext>
-            </a:extLst>
-          </p:cNvPr>
-          <p:cNvSpPr txBox="1"/>
-          <p:nvPr/>
-        </p:nvSpPr>
-        <p:spPr>
-          <a:xfrm>
-            <a:off x="5561794" y="5223545"/>
-            <a:ext cx="310719" cy="338554"/>
-          </a:xfrm>
-          <a:prstGeom prst="rect">
-            <a:avLst/>
-          </a:prstGeom>
-          <a:noFill/>
-        </p:spPr>
-        <p:txBody>
-          <a:bodyPr wrap="square" rtlCol="0">
-            <a:spAutoFit/>
-          </a:bodyPr>
-          <a:lstStyle/>
-          <a:p>
-            <a:r>
-              <a:rPr lang="en-US" sz="1600" dirty="0"/>
-              <a:t>3</a:t>
-            </a:r>
-          </a:p>
-        </p:txBody>
-      </p:sp>
-      <p:sp>
-        <p:nvSpPr>
-          <p:cNvPr id="12" name="Текстово поле 11">
-            <a:extLst>
-              <a:ext uri="{FF2B5EF4-FFF2-40B4-BE49-F238E27FC236}">
-                <a16:creationId xmlns:a16="http://schemas.microsoft.com/office/drawing/2014/main" id="{ECC100D4-DB67-45AD-A720-A6232E147D1D}"/>
-              </a:ext>
-            </a:extLst>
-          </p:cNvPr>
-          <p:cNvSpPr txBox="1"/>
-          <p:nvPr/>
-        </p:nvSpPr>
-        <p:spPr>
-          <a:xfrm>
-            <a:off x="6255857" y="5195618"/>
-            <a:ext cx="255974" cy="381870"/>
-          </a:xfrm>
-          <a:prstGeom prst="rect">
-            <a:avLst/>
-          </a:prstGeom>
-          <a:noFill/>
-        </p:spPr>
-        <p:txBody>
-          <a:bodyPr wrap="square" rtlCol="0">
-            <a:spAutoFit/>
-          </a:bodyPr>
-          <a:lstStyle/>
-          <a:p>
-            <a:r>
-              <a:rPr lang="en-US" dirty="0"/>
-              <a:t>4</a:t>
-            </a:r>
-          </a:p>
-        </p:txBody>
-      </p:sp>
-      <p:sp>
-        <p:nvSpPr>
-          <p:cNvPr id="13" name="Текстово поле 12">
-            <a:extLst>
-              <a:ext uri="{FF2B5EF4-FFF2-40B4-BE49-F238E27FC236}">
-                <a16:creationId xmlns:a16="http://schemas.microsoft.com/office/drawing/2014/main" id="{57D0D5DE-4C06-4AC3-B07E-F2480960E49C}"/>
-              </a:ext>
-            </a:extLst>
-          </p:cNvPr>
-          <p:cNvSpPr txBox="1"/>
-          <p:nvPr/>
-        </p:nvSpPr>
-        <p:spPr>
-          <a:xfrm>
-            <a:off x="7039398" y="5195618"/>
-            <a:ext cx="310719" cy="369332"/>
-          </a:xfrm>
-          <a:prstGeom prst="rect">
-            <a:avLst/>
-          </a:prstGeom>
-          <a:noFill/>
-        </p:spPr>
-        <p:txBody>
-          <a:bodyPr wrap="square" rtlCol="0">
-            <a:spAutoFit/>
-          </a:bodyPr>
-          <a:lstStyle/>
-          <a:p>
-            <a:r>
-              <a:rPr lang="en-US" dirty="0"/>
-              <a:t>5</a:t>
-            </a:r>
-          </a:p>
-        </p:txBody>
-      </p:sp>
-      <p:sp>
-        <p:nvSpPr>
-          <p:cNvPr id="14" name="Текстово поле 13">
-            <a:extLst>
-              <a:ext uri="{FF2B5EF4-FFF2-40B4-BE49-F238E27FC236}">
-                <a16:creationId xmlns:a16="http://schemas.microsoft.com/office/drawing/2014/main" id="{0710AF54-BFB4-4E23-839F-514B17A8C29D}"/>
-              </a:ext>
-            </a:extLst>
-          </p:cNvPr>
-          <p:cNvSpPr txBox="1"/>
-          <p:nvPr/>
-        </p:nvSpPr>
-        <p:spPr>
-          <a:xfrm>
-            <a:off x="7815461" y="5240923"/>
-            <a:ext cx="310719" cy="369332"/>
-          </a:xfrm>
-          <a:prstGeom prst="rect">
-            <a:avLst/>
-          </a:prstGeom>
-          <a:noFill/>
-        </p:spPr>
-        <p:txBody>
-          <a:bodyPr wrap="square" rtlCol="0">
-            <a:spAutoFit/>
-          </a:bodyPr>
-          <a:lstStyle/>
-          <a:p>
-            <a:r>
-              <a:rPr lang="en-US" dirty="0"/>
-              <a:t>6</a:t>
-            </a:r>
-          </a:p>
-        </p:txBody>
-      </p:sp>
-      <p:sp>
-        <p:nvSpPr>
-          <p:cNvPr id="15" name="Текстово поле 14">
-            <a:extLst>
-              <a:ext uri="{FF2B5EF4-FFF2-40B4-BE49-F238E27FC236}">
-                <a16:creationId xmlns:a16="http://schemas.microsoft.com/office/drawing/2014/main" id="{EB944A65-5263-411A-A004-64C499694CE1}"/>
-              </a:ext>
-            </a:extLst>
-          </p:cNvPr>
-          <p:cNvSpPr txBox="1"/>
-          <p:nvPr/>
-        </p:nvSpPr>
-        <p:spPr>
-          <a:xfrm>
-            <a:off x="8623239" y="5208156"/>
-            <a:ext cx="310719" cy="369332"/>
-          </a:xfrm>
-          <a:prstGeom prst="rect">
-            <a:avLst/>
-          </a:prstGeom>
-          <a:noFill/>
-        </p:spPr>
-        <p:txBody>
-          <a:bodyPr wrap="square" rtlCol="0">
-            <a:spAutoFit/>
-          </a:bodyPr>
-          <a:lstStyle/>
-          <a:p>
-            <a:r>
-              <a:rPr lang="en-US" dirty="0"/>
-              <a:t>7</a:t>
-            </a:r>
-          </a:p>
-        </p:txBody>
-      </p:sp>
-      <p:sp>
-        <p:nvSpPr>
-          <p:cNvPr id="16" name="Текстово поле 15">
-            <a:extLst>
-              <a:ext uri="{FF2B5EF4-FFF2-40B4-BE49-F238E27FC236}">
-                <a16:creationId xmlns:a16="http://schemas.microsoft.com/office/drawing/2014/main" id="{B61FB75F-D90E-434E-84D3-311B422BA15C}"/>
-              </a:ext>
-            </a:extLst>
-          </p:cNvPr>
-          <p:cNvSpPr txBox="1"/>
-          <p:nvPr/>
-        </p:nvSpPr>
-        <p:spPr>
-          <a:xfrm>
-            <a:off x="9342273" y="5240923"/>
-            <a:ext cx="310719" cy="369332"/>
-          </a:xfrm>
-          <a:prstGeom prst="rect">
-            <a:avLst/>
-          </a:prstGeom>
-          <a:noFill/>
-        </p:spPr>
-        <p:txBody>
-          <a:bodyPr wrap="square" rtlCol="0">
-            <a:spAutoFit/>
-          </a:bodyPr>
-          <a:lstStyle/>
-          <a:p>
-            <a:r>
-              <a:rPr lang="en-US" dirty="0"/>
-              <a:t>8</a:t>
-            </a:r>
-          </a:p>
-        </p:txBody>
-      </p:sp>
-      <p:sp>
-        <p:nvSpPr>
-          <p:cNvPr id="17" name="Текстово поле 16">
-            <a:extLst>
-              <a:ext uri="{FF2B5EF4-FFF2-40B4-BE49-F238E27FC236}">
-                <a16:creationId xmlns:a16="http://schemas.microsoft.com/office/drawing/2014/main" id="{5A390467-CDE2-4B35-89F9-995C4DEB4905}"/>
-              </a:ext>
-            </a:extLst>
-          </p:cNvPr>
-          <p:cNvSpPr txBox="1"/>
-          <p:nvPr/>
-        </p:nvSpPr>
-        <p:spPr>
-          <a:xfrm>
-            <a:off x="1016912" y="5240923"/>
-            <a:ext cx="998471" cy="369332"/>
-          </a:xfrm>
-          <a:prstGeom prst="rect">
-            <a:avLst/>
-          </a:prstGeom>
-          <a:noFill/>
-        </p:spPr>
-        <p:txBody>
-          <a:bodyPr wrap="square" rtlCol="0">
-            <a:spAutoFit/>
-          </a:bodyPr>
-          <a:lstStyle/>
-          <a:p>
-            <a:r>
-              <a:rPr lang="en-US" dirty="0"/>
-              <a:t>Indexes</a:t>
-            </a:r>
-          </a:p>
-        </p:txBody>
-      </p:sp>
-      <p:sp>
-        <p:nvSpPr>
-          <p:cNvPr id="18" name="Текстово поле 17">
-            <a:extLst>
-              <a:ext uri="{FF2B5EF4-FFF2-40B4-BE49-F238E27FC236}">
-                <a16:creationId xmlns:a16="http://schemas.microsoft.com/office/drawing/2014/main" id="{6BDE82C3-79B4-4E1D-BE69-1BC7EA9D3390}"/>
-              </a:ext>
-            </a:extLst>
-          </p:cNvPr>
-          <p:cNvSpPr txBox="1"/>
-          <p:nvPr/>
-        </p:nvSpPr>
-        <p:spPr>
-          <a:xfrm>
-            <a:off x="1016911" y="4656447"/>
-            <a:ext cx="1122611" cy="369332"/>
-          </a:xfrm>
-          <a:prstGeom prst="rect">
-            <a:avLst/>
-          </a:prstGeom>
-          <a:noFill/>
-        </p:spPr>
-        <p:txBody>
-          <a:bodyPr wrap="square" rtlCol="0">
-            <a:spAutoFit/>
-          </a:bodyPr>
-          <a:lstStyle/>
-          <a:p>
-            <a:r>
-              <a:rPr lang="en-US" dirty="0"/>
-              <a:t>elements</a:t>
-            </a:r>
-          </a:p>
-        </p:txBody>
-      </p:sp>
-      <p:cxnSp>
-        <p:nvCxnSpPr>
-          <p:cNvPr id="22" name="Съединител &quot;права стрелка&quot; 21">
-            <a:extLst>
-              <a:ext uri="{FF2B5EF4-FFF2-40B4-BE49-F238E27FC236}">
-                <a16:creationId xmlns:a16="http://schemas.microsoft.com/office/drawing/2014/main" id="{5D9BEDF3-2091-4886-BFEF-7C4B3422EBC1}"/>
-              </a:ext>
-            </a:extLst>
-          </p:cNvPr>
-          <p:cNvCxnSpPr/>
-          <p:nvPr/>
-        </p:nvCxnSpPr>
-        <p:spPr>
-          <a:xfrm>
-            <a:off x="2254933" y="4875320"/>
-            <a:ext cx="621437" cy="0"/>
-          </a:xfrm>
-          <a:prstGeom prst="straightConnector1">
-            <a:avLst/>
-          </a:prstGeom>
-          <a:ln>
-            <a:solidFill>
-              <a:schemeClr val="tx1"/>
-            </a:solidFill>
-            <a:tailEnd type="triangle"/>
-          </a:ln>
-        </p:spPr>
-        <p:style>
-          <a:lnRef idx="1">
-            <a:schemeClr val="accent1"/>
-          </a:lnRef>
-          <a:fillRef idx="0">
-            <a:schemeClr val="accent1"/>
-          </a:fillRef>
-          <a:effectRef idx="0">
-            <a:schemeClr val="accent1"/>
-          </a:effectRef>
-          <a:fontRef idx="minor">
-            <a:schemeClr val="tx1"/>
-          </a:fontRef>
-        </p:style>
-      </p:cxnSp>
-      <p:cxnSp>
-        <p:nvCxnSpPr>
-          <p:cNvPr id="24" name="Съединител &quot;права стрелка&quot; 23">
-            <a:extLst>
-              <a:ext uri="{FF2B5EF4-FFF2-40B4-BE49-F238E27FC236}">
-                <a16:creationId xmlns:a16="http://schemas.microsoft.com/office/drawing/2014/main" id="{A8B258F6-CF7A-404A-96B7-125B853FDE2E}"/>
-              </a:ext>
-            </a:extLst>
-          </p:cNvPr>
-          <p:cNvCxnSpPr/>
-          <p:nvPr/>
-        </p:nvCxnSpPr>
-        <p:spPr>
-          <a:xfrm>
-            <a:off x="2254933" y="5434613"/>
-            <a:ext cx="621437" cy="0"/>
-          </a:xfrm>
-          <a:prstGeom prst="straightConnector1">
-            <a:avLst/>
-          </a:prstGeom>
-          <a:ln>
-            <a:solidFill>
-              <a:schemeClr val="tx1"/>
-            </a:solidFill>
-            <a:tailEnd type="triangle"/>
-          </a:ln>
-        </p:spPr>
-        <p:style>
-          <a:lnRef idx="1">
-            <a:schemeClr val="accent1"/>
-          </a:lnRef>
-          <a:fillRef idx="0">
-            <a:schemeClr val="accent1"/>
-          </a:fillRef>
-          <a:effectRef idx="0">
-            <a:schemeClr val="accent1"/>
-          </a:effectRef>
-          <a:fontRef idx="minor">
-            <a:schemeClr val="tx1"/>
-          </a:fontRef>
-        </p:style>
-      </p:cxnSp>
+            <a:pPr>
+              <a:buClr>
+                <a:schemeClr val="tx1"/>
+              </a:buClr>
+            </a:pPr>
+            <a:r>
+              <a:rPr lang="bg-BG" sz="2400" dirty="0">
+                <a:latin typeface="Arial" panose="020B0604020202020204" pitchFamily="34" charset="0"/>
+                <a:cs typeface="Arial" panose="020B0604020202020204" pitchFamily="34" charset="0"/>
+              </a:rPr>
+              <a:t>В компютърните науки структурите от данни са начин на </a:t>
+            </a:r>
+            <a:r>
+              <a:rPr lang="bg-BG" sz="2400" dirty="0">
+                <a:solidFill>
+                  <a:srgbClr val="FFFF00"/>
+                </a:solidFill>
+                <a:latin typeface="Arial" panose="020B0604020202020204" pitchFamily="34" charset="0"/>
+                <a:cs typeface="Arial" panose="020B0604020202020204" pitchFamily="34" charset="0"/>
+              </a:rPr>
+              <a:t>организация</a:t>
+            </a:r>
+            <a:r>
+              <a:rPr lang="bg-BG" sz="2400" dirty="0">
+                <a:latin typeface="Arial" panose="020B0604020202020204" pitchFamily="34" charset="0"/>
+                <a:cs typeface="Arial" panose="020B0604020202020204" pitchFamily="34" charset="0"/>
+              </a:rPr>
+              <a:t> на данните в компютъра, така че те да могат да бъдат използвани </a:t>
+            </a:r>
+            <a:r>
+              <a:rPr lang="bg-BG" sz="2400" dirty="0">
+                <a:solidFill>
+                  <a:srgbClr val="FFFF00"/>
+                </a:solidFill>
+                <a:latin typeface="Arial" panose="020B0604020202020204" pitchFamily="34" charset="0"/>
+                <a:cs typeface="Arial" panose="020B0604020202020204" pitchFamily="34" charset="0"/>
+              </a:rPr>
+              <a:t>ефективно</a:t>
+            </a:r>
+            <a:r>
+              <a:rPr lang="en-US" sz="2400" dirty="0">
+                <a:latin typeface="Arial" panose="020B0604020202020204" pitchFamily="34" charset="0"/>
+                <a:cs typeface="Arial" panose="020B0604020202020204" pitchFamily="34" charset="0"/>
+              </a:rPr>
+              <a:t>.</a:t>
+            </a:r>
+          </a:p>
+          <a:p>
+            <a:pPr>
+              <a:buClr>
+                <a:schemeClr val="tx1"/>
+              </a:buClr>
+            </a:pPr>
+            <a:r>
+              <a:rPr lang="bg-BG" sz="2400" dirty="0">
+                <a:latin typeface="Arial" panose="020B0604020202020204" pitchFamily="34" charset="0"/>
+                <a:cs typeface="Arial" panose="020B0604020202020204" pitchFamily="34" charset="0"/>
+              </a:rPr>
+              <a:t>Структурите от данни не са само за организиране на данните. Те се използват също за ефективно </a:t>
+            </a:r>
+            <a:r>
+              <a:rPr lang="bg-BG" sz="2400" dirty="0">
+                <a:solidFill>
+                  <a:srgbClr val="FFFF00"/>
+                </a:solidFill>
+                <a:latin typeface="Arial" panose="020B0604020202020204" pitchFamily="34" charset="0"/>
+                <a:cs typeface="Arial" panose="020B0604020202020204" pitchFamily="34" charset="0"/>
+              </a:rPr>
+              <a:t>достъпване</a:t>
+            </a:r>
+            <a:r>
+              <a:rPr lang="bg-BG" sz="2400" dirty="0">
+                <a:latin typeface="Arial" panose="020B0604020202020204" pitchFamily="34" charset="0"/>
+                <a:cs typeface="Arial" panose="020B0604020202020204" pitchFamily="34" charset="0"/>
+              </a:rPr>
+              <a:t>, </a:t>
+            </a:r>
+            <a:r>
+              <a:rPr lang="bg-BG" sz="2400" dirty="0">
+                <a:solidFill>
+                  <a:srgbClr val="FFFF00"/>
+                </a:solidFill>
+                <a:latin typeface="Arial" panose="020B0604020202020204" pitchFamily="34" charset="0"/>
+                <a:cs typeface="Arial" panose="020B0604020202020204" pitchFamily="34" charset="0"/>
+              </a:rPr>
+              <a:t>ъпдейтване</a:t>
+            </a:r>
+            <a:r>
+              <a:rPr lang="bg-BG" sz="2400" dirty="0">
+                <a:latin typeface="Arial" panose="020B0604020202020204" pitchFamily="34" charset="0"/>
+                <a:cs typeface="Arial" panose="020B0604020202020204" pitchFamily="34" charset="0"/>
+              </a:rPr>
+              <a:t> и </a:t>
+            </a:r>
+            <a:r>
+              <a:rPr lang="bg-BG" sz="2400" dirty="0">
+                <a:solidFill>
+                  <a:srgbClr val="FFFF00"/>
+                </a:solidFill>
+                <a:latin typeface="Arial" panose="020B0604020202020204" pitchFamily="34" charset="0"/>
+                <a:cs typeface="Arial" panose="020B0604020202020204" pitchFamily="34" charset="0"/>
+              </a:rPr>
+              <a:t>съхранение</a:t>
+            </a:r>
+            <a:r>
+              <a:rPr lang="bg-BG" sz="2400" dirty="0">
+                <a:latin typeface="Arial" panose="020B0604020202020204" pitchFamily="34" charset="0"/>
+                <a:cs typeface="Arial" panose="020B0604020202020204" pitchFamily="34" charset="0"/>
+              </a:rPr>
+              <a:t> на данните.</a:t>
+            </a:r>
+            <a:endParaRPr lang="en-US" sz="2400" dirty="0">
+              <a:latin typeface="Arial" panose="020B0604020202020204" pitchFamily="34" charset="0"/>
+              <a:cs typeface="Arial" panose="020B0604020202020204" pitchFamily="34" charset="0"/>
+            </a:endParaRPr>
+          </a:p>
+          <a:p>
+            <a:pPr marL="0" indent="0">
+              <a:buNone/>
+            </a:pPr>
+            <a:endParaRPr lang="en-US" sz="2400" dirty="0">
+              <a:latin typeface="Arial" panose="020B0604020202020204" pitchFamily="34" charset="0"/>
+              <a:cs typeface="Arial" panose="020B0604020202020204" pitchFamily="34" charset="0"/>
+            </a:endParaRPr>
+          </a:p>
+        </p:txBody>
+      </p:sp>
     </p:spTree>
     <p:extLst>
       <p:ext uri="{BB962C8B-B14F-4D97-AF65-F5344CB8AC3E}">
-        <p14:creationId xmlns:p14="http://schemas.microsoft.com/office/powerpoint/2010/main" val="2001394900"/>
+        <p14:creationId xmlns:p14="http://schemas.microsoft.com/office/powerpoint/2010/main" val="3126285820"/>
       </p:ext>
     </p:extLst>
   </p:cSld>

</xml_diff>

<commit_message>
C# Intermediate -> Array slides + slight color changes
</commit_message>
<xml_diff>
--- a/C# Intermediate.pptx
+++ b/C# Intermediate.pptx
@@ -15,6 +15,12 @@
     <p:sldId id="265" r:id="rId9"/>
     <p:sldId id="259" r:id="rId10"/>
     <p:sldId id="258" r:id="rId11"/>
+    <p:sldId id="266" r:id="rId12"/>
+    <p:sldId id="267" r:id="rId13"/>
+    <p:sldId id="268" r:id="rId14"/>
+    <p:sldId id="269" r:id="rId15"/>
+    <p:sldId id="271" r:id="rId16"/>
+    <p:sldId id="272" r:id="rId17"/>
   </p:sldIdLst>
   <p:sldSz cx="12192000" cy="6858000"/>
   <p:notesSz cx="6858000" cy="9144000"/>
@@ -317,7 +323,7 @@
           <a:p>
             <a:fld id="{0BD89023-946D-4914-A444-F66256F52110}" type="datetimeFigureOut">
               <a:rPr lang="bg-BG" smtClean="0"/>
-              <a:t>11.11.2022 г.</a:t>
+              <a:t>12.11.2022 г.</a:t>
             </a:fld>
             <a:endParaRPr lang="bg-BG"/>
           </a:p>
@@ -598,7 +604,7 @@
           <a:p>
             <a:fld id="{0BD89023-946D-4914-A444-F66256F52110}" type="datetimeFigureOut">
               <a:rPr lang="bg-BG" smtClean="0"/>
-              <a:t>11.11.2022 г.</a:t>
+              <a:t>12.11.2022 г.</a:t>
             </a:fld>
             <a:endParaRPr lang="bg-BG"/>
           </a:p>
@@ -790,7 +796,7 @@
           <a:p>
             <a:fld id="{0BD89023-946D-4914-A444-F66256F52110}" type="datetimeFigureOut">
               <a:rPr lang="bg-BG" smtClean="0"/>
-              <a:t>11.11.2022 г.</a:t>
+              <a:t>12.11.2022 г.</a:t>
             </a:fld>
             <a:endParaRPr lang="bg-BG"/>
           </a:p>
@@ -1051,7 +1057,7 @@
           <a:p>
             <a:fld id="{0BD89023-946D-4914-A444-F66256F52110}" type="datetimeFigureOut">
               <a:rPr lang="bg-BG" smtClean="0"/>
-              <a:t>11.11.2022 г.</a:t>
+              <a:t>12.11.2022 г.</a:t>
             </a:fld>
             <a:endParaRPr lang="bg-BG"/>
           </a:p>
@@ -1477,7 +1483,7 @@
           <a:p>
             <a:fld id="{0BD89023-946D-4914-A444-F66256F52110}" type="datetimeFigureOut">
               <a:rPr lang="bg-BG" smtClean="0"/>
-              <a:t>11.11.2022 г.</a:t>
+              <a:t>12.11.2022 г.</a:t>
             </a:fld>
             <a:endParaRPr lang="bg-BG"/>
           </a:p>
@@ -2023,7 +2029,7 @@
           <a:p>
             <a:fld id="{0BD89023-946D-4914-A444-F66256F52110}" type="datetimeFigureOut">
               <a:rPr lang="bg-BG" smtClean="0"/>
-              <a:t>11.11.2022 г.</a:t>
+              <a:t>12.11.2022 г.</a:t>
             </a:fld>
             <a:endParaRPr lang="bg-BG"/>
           </a:p>
@@ -2854,7 +2860,7 @@
           <a:p>
             <a:fld id="{0BD89023-946D-4914-A444-F66256F52110}" type="datetimeFigureOut">
               <a:rPr lang="bg-BG" smtClean="0"/>
-              <a:t>11.11.2022 г.</a:t>
+              <a:t>12.11.2022 г.</a:t>
             </a:fld>
             <a:endParaRPr lang="bg-BG"/>
           </a:p>
@@ -3024,7 +3030,7 @@
           <a:p>
             <a:fld id="{0BD89023-946D-4914-A444-F66256F52110}" type="datetimeFigureOut">
               <a:rPr lang="bg-BG" smtClean="0"/>
-              <a:t>11.11.2022 г.</a:t>
+              <a:t>12.11.2022 г.</a:t>
             </a:fld>
             <a:endParaRPr lang="bg-BG"/>
           </a:p>
@@ -3204,7 +3210,7 @@
           <a:p>
             <a:fld id="{0BD89023-946D-4914-A444-F66256F52110}" type="datetimeFigureOut">
               <a:rPr lang="bg-BG" smtClean="0"/>
-              <a:t>11.11.2022 г.</a:t>
+              <a:t>12.11.2022 г.</a:t>
             </a:fld>
             <a:endParaRPr lang="bg-BG"/>
           </a:p>
@@ -3374,7 +3380,7 @@
           <a:p>
             <a:fld id="{0BD89023-946D-4914-A444-F66256F52110}" type="datetimeFigureOut">
               <a:rPr lang="bg-BG" smtClean="0"/>
-              <a:t>11.11.2022 г.</a:t>
+              <a:t>12.11.2022 г.</a:t>
             </a:fld>
             <a:endParaRPr lang="bg-BG"/>
           </a:p>
@@ -3631,7 +3637,7 @@
           <a:p>
             <a:fld id="{0BD89023-946D-4914-A444-F66256F52110}" type="datetimeFigureOut">
               <a:rPr lang="bg-BG" smtClean="0"/>
-              <a:t>11.11.2022 г.</a:t>
+              <a:t>12.11.2022 г.</a:t>
             </a:fld>
             <a:endParaRPr lang="bg-BG"/>
           </a:p>
@@ -3863,7 +3869,7 @@
           <a:p>
             <a:fld id="{0BD89023-946D-4914-A444-F66256F52110}" type="datetimeFigureOut">
               <a:rPr lang="bg-BG" smtClean="0"/>
-              <a:t>11.11.2022 г.</a:t>
+              <a:t>12.11.2022 г.</a:t>
             </a:fld>
             <a:endParaRPr lang="bg-BG"/>
           </a:p>
@@ -4256,7 +4262,7 @@
           <a:p>
             <a:fld id="{0BD89023-946D-4914-A444-F66256F52110}" type="datetimeFigureOut">
               <a:rPr lang="bg-BG" smtClean="0"/>
-              <a:t>11.11.2022 г.</a:t>
+              <a:t>12.11.2022 г.</a:t>
             </a:fld>
             <a:endParaRPr lang="bg-BG"/>
           </a:p>
@@ -4374,7 +4380,7 @@
           <a:p>
             <a:fld id="{0BD89023-946D-4914-A444-F66256F52110}" type="datetimeFigureOut">
               <a:rPr lang="bg-BG" smtClean="0"/>
-              <a:t>11.11.2022 г.</a:t>
+              <a:t>12.11.2022 г.</a:t>
             </a:fld>
             <a:endParaRPr lang="bg-BG"/>
           </a:p>
@@ -4469,7 +4475,7 @@
           <a:p>
             <a:fld id="{0BD89023-946D-4914-A444-F66256F52110}" type="datetimeFigureOut">
               <a:rPr lang="bg-BG" smtClean="0"/>
-              <a:t>11.11.2022 г.</a:t>
+              <a:t>12.11.2022 г.</a:t>
             </a:fld>
             <a:endParaRPr lang="bg-BG"/>
           </a:p>
@@ -4742,7 +4748,7 @@
           <a:p>
             <a:fld id="{0BD89023-946D-4914-A444-F66256F52110}" type="datetimeFigureOut">
               <a:rPr lang="bg-BG" smtClean="0"/>
-              <a:t>11.11.2022 г.</a:t>
+              <a:t>12.11.2022 г.</a:t>
             </a:fld>
             <a:endParaRPr lang="bg-BG"/>
           </a:p>
@@ -5023,7 +5029,7 @@
           <a:p>
             <a:fld id="{0BD89023-946D-4914-A444-F66256F52110}" type="datetimeFigureOut">
               <a:rPr lang="bg-BG" smtClean="0"/>
-              <a:t>11.11.2022 г.</a:t>
+              <a:t>12.11.2022 г.</a:t>
             </a:fld>
             <a:endParaRPr lang="bg-BG"/>
           </a:p>
@@ -5263,7 +5269,7 @@
           <a:p>
             <a:fld id="{0BD89023-946D-4914-A444-F66256F52110}" type="datetimeFigureOut">
               <a:rPr lang="bg-BG" smtClean="0"/>
-              <a:t>11.11.2022 г.</a:t>
+              <a:t>12.11.2022 г.</a:t>
             </a:fld>
             <a:endParaRPr lang="bg-BG"/>
           </a:p>
@@ -5870,29 +5876,9 @@
             <a:pPr algn="r"/>
             <a:r>
               <a:rPr lang="en-US" sz="9600" spc="-300" dirty="0">
-                <a:gradFill flip="none" rotWithShape="1">
-                  <a:gsLst>
-                    <a:gs pos="32000">
-                      <a:schemeClr val="tx1">
-                        <a:lumMod val="89000"/>
-                      </a:schemeClr>
-                    </a:gs>
-                    <a:gs pos="0">
-                      <a:schemeClr val="bg1">
-                        <a:lumMod val="41000"/>
-                        <a:lumOff val="59000"/>
-                      </a:schemeClr>
-                    </a:gs>
-                    <a:gs pos="100000">
-                      <a:schemeClr val="tx2">
-                        <a:lumMod val="0"/>
-                        <a:lumOff val="100000"/>
-                      </a:schemeClr>
-                    </a:gs>
-                  </a:gsLst>
-                  <a:lin ang="8100000" scaled="1"/>
-                  <a:tileRect/>
-                </a:gradFill>
+                <a:solidFill>
+                  <a:schemeClr val="tx1"/>
+                </a:solidFill>
                 <a:effectLst>
                   <a:outerShdw blurRad="469900" dist="342900" dir="5400000" sy="-20000" rotWithShape="0">
                     <a:prstClr val="black">
@@ -5999,6 +5985,9 @@
             <a:pPr algn="ctr"/>
             <a:r>
               <a:rPr lang="bg-BG" dirty="0">
+                <a:solidFill>
+                  <a:schemeClr val="tx1"/>
+                </a:solidFill>
                 <a:latin typeface="Arial" panose="020B0604020202020204" pitchFamily="34" charset="0"/>
                 <a:cs typeface="Arial" panose="020B0604020202020204" pitchFamily="34" charset="0"/>
               </a:rPr>
@@ -6006,6 +5995,9 @@
             </a:r>
             <a:r>
               <a:rPr lang="en-US" dirty="0">
+                <a:solidFill>
+                  <a:schemeClr val="tx1"/>
+                </a:solidFill>
                 <a:latin typeface="Arial" panose="020B0604020202020204" pitchFamily="34" charset="0"/>
                 <a:cs typeface="Arial" panose="020B0604020202020204" pitchFamily="34" charset="0"/>
               </a:rPr>
@@ -6050,11 +6042,23 @@
             </a:r>
             <a:r>
               <a:rPr lang="bg-BG" dirty="0"/>
-              <a:t> са </a:t>
+              <a:t> </a:t>
             </a:r>
             <a:r>
               <a:rPr lang="bg-BG" dirty="0">
                 <a:solidFill>
+                  <a:schemeClr val="tx1"/>
+                </a:solidFill>
+              </a:rPr>
+              <a:t>са</a:t>
+            </a:r>
+            <a:r>
+              <a:rPr lang="bg-BG" dirty="0"/>
+              <a:t> </a:t>
+            </a:r>
+            <a:r>
+              <a:rPr lang="bg-BG" dirty="0">
+                <a:solidFill>
                   <a:srgbClr val="FFFF00"/>
                 </a:solidFill>
               </a:rPr>
@@ -6062,11 +6066,19 @@
             </a:r>
             <a:r>
               <a:rPr lang="bg-BG" dirty="0"/>
-              <a:t> от данни, която съхранява елементи от един и същи тип в </a:t>
+              <a:t> </a:t>
             </a:r>
             <a:r>
               <a:rPr lang="bg-BG" dirty="0">
                 <a:solidFill>
+                  <a:schemeClr val="tx1"/>
+                </a:solidFill>
+              </a:rPr>
+              <a:t>от данни, която съхранява елементи от един и същи тип в </a:t>
+            </a:r>
+            <a:r>
+              <a:rPr lang="bg-BG" dirty="0">
+                <a:solidFill>
                   <a:srgbClr val="FFFF00"/>
                 </a:solidFill>
               </a:rPr>
@@ -6074,15 +6086,35 @@
             </a:r>
             <a:r>
               <a:rPr lang="bg-BG" dirty="0"/>
-              <a:t> места в паметта</a:t>
-            </a:r>
-            <a:r>
-              <a:rPr lang="en-US" dirty="0"/>
+              <a:t> </a:t>
+            </a:r>
+            <a:r>
+              <a:rPr lang="bg-BG" dirty="0">
+                <a:solidFill>
+                  <a:schemeClr val="tx1"/>
+                </a:solidFill>
+              </a:rPr>
+              <a:t>места в паметта</a:t>
+            </a:r>
+            <a:r>
+              <a:rPr lang="en-US" dirty="0">
+                <a:solidFill>
+                  <a:schemeClr val="tx1"/>
+                </a:solidFill>
+              </a:rPr>
               <a:t>. </a:t>
             </a:r>
             <a:r>
+              <a:rPr lang="bg-BG" dirty="0">
+                <a:solidFill>
+                  <a:schemeClr val="tx1"/>
+                </a:solidFill>
+              </a:rPr>
+              <a:t>Това е най-простата структура от данни, при която достъпването на елемент от колекцията става чрез</a:t>
+            </a:r>
+            <a:r>
               <a:rPr lang="bg-BG" dirty="0"/>
-              <a:t>Това е най-простата структура от данни, при която достъпването на елемент от колекцията става чрез </a:t>
+              <a:t> </a:t>
             </a:r>
             <a:r>
               <a:rPr lang="bg-BG" dirty="0">
@@ -6093,27 +6125,47 @@
               <a:t>индекс</a:t>
             </a:r>
             <a:r>
-              <a:rPr lang="en-US" dirty="0"/>
+              <a:rPr lang="en-US" dirty="0">
+                <a:solidFill>
+                  <a:schemeClr val="tx1"/>
+                </a:solidFill>
+              </a:rPr>
               <a:t>. </a:t>
             </a:r>
             <a:r>
+              <a:rPr lang="bg-BG" dirty="0">
+                <a:solidFill>
+                  <a:schemeClr val="tx1"/>
+                </a:solidFill>
+              </a:rPr>
+              <a:t>Масивите имат </a:t>
+            </a:r>
+            <a:r>
+              <a:rPr lang="bg-BG" dirty="0">
+                <a:solidFill>
+                  <a:srgbClr val="FFFF00"/>
+                </a:solidFill>
+              </a:rPr>
+              <a:t>фиксиран</a:t>
+            </a:r>
+            <a:r>
               <a:rPr lang="bg-BG" dirty="0"/>
-              <a:t>Масивите имат </a:t>
+              <a:t> </a:t>
             </a:r>
             <a:r>
               <a:rPr lang="bg-BG" dirty="0">
                 <a:solidFill>
-                  <a:srgbClr val="FFFF00"/>
-                </a:solidFill>
-              </a:rPr>
-              <a:t>фиксиран</a:t>
-            </a:r>
-            <a:r>
-              <a:rPr lang="bg-BG" dirty="0"/>
-              <a:t> размер</a:t>
-            </a:r>
-            <a:r>
-              <a:rPr lang="en-US" dirty="0"/>
+                  <a:schemeClr val="tx1"/>
+                </a:solidFill>
+              </a:rPr>
+              <a:t>размер</a:t>
+            </a:r>
+            <a:r>
+              <a:rPr lang="en-US" dirty="0">
+                <a:solidFill>
+                  <a:schemeClr val="tx1"/>
+                </a:solidFill>
+              </a:rPr>
               <a:t>.</a:t>
             </a:r>
           </a:p>
@@ -6642,6 +6694,2854 @@
 </p:sld>
 </file>
 
+<file path=ppt/slides/slide11.xml><?xml version="1.0" encoding="utf-8"?>
+<p:sld xmlns:a="http://schemas.openxmlformats.org/drawingml/2006/main" xmlns:r="http://schemas.openxmlformats.org/officeDocument/2006/relationships" xmlns:p="http://schemas.openxmlformats.org/presentationml/2006/main">
+  <p:cSld>
+    <p:spTree>
+      <p:nvGrpSpPr>
+        <p:cNvPr id="1" name=""/>
+        <p:cNvGrpSpPr/>
+        <p:nvPr/>
+      </p:nvGrpSpPr>
+      <p:grpSpPr>
+        <a:xfrm>
+          <a:off x="0" y="0"/>
+          <a:ext cx="0" cy="0"/>
+          <a:chOff x="0" y="0"/>
+          <a:chExt cx="0" cy="0"/>
+        </a:xfrm>
+      </p:grpSpPr>
+      <p:sp>
+        <p:nvSpPr>
+          <p:cNvPr id="2" name="Заглавие 1">
+            <a:extLst>
+              <a:ext uri="{FF2B5EF4-FFF2-40B4-BE49-F238E27FC236}">
+                <a16:creationId xmlns:a16="http://schemas.microsoft.com/office/drawing/2014/main" id="{FE2DBD1F-217E-192F-0B34-F9D1EABDC963}"/>
+              </a:ext>
+            </a:extLst>
+          </p:cNvPr>
+          <p:cNvSpPr>
+            <a:spLocks noGrp="1"/>
+          </p:cNvSpPr>
+          <p:nvPr>
+            <p:ph type="title"/>
+          </p:nvPr>
+        </p:nvSpPr>
+        <p:spPr/>
+        <p:txBody>
+          <a:bodyPr/>
+          <a:lstStyle/>
+          <a:p>
+            <a:pPr algn="ctr"/>
+            <a:r>
+              <a:rPr lang="bg-BG" dirty="0">
+                <a:solidFill>
+                  <a:schemeClr val="tx1"/>
+                </a:solidFill>
+                <a:latin typeface="Arial" panose="020B0604020202020204" pitchFamily="34" charset="0"/>
+                <a:cs typeface="Arial" panose="020B0604020202020204" pitchFamily="34" charset="0"/>
+              </a:rPr>
+              <a:t>Създаване на масив</a:t>
+            </a:r>
+            <a:endParaRPr lang="en-US" dirty="0">
+              <a:solidFill>
+                <a:schemeClr val="tx1"/>
+              </a:solidFill>
+              <a:latin typeface="Arial" panose="020B0604020202020204" pitchFamily="34" charset="0"/>
+              <a:cs typeface="Arial" panose="020B0604020202020204" pitchFamily="34" charset="0"/>
+            </a:endParaRPr>
+          </a:p>
+        </p:txBody>
+      </p:sp>
+      <p:sp>
+        <p:nvSpPr>
+          <p:cNvPr id="3" name="Контейнер за съдържание 2">
+            <a:extLst>
+              <a:ext uri="{FF2B5EF4-FFF2-40B4-BE49-F238E27FC236}">
+                <a16:creationId xmlns:a16="http://schemas.microsoft.com/office/drawing/2014/main" id="{E21FD466-E7D9-54EF-D48A-C3F881CC8C6F}"/>
+              </a:ext>
+            </a:extLst>
+          </p:cNvPr>
+          <p:cNvSpPr>
+            <a:spLocks noGrp="1"/>
+          </p:cNvSpPr>
+          <p:nvPr>
+            <p:ph idx="1"/>
+          </p:nvPr>
+        </p:nvSpPr>
+        <p:spPr/>
+        <p:txBody>
+          <a:bodyPr/>
+          <a:lstStyle/>
+          <a:p>
+            <a:r>
+              <a:rPr lang="bg-BG" dirty="0">
+                <a:solidFill>
+                  <a:schemeClr val="tx1"/>
+                </a:solidFill>
+                <a:latin typeface="Arial" panose="020B0604020202020204" pitchFamily="34" charset="0"/>
+                <a:cs typeface="Arial" panose="020B0604020202020204" pitchFamily="34" charset="0"/>
+              </a:rPr>
+              <a:t>Масив (</a:t>
+            </a:r>
+            <a:r>
+              <a:rPr lang="en-US" dirty="0">
+                <a:solidFill>
+                  <a:schemeClr val="tx1"/>
+                </a:solidFill>
+                <a:latin typeface="Arial" panose="020B0604020202020204" pitchFamily="34" charset="0"/>
+                <a:cs typeface="Arial" panose="020B0604020202020204" pitchFamily="34" charset="0"/>
+              </a:rPr>
+              <a:t>array</a:t>
+            </a:r>
+            <a:r>
+              <a:rPr lang="bg-BG" dirty="0">
+                <a:solidFill>
+                  <a:schemeClr val="tx1"/>
+                </a:solidFill>
+                <a:latin typeface="Arial" panose="020B0604020202020204" pitchFamily="34" charset="0"/>
+                <a:cs typeface="Arial" panose="020B0604020202020204" pitchFamily="34" charset="0"/>
+              </a:rPr>
+              <a:t>)</a:t>
+            </a:r>
+            <a:r>
+              <a:rPr lang="en-US" dirty="0">
+                <a:solidFill>
+                  <a:schemeClr val="tx1"/>
+                </a:solidFill>
+                <a:latin typeface="Arial" panose="020B0604020202020204" pitchFamily="34" charset="0"/>
+                <a:cs typeface="Arial" panose="020B0604020202020204" pitchFamily="34" charset="0"/>
+              </a:rPr>
+              <a:t> </a:t>
+            </a:r>
+            <a:r>
+              <a:rPr lang="bg-BG" dirty="0">
+                <a:solidFill>
+                  <a:schemeClr val="tx1"/>
+                </a:solidFill>
+                <a:latin typeface="Arial" panose="020B0604020202020204" pitchFamily="34" charset="0"/>
+                <a:cs typeface="Arial" panose="020B0604020202020204" pitchFamily="34" charset="0"/>
+              </a:rPr>
+              <a:t>се създава чрез ключовата дума</a:t>
+            </a:r>
+            <a:r>
+              <a:rPr lang="bg-BG" dirty="0">
+                <a:latin typeface="Arial" panose="020B0604020202020204" pitchFamily="34" charset="0"/>
+                <a:cs typeface="Arial" panose="020B0604020202020204" pitchFamily="34" charset="0"/>
+              </a:rPr>
+              <a:t> „</a:t>
+            </a:r>
+            <a:r>
+              <a:rPr lang="en-US" dirty="0">
+                <a:solidFill>
+                  <a:srgbClr val="92D050"/>
+                </a:solidFill>
+                <a:latin typeface="Arial" panose="020B0604020202020204" pitchFamily="34" charset="0"/>
+                <a:cs typeface="Arial" panose="020B0604020202020204" pitchFamily="34" charset="0"/>
+              </a:rPr>
+              <a:t>new</a:t>
+            </a:r>
+            <a:r>
+              <a:rPr lang="bg-BG" dirty="0">
+                <a:latin typeface="Arial" panose="020B0604020202020204" pitchFamily="34" charset="0"/>
+                <a:cs typeface="Arial" panose="020B0604020202020204" pitchFamily="34" charset="0"/>
+              </a:rPr>
+              <a:t>“</a:t>
+            </a:r>
+            <a:r>
+              <a:rPr lang="en-US" dirty="0">
+                <a:latin typeface="Arial" panose="020B0604020202020204" pitchFamily="34" charset="0"/>
+                <a:cs typeface="Arial" panose="020B0604020202020204" pitchFamily="34" charset="0"/>
+              </a:rPr>
+              <a:t>.</a:t>
+            </a:r>
+            <a:r>
+              <a:rPr lang="bg-BG" dirty="0">
+                <a:latin typeface="Arial" panose="020B0604020202020204" pitchFamily="34" charset="0"/>
+                <a:cs typeface="Arial" panose="020B0604020202020204" pitchFamily="34" charset="0"/>
+              </a:rPr>
+              <a:t> </a:t>
+            </a:r>
+            <a:endParaRPr lang="en-US" dirty="0">
+              <a:latin typeface="Arial" panose="020B0604020202020204" pitchFamily="34" charset="0"/>
+              <a:cs typeface="Arial" panose="020B0604020202020204" pitchFamily="34" charset="0"/>
+            </a:endParaRPr>
+          </a:p>
+          <a:p>
+            <a:pPr marL="0" indent="0">
+              <a:buNone/>
+            </a:pPr>
+            <a:endParaRPr lang="en-US" dirty="0">
+              <a:latin typeface="Arial" panose="020B0604020202020204" pitchFamily="34" charset="0"/>
+              <a:cs typeface="Arial" panose="020B0604020202020204" pitchFamily="34" charset="0"/>
+            </a:endParaRPr>
+          </a:p>
+          <a:p>
+            <a:pPr marL="0" indent="0">
+              <a:buNone/>
+            </a:pPr>
+            <a:r>
+              <a:rPr lang="bg-BG" u="sng" dirty="0">
+                <a:solidFill>
+                  <a:schemeClr val="tx1"/>
+                </a:solidFill>
+                <a:latin typeface="Arial" panose="020B0604020202020204" pitchFamily="34" charset="0"/>
+                <a:cs typeface="Arial" panose="020B0604020202020204" pitchFamily="34" charset="0"/>
+              </a:rPr>
+              <a:t>Пример:</a:t>
+            </a:r>
+          </a:p>
+          <a:p>
+            <a:pPr marL="0" indent="0">
+              <a:buNone/>
+            </a:pPr>
+            <a:r>
+              <a:rPr lang="bg-BG" dirty="0"/>
+              <a:t>	</a:t>
+            </a:r>
+            <a:endParaRPr lang="en-US" dirty="0"/>
+          </a:p>
+        </p:txBody>
+      </p:sp>
+      <p:sp>
+        <p:nvSpPr>
+          <p:cNvPr id="5" name="Текстово поле 4">
+            <a:extLst>
+              <a:ext uri="{FF2B5EF4-FFF2-40B4-BE49-F238E27FC236}">
+                <a16:creationId xmlns:a16="http://schemas.microsoft.com/office/drawing/2014/main" id="{4481618D-BAEE-4343-D090-568267BDFE1A}"/>
+              </a:ext>
+            </a:extLst>
+          </p:cNvPr>
+          <p:cNvSpPr txBox="1"/>
+          <p:nvPr/>
+        </p:nvSpPr>
+        <p:spPr>
+          <a:xfrm>
+            <a:off x="1655442" y="3611920"/>
+            <a:ext cx="8691239" cy="1477328"/>
+          </a:xfrm>
+          <a:prstGeom prst="rect">
+            <a:avLst/>
+          </a:prstGeom>
+          <a:noFill/>
+        </p:spPr>
+        <p:txBody>
+          <a:bodyPr wrap="square" rtlCol="0">
+            <a:spAutoFit/>
+          </a:bodyPr>
+          <a:lstStyle/>
+          <a:p>
+            <a:r>
+              <a:rPr lang="en-US" dirty="0">
+                <a:latin typeface="Consolas" panose="020B0609020204030204" pitchFamily="49" charset="0"/>
+              </a:rPr>
+              <a:t>int[] </a:t>
+            </a:r>
+            <a:r>
+              <a:rPr lang="en-US" dirty="0" err="1">
+                <a:latin typeface="Consolas" panose="020B0609020204030204" pitchFamily="49" charset="0"/>
+              </a:rPr>
+              <a:t>arrayOne</a:t>
+            </a:r>
+            <a:r>
+              <a:rPr lang="en-US" dirty="0">
+                <a:latin typeface="Consolas" panose="020B0609020204030204" pitchFamily="49" charset="0"/>
+              </a:rPr>
+              <a:t> = </a:t>
+            </a:r>
+            <a:r>
+              <a:rPr lang="en-US" dirty="0">
+                <a:solidFill>
+                  <a:schemeClr val="accent2">
+                    <a:lumMod val="75000"/>
+                  </a:schemeClr>
+                </a:solidFill>
+                <a:latin typeface="Consolas" panose="020B0609020204030204" pitchFamily="49" charset="0"/>
+              </a:rPr>
+              <a:t>new</a:t>
+            </a:r>
+            <a:r>
+              <a:rPr lang="en-US" dirty="0">
+                <a:latin typeface="Consolas" panose="020B0609020204030204" pitchFamily="49" charset="0"/>
+              </a:rPr>
+              <a:t> int</a:t>
+            </a:r>
+            <a:r>
+              <a:rPr lang="en-US" dirty="0">
+                <a:solidFill>
+                  <a:schemeClr val="accent6">
+                    <a:lumMod val="60000"/>
+                    <a:lumOff val="40000"/>
+                  </a:schemeClr>
+                </a:solidFill>
+                <a:latin typeface="Consolas" panose="020B0609020204030204" pitchFamily="49" charset="0"/>
+              </a:rPr>
+              <a:t>[2]</a:t>
+            </a:r>
+            <a:r>
+              <a:rPr lang="en-US" dirty="0">
+                <a:latin typeface="Consolas" panose="020B0609020204030204" pitchFamily="49" charset="0"/>
+              </a:rPr>
+              <a:t>;</a:t>
+            </a:r>
+          </a:p>
+          <a:p>
+            <a:endParaRPr lang="en-US" dirty="0">
+              <a:latin typeface="Consolas" panose="020B0609020204030204" pitchFamily="49" charset="0"/>
+            </a:endParaRPr>
+          </a:p>
+          <a:p>
+            <a:r>
+              <a:rPr lang="en-US" dirty="0">
+                <a:latin typeface="Consolas" panose="020B0609020204030204" pitchFamily="49" charset="0"/>
+              </a:rPr>
+              <a:t>string[] </a:t>
+            </a:r>
+            <a:r>
+              <a:rPr lang="en-US" dirty="0" err="1">
+                <a:latin typeface="Consolas" panose="020B0609020204030204" pitchFamily="49" charset="0"/>
+              </a:rPr>
+              <a:t>arrayTwo</a:t>
+            </a:r>
+            <a:r>
+              <a:rPr lang="en-US" dirty="0">
+                <a:latin typeface="Consolas" panose="020B0609020204030204" pitchFamily="49" charset="0"/>
+              </a:rPr>
+              <a:t> = </a:t>
+            </a:r>
+            <a:r>
+              <a:rPr lang="en-US" dirty="0">
+                <a:solidFill>
+                  <a:schemeClr val="accent2">
+                    <a:lumMod val="75000"/>
+                  </a:schemeClr>
+                </a:solidFill>
+                <a:latin typeface="Consolas" panose="020B0609020204030204" pitchFamily="49" charset="0"/>
+              </a:rPr>
+              <a:t>new</a:t>
+            </a:r>
+            <a:r>
+              <a:rPr lang="en-US" dirty="0">
+                <a:latin typeface="Consolas" panose="020B0609020204030204" pitchFamily="49" charset="0"/>
+              </a:rPr>
+              <a:t> string</a:t>
+            </a:r>
+            <a:r>
+              <a:rPr lang="en-US" dirty="0">
+                <a:solidFill>
+                  <a:schemeClr val="accent6">
+                    <a:lumMod val="60000"/>
+                    <a:lumOff val="40000"/>
+                  </a:schemeClr>
+                </a:solidFill>
+                <a:latin typeface="Consolas" panose="020B0609020204030204" pitchFamily="49" charset="0"/>
+              </a:rPr>
+              <a:t>[5]</a:t>
+            </a:r>
+            <a:r>
+              <a:rPr lang="en-US" dirty="0">
+                <a:latin typeface="Consolas" panose="020B0609020204030204" pitchFamily="49" charset="0"/>
+              </a:rPr>
+              <a:t>;</a:t>
+            </a:r>
+          </a:p>
+          <a:p>
+            <a:endParaRPr lang="en-US" dirty="0">
+              <a:latin typeface="Consolas" panose="020B0609020204030204" pitchFamily="49" charset="0"/>
+            </a:endParaRPr>
+          </a:p>
+          <a:p>
+            <a:r>
+              <a:rPr lang="en-US" dirty="0">
+                <a:latin typeface="Consolas" panose="020B0609020204030204" pitchFamily="49" charset="0"/>
+              </a:rPr>
+              <a:t>double[] </a:t>
+            </a:r>
+            <a:r>
+              <a:rPr lang="en-US" dirty="0" err="1">
+                <a:latin typeface="Consolas" panose="020B0609020204030204" pitchFamily="49" charset="0"/>
+              </a:rPr>
+              <a:t>arrayThree</a:t>
+            </a:r>
+            <a:r>
+              <a:rPr lang="en-US" dirty="0">
+                <a:latin typeface="Consolas" panose="020B0609020204030204" pitchFamily="49" charset="0"/>
+              </a:rPr>
+              <a:t> = </a:t>
+            </a:r>
+            <a:r>
+              <a:rPr lang="en-US" dirty="0">
+                <a:solidFill>
+                  <a:schemeClr val="accent2">
+                    <a:lumMod val="75000"/>
+                  </a:schemeClr>
+                </a:solidFill>
+                <a:latin typeface="Consolas" panose="020B0609020204030204" pitchFamily="49" charset="0"/>
+              </a:rPr>
+              <a:t>new</a:t>
+            </a:r>
+            <a:r>
+              <a:rPr lang="en-US" dirty="0">
+                <a:latin typeface="Consolas" panose="020B0609020204030204" pitchFamily="49" charset="0"/>
+              </a:rPr>
+              <a:t> double</a:t>
+            </a:r>
+            <a:r>
+              <a:rPr lang="en-US" dirty="0">
+                <a:solidFill>
+                  <a:schemeClr val="accent6">
+                    <a:lumMod val="60000"/>
+                    <a:lumOff val="40000"/>
+                  </a:schemeClr>
+                </a:solidFill>
+                <a:latin typeface="Consolas" panose="020B0609020204030204" pitchFamily="49" charset="0"/>
+              </a:rPr>
+              <a:t>[</a:t>
+            </a:r>
+            <a:r>
+              <a:rPr lang="bg-BG" dirty="0">
+                <a:solidFill>
+                  <a:schemeClr val="accent6">
+                    <a:lumMod val="60000"/>
+                    <a:lumOff val="40000"/>
+                  </a:schemeClr>
+                </a:solidFill>
+                <a:latin typeface="Consolas" panose="020B0609020204030204" pitchFamily="49" charset="0"/>
+              </a:rPr>
+              <a:t>2</a:t>
+            </a:r>
+            <a:r>
+              <a:rPr lang="en-US" dirty="0">
+                <a:solidFill>
+                  <a:schemeClr val="accent6">
+                    <a:lumMod val="60000"/>
+                    <a:lumOff val="40000"/>
+                  </a:schemeClr>
+                </a:solidFill>
+                <a:latin typeface="Consolas" panose="020B0609020204030204" pitchFamily="49" charset="0"/>
+              </a:rPr>
+              <a:t>]</a:t>
+            </a:r>
+            <a:r>
+              <a:rPr lang="bg-BG" dirty="0">
+                <a:solidFill>
+                  <a:schemeClr val="accent6">
+                    <a:lumMod val="60000"/>
+                    <a:lumOff val="40000"/>
+                  </a:schemeClr>
+                </a:solidFill>
+                <a:latin typeface="Consolas" panose="020B0609020204030204" pitchFamily="49" charset="0"/>
+              </a:rPr>
+              <a:t> </a:t>
+            </a:r>
+            <a:r>
+              <a:rPr lang="en-US" dirty="0">
+                <a:latin typeface="Consolas" panose="020B0609020204030204" pitchFamily="49" charset="0"/>
+              </a:rPr>
+              <a:t>{</a:t>
+            </a:r>
+            <a:r>
+              <a:rPr lang="en-US" dirty="0">
+                <a:solidFill>
+                  <a:srgbClr val="00B0F0"/>
+                </a:solidFill>
+                <a:latin typeface="Consolas" panose="020B0609020204030204" pitchFamily="49" charset="0"/>
+              </a:rPr>
+              <a:t>2.5</a:t>
+            </a:r>
+            <a:r>
+              <a:rPr lang="en-US" dirty="0">
+                <a:latin typeface="Consolas" panose="020B0609020204030204" pitchFamily="49" charset="0"/>
+              </a:rPr>
+              <a:t>,</a:t>
+            </a:r>
+            <a:r>
+              <a:rPr lang="en-US" dirty="0">
+                <a:solidFill>
+                  <a:schemeClr val="accent6">
+                    <a:lumMod val="60000"/>
+                    <a:lumOff val="40000"/>
+                  </a:schemeClr>
+                </a:solidFill>
+                <a:latin typeface="Consolas" panose="020B0609020204030204" pitchFamily="49" charset="0"/>
+              </a:rPr>
+              <a:t> </a:t>
+            </a:r>
+            <a:r>
+              <a:rPr lang="en-US" dirty="0">
+                <a:solidFill>
+                  <a:srgbClr val="00B0F0"/>
+                </a:solidFill>
+                <a:latin typeface="Consolas" panose="020B0609020204030204" pitchFamily="49" charset="0"/>
+              </a:rPr>
+              <a:t>5.8</a:t>
+            </a:r>
+            <a:r>
+              <a:rPr lang="en-US" dirty="0">
+                <a:latin typeface="Consolas" panose="020B0609020204030204" pitchFamily="49" charset="0"/>
+              </a:rPr>
+              <a:t>};</a:t>
+            </a:r>
+          </a:p>
+        </p:txBody>
+      </p:sp>
+    </p:spTree>
+    <p:extLst>
+      <p:ext uri="{BB962C8B-B14F-4D97-AF65-F5344CB8AC3E}">
+        <p14:creationId xmlns:p14="http://schemas.microsoft.com/office/powerpoint/2010/main" val="3514515184"/>
+      </p:ext>
+    </p:extLst>
+  </p:cSld>
+  <p:clrMapOvr>
+    <a:masterClrMapping/>
+  </p:clrMapOvr>
+</p:sld>
+</file>
+
+<file path=ppt/slides/slide12.xml><?xml version="1.0" encoding="utf-8"?>
+<p:sld xmlns:a="http://schemas.openxmlformats.org/drawingml/2006/main" xmlns:r="http://schemas.openxmlformats.org/officeDocument/2006/relationships" xmlns:p="http://schemas.openxmlformats.org/presentationml/2006/main">
+  <p:cSld>
+    <p:spTree>
+      <p:nvGrpSpPr>
+        <p:cNvPr id="1" name=""/>
+        <p:cNvGrpSpPr/>
+        <p:nvPr/>
+      </p:nvGrpSpPr>
+      <p:grpSpPr>
+        <a:xfrm>
+          <a:off x="0" y="0"/>
+          <a:ext cx="0" cy="0"/>
+          <a:chOff x="0" y="0"/>
+          <a:chExt cx="0" cy="0"/>
+        </a:xfrm>
+      </p:grpSpPr>
+      <p:sp>
+        <p:nvSpPr>
+          <p:cNvPr id="2" name="Заглавие 1">
+            <a:extLst>
+              <a:ext uri="{FF2B5EF4-FFF2-40B4-BE49-F238E27FC236}">
+                <a16:creationId xmlns:a16="http://schemas.microsoft.com/office/drawing/2014/main" id="{9CE1E136-7464-6FA3-97DF-FA8FD6E46272}"/>
+              </a:ext>
+            </a:extLst>
+          </p:cNvPr>
+          <p:cNvSpPr>
+            <a:spLocks noGrp="1"/>
+          </p:cNvSpPr>
+          <p:nvPr>
+            <p:ph type="title"/>
+          </p:nvPr>
+        </p:nvSpPr>
+        <p:spPr/>
+        <p:txBody>
+          <a:bodyPr/>
+          <a:lstStyle/>
+          <a:p>
+            <a:pPr algn="ctr"/>
+            <a:r>
+              <a:rPr lang="en-US" dirty="0">
+                <a:solidFill>
+                  <a:schemeClr val="tx1"/>
+                </a:solidFill>
+              </a:rPr>
+              <a:t>Length </a:t>
+            </a:r>
+            <a:r>
+              <a:rPr lang="bg-BG" dirty="0">
+                <a:solidFill>
+                  <a:schemeClr val="tx1"/>
+                </a:solidFill>
+              </a:rPr>
+              <a:t>и индексиране</a:t>
+            </a:r>
+            <a:r>
+              <a:rPr lang="en-US" dirty="0">
+                <a:solidFill>
+                  <a:schemeClr val="tx1"/>
+                </a:solidFill>
+              </a:rPr>
+              <a:t> []</a:t>
+            </a:r>
+          </a:p>
+        </p:txBody>
+      </p:sp>
+      <p:sp>
+        <p:nvSpPr>
+          <p:cNvPr id="3" name="Контейнер за съдържание 2">
+            <a:extLst>
+              <a:ext uri="{FF2B5EF4-FFF2-40B4-BE49-F238E27FC236}">
+                <a16:creationId xmlns:a16="http://schemas.microsoft.com/office/drawing/2014/main" id="{FD4B3D6F-830A-4BBB-456A-FB9AAA0D8DE1}"/>
+              </a:ext>
+            </a:extLst>
+          </p:cNvPr>
+          <p:cNvSpPr>
+            <a:spLocks noGrp="1"/>
+          </p:cNvSpPr>
+          <p:nvPr>
+            <p:ph idx="1"/>
+          </p:nvPr>
+        </p:nvSpPr>
+        <p:spPr/>
+        <p:txBody>
+          <a:bodyPr/>
+          <a:lstStyle/>
+          <a:p>
+            <a:r>
+              <a:rPr lang="bg-BG" dirty="0">
+                <a:solidFill>
+                  <a:schemeClr val="tx1"/>
+                </a:solidFill>
+              </a:rPr>
+              <a:t>Масивът има пропърти (свойство), което се нарича </a:t>
+            </a:r>
+            <a:r>
+              <a:rPr lang="en-US" dirty="0">
+                <a:solidFill>
+                  <a:srgbClr val="92D050"/>
+                </a:solidFill>
+              </a:rPr>
+              <a:t>length</a:t>
+            </a:r>
+            <a:r>
+              <a:rPr lang="en-US" dirty="0"/>
+              <a:t>. </a:t>
+            </a:r>
+            <a:r>
+              <a:rPr lang="bg-BG" dirty="0"/>
+              <a:t>То ни </a:t>
+            </a:r>
+            <a:r>
+              <a:rPr lang="bg-BG" dirty="0">
+                <a:solidFill>
+                  <a:schemeClr val="tx1"/>
+                </a:solidFill>
+              </a:rPr>
+              <a:t>дава</a:t>
+            </a:r>
+            <a:r>
+              <a:rPr lang="bg-BG" dirty="0"/>
+              <a:t> </a:t>
+            </a:r>
+            <a:r>
+              <a:rPr lang="bg-BG" dirty="0">
+                <a:solidFill>
+                  <a:srgbClr val="92D050"/>
+                </a:solidFill>
+              </a:rPr>
+              <a:t>дължината</a:t>
+            </a:r>
+            <a:r>
+              <a:rPr lang="bg-BG" dirty="0"/>
+              <a:t> </a:t>
+            </a:r>
+            <a:r>
+              <a:rPr lang="bg-BG" dirty="0">
+                <a:solidFill>
+                  <a:schemeClr val="tx1"/>
+                </a:solidFill>
+              </a:rPr>
+              <a:t>на масива, който използваме</a:t>
+            </a:r>
+            <a:r>
+              <a:rPr lang="bg-BG" dirty="0"/>
+              <a:t>.</a:t>
+            </a:r>
+          </a:p>
+          <a:p>
+            <a:r>
+              <a:rPr lang="bg-BG" dirty="0">
+                <a:solidFill>
+                  <a:schemeClr val="tx1"/>
+                </a:solidFill>
+              </a:rPr>
+              <a:t>Елементите в  масив се достъпват чрез използването на </a:t>
+            </a:r>
+            <a:r>
+              <a:rPr lang="bg-BG" dirty="0">
+                <a:solidFill>
+                  <a:srgbClr val="92D050"/>
+                </a:solidFill>
+              </a:rPr>
+              <a:t>индексиране</a:t>
+            </a:r>
+            <a:r>
+              <a:rPr lang="bg-BG" dirty="0"/>
+              <a:t> </a:t>
+            </a:r>
+            <a:r>
+              <a:rPr lang="bg-BG" dirty="0">
+                <a:solidFill>
+                  <a:schemeClr val="tx1"/>
+                </a:solidFill>
+              </a:rPr>
+              <a:t>или иначе казано всеки един елемент е под конкретен индекс в масива.</a:t>
+            </a:r>
+          </a:p>
+          <a:p>
+            <a:pPr marL="0" indent="0">
+              <a:buNone/>
+            </a:pPr>
+            <a:r>
+              <a:rPr lang="bg-BG" dirty="0"/>
+              <a:t>   </a:t>
+            </a:r>
+            <a:r>
+              <a:rPr lang="bg-BG" u="sng" dirty="0">
+                <a:solidFill>
+                  <a:schemeClr val="tx1"/>
+                </a:solidFill>
+              </a:rPr>
+              <a:t>Пример</a:t>
+            </a:r>
+            <a:r>
+              <a:rPr lang="en-US" u="sng" dirty="0">
+                <a:solidFill>
+                  <a:schemeClr val="tx1"/>
+                </a:solidFill>
+              </a:rPr>
+              <a:t>:</a:t>
+            </a:r>
+          </a:p>
+          <a:p>
+            <a:endParaRPr lang="en-US" dirty="0"/>
+          </a:p>
+          <a:p>
+            <a:endParaRPr lang="en-US" dirty="0"/>
+          </a:p>
+          <a:p>
+            <a:endParaRPr lang="en-US" dirty="0"/>
+          </a:p>
+          <a:p>
+            <a:endParaRPr lang="en-US" dirty="0"/>
+          </a:p>
+          <a:p>
+            <a:endParaRPr lang="en-US" dirty="0"/>
+          </a:p>
+          <a:p>
+            <a:endParaRPr lang="bg-BG" dirty="0"/>
+          </a:p>
+          <a:p>
+            <a:endParaRPr lang="bg-BG" dirty="0"/>
+          </a:p>
+          <a:p>
+            <a:endParaRPr lang="bg-BG" dirty="0"/>
+          </a:p>
+        </p:txBody>
+      </p:sp>
+      <p:sp>
+        <p:nvSpPr>
+          <p:cNvPr id="5" name="Текстово поле 4">
+            <a:extLst>
+              <a:ext uri="{FF2B5EF4-FFF2-40B4-BE49-F238E27FC236}">
+                <a16:creationId xmlns:a16="http://schemas.microsoft.com/office/drawing/2014/main" id="{DEBEF65F-B91D-55CC-4317-D9AA73D7DBF6}"/>
+              </a:ext>
+            </a:extLst>
+          </p:cNvPr>
+          <p:cNvSpPr txBox="1"/>
+          <p:nvPr/>
+        </p:nvSpPr>
+        <p:spPr>
+          <a:xfrm>
+            <a:off x="1342184" y="4698988"/>
+            <a:ext cx="6968973" cy="1723549"/>
+          </a:xfrm>
+          <a:prstGeom prst="rect">
+            <a:avLst/>
+          </a:prstGeom>
+          <a:noFill/>
+        </p:spPr>
+        <p:txBody>
+          <a:bodyPr wrap="square" rtlCol="0">
+            <a:spAutoFit/>
+          </a:bodyPr>
+          <a:lstStyle/>
+          <a:p>
+            <a:pPr marL="0" indent="0">
+              <a:buNone/>
+            </a:pPr>
+            <a:r>
+              <a:rPr lang="nn-NO" sz="2200" dirty="0">
+                <a:latin typeface="Consolas" panose="020B0609020204030204" pitchFamily="49" charset="0"/>
+              </a:rPr>
+              <a:t>for (int i = 0; i &lt; </a:t>
+            </a:r>
+            <a:r>
+              <a:rPr lang="nn-NO" sz="2200" dirty="0">
+                <a:solidFill>
+                  <a:schemeClr val="accent6">
+                    <a:lumMod val="60000"/>
+                    <a:lumOff val="40000"/>
+                  </a:schemeClr>
+                </a:solidFill>
+                <a:latin typeface="Consolas" panose="020B0609020204030204" pitchFamily="49" charset="0"/>
+              </a:rPr>
+              <a:t>myArray</a:t>
+            </a:r>
+            <a:r>
+              <a:rPr lang="nn-NO" sz="2200" dirty="0">
+                <a:solidFill>
+                  <a:schemeClr val="tx1"/>
+                </a:solidFill>
+                <a:latin typeface="Consolas" panose="020B0609020204030204" pitchFamily="49" charset="0"/>
+              </a:rPr>
+              <a:t>.</a:t>
+            </a:r>
+            <a:r>
+              <a:rPr lang="nn-NO" sz="2200" dirty="0">
+                <a:solidFill>
+                  <a:schemeClr val="tx2">
+                    <a:lumMod val="75000"/>
+                  </a:schemeClr>
+                </a:solidFill>
+                <a:latin typeface="Consolas" panose="020B0609020204030204" pitchFamily="49" charset="0"/>
+              </a:rPr>
+              <a:t>Length</a:t>
+            </a:r>
+            <a:r>
+              <a:rPr lang="nn-NO" sz="2200" dirty="0">
+                <a:latin typeface="Consolas" panose="020B0609020204030204" pitchFamily="49" charset="0"/>
+              </a:rPr>
+              <a:t>; i++)</a:t>
+            </a:r>
+          </a:p>
+          <a:p>
+            <a:pPr marL="0" indent="0">
+              <a:buNone/>
+            </a:pPr>
+            <a:r>
+              <a:rPr lang="bg-BG" sz="2200" dirty="0">
+                <a:solidFill>
+                  <a:schemeClr val="tx1"/>
+                </a:solidFill>
+                <a:latin typeface="Consolas" panose="020B0609020204030204" pitchFamily="49" charset="0"/>
+              </a:rPr>
+              <a:t>    {</a:t>
+            </a:r>
+            <a:endParaRPr lang="bg-BG" sz="2200" dirty="0">
+              <a:solidFill>
+                <a:schemeClr val="tx2">
+                  <a:lumMod val="60000"/>
+                  <a:lumOff val="40000"/>
+                </a:schemeClr>
+              </a:solidFill>
+              <a:latin typeface="Consolas" panose="020B0609020204030204" pitchFamily="49" charset="0"/>
+            </a:endParaRPr>
+          </a:p>
+          <a:p>
+            <a:pPr marL="0" indent="0">
+              <a:buNone/>
+            </a:pPr>
+            <a:r>
+              <a:rPr lang="en-US" sz="2200" dirty="0">
+                <a:solidFill>
+                  <a:schemeClr val="tx2">
+                    <a:lumMod val="60000"/>
+                    <a:lumOff val="40000"/>
+                  </a:schemeClr>
+                </a:solidFill>
+                <a:latin typeface="Consolas" panose="020B0609020204030204" pitchFamily="49" charset="0"/>
+              </a:rPr>
+              <a:t> 		 </a:t>
+            </a:r>
+            <a:r>
+              <a:rPr lang="nn-NO" sz="2200" dirty="0">
+                <a:solidFill>
+                  <a:schemeClr val="tx1"/>
+                </a:solidFill>
+                <a:latin typeface="Consolas" panose="020B0609020204030204" pitchFamily="49" charset="0"/>
+              </a:rPr>
+              <a:t>myArray</a:t>
+            </a:r>
+            <a:r>
+              <a:rPr lang="nn-NO" sz="2200" dirty="0">
+                <a:solidFill>
+                  <a:schemeClr val="accent6">
+                    <a:lumMod val="60000"/>
+                    <a:lumOff val="40000"/>
+                  </a:schemeClr>
+                </a:solidFill>
+                <a:latin typeface="Consolas" panose="020B0609020204030204" pitchFamily="49" charset="0"/>
+              </a:rPr>
+              <a:t>[i]</a:t>
+            </a:r>
+            <a:r>
+              <a:rPr lang="nn-NO" sz="2200" dirty="0">
+                <a:solidFill>
+                  <a:schemeClr val="tx1"/>
+                </a:solidFill>
+                <a:latin typeface="Consolas" panose="020B0609020204030204" pitchFamily="49" charset="0"/>
+              </a:rPr>
+              <a:t> = i;</a:t>
+            </a:r>
+            <a:endParaRPr lang="en-US" sz="2200" dirty="0">
+              <a:solidFill>
+                <a:schemeClr val="tx1"/>
+              </a:solidFill>
+              <a:latin typeface="Consolas" panose="020B0609020204030204" pitchFamily="49" charset="0"/>
+            </a:endParaRPr>
+          </a:p>
+          <a:p>
+            <a:pPr marL="0" indent="0">
+              <a:buNone/>
+            </a:pPr>
+            <a:r>
+              <a:rPr lang="bg-BG" sz="2200" dirty="0">
+                <a:solidFill>
+                  <a:schemeClr val="tx1"/>
+                </a:solidFill>
+                <a:latin typeface="Consolas" panose="020B0609020204030204" pitchFamily="49" charset="0"/>
+              </a:rPr>
+              <a:t>    }</a:t>
+            </a:r>
+          </a:p>
+          <a:p>
+            <a:endParaRPr lang="en-US" dirty="0"/>
+          </a:p>
+        </p:txBody>
+      </p:sp>
+      <p:cxnSp>
+        <p:nvCxnSpPr>
+          <p:cNvPr id="7" name="Съединител &quot;права стрелка&quot; 6">
+            <a:extLst>
+              <a:ext uri="{FF2B5EF4-FFF2-40B4-BE49-F238E27FC236}">
+                <a16:creationId xmlns:a16="http://schemas.microsoft.com/office/drawing/2014/main" id="{F8D4CC3D-6E1B-7E8E-47EF-A88923DAB1DC}"/>
+              </a:ext>
+            </a:extLst>
+          </p:cNvPr>
+          <p:cNvCxnSpPr>
+            <a:cxnSpLocks/>
+          </p:cNvCxnSpPr>
+          <p:nvPr/>
+        </p:nvCxnSpPr>
+        <p:spPr>
+          <a:xfrm flipH="1" flipV="1">
+            <a:off x="3888419" y="5770485"/>
+            <a:ext cx="1704513" cy="541538"/>
+          </a:xfrm>
+          <a:prstGeom prst="straightConnector1">
+            <a:avLst/>
+          </a:prstGeom>
+          <a:ln>
+            <a:solidFill>
+              <a:schemeClr val="tx1"/>
+            </a:solidFill>
+            <a:tailEnd type="triangle"/>
+          </a:ln>
+        </p:spPr>
+        <p:style>
+          <a:lnRef idx="1">
+            <a:schemeClr val="accent1"/>
+          </a:lnRef>
+          <a:fillRef idx="0">
+            <a:schemeClr val="accent1"/>
+          </a:fillRef>
+          <a:effectRef idx="0">
+            <a:schemeClr val="accent1"/>
+          </a:effectRef>
+          <a:fontRef idx="minor">
+            <a:schemeClr val="tx1"/>
+          </a:fontRef>
+        </p:style>
+      </p:cxnSp>
+      <p:sp>
+        <p:nvSpPr>
+          <p:cNvPr id="11" name="Текстово поле 10">
+            <a:extLst>
+              <a:ext uri="{FF2B5EF4-FFF2-40B4-BE49-F238E27FC236}">
+                <a16:creationId xmlns:a16="http://schemas.microsoft.com/office/drawing/2014/main" id="{9229470B-1B95-ED79-4E2F-ACEB68063A3B}"/>
+              </a:ext>
+            </a:extLst>
+          </p:cNvPr>
+          <p:cNvSpPr txBox="1"/>
+          <p:nvPr/>
+        </p:nvSpPr>
+        <p:spPr>
+          <a:xfrm>
+            <a:off x="4632727" y="6308209"/>
+            <a:ext cx="3028702" cy="369332"/>
+          </a:xfrm>
+          <a:prstGeom prst="rect">
+            <a:avLst/>
+          </a:prstGeom>
+          <a:noFill/>
+        </p:spPr>
+        <p:txBody>
+          <a:bodyPr wrap="square" rtlCol="0">
+            <a:spAutoFit/>
+          </a:bodyPr>
+          <a:lstStyle/>
+          <a:p>
+            <a:r>
+              <a:rPr lang="bg-BG" dirty="0"/>
+              <a:t>Достъпване по индекс  с </a:t>
+            </a:r>
+            <a:r>
+              <a:rPr lang="en-US" dirty="0"/>
+              <a:t>[</a:t>
+            </a:r>
+            <a:r>
+              <a:rPr lang="bg-BG" dirty="0"/>
+              <a:t> </a:t>
+            </a:r>
+            <a:r>
+              <a:rPr lang="en-US" dirty="0"/>
+              <a:t>]</a:t>
+            </a:r>
+          </a:p>
+        </p:txBody>
+      </p:sp>
+    </p:spTree>
+    <p:extLst>
+      <p:ext uri="{BB962C8B-B14F-4D97-AF65-F5344CB8AC3E}">
+        <p14:creationId xmlns:p14="http://schemas.microsoft.com/office/powerpoint/2010/main" val="4155584167"/>
+      </p:ext>
+    </p:extLst>
+  </p:cSld>
+  <p:clrMapOvr>
+    <a:masterClrMapping/>
+  </p:clrMapOvr>
+</p:sld>
+</file>
+
+<file path=ppt/slides/slide13.xml><?xml version="1.0" encoding="utf-8"?>
+<p:sld xmlns:a="http://schemas.openxmlformats.org/drawingml/2006/main" xmlns:r="http://schemas.openxmlformats.org/officeDocument/2006/relationships" xmlns:p="http://schemas.openxmlformats.org/presentationml/2006/main">
+  <p:cSld>
+    <p:spTree>
+      <p:nvGrpSpPr>
+        <p:cNvPr id="1" name=""/>
+        <p:cNvGrpSpPr/>
+        <p:nvPr/>
+      </p:nvGrpSpPr>
+      <p:grpSpPr>
+        <a:xfrm>
+          <a:off x="0" y="0"/>
+          <a:ext cx="0" cy="0"/>
+          <a:chOff x="0" y="0"/>
+          <a:chExt cx="0" cy="0"/>
+        </a:xfrm>
+      </p:grpSpPr>
+      <p:sp>
+        <p:nvSpPr>
+          <p:cNvPr id="2" name="Заглавие 1">
+            <a:extLst>
+              <a:ext uri="{FF2B5EF4-FFF2-40B4-BE49-F238E27FC236}">
+                <a16:creationId xmlns:a16="http://schemas.microsoft.com/office/drawing/2014/main" id="{5BE81EE3-E59E-A8BA-68F7-759A744BC9BD}"/>
+              </a:ext>
+            </a:extLst>
+          </p:cNvPr>
+          <p:cNvSpPr>
+            <a:spLocks noGrp="1"/>
+          </p:cNvSpPr>
+          <p:nvPr>
+            <p:ph type="title"/>
+          </p:nvPr>
+        </p:nvSpPr>
+        <p:spPr/>
+        <p:txBody>
+          <a:bodyPr>
+            <a:normAutofit fontScale="90000"/>
+          </a:bodyPr>
+          <a:lstStyle/>
+          <a:p>
+            <a:pPr algn="ctr"/>
+            <a:r>
+              <a:rPr lang="bg-BG" dirty="0">
+                <a:solidFill>
+                  <a:schemeClr val="tx1"/>
+                </a:solidFill>
+                <a:latin typeface="Arial" panose="020B0604020202020204" pitchFamily="34" charset="0"/>
+                <a:cs typeface="Arial" panose="020B0604020202020204" pitchFamily="34" charset="0"/>
+              </a:rPr>
+              <a:t>Четене на масиви от конзолата</a:t>
+            </a:r>
+            <a:br>
+              <a:rPr lang="en-US" dirty="0">
+                <a:solidFill>
+                  <a:schemeClr val="tx1"/>
+                </a:solidFill>
+                <a:latin typeface="Arial" panose="020B0604020202020204" pitchFamily="34" charset="0"/>
+                <a:cs typeface="Arial" panose="020B0604020202020204" pitchFamily="34" charset="0"/>
+              </a:rPr>
+            </a:br>
+            <a:r>
+              <a:rPr lang="en-US" dirty="0">
+                <a:solidFill>
+                  <a:schemeClr val="tx1"/>
+                </a:solidFill>
+                <a:latin typeface="Arial" panose="020B0604020202020204" pitchFamily="34" charset="0"/>
+                <a:cs typeface="Arial" panose="020B0604020202020204" pitchFamily="34" charset="0"/>
+              </a:rPr>
+              <a:t>/</a:t>
+            </a:r>
+            <a:r>
+              <a:rPr lang="bg-BG" dirty="0">
+                <a:solidFill>
+                  <a:schemeClr val="tx1"/>
+                </a:solidFill>
+                <a:latin typeface="Arial" panose="020B0604020202020204" pitchFamily="34" charset="0"/>
+                <a:cs typeface="Arial" panose="020B0604020202020204" pitchFamily="34" charset="0"/>
+              </a:rPr>
+              <a:t>начин 1</a:t>
+            </a:r>
+            <a:r>
+              <a:rPr lang="en-US" dirty="0">
+                <a:solidFill>
+                  <a:schemeClr val="tx1"/>
+                </a:solidFill>
+                <a:latin typeface="Arial" panose="020B0604020202020204" pitchFamily="34" charset="0"/>
+                <a:cs typeface="Arial" panose="020B0604020202020204" pitchFamily="34" charset="0"/>
+              </a:rPr>
+              <a:t>/</a:t>
+            </a:r>
+          </a:p>
+        </p:txBody>
+      </p:sp>
+      <p:sp>
+        <p:nvSpPr>
+          <p:cNvPr id="3" name="Контейнер за съдържание 2">
+            <a:extLst>
+              <a:ext uri="{FF2B5EF4-FFF2-40B4-BE49-F238E27FC236}">
+                <a16:creationId xmlns:a16="http://schemas.microsoft.com/office/drawing/2014/main" id="{5B59009E-A341-F70D-A62B-32040E5F6E0B}"/>
+              </a:ext>
+            </a:extLst>
+          </p:cNvPr>
+          <p:cNvSpPr>
+            <a:spLocks noGrp="1"/>
+          </p:cNvSpPr>
+          <p:nvPr>
+            <p:ph idx="1"/>
+          </p:nvPr>
+        </p:nvSpPr>
+        <p:spPr>
+          <a:xfrm>
+            <a:off x="1289818" y="2141537"/>
+            <a:ext cx="10233800" cy="4351338"/>
+          </a:xfrm>
+        </p:spPr>
+        <p:txBody>
+          <a:bodyPr/>
+          <a:lstStyle/>
+          <a:p>
+            <a:pPr marL="0" indent="0">
+              <a:buNone/>
+            </a:pPr>
+            <a:r>
+              <a:rPr lang="en-US" sz="2400" dirty="0">
+                <a:solidFill>
+                  <a:schemeClr val="tx1"/>
+                </a:solidFill>
+                <a:latin typeface="Consolas" panose="020B0609020204030204" pitchFamily="49" charset="0"/>
+              </a:rPr>
+              <a:t>int </a:t>
+            </a:r>
+            <a:r>
+              <a:rPr lang="en-US" sz="2400" dirty="0" err="1">
+                <a:solidFill>
+                  <a:schemeClr val="accent6">
+                    <a:lumMod val="40000"/>
+                    <a:lumOff val="60000"/>
+                  </a:schemeClr>
+                </a:solidFill>
+                <a:latin typeface="Consolas" panose="020B0609020204030204" pitchFamily="49" charset="0"/>
+              </a:rPr>
+              <a:t>arrayLength</a:t>
+            </a:r>
+            <a:r>
+              <a:rPr lang="en-US" sz="2400" dirty="0">
+                <a:solidFill>
+                  <a:schemeClr val="tx1"/>
+                </a:solidFill>
+                <a:latin typeface="Consolas" panose="020B0609020204030204" pitchFamily="49" charset="0"/>
+              </a:rPr>
+              <a:t> = </a:t>
+            </a:r>
+            <a:r>
+              <a:rPr lang="en-US" sz="2400" dirty="0" err="1">
+                <a:solidFill>
+                  <a:schemeClr val="tx1"/>
+                </a:solidFill>
+                <a:latin typeface="Consolas" panose="020B0609020204030204" pitchFamily="49" charset="0"/>
+              </a:rPr>
+              <a:t>int.Parse</a:t>
+            </a:r>
+            <a:r>
+              <a:rPr lang="en-US" sz="2400" dirty="0">
+                <a:solidFill>
+                  <a:schemeClr val="tx1"/>
+                </a:solidFill>
+                <a:latin typeface="Consolas" panose="020B0609020204030204" pitchFamily="49" charset="0"/>
+              </a:rPr>
+              <a:t>(</a:t>
+            </a:r>
+            <a:r>
+              <a:rPr lang="nn-NO" sz="2400" dirty="0">
+                <a:solidFill>
+                  <a:schemeClr val="tx1"/>
+                </a:solidFill>
+                <a:latin typeface="Consolas" panose="020B0609020204030204" pitchFamily="49" charset="0"/>
+              </a:rPr>
+              <a:t>Console.ReadLine()</a:t>
+            </a:r>
+            <a:r>
+              <a:rPr lang="en-US" sz="2400" dirty="0">
+                <a:solidFill>
+                  <a:schemeClr val="tx1"/>
+                </a:solidFill>
+                <a:latin typeface="Consolas" panose="020B0609020204030204" pitchFamily="49" charset="0"/>
+              </a:rPr>
+              <a:t>);</a:t>
+            </a:r>
+          </a:p>
+          <a:p>
+            <a:pPr marL="0" indent="0">
+              <a:buNone/>
+            </a:pPr>
+            <a:r>
+              <a:rPr lang="en-US" sz="2400" dirty="0">
+                <a:solidFill>
+                  <a:schemeClr val="tx1"/>
+                </a:solidFill>
+                <a:latin typeface="Consolas" panose="020B0609020204030204" pitchFamily="49" charset="0"/>
+              </a:rPr>
+              <a:t>string[] </a:t>
+            </a:r>
+            <a:r>
+              <a:rPr lang="en-US" sz="2400" dirty="0" err="1">
+                <a:solidFill>
+                  <a:srgbClr val="92D050"/>
+                </a:solidFill>
+                <a:latin typeface="Consolas" panose="020B0609020204030204" pitchFamily="49" charset="0"/>
+              </a:rPr>
+              <a:t>myArray</a:t>
+            </a:r>
+            <a:r>
+              <a:rPr lang="en-US" sz="2400" dirty="0">
+                <a:solidFill>
+                  <a:schemeClr val="tx1"/>
+                </a:solidFill>
+                <a:latin typeface="Consolas" panose="020B0609020204030204" pitchFamily="49" charset="0"/>
+              </a:rPr>
+              <a:t> = new string[</a:t>
+            </a:r>
+            <a:r>
+              <a:rPr lang="en-US" sz="2400" dirty="0" err="1">
+                <a:solidFill>
+                  <a:schemeClr val="accent6">
+                    <a:lumMod val="40000"/>
+                    <a:lumOff val="60000"/>
+                  </a:schemeClr>
+                </a:solidFill>
+                <a:latin typeface="Consolas" panose="020B0609020204030204" pitchFamily="49" charset="0"/>
+              </a:rPr>
+              <a:t>arrayLength</a:t>
+            </a:r>
+            <a:r>
+              <a:rPr lang="en-US" sz="2400" dirty="0">
+                <a:solidFill>
+                  <a:schemeClr val="tx1"/>
+                </a:solidFill>
+                <a:latin typeface="Consolas" panose="020B0609020204030204" pitchFamily="49" charset="0"/>
+              </a:rPr>
+              <a:t>];</a:t>
+            </a:r>
+            <a:endParaRPr lang="bg-BG" sz="2400" dirty="0">
+              <a:solidFill>
+                <a:schemeClr val="tx1"/>
+              </a:solidFill>
+              <a:latin typeface="Consolas" panose="020B0609020204030204" pitchFamily="49" charset="0"/>
+            </a:endParaRPr>
+          </a:p>
+          <a:p>
+            <a:pPr marL="0" indent="0">
+              <a:buNone/>
+            </a:pPr>
+            <a:endParaRPr lang="bg-BG" sz="2400" dirty="0">
+              <a:solidFill>
+                <a:schemeClr val="tx1"/>
+              </a:solidFill>
+              <a:latin typeface="Consolas" panose="020B0609020204030204" pitchFamily="49" charset="0"/>
+            </a:endParaRPr>
+          </a:p>
+          <a:p>
+            <a:pPr marL="0" indent="0">
+              <a:buNone/>
+            </a:pPr>
+            <a:r>
+              <a:rPr lang="nn-NO" sz="2400" dirty="0">
+                <a:solidFill>
+                  <a:schemeClr val="tx1"/>
+                </a:solidFill>
+                <a:latin typeface="Consolas" panose="020B0609020204030204" pitchFamily="49" charset="0"/>
+              </a:rPr>
+              <a:t>for (int i = 0; i &lt; </a:t>
+            </a:r>
+            <a:r>
+              <a:rPr lang="nn-NO" sz="2400" dirty="0">
+                <a:solidFill>
+                  <a:srgbClr val="92D050"/>
+                </a:solidFill>
+                <a:latin typeface="Consolas" panose="020B0609020204030204" pitchFamily="49" charset="0"/>
+              </a:rPr>
+              <a:t>myArray</a:t>
+            </a:r>
+            <a:r>
+              <a:rPr lang="nn-NO" sz="2400" dirty="0">
+                <a:solidFill>
+                  <a:schemeClr val="tx1"/>
+                </a:solidFill>
+                <a:latin typeface="Consolas" panose="020B0609020204030204" pitchFamily="49" charset="0"/>
+              </a:rPr>
+              <a:t>.</a:t>
+            </a:r>
+            <a:r>
+              <a:rPr lang="nn-NO" sz="2400" dirty="0">
+                <a:solidFill>
+                  <a:schemeClr val="tx2">
+                    <a:lumMod val="75000"/>
+                  </a:schemeClr>
+                </a:solidFill>
+                <a:latin typeface="Consolas" panose="020B0609020204030204" pitchFamily="49" charset="0"/>
+              </a:rPr>
+              <a:t>Length</a:t>
+            </a:r>
+            <a:r>
+              <a:rPr lang="nn-NO" sz="2400" dirty="0">
+                <a:solidFill>
+                  <a:schemeClr val="tx1"/>
+                </a:solidFill>
+                <a:latin typeface="Consolas" panose="020B0609020204030204" pitchFamily="49" charset="0"/>
+              </a:rPr>
+              <a:t>; i++)</a:t>
+            </a:r>
+          </a:p>
+          <a:p>
+            <a:pPr marL="0" indent="0">
+              <a:buNone/>
+            </a:pPr>
+            <a:r>
+              <a:rPr lang="bg-BG" sz="2400" dirty="0">
+                <a:solidFill>
+                  <a:schemeClr val="tx1"/>
+                </a:solidFill>
+                <a:latin typeface="Consolas" panose="020B0609020204030204" pitchFamily="49" charset="0"/>
+              </a:rPr>
+              <a:t>    {</a:t>
+            </a:r>
+            <a:endParaRPr lang="bg-BG" sz="2400" dirty="0">
+              <a:solidFill>
+                <a:schemeClr val="tx2">
+                  <a:lumMod val="60000"/>
+                  <a:lumOff val="40000"/>
+                </a:schemeClr>
+              </a:solidFill>
+              <a:latin typeface="Consolas" panose="020B0609020204030204" pitchFamily="49" charset="0"/>
+            </a:endParaRPr>
+          </a:p>
+          <a:p>
+            <a:pPr marL="0" indent="0">
+              <a:buNone/>
+            </a:pPr>
+            <a:r>
+              <a:rPr lang="en-US" sz="2400" dirty="0">
+                <a:solidFill>
+                  <a:schemeClr val="tx2">
+                    <a:lumMod val="60000"/>
+                    <a:lumOff val="40000"/>
+                  </a:schemeClr>
+                </a:solidFill>
+                <a:latin typeface="Consolas" panose="020B0609020204030204" pitchFamily="49" charset="0"/>
+              </a:rPr>
+              <a:t> 	 </a:t>
+            </a:r>
+            <a:r>
+              <a:rPr lang="nn-NO" sz="2400" dirty="0">
+                <a:solidFill>
+                  <a:schemeClr val="tx1"/>
+                </a:solidFill>
+                <a:latin typeface="Consolas" panose="020B0609020204030204" pitchFamily="49" charset="0"/>
+              </a:rPr>
+              <a:t>myArray</a:t>
+            </a:r>
+            <a:r>
+              <a:rPr lang="nn-NO" sz="2400" dirty="0">
+                <a:solidFill>
+                  <a:schemeClr val="accent6">
+                    <a:lumMod val="60000"/>
+                    <a:lumOff val="40000"/>
+                  </a:schemeClr>
+                </a:solidFill>
+                <a:latin typeface="Consolas" panose="020B0609020204030204" pitchFamily="49" charset="0"/>
+              </a:rPr>
+              <a:t>[i]</a:t>
+            </a:r>
+            <a:r>
+              <a:rPr lang="nn-NO" sz="2400" dirty="0">
+                <a:solidFill>
+                  <a:schemeClr val="tx1"/>
+                </a:solidFill>
+                <a:latin typeface="Consolas" panose="020B0609020204030204" pitchFamily="49" charset="0"/>
+              </a:rPr>
+              <a:t> = Console.ReadLine();</a:t>
+            </a:r>
+            <a:endParaRPr lang="en-US" sz="2400" dirty="0">
+              <a:solidFill>
+                <a:schemeClr val="tx1"/>
+              </a:solidFill>
+              <a:latin typeface="Consolas" panose="020B0609020204030204" pitchFamily="49" charset="0"/>
+            </a:endParaRPr>
+          </a:p>
+          <a:p>
+            <a:pPr marL="0" indent="0">
+              <a:buNone/>
+            </a:pPr>
+            <a:r>
+              <a:rPr lang="bg-BG" sz="2400" dirty="0">
+                <a:solidFill>
+                  <a:schemeClr val="tx1"/>
+                </a:solidFill>
+                <a:latin typeface="Consolas" panose="020B0609020204030204" pitchFamily="49" charset="0"/>
+              </a:rPr>
+              <a:t>    }</a:t>
+            </a:r>
+          </a:p>
+        </p:txBody>
+      </p:sp>
+    </p:spTree>
+    <p:extLst>
+      <p:ext uri="{BB962C8B-B14F-4D97-AF65-F5344CB8AC3E}">
+        <p14:creationId xmlns:p14="http://schemas.microsoft.com/office/powerpoint/2010/main" val="320994804"/>
+      </p:ext>
+    </p:extLst>
+  </p:cSld>
+  <p:clrMapOvr>
+    <a:masterClrMapping/>
+  </p:clrMapOvr>
+</p:sld>
+</file>
+
+<file path=ppt/slides/slide14.xml><?xml version="1.0" encoding="utf-8"?>
+<p:sld xmlns:a="http://schemas.openxmlformats.org/drawingml/2006/main" xmlns:r="http://schemas.openxmlformats.org/officeDocument/2006/relationships" xmlns:p="http://schemas.openxmlformats.org/presentationml/2006/main">
+  <p:cSld>
+    <p:spTree>
+      <p:nvGrpSpPr>
+        <p:cNvPr id="1" name=""/>
+        <p:cNvGrpSpPr/>
+        <p:nvPr/>
+      </p:nvGrpSpPr>
+      <p:grpSpPr>
+        <a:xfrm>
+          <a:off x="0" y="0"/>
+          <a:ext cx="0" cy="0"/>
+          <a:chOff x="0" y="0"/>
+          <a:chExt cx="0" cy="0"/>
+        </a:xfrm>
+      </p:grpSpPr>
+      <p:sp>
+        <p:nvSpPr>
+          <p:cNvPr id="2" name="Заглавие 1">
+            <a:extLst>
+              <a:ext uri="{FF2B5EF4-FFF2-40B4-BE49-F238E27FC236}">
+                <a16:creationId xmlns:a16="http://schemas.microsoft.com/office/drawing/2014/main" id="{5BE81EE3-E59E-A8BA-68F7-759A744BC9BD}"/>
+              </a:ext>
+            </a:extLst>
+          </p:cNvPr>
+          <p:cNvSpPr>
+            <a:spLocks noGrp="1"/>
+          </p:cNvSpPr>
+          <p:nvPr>
+            <p:ph type="title"/>
+          </p:nvPr>
+        </p:nvSpPr>
+        <p:spPr/>
+        <p:txBody>
+          <a:bodyPr>
+            <a:normAutofit fontScale="90000"/>
+          </a:bodyPr>
+          <a:lstStyle/>
+          <a:p>
+            <a:pPr algn="ctr"/>
+            <a:r>
+              <a:rPr lang="bg-BG" dirty="0">
+                <a:solidFill>
+                  <a:schemeClr val="tx1"/>
+                </a:solidFill>
+                <a:latin typeface="Arial" panose="020B0604020202020204" pitchFamily="34" charset="0"/>
+                <a:cs typeface="Arial" panose="020B0604020202020204" pitchFamily="34" charset="0"/>
+              </a:rPr>
+              <a:t>Четене на масиви от конзолата</a:t>
+            </a:r>
+            <a:br>
+              <a:rPr lang="en-US" dirty="0">
+                <a:solidFill>
+                  <a:schemeClr val="tx1"/>
+                </a:solidFill>
+                <a:latin typeface="Arial" panose="020B0604020202020204" pitchFamily="34" charset="0"/>
+                <a:cs typeface="Arial" panose="020B0604020202020204" pitchFamily="34" charset="0"/>
+              </a:rPr>
+            </a:br>
+            <a:r>
+              <a:rPr lang="en-US" dirty="0">
+                <a:solidFill>
+                  <a:schemeClr val="tx1"/>
+                </a:solidFill>
+                <a:latin typeface="Arial" panose="020B0604020202020204" pitchFamily="34" charset="0"/>
+                <a:cs typeface="Arial" panose="020B0604020202020204" pitchFamily="34" charset="0"/>
+              </a:rPr>
+              <a:t>/</a:t>
+            </a:r>
+            <a:r>
+              <a:rPr lang="bg-BG" dirty="0">
+                <a:solidFill>
+                  <a:schemeClr val="tx1"/>
+                </a:solidFill>
+                <a:latin typeface="Arial" panose="020B0604020202020204" pitchFamily="34" charset="0"/>
+                <a:cs typeface="Arial" panose="020B0604020202020204" pitchFamily="34" charset="0"/>
+              </a:rPr>
+              <a:t>начин 2</a:t>
+            </a:r>
+            <a:r>
+              <a:rPr lang="en-US" dirty="0">
+                <a:solidFill>
+                  <a:schemeClr val="tx1"/>
+                </a:solidFill>
+                <a:latin typeface="Arial" panose="020B0604020202020204" pitchFamily="34" charset="0"/>
+                <a:cs typeface="Arial" panose="020B0604020202020204" pitchFamily="34" charset="0"/>
+              </a:rPr>
+              <a:t>/</a:t>
+            </a:r>
+          </a:p>
+        </p:txBody>
+      </p:sp>
+      <p:sp>
+        <p:nvSpPr>
+          <p:cNvPr id="3" name="Контейнер за съдържание 2">
+            <a:extLst>
+              <a:ext uri="{FF2B5EF4-FFF2-40B4-BE49-F238E27FC236}">
+                <a16:creationId xmlns:a16="http://schemas.microsoft.com/office/drawing/2014/main" id="{5B59009E-A341-F70D-A62B-32040E5F6E0B}"/>
+              </a:ext>
+            </a:extLst>
+          </p:cNvPr>
+          <p:cNvSpPr>
+            <a:spLocks noGrp="1"/>
+          </p:cNvSpPr>
+          <p:nvPr>
+            <p:ph idx="1"/>
+          </p:nvPr>
+        </p:nvSpPr>
+        <p:spPr>
+          <a:xfrm>
+            <a:off x="1223084" y="2443379"/>
+            <a:ext cx="9745832" cy="2794447"/>
+          </a:xfrm>
+        </p:spPr>
+        <p:txBody>
+          <a:bodyPr/>
+          <a:lstStyle/>
+          <a:p>
+            <a:pPr marL="0" indent="0">
+              <a:buNone/>
+            </a:pPr>
+            <a:r>
+              <a:rPr lang="en-US" sz="2400" dirty="0">
+                <a:solidFill>
+                  <a:schemeClr val="tx1"/>
+                </a:solidFill>
+                <a:latin typeface="Consolas" panose="020B0609020204030204" pitchFamily="49" charset="0"/>
+              </a:rPr>
+              <a:t>string </a:t>
+            </a:r>
+            <a:r>
+              <a:rPr lang="en-US" sz="2400" dirty="0" err="1">
+                <a:solidFill>
+                  <a:schemeClr val="accent6">
+                    <a:lumMod val="40000"/>
+                    <a:lumOff val="60000"/>
+                  </a:schemeClr>
+                </a:solidFill>
+                <a:latin typeface="Consolas" panose="020B0609020204030204" pitchFamily="49" charset="0"/>
+              </a:rPr>
+              <a:t>elementsText</a:t>
+            </a:r>
+            <a:r>
+              <a:rPr lang="en-US" sz="2400" dirty="0">
+                <a:solidFill>
+                  <a:schemeClr val="tx1"/>
+                </a:solidFill>
+                <a:latin typeface="Consolas" panose="020B0609020204030204" pitchFamily="49" charset="0"/>
+              </a:rPr>
+              <a:t> = </a:t>
+            </a:r>
+            <a:r>
+              <a:rPr lang="nn-NO" sz="2400" dirty="0">
+                <a:solidFill>
+                  <a:schemeClr val="tx1"/>
+                </a:solidFill>
+                <a:latin typeface="Consolas" panose="020B0609020204030204" pitchFamily="49" charset="0"/>
+              </a:rPr>
+              <a:t>Console.ReadLine()</a:t>
+            </a:r>
+            <a:r>
+              <a:rPr lang="en-US" sz="2400" dirty="0">
+                <a:solidFill>
+                  <a:schemeClr val="tx1"/>
+                </a:solidFill>
+                <a:latin typeface="Consolas" panose="020B0609020204030204" pitchFamily="49" charset="0"/>
+              </a:rPr>
+              <a:t>;</a:t>
+            </a:r>
+          </a:p>
+          <a:p>
+            <a:pPr marL="0" indent="0">
+              <a:buNone/>
+            </a:pPr>
+            <a:r>
+              <a:rPr lang="en-US" sz="2400" dirty="0">
+                <a:solidFill>
+                  <a:schemeClr val="tx1"/>
+                </a:solidFill>
+                <a:latin typeface="Consolas" panose="020B0609020204030204" pitchFamily="49" charset="0"/>
+              </a:rPr>
+              <a:t>string[] </a:t>
+            </a:r>
+            <a:r>
+              <a:rPr lang="en-US" sz="2400" dirty="0" err="1">
+                <a:solidFill>
+                  <a:srgbClr val="92D050"/>
+                </a:solidFill>
+                <a:latin typeface="Consolas" panose="020B0609020204030204" pitchFamily="49" charset="0"/>
+              </a:rPr>
+              <a:t>arrayItems</a:t>
+            </a:r>
+            <a:r>
+              <a:rPr lang="en-US" sz="2400" dirty="0">
+                <a:solidFill>
+                  <a:schemeClr val="tx1"/>
+                </a:solidFill>
+                <a:latin typeface="Consolas" panose="020B0609020204030204" pitchFamily="49" charset="0"/>
+              </a:rPr>
+              <a:t> =</a:t>
+            </a:r>
+            <a:r>
+              <a:rPr lang="en-US" sz="2400" dirty="0">
+                <a:solidFill>
+                  <a:schemeClr val="accent6">
+                    <a:lumMod val="40000"/>
+                    <a:lumOff val="60000"/>
+                  </a:schemeClr>
+                </a:solidFill>
+                <a:latin typeface="Consolas" panose="020B0609020204030204" pitchFamily="49" charset="0"/>
+              </a:rPr>
+              <a:t> </a:t>
+            </a:r>
+            <a:r>
+              <a:rPr lang="en-US" sz="2400" dirty="0" err="1">
+                <a:solidFill>
+                  <a:schemeClr val="accent6">
+                    <a:lumMod val="40000"/>
+                    <a:lumOff val="60000"/>
+                  </a:schemeClr>
+                </a:solidFill>
+                <a:latin typeface="Consolas" panose="020B0609020204030204" pitchFamily="49" charset="0"/>
+              </a:rPr>
+              <a:t>elementsText</a:t>
+            </a:r>
+            <a:r>
+              <a:rPr lang="en-US" sz="2400" dirty="0" err="1">
+                <a:solidFill>
+                  <a:schemeClr val="tx1"/>
+                </a:solidFill>
+                <a:latin typeface="Consolas" panose="020B0609020204030204" pitchFamily="49" charset="0"/>
+              </a:rPr>
+              <a:t>.</a:t>
+            </a:r>
+            <a:r>
+              <a:rPr lang="en-US" sz="2400" dirty="0" err="1">
+                <a:solidFill>
+                  <a:schemeClr val="accent2"/>
+                </a:solidFill>
+                <a:latin typeface="Consolas" panose="020B0609020204030204" pitchFamily="49" charset="0"/>
+              </a:rPr>
+              <a:t>Split</a:t>
+            </a:r>
+            <a:r>
+              <a:rPr lang="en-US" sz="2400" dirty="0">
+                <a:solidFill>
+                  <a:schemeClr val="accent2"/>
+                </a:solidFill>
+                <a:latin typeface="Consolas" panose="020B0609020204030204" pitchFamily="49" charset="0"/>
+              </a:rPr>
+              <a:t>()</a:t>
+            </a:r>
+            <a:r>
+              <a:rPr lang="en-US" sz="2400" dirty="0">
+                <a:solidFill>
+                  <a:schemeClr val="tx1"/>
+                </a:solidFill>
+                <a:latin typeface="Consolas" panose="020B0609020204030204" pitchFamily="49" charset="0"/>
+              </a:rPr>
+              <a:t>.</a:t>
+            </a:r>
+            <a:r>
+              <a:rPr lang="en-US" sz="2400" dirty="0" err="1">
+                <a:solidFill>
+                  <a:schemeClr val="accent2"/>
+                </a:solidFill>
+                <a:latin typeface="Consolas" panose="020B0609020204030204" pitchFamily="49" charset="0"/>
+              </a:rPr>
+              <a:t>ToArray</a:t>
+            </a:r>
+            <a:r>
+              <a:rPr lang="en-US" sz="2400" dirty="0">
+                <a:solidFill>
+                  <a:schemeClr val="accent2"/>
+                </a:solidFill>
+                <a:latin typeface="Consolas" panose="020B0609020204030204" pitchFamily="49" charset="0"/>
+              </a:rPr>
+              <a:t>()</a:t>
+            </a:r>
+            <a:r>
+              <a:rPr lang="en-US" sz="2400" dirty="0">
+                <a:solidFill>
+                  <a:schemeClr val="tx1"/>
+                </a:solidFill>
+                <a:latin typeface="Consolas" panose="020B0609020204030204" pitchFamily="49" charset="0"/>
+              </a:rPr>
+              <a:t>;</a:t>
+            </a:r>
+          </a:p>
+          <a:p>
+            <a:pPr marL="0" indent="0">
+              <a:buNone/>
+            </a:pPr>
+            <a:endParaRPr lang="en-US" sz="2400" dirty="0">
+              <a:solidFill>
+                <a:schemeClr val="tx1"/>
+              </a:solidFill>
+              <a:latin typeface="Consolas" panose="020B0609020204030204" pitchFamily="49" charset="0"/>
+            </a:endParaRPr>
+          </a:p>
+          <a:p>
+            <a:pPr marL="0" indent="0">
+              <a:buNone/>
+            </a:pPr>
+            <a:r>
+              <a:rPr lang="en-US" sz="2400" dirty="0">
+                <a:solidFill>
+                  <a:schemeClr val="tx1"/>
+                </a:solidFill>
+                <a:latin typeface="Consolas" panose="020B0609020204030204" pitchFamily="49" charset="0"/>
+              </a:rPr>
+              <a:t>int[] </a:t>
+            </a:r>
+            <a:r>
+              <a:rPr lang="en-US" sz="2400" dirty="0" err="1">
+                <a:solidFill>
+                  <a:srgbClr val="92D050"/>
+                </a:solidFill>
+                <a:latin typeface="Consolas" panose="020B0609020204030204" pitchFamily="49" charset="0"/>
+              </a:rPr>
+              <a:t>arrayItems</a:t>
+            </a:r>
+            <a:r>
+              <a:rPr lang="en-US" sz="2400" dirty="0">
+                <a:solidFill>
+                  <a:schemeClr val="tx1"/>
+                </a:solidFill>
+                <a:latin typeface="Consolas" panose="020B0609020204030204" pitchFamily="49" charset="0"/>
+              </a:rPr>
+              <a:t> =</a:t>
+            </a:r>
+            <a:r>
+              <a:rPr lang="en-US" sz="2400" dirty="0">
+                <a:solidFill>
+                  <a:schemeClr val="accent6">
+                    <a:lumMod val="40000"/>
+                    <a:lumOff val="60000"/>
+                  </a:schemeClr>
+                </a:solidFill>
+                <a:latin typeface="Consolas" panose="020B0609020204030204" pitchFamily="49" charset="0"/>
+              </a:rPr>
+              <a:t>    </a:t>
+            </a:r>
+            <a:r>
+              <a:rPr lang="nn-NO" sz="2400" dirty="0">
+                <a:solidFill>
+                  <a:schemeClr val="tx1"/>
+                </a:solidFill>
+                <a:latin typeface="Consolas" panose="020B0609020204030204" pitchFamily="49" charset="0"/>
+              </a:rPr>
+              <a:t>Console.ReadLine()</a:t>
+            </a:r>
+            <a:r>
+              <a:rPr lang="en-US" sz="2400" dirty="0">
+                <a:solidFill>
+                  <a:schemeClr val="tx1"/>
+                </a:solidFill>
+                <a:latin typeface="Consolas" panose="020B0609020204030204" pitchFamily="49" charset="0"/>
+              </a:rPr>
+              <a:t>.</a:t>
+            </a:r>
+            <a:r>
+              <a:rPr lang="en-US" sz="2400" dirty="0">
+                <a:solidFill>
+                  <a:schemeClr val="accent2"/>
+                </a:solidFill>
+                <a:latin typeface="Consolas" panose="020B0609020204030204" pitchFamily="49" charset="0"/>
+              </a:rPr>
+              <a:t>Split()</a:t>
+            </a:r>
+            <a:r>
+              <a:rPr lang="en-US" sz="2400" dirty="0">
+                <a:solidFill>
+                  <a:schemeClr val="tx1"/>
+                </a:solidFill>
+                <a:latin typeface="Consolas" panose="020B0609020204030204" pitchFamily="49" charset="0"/>
+              </a:rPr>
+              <a:t>.</a:t>
+            </a:r>
+            <a:r>
+              <a:rPr lang="en-US" sz="2400" dirty="0">
+                <a:solidFill>
+                  <a:schemeClr val="accent2"/>
+                </a:solidFill>
+                <a:latin typeface="Consolas" panose="020B0609020204030204" pitchFamily="49" charset="0"/>
+              </a:rPr>
+              <a:t>Select</a:t>
+            </a:r>
+            <a:r>
+              <a:rPr lang="en-US" sz="2400" dirty="0">
+                <a:solidFill>
+                  <a:schemeClr val="tx1"/>
+                </a:solidFill>
+                <a:latin typeface="Consolas" panose="020B0609020204030204" pitchFamily="49" charset="0"/>
+              </a:rPr>
+              <a:t>(</a:t>
+            </a:r>
+            <a:r>
+              <a:rPr lang="en-US" sz="2400" dirty="0" err="1">
+                <a:solidFill>
+                  <a:srgbClr val="00B050"/>
+                </a:solidFill>
+                <a:latin typeface="Consolas" panose="020B0609020204030204" pitchFamily="49" charset="0"/>
+              </a:rPr>
+              <a:t>int</a:t>
+            </a:r>
+            <a:r>
+              <a:rPr lang="en-US" sz="2400" dirty="0" err="1">
+                <a:solidFill>
+                  <a:schemeClr val="tx1"/>
+                </a:solidFill>
+                <a:latin typeface="Consolas" panose="020B0609020204030204" pitchFamily="49" charset="0"/>
+              </a:rPr>
+              <a:t>.</a:t>
+            </a:r>
+            <a:r>
+              <a:rPr lang="en-US" sz="2400" dirty="0" err="1">
+                <a:solidFill>
+                  <a:schemeClr val="tx2"/>
+                </a:solidFill>
+                <a:latin typeface="Consolas" panose="020B0609020204030204" pitchFamily="49" charset="0"/>
+              </a:rPr>
+              <a:t>Parse</a:t>
+            </a:r>
+            <a:r>
+              <a:rPr lang="en-US" sz="2400" dirty="0">
+                <a:solidFill>
+                  <a:schemeClr val="tx1"/>
+                </a:solidFill>
+                <a:latin typeface="Consolas" panose="020B0609020204030204" pitchFamily="49" charset="0"/>
+              </a:rPr>
+              <a:t>).</a:t>
+            </a:r>
+            <a:r>
+              <a:rPr lang="en-US" sz="2400" dirty="0" err="1">
+                <a:solidFill>
+                  <a:schemeClr val="accent2"/>
+                </a:solidFill>
+                <a:latin typeface="Consolas" panose="020B0609020204030204" pitchFamily="49" charset="0"/>
+              </a:rPr>
+              <a:t>ToArray</a:t>
+            </a:r>
+            <a:r>
+              <a:rPr lang="en-US" sz="2400" dirty="0">
+                <a:solidFill>
+                  <a:schemeClr val="accent2"/>
+                </a:solidFill>
+                <a:latin typeface="Consolas" panose="020B0609020204030204" pitchFamily="49" charset="0"/>
+              </a:rPr>
+              <a:t>()</a:t>
+            </a:r>
+            <a:r>
+              <a:rPr lang="en-US" sz="2400" dirty="0">
+                <a:solidFill>
+                  <a:schemeClr val="tx1"/>
+                </a:solidFill>
+                <a:latin typeface="Consolas" panose="020B0609020204030204" pitchFamily="49" charset="0"/>
+              </a:rPr>
+              <a:t>;</a:t>
+            </a:r>
+            <a:endParaRPr lang="bg-BG" sz="2400" dirty="0">
+              <a:solidFill>
+                <a:schemeClr val="tx1"/>
+              </a:solidFill>
+              <a:latin typeface="Consolas" panose="020B0609020204030204" pitchFamily="49" charset="0"/>
+            </a:endParaRPr>
+          </a:p>
+          <a:p>
+            <a:pPr marL="0" indent="0">
+              <a:buNone/>
+            </a:pPr>
+            <a:endParaRPr lang="bg-BG" sz="2800" dirty="0">
+              <a:solidFill>
+                <a:schemeClr val="tx1"/>
+              </a:solidFill>
+              <a:latin typeface="Consolas" panose="020B0609020204030204" pitchFamily="49" charset="0"/>
+            </a:endParaRPr>
+          </a:p>
+          <a:p>
+            <a:pPr marL="0" indent="0">
+              <a:buNone/>
+            </a:pPr>
+            <a:endParaRPr lang="bg-BG" dirty="0">
+              <a:solidFill>
+                <a:schemeClr val="tx1"/>
+              </a:solidFill>
+              <a:latin typeface="Consolas" panose="020B0609020204030204" pitchFamily="49" charset="0"/>
+            </a:endParaRPr>
+          </a:p>
+          <a:p>
+            <a:endParaRPr lang="en-US" dirty="0"/>
+          </a:p>
+        </p:txBody>
+      </p:sp>
+    </p:spTree>
+    <p:extLst>
+      <p:ext uri="{BB962C8B-B14F-4D97-AF65-F5344CB8AC3E}">
+        <p14:creationId xmlns:p14="http://schemas.microsoft.com/office/powerpoint/2010/main" val="533465213"/>
+      </p:ext>
+    </p:extLst>
+  </p:cSld>
+  <p:clrMapOvr>
+    <a:masterClrMapping/>
+  </p:clrMapOvr>
+</p:sld>
+</file>
+
+<file path=ppt/slides/slide15.xml><?xml version="1.0" encoding="utf-8"?>
+<p:sld xmlns:a="http://schemas.openxmlformats.org/drawingml/2006/main" xmlns:r="http://schemas.openxmlformats.org/officeDocument/2006/relationships" xmlns:p="http://schemas.openxmlformats.org/presentationml/2006/main">
+  <p:cSld>
+    <p:spTree>
+      <p:nvGrpSpPr>
+        <p:cNvPr id="1" name=""/>
+        <p:cNvGrpSpPr/>
+        <p:nvPr/>
+      </p:nvGrpSpPr>
+      <p:grpSpPr>
+        <a:xfrm>
+          <a:off x="0" y="0"/>
+          <a:ext cx="0" cy="0"/>
+          <a:chOff x="0" y="0"/>
+          <a:chExt cx="0" cy="0"/>
+        </a:xfrm>
+      </p:grpSpPr>
+      <p:sp>
+        <p:nvSpPr>
+          <p:cNvPr id="2" name="Заглавие 1">
+            <a:extLst>
+              <a:ext uri="{FF2B5EF4-FFF2-40B4-BE49-F238E27FC236}">
+                <a16:creationId xmlns:a16="http://schemas.microsoft.com/office/drawing/2014/main" id="{5BE81EE3-E59E-A8BA-68F7-759A744BC9BD}"/>
+              </a:ext>
+            </a:extLst>
+          </p:cNvPr>
+          <p:cNvSpPr>
+            <a:spLocks noGrp="1"/>
+          </p:cNvSpPr>
+          <p:nvPr>
+            <p:ph type="title"/>
+          </p:nvPr>
+        </p:nvSpPr>
+        <p:spPr/>
+        <p:txBody>
+          <a:bodyPr>
+            <a:normAutofit/>
+          </a:bodyPr>
+          <a:lstStyle/>
+          <a:p>
+            <a:pPr algn="ctr"/>
+            <a:r>
+              <a:rPr lang="bg-BG" dirty="0">
+                <a:solidFill>
+                  <a:schemeClr val="tx1"/>
+                </a:solidFill>
+                <a:latin typeface="Arial" panose="020B0604020202020204" pitchFamily="34" charset="0"/>
+                <a:cs typeface="Arial" panose="020B0604020202020204" pitchFamily="34" charset="0"/>
+              </a:rPr>
+              <a:t>Принтиране на масив</a:t>
+            </a:r>
+            <a:endParaRPr lang="en-US" dirty="0">
+              <a:solidFill>
+                <a:schemeClr val="tx1"/>
+              </a:solidFill>
+              <a:latin typeface="Arial" panose="020B0604020202020204" pitchFamily="34" charset="0"/>
+              <a:cs typeface="Arial" panose="020B0604020202020204" pitchFamily="34" charset="0"/>
+            </a:endParaRPr>
+          </a:p>
+        </p:txBody>
+      </p:sp>
+      <p:sp>
+        <p:nvSpPr>
+          <p:cNvPr id="3" name="Контейнер за съдържание 2">
+            <a:extLst>
+              <a:ext uri="{FF2B5EF4-FFF2-40B4-BE49-F238E27FC236}">
+                <a16:creationId xmlns:a16="http://schemas.microsoft.com/office/drawing/2014/main" id="{5B59009E-A341-F70D-A62B-32040E5F6E0B}"/>
+              </a:ext>
+            </a:extLst>
+          </p:cNvPr>
+          <p:cNvSpPr>
+            <a:spLocks noGrp="1"/>
+          </p:cNvSpPr>
+          <p:nvPr>
+            <p:ph idx="1"/>
+          </p:nvPr>
+        </p:nvSpPr>
+        <p:spPr>
+          <a:xfrm>
+            <a:off x="1223084" y="2443380"/>
+            <a:ext cx="9359099" cy="1938992"/>
+          </a:xfrm>
+        </p:spPr>
+        <p:txBody>
+          <a:bodyPr/>
+          <a:lstStyle/>
+          <a:p>
+            <a:pPr marL="0" indent="0">
+              <a:buNone/>
+            </a:pPr>
+            <a:endParaRPr lang="bg-BG" sz="2800" dirty="0">
+              <a:solidFill>
+                <a:schemeClr val="tx1"/>
+              </a:solidFill>
+              <a:latin typeface="Consolas" panose="020B0609020204030204" pitchFamily="49" charset="0"/>
+            </a:endParaRPr>
+          </a:p>
+          <a:p>
+            <a:pPr marL="0" indent="0">
+              <a:buNone/>
+            </a:pPr>
+            <a:endParaRPr lang="bg-BG" dirty="0">
+              <a:solidFill>
+                <a:schemeClr val="tx1"/>
+              </a:solidFill>
+              <a:latin typeface="Consolas" panose="020B0609020204030204" pitchFamily="49" charset="0"/>
+            </a:endParaRPr>
+          </a:p>
+          <a:p>
+            <a:endParaRPr lang="en-US" dirty="0"/>
+          </a:p>
+        </p:txBody>
+      </p:sp>
+      <p:sp>
+        <p:nvSpPr>
+          <p:cNvPr id="5" name="Текстово поле 4">
+            <a:extLst>
+              <a:ext uri="{FF2B5EF4-FFF2-40B4-BE49-F238E27FC236}">
+                <a16:creationId xmlns:a16="http://schemas.microsoft.com/office/drawing/2014/main" id="{244B509F-CD00-470B-1C98-34FA4474D0A5}"/>
+              </a:ext>
+            </a:extLst>
+          </p:cNvPr>
+          <p:cNvSpPr txBox="1"/>
+          <p:nvPr/>
+        </p:nvSpPr>
+        <p:spPr>
+          <a:xfrm>
+            <a:off x="2147379" y="2339405"/>
+            <a:ext cx="7897242" cy="1938992"/>
+          </a:xfrm>
+          <a:prstGeom prst="rect">
+            <a:avLst/>
+          </a:prstGeom>
+          <a:noFill/>
+        </p:spPr>
+        <p:txBody>
+          <a:bodyPr wrap="square">
+            <a:spAutoFit/>
+          </a:bodyPr>
+          <a:lstStyle/>
+          <a:p>
+            <a:pPr marL="0" indent="0">
+              <a:buNone/>
+            </a:pPr>
+            <a:endParaRPr lang="bg-BG" sz="2400" dirty="0">
+              <a:solidFill>
+                <a:schemeClr val="tx1"/>
+              </a:solidFill>
+              <a:latin typeface="Consolas" panose="020B0609020204030204" pitchFamily="49" charset="0"/>
+            </a:endParaRPr>
+          </a:p>
+          <a:p>
+            <a:pPr marL="0" indent="0">
+              <a:buNone/>
+            </a:pPr>
+            <a:r>
+              <a:rPr lang="nn-NO" sz="2400" dirty="0">
+                <a:solidFill>
+                  <a:schemeClr val="tx1"/>
+                </a:solidFill>
+                <a:latin typeface="Consolas" panose="020B0609020204030204" pitchFamily="49" charset="0"/>
+              </a:rPr>
+              <a:t>for (int i = 0; i &lt; </a:t>
+            </a:r>
+            <a:r>
+              <a:rPr lang="nn-NO" sz="2400" dirty="0">
+                <a:solidFill>
+                  <a:srgbClr val="92D050"/>
+                </a:solidFill>
+                <a:latin typeface="Consolas" panose="020B0609020204030204" pitchFamily="49" charset="0"/>
+              </a:rPr>
+              <a:t>myArray</a:t>
+            </a:r>
+            <a:r>
+              <a:rPr lang="nn-NO" sz="2400" dirty="0">
+                <a:solidFill>
+                  <a:schemeClr val="tx1"/>
+                </a:solidFill>
+                <a:latin typeface="Consolas" panose="020B0609020204030204" pitchFamily="49" charset="0"/>
+              </a:rPr>
+              <a:t>.</a:t>
+            </a:r>
+            <a:r>
+              <a:rPr lang="nn-NO" sz="2400" dirty="0">
+                <a:solidFill>
+                  <a:schemeClr val="tx2">
+                    <a:lumMod val="75000"/>
+                  </a:schemeClr>
+                </a:solidFill>
+                <a:latin typeface="Consolas" panose="020B0609020204030204" pitchFamily="49" charset="0"/>
+              </a:rPr>
+              <a:t>Length</a:t>
+            </a:r>
+            <a:r>
+              <a:rPr lang="nn-NO" sz="2400" dirty="0">
+                <a:solidFill>
+                  <a:schemeClr val="tx1"/>
+                </a:solidFill>
+                <a:latin typeface="Consolas" panose="020B0609020204030204" pitchFamily="49" charset="0"/>
+              </a:rPr>
+              <a:t>; i++)</a:t>
+            </a:r>
+          </a:p>
+          <a:p>
+            <a:pPr marL="0" indent="0">
+              <a:buNone/>
+            </a:pPr>
+            <a:r>
+              <a:rPr lang="bg-BG" sz="2400" dirty="0">
+                <a:solidFill>
+                  <a:schemeClr val="tx1"/>
+                </a:solidFill>
+                <a:latin typeface="Consolas" panose="020B0609020204030204" pitchFamily="49" charset="0"/>
+              </a:rPr>
+              <a:t>    {</a:t>
+            </a:r>
+            <a:endParaRPr lang="bg-BG" sz="2400" dirty="0">
+              <a:solidFill>
+                <a:schemeClr val="tx2">
+                  <a:lumMod val="60000"/>
+                  <a:lumOff val="40000"/>
+                </a:schemeClr>
+              </a:solidFill>
+              <a:latin typeface="Consolas" panose="020B0609020204030204" pitchFamily="49" charset="0"/>
+            </a:endParaRPr>
+          </a:p>
+          <a:p>
+            <a:pPr marL="0" indent="0">
+              <a:buNone/>
+            </a:pPr>
+            <a:r>
+              <a:rPr lang="en-US" sz="2400" dirty="0">
+                <a:solidFill>
+                  <a:schemeClr val="tx2">
+                    <a:lumMod val="60000"/>
+                    <a:lumOff val="40000"/>
+                  </a:schemeClr>
+                </a:solidFill>
+                <a:latin typeface="Consolas" panose="020B0609020204030204" pitchFamily="49" charset="0"/>
+              </a:rPr>
+              <a:t> 		</a:t>
+            </a:r>
+            <a:r>
+              <a:rPr lang="en-US" sz="2400" dirty="0" err="1">
+                <a:latin typeface="Consolas" panose="020B0609020204030204" pitchFamily="49" charset="0"/>
+              </a:rPr>
+              <a:t>Console.WriteLine</a:t>
+            </a:r>
+            <a:r>
+              <a:rPr lang="en-US" sz="2400" dirty="0">
+                <a:solidFill>
+                  <a:schemeClr val="tx2">
+                    <a:lumMod val="60000"/>
+                    <a:lumOff val="40000"/>
+                  </a:schemeClr>
+                </a:solidFill>
+                <a:latin typeface="Consolas" panose="020B0609020204030204" pitchFamily="49" charset="0"/>
+              </a:rPr>
+              <a:t>(</a:t>
+            </a:r>
+            <a:r>
+              <a:rPr lang="nn-NO" sz="2400" dirty="0">
+                <a:solidFill>
+                  <a:srgbClr val="92D050"/>
+                </a:solidFill>
+                <a:latin typeface="Consolas" panose="020B0609020204030204" pitchFamily="49" charset="0"/>
+              </a:rPr>
+              <a:t>myArray</a:t>
+            </a:r>
+            <a:r>
+              <a:rPr lang="nn-NO" sz="2400" dirty="0">
+                <a:solidFill>
+                  <a:schemeClr val="accent6">
+                    <a:lumMod val="60000"/>
+                    <a:lumOff val="40000"/>
+                  </a:schemeClr>
+                </a:solidFill>
+                <a:latin typeface="Consolas" panose="020B0609020204030204" pitchFamily="49" charset="0"/>
+              </a:rPr>
+              <a:t>[i]</a:t>
+            </a:r>
+            <a:r>
+              <a:rPr lang="nn-NO" sz="2400" dirty="0">
+                <a:latin typeface="Consolas" panose="020B0609020204030204" pitchFamily="49" charset="0"/>
+              </a:rPr>
+              <a:t>);</a:t>
+            </a:r>
+            <a:endParaRPr lang="en-US" sz="2400" dirty="0">
+              <a:latin typeface="Consolas" panose="020B0609020204030204" pitchFamily="49" charset="0"/>
+            </a:endParaRPr>
+          </a:p>
+          <a:p>
+            <a:pPr marL="0" indent="0">
+              <a:buNone/>
+            </a:pPr>
+            <a:r>
+              <a:rPr lang="bg-BG" sz="2400" dirty="0">
+                <a:solidFill>
+                  <a:schemeClr val="tx1"/>
+                </a:solidFill>
+                <a:latin typeface="Consolas" panose="020B0609020204030204" pitchFamily="49" charset="0"/>
+              </a:rPr>
+              <a:t>    }</a:t>
+            </a:r>
+          </a:p>
+        </p:txBody>
+      </p:sp>
+      <p:sp>
+        <p:nvSpPr>
+          <p:cNvPr id="6" name="Текстово поле 5">
+            <a:extLst>
+              <a:ext uri="{FF2B5EF4-FFF2-40B4-BE49-F238E27FC236}">
+                <a16:creationId xmlns:a16="http://schemas.microsoft.com/office/drawing/2014/main" id="{E6D827FB-9B63-6B7D-8160-EBF3DE0E1DA0}"/>
+              </a:ext>
+            </a:extLst>
+          </p:cNvPr>
+          <p:cNvSpPr txBox="1"/>
+          <p:nvPr/>
+        </p:nvSpPr>
+        <p:spPr>
+          <a:xfrm>
+            <a:off x="1761663" y="2186877"/>
+            <a:ext cx="2242166" cy="369332"/>
+          </a:xfrm>
+          <a:prstGeom prst="rect">
+            <a:avLst/>
+          </a:prstGeom>
+          <a:noFill/>
+        </p:spPr>
+        <p:txBody>
+          <a:bodyPr wrap="square" rtlCol="0">
+            <a:spAutoFit/>
+          </a:bodyPr>
+          <a:lstStyle/>
+          <a:p>
+            <a:r>
+              <a:rPr lang="bg-BG" dirty="0">
+                <a:latin typeface="Arial" panose="020B0604020202020204" pitchFamily="34" charset="0"/>
+                <a:cs typeface="Arial" panose="020B0604020202020204" pitchFamily="34" charset="0"/>
+              </a:rPr>
+              <a:t> С  </a:t>
+            </a:r>
+            <a:r>
+              <a:rPr lang="en-US" dirty="0">
+                <a:solidFill>
+                  <a:schemeClr val="accent6">
+                    <a:lumMod val="60000"/>
+                    <a:lumOff val="40000"/>
+                  </a:schemeClr>
+                </a:solidFill>
+                <a:latin typeface="Arial" panose="020B0604020202020204" pitchFamily="34" charset="0"/>
+                <a:cs typeface="Arial" panose="020B0604020202020204" pitchFamily="34" charset="0"/>
+              </a:rPr>
+              <a:t>for-</a:t>
+            </a:r>
+            <a:r>
+              <a:rPr lang="bg-BG" dirty="0">
+                <a:solidFill>
+                  <a:schemeClr val="accent6">
+                    <a:lumMod val="60000"/>
+                    <a:lumOff val="40000"/>
+                  </a:schemeClr>
+                </a:solidFill>
+                <a:latin typeface="Arial" panose="020B0604020202020204" pitchFamily="34" charset="0"/>
+                <a:cs typeface="Arial" panose="020B0604020202020204" pitchFamily="34" charset="0"/>
+              </a:rPr>
+              <a:t>цикъл</a:t>
+            </a:r>
+            <a:endParaRPr lang="en-US" dirty="0">
+              <a:solidFill>
+                <a:schemeClr val="accent6">
+                  <a:lumMod val="60000"/>
+                  <a:lumOff val="40000"/>
+                </a:schemeClr>
+              </a:solidFill>
+              <a:latin typeface="Arial" panose="020B0604020202020204" pitchFamily="34" charset="0"/>
+              <a:cs typeface="Arial" panose="020B0604020202020204" pitchFamily="34" charset="0"/>
+            </a:endParaRPr>
+          </a:p>
+        </p:txBody>
+      </p:sp>
+      <p:sp>
+        <p:nvSpPr>
+          <p:cNvPr id="7" name="Текстово поле 6">
+            <a:extLst>
+              <a:ext uri="{FF2B5EF4-FFF2-40B4-BE49-F238E27FC236}">
+                <a16:creationId xmlns:a16="http://schemas.microsoft.com/office/drawing/2014/main" id="{ED07C795-261F-4E73-6872-1F2A611E3A7E}"/>
+              </a:ext>
+            </a:extLst>
+          </p:cNvPr>
+          <p:cNvSpPr txBox="1"/>
+          <p:nvPr/>
+        </p:nvSpPr>
+        <p:spPr>
+          <a:xfrm>
+            <a:off x="1761663" y="4639446"/>
+            <a:ext cx="2357576" cy="369332"/>
+          </a:xfrm>
+          <a:prstGeom prst="rect">
+            <a:avLst/>
+          </a:prstGeom>
+          <a:noFill/>
+        </p:spPr>
+        <p:txBody>
+          <a:bodyPr wrap="square" rtlCol="0">
+            <a:spAutoFit/>
+          </a:bodyPr>
+          <a:lstStyle/>
+          <a:p>
+            <a:r>
+              <a:rPr lang="bg-BG" dirty="0">
+                <a:latin typeface="Arial" panose="020B0604020202020204" pitchFamily="34" charset="0"/>
+                <a:cs typeface="Arial" panose="020B0604020202020204" pitchFamily="34" charset="0"/>
+              </a:rPr>
+              <a:t> Със  </a:t>
+            </a:r>
+            <a:r>
+              <a:rPr lang="en-US" dirty="0" err="1">
+                <a:solidFill>
+                  <a:schemeClr val="accent6">
+                    <a:lumMod val="60000"/>
+                    <a:lumOff val="40000"/>
+                  </a:schemeClr>
+                </a:solidFill>
+                <a:latin typeface="Arial" panose="020B0604020202020204" pitchFamily="34" charset="0"/>
+                <a:cs typeface="Arial" panose="020B0604020202020204" pitchFamily="34" charset="0"/>
+              </a:rPr>
+              <a:t>string.Join</a:t>
+            </a:r>
+            <a:endParaRPr lang="en-US" dirty="0">
+              <a:solidFill>
+                <a:schemeClr val="accent6">
+                  <a:lumMod val="60000"/>
+                  <a:lumOff val="40000"/>
+                </a:schemeClr>
+              </a:solidFill>
+              <a:latin typeface="Arial" panose="020B0604020202020204" pitchFamily="34" charset="0"/>
+              <a:cs typeface="Arial" panose="020B0604020202020204" pitchFamily="34" charset="0"/>
+            </a:endParaRPr>
+          </a:p>
+        </p:txBody>
+      </p:sp>
+      <p:sp>
+        <p:nvSpPr>
+          <p:cNvPr id="8" name="Текстово поле 7">
+            <a:extLst>
+              <a:ext uri="{FF2B5EF4-FFF2-40B4-BE49-F238E27FC236}">
+                <a16:creationId xmlns:a16="http://schemas.microsoft.com/office/drawing/2014/main" id="{1BFC2047-E17C-F824-FEB2-38777CADFD6C}"/>
+              </a:ext>
+            </a:extLst>
+          </p:cNvPr>
+          <p:cNvSpPr txBox="1"/>
+          <p:nvPr/>
+        </p:nvSpPr>
+        <p:spPr>
+          <a:xfrm>
+            <a:off x="2147379" y="4824112"/>
+            <a:ext cx="7897242" cy="830997"/>
+          </a:xfrm>
+          <a:prstGeom prst="rect">
+            <a:avLst/>
+          </a:prstGeom>
+          <a:noFill/>
+        </p:spPr>
+        <p:txBody>
+          <a:bodyPr wrap="square">
+            <a:spAutoFit/>
+          </a:bodyPr>
+          <a:lstStyle/>
+          <a:p>
+            <a:pPr marL="0" indent="0">
+              <a:buNone/>
+            </a:pPr>
+            <a:endParaRPr lang="bg-BG" sz="2400" dirty="0">
+              <a:solidFill>
+                <a:schemeClr val="tx1"/>
+              </a:solidFill>
+              <a:latin typeface="Consolas" panose="020B0609020204030204" pitchFamily="49" charset="0"/>
+            </a:endParaRPr>
+          </a:p>
+          <a:p>
+            <a:pPr marL="0" indent="0">
+              <a:buNone/>
+            </a:pPr>
+            <a:r>
+              <a:rPr lang="en-US" sz="2400" dirty="0" err="1">
+                <a:latin typeface="Consolas" panose="020B0609020204030204" pitchFamily="49" charset="0"/>
+              </a:rPr>
+              <a:t>Console.WriteLine</a:t>
+            </a:r>
+            <a:r>
+              <a:rPr lang="en-US" sz="2400" dirty="0">
+                <a:latin typeface="Consolas" panose="020B0609020204030204" pitchFamily="49" charset="0"/>
+              </a:rPr>
+              <a:t>(</a:t>
+            </a:r>
+            <a:r>
+              <a:rPr lang="en-US" sz="2400" dirty="0" err="1">
+                <a:latin typeface="Consolas" panose="020B0609020204030204" pitchFamily="49" charset="0"/>
+              </a:rPr>
+              <a:t>string.Join</a:t>
+            </a:r>
+            <a:r>
+              <a:rPr lang="en-US" sz="2400" dirty="0">
+                <a:latin typeface="Consolas" panose="020B0609020204030204" pitchFamily="49" charset="0"/>
+              </a:rPr>
+              <a:t>(‘,’ </a:t>
+            </a:r>
+            <a:r>
+              <a:rPr lang="nn-NO" sz="2400" dirty="0">
+                <a:solidFill>
+                  <a:srgbClr val="92D050"/>
+                </a:solidFill>
+                <a:latin typeface="Consolas" panose="020B0609020204030204" pitchFamily="49" charset="0"/>
+              </a:rPr>
+              <a:t>myArray</a:t>
+            </a:r>
+            <a:r>
+              <a:rPr lang="en-US" sz="2400" dirty="0">
+                <a:latin typeface="Consolas" panose="020B0609020204030204" pitchFamily="49" charset="0"/>
+              </a:rPr>
+              <a:t>))</a:t>
+            </a:r>
+            <a:endParaRPr lang="bg-BG" sz="2400" dirty="0">
+              <a:solidFill>
+                <a:schemeClr val="tx1"/>
+              </a:solidFill>
+              <a:latin typeface="Consolas" panose="020B0609020204030204" pitchFamily="49" charset="0"/>
+            </a:endParaRPr>
+          </a:p>
+        </p:txBody>
+      </p:sp>
+    </p:spTree>
+    <p:extLst>
+      <p:ext uri="{BB962C8B-B14F-4D97-AF65-F5344CB8AC3E}">
+        <p14:creationId xmlns:p14="http://schemas.microsoft.com/office/powerpoint/2010/main" val="2287789645"/>
+      </p:ext>
+    </p:extLst>
+  </p:cSld>
+  <p:clrMapOvr>
+    <a:masterClrMapping/>
+  </p:clrMapOvr>
+</p:sld>
+</file>
+
+<file path=ppt/slides/slide16.xml><?xml version="1.0" encoding="utf-8"?>
+<p:sld xmlns:a="http://schemas.openxmlformats.org/drawingml/2006/main" xmlns:r="http://schemas.openxmlformats.org/officeDocument/2006/relationships" xmlns:p="http://schemas.openxmlformats.org/presentationml/2006/main">
+  <p:cSld>
+    <p:spTree>
+      <p:nvGrpSpPr>
+        <p:cNvPr id="1" name=""/>
+        <p:cNvGrpSpPr/>
+        <p:nvPr/>
+      </p:nvGrpSpPr>
+      <p:grpSpPr>
+        <a:xfrm>
+          <a:off x="0" y="0"/>
+          <a:ext cx="0" cy="0"/>
+          <a:chOff x="0" y="0"/>
+          <a:chExt cx="0" cy="0"/>
+        </a:xfrm>
+      </p:grpSpPr>
+      <p:sp>
+        <p:nvSpPr>
+          <p:cNvPr id="2" name="Заглавие 1">
+            <a:extLst>
+              <a:ext uri="{FF2B5EF4-FFF2-40B4-BE49-F238E27FC236}">
+                <a16:creationId xmlns:a16="http://schemas.microsoft.com/office/drawing/2014/main" id="{1BFF8B52-2127-C7BA-6000-4E50277E566C}"/>
+              </a:ext>
+            </a:extLst>
+          </p:cNvPr>
+          <p:cNvSpPr>
+            <a:spLocks noGrp="1"/>
+          </p:cNvSpPr>
+          <p:nvPr>
+            <p:ph type="title"/>
+          </p:nvPr>
+        </p:nvSpPr>
+        <p:spPr/>
+        <p:txBody>
+          <a:bodyPr/>
+          <a:lstStyle/>
+          <a:p>
+            <a:pPr algn="ctr"/>
+            <a:r>
+              <a:rPr lang="bg-BG" dirty="0">
+                <a:solidFill>
+                  <a:srgbClr val="FF0000"/>
+                </a:solidFill>
+                <a:latin typeface="Arial" panose="020B0604020202020204" pitchFamily="34" charset="0"/>
+                <a:cs typeface="Arial" panose="020B0604020202020204" pitchFamily="34" charset="0"/>
+              </a:rPr>
+              <a:t>Често допускана грешка!</a:t>
+            </a:r>
+            <a:endParaRPr lang="en-US" dirty="0">
+              <a:solidFill>
+                <a:srgbClr val="FF0000"/>
+              </a:solidFill>
+              <a:latin typeface="Arial" panose="020B0604020202020204" pitchFamily="34" charset="0"/>
+              <a:cs typeface="Arial" panose="020B0604020202020204" pitchFamily="34" charset="0"/>
+            </a:endParaRPr>
+          </a:p>
+        </p:txBody>
+      </p:sp>
+      <p:sp>
+        <p:nvSpPr>
+          <p:cNvPr id="3" name="Контейнер за съдържание 2">
+            <a:extLst>
+              <a:ext uri="{FF2B5EF4-FFF2-40B4-BE49-F238E27FC236}">
+                <a16:creationId xmlns:a16="http://schemas.microsoft.com/office/drawing/2014/main" id="{FE74A821-5E69-E734-91BD-DDE056DD4A68}"/>
+              </a:ext>
+            </a:extLst>
+          </p:cNvPr>
+          <p:cNvSpPr>
+            <a:spLocks noGrp="1"/>
+          </p:cNvSpPr>
+          <p:nvPr>
+            <p:ph idx="1"/>
+          </p:nvPr>
+        </p:nvSpPr>
+        <p:spPr>
+          <a:xfrm>
+            <a:off x="1215369" y="4000654"/>
+            <a:ext cx="10233800" cy="1603375"/>
+          </a:xfrm>
+        </p:spPr>
+        <p:txBody>
+          <a:bodyPr>
+            <a:normAutofit/>
+          </a:bodyPr>
+          <a:lstStyle/>
+          <a:p>
+            <a:r>
+              <a:rPr lang="en-US" sz="2400" dirty="0">
+                <a:solidFill>
+                  <a:schemeClr val="tx1"/>
+                </a:solidFill>
+                <a:latin typeface="Consolas" panose="020B0609020204030204" pitchFamily="49" charset="0"/>
+              </a:rPr>
+              <a:t>double[] </a:t>
+            </a:r>
+            <a:r>
+              <a:rPr lang="en-US" sz="2400" dirty="0" err="1">
+                <a:solidFill>
+                  <a:schemeClr val="accent6"/>
+                </a:solidFill>
+                <a:latin typeface="Consolas" panose="020B0609020204030204" pitchFamily="49" charset="0"/>
+              </a:rPr>
+              <a:t>myArray</a:t>
+            </a:r>
+            <a:r>
+              <a:rPr lang="en-US" sz="2400" dirty="0">
+                <a:latin typeface="Consolas" panose="020B0609020204030204" pitchFamily="49" charset="0"/>
+              </a:rPr>
+              <a:t> = </a:t>
+            </a:r>
+            <a:r>
+              <a:rPr lang="en-US" sz="2400" dirty="0">
+                <a:solidFill>
+                  <a:schemeClr val="accent2">
+                    <a:lumMod val="75000"/>
+                  </a:schemeClr>
+                </a:solidFill>
+                <a:latin typeface="Consolas" panose="020B0609020204030204" pitchFamily="49" charset="0"/>
+              </a:rPr>
+              <a:t>new</a:t>
+            </a:r>
+            <a:r>
+              <a:rPr lang="en-US" sz="2400" dirty="0">
+                <a:latin typeface="Consolas" panose="020B0609020204030204" pitchFamily="49" charset="0"/>
+              </a:rPr>
+              <a:t> </a:t>
+            </a:r>
+            <a:r>
+              <a:rPr lang="en-US" sz="2400" dirty="0">
+                <a:solidFill>
+                  <a:schemeClr val="tx1"/>
+                </a:solidFill>
+                <a:latin typeface="Consolas" panose="020B0609020204030204" pitchFamily="49" charset="0"/>
+              </a:rPr>
+              <a:t>double[</a:t>
+            </a:r>
+            <a:r>
+              <a:rPr lang="bg-BG" sz="2400" dirty="0">
+                <a:solidFill>
+                  <a:schemeClr val="tx1"/>
+                </a:solidFill>
+                <a:latin typeface="Consolas" panose="020B0609020204030204" pitchFamily="49" charset="0"/>
+              </a:rPr>
+              <a:t>2</a:t>
+            </a:r>
+            <a:r>
+              <a:rPr lang="en-US" sz="2400" dirty="0">
+                <a:solidFill>
+                  <a:schemeClr val="tx1"/>
+                </a:solidFill>
+                <a:latin typeface="Consolas" panose="020B0609020204030204" pitchFamily="49" charset="0"/>
+              </a:rPr>
+              <a:t>]</a:t>
+            </a:r>
+            <a:r>
+              <a:rPr lang="bg-BG" sz="2400" dirty="0">
+                <a:solidFill>
+                  <a:schemeClr val="accent6">
+                    <a:lumMod val="60000"/>
+                    <a:lumOff val="40000"/>
+                  </a:schemeClr>
+                </a:solidFill>
+                <a:latin typeface="Consolas" panose="020B0609020204030204" pitchFamily="49" charset="0"/>
+              </a:rPr>
+              <a:t> </a:t>
+            </a:r>
+            <a:r>
+              <a:rPr lang="en-US" sz="2400" dirty="0">
+                <a:latin typeface="Consolas" panose="020B0609020204030204" pitchFamily="49" charset="0"/>
+              </a:rPr>
+              <a:t>{</a:t>
+            </a:r>
+            <a:r>
+              <a:rPr lang="en-US" sz="2400" dirty="0">
+                <a:solidFill>
+                  <a:srgbClr val="00B0F0"/>
+                </a:solidFill>
+                <a:latin typeface="Consolas" panose="020B0609020204030204" pitchFamily="49" charset="0"/>
+              </a:rPr>
+              <a:t>2.5</a:t>
+            </a:r>
+            <a:r>
+              <a:rPr lang="en-US" sz="2400" dirty="0">
+                <a:solidFill>
+                  <a:schemeClr val="tx1"/>
+                </a:solidFill>
+                <a:latin typeface="Consolas" panose="020B0609020204030204" pitchFamily="49" charset="0"/>
+              </a:rPr>
+              <a:t>,</a:t>
+            </a:r>
+            <a:r>
+              <a:rPr lang="en-US" sz="2400" dirty="0">
+                <a:solidFill>
+                  <a:schemeClr val="accent6">
+                    <a:lumMod val="60000"/>
+                    <a:lumOff val="40000"/>
+                  </a:schemeClr>
+                </a:solidFill>
+                <a:latin typeface="Consolas" panose="020B0609020204030204" pitchFamily="49" charset="0"/>
+              </a:rPr>
+              <a:t> </a:t>
+            </a:r>
+            <a:r>
+              <a:rPr lang="en-US" sz="2400" dirty="0">
+                <a:solidFill>
+                  <a:srgbClr val="00B0F0"/>
+                </a:solidFill>
+                <a:latin typeface="Consolas" panose="020B0609020204030204" pitchFamily="49" charset="0"/>
+              </a:rPr>
+              <a:t>5.8</a:t>
+            </a:r>
+            <a:r>
+              <a:rPr lang="en-US" sz="2400" dirty="0">
+                <a:latin typeface="Consolas" panose="020B0609020204030204" pitchFamily="49" charset="0"/>
+              </a:rPr>
+              <a:t>};</a:t>
+            </a:r>
+            <a:endParaRPr lang="bg-BG" sz="2400" dirty="0">
+              <a:latin typeface="Consolas" panose="020B0609020204030204" pitchFamily="49" charset="0"/>
+            </a:endParaRPr>
+          </a:p>
+          <a:p>
+            <a:endParaRPr lang="bg-BG" sz="2400" dirty="0">
+              <a:latin typeface="Consolas" panose="020B0609020204030204" pitchFamily="49" charset="0"/>
+            </a:endParaRPr>
+          </a:p>
+          <a:p>
+            <a:r>
+              <a:rPr lang="en-US" sz="2400" dirty="0" err="1">
+                <a:solidFill>
+                  <a:schemeClr val="tx1"/>
+                </a:solidFill>
+              </a:rPr>
+              <a:t>Console.WriteLine</a:t>
+            </a:r>
+            <a:r>
+              <a:rPr lang="en-US" sz="2400" dirty="0"/>
+              <a:t>(</a:t>
+            </a:r>
+            <a:r>
+              <a:rPr lang="en-US" sz="2400" dirty="0" err="1">
+                <a:solidFill>
+                  <a:schemeClr val="accent6"/>
+                </a:solidFill>
+                <a:latin typeface="Consolas" panose="020B0609020204030204" pitchFamily="49" charset="0"/>
+              </a:rPr>
+              <a:t>myArray</a:t>
+            </a:r>
+            <a:r>
+              <a:rPr lang="en-US" sz="2400" dirty="0">
+                <a:solidFill>
+                  <a:schemeClr val="accent2">
+                    <a:lumMod val="75000"/>
+                  </a:schemeClr>
+                </a:solidFill>
+                <a:latin typeface="Consolas" panose="020B0609020204030204" pitchFamily="49" charset="0"/>
+              </a:rPr>
+              <a:t>[5]</a:t>
+            </a:r>
+            <a:r>
+              <a:rPr lang="en-US" sz="2400" dirty="0"/>
+              <a:t>);  	</a:t>
+            </a:r>
+            <a:r>
+              <a:rPr lang="en-US" sz="2400" dirty="0">
+                <a:solidFill>
+                  <a:srgbClr val="92D050"/>
+                </a:solidFill>
+              </a:rPr>
+              <a:t>//</a:t>
+            </a:r>
+            <a:r>
+              <a:rPr lang="en-US" sz="2400" dirty="0" err="1">
+                <a:solidFill>
+                  <a:srgbClr val="92D050"/>
+                </a:solidFill>
+              </a:rPr>
+              <a:t>IndexOutOfRangeException</a:t>
+            </a:r>
+            <a:endParaRPr lang="en-US" sz="2400" dirty="0">
+              <a:solidFill>
+                <a:srgbClr val="92D050"/>
+              </a:solidFill>
+            </a:endParaRPr>
+          </a:p>
+        </p:txBody>
+      </p:sp>
+      <p:sp>
+        <p:nvSpPr>
+          <p:cNvPr id="4" name="Текстово поле 3">
+            <a:extLst>
+              <a:ext uri="{FF2B5EF4-FFF2-40B4-BE49-F238E27FC236}">
+                <a16:creationId xmlns:a16="http://schemas.microsoft.com/office/drawing/2014/main" id="{FE34AB0B-DF14-6A19-D175-837D5E002A3D}"/>
+              </a:ext>
+            </a:extLst>
+          </p:cNvPr>
+          <p:cNvSpPr txBox="1"/>
+          <p:nvPr/>
+        </p:nvSpPr>
+        <p:spPr>
+          <a:xfrm>
+            <a:off x="1215369" y="2246049"/>
+            <a:ext cx="8380521" cy="954107"/>
+          </a:xfrm>
+          <a:prstGeom prst="rect">
+            <a:avLst/>
+          </a:prstGeom>
+          <a:noFill/>
+        </p:spPr>
+        <p:txBody>
+          <a:bodyPr wrap="square" rtlCol="0">
+            <a:spAutoFit/>
+          </a:bodyPr>
+          <a:lstStyle/>
+          <a:p>
+            <a:r>
+              <a:rPr lang="bg-BG" sz="2800" dirty="0">
+                <a:latin typeface="Arial" panose="020B0604020202020204" pitchFamily="34" charset="0"/>
+                <a:cs typeface="Arial" panose="020B0604020202020204" pitchFamily="34" charset="0"/>
+              </a:rPr>
+              <a:t>Опитваме да </a:t>
+            </a:r>
+            <a:r>
+              <a:rPr lang="bg-BG" sz="2800" dirty="0" err="1">
+                <a:latin typeface="Arial" panose="020B0604020202020204" pitchFamily="34" charset="0"/>
+                <a:cs typeface="Arial" panose="020B0604020202020204" pitchFamily="34" charset="0"/>
+              </a:rPr>
+              <a:t>достъпим</a:t>
+            </a:r>
+            <a:r>
+              <a:rPr lang="bg-BG" sz="2800" dirty="0">
+                <a:latin typeface="Arial" panose="020B0604020202020204" pitchFamily="34" charset="0"/>
+                <a:cs typeface="Arial" panose="020B0604020202020204" pitchFamily="34" charset="0"/>
+              </a:rPr>
+              <a:t> елемент  на индекс, който </a:t>
+            </a:r>
+            <a:r>
+              <a:rPr lang="bg-BG" sz="2800" dirty="0" err="1">
+                <a:latin typeface="Arial" panose="020B0604020202020204" pitchFamily="34" charset="0"/>
+                <a:cs typeface="Arial" panose="020B0604020202020204" pitchFamily="34" charset="0"/>
+              </a:rPr>
+              <a:t>несъществува</a:t>
+            </a:r>
+            <a:r>
+              <a:rPr lang="bg-BG" sz="2800" dirty="0">
+                <a:latin typeface="Arial" panose="020B0604020202020204" pitchFamily="34" charset="0"/>
+                <a:cs typeface="Arial" panose="020B0604020202020204" pitchFamily="34" charset="0"/>
+              </a:rPr>
+              <a:t>.</a:t>
+            </a:r>
+            <a:endParaRPr lang="en-US" sz="2800" dirty="0">
+              <a:latin typeface="Arial" panose="020B0604020202020204" pitchFamily="34" charset="0"/>
+              <a:cs typeface="Arial" panose="020B0604020202020204" pitchFamily="34" charset="0"/>
+            </a:endParaRPr>
+          </a:p>
+        </p:txBody>
+      </p:sp>
+    </p:spTree>
+    <p:extLst>
+      <p:ext uri="{BB962C8B-B14F-4D97-AF65-F5344CB8AC3E}">
+        <p14:creationId xmlns:p14="http://schemas.microsoft.com/office/powerpoint/2010/main" val="3536173249"/>
+      </p:ext>
+    </p:extLst>
+  </p:cSld>
+  <p:clrMapOvr>
+    <a:masterClrMapping/>
+  </p:clrMapOvr>
+</p:sld>
+</file>
+
 <file path=ppt/slides/slide2.xml><?xml version="1.0" encoding="utf-8"?>
 <p:sld xmlns:a="http://schemas.openxmlformats.org/drawingml/2006/main" xmlns:r="http://schemas.openxmlformats.org/officeDocument/2006/relationships" xmlns:p="http://schemas.openxmlformats.org/presentationml/2006/main">
   <p:cSld>
@@ -6688,6 +9588,9 @@
             <a:pPr algn="ctr"/>
             <a:r>
               <a:rPr lang="bg-BG" dirty="0">
+                <a:solidFill>
+                  <a:schemeClr val="tx1"/>
+                </a:solidFill>
                 <a:latin typeface="Arial" panose="020B0604020202020204" pitchFamily="34" charset="0"/>
                 <a:cs typeface="Arial" panose="020B0604020202020204" pitchFamily="34" charset="0"/>
               </a:rPr>
@@ -6726,6 +9629,9 @@
           <a:p>
             <a:r>
               <a:rPr lang="en-US" sz="2400" dirty="0">
+                <a:solidFill>
+                  <a:schemeClr val="tx1"/>
+                </a:solidFill>
                 <a:latin typeface="Arial" panose="020B0604020202020204" pitchFamily="34" charset="0"/>
                 <a:cs typeface="Arial" panose="020B0604020202020204" pitchFamily="34" charset="0"/>
               </a:rPr>
@@ -6735,12 +9641,18 @@
           <a:p>
             <a:r>
               <a:rPr lang="en-US" sz="2400" dirty="0" err="1">
+                <a:solidFill>
+                  <a:schemeClr val="tx1"/>
+                </a:solidFill>
                 <a:latin typeface="Arial" panose="020B0604020202020204" pitchFamily="34" charset="0"/>
                 <a:cs typeface="Arial" panose="020B0604020202020204" pitchFamily="34" charset="0"/>
               </a:rPr>
               <a:t>Enums</a:t>
             </a:r>
             <a:endParaRPr lang="en-US" sz="2400" dirty="0">
+              <a:solidFill>
+                <a:schemeClr val="tx1"/>
+              </a:solidFill>
               <a:latin typeface="Arial" panose="020B0604020202020204" pitchFamily="34" charset="0"/>
               <a:cs typeface="Arial" panose="020B0604020202020204" pitchFamily="34" charset="0"/>
             </a:endParaRPr>
@@ -6748,6 +9660,9 @@
           <a:p>
             <a:r>
               <a:rPr lang="en-US" sz="2400" dirty="0">
+                <a:solidFill>
+                  <a:schemeClr val="tx1"/>
+                </a:solidFill>
                 <a:latin typeface="Arial" panose="020B0604020202020204" pitchFamily="34" charset="0"/>
                 <a:cs typeface="Arial" panose="020B0604020202020204" pitchFamily="34" charset="0"/>
               </a:rPr>
@@ -6757,6 +9672,9 @@
           <a:p>
             <a:r>
               <a:rPr lang="en-US" sz="2400" dirty="0">
+                <a:solidFill>
+                  <a:schemeClr val="tx1"/>
+                </a:solidFill>
                 <a:latin typeface="Arial" panose="020B0604020202020204" pitchFamily="34" charset="0"/>
                 <a:cs typeface="Arial" panose="020B0604020202020204" pitchFamily="34" charset="0"/>
               </a:rPr>
@@ -6766,12 +9684,18 @@
           <a:p>
             <a:r>
               <a:rPr lang="en-US" sz="2400" dirty="0" err="1">
+                <a:solidFill>
+                  <a:schemeClr val="tx1"/>
+                </a:solidFill>
                 <a:latin typeface="Arial" panose="020B0604020202020204" pitchFamily="34" charset="0"/>
                 <a:cs typeface="Arial" panose="020B0604020202020204" pitchFamily="34" charset="0"/>
               </a:rPr>
               <a:t>Nullables</a:t>
             </a:r>
             <a:endParaRPr lang="en-US" sz="2400" dirty="0">
+              <a:solidFill>
+                <a:schemeClr val="tx1"/>
+              </a:solidFill>
               <a:latin typeface="Arial" panose="020B0604020202020204" pitchFamily="34" charset="0"/>
               <a:cs typeface="Arial" panose="020B0604020202020204" pitchFamily="34" charset="0"/>
             </a:endParaRPr>
@@ -6779,6 +9703,9 @@
           <a:p>
             <a:r>
               <a:rPr lang="en-US" sz="2400" dirty="0">
+                <a:solidFill>
+                  <a:schemeClr val="tx1"/>
+                </a:solidFill>
                 <a:latin typeface="Arial" panose="020B0604020202020204" pitchFamily="34" charset="0"/>
                 <a:cs typeface="Arial" panose="020B0604020202020204" pitchFamily="34" charset="0"/>
               </a:rPr>
@@ -6788,6 +9715,9 @@
           <a:p>
             <a:r>
               <a:rPr lang="en-US" sz="2400" dirty="0">
+                <a:solidFill>
+                  <a:schemeClr val="tx1"/>
+                </a:solidFill>
                 <a:latin typeface="Arial" panose="020B0604020202020204" pitchFamily="34" charset="0"/>
                 <a:cs typeface="Arial" panose="020B0604020202020204" pitchFamily="34" charset="0"/>
               </a:rPr>
@@ -7091,6 +10021,9 @@
           <a:p>
             <a:r>
               <a:rPr lang="en-US" sz="2400" dirty="0">
+                <a:solidFill>
+                  <a:schemeClr val="tx1"/>
+                </a:solidFill>
                 <a:latin typeface="Arial" panose="020B0604020202020204" pitchFamily="34" charset="0"/>
                 <a:cs typeface="Arial" panose="020B0604020202020204" pitchFamily="34" charset="0"/>
               </a:rPr>
@@ -7100,6 +10033,9 @@
           <a:p>
             <a:r>
               <a:rPr lang="en-US" sz="2400" dirty="0">
+                <a:solidFill>
+                  <a:schemeClr val="tx1"/>
+                </a:solidFill>
                 <a:latin typeface="Arial" panose="020B0604020202020204" pitchFamily="34" charset="0"/>
                 <a:cs typeface="Arial" panose="020B0604020202020204" pitchFamily="34" charset="0"/>
               </a:rPr>
@@ -7109,6 +10045,9 @@
           <a:p>
             <a:r>
               <a:rPr lang="en-US" sz="2400" dirty="0">
+                <a:solidFill>
+                  <a:schemeClr val="tx1"/>
+                </a:solidFill>
                 <a:latin typeface="Arial" panose="020B0604020202020204" pitchFamily="34" charset="0"/>
                 <a:cs typeface="Arial" panose="020B0604020202020204" pitchFamily="34" charset="0"/>
               </a:rPr>
@@ -7118,6 +10057,9 @@
           <a:p>
             <a:r>
               <a:rPr lang="en-US" sz="2400" dirty="0">
+                <a:solidFill>
+                  <a:schemeClr val="tx1"/>
+                </a:solidFill>
                 <a:latin typeface="Arial" panose="020B0604020202020204" pitchFamily="34" charset="0"/>
                 <a:cs typeface="Arial" panose="020B0604020202020204" pitchFamily="34" charset="0"/>
               </a:rPr>
@@ -7127,6 +10069,9 @@
           <a:p>
             <a:r>
               <a:rPr lang="en-US" sz="2400" dirty="0">
+                <a:solidFill>
+                  <a:schemeClr val="tx1"/>
+                </a:solidFill>
                 <a:latin typeface="Arial" panose="020B0604020202020204" pitchFamily="34" charset="0"/>
                 <a:cs typeface="Arial" panose="020B0604020202020204" pitchFamily="34" charset="0"/>
               </a:rPr>
@@ -7136,6 +10081,9 @@
           <a:p>
             <a:r>
               <a:rPr lang="en-US" sz="2400" dirty="0">
+                <a:solidFill>
+                  <a:schemeClr val="tx1"/>
+                </a:solidFill>
                 <a:latin typeface="Arial" panose="020B0604020202020204" pitchFamily="34" charset="0"/>
                 <a:cs typeface="Arial" panose="020B0604020202020204" pitchFamily="34" charset="0"/>
               </a:rPr>
@@ -7145,6 +10093,9 @@
           <a:p>
             <a:r>
               <a:rPr lang="en-US" sz="2400" dirty="0">
+                <a:solidFill>
+                  <a:schemeClr val="tx1"/>
+                </a:solidFill>
                 <a:latin typeface="Arial" panose="020B0604020202020204" pitchFamily="34" charset="0"/>
                 <a:cs typeface="Arial" panose="020B0604020202020204" pitchFamily="34" charset="0"/>
               </a:rPr>
@@ -7154,6 +10105,9 @@
           <a:p>
             <a:r>
               <a:rPr lang="en-US" sz="2400" dirty="0">
+                <a:solidFill>
+                  <a:schemeClr val="tx1"/>
+                </a:solidFill>
                 <a:latin typeface="Arial" panose="020B0604020202020204" pitchFamily="34" charset="0"/>
                 <a:cs typeface="Arial" panose="020B0604020202020204" pitchFamily="34" charset="0"/>
               </a:rPr>
@@ -7216,6 +10170,9 @@
             <a:pPr algn="ctr"/>
             <a:r>
               <a:rPr lang="bg-BG" dirty="0">
+                <a:solidFill>
+                  <a:schemeClr val="tx1"/>
+                </a:solidFill>
                 <a:latin typeface="Arial" panose="020B0604020202020204" pitchFamily="34" charset="0"/>
                 <a:cs typeface="Arial" panose="020B0604020202020204" pitchFamily="34" charset="0"/>
               </a:rPr>
@@ -7255,7 +10212,15 @@
             </a:r>
             <a:r>
               <a:rPr lang="bg-BG" dirty="0"/>
-              <a:t> са наименуван блок от код, който върши някаква работа и може впоследствие да бъде извикван на много места. Декларират се клас.</a:t>
+              <a:t> </a:t>
+            </a:r>
+            <a:r>
+              <a:rPr lang="bg-BG" dirty="0">
+                <a:solidFill>
+                  <a:schemeClr val="tx1"/>
+                </a:solidFill>
+              </a:rPr>
+              <a:t>са наименуван блок от код, който върши някаква работа и може впоследствие да бъде извикван на много места. Декларират се клас.</a:t>
             </a:r>
           </a:p>
         </p:txBody>
@@ -7662,6 +10627,9 @@
             <a:pPr algn="ctr"/>
             <a:r>
               <a:rPr lang="bg-BG" dirty="0">
+                <a:solidFill>
+                  <a:schemeClr val="tx1"/>
+                </a:solidFill>
                 <a:latin typeface="Arial" panose="020B0604020202020204" pitchFamily="34" charset="0"/>
                 <a:cs typeface="Arial" panose="020B0604020202020204" pitchFamily="34" charset="0"/>
               </a:rPr>
@@ -7693,6 +10661,9 @@
           <a:p>
             <a:r>
               <a:rPr lang="bg-BG" dirty="0">
+                <a:solidFill>
+                  <a:schemeClr val="tx1"/>
+                </a:solidFill>
                 <a:latin typeface="Arial" panose="020B0604020202020204" pitchFamily="34" charset="0"/>
                 <a:cs typeface="Arial" panose="020B0604020202020204" pitchFamily="34" charset="0"/>
               </a:rPr>
@@ -7702,6 +10673,9 @@
           <a:p>
             <a:r>
               <a:rPr lang="bg-BG" dirty="0">
+                <a:solidFill>
+                  <a:schemeClr val="tx1"/>
+                </a:solidFill>
                 <a:latin typeface="Arial" panose="020B0604020202020204" pitchFamily="34" charset="0"/>
                 <a:cs typeface="Arial" panose="020B0604020202020204" pitchFamily="34" charset="0"/>
               </a:rPr>
@@ -7709,6 +10683,9 @@
             </a:r>
             <a:r>
               <a:rPr lang="bg-BG" dirty="0" err="1">
+                <a:solidFill>
+                  <a:schemeClr val="tx1"/>
+                </a:solidFill>
                 <a:latin typeface="Arial" panose="020B0604020202020204" pitchFamily="34" charset="0"/>
                 <a:cs typeface="Arial" panose="020B0604020202020204" pitchFamily="34" charset="0"/>
               </a:rPr>
@@ -7716,6 +10693,9 @@
             </a:r>
             <a:r>
               <a:rPr lang="bg-BG" dirty="0">
+                <a:solidFill>
+                  <a:schemeClr val="tx1"/>
+                </a:solidFill>
                 <a:latin typeface="Arial" panose="020B0604020202020204" pitchFamily="34" charset="0"/>
                 <a:cs typeface="Arial" panose="020B0604020202020204" pitchFamily="34" charset="0"/>
               </a:rPr>
@@ -7725,6 +10705,9 @@
           <a:p>
             <a:r>
               <a:rPr lang="bg-BG" dirty="0">
+                <a:solidFill>
+                  <a:schemeClr val="tx1"/>
+                </a:solidFill>
                 <a:latin typeface="Arial" panose="020B0604020202020204" pitchFamily="34" charset="0"/>
                 <a:cs typeface="Arial" panose="020B0604020202020204" pitchFamily="34" charset="0"/>
               </a:rPr>
@@ -7734,6 +10717,9 @@
           <a:p>
             <a:r>
               <a:rPr lang="bg-BG" dirty="0">
+                <a:solidFill>
+                  <a:schemeClr val="tx1"/>
+                </a:solidFill>
                 <a:latin typeface="Arial" panose="020B0604020202020204" pitchFamily="34" charset="0"/>
                 <a:cs typeface="Arial" panose="020B0604020202020204" pitchFamily="34" charset="0"/>
               </a:rPr>
@@ -7743,6 +10729,9 @@
           <a:p>
             <a:r>
               <a:rPr lang="bg-BG" dirty="0">
+                <a:solidFill>
+                  <a:schemeClr val="tx1"/>
+                </a:solidFill>
                 <a:latin typeface="Arial" panose="020B0604020202020204" pitchFamily="34" charset="0"/>
                 <a:cs typeface="Arial" panose="020B0604020202020204" pitchFamily="34" charset="0"/>
               </a:rPr>
@@ -7752,6 +10741,9 @@
           <a:p>
             <a:r>
               <a:rPr lang="bg-BG" dirty="0">
+                <a:solidFill>
+                  <a:schemeClr val="tx1"/>
+                </a:solidFill>
                 <a:latin typeface="Arial" panose="020B0604020202020204" pitchFamily="34" charset="0"/>
                 <a:cs typeface="Arial" panose="020B0604020202020204" pitchFamily="34" charset="0"/>
               </a:rPr>
@@ -7759,6 +10751,9 @@
             </a:r>
             <a:r>
               <a:rPr lang="bg-BG" dirty="0" err="1">
+                <a:solidFill>
+                  <a:schemeClr val="tx1"/>
+                </a:solidFill>
                 <a:latin typeface="Arial" panose="020B0604020202020204" pitchFamily="34" charset="0"/>
                 <a:cs typeface="Arial" panose="020B0604020202020204" pitchFamily="34" charset="0"/>
               </a:rPr>
@@ -7766,6 +10761,9 @@
             </a:r>
             <a:r>
               <a:rPr lang="bg-BG" dirty="0">
+                <a:solidFill>
+                  <a:schemeClr val="tx1"/>
+                </a:solidFill>
                 <a:latin typeface="Arial" panose="020B0604020202020204" pitchFamily="34" charset="0"/>
                 <a:cs typeface="Arial" panose="020B0604020202020204" pitchFamily="34" charset="0"/>
               </a:rPr>
@@ -7839,7 +10837,11 @@
               <a:t> </a:t>
             </a:r>
             <a:r>
-              <a:rPr lang="bg-BG" dirty="0"/>
+              <a:rPr lang="bg-BG" dirty="0">
+                <a:solidFill>
+                  <a:schemeClr val="tx1"/>
+                </a:solidFill>
+              </a:rPr>
               <a:t>методи</a:t>
             </a:r>
           </a:p>
@@ -7879,7 +10881,11 @@
               <a:t> </a:t>
             </a:r>
             <a:r>
-              <a:rPr lang="bg-BG" dirty="0"/>
+              <a:rPr lang="bg-BG" dirty="0">
+                <a:solidFill>
+                  <a:schemeClr val="tx1"/>
+                </a:solidFill>
+              </a:rPr>
               <a:t>методите са методи, които не връщат никакъв резултат. Те просто изпълняват кода между къдравите скоби. Могат да приемат един или много параметри.</a:t>
             </a:r>
           </a:p>
@@ -8233,11 +11239,6 @@
             </a:r>
             <a:r>
               <a:rPr lang="en-US" sz="1800" dirty="0">
-                <a:solidFill>
-                  <a:schemeClr val="tx2">
-                    <a:lumMod val="75000"/>
-                  </a:schemeClr>
-                </a:solidFill>
                 <a:latin typeface="Consolas" panose="020B0609020204030204" pitchFamily="49" charset="0"/>
               </a:rPr>
               <a:t>limit</a:t>
@@ -8509,6 +11510,9 @@
             </a:r>
             <a:r>
               <a:rPr lang="bg-BG" dirty="0">
+                <a:solidFill>
+                  <a:schemeClr val="tx1"/>
+                </a:solidFill>
                 <a:latin typeface="Arial" panose="020B0604020202020204" pitchFamily="34" charset="0"/>
                 <a:cs typeface="Arial" panose="020B0604020202020204" pitchFamily="34" charset="0"/>
               </a:rPr>
@@ -8900,6 +11904,9 @@
             <a:pPr algn="ctr"/>
             <a:r>
               <a:rPr lang="bg-BG" dirty="0">
+                <a:solidFill>
+                  <a:schemeClr val="tx1"/>
+                </a:solidFill>
                 <a:latin typeface="Arial" panose="020B0604020202020204" pitchFamily="34" charset="0"/>
                 <a:cs typeface="Arial" panose="020B0604020202020204" pitchFamily="34" charset="0"/>
               </a:rPr>
@@ -8930,15 +11937,27 @@
           <a:lstStyle/>
           <a:p>
             <a:r>
-              <a:rPr lang="bg-BG" dirty="0"/>
+              <a:rPr lang="bg-BG" dirty="0">
+                <a:solidFill>
+                  <a:schemeClr val="tx1"/>
+                </a:solidFill>
+              </a:rPr>
               <a:t>Освен </a:t>
             </a:r>
             <a:r>
-              <a:rPr lang="en-US" dirty="0"/>
+              <a:rPr lang="en-US" dirty="0">
+                <a:solidFill>
+                  <a:schemeClr val="tx1"/>
+                </a:solidFill>
+              </a:rPr>
               <a:t>void </a:t>
             </a:r>
             <a:r>
-              <a:rPr lang="bg-BG" dirty="0"/>
+              <a:rPr lang="bg-BG" dirty="0">
+                <a:solidFill>
+                  <a:schemeClr val="tx1"/>
+                </a:solidFill>
+              </a:rPr>
               <a:t>методите, съществуват и методи, които могат да връщат дадена стойност.</a:t>
             </a:r>
           </a:p>
@@ -9205,7 +12224,25 @@
                 </a:solidFill>
                 <a:latin typeface="Consolas" panose="020B0609020204030204" pitchFamily="49" charset="0"/>
               </a:rPr>
-              <a:t> + </a:t>
+              <a:t> </a:t>
+            </a:r>
+            <a:r>
+              <a:rPr lang="en-US" sz="1800" dirty="0">
+                <a:latin typeface="Consolas" panose="020B0609020204030204" pitchFamily="49" charset="0"/>
+              </a:rPr>
+              <a:t>+</a:t>
+            </a:r>
+            <a:r>
+              <a:rPr lang="en-US" sz="1800" dirty="0">
+                <a:solidFill>
+                  <a:schemeClr val="tx2">
+                    <a:lumMod val="60000"/>
+                    <a:lumOff val="40000"/>
+                  </a:schemeClr>
+                </a:solidFill>
+                <a:latin typeface="Consolas" panose="020B0609020204030204" pitchFamily="49" charset="0"/>
+              </a:rPr>
+              <a:t> </a:t>
             </a:r>
             <a:r>
               <a:rPr lang="en-US" sz="1800" dirty="0" err="1">
@@ -9525,7 +12562,25 @@
                 </a:solidFill>
                 <a:latin typeface="Consolas" panose="020B0609020204030204" pitchFamily="49" charset="0"/>
               </a:rPr>
-              <a:t> = </a:t>
+              <a:t> </a:t>
+            </a:r>
+            <a:r>
+              <a:rPr lang="en-US" sz="1800" dirty="0">
+                <a:latin typeface="Consolas" panose="020B0609020204030204" pitchFamily="49" charset="0"/>
+              </a:rPr>
+              <a:t>=</a:t>
+            </a:r>
+            <a:r>
+              <a:rPr lang="en-US" sz="1800" dirty="0">
+                <a:solidFill>
+                  <a:schemeClr val="tx2">
+                    <a:lumMod val="60000"/>
+                    <a:lumOff val="40000"/>
+                  </a:schemeClr>
+                </a:solidFill>
+                <a:latin typeface="Consolas" panose="020B0609020204030204" pitchFamily="49" charset="0"/>
+              </a:rPr>
+              <a:t> </a:t>
             </a:r>
             <a:r>
               <a:rPr lang="en-US" sz="1800" dirty="0">
@@ -9762,6 +12817,9 @@
             <a:pPr algn="ctr"/>
             <a:r>
               <a:rPr lang="bg-BG" dirty="0">
+                <a:solidFill>
+                  <a:schemeClr val="tx1"/>
+                </a:solidFill>
                 <a:latin typeface="Arial" panose="020B0604020202020204" pitchFamily="34" charset="0"/>
                 <a:cs typeface="Arial" panose="020B0604020202020204" pitchFamily="34" charset="0"/>
               </a:rPr>
@@ -9769,12 +12827,18 @@
             </a:r>
             <a:br>
               <a:rPr lang="en-US" dirty="0">
+                <a:solidFill>
+                  <a:schemeClr val="tx1"/>
+                </a:solidFill>
                 <a:latin typeface="Arial" panose="020B0604020202020204" pitchFamily="34" charset="0"/>
                 <a:cs typeface="Arial" panose="020B0604020202020204" pitchFamily="34" charset="0"/>
               </a:rPr>
             </a:br>
             <a:r>
               <a:rPr lang="en-US" dirty="0">
+                <a:solidFill>
+                  <a:schemeClr val="tx1"/>
+                </a:solidFill>
                 <a:latin typeface="Arial" panose="020B0604020202020204" pitchFamily="34" charset="0"/>
                 <a:cs typeface="Arial" panose="020B0604020202020204" pitchFamily="34" charset="0"/>
               </a:rPr>
@@ -9782,6 +12846,9 @@
             </a:r>
             <a:r>
               <a:rPr lang="bg-BG" dirty="0">
+                <a:solidFill>
+                  <a:schemeClr val="tx1"/>
+                </a:solidFill>
                 <a:latin typeface="Arial" panose="020B0604020202020204" pitchFamily="34" charset="0"/>
                 <a:cs typeface="Arial" panose="020B0604020202020204" pitchFamily="34" charset="0"/>
               </a:rPr>
@@ -9789,12 +12856,19 @@
             </a:r>
             <a:r>
               <a:rPr lang="en-US" dirty="0">
+                <a:solidFill>
+                  <a:schemeClr val="tx1"/>
+                </a:solidFill>
                 <a:latin typeface="Arial" panose="020B0604020202020204" pitchFamily="34" charset="0"/>
                 <a:cs typeface="Arial" panose="020B0604020202020204" pitchFamily="34" charset="0"/>
               </a:rPr>
               <a:t>/</a:t>
             </a:r>
-            <a:endParaRPr lang="bg-BG" dirty="0"/>
+            <a:endParaRPr lang="bg-BG" dirty="0">
+              <a:solidFill>
+                <a:schemeClr val="tx1"/>
+              </a:solidFill>
+            </a:endParaRPr>
           </a:p>
         </p:txBody>
       </p:sp>
@@ -10133,6 +13207,9 @@
             <a:pPr algn="ctr"/>
             <a:r>
               <a:rPr lang="bg-BG" dirty="0">
+                <a:solidFill>
+                  <a:schemeClr val="tx1"/>
+                </a:solidFill>
                 <a:latin typeface="Arial" panose="020B0604020202020204" pitchFamily="34" charset="0"/>
                 <a:cs typeface="Arial" panose="020B0604020202020204" pitchFamily="34" charset="0"/>
               </a:rPr>
@@ -10140,6 +13217,9 @@
             </a:r>
             <a:r>
               <a:rPr lang="en-US" dirty="0">
+                <a:solidFill>
+                  <a:schemeClr val="tx1"/>
+                </a:solidFill>
                 <a:latin typeface="Arial" panose="020B0604020202020204" pitchFamily="34" charset="0"/>
                 <a:cs typeface="Arial" panose="020B0604020202020204" pitchFamily="34" charset="0"/>
               </a:rPr>
@@ -10299,6 +13379,9 @@
             </a:pPr>
             <a:r>
               <a:rPr lang="bg-BG" sz="2400" dirty="0">
+                <a:solidFill>
+                  <a:schemeClr val="tx1"/>
+                </a:solidFill>
                 <a:latin typeface="Arial" panose="020B0604020202020204" pitchFamily="34" charset="0"/>
                 <a:cs typeface="Arial" panose="020B0604020202020204" pitchFamily="34" charset="0"/>
               </a:rPr>
@@ -10319,7 +13402,17 @@
                 <a:latin typeface="Arial" panose="020B0604020202020204" pitchFamily="34" charset="0"/>
                 <a:cs typeface="Arial" panose="020B0604020202020204" pitchFamily="34" charset="0"/>
               </a:rPr>
-              <a:t> на данните в компютъра, така че те да могат да бъдат използвани </a:t>
+              <a:t> </a:t>
+            </a:r>
+            <a:r>
+              <a:rPr lang="bg-BG" sz="2400" dirty="0">
+                <a:solidFill>
+                  <a:schemeClr val="tx1"/>
+                </a:solidFill>
+                <a:latin typeface="Arial" panose="020B0604020202020204" pitchFamily="34" charset="0"/>
+                <a:cs typeface="Arial" panose="020B0604020202020204" pitchFamily="34" charset="0"/>
+              </a:rPr>
+              <a:t>на данните в компютъра, така че те да могат да бъдат използвани </a:t>
             </a:r>
             <a:r>
               <a:rPr lang="bg-BG" sz="2400" dirty="0">
@@ -10347,6 +13440,9 @@
             </a:pPr>
             <a:r>
               <a:rPr lang="bg-BG" sz="2400" dirty="0">
+                <a:solidFill>
+                  <a:schemeClr val="tx1"/>
+                </a:solidFill>
                 <a:latin typeface="Arial" panose="020B0604020202020204" pitchFamily="34" charset="0"/>
                 <a:cs typeface="Arial" panose="020B0604020202020204" pitchFamily="34" charset="0"/>
               </a:rPr>
@@ -10384,7 +13480,17 @@
                 <a:latin typeface="Arial" panose="020B0604020202020204" pitchFamily="34" charset="0"/>
                 <a:cs typeface="Arial" panose="020B0604020202020204" pitchFamily="34" charset="0"/>
               </a:rPr>
-              <a:t> и </a:t>
+              <a:t> </a:t>
+            </a:r>
+            <a:r>
+              <a:rPr lang="bg-BG" sz="2400" dirty="0">
+                <a:solidFill>
+                  <a:schemeClr val="tx1"/>
+                </a:solidFill>
+                <a:latin typeface="Arial" panose="020B0604020202020204" pitchFamily="34" charset="0"/>
+                <a:cs typeface="Arial" panose="020B0604020202020204" pitchFamily="34" charset="0"/>
+              </a:rPr>
+              <a:t>и </a:t>
             </a:r>
             <a:r>
               <a:rPr lang="bg-BG" sz="2400" dirty="0">
@@ -10401,9 +13507,22 @@
                 <a:latin typeface="Arial" panose="020B0604020202020204" pitchFamily="34" charset="0"/>
                 <a:cs typeface="Arial" panose="020B0604020202020204" pitchFamily="34" charset="0"/>
               </a:rPr>
-              <a:t> на данните.</a:t>
+              <a:t> </a:t>
+            </a:r>
+            <a:r>
+              <a:rPr lang="bg-BG" sz="2400" dirty="0">
+                <a:solidFill>
+                  <a:schemeClr val="tx1"/>
+                </a:solidFill>
+                <a:latin typeface="Arial" panose="020B0604020202020204" pitchFamily="34" charset="0"/>
+                <a:cs typeface="Arial" panose="020B0604020202020204" pitchFamily="34" charset="0"/>
+              </a:rPr>
+              <a:t>на данните.</a:t>
             </a:r>
             <a:endParaRPr lang="en-US" sz="2400" dirty="0">
+              <a:solidFill>
+                <a:schemeClr val="tx1"/>
+              </a:solidFill>
               <a:latin typeface="Arial" panose="020B0604020202020204" pitchFamily="34" charset="0"/>
               <a:cs typeface="Arial" panose="020B0604020202020204" pitchFamily="34" charset="0"/>
             </a:endParaRPr>

</xml_diff>

<commit_message>
C# Intermediate: List slides
</commit_message>
<xml_diff>
--- a/C# Intermediate.pptx
+++ b/C# Intermediate.pptx
@@ -21,6 +21,14 @@
     <p:sldId id="269" r:id="rId15"/>
     <p:sldId id="271" r:id="rId16"/>
     <p:sldId id="272" r:id="rId17"/>
+    <p:sldId id="273" r:id="rId18"/>
+    <p:sldId id="274" r:id="rId19"/>
+    <p:sldId id="275" r:id="rId20"/>
+    <p:sldId id="276" r:id="rId21"/>
+    <p:sldId id="277" r:id="rId22"/>
+    <p:sldId id="278" r:id="rId23"/>
+    <p:sldId id="279" r:id="rId24"/>
+    <p:sldId id="280" r:id="rId25"/>
   </p:sldIdLst>
   <p:sldSz cx="12192000" cy="6858000"/>
   <p:notesSz cx="6858000" cy="9144000"/>
@@ -323,7 +331,7 @@
           <a:p>
             <a:fld id="{0BD89023-946D-4914-A444-F66256F52110}" type="datetimeFigureOut">
               <a:rPr lang="bg-BG" smtClean="0"/>
-              <a:t>12.11.2022 г.</a:t>
+              <a:t>13.11.2022 г.</a:t>
             </a:fld>
             <a:endParaRPr lang="bg-BG"/>
           </a:p>
@@ -604,7 +612,7 @@
           <a:p>
             <a:fld id="{0BD89023-946D-4914-A444-F66256F52110}" type="datetimeFigureOut">
               <a:rPr lang="bg-BG" smtClean="0"/>
-              <a:t>12.11.2022 г.</a:t>
+              <a:t>13.11.2022 г.</a:t>
             </a:fld>
             <a:endParaRPr lang="bg-BG"/>
           </a:p>
@@ -796,7 +804,7 @@
           <a:p>
             <a:fld id="{0BD89023-946D-4914-A444-F66256F52110}" type="datetimeFigureOut">
               <a:rPr lang="bg-BG" smtClean="0"/>
-              <a:t>12.11.2022 г.</a:t>
+              <a:t>13.11.2022 г.</a:t>
             </a:fld>
             <a:endParaRPr lang="bg-BG"/>
           </a:p>
@@ -1057,7 +1065,7 @@
           <a:p>
             <a:fld id="{0BD89023-946D-4914-A444-F66256F52110}" type="datetimeFigureOut">
               <a:rPr lang="bg-BG" smtClean="0"/>
-              <a:t>12.11.2022 г.</a:t>
+              <a:t>13.11.2022 г.</a:t>
             </a:fld>
             <a:endParaRPr lang="bg-BG"/>
           </a:p>
@@ -1483,7 +1491,7 @@
           <a:p>
             <a:fld id="{0BD89023-946D-4914-A444-F66256F52110}" type="datetimeFigureOut">
               <a:rPr lang="bg-BG" smtClean="0"/>
-              <a:t>12.11.2022 г.</a:t>
+              <a:t>13.11.2022 г.</a:t>
             </a:fld>
             <a:endParaRPr lang="bg-BG"/>
           </a:p>
@@ -2029,7 +2037,7 @@
           <a:p>
             <a:fld id="{0BD89023-946D-4914-A444-F66256F52110}" type="datetimeFigureOut">
               <a:rPr lang="bg-BG" smtClean="0"/>
-              <a:t>12.11.2022 г.</a:t>
+              <a:t>13.11.2022 г.</a:t>
             </a:fld>
             <a:endParaRPr lang="bg-BG"/>
           </a:p>
@@ -2860,7 +2868,7 @@
           <a:p>
             <a:fld id="{0BD89023-946D-4914-A444-F66256F52110}" type="datetimeFigureOut">
               <a:rPr lang="bg-BG" smtClean="0"/>
-              <a:t>12.11.2022 г.</a:t>
+              <a:t>13.11.2022 г.</a:t>
             </a:fld>
             <a:endParaRPr lang="bg-BG"/>
           </a:p>
@@ -3030,7 +3038,7 @@
           <a:p>
             <a:fld id="{0BD89023-946D-4914-A444-F66256F52110}" type="datetimeFigureOut">
               <a:rPr lang="bg-BG" smtClean="0"/>
-              <a:t>12.11.2022 г.</a:t>
+              <a:t>13.11.2022 г.</a:t>
             </a:fld>
             <a:endParaRPr lang="bg-BG"/>
           </a:p>
@@ -3210,7 +3218,7 @@
           <a:p>
             <a:fld id="{0BD89023-946D-4914-A444-F66256F52110}" type="datetimeFigureOut">
               <a:rPr lang="bg-BG" smtClean="0"/>
-              <a:t>12.11.2022 г.</a:t>
+              <a:t>13.11.2022 г.</a:t>
             </a:fld>
             <a:endParaRPr lang="bg-BG"/>
           </a:p>
@@ -3380,7 +3388,7 @@
           <a:p>
             <a:fld id="{0BD89023-946D-4914-A444-F66256F52110}" type="datetimeFigureOut">
               <a:rPr lang="bg-BG" smtClean="0"/>
-              <a:t>12.11.2022 г.</a:t>
+              <a:t>13.11.2022 г.</a:t>
             </a:fld>
             <a:endParaRPr lang="bg-BG"/>
           </a:p>
@@ -3637,7 +3645,7 @@
           <a:p>
             <a:fld id="{0BD89023-946D-4914-A444-F66256F52110}" type="datetimeFigureOut">
               <a:rPr lang="bg-BG" smtClean="0"/>
-              <a:t>12.11.2022 г.</a:t>
+              <a:t>13.11.2022 г.</a:t>
             </a:fld>
             <a:endParaRPr lang="bg-BG"/>
           </a:p>
@@ -3869,7 +3877,7 @@
           <a:p>
             <a:fld id="{0BD89023-946D-4914-A444-F66256F52110}" type="datetimeFigureOut">
               <a:rPr lang="bg-BG" smtClean="0"/>
-              <a:t>12.11.2022 г.</a:t>
+              <a:t>13.11.2022 г.</a:t>
             </a:fld>
             <a:endParaRPr lang="bg-BG"/>
           </a:p>
@@ -4262,7 +4270,7 @@
           <a:p>
             <a:fld id="{0BD89023-946D-4914-A444-F66256F52110}" type="datetimeFigureOut">
               <a:rPr lang="bg-BG" smtClean="0"/>
-              <a:t>12.11.2022 г.</a:t>
+              <a:t>13.11.2022 г.</a:t>
             </a:fld>
             <a:endParaRPr lang="bg-BG"/>
           </a:p>
@@ -4380,7 +4388,7 @@
           <a:p>
             <a:fld id="{0BD89023-946D-4914-A444-F66256F52110}" type="datetimeFigureOut">
               <a:rPr lang="bg-BG" smtClean="0"/>
-              <a:t>12.11.2022 г.</a:t>
+              <a:t>13.11.2022 г.</a:t>
             </a:fld>
             <a:endParaRPr lang="bg-BG"/>
           </a:p>
@@ -4475,7 +4483,7 @@
           <a:p>
             <a:fld id="{0BD89023-946D-4914-A444-F66256F52110}" type="datetimeFigureOut">
               <a:rPr lang="bg-BG" smtClean="0"/>
-              <a:t>12.11.2022 г.</a:t>
+              <a:t>13.11.2022 г.</a:t>
             </a:fld>
             <a:endParaRPr lang="bg-BG"/>
           </a:p>
@@ -4748,7 +4756,7 @@
           <a:p>
             <a:fld id="{0BD89023-946D-4914-A444-F66256F52110}" type="datetimeFigureOut">
               <a:rPr lang="bg-BG" smtClean="0"/>
-              <a:t>12.11.2022 г.</a:t>
+              <a:t>13.11.2022 г.</a:t>
             </a:fld>
             <a:endParaRPr lang="bg-BG"/>
           </a:p>
@@ -5029,7 +5037,7 @@
           <a:p>
             <a:fld id="{0BD89023-946D-4914-A444-F66256F52110}" type="datetimeFigureOut">
               <a:rPr lang="bg-BG" smtClean="0"/>
-              <a:t>12.11.2022 г.</a:t>
+              <a:t>13.11.2022 г.</a:t>
             </a:fld>
             <a:endParaRPr lang="bg-BG"/>
           </a:p>
@@ -5269,7 +5277,7 @@
           <a:p>
             <a:fld id="{0BD89023-946D-4914-A444-F66256F52110}" type="datetimeFigureOut">
               <a:rPr lang="bg-BG" smtClean="0"/>
-              <a:t>12.11.2022 г.</a:t>
+              <a:t>13.11.2022 г.</a:t>
             </a:fld>
             <a:endParaRPr lang="bg-BG"/>
           </a:p>
@@ -9542,6 +9550,1095 @@
 </p:sld>
 </file>
 
+<file path=ppt/slides/slide17.xml><?xml version="1.0" encoding="utf-8"?>
+<p:sld xmlns:a="http://schemas.openxmlformats.org/drawingml/2006/main" xmlns:r="http://schemas.openxmlformats.org/officeDocument/2006/relationships" xmlns:p="http://schemas.openxmlformats.org/presentationml/2006/main">
+  <p:cSld>
+    <p:spTree>
+      <p:nvGrpSpPr>
+        <p:cNvPr id="1" name=""/>
+        <p:cNvGrpSpPr/>
+        <p:nvPr/>
+      </p:nvGrpSpPr>
+      <p:grpSpPr>
+        <a:xfrm>
+          <a:off x="0" y="0"/>
+          <a:ext cx="0" cy="0"/>
+          <a:chOff x="0" y="0"/>
+          <a:chExt cx="0" cy="0"/>
+        </a:xfrm>
+      </p:grpSpPr>
+      <p:sp>
+        <p:nvSpPr>
+          <p:cNvPr id="2" name="Заглавие 1">
+            <a:extLst>
+              <a:ext uri="{FF2B5EF4-FFF2-40B4-BE49-F238E27FC236}">
+                <a16:creationId xmlns:a16="http://schemas.microsoft.com/office/drawing/2014/main" id="{5ED9D914-3F3B-AA86-9987-344FD40EEB72}"/>
+              </a:ext>
+            </a:extLst>
+          </p:cNvPr>
+          <p:cNvSpPr>
+            <a:spLocks noGrp="1"/>
+          </p:cNvSpPr>
+          <p:nvPr>
+            <p:ph type="title"/>
+          </p:nvPr>
+        </p:nvSpPr>
+        <p:spPr/>
+        <p:txBody>
+          <a:bodyPr/>
+          <a:lstStyle/>
+          <a:p>
+            <a:pPr algn="ctr"/>
+            <a:r>
+              <a:rPr lang="bg-BG" dirty="0">
+                <a:latin typeface="Arial" panose="020B0604020202020204" pitchFamily="34" charset="0"/>
+                <a:cs typeface="Arial" panose="020B0604020202020204" pitchFamily="34" charset="0"/>
+              </a:rPr>
+              <a:t>Какво е списък? </a:t>
+            </a:r>
+            <a:r>
+              <a:rPr lang="en-US" dirty="0">
+                <a:latin typeface="Arial" panose="020B0604020202020204" pitchFamily="34" charset="0"/>
+                <a:cs typeface="Arial" panose="020B0604020202020204" pitchFamily="34" charset="0"/>
+              </a:rPr>
+              <a:t>List&lt;T&gt;?</a:t>
+            </a:r>
+          </a:p>
+        </p:txBody>
+      </p:sp>
+      <p:sp>
+        <p:nvSpPr>
+          <p:cNvPr id="3" name="Контейнер за съдържание 2">
+            <a:extLst>
+              <a:ext uri="{FF2B5EF4-FFF2-40B4-BE49-F238E27FC236}">
+                <a16:creationId xmlns:a16="http://schemas.microsoft.com/office/drawing/2014/main" id="{120A9833-3434-6BB3-34C2-7E12823EDBA0}"/>
+              </a:ext>
+            </a:extLst>
+          </p:cNvPr>
+          <p:cNvSpPr>
+            <a:spLocks noGrp="1"/>
+          </p:cNvSpPr>
+          <p:nvPr>
+            <p:ph idx="1"/>
+          </p:nvPr>
+        </p:nvSpPr>
+        <p:spPr>
+          <a:xfrm>
+            <a:off x="1120000" y="1825625"/>
+            <a:ext cx="10233800" cy="4667250"/>
+          </a:xfrm>
+        </p:spPr>
+        <p:txBody>
+          <a:bodyPr>
+            <a:normAutofit/>
+          </a:bodyPr>
+          <a:lstStyle/>
+          <a:p>
+            <a:r>
+              <a:rPr lang="bg-BG" sz="2400" dirty="0">
+                <a:solidFill>
+                  <a:schemeClr val="tx1"/>
+                </a:solidFill>
+                <a:latin typeface="Arial" panose="020B0604020202020204" pitchFamily="34" charset="0"/>
+                <a:cs typeface="Arial" panose="020B0604020202020204" pitchFamily="34" charset="0"/>
+              </a:rPr>
+              <a:t>Списъкът в </a:t>
+            </a:r>
+            <a:r>
+              <a:rPr lang="en-US" sz="2400" dirty="0">
+                <a:solidFill>
+                  <a:schemeClr val="tx1"/>
+                </a:solidFill>
+                <a:latin typeface="Arial" panose="020B0604020202020204" pitchFamily="34" charset="0"/>
+                <a:cs typeface="Arial" panose="020B0604020202020204" pitchFamily="34" charset="0"/>
+              </a:rPr>
+              <a:t>C# </a:t>
+            </a:r>
+            <a:r>
+              <a:rPr lang="bg-BG" sz="2400" dirty="0">
+                <a:solidFill>
+                  <a:schemeClr val="tx1"/>
+                </a:solidFill>
+                <a:latin typeface="Arial" panose="020B0604020202020204" pitchFamily="34" charset="0"/>
+                <a:cs typeface="Arial" panose="020B0604020202020204" pitchFamily="34" charset="0"/>
+              </a:rPr>
+              <a:t>е</a:t>
+            </a:r>
+            <a:r>
+              <a:rPr lang="en-US" sz="2400" dirty="0">
+                <a:solidFill>
+                  <a:schemeClr val="tx1"/>
+                </a:solidFill>
+                <a:latin typeface="Arial" panose="020B0604020202020204" pitchFamily="34" charset="0"/>
+                <a:cs typeface="Arial" panose="020B0604020202020204" pitchFamily="34" charset="0"/>
+              </a:rPr>
+              <a:t> </a:t>
+            </a:r>
+            <a:r>
+              <a:rPr lang="en-US" sz="2400" dirty="0">
+                <a:solidFill>
+                  <a:srgbClr val="FFFF00"/>
+                </a:solidFill>
+                <a:latin typeface="Arial" panose="020B0604020202020204" pitchFamily="34" charset="0"/>
+                <a:cs typeface="Arial" panose="020B0604020202020204" pitchFamily="34" charset="0"/>
+              </a:rPr>
+              <a:t>generic</a:t>
+            </a:r>
+            <a:r>
+              <a:rPr lang="bg-BG" sz="2400" dirty="0">
+                <a:solidFill>
+                  <a:schemeClr val="tx1"/>
+                </a:solidFill>
+                <a:latin typeface="Arial" panose="020B0604020202020204" pitchFamily="34" charset="0"/>
+                <a:cs typeface="Arial" panose="020B0604020202020204" pitchFamily="34" charset="0"/>
+              </a:rPr>
+              <a:t> колекция от данни, която съдържа елементи от един и същи тип.</a:t>
+            </a:r>
+            <a:r>
+              <a:rPr lang="en-US" sz="2400" dirty="0">
+                <a:solidFill>
+                  <a:schemeClr val="tx1"/>
+                </a:solidFill>
+                <a:latin typeface="Arial" panose="020B0604020202020204" pitchFamily="34" charset="0"/>
+                <a:cs typeface="Arial" panose="020B0604020202020204" pitchFamily="34" charset="0"/>
+              </a:rPr>
+              <a:t> </a:t>
+            </a:r>
+            <a:r>
+              <a:rPr lang="bg-BG" sz="2400" dirty="0">
+                <a:solidFill>
+                  <a:schemeClr val="tx1"/>
+                </a:solidFill>
+                <a:latin typeface="Arial" panose="020B0604020202020204" pitchFamily="34" charset="0"/>
+                <a:cs typeface="Arial" panose="020B0604020202020204" pitchFamily="34" charset="0"/>
+              </a:rPr>
+              <a:t>Много са подобни на масивите, с тази разлика, че може да бъде променян размера им и да се добавят нови елементи към тях.</a:t>
+            </a:r>
+          </a:p>
+          <a:p>
+            <a:pPr marL="0" indent="0">
+              <a:buNone/>
+            </a:pPr>
+            <a:r>
+              <a:rPr lang="bg-BG" dirty="0">
+                <a:latin typeface="Arial" panose="020B0604020202020204" pitchFamily="34" charset="0"/>
+                <a:cs typeface="Arial" panose="020B0604020202020204" pitchFamily="34" charset="0"/>
+              </a:rPr>
+              <a:t>   </a:t>
+            </a:r>
+          </a:p>
+          <a:p>
+            <a:pPr marL="0" indent="0">
+              <a:buNone/>
+            </a:pPr>
+            <a:endParaRPr lang="bg-BG" dirty="0">
+              <a:latin typeface="Arial" panose="020B0604020202020204" pitchFamily="34" charset="0"/>
+              <a:cs typeface="Arial" panose="020B0604020202020204" pitchFamily="34" charset="0"/>
+            </a:endParaRPr>
+          </a:p>
+          <a:p>
+            <a:endParaRPr lang="bg-BG" dirty="0">
+              <a:latin typeface="Arial" panose="020B0604020202020204" pitchFamily="34" charset="0"/>
+              <a:cs typeface="Arial" panose="020B0604020202020204" pitchFamily="34" charset="0"/>
+            </a:endParaRPr>
+          </a:p>
+          <a:p>
+            <a:endParaRPr lang="bg-BG" dirty="0">
+              <a:latin typeface="Arial" panose="020B0604020202020204" pitchFamily="34" charset="0"/>
+              <a:cs typeface="Arial" panose="020B0604020202020204" pitchFamily="34" charset="0"/>
+            </a:endParaRPr>
+          </a:p>
+        </p:txBody>
+      </p:sp>
+      <p:pic>
+        <p:nvPicPr>
+          <p:cNvPr id="7" name="Картина 6">
+            <a:extLst>
+              <a:ext uri="{FF2B5EF4-FFF2-40B4-BE49-F238E27FC236}">
+                <a16:creationId xmlns:a16="http://schemas.microsoft.com/office/drawing/2014/main" id="{5C206563-E068-3CDA-1611-E45D2F1EB4A9}"/>
+              </a:ext>
+            </a:extLst>
+          </p:cNvPr>
+          <p:cNvPicPr>
+            <a:picLocks noChangeAspect="1"/>
+          </p:cNvPicPr>
+          <p:nvPr/>
+        </p:nvPicPr>
+        <p:blipFill>
+          <a:blip r:embed="rId2">
+            <a:extLst>
+              <a:ext uri="{28A0092B-C50C-407E-A947-70E740481C1C}">
+                <a14:useLocalDpi xmlns:a14="http://schemas.microsoft.com/office/drawing/2010/main" val="0"/>
+              </a:ext>
+            </a:extLst>
+          </a:blip>
+          <a:stretch>
+            <a:fillRect/>
+          </a:stretch>
+        </p:blipFill>
+        <p:spPr>
+          <a:xfrm>
+            <a:off x="3575897" y="3349625"/>
+            <a:ext cx="6105525" cy="2962275"/>
+          </a:xfrm>
+          <a:prstGeom prst="rect">
+            <a:avLst/>
+          </a:prstGeom>
+        </p:spPr>
+      </p:pic>
+      <p:cxnSp>
+        <p:nvCxnSpPr>
+          <p:cNvPr id="9" name="Съединител: с чупка 8">
+            <a:extLst>
+              <a:ext uri="{FF2B5EF4-FFF2-40B4-BE49-F238E27FC236}">
+                <a16:creationId xmlns:a16="http://schemas.microsoft.com/office/drawing/2014/main" id="{25BB9061-A900-E794-D43B-CFCF07529087}"/>
+              </a:ext>
+            </a:extLst>
+          </p:cNvPr>
+          <p:cNvCxnSpPr>
+            <a:cxnSpLocks/>
+          </p:cNvCxnSpPr>
+          <p:nvPr/>
+        </p:nvCxnSpPr>
+        <p:spPr>
+          <a:xfrm rot="16200000" flipH="1">
+            <a:off x="6625700" y="3740456"/>
+            <a:ext cx="488275" cy="482359"/>
+          </a:xfrm>
+          <a:prstGeom prst="bentConnector3">
+            <a:avLst>
+              <a:gd name="adj1" fmla="val 50000"/>
+            </a:avLst>
+          </a:prstGeom>
+          <a:ln>
+            <a:solidFill>
+              <a:schemeClr val="tx1"/>
+            </a:solidFill>
+            <a:tailEnd type="triangle"/>
+          </a:ln>
+        </p:spPr>
+        <p:style>
+          <a:lnRef idx="1">
+            <a:schemeClr val="accent1"/>
+          </a:lnRef>
+          <a:fillRef idx="0">
+            <a:schemeClr val="accent1"/>
+          </a:fillRef>
+          <a:effectRef idx="0">
+            <a:schemeClr val="accent1"/>
+          </a:effectRef>
+          <a:fontRef idx="minor">
+            <a:schemeClr val="tx1"/>
+          </a:fontRef>
+        </p:style>
+      </p:cxnSp>
+      <p:sp>
+        <p:nvSpPr>
+          <p:cNvPr id="15" name="Текстово поле 14">
+            <a:extLst>
+              <a:ext uri="{FF2B5EF4-FFF2-40B4-BE49-F238E27FC236}">
+                <a16:creationId xmlns:a16="http://schemas.microsoft.com/office/drawing/2014/main" id="{84A1EA49-3EC9-7167-193A-F83D6EA27833}"/>
+              </a:ext>
+            </a:extLst>
+          </p:cNvPr>
+          <p:cNvSpPr txBox="1"/>
+          <p:nvPr/>
+        </p:nvSpPr>
+        <p:spPr>
+          <a:xfrm>
+            <a:off x="1903519" y="3836084"/>
+            <a:ext cx="2044340" cy="646331"/>
+          </a:xfrm>
+          <a:prstGeom prst="rect">
+            <a:avLst/>
+          </a:prstGeom>
+          <a:noFill/>
+        </p:spPr>
+        <p:txBody>
+          <a:bodyPr wrap="square" rtlCol="0">
+            <a:spAutoFit/>
+          </a:bodyPr>
+          <a:lstStyle/>
+          <a:p>
+            <a:r>
+              <a:rPr lang="bg-BG" dirty="0"/>
+              <a:t>Начален масив</a:t>
+            </a:r>
+          </a:p>
+          <a:p>
+            <a:r>
+              <a:rPr lang="bg-BG" dirty="0"/>
+              <a:t>(4 елемента)</a:t>
+            </a:r>
+            <a:endParaRPr lang="en-US" dirty="0"/>
+          </a:p>
+        </p:txBody>
+      </p:sp>
+      <p:sp>
+        <p:nvSpPr>
+          <p:cNvPr id="16" name="Текстово поле 15">
+            <a:extLst>
+              <a:ext uri="{FF2B5EF4-FFF2-40B4-BE49-F238E27FC236}">
+                <a16:creationId xmlns:a16="http://schemas.microsoft.com/office/drawing/2014/main" id="{FD197CEB-D467-E099-0767-F841CB87AB7B}"/>
+              </a:ext>
+            </a:extLst>
+          </p:cNvPr>
+          <p:cNvSpPr txBox="1"/>
+          <p:nvPr/>
+        </p:nvSpPr>
+        <p:spPr>
+          <a:xfrm>
+            <a:off x="7164556" y="3556522"/>
+            <a:ext cx="2235370" cy="646331"/>
+          </a:xfrm>
+          <a:prstGeom prst="rect">
+            <a:avLst/>
+          </a:prstGeom>
+          <a:noFill/>
+        </p:spPr>
+        <p:txBody>
+          <a:bodyPr wrap="square" rtlCol="0">
+            <a:spAutoFit/>
+          </a:bodyPr>
+          <a:lstStyle/>
+          <a:p>
+            <a:r>
+              <a:rPr lang="bg-BG" dirty="0"/>
+              <a:t>Добавяне на нов елемент</a:t>
+            </a:r>
+            <a:endParaRPr lang="en-US" dirty="0"/>
+          </a:p>
+        </p:txBody>
+      </p:sp>
+      <p:sp>
+        <p:nvSpPr>
+          <p:cNvPr id="17" name="Текстово поле 16">
+            <a:extLst>
+              <a:ext uri="{FF2B5EF4-FFF2-40B4-BE49-F238E27FC236}">
+                <a16:creationId xmlns:a16="http://schemas.microsoft.com/office/drawing/2014/main" id="{4DA7801A-9257-5BD6-A427-4C23C7651EEE}"/>
+              </a:ext>
+            </a:extLst>
+          </p:cNvPr>
+          <p:cNvSpPr txBox="1"/>
+          <p:nvPr/>
+        </p:nvSpPr>
+        <p:spPr>
+          <a:xfrm>
+            <a:off x="1712489" y="5150484"/>
+            <a:ext cx="1696536" cy="1477328"/>
+          </a:xfrm>
+          <a:prstGeom prst="rect">
+            <a:avLst/>
+          </a:prstGeom>
+          <a:noFill/>
+        </p:spPr>
+        <p:txBody>
+          <a:bodyPr wrap="square" rtlCol="0">
+            <a:spAutoFit/>
+          </a:bodyPr>
+          <a:lstStyle/>
+          <a:p>
+            <a:r>
+              <a:rPr lang="bg-BG" dirty="0"/>
+              <a:t>Заделяне на памет за нов масив с капацитет 8 елемента</a:t>
+            </a:r>
+          </a:p>
+        </p:txBody>
+      </p:sp>
+    </p:spTree>
+    <p:extLst>
+      <p:ext uri="{BB962C8B-B14F-4D97-AF65-F5344CB8AC3E}">
+        <p14:creationId xmlns:p14="http://schemas.microsoft.com/office/powerpoint/2010/main" val="1349082904"/>
+      </p:ext>
+    </p:extLst>
+  </p:cSld>
+  <p:clrMapOvr>
+    <a:masterClrMapping/>
+  </p:clrMapOvr>
+</p:sld>
+</file>
+
+<file path=ppt/slides/slide18.xml><?xml version="1.0" encoding="utf-8"?>
+<p:sld xmlns:a="http://schemas.openxmlformats.org/drawingml/2006/main" xmlns:r="http://schemas.openxmlformats.org/officeDocument/2006/relationships" xmlns:p="http://schemas.openxmlformats.org/presentationml/2006/main">
+  <p:cSld>
+    <p:spTree>
+      <p:nvGrpSpPr>
+        <p:cNvPr id="1" name=""/>
+        <p:cNvGrpSpPr/>
+        <p:nvPr/>
+      </p:nvGrpSpPr>
+      <p:grpSpPr>
+        <a:xfrm>
+          <a:off x="0" y="0"/>
+          <a:ext cx="0" cy="0"/>
+          <a:chOff x="0" y="0"/>
+          <a:chExt cx="0" cy="0"/>
+        </a:xfrm>
+      </p:grpSpPr>
+      <p:sp>
+        <p:nvSpPr>
+          <p:cNvPr id="2" name="Заглавие 1">
+            <a:extLst>
+              <a:ext uri="{FF2B5EF4-FFF2-40B4-BE49-F238E27FC236}">
+                <a16:creationId xmlns:a16="http://schemas.microsoft.com/office/drawing/2014/main" id="{C2D9E43F-1715-4F40-6F58-2CDD50A69388}"/>
+              </a:ext>
+            </a:extLst>
+          </p:cNvPr>
+          <p:cNvSpPr>
+            <a:spLocks noGrp="1"/>
+          </p:cNvSpPr>
+          <p:nvPr>
+            <p:ph type="title"/>
+          </p:nvPr>
+        </p:nvSpPr>
+        <p:spPr/>
+        <p:txBody>
+          <a:bodyPr/>
+          <a:lstStyle/>
+          <a:p>
+            <a:pPr algn="ctr"/>
+            <a:r>
+              <a:rPr lang="bg-BG" dirty="0">
+                <a:solidFill>
+                  <a:schemeClr val="tx1"/>
+                </a:solidFill>
+                <a:latin typeface="Arial" panose="020B0604020202020204" pitchFamily="34" charset="0"/>
+                <a:cs typeface="Arial" panose="020B0604020202020204" pitchFamily="34" charset="0"/>
+              </a:rPr>
+              <a:t>Основни характеристики</a:t>
+            </a:r>
+            <a:endParaRPr lang="en-US" dirty="0">
+              <a:solidFill>
+                <a:schemeClr val="tx1"/>
+              </a:solidFill>
+              <a:latin typeface="Arial" panose="020B0604020202020204" pitchFamily="34" charset="0"/>
+              <a:cs typeface="Arial" panose="020B0604020202020204" pitchFamily="34" charset="0"/>
+            </a:endParaRPr>
+          </a:p>
+        </p:txBody>
+      </p:sp>
+      <p:sp>
+        <p:nvSpPr>
+          <p:cNvPr id="3" name="Контейнер за съдържание 2">
+            <a:extLst>
+              <a:ext uri="{FF2B5EF4-FFF2-40B4-BE49-F238E27FC236}">
+                <a16:creationId xmlns:a16="http://schemas.microsoft.com/office/drawing/2014/main" id="{77CCFAFE-5000-4530-459A-BA66BE783D1C}"/>
+              </a:ext>
+            </a:extLst>
+          </p:cNvPr>
+          <p:cNvSpPr>
+            <a:spLocks noGrp="1"/>
+          </p:cNvSpPr>
+          <p:nvPr>
+            <p:ph idx="1"/>
+          </p:nvPr>
+        </p:nvSpPr>
+        <p:spPr/>
+        <p:txBody>
+          <a:bodyPr/>
+          <a:lstStyle/>
+          <a:p>
+            <a:r>
+              <a:rPr lang="bg-BG" dirty="0">
+                <a:solidFill>
+                  <a:schemeClr val="tx1"/>
+                </a:solidFill>
+                <a:latin typeface="Arial" panose="020B0604020202020204" pitchFamily="34" charset="0"/>
+                <a:cs typeface="Arial" panose="020B0604020202020204" pitchFamily="34" charset="0"/>
+              </a:rPr>
+              <a:t>Достъпът до елементите е през </a:t>
+            </a:r>
+            <a:r>
+              <a:rPr lang="bg-BG" dirty="0" err="1">
+                <a:solidFill>
+                  <a:srgbClr val="FFFF00"/>
+                </a:solidFill>
+                <a:latin typeface="Arial" panose="020B0604020202020204" pitchFamily="34" charset="0"/>
+                <a:cs typeface="Arial" panose="020B0604020202020204" pitchFamily="34" charset="0"/>
+              </a:rPr>
+              <a:t>индексатор</a:t>
+            </a:r>
+            <a:r>
+              <a:rPr lang="bg-BG" dirty="0">
+                <a:solidFill>
+                  <a:schemeClr val="tx1"/>
+                </a:solidFill>
+                <a:latin typeface="Arial" panose="020B0604020202020204" pitchFamily="34" charset="0"/>
+                <a:cs typeface="Arial" panose="020B0604020202020204" pitchFamily="34" charset="0"/>
+              </a:rPr>
+              <a:t>, както при масивите</a:t>
+            </a:r>
+          </a:p>
+          <a:p>
+            <a:endParaRPr lang="bg-BG" dirty="0">
+              <a:latin typeface="Arial" panose="020B0604020202020204" pitchFamily="34" charset="0"/>
+              <a:cs typeface="Arial" panose="020B0604020202020204" pitchFamily="34" charset="0"/>
+            </a:endParaRPr>
+          </a:p>
+          <a:p>
+            <a:r>
+              <a:rPr lang="bg-BG" dirty="0">
+                <a:solidFill>
+                  <a:schemeClr val="tx1"/>
+                </a:solidFill>
+                <a:latin typeface="Arial" panose="020B0604020202020204" pitchFamily="34" charset="0"/>
+                <a:cs typeface="Arial" panose="020B0604020202020204" pitchFamily="34" charset="0"/>
+              </a:rPr>
+              <a:t>Могат да се </a:t>
+            </a:r>
+            <a:r>
+              <a:rPr lang="bg-BG" dirty="0">
+                <a:solidFill>
+                  <a:srgbClr val="FFFF00"/>
+                </a:solidFill>
+                <a:latin typeface="Arial" panose="020B0604020202020204" pitchFamily="34" charset="0"/>
+                <a:cs typeface="Arial" panose="020B0604020202020204" pitchFamily="34" charset="0"/>
+              </a:rPr>
+              <a:t>разширяват</a:t>
+            </a:r>
+            <a:r>
+              <a:rPr lang="bg-BG" dirty="0">
+                <a:latin typeface="Arial" panose="020B0604020202020204" pitchFamily="34" charset="0"/>
+                <a:cs typeface="Arial" panose="020B0604020202020204" pitchFamily="34" charset="0"/>
+              </a:rPr>
+              <a:t> </a:t>
+            </a:r>
+            <a:r>
+              <a:rPr lang="bg-BG" dirty="0">
+                <a:solidFill>
+                  <a:schemeClr val="tx1"/>
+                </a:solidFill>
+                <a:latin typeface="Arial" panose="020B0604020202020204" pitchFamily="34" charset="0"/>
+                <a:cs typeface="Arial" panose="020B0604020202020204" pitchFamily="34" charset="0"/>
+              </a:rPr>
+              <a:t>и</a:t>
+            </a:r>
+            <a:r>
+              <a:rPr lang="bg-BG" dirty="0">
+                <a:latin typeface="Arial" panose="020B0604020202020204" pitchFamily="34" charset="0"/>
+                <a:cs typeface="Arial" panose="020B0604020202020204" pitchFamily="34" charset="0"/>
+              </a:rPr>
+              <a:t> </a:t>
+            </a:r>
+            <a:r>
+              <a:rPr lang="bg-BG" dirty="0">
+                <a:solidFill>
+                  <a:srgbClr val="FFFF00"/>
+                </a:solidFill>
+                <a:latin typeface="Arial" panose="020B0604020202020204" pitchFamily="34" charset="0"/>
+                <a:cs typeface="Arial" panose="020B0604020202020204" pitchFamily="34" charset="0"/>
+              </a:rPr>
+              <a:t>свиват</a:t>
+            </a:r>
+            <a:r>
+              <a:rPr lang="bg-BG" dirty="0">
+                <a:latin typeface="Arial" panose="020B0604020202020204" pitchFamily="34" charset="0"/>
+                <a:cs typeface="Arial" panose="020B0604020202020204" pitchFamily="34" charset="0"/>
+              </a:rPr>
+              <a:t> </a:t>
+            </a:r>
+            <a:r>
+              <a:rPr lang="bg-BG" dirty="0">
+                <a:solidFill>
+                  <a:schemeClr val="tx1"/>
+                </a:solidFill>
+                <a:latin typeface="Arial" panose="020B0604020202020204" pitchFamily="34" charset="0"/>
+                <a:cs typeface="Arial" panose="020B0604020202020204" pitchFamily="34" charset="0"/>
+              </a:rPr>
+              <a:t>автоматично в зависимост от това какво се случва с броя елементи към момента</a:t>
+            </a:r>
+          </a:p>
+          <a:p>
+            <a:endParaRPr lang="bg-BG" dirty="0">
+              <a:latin typeface="Arial" panose="020B0604020202020204" pitchFamily="34" charset="0"/>
+              <a:cs typeface="Arial" panose="020B0604020202020204" pitchFamily="34" charset="0"/>
+            </a:endParaRPr>
+          </a:p>
+          <a:p>
+            <a:r>
+              <a:rPr lang="bg-BG" dirty="0">
+                <a:solidFill>
+                  <a:schemeClr val="tx1"/>
+                </a:solidFill>
+                <a:latin typeface="Arial" panose="020B0604020202020204" pitchFamily="34" charset="0"/>
+                <a:cs typeface="Arial" panose="020B0604020202020204" pitchFamily="34" charset="0"/>
+              </a:rPr>
+              <a:t>Имат множество методи към тях, които могат да бъдат използвани</a:t>
+            </a:r>
+            <a:r>
+              <a:rPr lang="bg-BG" dirty="0">
+                <a:latin typeface="Arial" panose="020B0604020202020204" pitchFamily="34" charset="0"/>
+                <a:cs typeface="Arial" panose="020B0604020202020204" pitchFamily="34" charset="0"/>
+              </a:rPr>
+              <a:t>.</a:t>
+            </a:r>
+          </a:p>
+          <a:p>
+            <a:endParaRPr lang="bg-BG" dirty="0"/>
+          </a:p>
+          <a:p>
+            <a:endParaRPr lang="bg-BG" dirty="0"/>
+          </a:p>
+          <a:p>
+            <a:endParaRPr lang="bg-BG" dirty="0"/>
+          </a:p>
+        </p:txBody>
+      </p:sp>
+    </p:spTree>
+    <p:extLst>
+      <p:ext uri="{BB962C8B-B14F-4D97-AF65-F5344CB8AC3E}">
+        <p14:creationId xmlns:p14="http://schemas.microsoft.com/office/powerpoint/2010/main" val="3083162030"/>
+      </p:ext>
+    </p:extLst>
+  </p:cSld>
+  <p:clrMapOvr>
+    <a:masterClrMapping/>
+  </p:clrMapOvr>
+</p:sld>
+</file>
+
+<file path=ppt/slides/slide19.xml><?xml version="1.0" encoding="utf-8"?>
+<p:sld xmlns:a="http://schemas.openxmlformats.org/drawingml/2006/main" xmlns:r="http://schemas.openxmlformats.org/officeDocument/2006/relationships" xmlns:p="http://schemas.openxmlformats.org/presentationml/2006/main">
+  <p:cSld>
+    <p:spTree>
+      <p:nvGrpSpPr>
+        <p:cNvPr id="1" name=""/>
+        <p:cNvGrpSpPr/>
+        <p:nvPr/>
+      </p:nvGrpSpPr>
+      <p:grpSpPr>
+        <a:xfrm>
+          <a:off x="0" y="0"/>
+          <a:ext cx="0" cy="0"/>
+          <a:chOff x="0" y="0"/>
+          <a:chExt cx="0" cy="0"/>
+        </a:xfrm>
+      </p:grpSpPr>
+      <p:sp>
+        <p:nvSpPr>
+          <p:cNvPr id="2" name="Заглавие 1">
+            <a:extLst>
+              <a:ext uri="{FF2B5EF4-FFF2-40B4-BE49-F238E27FC236}">
+                <a16:creationId xmlns:a16="http://schemas.microsoft.com/office/drawing/2014/main" id="{E4B3DE4D-BD37-1F80-7A44-89DAAFCE62DF}"/>
+              </a:ext>
+            </a:extLst>
+          </p:cNvPr>
+          <p:cNvSpPr>
+            <a:spLocks noGrp="1"/>
+          </p:cNvSpPr>
+          <p:nvPr>
+            <p:ph type="title"/>
+          </p:nvPr>
+        </p:nvSpPr>
+        <p:spPr/>
+        <p:txBody>
+          <a:bodyPr/>
+          <a:lstStyle/>
+          <a:p>
+            <a:pPr algn="ctr"/>
+            <a:r>
+              <a:rPr lang="bg-BG" dirty="0"/>
+              <a:t>Основни методи за работа</a:t>
+            </a:r>
+            <a:endParaRPr lang="en-US" dirty="0"/>
+          </a:p>
+        </p:txBody>
+      </p:sp>
+      <p:sp>
+        <p:nvSpPr>
+          <p:cNvPr id="3" name="Контейнер за съдържание 2">
+            <a:extLst>
+              <a:ext uri="{FF2B5EF4-FFF2-40B4-BE49-F238E27FC236}">
+                <a16:creationId xmlns:a16="http://schemas.microsoft.com/office/drawing/2014/main" id="{C7A99CB0-9BA4-D896-137F-1DE63FA838CE}"/>
+              </a:ext>
+            </a:extLst>
+          </p:cNvPr>
+          <p:cNvSpPr>
+            <a:spLocks noGrp="1"/>
+          </p:cNvSpPr>
+          <p:nvPr>
+            <p:ph idx="1"/>
+          </p:nvPr>
+        </p:nvSpPr>
+        <p:spPr/>
+        <p:txBody>
+          <a:bodyPr/>
+          <a:lstStyle/>
+          <a:p>
+            <a:r>
+              <a:rPr lang="en-US" dirty="0">
+                <a:solidFill>
+                  <a:schemeClr val="accent3">
+                    <a:lumMod val="60000"/>
+                    <a:lumOff val="40000"/>
+                  </a:schemeClr>
+                </a:solidFill>
+              </a:rPr>
+              <a:t>Add</a:t>
+            </a:r>
+            <a:r>
+              <a:rPr lang="en-US" dirty="0"/>
+              <a:t>(</a:t>
+            </a:r>
+            <a:r>
+              <a:rPr lang="en-US" dirty="0">
+                <a:solidFill>
+                  <a:schemeClr val="tx2">
+                    <a:lumMod val="75000"/>
+                  </a:schemeClr>
+                </a:solidFill>
+              </a:rPr>
+              <a:t>element</a:t>
+            </a:r>
+            <a:r>
+              <a:rPr lang="en-US" dirty="0"/>
+              <a:t>) </a:t>
+            </a:r>
+            <a:r>
+              <a:rPr lang="en-US" dirty="0">
+                <a:solidFill>
+                  <a:schemeClr val="tx1"/>
+                </a:solidFill>
+              </a:rPr>
+              <a:t>–</a:t>
+            </a:r>
+            <a:r>
+              <a:rPr lang="en-US" dirty="0"/>
+              <a:t> </a:t>
+            </a:r>
+            <a:r>
+              <a:rPr lang="bg-BG" dirty="0">
+                <a:solidFill>
+                  <a:schemeClr val="tx1"/>
+                </a:solidFill>
+              </a:rPr>
+              <a:t>добавя елемент в списъка</a:t>
+            </a:r>
+          </a:p>
+          <a:p>
+            <a:r>
+              <a:rPr lang="en-US" dirty="0">
+                <a:solidFill>
+                  <a:schemeClr val="accent3">
+                    <a:lumMod val="60000"/>
+                    <a:lumOff val="40000"/>
+                  </a:schemeClr>
+                </a:solidFill>
+              </a:rPr>
+              <a:t>Remove</a:t>
+            </a:r>
+            <a:r>
+              <a:rPr lang="en-US" dirty="0"/>
+              <a:t>(</a:t>
+            </a:r>
+            <a:r>
+              <a:rPr lang="en-US" dirty="0">
+                <a:solidFill>
+                  <a:schemeClr val="tx2">
+                    <a:lumMod val="75000"/>
+                  </a:schemeClr>
+                </a:solidFill>
+              </a:rPr>
+              <a:t>element</a:t>
+            </a:r>
+            <a:r>
+              <a:rPr lang="en-US" dirty="0"/>
+              <a:t>) </a:t>
+            </a:r>
+            <a:r>
+              <a:rPr lang="en-US" dirty="0">
+                <a:solidFill>
+                  <a:schemeClr val="tx1"/>
+                </a:solidFill>
+              </a:rPr>
+              <a:t>–</a:t>
+            </a:r>
+            <a:r>
+              <a:rPr lang="en-US" dirty="0"/>
+              <a:t> </a:t>
+            </a:r>
+            <a:r>
+              <a:rPr lang="bg-BG" dirty="0">
+                <a:solidFill>
+                  <a:schemeClr val="tx1"/>
+                </a:solidFill>
+              </a:rPr>
+              <a:t>изтрива елемент от списъка</a:t>
+            </a:r>
+          </a:p>
+          <a:p>
+            <a:r>
+              <a:rPr lang="en-US" dirty="0" err="1">
+                <a:solidFill>
+                  <a:schemeClr val="accent3">
+                    <a:lumMod val="60000"/>
+                    <a:lumOff val="40000"/>
+                  </a:schemeClr>
+                </a:solidFill>
+              </a:rPr>
+              <a:t>RemoveAt</a:t>
+            </a:r>
+            <a:r>
+              <a:rPr lang="en-US" dirty="0"/>
+              <a:t>(</a:t>
+            </a:r>
+            <a:r>
+              <a:rPr lang="en-US" dirty="0">
+                <a:solidFill>
+                  <a:schemeClr val="tx2">
+                    <a:lumMod val="75000"/>
+                  </a:schemeClr>
+                </a:solidFill>
+              </a:rPr>
+              <a:t>index</a:t>
+            </a:r>
+            <a:r>
+              <a:rPr lang="en-US" dirty="0"/>
+              <a:t>) </a:t>
+            </a:r>
+            <a:r>
+              <a:rPr lang="bg-BG" dirty="0">
+                <a:solidFill>
+                  <a:schemeClr val="tx1"/>
+                </a:solidFill>
+              </a:rPr>
+              <a:t>–</a:t>
+            </a:r>
+            <a:r>
+              <a:rPr lang="bg-BG" dirty="0"/>
+              <a:t> </a:t>
+            </a:r>
+            <a:r>
+              <a:rPr lang="bg-BG" dirty="0">
+                <a:solidFill>
+                  <a:schemeClr val="tx1"/>
+                </a:solidFill>
+              </a:rPr>
+              <a:t>изтрива елемент по даден индекс</a:t>
+            </a:r>
+          </a:p>
+          <a:p>
+            <a:r>
+              <a:rPr lang="en-US" dirty="0">
+                <a:solidFill>
+                  <a:schemeClr val="accent3">
+                    <a:lumMod val="60000"/>
+                    <a:lumOff val="40000"/>
+                  </a:schemeClr>
+                </a:solidFill>
+              </a:rPr>
+              <a:t>Insert</a:t>
+            </a:r>
+            <a:r>
+              <a:rPr lang="en-US" dirty="0"/>
+              <a:t>(</a:t>
+            </a:r>
+            <a:r>
+              <a:rPr lang="en-US" dirty="0">
+                <a:solidFill>
+                  <a:schemeClr val="tx2">
+                    <a:lumMod val="75000"/>
+                  </a:schemeClr>
+                </a:solidFill>
+              </a:rPr>
+              <a:t>index</a:t>
+            </a:r>
+            <a:r>
+              <a:rPr lang="en-US" dirty="0"/>
+              <a:t>, </a:t>
+            </a:r>
+            <a:r>
+              <a:rPr lang="en-US" dirty="0">
+                <a:solidFill>
+                  <a:schemeClr val="tx2">
+                    <a:lumMod val="75000"/>
+                  </a:schemeClr>
+                </a:solidFill>
+              </a:rPr>
+              <a:t>element</a:t>
+            </a:r>
+            <a:r>
+              <a:rPr lang="en-US" dirty="0"/>
+              <a:t>) </a:t>
+            </a:r>
+            <a:r>
+              <a:rPr lang="en-US" dirty="0">
+                <a:solidFill>
+                  <a:schemeClr val="tx1"/>
+                </a:solidFill>
+              </a:rPr>
+              <a:t>–</a:t>
+            </a:r>
+            <a:r>
+              <a:rPr lang="en-US" dirty="0"/>
+              <a:t> </a:t>
+            </a:r>
+            <a:r>
+              <a:rPr lang="bg-BG" dirty="0">
+                <a:solidFill>
+                  <a:schemeClr val="tx1"/>
+                </a:solidFill>
+              </a:rPr>
+              <a:t>вмъква елемент на посочения индекс</a:t>
+            </a:r>
+          </a:p>
+          <a:p>
+            <a:r>
+              <a:rPr lang="en-US" dirty="0">
+                <a:solidFill>
+                  <a:schemeClr val="accent3">
+                    <a:lumMod val="60000"/>
+                    <a:lumOff val="40000"/>
+                  </a:schemeClr>
+                </a:solidFill>
+              </a:rPr>
+              <a:t>Contains</a:t>
+            </a:r>
+            <a:r>
+              <a:rPr lang="en-US" dirty="0"/>
+              <a:t>(</a:t>
+            </a:r>
+            <a:r>
+              <a:rPr lang="en-US" dirty="0">
+                <a:solidFill>
+                  <a:schemeClr val="tx2">
+                    <a:lumMod val="75000"/>
+                  </a:schemeClr>
+                </a:solidFill>
+              </a:rPr>
+              <a:t>element</a:t>
+            </a:r>
+            <a:r>
+              <a:rPr lang="en-US" dirty="0"/>
+              <a:t>) </a:t>
+            </a:r>
+            <a:r>
+              <a:rPr lang="bg-BG" dirty="0">
+                <a:solidFill>
+                  <a:schemeClr val="tx1"/>
+                </a:solidFill>
+              </a:rPr>
+              <a:t>–</a:t>
+            </a:r>
+            <a:r>
+              <a:rPr lang="bg-BG" dirty="0"/>
+              <a:t> </a:t>
+            </a:r>
+            <a:r>
+              <a:rPr lang="bg-BG" dirty="0">
+                <a:solidFill>
+                  <a:schemeClr val="tx1"/>
+                </a:solidFill>
+              </a:rPr>
+              <a:t>проверява дали елемента е в списъка</a:t>
+            </a:r>
+          </a:p>
+          <a:p>
+            <a:r>
+              <a:rPr lang="en-US" dirty="0">
+                <a:solidFill>
+                  <a:schemeClr val="accent3">
+                    <a:lumMod val="60000"/>
+                    <a:lumOff val="40000"/>
+                  </a:schemeClr>
+                </a:solidFill>
+              </a:rPr>
+              <a:t>Sort</a:t>
+            </a:r>
+            <a:r>
+              <a:rPr lang="en-US" dirty="0"/>
+              <a:t>() </a:t>
+            </a:r>
+            <a:r>
+              <a:rPr lang="en-US" dirty="0">
+                <a:solidFill>
+                  <a:schemeClr val="tx1"/>
+                </a:solidFill>
+              </a:rPr>
+              <a:t>–</a:t>
+            </a:r>
+            <a:r>
+              <a:rPr lang="en-US" dirty="0"/>
+              <a:t> </a:t>
+            </a:r>
+            <a:r>
+              <a:rPr lang="bg-BG" dirty="0">
+                <a:solidFill>
+                  <a:schemeClr val="tx1"/>
+                </a:solidFill>
+              </a:rPr>
+              <a:t>сортира елементите на списъка</a:t>
+            </a:r>
+          </a:p>
+          <a:p>
+            <a:pPr marL="0" indent="0">
+              <a:buNone/>
+            </a:pPr>
+            <a:endParaRPr lang="bg-BG" dirty="0"/>
+          </a:p>
+          <a:p>
+            <a:r>
+              <a:rPr lang="en-US" dirty="0">
+                <a:solidFill>
+                  <a:schemeClr val="accent6">
+                    <a:lumMod val="60000"/>
+                    <a:lumOff val="40000"/>
+                  </a:schemeClr>
+                </a:solidFill>
+              </a:rPr>
+              <a:t>Count</a:t>
+            </a:r>
+            <a:r>
+              <a:rPr lang="en-US" dirty="0"/>
+              <a:t> </a:t>
+            </a:r>
+            <a:r>
+              <a:rPr lang="en-US" dirty="0">
+                <a:solidFill>
+                  <a:schemeClr val="tx1"/>
+                </a:solidFill>
+              </a:rPr>
+              <a:t>/property/</a:t>
+            </a:r>
+            <a:r>
+              <a:rPr lang="en-US" dirty="0"/>
+              <a:t> </a:t>
+            </a:r>
+            <a:r>
+              <a:rPr lang="en-US" dirty="0">
+                <a:solidFill>
+                  <a:schemeClr val="tx1"/>
+                </a:solidFill>
+              </a:rPr>
+              <a:t>- </a:t>
+            </a:r>
+            <a:r>
+              <a:rPr lang="bg-BG" dirty="0">
+                <a:solidFill>
+                  <a:schemeClr val="tx1"/>
+                </a:solidFill>
+              </a:rPr>
+              <a:t>връща броя на елементите в списъка</a:t>
+            </a:r>
+          </a:p>
+          <a:p>
+            <a:endParaRPr lang="bg-BG" dirty="0"/>
+          </a:p>
+        </p:txBody>
+      </p:sp>
+    </p:spTree>
+    <p:extLst>
+      <p:ext uri="{BB962C8B-B14F-4D97-AF65-F5344CB8AC3E}">
+        <p14:creationId xmlns:p14="http://schemas.microsoft.com/office/powerpoint/2010/main" val="1325010932"/>
+      </p:ext>
+    </p:extLst>
+  </p:cSld>
+  <p:clrMapOvr>
+    <a:masterClrMapping/>
+  </p:clrMapOvr>
+</p:sld>
+</file>
+
 <file path=ppt/slides/slide2.xml><?xml version="1.0" encoding="utf-8"?>
 <p:sld xmlns:a="http://schemas.openxmlformats.org/drawingml/2006/main" xmlns:r="http://schemas.openxmlformats.org/officeDocument/2006/relationships" xmlns:p="http://schemas.openxmlformats.org/presentationml/2006/main">
   <p:cSld>
@@ -10157,6 +11254,2548 @@
 </p:sld>
 </file>
 
+<file path=ppt/slides/slide20.xml><?xml version="1.0" encoding="utf-8"?>
+<p:sld xmlns:a="http://schemas.openxmlformats.org/drawingml/2006/main" xmlns:r="http://schemas.openxmlformats.org/officeDocument/2006/relationships" xmlns:p="http://schemas.openxmlformats.org/presentationml/2006/main">
+  <p:cSld>
+    <p:spTree>
+      <p:nvGrpSpPr>
+        <p:cNvPr id="1" name=""/>
+        <p:cNvGrpSpPr/>
+        <p:nvPr/>
+      </p:nvGrpSpPr>
+      <p:grpSpPr>
+        <a:xfrm>
+          <a:off x="0" y="0"/>
+          <a:ext cx="0" cy="0"/>
+          <a:chOff x="0" y="0"/>
+          <a:chExt cx="0" cy="0"/>
+        </a:xfrm>
+      </p:grpSpPr>
+      <p:sp>
+        <p:nvSpPr>
+          <p:cNvPr id="2" name="Заглавие 1">
+            <a:extLst>
+              <a:ext uri="{FF2B5EF4-FFF2-40B4-BE49-F238E27FC236}">
+                <a16:creationId xmlns:a16="http://schemas.microsoft.com/office/drawing/2014/main" id="{5FB72691-2AEB-A0D4-6BD2-B68059285322}"/>
+              </a:ext>
+            </a:extLst>
+          </p:cNvPr>
+          <p:cNvSpPr>
+            <a:spLocks noGrp="1"/>
+          </p:cNvSpPr>
+          <p:nvPr>
+            <p:ph type="title"/>
+          </p:nvPr>
+        </p:nvSpPr>
+        <p:spPr/>
+        <p:txBody>
+          <a:bodyPr>
+            <a:normAutofit/>
+          </a:bodyPr>
+          <a:lstStyle/>
+          <a:p>
+            <a:pPr algn="ctr"/>
+            <a:r>
+              <a:rPr lang="bg-BG" dirty="0">
+                <a:latin typeface="Arial" panose="020B0604020202020204" pitchFamily="34" charset="0"/>
+                <a:cs typeface="Arial" panose="020B0604020202020204" pitchFamily="34" charset="0"/>
+              </a:rPr>
+              <a:t>Създаване на списък</a:t>
+            </a:r>
+            <a:endParaRPr lang="en-US" dirty="0">
+              <a:latin typeface="Arial" panose="020B0604020202020204" pitchFamily="34" charset="0"/>
+              <a:cs typeface="Arial" panose="020B0604020202020204" pitchFamily="34" charset="0"/>
+            </a:endParaRPr>
+          </a:p>
+        </p:txBody>
+      </p:sp>
+      <p:sp>
+        <p:nvSpPr>
+          <p:cNvPr id="3" name="Контейнер за съдържание 2">
+            <a:extLst>
+              <a:ext uri="{FF2B5EF4-FFF2-40B4-BE49-F238E27FC236}">
+                <a16:creationId xmlns:a16="http://schemas.microsoft.com/office/drawing/2014/main" id="{919E5B60-90AD-1E52-B25B-8F2FF68B30C7}"/>
+              </a:ext>
+            </a:extLst>
+          </p:cNvPr>
+          <p:cNvSpPr>
+            <a:spLocks noGrp="1"/>
+          </p:cNvSpPr>
+          <p:nvPr>
+            <p:ph idx="1"/>
+          </p:nvPr>
+        </p:nvSpPr>
+        <p:spPr>
+          <a:xfrm>
+            <a:off x="1120000" y="3098307"/>
+            <a:ext cx="10233800" cy="3078655"/>
+          </a:xfrm>
+        </p:spPr>
+        <p:txBody>
+          <a:bodyPr/>
+          <a:lstStyle/>
+          <a:p>
+            <a:pPr marL="0" indent="0">
+              <a:buNone/>
+            </a:pPr>
+            <a:r>
+              <a:rPr lang="en-US" dirty="0">
+                <a:solidFill>
+                  <a:schemeClr val="tx2">
+                    <a:lumMod val="75000"/>
+                  </a:schemeClr>
+                </a:solidFill>
+                <a:latin typeface="Consolas" panose="020B0609020204030204" pitchFamily="49" charset="0"/>
+              </a:rPr>
+              <a:t>List</a:t>
+            </a:r>
+            <a:r>
+              <a:rPr lang="en-US" dirty="0">
+                <a:solidFill>
+                  <a:schemeClr val="tx1"/>
+                </a:solidFill>
+                <a:latin typeface="Consolas" panose="020B0609020204030204" pitchFamily="49" charset="0"/>
+              </a:rPr>
+              <a:t>&lt;</a:t>
+            </a:r>
+            <a:r>
+              <a:rPr lang="en-US" dirty="0">
+                <a:solidFill>
+                  <a:schemeClr val="accent6">
+                    <a:lumMod val="40000"/>
+                    <a:lumOff val="60000"/>
+                  </a:schemeClr>
+                </a:solidFill>
+                <a:latin typeface="Consolas" panose="020B0609020204030204" pitchFamily="49" charset="0"/>
+              </a:rPr>
+              <a:t>int</a:t>
+            </a:r>
+            <a:r>
+              <a:rPr lang="en-US" dirty="0">
+                <a:solidFill>
+                  <a:schemeClr val="tx1"/>
+                </a:solidFill>
+                <a:latin typeface="Consolas" panose="020B0609020204030204" pitchFamily="49" charset="0"/>
+              </a:rPr>
+              <a:t>&gt;</a:t>
+            </a:r>
+            <a:r>
+              <a:rPr lang="en-US" sz="2800" dirty="0">
+                <a:solidFill>
+                  <a:schemeClr val="tx1"/>
+                </a:solidFill>
+                <a:latin typeface="Consolas" panose="020B0609020204030204" pitchFamily="49" charset="0"/>
+              </a:rPr>
+              <a:t> </a:t>
+            </a:r>
+            <a:r>
+              <a:rPr lang="en-US" sz="2800" dirty="0" err="1">
+                <a:solidFill>
+                  <a:srgbClr val="92D050"/>
+                </a:solidFill>
+                <a:latin typeface="Consolas" panose="020B0609020204030204" pitchFamily="49" charset="0"/>
+              </a:rPr>
+              <a:t>myIntList</a:t>
+            </a:r>
+            <a:r>
+              <a:rPr lang="en-US" sz="2800" dirty="0">
+                <a:solidFill>
+                  <a:schemeClr val="tx1"/>
+                </a:solidFill>
+                <a:latin typeface="Consolas" panose="020B0609020204030204" pitchFamily="49" charset="0"/>
+              </a:rPr>
+              <a:t> = </a:t>
+            </a:r>
+            <a:r>
+              <a:rPr lang="en-US" sz="2800" dirty="0">
+                <a:solidFill>
+                  <a:schemeClr val="accent2">
+                    <a:lumMod val="75000"/>
+                  </a:schemeClr>
+                </a:solidFill>
+                <a:latin typeface="Consolas" panose="020B0609020204030204" pitchFamily="49" charset="0"/>
+              </a:rPr>
+              <a:t>new</a:t>
+            </a:r>
+            <a:r>
+              <a:rPr lang="en-US" sz="2800" dirty="0">
+                <a:solidFill>
+                  <a:schemeClr val="tx1"/>
+                </a:solidFill>
+                <a:latin typeface="Consolas" panose="020B0609020204030204" pitchFamily="49" charset="0"/>
+              </a:rPr>
+              <a:t> </a:t>
+            </a:r>
+            <a:r>
+              <a:rPr lang="en-US" sz="2800" dirty="0">
+                <a:solidFill>
+                  <a:schemeClr val="tx2">
+                    <a:lumMod val="75000"/>
+                  </a:schemeClr>
+                </a:solidFill>
+                <a:latin typeface="Consolas" panose="020B0609020204030204" pitchFamily="49" charset="0"/>
+              </a:rPr>
+              <a:t>List</a:t>
+            </a:r>
+            <a:r>
+              <a:rPr lang="en-US" sz="2800" dirty="0">
+                <a:solidFill>
+                  <a:schemeClr val="tx1"/>
+                </a:solidFill>
+                <a:latin typeface="Consolas" panose="020B0609020204030204" pitchFamily="49" charset="0"/>
+              </a:rPr>
+              <a:t>&lt;</a:t>
+            </a:r>
+            <a:r>
+              <a:rPr lang="en-US" sz="2800" dirty="0">
+                <a:solidFill>
+                  <a:schemeClr val="accent6">
+                    <a:lumMod val="40000"/>
+                    <a:lumOff val="60000"/>
+                  </a:schemeClr>
+                </a:solidFill>
+                <a:latin typeface="Consolas" panose="020B0609020204030204" pitchFamily="49" charset="0"/>
+              </a:rPr>
+              <a:t>int</a:t>
+            </a:r>
+            <a:r>
+              <a:rPr lang="en-US" sz="2800" dirty="0">
+                <a:solidFill>
+                  <a:schemeClr val="tx1"/>
+                </a:solidFill>
+                <a:latin typeface="Consolas" panose="020B0609020204030204" pitchFamily="49" charset="0"/>
+              </a:rPr>
+              <a:t>&gt;(); </a:t>
+            </a:r>
+          </a:p>
+          <a:p>
+            <a:pPr marL="0" indent="0">
+              <a:buNone/>
+            </a:pPr>
+            <a:endParaRPr lang="en-US" dirty="0">
+              <a:solidFill>
+                <a:schemeClr val="tx1"/>
+              </a:solidFill>
+              <a:latin typeface="Consolas" panose="020B0609020204030204" pitchFamily="49" charset="0"/>
+            </a:endParaRPr>
+          </a:p>
+          <a:p>
+            <a:pPr marL="0" indent="0">
+              <a:buNone/>
+            </a:pPr>
+            <a:r>
+              <a:rPr lang="en-US" sz="2800" dirty="0">
+                <a:solidFill>
+                  <a:schemeClr val="tx2">
+                    <a:lumMod val="75000"/>
+                  </a:schemeClr>
+                </a:solidFill>
+                <a:latin typeface="Consolas" panose="020B0609020204030204" pitchFamily="49" charset="0"/>
+              </a:rPr>
+              <a:t>List</a:t>
+            </a:r>
+            <a:r>
+              <a:rPr lang="en-US" sz="2800" dirty="0">
+                <a:solidFill>
+                  <a:schemeClr val="tx1"/>
+                </a:solidFill>
+                <a:latin typeface="Consolas" panose="020B0609020204030204" pitchFamily="49" charset="0"/>
+              </a:rPr>
+              <a:t>&lt;</a:t>
+            </a:r>
+            <a:r>
+              <a:rPr lang="en-US" sz="2800" dirty="0">
+                <a:solidFill>
+                  <a:schemeClr val="accent6">
+                    <a:lumMod val="40000"/>
+                    <a:lumOff val="60000"/>
+                  </a:schemeClr>
+                </a:solidFill>
+                <a:latin typeface="Consolas" panose="020B0609020204030204" pitchFamily="49" charset="0"/>
+              </a:rPr>
+              <a:t>string</a:t>
+            </a:r>
+            <a:r>
+              <a:rPr lang="en-US" sz="2800" dirty="0">
+                <a:solidFill>
+                  <a:schemeClr val="tx1"/>
+                </a:solidFill>
+                <a:latin typeface="Consolas" panose="020B0609020204030204" pitchFamily="49" charset="0"/>
+              </a:rPr>
+              <a:t>&gt; </a:t>
+            </a:r>
+            <a:r>
+              <a:rPr lang="en-US" sz="2800" dirty="0" err="1">
+                <a:solidFill>
+                  <a:schemeClr val="accent3"/>
+                </a:solidFill>
+                <a:latin typeface="Consolas" panose="020B0609020204030204" pitchFamily="49" charset="0"/>
+              </a:rPr>
+              <a:t>myStringList</a:t>
+            </a:r>
+            <a:r>
+              <a:rPr lang="en-US" sz="2800" dirty="0">
+                <a:solidFill>
+                  <a:schemeClr val="tx1"/>
+                </a:solidFill>
+                <a:latin typeface="Consolas" panose="020B0609020204030204" pitchFamily="49" charset="0"/>
+              </a:rPr>
+              <a:t> = </a:t>
+            </a:r>
+            <a:r>
+              <a:rPr lang="en-US" sz="2800" dirty="0">
+                <a:solidFill>
+                  <a:schemeClr val="accent2">
+                    <a:lumMod val="75000"/>
+                  </a:schemeClr>
+                </a:solidFill>
+                <a:latin typeface="Consolas" panose="020B0609020204030204" pitchFamily="49" charset="0"/>
+              </a:rPr>
+              <a:t>new</a:t>
+            </a:r>
+            <a:r>
+              <a:rPr lang="en-US" sz="2800" dirty="0">
+                <a:solidFill>
+                  <a:schemeClr val="tx1"/>
+                </a:solidFill>
+                <a:latin typeface="Consolas" panose="020B0609020204030204" pitchFamily="49" charset="0"/>
+              </a:rPr>
+              <a:t> </a:t>
+            </a:r>
+            <a:r>
+              <a:rPr lang="en-US" sz="2800" dirty="0">
+                <a:solidFill>
+                  <a:schemeClr val="tx2">
+                    <a:lumMod val="75000"/>
+                  </a:schemeClr>
+                </a:solidFill>
+                <a:latin typeface="Consolas" panose="020B0609020204030204" pitchFamily="49" charset="0"/>
+              </a:rPr>
+              <a:t>List</a:t>
+            </a:r>
+            <a:r>
+              <a:rPr lang="en-US" sz="2800" dirty="0">
+                <a:solidFill>
+                  <a:schemeClr val="tx1"/>
+                </a:solidFill>
+                <a:latin typeface="Consolas" panose="020B0609020204030204" pitchFamily="49" charset="0"/>
+              </a:rPr>
+              <a:t>&lt;</a:t>
+            </a:r>
+            <a:r>
+              <a:rPr lang="en-US" sz="2800" dirty="0">
+                <a:solidFill>
+                  <a:schemeClr val="accent6">
+                    <a:lumMod val="40000"/>
+                    <a:lumOff val="60000"/>
+                  </a:schemeClr>
+                </a:solidFill>
+                <a:latin typeface="Consolas" panose="020B0609020204030204" pitchFamily="49" charset="0"/>
+              </a:rPr>
+              <a:t>string</a:t>
+            </a:r>
+            <a:r>
+              <a:rPr lang="en-US" sz="2800" dirty="0">
+                <a:solidFill>
+                  <a:schemeClr val="tx1"/>
+                </a:solidFill>
+                <a:latin typeface="Consolas" panose="020B0609020204030204" pitchFamily="49" charset="0"/>
+              </a:rPr>
+              <a:t>&gt;()</a:t>
+            </a:r>
+          </a:p>
+          <a:p>
+            <a:pPr marL="0" indent="0">
+              <a:buNone/>
+            </a:pPr>
+            <a:r>
+              <a:rPr lang="en-US" dirty="0">
+                <a:solidFill>
+                  <a:schemeClr val="tx1"/>
+                </a:solidFill>
+                <a:latin typeface="Consolas" panose="020B0609020204030204" pitchFamily="49" charset="0"/>
+              </a:rPr>
+              <a:t>{</a:t>
+            </a:r>
+          </a:p>
+          <a:p>
+            <a:pPr marL="0" indent="0">
+              <a:buNone/>
+            </a:pPr>
+            <a:r>
+              <a:rPr lang="en-US" dirty="0">
+                <a:solidFill>
+                  <a:schemeClr val="tx1"/>
+                </a:solidFill>
+                <a:latin typeface="Consolas" panose="020B0609020204030204" pitchFamily="49" charset="0"/>
+              </a:rPr>
+              <a:t>  “Velizar”, “Ivan”, “</a:t>
+            </a:r>
+            <a:r>
+              <a:rPr lang="en-US" dirty="0" err="1">
+                <a:solidFill>
+                  <a:schemeClr val="tx1"/>
+                </a:solidFill>
+                <a:latin typeface="Consolas" panose="020B0609020204030204" pitchFamily="49" charset="0"/>
+              </a:rPr>
+              <a:t>Mitko</a:t>
+            </a:r>
+            <a:r>
+              <a:rPr lang="en-US" dirty="0">
+                <a:solidFill>
+                  <a:schemeClr val="tx1"/>
+                </a:solidFill>
+                <a:latin typeface="Consolas" panose="020B0609020204030204" pitchFamily="49" charset="0"/>
+              </a:rPr>
+              <a:t>”</a:t>
+            </a:r>
+          </a:p>
+          <a:p>
+            <a:pPr marL="0" indent="0">
+              <a:buNone/>
+            </a:pPr>
+            <a:r>
+              <a:rPr lang="en-US" dirty="0">
+                <a:solidFill>
+                  <a:schemeClr val="tx1"/>
+                </a:solidFill>
+                <a:latin typeface="Consolas" panose="020B0609020204030204" pitchFamily="49" charset="0"/>
+              </a:rPr>
+              <a:t>};</a:t>
+            </a:r>
+            <a:endParaRPr lang="bg-BG" sz="2800" dirty="0">
+              <a:solidFill>
+                <a:schemeClr val="tx1"/>
+              </a:solidFill>
+              <a:latin typeface="Consolas" panose="020B0609020204030204" pitchFamily="49" charset="0"/>
+            </a:endParaRPr>
+          </a:p>
+          <a:p>
+            <a:endParaRPr lang="en-US" dirty="0"/>
+          </a:p>
+        </p:txBody>
+      </p:sp>
+      <p:sp>
+        <p:nvSpPr>
+          <p:cNvPr id="4" name="Текстово поле 3">
+            <a:extLst>
+              <a:ext uri="{FF2B5EF4-FFF2-40B4-BE49-F238E27FC236}">
+                <a16:creationId xmlns:a16="http://schemas.microsoft.com/office/drawing/2014/main" id="{985AD837-C01B-9696-8F2B-24F75EA864F4}"/>
+              </a:ext>
+            </a:extLst>
+          </p:cNvPr>
+          <p:cNvSpPr txBox="1"/>
+          <p:nvPr/>
+        </p:nvSpPr>
+        <p:spPr>
+          <a:xfrm>
+            <a:off x="1120000" y="2228643"/>
+            <a:ext cx="1898408" cy="523220"/>
+          </a:xfrm>
+          <a:prstGeom prst="rect">
+            <a:avLst/>
+          </a:prstGeom>
+          <a:noFill/>
+        </p:spPr>
+        <p:txBody>
+          <a:bodyPr wrap="square" rtlCol="0">
+            <a:spAutoFit/>
+          </a:bodyPr>
+          <a:lstStyle/>
+          <a:p>
+            <a:r>
+              <a:rPr lang="bg-BG" sz="2800" u="sng" dirty="0">
+                <a:latin typeface="Arial" panose="020B0604020202020204" pitchFamily="34" charset="0"/>
+                <a:cs typeface="Arial" panose="020B0604020202020204" pitchFamily="34" charset="0"/>
+              </a:rPr>
+              <a:t>Пример</a:t>
+            </a:r>
+            <a:r>
+              <a:rPr lang="bg-BG" sz="2800" dirty="0"/>
+              <a:t>:</a:t>
+            </a:r>
+            <a:endParaRPr lang="en-US" sz="2800" dirty="0"/>
+          </a:p>
+        </p:txBody>
+      </p:sp>
+    </p:spTree>
+    <p:extLst>
+      <p:ext uri="{BB962C8B-B14F-4D97-AF65-F5344CB8AC3E}">
+        <p14:creationId xmlns:p14="http://schemas.microsoft.com/office/powerpoint/2010/main" val="4146081726"/>
+      </p:ext>
+    </p:extLst>
+  </p:cSld>
+  <p:clrMapOvr>
+    <a:masterClrMapping/>
+  </p:clrMapOvr>
+</p:sld>
+</file>
+
+<file path=ppt/slides/slide21.xml><?xml version="1.0" encoding="utf-8"?>
+<p:sld xmlns:a="http://schemas.openxmlformats.org/drawingml/2006/main" xmlns:r="http://schemas.openxmlformats.org/officeDocument/2006/relationships" xmlns:p="http://schemas.openxmlformats.org/presentationml/2006/main">
+  <p:cSld>
+    <p:spTree>
+      <p:nvGrpSpPr>
+        <p:cNvPr id="1" name=""/>
+        <p:cNvGrpSpPr/>
+        <p:nvPr/>
+      </p:nvGrpSpPr>
+      <p:grpSpPr>
+        <a:xfrm>
+          <a:off x="0" y="0"/>
+          <a:ext cx="0" cy="0"/>
+          <a:chOff x="0" y="0"/>
+          <a:chExt cx="0" cy="0"/>
+        </a:xfrm>
+      </p:grpSpPr>
+      <p:sp>
+        <p:nvSpPr>
+          <p:cNvPr id="2" name="Заглавие 1">
+            <a:extLst>
+              <a:ext uri="{FF2B5EF4-FFF2-40B4-BE49-F238E27FC236}">
+                <a16:creationId xmlns:a16="http://schemas.microsoft.com/office/drawing/2014/main" id="{9CE1E136-7464-6FA3-97DF-FA8FD6E46272}"/>
+              </a:ext>
+            </a:extLst>
+          </p:cNvPr>
+          <p:cNvSpPr>
+            <a:spLocks noGrp="1"/>
+          </p:cNvSpPr>
+          <p:nvPr>
+            <p:ph type="title"/>
+          </p:nvPr>
+        </p:nvSpPr>
+        <p:spPr/>
+        <p:txBody>
+          <a:bodyPr/>
+          <a:lstStyle/>
+          <a:p>
+            <a:pPr algn="ctr"/>
+            <a:r>
+              <a:rPr lang="en-US" dirty="0">
+                <a:solidFill>
+                  <a:schemeClr val="tx1"/>
+                </a:solidFill>
+              </a:rPr>
+              <a:t>Count </a:t>
+            </a:r>
+            <a:r>
+              <a:rPr lang="bg-BG" dirty="0">
+                <a:solidFill>
+                  <a:schemeClr val="tx1"/>
+                </a:solidFill>
+              </a:rPr>
+              <a:t>и индексиране</a:t>
+            </a:r>
+            <a:r>
+              <a:rPr lang="en-US" dirty="0">
+                <a:solidFill>
+                  <a:schemeClr val="tx1"/>
+                </a:solidFill>
+              </a:rPr>
+              <a:t> []</a:t>
+            </a:r>
+          </a:p>
+        </p:txBody>
+      </p:sp>
+      <p:sp>
+        <p:nvSpPr>
+          <p:cNvPr id="3" name="Контейнер за съдържание 2">
+            <a:extLst>
+              <a:ext uri="{FF2B5EF4-FFF2-40B4-BE49-F238E27FC236}">
+                <a16:creationId xmlns:a16="http://schemas.microsoft.com/office/drawing/2014/main" id="{FD4B3D6F-830A-4BBB-456A-FB9AAA0D8DE1}"/>
+              </a:ext>
+            </a:extLst>
+          </p:cNvPr>
+          <p:cNvSpPr>
+            <a:spLocks noGrp="1"/>
+          </p:cNvSpPr>
+          <p:nvPr>
+            <p:ph idx="1"/>
+          </p:nvPr>
+        </p:nvSpPr>
+        <p:spPr/>
+        <p:txBody>
+          <a:bodyPr/>
+          <a:lstStyle/>
+          <a:p>
+            <a:r>
+              <a:rPr lang="bg-BG" dirty="0">
+                <a:solidFill>
+                  <a:schemeClr val="tx1"/>
+                </a:solidFill>
+              </a:rPr>
+              <a:t>Списъкът има пропърти (свойство), което се нарича </a:t>
+            </a:r>
+            <a:r>
+              <a:rPr lang="en-US" dirty="0">
+                <a:solidFill>
+                  <a:srgbClr val="92D050"/>
+                </a:solidFill>
+              </a:rPr>
+              <a:t>Count</a:t>
+            </a:r>
+            <a:r>
+              <a:rPr lang="en-US" dirty="0"/>
+              <a:t>. </a:t>
+            </a:r>
+            <a:r>
+              <a:rPr lang="bg-BG" dirty="0"/>
+              <a:t>То </a:t>
+            </a:r>
+            <a:r>
+              <a:rPr lang="bg-BG" dirty="0">
+                <a:solidFill>
+                  <a:schemeClr val="tx1"/>
+                </a:solidFill>
+              </a:rPr>
+              <a:t>ни</a:t>
+            </a:r>
+            <a:r>
+              <a:rPr lang="bg-BG" dirty="0"/>
+              <a:t> </a:t>
+            </a:r>
+            <a:r>
+              <a:rPr lang="bg-BG" dirty="0">
+                <a:solidFill>
+                  <a:schemeClr val="tx1"/>
+                </a:solidFill>
+              </a:rPr>
+              <a:t>дава</a:t>
+            </a:r>
+            <a:r>
+              <a:rPr lang="bg-BG" dirty="0"/>
+              <a:t> </a:t>
+            </a:r>
+            <a:r>
+              <a:rPr lang="bg-BG" dirty="0">
+                <a:solidFill>
+                  <a:srgbClr val="92D050"/>
+                </a:solidFill>
+              </a:rPr>
+              <a:t>броя на елементите в</a:t>
+            </a:r>
+            <a:r>
+              <a:rPr lang="bg-BG" dirty="0"/>
+              <a:t> </a:t>
+            </a:r>
+            <a:r>
+              <a:rPr lang="bg-BG" dirty="0">
+                <a:solidFill>
+                  <a:schemeClr val="tx1"/>
+                </a:solidFill>
+              </a:rPr>
+              <a:t>списъка</a:t>
+            </a:r>
+            <a:r>
+              <a:rPr lang="bg-BG" dirty="0"/>
+              <a:t>.</a:t>
+            </a:r>
+          </a:p>
+          <a:p>
+            <a:r>
+              <a:rPr lang="bg-BG" dirty="0">
+                <a:solidFill>
+                  <a:schemeClr val="tx1"/>
+                </a:solidFill>
+              </a:rPr>
+              <a:t>Елементите се достъпват чрез използването на </a:t>
+            </a:r>
+            <a:r>
+              <a:rPr lang="bg-BG" dirty="0">
+                <a:solidFill>
+                  <a:srgbClr val="92D050"/>
+                </a:solidFill>
+              </a:rPr>
+              <a:t>индексиране</a:t>
+            </a:r>
+            <a:r>
+              <a:rPr lang="bg-BG" dirty="0"/>
+              <a:t> </a:t>
+            </a:r>
+            <a:r>
+              <a:rPr lang="bg-BG" dirty="0">
+                <a:solidFill>
+                  <a:schemeClr val="tx1"/>
+                </a:solidFill>
+              </a:rPr>
+              <a:t>или иначе казано всеки един елемент е под конкретен индекс.</a:t>
+            </a:r>
+          </a:p>
+          <a:p>
+            <a:pPr marL="0" indent="0">
+              <a:buNone/>
+            </a:pPr>
+            <a:r>
+              <a:rPr lang="bg-BG" dirty="0"/>
+              <a:t>   </a:t>
+            </a:r>
+            <a:r>
+              <a:rPr lang="bg-BG" u="sng" dirty="0">
+                <a:solidFill>
+                  <a:schemeClr val="tx1"/>
+                </a:solidFill>
+              </a:rPr>
+              <a:t>Пример</a:t>
+            </a:r>
+            <a:r>
+              <a:rPr lang="en-US" u="sng" dirty="0">
+                <a:solidFill>
+                  <a:schemeClr val="tx1"/>
+                </a:solidFill>
+              </a:rPr>
+              <a:t>:</a:t>
+            </a:r>
+            <a:endParaRPr lang="en-US" dirty="0"/>
+          </a:p>
+          <a:p>
+            <a:endParaRPr lang="en-US" dirty="0"/>
+          </a:p>
+          <a:p>
+            <a:endParaRPr lang="en-US" dirty="0"/>
+          </a:p>
+          <a:p>
+            <a:endParaRPr lang="en-US" dirty="0"/>
+          </a:p>
+          <a:p>
+            <a:endParaRPr lang="en-US" dirty="0"/>
+          </a:p>
+          <a:p>
+            <a:endParaRPr lang="bg-BG" dirty="0"/>
+          </a:p>
+          <a:p>
+            <a:endParaRPr lang="bg-BG" dirty="0"/>
+          </a:p>
+          <a:p>
+            <a:endParaRPr lang="bg-BG" dirty="0"/>
+          </a:p>
+        </p:txBody>
+      </p:sp>
+      <p:sp>
+        <p:nvSpPr>
+          <p:cNvPr id="5" name="Текстово поле 4">
+            <a:extLst>
+              <a:ext uri="{FF2B5EF4-FFF2-40B4-BE49-F238E27FC236}">
+                <a16:creationId xmlns:a16="http://schemas.microsoft.com/office/drawing/2014/main" id="{DEBEF65F-B91D-55CC-4317-D9AA73D7DBF6}"/>
+              </a:ext>
+            </a:extLst>
+          </p:cNvPr>
+          <p:cNvSpPr txBox="1"/>
+          <p:nvPr/>
+        </p:nvSpPr>
+        <p:spPr>
+          <a:xfrm>
+            <a:off x="1342184" y="4698988"/>
+            <a:ext cx="6968973" cy="1723549"/>
+          </a:xfrm>
+          <a:prstGeom prst="rect">
+            <a:avLst/>
+          </a:prstGeom>
+          <a:noFill/>
+        </p:spPr>
+        <p:txBody>
+          <a:bodyPr wrap="square" rtlCol="0">
+            <a:spAutoFit/>
+          </a:bodyPr>
+          <a:lstStyle/>
+          <a:p>
+            <a:pPr marL="0" indent="0">
+              <a:buNone/>
+            </a:pPr>
+            <a:r>
+              <a:rPr lang="nn-NO" sz="2200" dirty="0">
+                <a:latin typeface="Consolas" panose="020B0609020204030204" pitchFamily="49" charset="0"/>
+              </a:rPr>
+              <a:t>for (int i = 0; i &lt; </a:t>
+            </a:r>
+            <a:r>
+              <a:rPr lang="nn-NO" sz="2200" dirty="0">
+                <a:solidFill>
+                  <a:srgbClr val="92D050"/>
+                </a:solidFill>
+                <a:latin typeface="Consolas" panose="020B0609020204030204" pitchFamily="49" charset="0"/>
+              </a:rPr>
+              <a:t>myList</a:t>
+            </a:r>
+            <a:r>
+              <a:rPr lang="nn-NO" sz="2200" dirty="0">
+                <a:solidFill>
+                  <a:schemeClr val="tx1"/>
+                </a:solidFill>
+                <a:latin typeface="Consolas" panose="020B0609020204030204" pitchFamily="49" charset="0"/>
+              </a:rPr>
+              <a:t>.</a:t>
+            </a:r>
+            <a:r>
+              <a:rPr lang="en-US" sz="2200" dirty="0">
+                <a:solidFill>
+                  <a:schemeClr val="tx2">
+                    <a:lumMod val="75000"/>
+                  </a:schemeClr>
+                </a:solidFill>
+                <a:latin typeface="Consolas" panose="020B0609020204030204" pitchFamily="49" charset="0"/>
+              </a:rPr>
+              <a:t>Count</a:t>
+            </a:r>
+            <a:r>
+              <a:rPr lang="nn-NO" sz="2200" dirty="0">
+                <a:latin typeface="Consolas" panose="020B0609020204030204" pitchFamily="49" charset="0"/>
+              </a:rPr>
+              <a:t>; i++)</a:t>
+            </a:r>
+          </a:p>
+          <a:p>
+            <a:pPr marL="0" indent="0">
+              <a:buNone/>
+            </a:pPr>
+            <a:r>
+              <a:rPr lang="bg-BG" sz="2200" dirty="0">
+                <a:solidFill>
+                  <a:schemeClr val="tx1"/>
+                </a:solidFill>
+                <a:latin typeface="Consolas" panose="020B0609020204030204" pitchFamily="49" charset="0"/>
+              </a:rPr>
+              <a:t>    {</a:t>
+            </a:r>
+            <a:endParaRPr lang="bg-BG" sz="2200" dirty="0">
+              <a:solidFill>
+                <a:schemeClr val="tx2">
+                  <a:lumMod val="60000"/>
+                  <a:lumOff val="40000"/>
+                </a:schemeClr>
+              </a:solidFill>
+              <a:latin typeface="Consolas" panose="020B0609020204030204" pitchFamily="49" charset="0"/>
+            </a:endParaRPr>
+          </a:p>
+          <a:p>
+            <a:pPr marL="0" indent="0">
+              <a:buNone/>
+            </a:pPr>
+            <a:r>
+              <a:rPr lang="en-US" sz="2200" dirty="0">
+                <a:solidFill>
+                  <a:schemeClr val="tx2">
+                    <a:lumMod val="60000"/>
+                    <a:lumOff val="40000"/>
+                  </a:schemeClr>
+                </a:solidFill>
+                <a:latin typeface="Consolas" panose="020B0609020204030204" pitchFamily="49" charset="0"/>
+              </a:rPr>
+              <a:t> 		 </a:t>
+            </a:r>
+            <a:r>
+              <a:rPr lang="nn-NO" sz="2200" dirty="0">
+                <a:solidFill>
+                  <a:srgbClr val="92D050"/>
+                </a:solidFill>
+                <a:latin typeface="Consolas" panose="020B0609020204030204" pitchFamily="49" charset="0"/>
+              </a:rPr>
+              <a:t>myList</a:t>
+            </a:r>
+            <a:r>
+              <a:rPr lang="nn-NO" sz="2200" dirty="0">
+                <a:solidFill>
+                  <a:schemeClr val="accent6">
+                    <a:lumMod val="60000"/>
+                    <a:lumOff val="40000"/>
+                  </a:schemeClr>
+                </a:solidFill>
+                <a:latin typeface="Consolas" panose="020B0609020204030204" pitchFamily="49" charset="0"/>
+              </a:rPr>
+              <a:t>[i]</a:t>
+            </a:r>
+            <a:r>
+              <a:rPr lang="nn-NO" sz="2200" dirty="0">
+                <a:solidFill>
+                  <a:schemeClr val="tx1"/>
+                </a:solidFill>
+                <a:latin typeface="Consolas" panose="020B0609020204030204" pitchFamily="49" charset="0"/>
+              </a:rPr>
+              <a:t> = i;</a:t>
+            </a:r>
+            <a:endParaRPr lang="en-US" sz="2200" dirty="0">
+              <a:solidFill>
+                <a:schemeClr val="tx1"/>
+              </a:solidFill>
+              <a:latin typeface="Consolas" panose="020B0609020204030204" pitchFamily="49" charset="0"/>
+            </a:endParaRPr>
+          </a:p>
+          <a:p>
+            <a:pPr marL="0" indent="0">
+              <a:buNone/>
+            </a:pPr>
+            <a:r>
+              <a:rPr lang="bg-BG" sz="2200" dirty="0">
+                <a:solidFill>
+                  <a:schemeClr val="tx1"/>
+                </a:solidFill>
+                <a:latin typeface="Consolas" panose="020B0609020204030204" pitchFamily="49" charset="0"/>
+              </a:rPr>
+              <a:t>    }</a:t>
+            </a:r>
+          </a:p>
+          <a:p>
+            <a:endParaRPr lang="en-US" dirty="0"/>
+          </a:p>
+        </p:txBody>
+      </p:sp>
+      <p:cxnSp>
+        <p:nvCxnSpPr>
+          <p:cNvPr id="7" name="Съединител &quot;права стрелка&quot; 6">
+            <a:extLst>
+              <a:ext uri="{FF2B5EF4-FFF2-40B4-BE49-F238E27FC236}">
+                <a16:creationId xmlns:a16="http://schemas.microsoft.com/office/drawing/2014/main" id="{F8D4CC3D-6E1B-7E8E-47EF-A88923DAB1DC}"/>
+              </a:ext>
+            </a:extLst>
+          </p:cNvPr>
+          <p:cNvCxnSpPr>
+            <a:cxnSpLocks/>
+          </p:cNvCxnSpPr>
+          <p:nvPr/>
+        </p:nvCxnSpPr>
+        <p:spPr>
+          <a:xfrm flipH="1" flipV="1">
+            <a:off x="3888419" y="5770485"/>
+            <a:ext cx="1704513" cy="541538"/>
+          </a:xfrm>
+          <a:prstGeom prst="straightConnector1">
+            <a:avLst/>
+          </a:prstGeom>
+          <a:ln>
+            <a:solidFill>
+              <a:schemeClr val="tx1"/>
+            </a:solidFill>
+            <a:tailEnd type="triangle"/>
+          </a:ln>
+        </p:spPr>
+        <p:style>
+          <a:lnRef idx="1">
+            <a:schemeClr val="accent1"/>
+          </a:lnRef>
+          <a:fillRef idx="0">
+            <a:schemeClr val="accent1"/>
+          </a:fillRef>
+          <a:effectRef idx="0">
+            <a:schemeClr val="accent1"/>
+          </a:effectRef>
+          <a:fontRef idx="minor">
+            <a:schemeClr val="tx1"/>
+          </a:fontRef>
+        </p:style>
+      </p:cxnSp>
+      <p:sp>
+        <p:nvSpPr>
+          <p:cNvPr id="11" name="Текстово поле 10">
+            <a:extLst>
+              <a:ext uri="{FF2B5EF4-FFF2-40B4-BE49-F238E27FC236}">
+                <a16:creationId xmlns:a16="http://schemas.microsoft.com/office/drawing/2014/main" id="{9229470B-1B95-ED79-4E2F-ACEB68063A3B}"/>
+              </a:ext>
+            </a:extLst>
+          </p:cNvPr>
+          <p:cNvSpPr txBox="1"/>
+          <p:nvPr/>
+        </p:nvSpPr>
+        <p:spPr>
+          <a:xfrm>
+            <a:off x="4632727" y="6308209"/>
+            <a:ext cx="3028702" cy="369332"/>
+          </a:xfrm>
+          <a:prstGeom prst="rect">
+            <a:avLst/>
+          </a:prstGeom>
+          <a:noFill/>
+        </p:spPr>
+        <p:txBody>
+          <a:bodyPr wrap="square" rtlCol="0">
+            <a:spAutoFit/>
+          </a:bodyPr>
+          <a:lstStyle/>
+          <a:p>
+            <a:r>
+              <a:rPr lang="bg-BG" dirty="0"/>
+              <a:t>Достъпване по индекс  с </a:t>
+            </a:r>
+            <a:r>
+              <a:rPr lang="en-US" dirty="0"/>
+              <a:t>[</a:t>
+            </a:r>
+            <a:r>
+              <a:rPr lang="bg-BG" dirty="0"/>
+              <a:t> </a:t>
+            </a:r>
+            <a:r>
+              <a:rPr lang="en-US" dirty="0"/>
+              <a:t>]</a:t>
+            </a:r>
+          </a:p>
+        </p:txBody>
+      </p:sp>
+    </p:spTree>
+    <p:extLst>
+      <p:ext uri="{BB962C8B-B14F-4D97-AF65-F5344CB8AC3E}">
+        <p14:creationId xmlns:p14="http://schemas.microsoft.com/office/powerpoint/2010/main" val="502647737"/>
+      </p:ext>
+    </p:extLst>
+  </p:cSld>
+  <p:clrMapOvr>
+    <a:masterClrMapping/>
+  </p:clrMapOvr>
+</p:sld>
+</file>
+
+<file path=ppt/slides/slide22.xml><?xml version="1.0" encoding="utf-8"?>
+<p:sld xmlns:a="http://schemas.openxmlformats.org/drawingml/2006/main" xmlns:r="http://schemas.openxmlformats.org/officeDocument/2006/relationships" xmlns:p="http://schemas.openxmlformats.org/presentationml/2006/main">
+  <p:cSld>
+    <p:spTree>
+      <p:nvGrpSpPr>
+        <p:cNvPr id="1" name=""/>
+        <p:cNvGrpSpPr/>
+        <p:nvPr/>
+      </p:nvGrpSpPr>
+      <p:grpSpPr>
+        <a:xfrm>
+          <a:off x="0" y="0"/>
+          <a:ext cx="0" cy="0"/>
+          <a:chOff x="0" y="0"/>
+          <a:chExt cx="0" cy="0"/>
+        </a:xfrm>
+      </p:grpSpPr>
+      <p:sp>
+        <p:nvSpPr>
+          <p:cNvPr id="2" name="Заглавие 1">
+            <a:extLst>
+              <a:ext uri="{FF2B5EF4-FFF2-40B4-BE49-F238E27FC236}">
+                <a16:creationId xmlns:a16="http://schemas.microsoft.com/office/drawing/2014/main" id="{5BE81EE3-E59E-A8BA-68F7-759A744BC9BD}"/>
+              </a:ext>
+            </a:extLst>
+          </p:cNvPr>
+          <p:cNvSpPr>
+            <a:spLocks noGrp="1"/>
+          </p:cNvSpPr>
+          <p:nvPr>
+            <p:ph type="title"/>
+          </p:nvPr>
+        </p:nvSpPr>
+        <p:spPr/>
+        <p:txBody>
+          <a:bodyPr>
+            <a:normAutofit fontScale="90000"/>
+          </a:bodyPr>
+          <a:lstStyle/>
+          <a:p>
+            <a:pPr algn="ctr"/>
+            <a:r>
+              <a:rPr lang="bg-BG" dirty="0">
+                <a:solidFill>
+                  <a:schemeClr val="tx1"/>
+                </a:solidFill>
+                <a:latin typeface="Arial" panose="020B0604020202020204" pitchFamily="34" charset="0"/>
+                <a:cs typeface="Arial" panose="020B0604020202020204" pitchFamily="34" charset="0"/>
+              </a:rPr>
+              <a:t>Четене на списъци от конзолата</a:t>
+            </a:r>
+            <a:br>
+              <a:rPr lang="en-US" dirty="0">
+                <a:solidFill>
+                  <a:schemeClr val="tx1"/>
+                </a:solidFill>
+                <a:latin typeface="Arial" panose="020B0604020202020204" pitchFamily="34" charset="0"/>
+                <a:cs typeface="Arial" panose="020B0604020202020204" pitchFamily="34" charset="0"/>
+              </a:rPr>
+            </a:br>
+            <a:r>
+              <a:rPr lang="en-US" dirty="0">
+                <a:solidFill>
+                  <a:schemeClr val="tx1"/>
+                </a:solidFill>
+                <a:latin typeface="Arial" panose="020B0604020202020204" pitchFamily="34" charset="0"/>
+                <a:cs typeface="Arial" panose="020B0604020202020204" pitchFamily="34" charset="0"/>
+              </a:rPr>
+              <a:t>/</a:t>
+            </a:r>
+            <a:r>
+              <a:rPr lang="bg-BG" dirty="0">
+                <a:solidFill>
+                  <a:schemeClr val="tx1"/>
+                </a:solidFill>
+                <a:latin typeface="Arial" panose="020B0604020202020204" pitchFamily="34" charset="0"/>
+                <a:cs typeface="Arial" panose="020B0604020202020204" pitchFamily="34" charset="0"/>
+              </a:rPr>
+              <a:t>начин 1</a:t>
+            </a:r>
+            <a:r>
+              <a:rPr lang="en-US" dirty="0">
+                <a:solidFill>
+                  <a:schemeClr val="tx1"/>
+                </a:solidFill>
+                <a:latin typeface="Arial" panose="020B0604020202020204" pitchFamily="34" charset="0"/>
+                <a:cs typeface="Arial" panose="020B0604020202020204" pitchFamily="34" charset="0"/>
+              </a:rPr>
+              <a:t>/</a:t>
+            </a:r>
+          </a:p>
+        </p:txBody>
+      </p:sp>
+      <p:sp>
+        <p:nvSpPr>
+          <p:cNvPr id="3" name="Контейнер за съдържание 2">
+            <a:extLst>
+              <a:ext uri="{FF2B5EF4-FFF2-40B4-BE49-F238E27FC236}">
+                <a16:creationId xmlns:a16="http://schemas.microsoft.com/office/drawing/2014/main" id="{5B59009E-A341-F70D-A62B-32040E5F6E0B}"/>
+              </a:ext>
+            </a:extLst>
+          </p:cNvPr>
+          <p:cNvSpPr>
+            <a:spLocks noGrp="1"/>
+          </p:cNvSpPr>
+          <p:nvPr>
+            <p:ph idx="1"/>
+          </p:nvPr>
+        </p:nvSpPr>
+        <p:spPr>
+          <a:xfrm>
+            <a:off x="1289818" y="2141537"/>
+            <a:ext cx="10233800" cy="4351338"/>
+          </a:xfrm>
+        </p:spPr>
+        <p:txBody>
+          <a:bodyPr/>
+          <a:lstStyle/>
+          <a:p>
+            <a:pPr marL="0" indent="0">
+              <a:buNone/>
+            </a:pPr>
+            <a:r>
+              <a:rPr lang="en-US" sz="2400" dirty="0">
+                <a:solidFill>
+                  <a:schemeClr val="tx1"/>
+                </a:solidFill>
+                <a:latin typeface="Consolas" panose="020B0609020204030204" pitchFamily="49" charset="0"/>
+              </a:rPr>
+              <a:t>int </a:t>
+            </a:r>
+            <a:r>
+              <a:rPr lang="en-US" sz="2400" dirty="0" err="1">
+                <a:solidFill>
+                  <a:schemeClr val="tx1"/>
+                </a:solidFill>
+                <a:latin typeface="Consolas" panose="020B0609020204030204" pitchFamily="49" charset="0"/>
+              </a:rPr>
+              <a:t>countElements</a:t>
+            </a:r>
+            <a:r>
+              <a:rPr lang="en-US" sz="2400" dirty="0">
+                <a:solidFill>
+                  <a:schemeClr val="tx1"/>
+                </a:solidFill>
+                <a:latin typeface="Consolas" panose="020B0609020204030204" pitchFamily="49" charset="0"/>
+              </a:rPr>
+              <a:t> = </a:t>
+            </a:r>
+            <a:r>
+              <a:rPr lang="en-US" sz="2400" dirty="0" err="1">
+                <a:solidFill>
+                  <a:schemeClr val="tx1"/>
+                </a:solidFill>
+                <a:latin typeface="Consolas" panose="020B0609020204030204" pitchFamily="49" charset="0"/>
+              </a:rPr>
+              <a:t>int.Parse</a:t>
+            </a:r>
+            <a:r>
+              <a:rPr lang="en-US" sz="2400" dirty="0">
+                <a:solidFill>
+                  <a:schemeClr val="tx1"/>
+                </a:solidFill>
+                <a:latin typeface="Consolas" panose="020B0609020204030204" pitchFamily="49" charset="0"/>
+              </a:rPr>
+              <a:t>(</a:t>
+            </a:r>
+            <a:r>
+              <a:rPr lang="en-US" sz="2400" dirty="0" err="1">
+                <a:solidFill>
+                  <a:schemeClr val="tx1"/>
+                </a:solidFill>
+                <a:latin typeface="Consolas" panose="020B0609020204030204" pitchFamily="49" charset="0"/>
+              </a:rPr>
+              <a:t>Console.ReadLine</a:t>
+            </a:r>
+            <a:r>
+              <a:rPr lang="en-US" sz="2400" dirty="0">
+                <a:solidFill>
+                  <a:schemeClr val="tx1"/>
+                </a:solidFill>
+                <a:latin typeface="Consolas" panose="020B0609020204030204" pitchFamily="49" charset="0"/>
+              </a:rPr>
+              <a:t>());</a:t>
+            </a:r>
+          </a:p>
+          <a:p>
+            <a:pPr marL="0" indent="0">
+              <a:buNone/>
+            </a:pPr>
+            <a:r>
+              <a:rPr lang="en-US" sz="2400" dirty="0">
+                <a:solidFill>
+                  <a:schemeClr val="tx2">
+                    <a:lumMod val="75000"/>
+                  </a:schemeClr>
+                </a:solidFill>
+                <a:latin typeface="Consolas" panose="020B0609020204030204" pitchFamily="49" charset="0"/>
+              </a:rPr>
+              <a:t>List</a:t>
+            </a:r>
+            <a:r>
+              <a:rPr lang="en-US" sz="2400" dirty="0">
+                <a:solidFill>
+                  <a:schemeClr val="tx1"/>
+                </a:solidFill>
+                <a:latin typeface="Consolas" panose="020B0609020204030204" pitchFamily="49" charset="0"/>
+              </a:rPr>
+              <a:t>&lt;string&gt; </a:t>
+            </a:r>
+            <a:r>
+              <a:rPr lang="en-US" sz="2400" dirty="0" err="1">
+                <a:solidFill>
+                  <a:srgbClr val="92D050"/>
+                </a:solidFill>
+                <a:latin typeface="Consolas" panose="020B0609020204030204" pitchFamily="49" charset="0"/>
+              </a:rPr>
+              <a:t>myList</a:t>
+            </a:r>
+            <a:r>
+              <a:rPr lang="en-US" sz="2400" dirty="0">
+                <a:solidFill>
+                  <a:schemeClr val="tx1"/>
+                </a:solidFill>
+                <a:latin typeface="Consolas" panose="020B0609020204030204" pitchFamily="49" charset="0"/>
+              </a:rPr>
+              <a:t> = new </a:t>
+            </a:r>
+            <a:r>
+              <a:rPr lang="en-US" sz="2400" dirty="0">
+                <a:solidFill>
+                  <a:schemeClr val="tx2">
+                    <a:lumMod val="75000"/>
+                  </a:schemeClr>
+                </a:solidFill>
+                <a:latin typeface="Consolas" panose="020B0609020204030204" pitchFamily="49" charset="0"/>
+              </a:rPr>
+              <a:t>List</a:t>
+            </a:r>
+            <a:r>
+              <a:rPr lang="en-US" sz="2400" dirty="0">
+                <a:solidFill>
+                  <a:schemeClr val="tx1"/>
+                </a:solidFill>
+                <a:latin typeface="Consolas" panose="020B0609020204030204" pitchFamily="49" charset="0"/>
+              </a:rPr>
+              <a:t>&lt;string&gt;();</a:t>
+            </a:r>
+            <a:endParaRPr lang="bg-BG" sz="2400" dirty="0">
+              <a:solidFill>
+                <a:schemeClr val="tx1"/>
+              </a:solidFill>
+              <a:latin typeface="Consolas" panose="020B0609020204030204" pitchFamily="49" charset="0"/>
+            </a:endParaRPr>
+          </a:p>
+          <a:p>
+            <a:pPr marL="0" indent="0">
+              <a:buNone/>
+            </a:pPr>
+            <a:endParaRPr lang="bg-BG" sz="2400" dirty="0">
+              <a:solidFill>
+                <a:schemeClr val="tx1"/>
+              </a:solidFill>
+              <a:latin typeface="Consolas" panose="020B0609020204030204" pitchFamily="49" charset="0"/>
+            </a:endParaRPr>
+          </a:p>
+          <a:p>
+            <a:pPr marL="0" indent="0">
+              <a:buNone/>
+            </a:pPr>
+            <a:r>
+              <a:rPr lang="nn-NO" sz="2400" dirty="0">
+                <a:solidFill>
+                  <a:schemeClr val="tx1"/>
+                </a:solidFill>
+                <a:latin typeface="Consolas" panose="020B0609020204030204" pitchFamily="49" charset="0"/>
+              </a:rPr>
+              <a:t>for (int i = 0; i &lt; </a:t>
+            </a:r>
+            <a:r>
+              <a:rPr lang="en-US" sz="2400" dirty="0" err="1">
+                <a:solidFill>
+                  <a:schemeClr val="tx1"/>
+                </a:solidFill>
+                <a:latin typeface="Consolas" panose="020B0609020204030204" pitchFamily="49" charset="0"/>
+              </a:rPr>
+              <a:t>countElements</a:t>
+            </a:r>
+            <a:r>
+              <a:rPr lang="nn-NO" sz="2400" dirty="0">
+                <a:solidFill>
+                  <a:schemeClr val="tx1"/>
+                </a:solidFill>
+                <a:latin typeface="Consolas" panose="020B0609020204030204" pitchFamily="49" charset="0"/>
+              </a:rPr>
+              <a:t>; i++)</a:t>
+            </a:r>
+          </a:p>
+          <a:p>
+            <a:pPr marL="0" indent="0">
+              <a:buNone/>
+            </a:pPr>
+            <a:r>
+              <a:rPr lang="bg-BG" sz="2400" dirty="0">
+                <a:solidFill>
+                  <a:schemeClr val="tx1"/>
+                </a:solidFill>
+                <a:latin typeface="Consolas" panose="020B0609020204030204" pitchFamily="49" charset="0"/>
+              </a:rPr>
+              <a:t>    {</a:t>
+            </a:r>
+            <a:endParaRPr lang="bg-BG" sz="2400" dirty="0">
+              <a:solidFill>
+                <a:schemeClr val="tx2">
+                  <a:lumMod val="60000"/>
+                  <a:lumOff val="40000"/>
+                </a:schemeClr>
+              </a:solidFill>
+              <a:latin typeface="Consolas" panose="020B0609020204030204" pitchFamily="49" charset="0"/>
+            </a:endParaRPr>
+          </a:p>
+          <a:p>
+            <a:pPr marL="0" indent="0">
+              <a:buNone/>
+            </a:pPr>
+            <a:r>
+              <a:rPr lang="en-US" sz="2400" dirty="0">
+                <a:solidFill>
+                  <a:schemeClr val="tx2">
+                    <a:lumMod val="60000"/>
+                    <a:lumOff val="40000"/>
+                  </a:schemeClr>
+                </a:solidFill>
+                <a:latin typeface="Consolas" panose="020B0609020204030204" pitchFamily="49" charset="0"/>
+              </a:rPr>
+              <a:t> 	 </a:t>
+            </a:r>
+            <a:r>
+              <a:rPr lang="en-US" sz="2400" dirty="0">
+                <a:solidFill>
+                  <a:schemeClr val="tx1"/>
+                </a:solidFill>
+                <a:latin typeface="Consolas" panose="020B0609020204030204" pitchFamily="49" charset="0"/>
+              </a:rPr>
+              <a:t>element</a:t>
+            </a:r>
+            <a:r>
+              <a:rPr lang="en-US" sz="2400" dirty="0">
+                <a:solidFill>
+                  <a:schemeClr val="tx2">
+                    <a:lumMod val="60000"/>
+                    <a:lumOff val="40000"/>
+                  </a:schemeClr>
+                </a:solidFill>
+                <a:latin typeface="Consolas" panose="020B0609020204030204" pitchFamily="49" charset="0"/>
+              </a:rPr>
+              <a:t> </a:t>
+            </a:r>
+            <a:r>
+              <a:rPr lang="nn-NO" sz="2400" dirty="0">
+                <a:solidFill>
+                  <a:schemeClr val="tx1"/>
+                </a:solidFill>
+                <a:latin typeface="Consolas" panose="020B0609020204030204" pitchFamily="49" charset="0"/>
+              </a:rPr>
+              <a:t>= Console.ReadLine();</a:t>
+            </a:r>
+          </a:p>
+          <a:p>
+            <a:pPr marL="0" indent="0">
+              <a:buNone/>
+            </a:pPr>
+            <a:r>
+              <a:rPr lang="nn-NO" sz="2400" dirty="0">
+                <a:solidFill>
+                  <a:schemeClr val="tx1"/>
+                </a:solidFill>
+                <a:latin typeface="Consolas" panose="020B0609020204030204" pitchFamily="49" charset="0"/>
+              </a:rPr>
+              <a:t>	 </a:t>
+            </a:r>
+            <a:r>
+              <a:rPr lang="en-US" sz="2400" dirty="0" err="1">
+                <a:solidFill>
+                  <a:srgbClr val="92D050"/>
+                </a:solidFill>
+                <a:latin typeface="Consolas" panose="020B0609020204030204" pitchFamily="49" charset="0"/>
+              </a:rPr>
+              <a:t>myList</a:t>
+            </a:r>
+            <a:r>
+              <a:rPr lang="en-US" sz="2400" dirty="0" err="1">
+                <a:solidFill>
+                  <a:schemeClr val="tx1"/>
+                </a:solidFill>
+                <a:latin typeface="Consolas" panose="020B0609020204030204" pitchFamily="49" charset="0"/>
+              </a:rPr>
+              <a:t>.</a:t>
+            </a:r>
+            <a:r>
+              <a:rPr lang="en-US" sz="2400" dirty="0" err="1">
+                <a:solidFill>
+                  <a:srgbClr val="FFFF00"/>
+                </a:solidFill>
+                <a:latin typeface="Consolas" panose="020B0609020204030204" pitchFamily="49" charset="0"/>
+              </a:rPr>
+              <a:t>Add</a:t>
+            </a:r>
+            <a:r>
+              <a:rPr lang="en-US" sz="2400" dirty="0">
+                <a:solidFill>
+                  <a:srgbClr val="92D050"/>
+                </a:solidFill>
+                <a:latin typeface="Consolas" panose="020B0609020204030204" pitchFamily="49" charset="0"/>
+              </a:rPr>
+              <a:t>(</a:t>
+            </a:r>
+            <a:r>
+              <a:rPr lang="en-US" sz="2400" dirty="0">
+                <a:solidFill>
+                  <a:schemeClr val="tx1"/>
+                </a:solidFill>
+                <a:latin typeface="Consolas" panose="020B0609020204030204" pitchFamily="49" charset="0"/>
+              </a:rPr>
+              <a:t>element</a:t>
+            </a:r>
+            <a:r>
+              <a:rPr lang="en-US" sz="2400" dirty="0">
+                <a:solidFill>
+                  <a:srgbClr val="92D050"/>
+                </a:solidFill>
+                <a:latin typeface="Consolas" panose="020B0609020204030204" pitchFamily="49" charset="0"/>
+              </a:rPr>
+              <a:t>)</a:t>
+            </a:r>
+            <a:r>
+              <a:rPr lang="en-US" sz="2400" dirty="0">
+                <a:solidFill>
+                  <a:schemeClr val="tx1"/>
+                </a:solidFill>
+                <a:latin typeface="Consolas" panose="020B0609020204030204" pitchFamily="49" charset="0"/>
+              </a:rPr>
+              <a:t>;</a:t>
+            </a:r>
+          </a:p>
+          <a:p>
+            <a:pPr marL="0" indent="0">
+              <a:buNone/>
+            </a:pPr>
+            <a:r>
+              <a:rPr lang="bg-BG" sz="2400" dirty="0">
+                <a:solidFill>
+                  <a:schemeClr val="tx1"/>
+                </a:solidFill>
+                <a:latin typeface="Consolas" panose="020B0609020204030204" pitchFamily="49" charset="0"/>
+              </a:rPr>
+              <a:t>    }</a:t>
+            </a:r>
+          </a:p>
+        </p:txBody>
+      </p:sp>
+    </p:spTree>
+    <p:extLst>
+      <p:ext uri="{BB962C8B-B14F-4D97-AF65-F5344CB8AC3E}">
+        <p14:creationId xmlns:p14="http://schemas.microsoft.com/office/powerpoint/2010/main" val="2058473667"/>
+      </p:ext>
+    </p:extLst>
+  </p:cSld>
+  <p:clrMapOvr>
+    <a:masterClrMapping/>
+  </p:clrMapOvr>
+</p:sld>
+</file>
+
+<file path=ppt/slides/slide23.xml><?xml version="1.0" encoding="utf-8"?>
+<p:sld xmlns:a="http://schemas.openxmlformats.org/drawingml/2006/main" xmlns:r="http://schemas.openxmlformats.org/officeDocument/2006/relationships" xmlns:p="http://schemas.openxmlformats.org/presentationml/2006/main">
+  <p:cSld>
+    <p:spTree>
+      <p:nvGrpSpPr>
+        <p:cNvPr id="1" name=""/>
+        <p:cNvGrpSpPr/>
+        <p:nvPr/>
+      </p:nvGrpSpPr>
+      <p:grpSpPr>
+        <a:xfrm>
+          <a:off x="0" y="0"/>
+          <a:ext cx="0" cy="0"/>
+          <a:chOff x="0" y="0"/>
+          <a:chExt cx="0" cy="0"/>
+        </a:xfrm>
+      </p:grpSpPr>
+      <p:sp>
+        <p:nvSpPr>
+          <p:cNvPr id="2" name="Заглавие 1">
+            <a:extLst>
+              <a:ext uri="{FF2B5EF4-FFF2-40B4-BE49-F238E27FC236}">
+                <a16:creationId xmlns:a16="http://schemas.microsoft.com/office/drawing/2014/main" id="{5BE81EE3-E59E-A8BA-68F7-759A744BC9BD}"/>
+              </a:ext>
+            </a:extLst>
+          </p:cNvPr>
+          <p:cNvSpPr>
+            <a:spLocks noGrp="1"/>
+          </p:cNvSpPr>
+          <p:nvPr>
+            <p:ph type="title"/>
+          </p:nvPr>
+        </p:nvSpPr>
+        <p:spPr/>
+        <p:txBody>
+          <a:bodyPr>
+            <a:normAutofit fontScale="90000"/>
+          </a:bodyPr>
+          <a:lstStyle/>
+          <a:p>
+            <a:pPr algn="ctr"/>
+            <a:r>
+              <a:rPr lang="bg-BG" dirty="0">
+                <a:solidFill>
+                  <a:schemeClr val="tx1"/>
+                </a:solidFill>
+                <a:latin typeface="Arial" panose="020B0604020202020204" pitchFamily="34" charset="0"/>
+                <a:cs typeface="Arial" panose="020B0604020202020204" pitchFamily="34" charset="0"/>
+              </a:rPr>
+              <a:t>Четене на списъци от конзолата</a:t>
+            </a:r>
+            <a:br>
+              <a:rPr lang="en-US" dirty="0">
+                <a:solidFill>
+                  <a:schemeClr val="tx1"/>
+                </a:solidFill>
+                <a:latin typeface="Arial" panose="020B0604020202020204" pitchFamily="34" charset="0"/>
+                <a:cs typeface="Arial" panose="020B0604020202020204" pitchFamily="34" charset="0"/>
+              </a:rPr>
+            </a:br>
+            <a:r>
+              <a:rPr lang="en-US" dirty="0">
+                <a:solidFill>
+                  <a:schemeClr val="tx1"/>
+                </a:solidFill>
+                <a:latin typeface="Arial" panose="020B0604020202020204" pitchFamily="34" charset="0"/>
+                <a:cs typeface="Arial" panose="020B0604020202020204" pitchFamily="34" charset="0"/>
+              </a:rPr>
+              <a:t>/</a:t>
+            </a:r>
+            <a:r>
+              <a:rPr lang="bg-BG" dirty="0">
+                <a:solidFill>
+                  <a:schemeClr val="tx1"/>
+                </a:solidFill>
+                <a:latin typeface="Arial" panose="020B0604020202020204" pitchFamily="34" charset="0"/>
+                <a:cs typeface="Arial" panose="020B0604020202020204" pitchFamily="34" charset="0"/>
+              </a:rPr>
+              <a:t>начин 2</a:t>
+            </a:r>
+            <a:r>
+              <a:rPr lang="en-US" dirty="0">
+                <a:solidFill>
+                  <a:schemeClr val="tx1"/>
+                </a:solidFill>
+                <a:latin typeface="Arial" panose="020B0604020202020204" pitchFamily="34" charset="0"/>
+                <a:cs typeface="Arial" panose="020B0604020202020204" pitchFamily="34" charset="0"/>
+              </a:rPr>
+              <a:t>/</a:t>
+            </a:r>
+          </a:p>
+        </p:txBody>
+      </p:sp>
+      <p:sp>
+        <p:nvSpPr>
+          <p:cNvPr id="3" name="Контейнер за съдържание 2">
+            <a:extLst>
+              <a:ext uri="{FF2B5EF4-FFF2-40B4-BE49-F238E27FC236}">
+                <a16:creationId xmlns:a16="http://schemas.microsoft.com/office/drawing/2014/main" id="{5B59009E-A341-F70D-A62B-32040E5F6E0B}"/>
+              </a:ext>
+            </a:extLst>
+          </p:cNvPr>
+          <p:cNvSpPr>
+            <a:spLocks noGrp="1"/>
+          </p:cNvSpPr>
+          <p:nvPr>
+            <p:ph idx="1"/>
+          </p:nvPr>
+        </p:nvSpPr>
+        <p:spPr>
+          <a:xfrm>
+            <a:off x="1223084" y="2443379"/>
+            <a:ext cx="9745832" cy="2794447"/>
+          </a:xfrm>
+        </p:spPr>
+        <p:txBody>
+          <a:bodyPr/>
+          <a:lstStyle/>
+          <a:p>
+            <a:pPr marL="0" indent="0">
+              <a:buNone/>
+            </a:pPr>
+            <a:r>
+              <a:rPr lang="en-US" sz="2400" dirty="0">
+                <a:solidFill>
+                  <a:schemeClr val="tx1"/>
+                </a:solidFill>
+                <a:latin typeface="Consolas" panose="020B0609020204030204" pitchFamily="49" charset="0"/>
+              </a:rPr>
+              <a:t>string </a:t>
+            </a:r>
+            <a:r>
+              <a:rPr lang="en-US" sz="2400" dirty="0" err="1">
+                <a:solidFill>
+                  <a:schemeClr val="accent6">
+                    <a:lumMod val="40000"/>
+                    <a:lumOff val="60000"/>
+                  </a:schemeClr>
+                </a:solidFill>
+                <a:latin typeface="Consolas" panose="020B0609020204030204" pitchFamily="49" charset="0"/>
+              </a:rPr>
+              <a:t>elementsText</a:t>
+            </a:r>
+            <a:r>
+              <a:rPr lang="en-US" sz="2400" dirty="0">
+                <a:solidFill>
+                  <a:schemeClr val="tx1"/>
+                </a:solidFill>
+                <a:latin typeface="Consolas" panose="020B0609020204030204" pitchFamily="49" charset="0"/>
+              </a:rPr>
+              <a:t> = </a:t>
+            </a:r>
+            <a:r>
+              <a:rPr lang="nn-NO" sz="2400" dirty="0">
+                <a:solidFill>
+                  <a:schemeClr val="tx1"/>
+                </a:solidFill>
+                <a:latin typeface="Consolas" panose="020B0609020204030204" pitchFamily="49" charset="0"/>
+              </a:rPr>
+              <a:t>Console.ReadLine()</a:t>
+            </a:r>
+            <a:r>
+              <a:rPr lang="en-US" sz="2400" dirty="0">
+                <a:solidFill>
+                  <a:schemeClr val="tx1"/>
+                </a:solidFill>
+                <a:latin typeface="Consolas" panose="020B0609020204030204" pitchFamily="49" charset="0"/>
+              </a:rPr>
+              <a:t>;</a:t>
+            </a:r>
+          </a:p>
+          <a:p>
+            <a:pPr marL="0" indent="0">
+              <a:buNone/>
+            </a:pPr>
+            <a:r>
+              <a:rPr lang="en-US" sz="2400" dirty="0">
+                <a:solidFill>
+                  <a:schemeClr val="tx1"/>
+                </a:solidFill>
+                <a:latin typeface="Consolas" panose="020B0609020204030204" pitchFamily="49" charset="0"/>
+              </a:rPr>
+              <a:t>List&lt;string&gt; </a:t>
+            </a:r>
+            <a:r>
+              <a:rPr lang="en-US" sz="2400" dirty="0" err="1">
+                <a:solidFill>
+                  <a:srgbClr val="92D050"/>
+                </a:solidFill>
+                <a:latin typeface="Consolas" panose="020B0609020204030204" pitchFamily="49" charset="0"/>
+              </a:rPr>
+              <a:t>listItems</a:t>
+            </a:r>
+            <a:r>
+              <a:rPr lang="en-US" sz="2400" dirty="0">
+                <a:solidFill>
+                  <a:schemeClr val="tx1"/>
+                </a:solidFill>
+                <a:latin typeface="Consolas" panose="020B0609020204030204" pitchFamily="49" charset="0"/>
+              </a:rPr>
+              <a:t> =</a:t>
+            </a:r>
+            <a:r>
+              <a:rPr lang="en-US" sz="2400" dirty="0">
+                <a:solidFill>
+                  <a:schemeClr val="accent6">
+                    <a:lumMod val="40000"/>
+                    <a:lumOff val="60000"/>
+                  </a:schemeClr>
+                </a:solidFill>
+                <a:latin typeface="Consolas" panose="020B0609020204030204" pitchFamily="49" charset="0"/>
+              </a:rPr>
+              <a:t> </a:t>
+            </a:r>
+            <a:r>
+              <a:rPr lang="en-US" sz="2400" dirty="0" err="1">
+                <a:solidFill>
+                  <a:schemeClr val="accent6">
+                    <a:lumMod val="40000"/>
+                    <a:lumOff val="60000"/>
+                  </a:schemeClr>
+                </a:solidFill>
+                <a:latin typeface="Consolas" panose="020B0609020204030204" pitchFamily="49" charset="0"/>
+              </a:rPr>
+              <a:t>elementsText</a:t>
+            </a:r>
+            <a:r>
+              <a:rPr lang="en-US" sz="2400" dirty="0" err="1">
+                <a:solidFill>
+                  <a:schemeClr val="tx1"/>
+                </a:solidFill>
+                <a:latin typeface="Consolas" panose="020B0609020204030204" pitchFamily="49" charset="0"/>
+              </a:rPr>
+              <a:t>.</a:t>
+            </a:r>
+            <a:r>
+              <a:rPr lang="en-US" sz="2400" dirty="0" err="1">
+                <a:solidFill>
+                  <a:schemeClr val="accent2"/>
+                </a:solidFill>
+                <a:latin typeface="Consolas" panose="020B0609020204030204" pitchFamily="49" charset="0"/>
+              </a:rPr>
+              <a:t>Split</a:t>
+            </a:r>
+            <a:r>
+              <a:rPr lang="en-US" sz="2400" dirty="0">
+                <a:solidFill>
+                  <a:schemeClr val="accent2"/>
+                </a:solidFill>
+                <a:latin typeface="Consolas" panose="020B0609020204030204" pitchFamily="49" charset="0"/>
+              </a:rPr>
+              <a:t>()</a:t>
+            </a:r>
+            <a:r>
+              <a:rPr lang="en-US" sz="2400" dirty="0">
+                <a:solidFill>
+                  <a:schemeClr val="tx1"/>
+                </a:solidFill>
+                <a:latin typeface="Consolas" panose="020B0609020204030204" pitchFamily="49" charset="0"/>
+              </a:rPr>
+              <a:t>.</a:t>
+            </a:r>
+            <a:r>
+              <a:rPr lang="en-US" sz="2400" dirty="0" err="1">
+                <a:solidFill>
+                  <a:schemeClr val="accent2"/>
+                </a:solidFill>
+                <a:latin typeface="Consolas" panose="020B0609020204030204" pitchFamily="49" charset="0"/>
+              </a:rPr>
+              <a:t>ToList</a:t>
+            </a:r>
+            <a:r>
+              <a:rPr lang="en-US" sz="2400" dirty="0">
+                <a:solidFill>
+                  <a:schemeClr val="accent2"/>
+                </a:solidFill>
+                <a:latin typeface="Consolas" panose="020B0609020204030204" pitchFamily="49" charset="0"/>
+              </a:rPr>
+              <a:t>()</a:t>
+            </a:r>
+            <a:r>
+              <a:rPr lang="en-US" sz="2400" dirty="0">
+                <a:solidFill>
+                  <a:schemeClr val="tx1"/>
+                </a:solidFill>
+                <a:latin typeface="Consolas" panose="020B0609020204030204" pitchFamily="49" charset="0"/>
+              </a:rPr>
+              <a:t>;</a:t>
+            </a:r>
+          </a:p>
+          <a:p>
+            <a:pPr marL="0" indent="0">
+              <a:buNone/>
+            </a:pPr>
+            <a:endParaRPr lang="en-US" sz="2400" dirty="0">
+              <a:solidFill>
+                <a:schemeClr val="tx1"/>
+              </a:solidFill>
+              <a:latin typeface="Consolas" panose="020B0609020204030204" pitchFamily="49" charset="0"/>
+            </a:endParaRPr>
+          </a:p>
+          <a:p>
+            <a:pPr marL="0" indent="0">
+              <a:buNone/>
+            </a:pPr>
+            <a:r>
+              <a:rPr lang="en-US" sz="2400" dirty="0">
+                <a:solidFill>
+                  <a:schemeClr val="tx1"/>
+                </a:solidFill>
+                <a:latin typeface="Consolas" panose="020B0609020204030204" pitchFamily="49" charset="0"/>
+              </a:rPr>
+              <a:t>List&lt;int&gt; </a:t>
+            </a:r>
+            <a:r>
+              <a:rPr lang="en-US" sz="2400" dirty="0" err="1">
+                <a:solidFill>
+                  <a:srgbClr val="92D050"/>
+                </a:solidFill>
+                <a:latin typeface="Consolas" panose="020B0609020204030204" pitchFamily="49" charset="0"/>
+              </a:rPr>
+              <a:t>listItems</a:t>
+            </a:r>
+            <a:r>
+              <a:rPr lang="en-US" sz="2400" dirty="0">
+                <a:solidFill>
+                  <a:schemeClr val="tx1"/>
+                </a:solidFill>
+                <a:latin typeface="Consolas" panose="020B0609020204030204" pitchFamily="49" charset="0"/>
+              </a:rPr>
+              <a:t> =</a:t>
+            </a:r>
+            <a:r>
+              <a:rPr lang="en-US" sz="2400" dirty="0">
+                <a:solidFill>
+                  <a:schemeClr val="accent6">
+                    <a:lumMod val="40000"/>
+                    <a:lumOff val="60000"/>
+                  </a:schemeClr>
+                </a:solidFill>
+                <a:latin typeface="Consolas" panose="020B0609020204030204" pitchFamily="49" charset="0"/>
+              </a:rPr>
+              <a:t>    </a:t>
+            </a:r>
+            <a:r>
+              <a:rPr lang="nn-NO" sz="2400" dirty="0">
+                <a:solidFill>
+                  <a:schemeClr val="tx1"/>
+                </a:solidFill>
+                <a:latin typeface="Consolas" panose="020B0609020204030204" pitchFamily="49" charset="0"/>
+              </a:rPr>
+              <a:t>Console.ReadLine()</a:t>
+            </a:r>
+            <a:r>
+              <a:rPr lang="en-US" sz="2400" dirty="0">
+                <a:solidFill>
+                  <a:schemeClr val="tx1"/>
+                </a:solidFill>
+                <a:latin typeface="Consolas" panose="020B0609020204030204" pitchFamily="49" charset="0"/>
+              </a:rPr>
+              <a:t>.</a:t>
+            </a:r>
+            <a:r>
+              <a:rPr lang="en-US" sz="2400" dirty="0">
+                <a:solidFill>
+                  <a:schemeClr val="accent2"/>
+                </a:solidFill>
+                <a:latin typeface="Consolas" panose="020B0609020204030204" pitchFamily="49" charset="0"/>
+              </a:rPr>
+              <a:t>Split()</a:t>
+            </a:r>
+            <a:r>
+              <a:rPr lang="en-US" sz="2400" dirty="0">
+                <a:solidFill>
+                  <a:schemeClr val="tx1"/>
+                </a:solidFill>
+                <a:latin typeface="Consolas" panose="020B0609020204030204" pitchFamily="49" charset="0"/>
+              </a:rPr>
+              <a:t>.</a:t>
+            </a:r>
+            <a:r>
+              <a:rPr lang="en-US" sz="2400" dirty="0">
+                <a:solidFill>
+                  <a:schemeClr val="accent2"/>
+                </a:solidFill>
+                <a:latin typeface="Consolas" panose="020B0609020204030204" pitchFamily="49" charset="0"/>
+              </a:rPr>
+              <a:t>Select</a:t>
+            </a:r>
+            <a:r>
+              <a:rPr lang="en-US" sz="2400" dirty="0">
+                <a:solidFill>
+                  <a:schemeClr val="tx1"/>
+                </a:solidFill>
+                <a:latin typeface="Consolas" panose="020B0609020204030204" pitchFamily="49" charset="0"/>
+              </a:rPr>
+              <a:t>(</a:t>
+            </a:r>
+            <a:r>
+              <a:rPr lang="en-US" sz="2400" dirty="0" err="1">
+                <a:solidFill>
+                  <a:srgbClr val="00B050"/>
+                </a:solidFill>
+                <a:latin typeface="Consolas" panose="020B0609020204030204" pitchFamily="49" charset="0"/>
+              </a:rPr>
+              <a:t>int</a:t>
+            </a:r>
+            <a:r>
+              <a:rPr lang="en-US" sz="2400" dirty="0" err="1">
+                <a:solidFill>
+                  <a:schemeClr val="tx1"/>
+                </a:solidFill>
+                <a:latin typeface="Consolas" panose="020B0609020204030204" pitchFamily="49" charset="0"/>
+              </a:rPr>
+              <a:t>.</a:t>
+            </a:r>
+            <a:r>
+              <a:rPr lang="en-US" sz="2400" dirty="0" err="1">
+                <a:solidFill>
+                  <a:schemeClr val="tx2"/>
+                </a:solidFill>
+                <a:latin typeface="Consolas" panose="020B0609020204030204" pitchFamily="49" charset="0"/>
+              </a:rPr>
+              <a:t>Parse</a:t>
+            </a:r>
+            <a:r>
+              <a:rPr lang="en-US" sz="2400" dirty="0">
+                <a:solidFill>
+                  <a:schemeClr val="tx1"/>
+                </a:solidFill>
+                <a:latin typeface="Consolas" panose="020B0609020204030204" pitchFamily="49" charset="0"/>
+              </a:rPr>
+              <a:t>).</a:t>
+            </a:r>
+            <a:r>
+              <a:rPr lang="en-US" sz="2400" dirty="0" err="1">
+                <a:solidFill>
+                  <a:schemeClr val="accent2"/>
+                </a:solidFill>
+                <a:latin typeface="Consolas" panose="020B0609020204030204" pitchFamily="49" charset="0"/>
+              </a:rPr>
+              <a:t>ToList</a:t>
+            </a:r>
+            <a:r>
+              <a:rPr lang="en-US" sz="2400" dirty="0">
+                <a:solidFill>
+                  <a:schemeClr val="accent2"/>
+                </a:solidFill>
+                <a:latin typeface="Consolas" panose="020B0609020204030204" pitchFamily="49" charset="0"/>
+              </a:rPr>
+              <a:t>()</a:t>
+            </a:r>
+            <a:r>
+              <a:rPr lang="en-US" sz="2400" dirty="0">
+                <a:solidFill>
+                  <a:schemeClr val="tx1"/>
+                </a:solidFill>
+                <a:latin typeface="Consolas" panose="020B0609020204030204" pitchFamily="49" charset="0"/>
+              </a:rPr>
+              <a:t>;</a:t>
+            </a:r>
+            <a:endParaRPr lang="bg-BG" sz="2400" dirty="0">
+              <a:solidFill>
+                <a:schemeClr val="tx1"/>
+              </a:solidFill>
+              <a:latin typeface="Consolas" panose="020B0609020204030204" pitchFamily="49" charset="0"/>
+            </a:endParaRPr>
+          </a:p>
+          <a:p>
+            <a:pPr marL="0" indent="0">
+              <a:buNone/>
+            </a:pPr>
+            <a:endParaRPr lang="bg-BG" sz="2800" dirty="0">
+              <a:solidFill>
+                <a:schemeClr val="tx1"/>
+              </a:solidFill>
+              <a:latin typeface="Consolas" panose="020B0609020204030204" pitchFamily="49" charset="0"/>
+            </a:endParaRPr>
+          </a:p>
+          <a:p>
+            <a:pPr marL="0" indent="0">
+              <a:buNone/>
+            </a:pPr>
+            <a:endParaRPr lang="bg-BG" dirty="0">
+              <a:solidFill>
+                <a:schemeClr val="tx1"/>
+              </a:solidFill>
+              <a:latin typeface="Consolas" panose="020B0609020204030204" pitchFamily="49" charset="0"/>
+            </a:endParaRPr>
+          </a:p>
+          <a:p>
+            <a:endParaRPr lang="en-US" dirty="0"/>
+          </a:p>
+        </p:txBody>
+      </p:sp>
+    </p:spTree>
+    <p:extLst>
+      <p:ext uri="{BB962C8B-B14F-4D97-AF65-F5344CB8AC3E}">
+        <p14:creationId xmlns:p14="http://schemas.microsoft.com/office/powerpoint/2010/main" val="1507273939"/>
+      </p:ext>
+    </p:extLst>
+  </p:cSld>
+  <p:clrMapOvr>
+    <a:masterClrMapping/>
+  </p:clrMapOvr>
+</p:sld>
+</file>
+
+<file path=ppt/slides/slide24.xml><?xml version="1.0" encoding="utf-8"?>
+<p:sld xmlns:a="http://schemas.openxmlformats.org/drawingml/2006/main" xmlns:r="http://schemas.openxmlformats.org/officeDocument/2006/relationships" xmlns:p="http://schemas.openxmlformats.org/presentationml/2006/main">
+  <p:cSld>
+    <p:spTree>
+      <p:nvGrpSpPr>
+        <p:cNvPr id="1" name=""/>
+        <p:cNvGrpSpPr/>
+        <p:nvPr/>
+      </p:nvGrpSpPr>
+      <p:grpSpPr>
+        <a:xfrm>
+          <a:off x="0" y="0"/>
+          <a:ext cx="0" cy="0"/>
+          <a:chOff x="0" y="0"/>
+          <a:chExt cx="0" cy="0"/>
+        </a:xfrm>
+      </p:grpSpPr>
+      <p:sp>
+        <p:nvSpPr>
+          <p:cNvPr id="2" name="Заглавие 1">
+            <a:extLst>
+              <a:ext uri="{FF2B5EF4-FFF2-40B4-BE49-F238E27FC236}">
+                <a16:creationId xmlns:a16="http://schemas.microsoft.com/office/drawing/2014/main" id="{5BE81EE3-E59E-A8BA-68F7-759A744BC9BD}"/>
+              </a:ext>
+            </a:extLst>
+          </p:cNvPr>
+          <p:cNvSpPr>
+            <a:spLocks noGrp="1"/>
+          </p:cNvSpPr>
+          <p:nvPr>
+            <p:ph type="title"/>
+          </p:nvPr>
+        </p:nvSpPr>
+        <p:spPr/>
+        <p:txBody>
+          <a:bodyPr>
+            <a:normAutofit/>
+          </a:bodyPr>
+          <a:lstStyle/>
+          <a:p>
+            <a:pPr algn="ctr"/>
+            <a:r>
+              <a:rPr lang="bg-BG" dirty="0">
+                <a:solidFill>
+                  <a:schemeClr val="tx1"/>
+                </a:solidFill>
+                <a:latin typeface="Arial" panose="020B0604020202020204" pitchFamily="34" charset="0"/>
+                <a:cs typeface="Arial" panose="020B0604020202020204" pitchFamily="34" charset="0"/>
+              </a:rPr>
+              <a:t>Принтиране на списък</a:t>
+            </a:r>
+            <a:endParaRPr lang="en-US" dirty="0">
+              <a:solidFill>
+                <a:schemeClr val="tx1"/>
+              </a:solidFill>
+              <a:latin typeface="Arial" panose="020B0604020202020204" pitchFamily="34" charset="0"/>
+              <a:cs typeface="Arial" panose="020B0604020202020204" pitchFamily="34" charset="0"/>
+            </a:endParaRPr>
+          </a:p>
+        </p:txBody>
+      </p:sp>
+      <p:sp>
+        <p:nvSpPr>
+          <p:cNvPr id="3" name="Контейнер за съдържание 2">
+            <a:extLst>
+              <a:ext uri="{FF2B5EF4-FFF2-40B4-BE49-F238E27FC236}">
+                <a16:creationId xmlns:a16="http://schemas.microsoft.com/office/drawing/2014/main" id="{5B59009E-A341-F70D-A62B-32040E5F6E0B}"/>
+              </a:ext>
+            </a:extLst>
+          </p:cNvPr>
+          <p:cNvSpPr>
+            <a:spLocks noGrp="1"/>
+          </p:cNvSpPr>
+          <p:nvPr>
+            <p:ph idx="1"/>
+          </p:nvPr>
+        </p:nvSpPr>
+        <p:spPr>
+          <a:xfrm>
+            <a:off x="1223084" y="2443380"/>
+            <a:ext cx="9359099" cy="1938992"/>
+          </a:xfrm>
+        </p:spPr>
+        <p:txBody>
+          <a:bodyPr/>
+          <a:lstStyle/>
+          <a:p>
+            <a:pPr marL="0" indent="0">
+              <a:buNone/>
+            </a:pPr>
+            <a:endParaRPr lang="bg-BG" sz="2800" dirty="0">
+              <a:solidFill>
+                <a:schemeClr val="tx1"/>
+              </a:solidFill>
+              <a:latin typeface="Consolas" panose="020B0609020204030204" pitchFamily="49" charset="0"/>
+            </a:endParaRPr>
+          </a:p>
+          <a:p>
+            <a:pPr marL="0" indent="0">
+              <a:buNone/>
+            </a:pPr>
+            <a:endParaRPr lang="bg-BG" dirty="0">
+              <a:solidFill>
+                <a:schemeClr val="tx1"/>
+              </a:solidFill>
+              <a:latin typeface="Consolas" panose="020B0609020204030204" pitchFamily="49" charset="0"/>
+            </a:endParaRPr>
+          </a:p>
+          <a:p>
+            <a:endParaRPr lang="en-US" dirty="0"/>
+          </a:p>
+        </p:txBody>
+      </p:sp>
+      <p:sp>
+        <p:nvSpPr>
+          <p:cNvPr id="5" name="Текстово поле 4">
+            <a:extLst>
+              <a:ext uri="{FF2B5EF4-FFF2-40B4-BE49-F238E27FC236}">
+                <a16:creationId xmlns:a16="http://schemas.microsoft.com/office/drawing/2014/main" id="{244B509F-CD00-470B-1C98-34FA4474D0A5}"/>
+              </a:ext>
+            </a:extLst>
+          </p:cNvPr>
+          <p:cNvSpPr txBox="1"/>
+          <p:nvPr/>
+        </p:nvSpPr>
+        <p:spPr>
+          <a:xfrm>
+            <a:off x="2147379" y="2339405"/>
+            <a:ext cx="7897242" cy="1938992"/>
+          </a:xfrm>
+          <a:prstGeom prst="rect">
+            <a:avLst/>
+          </a:prstGeom>
+          <a:noFill/>
+        </p:spPr>
+        <p:txBody>
+          <a:bodyPr wrap="square">
+            <a:spAutoFit/>
+          </a:bodyPr>
+          <a:lstStyle/>
+          <a:p>
+            <a:pPr marL="0" indent="0">
+              <a:buNone/>
+            </a:pPr>
+            <a:endParaRPr lang="bg-BG" sz="2400" dirty="0">
+              <a:solidFill>
+                <a:schemeClr val="tx1"/>
+              </a:solidFill>
+              <a:latin typeface="Consolas" panose="020B0609020204030204" pitchFamily="49" charset="0"/>
+            </a:endParaRPr>
+          </a:p>
+          <a:p>
+            <a:pPr marL="0" indent="0">
+              <a:buNone/>
+            </a:pPr>
+            <a:r>
+              <a:rPr lang="nn-NO" sz="2400" dirty="0">
+                <a:solidFill>
+                  <a:schemeClr val="tx1"/>
+                </a:solidFill>
+                <a:latin typeface="Consolas" panose="020B0609020204030204" pitchFamily="49" charset="0"/>
+              </a:rPr>
+              <a:t>for (int i = 0; i &lt; </a:t>
+            </a:r>
+            <a:r>
+              <a:rPr lang="nn-NO" sz="2400" dirty="0">
+                <a:solidFill>
+                  <a:srgbClr val="92D050"/>
+                </a:solidFill>
+                <a:latin typeface="Consolas" panose="020B0609020204030204" pitchFamily="49" charset="0"/>
+              </a:rPr>
+              <a:t>my</a:t>
+            </a:r>
+            <a:r>
+              <a:rPr lang="en-US" sz="2400" dirty="0">
+                <a:solidFill>
+                  <a:srgbClr val="92D050"/>
+                </a:solidFill>
+                <a:latin typeface="Consolas" panose="020B0609020204030204" pitchFamily="49" charset="0"/>
+              </a:rPr>
+              <a:t>List</a:t>
+            </a:r>
+            <a:r>
+              <a:rPr lang="nn-NO" sz="2400" dirty="0">
+                <a:solidFill>
+                  <a:schemeClr val="tx1"/>
+                </a:solidFill>
+                <a:latin typeface="Consolas" panose="020B0609020204030204" pitchFamily="49" charset="0"/>
+              </a:rPr>
+              <a:t>.</a:t>
+            </a:r>
+            <a:r>
+              <a:rPr lang="nn-NO" sz="2400" dirty="0">
+                <a:solidFill>
+                  <a:schemeClr val="tx2">
+                    <a:lumMod val="75000"/>
+                  </a:schemeClr>
+                </a:solidFill>
+                <a:latin typeface="Consolas" panose="020B0609020204030204" pitchFamily="49" charset="0"/>
+              </a:rPr>
+              <a:t>Length</a:t>
+            </a:r>
+            <a:r>
+              <a:rPr lang="nn-NO" sz="2400" dirty="0">
+                <a:solidFill>
+                  <a:schemeClr val="tx1"/>
+                </a:solidFill>
+                <a:latin typeface="Consolas" panose="020B0609020204030204" pitchFamily="49" charset="0"/>
+              </a:rPr>
+              <a:t>; i++)</a:t>
+            </a:r>
+          </a:p>
+          <a:p>
+            <a:pPr marL="0" indent="0">
+              <a:buNone/>
+            </a:pPr>
+            <a:r>
+              <a:rPr lang="bg-BG" sz="2400" dirty="0">
+                <a:solidFill>
+                  <a:schemeClr val="tx1"/>
+                </a:solidFill>
+                <a:latin typeface="Consolas" panose="020B0609020204030204" pitchFamily="49" charset="0"/>
+              </a:rPr>
+              <a:t>    {</a:t>
+            </a:r>
+            <a:endParaRPr lang="bg-BG" sz="2400" dirty="0">
+              <a:solidFill>
+                <a:schemeClr val="tx2">
+                  <a:lumMod val="60000"/>
+                  <a:lumOff val="40000"/>
+                </a:schemeClr>
+              </a:solidFill>
+              <a:latin typeface="Consolas" panose="020B0609020204030204" pitchFamily="49" charset="0"/>
+            </a:endParaRPr>
+          </a:p>
+          <a:p>
+            <a:pPr marL="0" indent="0">
+              <a:buNone/>
+            </a:pPr>
+            <a:r>
+              <a:rPr lang="en-US" sz="2400" dirty="0">
+                <a:solidFill>
+                  <a:schemeClr val="tx2">
+                    <a:lumMod val="60000"/>
+                    <a:lumOff val="40000"/>
+                  </a:schemeClr>
+                </a:solidFill>
+                <a:latin typeface="Consolas" panose="020B0609020204030204" pitchFamily="49" charset="0"/>
+              </a:rPr>
+              <a:t> 		</a:t>
+            </a:r>
+            <a:r>
+              <a:rPr lang="en-US" sz="2400" dirty="0" err="1">
+                <a:latin typeface="Consolas" panose="020B0609020204030204" pitchFamily="49" charset="0"/>
+              </a:rPr>
+              <a:t>Console.WriteLine</a:t>
+            </a:r>
+            <a:r>
+              <a:rPr lang="en-US" sz="2400" dirty="0">
+                <a:solidFill>
+                  <a:schemeClr val="tx2">
+                    <a:lumMod val="60000"/>
+                    <a:lumOff val="40000"/>
+                  </a:schemeClr>
+                </a:solidFill>
+                <a:latin typeface="Consolas" panose="020B0609020204030204" pitchFamily="49" charset="0"/>
+              </a:rPr>
+              <a:t>(</a:t>
+            </a:r>
+            <a:r>
+              <a:rPr lang="nn-NO" sz="2400" dirty="0">
+                <a:solidFill>
+                  <a:srgbClr val="92D050"/>
+                </a:solidFill>
+                <a:latin typeface="Consolas" panose="020B0609020204030204" pitchFamily="49" charset="0"/>
+              </a:rPr>
+              <a:t>my</a:t>
+            </a:r>
+            <a:r>
+              <a:rPr lang="en-US" sz="2400" dirty="0">
+                <a:solidFill>
+                  <a:srgbClr val="92D050"/>
+                </a:solidFill>
+                <a:latin typeface="Consolas" panose="020B0609020204030204" pitchFamily="49" charset="0"/>
+              </a:rPr>
+              <a:t>List</a:t>
+            </a:r>
+            <a:r>
+              <a:rPr lang="nn-NO" sz="2400" dirty="0">
+                <a:solidFill>
+                  <a:schemeClr val="accent6">
+                    <a:lumMod val="60000"/>
+                    <a:lumOff val="40000"/>
+                  </a:schemeClr>
+                </a:solidFill>
+                <a:latin typeface="Consolas" panose="020B0609020204030204" pitchFamily="49" charset="0"/>
+              </a:rPr>
+              <a:t>[i]</a:t>
+            </a:r>
+            <a:r>
+              <a:rPr lang="nn-NO" sz="2400" dirty="0">
+                <a:latin typeface="Consolas" panose="020B0609020204030204" pitchFamily="49" charset="0"/>
+              </a:rPr>
+              <a:t>);</a:t>
+            </a:r>
+            <a:endParaRPr lang="en-US" sz="2400" dirty="0">
+              <a:latin typeface="Consolas" panose="020B0609020204030204" pitchFamily="49" charset="0"/>
+            </a:endParaRPr>
+          </a:p>
+          <a:p>
+            <a:pPr marL="0" indent="0">
+              <a:buNone/>
+            </a:pPr>
+            <a:r>
+              <a:rPr lang="bg-BG" sz="2400" dirty="0">
+                <a:solidFill>
+                  <a:schemeClr val="tx1"/>
+                </a:solidFill>
+                <a:latin typeface="Consolas" panose="020B0609020204030204" pitchFamily="49" charset="0"/>
+              </a:rPr>
+              <a:t>    }</a:t>
+            </a:r>
+          </a:p>
+        </p:txBody>
+      </p:sp>
+      <p:sp>
+        <p:nvSpPr>
+          <p:cNvPr id="6" name="Текстово поле 5">
+            <a:extLst>
+              <a:ext uri="{FF2B5EF4-FFF2-40B4-BE49-F238E27FC236}">
+                <a16:creationId xmlns:a16="http://schemas.microsoft.com/office/drawing/2014/main" id="{E6D827FB-9B63-6B7D-8160-EBF3DE0E1DA0}"/>
+              </a:ext>
+            </a:extLst>
+          </p:cNvPr>
+          <p:cNvSpPr txBox="1"/>
+          <p:nvPr/>
+        </p:nvSpPr>
+        <p:spPr>
+          <a:xfrm>
+            <a:off x="1761663" y="2186877"/>
+            <a:ext cx="2242166" cy="369332"/>
+          </a:xfrm>
+          <a:prstGeom prst="rect">
+            <a:avLst/>
+          </a:prstGeom>
+          <a:noFill/>
+        </p:spPr>
+        <p:txBody>
+          <a:bodyPr wrap="square" rtlCol="0">
+            <a:spAutoFit/>
+          </a:bodyPr>
+          <a:lstStyle/>
+          <a:p>
+            <a:r>
+              <a:rPr lang="bg-BG" dirty="0">
+                <a:latin typeface="Arial" panose="020B0604020202020204" pitchFamily="34" charset="0"/>
+                <a:cs typeface="Arial" panose="020B0604020202020204" pitchFamily="34" charset="0"/>
+              </a:rPr>
+              <a:t> С  </a:t>
+            </a:r>
+            <a:r>
+              <a:rPr lang="en-US" dirty="0">
+                <a:solidFill>
+                  <a:schemeClr val="accent6">
+                    <a:lumMod val="60000"/>
+                    <a:lumOff val="40000"/>
+                  </a:schemeClr>
+                </a:solidFill>
+                <a:latin typeface="Arial" panose="020B0604020202020204" pitchFamily="34" charset="0"/>
+                <a:cs typeface="Arial" panose="020B0604020202020204" pitchFamily="34" charset="0"/>
+              </a:rPr>
+              <a:t>for-</a:t>
+            </a:r>
+            <a:r>
+              <a:rPr lang="bg-BG" dirty="0">
+                <a:solidFill>
+                  <a:schemeClr val="accent6">
+                    <a:lumMod val="60000"/>
+                    <a:lumOff val="40000"/>
+                  </a:schemeClr>
+                </a:solidFill>
+                <a:latin typeface="Arial" panose="020B0604020202020204" pitchFamily="34" charset="0"/>
+                <a:cs typeface="Arial" panose="020B0604020202020204" pitchFamily="34" charset="0"/>
+              </a:rPr>
+              <a:t>цикъл</a:t>
+            </a:r>
+            <a:endParaRPr lang="en-US" dirty="0">
+              <a:solidFill>
+                <a:schemeClr val="accent6">
+                  <a:lumMod val="60000"/>
+                  <a:lumOff val="40000"/>
+                </a:schemeClr>
+              </a:solidFill>
+              <a:latin typeface="Arial" panose="020B0604020202020204" pitchFamily="34" charset="0"/>
+              <a:cs typeface="Arial" panose="020B0604020202020204" pitchFamily="34" charset="0"/>
+            </a:endParaRPr>
+          </a:p>
+        </p:txBody>
+      </p:sp>
+      <p:sp>
+        <p:nvSpPr>
+          <p:cNvPr id="7" name="Текстово поле 6">
+            <a:extLst>
+              <a:ext uri="{FF2B5EF4-FFF2-40B4-BE49-F238E27FC236}">
+                <a16:creationId xmlns:a16="http://schemas.microsoft.com/office/drawing/2014/main" id="{ED07C795-261F-4E73-6872-1F2A611E3A7E}"/>
+              </a:ext>
+            </a:extLst>
+          </p:cNvPr>
+          <p:cNvSpPr txBox="1"/>
+          <p:nvPr/>
+        </p:nvSpPr>
+        <p:spPr>
+          <a:xfrm>
+            <a:off x="1761663" y="4639446"/>
+            <a:ext cx="2357576" cy="369332"/>
+          </a:xfrm>
+          <a:prstGeom prst="rect">
+            <a:avLst/>
+          </a:prstGeom>
+          <a:noFill/>
+        </p:spPr>
+        <p:txBody>
+          <a:bodyPr wrap="square" rtlCol="0">
+            <a:spAutoFit/>
+          </a:bodyPr>
+          <a:lstStyle/>
+          <a:p>
+            <a:r>
+              <a:rPr lang="bg-BG" dirty="0">
+                <a:latin typeface="Arial" panose="020B0604020202020204" pitchFamily="34" charset="0"/>
+                <a:cs typeface="Arial" panose="020B0604020202020204" pitchFamily="34" charset="0"/>
+              </a:rPr>
+              <a:t> Със  </a:t>
+            </a:r>
+            <a:r>
+              <a:rPr lang="en-US" dirty="0" err="1">
+                <a:solidFill>
+                  <a:schemeClr val="accent6">
+                    <a:lumMod val="60000"/>
+                    <a:lumOff val="40000"/>
+                  </a:schemeClr>
+                </a:solidFill>
+                <a:latin typeface="Arial" panose="020B0604020202020204" pitchFamily="34" charset="0"/>
+                <a:cs typeface="Arial" panose="020B0604020202020204" pitchFamily="34" charset="0"/>
+              </a:rPr>
+              <a:t>string.Join</a:t>
+            </a:r>
+            <a:endParaRPr lang="en-US" dirty="0">
+              <a:solidFill>
+                <a:schemeClr val="accent6">
+                  <a:lumMod val="60000"/>
+                  <a:lumOff val="40000"/>
+                </a:schemeClr>
+              </a:solidFill>
+              <a:latin typeface="Arial" panose="020B0604020202020204" pitchFamily="34" charset="0"/>
+              <a:cs typeface="Arial" panose="020B0604020202020204" pitchFamily="34" charset="0"/>
+            </a:endParaRPr>
+          </a:p>
+        </p:txBody>
+      </p:sp>
+      <p:sp>
+        <p:nvSpPr>
+          <p:cNvPr id="8" name="Текстово поле 7">
+            <a:extLst>
+              <a:ext uri="{FF2B5EF4-FFF2-40B4-BE49-F238E27FC236}">
+                <a16:creationId xmlns:a16="http://schemas.microsoft.com/office/drawing/2014/main" id="{1BFC2047-E17C-F824-FEB2-38777CADFD6C}"/>
+              </a:ext>
+            </a:extLst>
+          </p:cNvPr>
+          <p:cNvSpPr txBox="1"/>
+          <p:nvPr/>
+        </p:nvSpPr>
+        <p:spPr>
+          <a:xfrm>
+            <a:off x="2147379" y="4824112"/>
+            <a:ext cx="7897242" cy="830997"/>
+          </a:xfrm>
+          <a:prstGeom prst="rect">
+            <a:avLst/>
+          </a:prstGeom>
+          <a:noFill/>
+        </p:spPr>
+        <p:txBody>
+          <a:bodyPr wrap="square">
+            <a:spAutoFit/>
+          </a:bodyPr>
+          <a:lstStyle/>
+          <a:p>
+            <a:pPr marL="0" indent="0">
+              <a:buNone/>
+            </a:pPr>
+            <a:endParaRPr lang="bg-BG" sz="2400" dirty="0">
+              <a:solidFill>
+                <a:schemeClr val="tx1"/>
+              </a:solidFill>
+              <a:latin typeface="Consolas" panose="020B0609020204030204" pitchFamily="49" charset="0"/>
+            </a:endParaRPr>
+          </a:p>
+          <a:p>
+            <a:pPr marL="0" indent="0">
+              <a:buNone/>
+            </a:pPr>
+            <a:r>
+              <a:rPr lang="en-US" sz="2400" dirty="0" err="1">
+                <a:latin typeface="Consolas" panose="020B0609020204030204" pitchFamily="49" charset="0"/>
+              </a:rPr>
+              <a:t>Console.WriteLine</a:t>
+            </a:r>
+            <a:r>
+              <a:rPr lang="en-US" sz="2400" dirty="0">
+                <a:latin typeface="Consolas" panose="020B0609020204030204" pitchFamily="49" charset="0"/>
+              </a:rPr>
+              <a:t>(</a:t>
+            </a:r>
+            <a:r>
+              <a:rPr lang="en-US" sz="2400" dirty="0" err="1">
+                <a:latin typeface="Consolas" panose="020B0609020204030204" pitchFamily="49" charset="0"/>
+              </a:rPr>
+              <a:t>string.Join</a:t>
+            </a:r>
+            <a:r>
+              <a:rPr lang="en-US" sz="2400" dirty="0">
+                <a:latin typeface="Consolas" panose="020B0609020204030204" pitchFamily="49" charset="0"/>
+              </a:rPr>
+              <a:t>(‘,’ </a:t>
+            </a:r>
+            <a:r>
+              <a:rPr lang="nn-NO" sz="2400" dirty="0">
+                <a:solidFill>
+                  <a:srgbClr val="92D050"/>
+                </a:solidFill>
+                <a:latin typeface="Consolas" panose="020B0609020204030204" pitchFamily="49" charset="0"/>
+              </a:rPr>
+              <a:t>my</a:t>
+            </a:r>
+            <a:r>
+              <a:rPr lang="en-US" sz="2400" dirty="0">
+                <a:solidFill>
+                  <a:srgbClr val="92D050"/>
+                </a:solidFill>
+                <a:latin typeface="Consolas" panose="020B0609020204030204" pitchFamily="49" charset="0"/>
+              </a:rPr>
+              <a:t>List</a:t>
+            </a:r>
+            <a:r>
+              <a:rPr lang="en-US" sz="2400" dirty="0">
+                <a:latin typeface="Consolas" panose="020B0609020204030204" pitchFamily="49" charset="0"/>
+              </a:rPr>
+              <a:t>))</a:t>
+            </a:r>
+            <a:endParaRPr lang="bg-BG" sz="2400" dirty="0">
+              <a:solidFill>
+                <a:schemeClr val="tx1"/>
+              </a:solidFill>
+              <a:latin typeface="Consolas" panose="020B0609020204030204" pitchFamily="49" charset="0"/>
+            </a:endParaRPr>
+          </a:p>
+        </p:txBody>
+      </p:sp>
+    </p:spTree>
+    <p:extLst>
+      <p:ext uri="{BB962C8B-B14F-4D97-AF65-F5344CB8AC3E}">
+        <p14:creationId xmlns:p14="http://schemas.microsoft.com/office/powerpoint/2010/main" val="4140491530"/>
+      </p:ext>
+    </p:extLst>
+  </p:cSld>
+  <p:clrMapOvr>
+    <a:masterClrMapping/>
+  </p:clrMapOvr>
+</p:sld>
+</file>
+
 <file path=ppt/slides/slide3.xml><?xml version="1.0" encoding="utf-8"?>
 <p:sld xmlns:a="http://schemas.openxmlformats.org/drawingml/2006/main" xmlns:r="http://schemas.openxmlformats.org/officeDocument/2006/relationships" xmlns:p="http://schemas.openxmlformats.org/presentationml/2006/main">
   <p:cSld>
@@ -10248,7 +13887,7 @@
                   <a:schemeClr val="tx1"/>
                 </a:solidFill>
               </a:rPr>
-              <a:t>са наименуван блок от код, който върши някаква работа и може впоследствие да бъде извикван на много места. Декларират се клас.</a:t>
+              <a:t>са наименуван блок от код, който върши някаква работа и може впоследствие да бъде извикван на много места. Декларират се в клас.</a:t>
             </a:r>
           </a:p>
         </p:txBody>

</xml_diff>

<commit_message>
Associative arrays - done
</commit_message>
<xml_diff>
--- a/C# Intermediate.pptx
+++ b/C# Intermediate.pptx
@@ -32,6 +32,11 @@
     <p:sldId id="279" r:id="rId26"/>
     <p:sldId id="280" r:id="rId27"/>
     <p:sldId id="283" r:id="rId28"/>
+    <p:sldId id="284" r:id="rId29"/>
+    <p:sldId id="285" r:id="rId30"/>
+    <p:sldId id="286" r:id="rId31"/>
+    <p:sldId id="287" r:id="rId32"/>
+    <p:sldId id="289" r:id="rId33"/>
   </p:sldIdLst>
   <p:sldSz cx="12192000" cy="6858000"/>
   <p:notesSz cx="6858000" cy="9144000"/>
@@ -334,7 +339,7 @@
           <a:p>
             <a:fld id="{0BD89023-946D-4914-A444-F66256F52110}" type="datetimeFigureOut">
               <a:rPr lang="bg-BG" smtClean="0"/>
-              <a:t>18.11.2022 г.</a:t>
+              <a:t>20.11.2022 г.</a:t>
             </a:fld>
             <a:endParaRPr lang="bg-BG"/>
           </a:p>
@@ -615,7 +620,7 @@
           <a:p>
             <a:fld id="{0BD89023-946D-4914-A444-F66256F52110}" type="datetimeFigureOut">
               <a:rPr lang="bg-BG" smtClean="0"/>
-              <a:t>18.11.2022 г.</a:t>
+              <a:t>20.11.2022 г.</a:t>
             </a:fld>
             <a:endParaRPr lang="bg-BG"/>
           </a:p>
@@ -807,7 +812,7 @@
           <a:p>
             <a:fld id="{0BD89023-946D-4914-A444-F66256F52110}" type="datetimeFigureOut">
               <a:rPr lang="bg-BG" smtClean="0"/>
-              <a:t>18.11.2022 г.</a:t>
+              <a:t>20.11.2022 г.</a:t>
             </a:fld>
             <a:endParaRPr lang="bg-BG"/>
           </a:p>
@@ -1068,7 +1073,7 @@
           <a:p>
             <a:fld id="{0BD89023-946D-4914-A444-F66256F52110}" type="datetimeFigureOut">
               <a:rPr lang="bg-BG" smtClean="0"/>
-              <a:t>18.11.2022 г.</a:t>
+              <a:t>20.11.2022 г.</a:t>
             </a:fld>
             <a:endParaRPr lang="bg-BG"/>
           </a:p>
@@ -1494,7 +1499,7 @@
           <a:p>
             <a:fld id="{0BD89023-946D-4914-A444-F66256F52110}" type="datetimeFigureOut">
               <a:rPr lang="bg-BG" smtClean="0"/>
-              <a:t>18.11.2022 г.</a:t>
+              <a:t>20.11.2022 г.</a:t>
             </a:fld>
             <a:endParaRPr lang="bg-BG"/>
           </a:p>
@@ -2040,7 +2045,7 @@
           <a:p>
             <a:fld id="{0BD89023-946D-4914-A444-F66256F52110}" type="datetimeFigureOut">
               <a:rPr lang="bg-BG" smtClean="0"/>
-              <a:t>18.11.2022 г.</a:t>
+              <a:t>20.11.2022 г.</a:t>
             </a:fld>
             <a:endParaRPr lang="bg-BG"/>
           </a:p>
@@ -2871,7 +2876,7 @@
           <a:p>
             <a:fld id="{0BD89023-946D-4914-A444-F66256F52110}" type="datetimeFigureOut">
               <a:rPr lang="bg-BG" smtClean="0"/>
-              <a:t>18.11.2022 г.</a:t>
+              <a:t>20.11.2022 г.</a:t>
             </a:fld>
             <a:endParaRPr lang="bg-BG"/>
           </a:p>
@@ -3041,7 +3046,7 @@
           <a:p>
             <a:fld id="{0BD89023-946D-4914-A444-F66256F52110}" type="datetimeFigureOut">
               <a:rPr lang="bg-BG" smtClean="0"/>
-              <a:t>18.11.2022 г.</a:t>
+              <a:t>20.11.2022 г.</a:t>
             </a:fld>
             <a:endParaRPr lang="bg-BG"/>
           </a:p>
@@ -3221,7 +3226,7 @@
           <a:p>
             <a:fld id="{0BD89023-946D-4914-A444-F66256F52110}" type="datetimeFigureOut">
               <a:rPr lang="bg-BG" smtClean="0"/>
-              <a:t>18.11.2022 г.</a:t>
+              <a:t>20.11.2022 г.</a:t>
             </a:fld>
             <a:endParaRPr lang="bg-BG"/>
           </a:p>
@@ -3391,7 +3396,7 @@
           <a:p>
             <a:fld id="{0BD89023-946D-4914-A444-F66256F52110}" type="datetimeFigureOut">
               <a:rPr lang="bg-BG" smtClean="0"/>
-              <a:t>18.11.2022 г.</a:t>
+              <a:t>20.11.2022 г.</a:t>
             </a:fld>
             <a:endParaRPr lang="bg-BG"/>
           </a:p>
@@ -3648,7 +3653,7 @@
           <a:p>
             <a:fld id="{0BD89023-946D-4914-A444-F66256F52110}" type="datetimeFigureOut">
               <a:rPr lang="bg-BG" smtClean="0"/>
-              <a:t>18.11.2022 г.</a:t>
+              <a:t>20.11.2022 г.</a:t>
             </a:fld>
             <a:endParaRPr lang="bg-BG"/>
           </a:p>
@@ -3880,7 +3885,7 @@
           <a:p>
             <a:fld id="{0BD89023-946D-4914-A444-F66256F52110}" type="datetimeFigureOut">
               <a:rPr lang="bg-BG" smtClean="0"/>
-              <a:t>18.11.2022 г.</a:t>
+              <a:t>20.11.2022 г.</a:t>
             </a:fld>
             <a:endParaRPr lang="bg-BG"/>
           </a:p>
@@ -4273,7 +4278,7 @@
           <a:p>
             <a:fld id="{0BD89023-946D-4914-A444-F66256F52110}" type="datetimeFigureOut">
               <a:rPr lang="bg-BG" smtClean="0"/>
-              <a:t>18.11.2022 г.</a:t>
+              <a:t>20.11.2022 г.</a:t>
             </a:fld>
             <a:endParaRPr lang="bg-BG"/>
           </a:p>
@@ -4391,7 +4396,7 @@
           <a:p>
             <a:fld id="{0BD89023-946D-4914-A444-F66256F52110}" type="datetimeFigureOut">
               <a:rPr lang="bg-BG" smtClean="0"/>
-              <a:t>18.11.2022 г.</a:t>
+              <a:t>20.11.2022 г.</a:t>
             </a:fld>
             <a:endParaRPr lang="bg-BG"/>
           </a:p>
@@ -4486,7 +4491,7 @@
           <a:p>
             <a:fld id="{0BD89023-946D-4914-A444-F66256F52110}" type="datetimeFigureOut">
               <a:rPr lang="bg-BG" smtClean="0"/>
-              <a:t>18.11.2022 г.</a:t>
+              <a:t>20.11.2022 г.</a:t>
             </a:fld>
             <a:endParaRPr lang="bg-BG"/>
           </a:p>
@@ -4759,7 +4764,7 @@
           <a:p>
             <a:fld id="{0BD89023-946D-4914-A444-F66256F52110}" type="datetimeFigureOut">
               <a:rPr lang="bg-BG" smtClean="0"/>
-              <a:t>18.11.2022 г.</a:t>
+              <a:t>20.11.2022 г.</a:t>
             </a:fld>
             <a:endParaRPr lang="bg-BG"/>
           </a:p>
@@ -5040,7 +5045,7 @@
           <a:p>
             <a:fld id="{0BD89023-946D-4914-A444-F66256F52110}" type="datetimeFigureOut">
               <a:rPr lang="bg-BG" smtClean="0"/>
-              <a:t>18.11.2022 г.</a:t>
+              <a:t>20.11.2022 г.</a:t>
             </a:fld>
             <a:endParaRPr lang="bg-BG"/>
           </a:p>
@@ -5280,7 +5285,7 @@
           <a:p>
             <a:fld id="{0BD89023-946D-4914-A444-F66256F52110}" type="datetimeFigureOut">
               <a:rPr lang="bg-BG" smtClean="0"/>
-              <a:t>18.11.2022 г.</a:t>
+              <a:t>20.11.2022 г.</a:t>
             </a:fld>
             <a:endParaRPr lang="bg-BG"/>
           </a:p>
@@ -14779,7 +14784,7 @@
                 </a:solidFill>
                 <a:latin typeface="Consolas" panose="020B0609020204030204" pitchFamily="49" charset="0"/>
               </a:rPr>
-              <a:t>Length</a:t>
+              <a:t>Count</a:t>
             </a:r>
             <a:r>
               <a:rPr lang="nn-NO" sz="2400" dirty="0">
@@ -15504,6 +15509,736 @@
 </p:sld>
 </file>
 
+<file path=ppt/slides/slide28.xml><?xml version="1.0" encoding="utf-8"?>
+<p:sld xmlns:a="http://schemas.openxmlformats.org/drawingml/2006/main" xmlns:r="http://schemas.openxmlformats.org/officeDocument/2006/relationships" xmlns:p="http://schemas.openxmlformats.org/presentationml/2006/main">
+  <p:cSld>
+    <p:spTree>
+      <p:nvGrpSpPr>
+        <p:cNvPr id="1" name=""/>
+        <p:cNvGrpSpPr/>
+        <p:nvPr/>
+      </p:nvGrpSpPr>
+      <p:grpSpPr>
+        <a:xfrm>
+          <a:off x="0" y="0"/>
+          <a:ext cx="0" cy="0"/>
+          <a:chOff x="0" y="0"/>
+          <a:chExt cx="0" cy="0"/>
+        </a:xfrm>
+      </p:grpSpPr>
+      <p:sp>
+        <p:nvSpPr>
+          <p:cNvPr id="2" name="Заглавие 1">
+            <a:extLst>
+              <a:ext uri="{FF2B5EF4-FFF2-40B4-BE49-F238E27FC236}">
+                <a16:creationId xmlns:a16="http://schemas.microsoft.com/office/drawing/2014/main" id="{8E645656-4E70-DA58-4951-11721C7CCB2E}"/>
+              </a:ext>
+            </a:extLst>
+          </p:cNvPr>
+          <p:cNvSpPr>
+            <a:spLocks noGrp="1"/>
+          </p:cNvSpPr>
+          <p:nvPr>
+            <p:ph type="title"/>
+          </p:nvPr>
+        </p:nvSpPr>
+        <p:spPr/>
+        <p:txBody>
+          <a:bodyPr/>
+          <a:lstStyle/>
+          <a:p>
+            <a:pPr algn="ctr"/>
+            <a:r>
+              <a:rPr lang="bg-BG" dirty="0">
+                <a:latin typeface="Arial" panose="020B0604020202020204" pitchFamily="34" charset="0"/>
+                <a:cs typeface="Arial" panose="020B0604020202020204" pitchFamily="34" charset="0"/>
+              </a:rPr>
+              <a:t>Асоциативни масиви</a:t>
+            </a:r>
+            <a:endParaRPr lang="en-US" dirty="0">
+              <a:latin typeface="Arial" panose="020B0604020202020204" pitchFamily="34" charset="0"/>
+              <a:cs typeface="Arial" panose="020B0604020202020204" pitchFamily="34" charset="0"/>
+            </a:endParaRPr>
+          </a:p>
+        </p:txBody>
+      </p:sp>
+      <p:sp>
+        <p:nvSpPr>
+          <p:cNvPr id="3" name="Контейнер за съдържание 2">
+            <a:extLst>
+              <a:ext uri="{FF2B5EF4-FFF2-40B4-BE49-F238E27FC236}">
+                <a16:creationId xmlns:a16="http://schemas.microsoft.com/office/drawing/2014/main" id="{E7CFF71B-023A-7919-55E9-A174BCA0ADBD}"/>
+              </a:ext>
+            </a:extLst>
+          </p:cNvPr>
+          <p:cNvSpPr>
+            <a:spLocks noGrp="1"/>
+          </p:cNvSpPr>
+          <p:nvPr>
+            <p:ph idx="1"/>
+          </p:nvPr>
+        </p:nvSpPr>
+        <p:spPr/>
+        <p:txBody>
+          <a:bodyPr/>
+          <a:lstStyle/>
+          <a:p>
+            <a:r>
+              <a:rPr lang="bg-BG" dirty="0"/>
+              <a:t>Това са масиви, които са индексирани чрез </a:t>
+            </a:r>
+            <a:r>
+              <a:rPr lang="bg-BG" dirty="0">
+                <a:solidFill>
+                  <a:srgbClr val="FFFF00"/>
+                </a:solidFill>
+              </a:rPr>
+              <a:t>ключове</a:t>
+            </a:r>
+            <a:r>
+              <a:rPr lang="bg-BG" dirty="0"/>
+              <a:t>, не чрез индекси като обикновените масиви.</a:t>
+            </a:r>
+          </a:p>
+          <a:p>
+            <a:endParaRPr lang="bg-BG" dirty="0"/>
+          </a:p>
+          <a:p>
+            <a:r>
+              <a:rPr lang="bg-BG" dirty="0"/>
+              <a:t>Съдържат двойки  </a:t>
+            </a:r>
+            <a:r>
+              <a:rPr lang="en-US" dirty="0"/>
+              <a:t>{</a:t>
+            </a:r>
+            <a:r>
+              <a:rPr lang="bg-BG" dirty="0">
+                <a:solidFill>
+                  <a:srgbClr val="FFFF00"/>
+                </a:solidFill>
+              </a:rPr>
+              <a:t>ключ</a:t>
+            </a:r>
+            <a:r>
+              <a:rPr lang="bg-BG" dirty="0"/>
+              <a:t> -&gt; </a:t>
+            </a:r>
+            <a:r>
+              <a:rPr lang="bg-BG" dirty="0">
+                <a:solidFill>
+                  <a:srgbClr val="FFFF00"/>
+                </a:solidFill>
+              </a:rPr>
+              <a:t>стойност</a:t>
+            </a:r>
+            <a:r>
+              <a:rPr lang="en-US" dirty="0"/>
+              <a:t>}</a:t>
+            </a:r>
+            <a:endParaRPr lang="bg-BG" dirty="0"/>
+          </a:p>
+          <a:p>
+            <a:pPr marL="0" indent="0">
+              <a:buNone/>
+            </a:pPr>
+            <a:r>
+              <a:rPr lang="bg-BG" dirty="0"/>
+              <a:t>   Пример:</a:t>
+            </a:r>
+          </a:p>
+          <a:p>
+            <a:pPr lvl="1"/>
+            <a:endParaRPr lang="en-US" dirty="0"/>
+          </a:p>
+        </p:txBody>
+      </p:sp>
+      <p:pic>
+        <p:nvPicPr>
+          <p:cNvPr id="6" name="Картина 5">
+            <a:extLst>
+              <a:ext uri="{FF2B5EF4-FFF2-40B4-BE49-F238E27FC236}">
+                <a16:creationId xmlns:a16="http://schemas.microsoft.com/office/drawing/2014/main" id="{12F39240-2989-4B9D-9C77-C63B837A8BB4}"/>
+              </a:ext>
+            </a:extLst>
+          </p:cNvPr>
+          <p:cNvPicPr>
+            <a:picLocks noChangeAspect="1"/>
+          </p:cNvPicPr>
+          <p:nvPr/>
+        </p:nvPicPr>
+        <p:blipFill>
+          <a:blip r:embed="rId2">
+            <a:extLst>
+              <a:ext uri="{28A0092B-C50C-407E-A947-70E740481C1C}">
+                <a14:useLocalDpi xmlns:a14="http://schemas.microsoft.com/office/drawing/2010/main" val="0"/>
+              </a:ext>
+            </a:extLst>
+          </a:blip>
+          <a:stretch>
+            <a:fillRect/>
+          </a:stretch>
+        </p:blipFill>
+        <p:spPr>
+          <a:xfrm>
+            <a:off x="3118513" y="4105152"/>
+            <a:ext cx="3797192" cy="2295525"/>
+          </a:xfrm>
+          <a:prstGeom prst="rect">
+            <a:avLst/>
+          </a:prstGeom>
+        </p:spPr>
+      </p:pic>
+    </p:spTree>
+    <p:extLst>
+      <p:ext uri="{BB962C8B-B14F-4D97-AF65-F5344CB8AC3E}">
+        <p14:creationId xmlns:p14="http://schemas.microsoft.com/office/powerpoint/2010/main" val="707886262"/>
+      </p:ext>
+    </p:extLst>
+  </p:cSld>
+  <p:clrMapOvr>
+    <a:masterClrMapping/>
+  </p:clrMapOvr>
+</p:sld>
+</file>
+
+<file path=ppt/slides/slide29.xml><?xml version="1.0" encoding="utf-8"?>
+<p:sld xmlns:a="http://schemas.openxmlformats.org/drawingml/2006/main" xmlns:r="http://schemas.openxmlformats.org/officeDocument/2006/relationships" xmlns:p="http://schemas.openxmlformats.org/presentationml/2006/main">
+  <p:cSld>
+    <p:spTree>
+      <p:nvGrpSpPr>
+        <p:cNvPr id="1" name=""/>
+        <p:cNvGrpSpPr/>
+        <p:nvPr/>
+      </p:nvGrpSpPr>
+      <p:grpSpPr>
+        <a:xfrm>
+          <a:off x="0" y="0"/>
+          <a:ext cx="0" cy="0"/>
+          <a:chOff x="0" y="0"/>
+          <a:chExt cx="0" cy="0"/>
+        </a:xfrm>
+      </p:grpSpPr>
+      <p:sp>
+        <p:nvSpPr>
+          <p:cNvPr id="2" name="Заглавие 1">
+            <a:extLst>
+              <a:ext uri="{FF2B5EF4-FFF2-40B4-BE49-F238E27FC236}">
+                <a16:creationId xmlns:a16="http://schemas.microsoft.com/office/drawing/2014/main" id="{FF270663-2F49-5D52-1993-A4FD0B8A33B9}"/>
+              </a:ext>
+            </a:extLst>
+          </p:cNvPr>
+          <p:cNvSpPr>
+            <a:spLocks noGrp="1"/>
+          </p:cNvSpPr>
+          <p:nvPr>
+            <p:ph type="title"/>
+          </p:nvPr>
+        </p:nvSpPr>
+        <p:spPr/>
+        <p:txBody>
+          <a:bodyPr>
+            <a:normAutofit/>
+          </a:bodyPr>
+          <a:lstStyle/>
+          <a:p>
+            <a:pPr algn="ctr"/>
+            <a:r>
+              <a:rPr lang="en-US" dirty="0">
+                <a:latin typeface="Arial" panose="020B0604020202020204" pitchFamily="34" charset="0"/>
+                <a:cs typeface="Arial" panose="020B0604020202020204" pitchFamily="34" charset="0"/>
+              </a:rPr>
+              <a:t>Dictionary&lt;K,V&gt;</a:t>
+            </a:r>
+          </a:p>
+        </p:txBody>
+      </p:sp>
+      <p:sp>
+        <p:nvSpPr>
+          <p:cNvPr id="3" name="Контейнер за съдържание 2">
+            <a:extLst>
+              <a:ext uri="{FF2B5EF4-FFF2-40B4-BE49-F238E27FC236}">
+                <a16:creationId xmlns:a16="http://schemas.microsoft.com/office/drawing/2014/main" id="{767F330E-9853-16D6-6485-BBD1D70EA643}"/>
+              </a:ext>
+            </a:extLst>
+          </p:cNvPr>
+          <p:cNvSpPr>
+            <a:spLocks noGrp="1"/>
+          </p:cNvSpPr>
+          <p:nvPr>
+            <p:ph idx="1"/>
+          </p:nvPr>
+        </p:nvSpPr>
+        <p:spPr/>
+        <p:txBody>
+          <a:bodyPr/>
+          <a:lstStyle/>
+          <a:p>
+            <a:r>
+              <a:rPr lang="en-US" dirty="0">
+                <a:solidFill>
+                  <a:srgbClr val="92D050"/>
+                </a:solidFill>
+                <a:latin typeface="Arial" panose="020B0604020202020204" pitchFamily="34" charset="0"/>
+                <a:cs typeface="Arial" panose="020B0604020202020204" pitchFamily="34" charset="0"/>
+              </a:rPr>
+              <a:t>Dictionary&lt;K,V&gt;</a:t>
+            </a:r>
+            <a:r>
+              <a:rPr lang="en-US" dirty="0">
+                <a:latin typeface="Arial" panose="020B0604020202020204" pitchFamily="34" charset="0"/>
+                <a:cs typeface="Arial" panose="020B0604020202020204" pitchFamily="34" charset="0"/>
+              </a:rPr>
+              <a:t> </a:t>
+            </a:r>
+            <a:r>
+              <a:rPr lang="bg-BG" dirty="0">
+                <a:latin typeface="Arial" panose="020B0604020202020204" pitchFamily="34" charset="0"/>
+                <a:cs typeface="Arial" panose="020B0604020202020204" pitchFamily="34" charset="0"/>
+              </a:rPr>
+              <a:t>е колекция от двойки </a:t>
+            </a:r>
+            <a:r>
+              <a:rPr lang="en-US" dirty="0">
+                <a:latin typeface="Arial" panose="020B0604020202020204" pitchFamily="34" charset="0"/>
+                <a:cs typeface="Arial" panose="020B0604020202020204" pitchFamily="34" charset="0"/>
+              </a:rPr>
+              <a:t>{ </a:t>
+            </a:r>
+            <a:r>
+              <a:rPr lang="en-US" dirty="0">
+                <a:solidFill>
+                  <a:srgbClr val="92D050"/>
+                </a:solidFill>
+                <a:latin typeface="Arial" panose="020B0604020202020204" pitchFamily="34" charset="0"/>
+                <a:cs typeface="Arial" panose="020B0604020202020204" pitchFamily="34" charset="0"/>
+              </a:rPr>
+              <a:t>key</a:t>
+            </a:r>
+            <a:r>
+              <a:rPr lang="en-US" dirty="0">
+                <a:latin typeface="Arial" panose="020B0604020202020204" pitchFamily="34" charset="0"/>
+                <a:cs typeface="Arial" panose="020B0604020202020204" pitchFamily="34" charset="0"/>
+              </a:rPr>
+              <a:t> -&gt; </a:t>
+            </a:r>
+            <a:r>
+              <a:rPr lang="en-US" dirty="0">
+                <a:solidFill>
+                  <a:srgbClr val="92D050"/>
+                </a:solidFill>
+                <a:latin typeface="Arial" panose="020B0604020202020204" pitchFamily="34" charset="0"/>
+                <a:cs typeface="Arial" panose="020B0604020202020204" pitchFamily="34" charset="0"/>
+              </a:rPr>
+              <a:t>value</a:t>
+            </a:r>
+            <a:r>
+              <a:rPr lang="en-US" dirty="0">
+                <a:latin typeface="Arial" panose="020B0604020202020204" pitchFamily="34" charset="0"/>
+                <a:cs typeface="Arial" panose="020B0604020202020204" pitchFamily="34" charset="0"/>
+              </a:rPr>
+              <a:t>}</a:t>
+            </a:r>
+          </a:p>
+          <a:p>
+            <a:r>
+              <a:rPr lang="bg-BG" dirty="0">
+                <a:latin typeface="Arial" panose="020B0604020202020204" pitchFamily="34" charset="0"/>
+                <a:cs typeface="Arial" panose="020B0604020202020204" pitchFamily="34" charset="0"/>
+              </a:rPr>
+              <a:t>Ключовете са </a:t>
+            </a:r>
+            <a:r>
+              <a:rPr lang="bg-BG" dirty="0">
+                <a:solidFill>
+                  <a:srgbClr val="FFFF00"/>
+                </a:solidFill>
+                <a:latin typeface="Arial" panose="020B0604020202020204" pitchFamily="34" charset="0"/>
+                <a:cs typeface="Arial" panose="020B0604020202020204" pitchFamily="34" charset="0"/>
+              </a:rPr>
+              <a:t>уникални</a:t>
+            </a:r>
+            <a:r>
+              <a:rPr lang="bg-BG" dirty="0">
+                <a:latin typeface="Arial" panose="020B0604020202020204" pitchFamily="34" charset="0"/>
+                <a:cs typeface="Arial" panose="020B0604020202020204" pitchFamily="34" charset="0"/>
+              </a:rPr>
+              <a:t> (не могат да се повтарят)</a:t>
+            </a:r>
+          </a:p>
+          <a:p>
+            <a:r>
+              <a:rPr lang="bg-BG" dirty="0">
+                <a:latin typeface="Arial" panose="020B0604020202020204" pitchFamily="34" charset="0"/>
+                <a:cs typeface="Arial" panose="020B0604020202020204" pitchFamily="34" charset="0"/>
+              </a:rPr>
+              <a:t>Запазва ключовете в реда на тяхното добавяне </a:t>
+            </a:r>
+          </a:p>
+          <a:p>
+            <a:endParaRPr lang="bg-BG" dirty="0">
+              <a:latin typeface="Arial" panose="020B0604020202020204" pitchFamily="34" charset="0"/>
+              <a:cs typeface="Arial" panose="020B0604020202020204" pitchFamily="34" charset="0"/>
+            </a:endParaRPr>
+          </a:p>
+          <a:p>
+            <a:pPr marL="0" indent="0">
+              <a:buNone/>
+            </a:pPr>
+            <a:r>
+              <a:rPr lang="en-US" dirty="0">
+                <a:latin typeface="Arial" panose="020B0604020202020204" pitchFamily="34" charset="0"/>
+                <a:cs typeface="Arial" panose="020B0604020202020204" pitchFamily="34" charset="0"/>
+              </a:rPr>
+              <a:t>  </a:t>
+            </a:r>
+            <a:r>
+              <a:rPr lang="en-US" dirty="0">
+                <a:solidFill>
+                  <a:srgbClr val="0070C0"/>
+                </a:solidFill>
+                <a:latin typeface="Arial" panose="020B0604020202020204" pitchFamily="34" charset="0"/>
+                <a:cs typeface="Arial" panose="020B0604020202020204" pitchFamily="34" charset="0"/>
+              </a:rPr>
+              <a:t>var</a:t>
+            </a:r>
+            <a:r>
+              <a:rPr lang="en-US" dirty="0">
+                <a:latin typeface="Arial" panose="020B0604020202020204" pitchFamily="34" charset="0"/>
+                <a:cs typeface="Arial" panose="020B0604020202020204" pitchFamily="34" charset="0"/>
+              </a:rPr>
+              <a:t> </a:t>
+            </a:r>
+            <a:r>
+              <a:rPr lang="en-US" dirty="0">
+                <a:solidFill>
+                  <a:srgbClr val="92D050"/>
+                </a:solidFill>
+                <a:latin typeface="Arial" panose="020B0604020202020204" pitchFamily="34" charset="0"/>
+                <a:cs typeface="Arial" panose="020B0604020202020204" pitchFamily="34" charset="0"/>
+              </a:rPr>
+              <a:t>sales</a:t>
+            </a:r>
+            <a:r>
+              <a:rPr lang="en-US" dirty="0">
+                <a:latin typeface="Arial" panose="020B0604020202020204" pitchFamily="34" charset="0"/>
+                <a:cs typeface="Arial" panose="020B0604020202020204" pitchFamily="34" charset="0"/>
+              </a:rPr>
+              <a:t> = new </a:t>
+            </a:r>
+            <a:r>
+              <a:rPr lang="en-US" dirty="0">
+                <a:solidFill>
+                  <a:schemeClr val="accent2">
+                    <a:lumMod val="75000"/>
+                  </a:schemeClr>
+                </a:solidFill>
+                <a:latin typeface="Arial" panose="020B0604020202020204" pitchFamily="34" charset="0"/>
+                <a:cs typeface="Arial" panose="020B0604020202020204" pitchFamily="34" charset="0"/>
+              </a:rPr>
+              <a:t>Dictionary</a:t>
+            </a:r>
+            <a:r>
+              <a:rPr lang="en-US" dirty="0">
+                <a:solidFill>
+                  <a:schemeClr val="tx1"/>
+                </a:solidFill>
+                <a:latin typeface="Arial" panose="020B0604020202020204" pitchFamily="34" charset="0"/>
+                <a:cs typeface="Arial" panose="020B0604020202020204" pitchFamily="34" charset="0"/>
+              </a:rPr>
+              <a:t>&lt;</a:t>
+            </a:r>
+            <a:r>
+              <a:rPr lang="en-US" dirty="0">
+                <a:solidFill>
+                  <a:schemeClr val="tx2">
+                    <a:lumMod val="60000"/>
+                    <a:lumOff val="40000"/>
+                  </a:schemeClr>
+                </a:solidFill>
+                <a:latin typeface="Arial" panose="020B0604020202020204" pitchFamily="34" charset="0"/>
+                <a:cs typeface="Arial" panose="020B0604020202020204" pitchFamily="34" charset="0"/>
+              </a:rPr>
+              <a:t>string</a:t>
+            </a:r>
+            <a:r>
+              <a:rPr lang="en-US" dirty="0">
+                <a:solidFill>
+                  <a:srgbClr val="92D050"/>
+                </a:solidFill>
+                <a:latin typeface="Arial" panose="020B0604020202020204" pitchFamily="34" charset="0"/>
+                <a:cs typeface="Arial" panose="020B0604020202020204" pitchFamily="34" charset="0"/>
+              </a:rPr>
+              <a:t>, </a:t>
+            </a:r>
+            <a:r>
+              <a:rPr lang="en-US" dirty="0">
+                <a:solidFill>
+                  <a:schemeClr val="tx2">
+                    <a:lumMod val="60000"/>
+                    <a:lumOff val="40000"/>
+                  </a:schemeClr>
+                </a:solidFill>
+                <a:latin typeface="Arial" panose="020B0604020202020204" pitchFamily="34" charset="0"/>
+                <a:cs typeface="Arial" panose="020B0604020202020204" pitchFamily="34" charset="0"/>
+              </a:rPr>
+              <a:t>int</a:t>
+            </a:r>
+            <a:r>
+              <a:rPr lang="en-US" dirty="0">
+                <a:solidFill>
+                  <a:schemeClr val="tx1"/>
+                </a:solidFill>
+                <a:latin typeface="Arial" panose="020B0604020202020204" pitchFamily="34" charset="0"/>
+                <a:cs typeface="Arial" panose="020B0604020202020204" pitchFamily="34" charset="0"/>
+              </a:rPr>
+              <a:t>&gt;()</a:t>
+            </a:r>
+            <a:r>
+              <a:rPr lang="en-US" dirty="0">
+                <a:solidFill>
+                  <a:srgbClr val="92D050"/>
+                </a:solidFill>
+                <a:latin typeface="Arial" panose="020B0604020202020204" pitchFamily="34" charset="0"/>
+                <a:cs typeface="Arial" panose="020B0604020202020204" pitchFamily="34" charset="0"/>
+              </a:rPr>
+              <a:t>;</a:t>
+            </a:r>
+          </a:p>
+          <a:p>
+            <a:pPr marL="0" indent="0">
+              <a:buNone/>
+            </a:pPr>
+            <a:r>
+              <a:rPr lang="en-US" dirty="0">
+                <a:latin typeface="Arial" panose="020B0604020202020204" pitchFamily="34" charset="0"/>
+                <a:cs typeface="Arial" panose="020B0604020202020204" pitchFamily="34" charset="0"/>
+              </a:rPr>
+              <a:t>  </a:t>
+            </a:r>
+            <a:r>
+              <a:rPr lang="en-US" dirty="0">
+                <a:solidFill>
+                  <a:srgbClr val="92D050"/>
+                </a:solidFill>
+                <a:latin typeface="Arial" panose="020B0604020202020204" pitchFamily="34" charset="0"/>
+                <a:cs typeface="Arial" panose="020B0604020202020204" pitchFamily="34" charset="0"/>
+              </a:rPr>
+              <a:t>sales</a:t>
+            </a:r>
+            <a:r>
+              <a:rPr lang="en-US" dirty="0">
+                <a:latin typeface="Arial" panose="020B0604020202020204" pitchFamily="34" charset="0"/>
+                <a:cs typeface="Arial" panose="020B0604020202020204" pitchFamily="34" charset="0"/>
+              </a:rPr>
+              <a:t>[“</a:t>
+            </a:r>
+            <a:r>
+              <a:rPr lang="en-US" dirty="0">
+                <a:solidFill>
+                  <a:srgbClr val="FFC000"/>
+                </a:solidFill>
+                <a:latin typeface="Arial" panose="020B0604020202020204" pitchFamily="34" charset="0"/>
+                <a:cs typeface="Arial" panose="020B0604020202020204" pitchFamily="34" charset="0"/>
+              </a:rPr>
+              <a:t>Ivan Ivanov</a:t>
+            </a:r>
+            <a:r>
+              <a:rPr lang="en-US" dirty="0">
+                <a:latin typeface="Arial" panose="020B0604020202020204" pitchFamily="34" charset="0"/>
+                <a:cs typeface="Arial" panose="020B0604020202020204" pitchFamily="34" charset="0"/>
+              </a:rPr>
+              <a:t>”] = </a:t>
+            </a:r>
+            <a:r>
+              <a:rPr lang="en-US" dirty="0">
+                <a:solidFill>
+                  <a:srgbClr val="FFC000"/>
+                </a:solidFill>
+                <a:latin typeface="Arial" panose="020B0604020202020204" pitchFamily="34" charset="0"/>
+                <a:cs typeface="Arial" panose="020B0604020202020204" pitchFamily="34" charset="0"/>
+              </a:rPr>
+              <a:t>1</a:t>
+            </a:r>
+            <a:r>
+              <a:rPr lang="en-US" dirty="0">
+                <a:latin typeface="Arial" panose="020B0604020202020204" pitchFamily="34" charset="0"/>
+                <a:cs typeface="Arial" panose="020B0604020202020204" pitchFamily="34" charset="0"/>
+              </a:rPr>
+              <a:t>;</a:t>
+            </a:r>
+          </a:p>
+          <a:p>
+            <a:pPr marL="0" indent="0">
+              <a:buNone/>
+            </a:pPr>
+            <a:r>
+              <a:rPr lang="en-US" dirty="0">
+                <a:latin typeface="Arial" panose="020B0604020202020204" pitchFamily="34" charset="0"/>
+                <a:cs typeface="Arial" panose="020B0604020202020204" pitchFamily="34" charset="0"/>
+              </a:rPr>
+              <a:t>  </a:t>
+            </a:r>
+            <a:r>
+              <a:rPr lang="en-US" dirty="0">
+                <a:solidFill>
+                  <a:srgbClr val="92D050"/>
+                </a:solidFill>
+                <a:latin typeface="Arial" panose="020B0604020202020204" pitchFamily="34" charset="0"/>
+                <a:cs typeface="Arial" panose="020B0604020202020204" pitchFamily="34" charset="0"/>
+              </a:rPr>
+              <a:t>sales</a:t>
+            </a:r>
+            <a:r>
+              <a:rPr lang="en-US" dirty="0">
+                <a:latin typeface="Arial" panose="020B0604020202020204" pitchFamily="34" charset="0"/>
+                <a:cs typeface="Arial" panose="020B0604020202020204" pitchFamily="34" charset="0"/>
+              </a:rPr>
+              <a:t>[“</a:t>
+            </a:r>
+            <a:r>
+              <a:rPr lang="en-US" dirty="0">
+                <a:solidFill>
+                  <a:srgbClr val="FFC000"/>
+                </a:solidFill>
+                <a:latin typeface="Arial" panose="020B0604020202020204" pitchFamily="34" charset="0"/>
+                <a:cs typeface="Arial" panose="020B0604020202020204" pitchFamily="34" charset="0"/>
+              </a:rPr>
+              <a:t>Milko </a:t>
+            </a:r>
+            <a:r>
+              <a:rPr lang="en-US" dirty="0" err="1">
+                <a:solidFill>
+                  <a:srgbClr val="FFC000"/>
+                </a:solidFill>
+                <a:latin typeface="Arial" panose="020B0604020202020204" pitchFamily="34" charset="0"/>
+                <a:cs typeface="Arial" panose="020B0604020202020204" pitchFamily="34" charset="0"/>
+              </a:rPr>
+              <a:t>Cvetanov</a:t>
+            </a:r>
+            <a:r>
+              <a:rPr lang="en-US" dirty="0">
+                <a:latin typeface="Arial" panose="020B0604020202020204" pitchFamily="34" charset="0"/>
+                <a:cs typeface="Arial" panose="020B0604020202020204" pitchFamily="34" charset="0"/>
+              </a:rPr>
+              <a:t>”] = </a:t>
+            </a:r>
+            <a:r>
+              <a:rPr lang="en-US" dirty="0">
+                <a:solidFill>
+                  <a:srgbClr val="FFC000"/>
+                </a:solidFill>
+                <a:latin typeface="Arial" panose="020B0604020202020204" pitchFamily="34" charset="0"/>
+                <a:cs typeface="Arial" panose="020B0604020202020204" pitchFamily="34" charset="0"/>
+              </a:rPr>
+              <a:t>5</a:t>
+            </a:r>
+            <a:r>
+              <a:rPr lang="en-US" dirty="0">
+                <a:latin typeface="Arial" panose="020B0604020202020204" pitchFamily="34" charset="0"/>
+                <a:cs typeface="Arial" panose="020B0604020202020204" pitchFamily="34" charset="0"/>
+              </a:rPr>
+              <a:t>;</a:t>
+            </a:r>
+          </a:p>
+          <a:p>
+            <a:pPr marL="0" indent="0">
+              <a:buNone/>
+            </a:pPr>
+            <a:r>
+              <a:rPr lang="en-US" dirty="0">
+                <a:latin typeface="Arial" panose="020B0604020202020204" pitchFamily="34" charset="0"/>
+                <a:cs typeface="Arial" panose="020B0604020202020204" pitchFamily="34" charset="0"/>
+              </a:rPr>
+              <a:t>  </a:t>
+            </a:r>
+            <a:r>
+              <a:rPr lang="en-US" dirty="0">
+                <a:solidFill>
+                  <a:srgbClr val="92D050"/>
+                </a:solidFill>
+                <a:latin typeface="Arial" panose="020B0604020202020204" pitchFamily="34" charset="0"/>
+                <a:cs typeface="Arial" panose="020B0604020202020204" pitchFamily="34" charset="0"/>
+              </a:rPr>
+              <a:t>sales</a:t>
+            </a:r>
+            <a:r>
+              <a:rPr lang="en-US" dirty="0">
+                <a:latin typeface="Arial" panose="020B0604020202020204" pitchFamily="34" charset="0"/>
+                <a:cs typeface="Arial" panose="020B0604020202020204" pitchFamily="34" charset="0"/>
+              </a:rPr>
+              <a:t>[“</a:t>
+            </a:r>
+            <a:r>
+              <a:rPr lang="en-US" dirty="0" err="1">
+                <a:solidFill>
+                  <a:srgbClr val="FFC000"/>
+                </a:solidFill>
+                <a:latin typeface="Arial" panose="020B0604020202020204" pitchFamily="34" charset="0"/>
+                <a:cs typeface="Arial" panose="020B0604020202020204" pitchFamily="34" charset="0"/>
+              </a:rPr>
+              <a:t>Dimitar</a:t>
+            </a:r>
+            <a:r>
+              <a:rPr lang="en-US" dirty="0">
+                <a:solidFill>
+                  <a:srgbClr val="FFC000"/>
+                </a:solidFill>
+                <a:latin typeface="Arial" panose="020B0604020202020204" pitchFamily="34" charset="0"/>
+                <a:cs typeface="Arial" panose="020B0604020202020204" pitchFamily="34" charset="0"/>
+              </a:rPr>
+              <a:t> </a:t>
+            </a:r>
+            <a:r>
+              <a:rPr lang="en-US" dirty="0" err="1">
+                <a:solidFill>
+                  <a:srgbClr val="FFC000"/>
+                </a:solidFill>
+                <a:latin typeface="Arial" panose="020B0604020202020204" pitchFamily="34" charset="0"/>
+                <a:cs typeface="Arial" panose="020B0604020202020204" pitchFamily="34" charset="0"/>
+              </a:rPr>
+              <a:t>Georgiev</a:t>
+            </a:r>
+            <a:r>
+              <a:rPr lang="en-US" dirty="0">
+                <a:latin typeface="Arial" panose="020B0604020202020204" pitchFamily="34" charset="0"/>
+                <a:cs typeface="Arial" panose="020B0604020202020204" pitchFamily="34" charset="0"/>
+              </a:rPr>
+              <a:t>”] = </a:t>
+            </a:r>
+            <a:r>
+              <a:rPr lang="en-US" dirty="0">
+                <a:solidFill>
+                  <a:srgbClr val="FFC000"/>
+                </a:solidFill>
+                <a:latin typeface="Arial" panose="020B0604020202020204" pitchFamily="34" charset="0"/>
+                <a:cs typeface="Arial" panose="020B0604020202020204" pitchFamily="34" charset="0"/>
+              </a:rPr>
+              <a:t>8</a:t>
+            </a:r>
+            <a:r>
+              <a:rPr lang="en-US" dirty="0">
+                <a:latin typeface="Arial" panose="020B0604020202020204" pitchFamily="34" charset="0"/>
+                <a:cs typeface="Arial" panose="020B0604020202020204" pitchFamily="34" charset="0"/>
+              </a:rPr>
+              <a:t>;</a:t>
+            </a:r>
+          </a:p>
+        </p:txBody>
+      </p:sp>
+    </p:spTree>
+    <p:extLst>
+      <p:ext uri="{BB962C8B-B14F-4D97-AF65-F5344CB8AC3E}">
+        <p14:creationId xmlns:p14="http://schemas.microsoft.com/office/powerpoint/2010/main" val="2118595685"/>
+      </p:ext>
+    </p:extLst>
+  </p:cSld>
+  <p:clrMapOvr>
+    <a:masterClrMapping/>
+  </p:clrMapOvr>
+</p:sld>
+</file>
+
 <file path=ppt/slides/slide3.xml><?xml version="1.0" encoding="utf-8"?>
 <p:sld xmlns:a="http://schemas.openxmlformats.org/drawingml/2006/main" xmlns:r="http://schemas.openxmlformats.org/officeDocument/2006/relationships" xmlns:p="http://schemas.openxmlformats.org/presentationml/2006/main">
   <p:cSld>
@@ -15922,6 +16657,2050 @@
     <p:extLst>
       <p:ext uri="{BB962C8B-B14F-4D97-AF65-F5344CB8AC3E}">
         <p14:creationId xmlns:p14="http://schemas.microsoft.com/office/powerpoint/2010/main" val="1503502359"/>
+      </p:ext>
+    </p:extLst>
+  </p:cSld>
+  <p:clrMapOvr>
+    <a:masterClrMapping/>
+  </p:clrMapOvr>
+</p:sld>
+</file>
+
+<file path=ppt/slides/slide30.xml><?xml version="1.0" encoding="utf-8"?>
+<p:sld xmlns:a="http://schemas.openxmlformats.org/drawingml/2006/main" xmlns:r="http://schemas.openxmlformats.org/officeDocument/2006/relationships" xmlns:p="http://schemas.openxmlformats.org/presentationml/2006/main">
+  <p:cSld>
+    <p:spTree>
+      <p:nvGrpSpPr>
+        <p:cNvPr id="1" name=""/>
+        <p:cNvGrpSpPr/>
+        <p:nvPr/>
+      </p:nvGrpSpPr>
+      <p:grpSpPr>
+        <a:xfrm>
+          <a:off x="0" y="0"/>
+          <a:ext cx="0" cy="0"/>
+          <a:chOff x="0" y="0"/>
+          <a:chExt cx="0" cy="0"/>
+        </a:xfrm>
+      </p:grpSpPr>
+      <p:sp>
+        <p:nvSpPr>
+          <p:cNvPr id="2" name="Заглавие 1">
+            <a:extLst>
+              <a:ext uri="{FF2B5EF4-FFF2-40B4-BE49-F238E27FC236}">
+                <a16:creationId xmlns:a16="http://schemas.microsoft.com/office/drawing/2014/main" id="{FF270663-2F49-5D52-1993-A4FD0B8A33B9}"/>
+              </a:ext>
+            </a:extLst>
+          </p:cNvPr>
+          <p:cNvSpPr>
+            <a:spLocks noGrp="1"/>
+          </p:cNvSpPr>
+          <p:nvPr>
+            <p:ph type="title"/>
+          </p:nvPr>
+        </p:nvSpPr>
+        <p:spPr/>
+        <p:txBody>
+          <a:bodyPr>
+            <a:normAutofit/>
+          </a:bodyPr>
+          <a:lstStyle/>
+          <a:p>
+            <a:pPr algn="ctr"/>
+            <a:r>
+              <a:rPr lang="en-US" dirty="0" err="1">
+                <a:latin typeface="Arial" panose="020B0604020202020204" pitchFamily="34" charset="0"/>
+                <a:cs typeface="Arial" panose="020B0604020202020204" pitchFamily="34" charset="0"/>
+              </a:rPr>
+              <a:t>SortedDictionary</a:t>
+            </a:r>
+            <a:r>
+              <a:rPr lang="en-US" dirty="0">
+                <a:latin typeface="Arial" panose="020B0604020202020204" pitchFamily="34" charset="0"/>
+                <a:cs typeface="Arial" panose="020B0604020202020204" pitchFamily="34" charset="0"/>
+              </a:rPr>
+              <a:t>&lt;K,V&gt;</a:t>
+            </a:r>
+          </a:p>
+        </p:txBody>
+      </p:sp>
+      <p:sp>
+        <p:nvSpPr>
+          <p:cNvPr id="3" name="Контейнер за съдържание 2">
+            <a:extLst>
+              <a:ext uri="{FF2B5EF4-FFF2-40B4-BE49-F238E27FC236}">
+                <a16:creationId xmlns:a16="http://schemas.microsoft.com/office/drawing/2014/main" id="{767F330E-9853-16D6-6485-BBD1D70EA643}"/>
+              </a:ext>
+            </a:extLst>
+          </p:cNvPr>
+          <p:cNvSpPr>
+            <a:spLocks noGrp="1"/>
+          </p:cNvSpPr>
+          <p:nvPr>
+            <p:ph idx="1"/>
+          </p:nvPr>
+        </p:nvSpPr>
+        <p:spPr/>
+        <p:txBody>
+          <a:bodyPr>
+            <a:normAutofit/>
+          </a:bodyPr>
+          <a:lstStyle/>
+          <a:p>
+            <a:r>
+              <a:rPr lang="bg-BG" dirty="0">
+                <a:latin typeface="Arial" panose="020B0604020202020204" pitchFamily="34" charset="0"/>
+                <a:cs typeface="Arial" panose="020B0604020202020204" pitchFamily="34" charset="0"/>
+              </a:rPr>
+              <a:t>Винаги пази ключовете сортирани</a:t>
+            </a:r>
+          </a:p>
+          <a:p>
+            <a:endParaRPr lang="bg-BG" dirty="0">
+              <a:latin typeface="Arial" panose="020B0604020202020204" pitchFamily="34" charset="0"/>
+              <a:cs typeface="Arial" panose="020B0604020202020204" pitchFamily="34" charset="0"/>
+            </a:endParaRPr>
+          </a:p>
+          <a:p>
+            <a:pPr marL="0" indent="0">
+              <a:buNone/>
+            </a:pPr>
+            <a:r>
+              <a:rPr lang="en-US" dirty="0">
+                <a:latin typeface="Arial" panose="020B0604020202020204" pitchFamily="34" charset="0"/>
+                <a:cs typeface="Arial" panose="020B0604020202020204" pitchFamily="34" charset="0"/>
+              </a:rPr>
+              <a:t> </a:t>
+            </a:r>
+            <a:r>
+              <a:rPr lang="en-US" dirty="0">
+                <a:solidFill>
+                  <a:srgbClr val="0070C0"/>
+                </a:solidFill>
+                <a:latin typeface="Arial" panose="020B0604020202020204" pitchFamily="34" charset="0"/>
+                <a:cs typeface="Arial" panose="020B0604020202020204" pitchFamily="34" charset="0"/>
+              </a:rPr>
+              <a:t>var</a:t>
+            </a:r>
+            <a:r>
+              <a:rPr lang="en-US" dirty="0">
+                <a:latin typeface="Arial" panose="020B0604020202020204" pitchFamily="34" charset="0"/>
+                <a:cs typeface="Arial" panose="020B0604020202020204" pitchFamily="34" charset="0"/>
+              </a:rPr>
+              <a:t> </a:t>
+            </a:r>
+            <a:r>
+              <a:rPr lang="en-US" dirty="0">
+                <a:solidFill>
+                  <a:srgbClr val="92D050"/>
+                </a:solidFill>
+                <a:latin typeface="Arial" panose="020B0604020202020204" pitchFamily="34" charset="0"/>
+                <a:cs typeface="Arial" panose="020B0604020202020204" pitchFamily="34" charset="0"/>
+              </a:rPr>
+              <a:t>motorcycles</a:t>
+            </a:r>
+            <a:r>
+              <a:rPr lang="en-US" dirty="0">
+                <a:latin typeface="Arial" panose="020B0604020202020204" pitchFamily="34" charset="0"/>
+                <a:cs typeface="Arial" panose="020B0604020202020204" pitchFamily="34" charset="0"/>
+              </a:rPr>
+              <a:t> = new </a:t>
+            </a:r>
+            <a:r>
+              <a:rPr lang="en-US" dirty="0" err="1">
+                <a:solidFill>
+                  <a:schemeClr val="accent2">
+                    <a:lumMod val="75000"/>
+                  </a:schemeClr>
+                </a:solidFill>
+                <a:latin typeface="Arial" panose="020B0604020202020204" pitchFamily="34" charset="0"/>
+                <a:cs typeface="Arial" panose="020B0604020202020204" pitchFamily="34" charset="0"/>
+              </a:rPr>
+              <a:t>SortedDictionary</a:t>
+            </a:r>
+            <a:r>
+              <a:rPr lang="en-US" dirty="0">
+                <a:solidFill>
+                  <a:schemeClr val="tx1"/>
+                </a:solidFill>
+                <a:latin typeface="Arial" panose="020B0604020202020204" pitchFamily="34" charset="0"/>
+                <a:cs typeface="Arial" panose="020B0604020202020204" pitchFamily="34" charset="0"/>
+              </a:rPr>
+              <a:t>&lt;</a:t>
+            </a:r>
+            <a:r>
+              <a:rPr lang="en-US" dirty="0">
+                <a:solidFill>
+                  <a:schemeClr val="tx2">
+                    <a:lumMod val="60000"/>
+                    <a:lumOff val="40000"/>
+                  </a:schemeClr>
+                </a:solidFill>
+                <a:latin typeface="Arial" panose="020B0604020202020204" pitchFamily="34" charset="0"/>
+                <a:cs typeface="Arial" panose="020B0604020202020204" pitchFamily="34" charset="0"/>
+              </a:rPr>
+              <a:t>string</a:t>
+            </a:r>
+            <a:r>
+              <a:rPr lang="en-US" dirty="0">
+                <a:solidFill>
+                  <a:srgbClr val="92D050"/>
+                </a:solidFill>
+                <a:latin typeface="Arial" panose="020B0604020202020204" pitchFamily="34" charset="0"/>
+                <a:cs typeface="Arial" panose="020B0604020202020204" pitchFamily="34" charset="0"/>
+              </a:rPr>
+              <a:t>, </a:t>
+            </a:r>
+            <a:r>
+              <a:rPr lang="en-US" dirty="0">
+                <a:solidFill>
+                  <a:schemeClr val="tx2">
+                    <a:lumMod val="60000"/>
+                    <a:lumOff val="40000"/>
+                  </a:schemeClr>
+                </a:solidFill>
+                <a:latin typeface="Arial" panose="020B0604020202020204" pitchFamily="34" charset="0"/>
+                <a:cs typeface="Arial" panose="020B0604020202020204" pitchFamily="34" charset="0"/>
+              </a:rPr>
+              <a:t>int</a:t>
+            </a:r>
+            <a:r>
+              <a:rPr lang="en-US" dirty="0">
+                <a:solidFill>
+                  <a:schemeClr val="tx1"/>
+                </a:solidFill>
+                <a:latin typeface="Arial" panose="020B0604020202020204" pitchFamily="34" charset="0"/>
+                <a:cs typeface="Arial" panose="020B0604020202020204" pitchFamily="34" charset="0"/>
+              </a:rPr>
+              <a:t>&gt;()</a:t>
+            </a:r>
+            <a:r>
+              <a:rPr lang="en-US" dirty="0">
+                <a:solidFill>
+                  <a:srgbClr val="92D050"/>
+                </a:solidFill>
+                <a:latin typeface="Arial" panose="020B0604020202020204" pitchFamily="34" charset="0"/>
+                <a:cs typeface="Arial" panose="020B0604020202020204" pitchFamily="34" charset="0"/>
+              </a:rPr>
+              <a:t>;</a:t>
+            </a:r>
+          </a:p>
+          <a:p>
+            <a:pPr marL="0" indent="0">
+              <a:buNone/>
+            </a:pPr>
+            <a:r>
+              <a:rPr lang="en-US" dirty="0">
+                <a:latin typeface="Arial" panose="020B0604020202020204" pitchFamily="34" charset="0"/>
+                <a:cs typeface="Arial" panose="020B0604020202020204" pitchFamily="34" charset="0"/>
+              </a:rPr>
+              <a:t> </a:t>
+            </a:r>
+            <a:r>
+              <a:rPr lang="en-US" dirty="0">
+                <a:solidFill>
+                  <a:srgbClr val="92D050"/>
+                </a:solidFill>
+                <a:latin typeface="Arial" panose="020B0604020202020204" pitchFamily="34" charset="0"/>
+                <a:cs typeface="Arial" panose="020B0604020202020204" pitchFamily="34" charset="0"/>
+              </a:rPr>
+              <a:t>motorcycles</a:t>
+            </a:r>
+            <a:r>
+              <a:rPr lang="en-US" dirty="0">
+                <a:latin typeface="Arial" panose="020B0604020202020204" pitchFamily="34" charset="0"/>
+                <a:cs typeface="Arial" panose="020B0604020202020204" pitchFamily="34" charset="0"/>
+              </a:rPr>
+              <a:t>[“</a:t>
+            </a:r>
+            <a:r>
+              <a:rPr lang="en-US" dirty="0" err="1">
+                <a:solidFill>
+                  <a:srgbClr val="FFC000"/>
+                </a:solidFill>
+                <a:latin typeface="Arial" panose="020B0604020202020204" pitchFamily="34" charset="0"/>
+                <a:cs typeface="Arial" panose="020B0604020202020204" pitchFamily="34" charset="0"/>
+              </a:rPr>
+              <a:t>Kawazaki</a:t>
+            </a:r>
+            <a:r>
+              <a:rPr lang="en-US" dirty="0">
+                <a:latin typeface="Arial" panose="020B0604020202020204" pitchFamily="34" charset="0"/>
+                <a:cs typeface="Arial" panose="020B0604020202020204" pitchFamily="34" charset="0"/>
+              </a:rPr>
+              <a:t>”] = </a:t>
+            </a:r>
+            <a:r>
+              <a:rPr lang="en-US" dirty="0">
+                <a:solidFill>
+                  <a:srgbClr val="FFC000"/>
+                </a:solidFill>
+                <a:latin typeface="Arial" panose="020B0604020202020204" pitchFamily="34" charset="0"/>
+                <a:cs typeface="Arial" panose="020B0604020202020204" pitchFamily="34" charset="0"/>
+              </a:rPr>
+              <a:t>1000</a:t>
+            </a:r>
+            <a:r>
+              <a:rPr lang="en-US" dirty="0">
+                <a:latin typeface="Arial" panose="020B0604020202020204" pitchFamily="34" charset="0"/>
+                <a:cs typeface="Arial" panose="020B0604020202020204" pitchFamily="34" charset="0"/>
+              </a:rPr>
+              <a:t>;</a:t>
+            </a:r>
+          </a:p>
+          <a:p>
+            <a:pPr marL="0" indent="0">
+              <a:buNone/>
+            </a:pPr>
+            <a:r>
+              <a:rPr lang="en-US" dirty="0">
+                <a:latin typeface="Arial" panose="020B0604020202020204" pitchFamily="34" charset="0"/>
+                <a:cs typeface="Arial" panose="020B0604020202020204" pitchFamily="34" charset="0"/>
+              </a:rPr>
+              <a:t> </a:t>
+            </a:r>
+            <a:r>
+              <a:rPr lang="en-US" dirty="0">
+                <a:solidFill>
+                  <a:srgbClr val="92D050"/>
+                </a:solidFill>
+                <a:latin typeface="Arial" panose="020B0604020202020204" pitchFamily="34" charset="0"/>
+                <a:cs typeface="Arial" panose="020B0604020202020204" pitchFamily="34" charset="0"/>
+              </a:rPr>
+              <a:t>motorcycles</a:t>
+            </a:r>
+            <a:r>
+              <a:rPr lang="en-US" dirty="0">
+                <a:latin typeface="Arial" panose="020B0604020202020204" pitchFamily="34" charset="0"/>
+                <a:cs typeface="Arial" panose="020B0604020202020204" pitchFamily="34" charset="0"/>
+              </a:rPr>
+              <a:t>[“</a:t>
+            </a:r>
+            <a:r>
+              <a:rPr lang="en-US" dirty="0">
+                <a:solidFill>
+                  <a:srgbClr val="FFC000"/>
+                </a:solidFill>
+                <a:latin typeface="Arial" panose="020B0604020202020204" pitchFamily="34" charset="0"/>
+                <a:cs typeface="Arial" panose="020B0604020202020204" pitchFamily="34" charset="0"/>
+              </a:rPr>
+              <a:t>Yamaha</a:t>
+            </a:r>
+            <a:r>
+              <a:rPr lang="en-US" dirty="0">
+                <a:latin typeface="Arial" panose="020B0604020202020204" pitchFamily="34" charset="0"/>
+                <a:cs typeface="Arial" panose="020B0604020202020204" pitchFamily="34" charset="0"/>
+              </a:rPr>
+              <a:t>”] = </a:t>
+            </a:r>
+            <a:r>
+              <a:rPr lang="en-US" dirty="0">
+                <a:solidFill>
+                  <a:srgbClr val="FFC000"/>
+                </a:solidFill>
+                <a:latin typeface="Arial" panose="020B0604020202020204" pitchFamily="34" charset="0"/>
+                <a:cs typeface="Arial" panose="020B0604020202020204" pitchFamily="34" charset="0"/>
+              </a:rPr>
+              <a:t>500</a:t>
+            </a:r>
+            <a:r>
+              <a:rPr lang="en-US" dirty="0">
+                <a:latin typeface="Arial" panose="020B0604020202020204" pitchFamily="34" charset="0"/>
+                <a:cs typeface="Arial" panose="020B0604020202020204" pitchFamily="34" charset="0"/>
+              </a:rPr>
+              <a:t>;</a:t>
+            </a:r>
+          </a:p>
+          <a:p>
+            <a:pPr marL="0" indent="0">
+              <a:buNone/>
+            </a:pPr>
+            <a:r>
+              <a:rPr lang="en-US" dirty="0">
+                <a:latin typeface="Arial" panose="020B0604020202020204" pitchFamily="34" charset="0"/>
+                <a:cs typeface="Arial" panose="020B0604020202020204" pitchFamily="34" charset="0"/>
+              </a:rPr>
+              <a:t> </a:t>
+            </a:r>
+            <a:r>
+              <a:rPr lang="en-US" dirty="0">
+                <a:solidFill>
+                  <a:srgbClr val="92D050"/>
+                </a:solidFill>
+                <a:latin typeface="Arial" panose="020B0604020202020204" pitchFamily="34" charset="0"/>
+                <a:cs typeface="Arial" panose="020B0604020202020204" pitchFamily="34" charset="0"/>
+              </a:rPr>
+              <a:t>motorcycles</a:t>
+            </a:r>
+            <a:r>
+              <a:rPr lang="en-US" dirty="0">
+                <a:latin typeface="Arial" panose="020B0604020202020204" pitchFamily="34" charset="0"/>
+                <a:cs typeface="Arial" panose="020B0604020202020204" pitchFamily="34" charset="0"/>
+              </a:rPr>
+              <a:t>[“</a:t>
+            </a:r>
+            <a:r>
+              <a:rPr lang="en-US" dirty="0">
+                <a:solidFill>
+                  <a:srgbClr val="FFC000"/>
+                </a:solidFill>
+                <a:latin typeface="Arial" panose="020B0604020202020204" pitchFamily="34" charset="0"/>
+                <a:cs typeface="Arial" panose="020B0604020202020204" pitchFamily="34" charset="0"/>
+              </a:rPr>
+              <a:t>Honda</a:t>
+            </a:r>
+            <a:r>
+              <a:rPr lang="en-US" dirty="0">
+                <a:latin typeface="Arial" panose="020B0604020202020204" pitchFamily="34" charset="0"/>
+                <a:cs typeface="Arial" panose="020B0604020202020204" pitchFamily="34" charset="0"/>
+              </a:rPr>
+              <a:t>”] = </a:t>
+            </a:r>
+            <a:r>
+              <a:rPr lang="en-US" dirty="0">
+                <a:solidFill>
+                  <a:srgbClr val="FFC000"/>
+                </a:solidFill>
+                <a:latin typeface="Arial" panose="020B0604020202020204" pitchFamily="34" charset="0"/>
+                <a:cs typeface="Arial" panose="020B0604020202020204" pitchFamily="34" charset="0"/>
+              </a:rPr>
+              <a:t>850</a:t>
+            </a:r>
+            <a:r>
+              <a:rPr lang="en-US" dirty="0">
+                <a:latin typeface="Arial" panose="020B0604020202020204" pitchFamily="34" charset="0"/>
+                <a:cs typeface="Arial" panose="020B0604020202020204" pitchFamily="34" charset="0"/>
+              </a:rPr>
+              <a:t>;</a:t>
+            </a:r>
+          </a:p>
+          <a:p>
+            <a:pPr marL="0" indent="0">
+              <a:buNone/>
+            </a:pPr>
+            <a:r>
+              <a:rPr lang="en-US" dirty="0">
+                <a:solidFill>
+                  <a:schemeClr val="accent2">
+                    <a:lumMod val="75000"/>
+                  </a:schemeClr>
+                </a:solidFill>
+                <a:latin typeface="Arial" panose="020B0604020202020204" pitchFamily="34" charset="0"/>
+                <a:cs typeface="Arial" panose="020B0604020202020204" pitchFamily="34" charset="0"/>
+              </a:rPr>
+              <a:t> </a:t>
+            </a:r>
+            <a:r>
+              <a:rPr lang="en-US" dirty="0">
+                <a:solidFill>
+                  <a:srgbClr val="92D050"/>
+                </a:solidFill>
+                <a:latin typeface="Arial" panose="020B0604020202020204" pitchFamily="34" charset="0"/>
+                <a:cs typeface="Arial" panose="020B0604020202020204" pitchFamily="34" charset="0"/>
+              </a:rPr>
+              <a:t>motorcycles</a:t>
+            </a:r>
+            <a:r>
+              <a:rPr lang="en-US" dirty="0">
+                <a:latin typeface="Arial" panose="020B0604020202020204" pitchFamily="34" charset="0"/>
+                <a:cs typeface="Arial" panose="020B0604020202020204" pitchFamily="34" charset="0"/>
+              </a:rPr>
+              <a:t>[“</a:t>
+            </a:r>
+            <a:r>
+              <a:rPr lang="en-US" dirty="0">
+                <a:solidFill>
+                  <a:srgbClr val="FFC000"/>
+                </a:solidFill>
+                <a:latin typeface="Arial" panose="020B0604020202020204" pitchFamily="34" charset="0"/>
+                <a:cs typeface="Arial" panose="020B0604020202020204" pitchFamily="34" charset="0"/>
+              </a:rPr>
+              <a:t>Aprilia</a:t>
+            </a:r>
+            <a:r>
+              <a:rPr lang="en-US" dirty="0">
+                <a:latin typeface="Arial" panose="020B0604020202020204" pitchFamily="34" charset="0"/>
+                <a:cs typeface="Arial" panose="020B0604020202020204" pitchFamily="34" charset="0"/>
+              </a:rPr>
+              <a:t>”] = </a:t>
+            </a:r>
+            <a:r>
+              <a:rPr lang="en-US" dirty="0">
+                <a:solidFill>
+                  <a:srgbClr val="FFC000"/>
+                </a:solidFill>
+                <a:latin typeface="Arial" panose="020B0604020202020204" pitchFamily="34" charset="0"/>
+                <a:cs typeface="Arial" panose="020B0604020202020204" pitchFamily="34" charset="0"/>
+              </a:rPr>
+              <a:t>700</a:t>
+            </a:r>
+            <a:r>
+              <a:rPr lang="en-US" dirty="0">
+                <a:latin typeface="Arial" panose="020B0604020202020204" pitchFamily="34" charset="0"/>
+                <a:cs typeface="Arial" panose="020B0604020202020204" pitchFamily="34" charset="0"/>
+              </a:rPr>
+              <a:t>;</a:t>
+            </a:r>
+          </a:p>
+          <a:p>
+            <a:pPr marL="0" indent="0">
+              <a:buNone/>
+            </a:pPr>
+            <a:endParaRPr lang="en-US" dirty="0">
+              <a:latin typeface="Arial" panose="020B0604020202020204" pitchFamily="34" charset="0"/>
+              <a:cs typeface="Arial" panose="020B0604020202020204" pitchFamily="34" charset="0"/>
+            </a:endParaRPr>
+          </a:p>
+        </p:txBody>
+      </p:sp>
+    </p:spTree>
+    <p:extLst>
+      <p:ext uri="{BB962C8B-B14F-4D97-AF65-F5344CB8AC3E}">
+        <p14:creationId xmlns:p14="http://schemas.microsoft.com/office/powerpoint/2010/main" val="2855608396"/>
+      </p:ext>
+    </p:extLst>
+  </p:cSld>
+  <p:clrMapOvr>
+    <a:masterClrMapping/>
+  </p:clrMapOvr>
+</p:sld>
+</file>
+
+<file path=ppt/slides/slide31.xml><?xml version="1.0" encoding="utf-8"?>
+<p:sld xmlns:a="http://schemas.openxmlformats.org/drawingml/2006/main" xmlns:r="http://schemas.openxmlformats.org/officeDocument/2006/relationships" xmlns:p="http://schemas.openxmlformats.org/presentationml/2006/main">
+  <p:cSld>
+    <p:spTree>
+      <p:nvGrpSpPr>
+        <p:cNvPr id="1" name=""/>
+        <p:cNvGrpSpPr/>
+        <p:nvPr/>
+      </p:nvGrpSpPr>
+      <p:grpSpPr>
+        <a:xfrm>
+          <a:off x="0" y="0"/>
+          <a:ext cx="0" cy="0"/>
+          <a:chOff x="0" y="0"/>
+          <a:chExt cx="0" cy="0"/>
+        </a:xfrm>
+      </p:grpSpPr>
+      <p:sp>
+        <p:nvSpPr>
+          <p:cNvPr id="2" name="Заглавие 1">
+            <a:extLst>
+              <a:ext uri="{FF2B5EF4-FFF2-40B4-BE49-F238E27FC236}">
+                <a16:creationId xmlns:a16="http://schemas.microsoft.com/office/drawing/2014/main" id="{E4B3DE4D-BD37-1F80-7A44-89DAAFCE62DF}"/>
+              </a:ext>
+            </a:extLst>
+          </p:cNvPr>
+          <p:cNvSpPr>
+            <a:spLocks noGrp="1"/>
+          </p:cNvSpPr>
+          <p:nvPr>
+            <p:ph type="title"/>
+          </p:nvPr>
+        </p:nvSpPr>
+        <p:spPr/>
+        <p:txBody>
+          <a:bodyPr/>
+          <a:lstStyle/>
+          <a:p>
+            <a:pPr algn="ctr"/>
+            <a:r>
+              <a:rPr lang="bg-BG" dirty="0">
+                <a:latin typeface="Arial" panose="020B0604020202020204" pitchFamily="34" charset="0"/>
+                <a:cs typeface="Arial" panose="020B0604020202020204" pitchFamily="34" charset="0"/>
+              </a:rPr>
+              <a:t>Основни методи за работа</a:t>
+            </a:r>
+            <a:endParaRPr lang="en-US" dirty="0">
+              <a:latin typeface="Arial" panose="020B0604020202020204" pitchFamily="34" charset="0"/>
+              <a:cs typeface="Arial" panose="020B0604020202020204" pitchFamily="34" charset="0"/>
+            </a:endParaRPr>
+          </a:p>
+        </p:txBody>
+      </p:sp>
+      <p:sp>
+        <p:nvSpPr>
+          <p:cNvPr id="3" name="Контейнер за съдържание 2">
+            <a:extLst>
+              <a:ext uri="{FF2B5EF4-FFF2-40B4-BE49-F238E27FC236}">
+                <a16:creationId xmlns:a16="http://schemas.microsoft.com/office/drawing/2014/main" id="{C7A99CB0-9BA4-D896-137F-1DE63FA838CE}"/>
+              </a:ext>
+            </a:extLst>
+          </p:cNvPr>
+          <p:cNvSpPr>
+            <a:spLocks noGrp="1"/>
+          </p:cNvSpPr>
+          <p:nvPr>
+            <p:ph idx="1"/>
+          </p:nvPr>
+        </p:nvSpPr>
+        <p:spPr/>
+        <p:txBody>
+          <a:bodyPr>
+            <a:normAutofit fontScale="92500" lnSpcReduction="10000"/>
+          </a:bodyPr>
+          <a:lstStyle/>
+          <a:p>
+            <a:r>
+              <a:rPr lang="en-US" dirty="0">
+                <a:solidFill>
+                  <a:schemeClr val="accent3">
+                    <a:lumMod val="60000"/>
+                    <a:lumOff val="40000"/>
+                  </a:schemeClr>
+                </a:solidFill>
+                <a:latin typeface="Arial" panose="020B0604020202020204" pitchFamily="34" charset="0"/>
+                <a:cs typeface="Arial" panose="020B0604020202020204" pitchFamily="34" charset="0"/>
+              </a:rPr>
+              <a:t>Add</a:t>
+            </a:r>
+            <a:r>
+              <a:rPr lang="en-US" dirty="0">
+                <a:latin typeface="Arial" panose="020B0604020202020204" pitchFamily="34" charset="0"/>
+                <a:cs typeface="Arial" panose="020B0604020202020204" pitchFamily="34" charset="0"/>
+              </a:rPr>
+              <a:t>(</a:t>
+            </a:r>
+            <a:r>
+              <a:rPr lang="en-US" dirty="0">
+                <a:solidFill>
+                  <a:schemeClr val="tx2">
+                    <a:lumMod val="75000"/>
+                  </a:schemeClr>
+                </a:solidFill>
+                <a:latin typeface="Arial" panose="020B0604020202020204" pitchFamily="34" charset="0"/>
+                <a:cs typeface="Arial" panose="020B0604020202020204" pitchFamily="34" charset="0"/>
+              </a:rPr>
+              <a:t>key</a:t>
+            </a:r>
+            <a:r>
+              <a:rPr lang="en-US" dirty="0">
+                <a:latin typeface="Arial" panose="020B0604020202020204" pitchFamily="34" charset="0"/>
+                <a:cs typeface="Arial" panose="020B0604020202020204" pitchFamily="34" charset="0"/>
+              </a:rPr>
+              <a:t>, </a:t>
+            </a:r>
+            <a:r>
+              <a:rPr lang="en-US" dirty="0">
+                <a:solidFill>
+                  <a:schemeClr val="tx2">
+                    <a:lumMod val="75000"/>
+                  </a:schemeClr>
+                </a:solidFill>
+                <a:latin typeface="Arial" panose="020B0604020202020204" pitchFamily="34" charset="0"/>
+                <a:cs typeface="Arial" panose="020B0604020202020204" pitchFamily="34" charset="0"/>
+              </a:rPr>
+              <a:t>value</a:t>
+            </a:r>
+            <a:r>
+              <a:rPr lang="en-US" dirty="0">
+                <a:latin typeface="Arial" panose="020B0604020202020204" pitchFamily="34" charset="0"/>
+                <a:cs typeface="Arial" panose="020B0604020202020204" pitchFamily="34" charset="0"/>
+              </a:rPr>
+              <a:t>) </a:t>
+            </a:r>
+            <a:r>
+              <a:rPr lang="en-US" dirty="0">
+                <a:solidFill>
+                  <a:schemeClr val="tx1"/>
+                </a:solidFill>
+                <a:latin typeface="Arial" panose="020B0604020202020204" pitchFamily="34" charset="0"/>
+                <a:cs typeface="Arial" panose="020B0604020202020204" pitchFamily="34" charset="0"/>
+              </a:rPr>
+              <a:t>–</a:t>
+            </a:r>
+            <a:r>
+              <a:rPr lang="en-US" dirty="0">
+                <a:latin typeface="Arial" panose="020B0604020202020204" pitchFamily="34" charset="0"/>
+                <a:cs typeface="Arial" panose="020B0604020202020204" pitchFamily="34" charset="0"/>
+              </a:rPr>
+              <a:t> </a:t>
+            </a:r>
+            <a:r>
+              <a:rPr lang="bg-BG" dirty="0">
+                <a:solidFill>
+                  <a:schemeClr val="tx1"/>
+                </a:solidFill>
+                <a:latin typeface="Arial" panose="020B0604020202020204" pitchFamily="34" charset="0"/>
+                <a:cs typeface="Arial" panose="020B0604020202020204" pitchFamily="34" charset="0"/>
+              </a:rPr>
+              <a:t>добавя ключ и стойност в речника</a:t>
+            </a:r>
+          </a:p>
+          <a:p>
+            <a:r>
+              <a:rPr lang="en-US" dirty="0">
+                <a:solidFill>
+                  <a:schemeClr val="accent3">
+                    <a:lumMod val="60000"/>
+                    <a:lumOff val="40000"/>
+                  </a:schemeClr>
+                </a:solidFill>
+                <a:latin typeface="Arial" panose="020B0604020202020204" pitchFamily="34" charset="0"/>
+                <a:cs typeface="Arial" panose="020B0604020202020204" pitchFamily="34" charset="0"/>
+              </a:rPr>
+              <a:t>Remove</a:t>
+            </a:r>
+            <a:r>
+              <a:rPr lang="en-US" dirty="0">
+                <a:latin typeface="Arial" panose="020B0604020202020204" pitchFamily="34" charset="0"/>
+                <a:cs typeface="Arial" panose="020B0604020202020204" pitchFamily="34" charset="0"/>
+              </a:rPr>
+              <a:t>(</a:t>
+            </a:r>
+            <a:r>
+              <a:rPr lang="en-US" dirty="0">
+                <a:solidFill>
+                  <a:schemeClr val="tx2">
+                    <a:lumMod val="75000"/>
+                  </a:schemeClr>
+                </a:solidFill>
+                <a:latin typeface="Arial" panose="020B0604020202020204" pitchFamily="34" charset="0"/>
+                <a:cs typeface="Arial" panose="020B0604020202020204" pitchFamily="34" charset="0"/>
+              </a:rPr>
+              <a:t>key</a:t>
+            </a:r>
+            <a:r>
+              <a:rPr lang="en-US" dirty="0">
+                <a:latin typeface="Arial" panose="020B0604020202020204" pitchFamily="34" charset="0"/>
+                <a:cs typeface="Arial" panose="020B0604020202020204" pitchFamily="34" charset="0"/>
+              </a:rPr>
+              <a:t>) </a:t>
+            </a:r>
+            <a:r>
+              <a:rPr lang="en-US" dirty="0">
+                <a:solidFill>
+                  <a:schemeClr val="tx1"/>
+                </a:solidFill>
+                <a:latin typeface="Arial" panose="020B0604020202020204" pitchFamily="34" charset="0"/>
+                <a:cs typeface="Arial" panose="020B0604020202020204" pitchFamily="34" charset="0"/>
+              </a:rPr>
+              <a:t>–</a:t>
+            </a:r>
+            <a:r>
+              <a:rPr lang="en-US" dirty="0">
+                <a:latin typeface="Arial" panose="020B0604020202020204" pitchFamily="34" charset="0"/>
+                <a:cs typeface="Arial" panose="020B0604020202020204" pitchFamily="34" charset="0"/>
+              </a:rPr>
+              <a:t> </a:t>
+            </a:r>
+            <a:r>
+              <a:rPr lang="bg-BG" dirty="0">
+                <a:solidFill>
+                  <a:schemeClr val="tx1"/>
+                </a:solidFill>
+                <a:latin typeface="Arial" panose="020B0604020202020204" pitchFamily="34" charset="0"/>
+                <a:cs typeface="Arial" panose="020B0604020202020204" pitchFamily="34" charset="0"/>
+              </a:rPr>
+              <a:t>изтрива елемент от речника</a:t>
+            </a:r>
+            <a:r>
+              <a:rPr lang="en-US" dirty="0">
+                <a:solidFill>
+                  <a:schemeClr val="tx1"/>
+                </a:solidFill>
+                <a:latin typeface="Arial" panose="020B0604020202020204" pitchFamily="34" charset="0"/>
+                <a:cs typeface="Arial" panose="020B0604020202020204" pitchFamily="34" charset="0"/>
+              </a:rPr>
+              <a:t> </a:t>
+            </a:r>
+            <a:r>
+              <a:rPr lang="bg-BG" dirty="0">
+                <a:solidFill>
+                  <a:schemeClr val="tx1"/>
+                </a:solidFill>
+                <a:latin typeface="Arial" panose="020B0604020202020204" pitchFamily="34" charset="0"/>
+                <a:cs typeface="Arial" panose="020B0604020202020204" pitchFamily="34" charset="0"/>
+              </a:rPr>
+              <a:t>по ключ</a:t>
+            </a:r>
+          </a:p>
+          <a:p>
+            <a:r>
+              <a:rPr lang="en-US" dirty="0" err="1">
+                <a:solidFill>
+                  <a:schemeClr val="accent3">
+                    <a:lumMod val="60000"/>
+                    <a:lumOff val="40000"/>
+                  </a:schemeClr>
+                </a:solidFill>
+                <a:latin typeface="Arial" panose="020B0604020202020204" pitchFamily="34" charset="0"/>
+                <a:cs typeface="Arial" panose="020B0604020202020204" pitchFamily="34" charset="0"/>
+              </a:rPr>
+              <a:t>ContainsKey</a:t>
+            </a:r>
+            <a:r>
+              <a:rPr lang="en-US" dirty="0">
+                <a:latin typeface="Arial" panose="020B0604020202020204" pitchFamily="34" charset="0"/>
+                <a:cs typeface="Arial" panose="020B0604020202020204" pitchFamily="34" charset="0"/>
+              </a:rPr>
+              <a:t>(</a:t>
+            </a:r>
+            <a:r>
+              <a:rPr lang="en-US" dirty="0">
+                <a:solidFill>
+                  <a:schemeClr val="tx2">
+                    <a:lumMod val="75000"/>
+                  </a:schemeClr>
+                </a:solidFill>
+                <a:latin typeface="Arial" panose="020B0604020202020204" pitchFamily="34" charset="0"/>
+                <a:cs typeface="Arial" panose="020B0604020202020204" pitchFamily="34" charset="0"/>
+              </a:rPr>
+              <a:t>key</a:t>
+            </a:r>
+            <a:r>
+              <a:rPr lang="en-US" dirty="0">
+                <a:latin typeface="Arial" panose="020B0604020202020204" pitchFamily="34" charset="0"/>
+                <a:cs typeface="Arial" panose="020B0604020202020204" pitchFamily="34" charset="0"/>
+              </a:rPr>
+              <a:t>) </a:t>
+            </a:r>
+            <a:r>
+              <a:rPr lang="bg-BG" dirty="0">
+                <a:solidFill>
+                  <a:schemeClr val="tx1"/>
+                </a:solidFill>
+                <a:latin typeface="Arial" panose="020B0604020202020204" pitchFamily="34" charset="0"/>
+                <a:cs typeface="Arial" panose="020B0604020202020204" pitchFamily="34" charset="0"/>
+              </a:rPr>
+              <a:t>–</a:t>
+            </a:r>
+            <a:r>
+              <a:rPr lang="bg-BG" dirty="0">
+                <a:latin typeface="Arial" panose="020B0604020202020204" pitchFamily="34" charset="0"/>
+                <a:cs typeface="Arial" panose="020B0604020202020204" pitchFamily="34" charset="0"/>
+              </a:rPr>
+              <a:t> </a:t>
+            </a:r>
+            <a:r>
+              <a:rPr lang="bg-BG" dirty="0">
+                <a:solidFill>
+                  <a:schemeClr val="tx1"/>
+                </a:solidFill>
+                <a:latin typeface="Arial" panose="020B0604020202020204" pitchFamily="34" charset="0"/>
+                <a:cs typeface="Arial" panose="020B0604020202020204" pitchFamily="34" charset="0"/>
+              </a:rPr>
+              <a:t>проверява дали има такъв ключ в речника</a:t>
+            </a:r>
+          </a:p>
+          <a:p>
+            <a:r>
+              <a:rPr lang="en-US" dirty="0" err="1">
+                <a:solidFill>
+                  <a:schemeClr val="accent3">
+                    <a:lumMod val="60000"/>
+                    <a:lumOff val="40000"/>
+                  </a:schemeClr>
+                </a:solidFill>
+                <a:latin typeface="Arial" panose="020B0604020202020204" pitchFamily="34" charset="0"/>
+                <a:cs typeface="Arial" panose="020B0604020202020204" pitchFamily="34" charset="0"/>
+              </a:rPr>
+              <a:t>ContainsValue</a:t>
+            </a:r>
+            <a:r>
+              <a:rPr lang="en-US" dirty="0">
+                <a:latin typeface="Arial" panose="020B0604020202020204" pitchFamily="34" charset="0"/>
+                <a:cs typeface="Arial" panose="020B0604020202020204" pitchFamily="34" charset="0"/>
+              </a:rPr>
+              <a:t>(</a:t>
+            </a:r>
+            <a:r>
+              <a:rPr lang="en-US" dirty="0">
+                <a:solidFill>
+                  <a:schemeClr val="tx2">
+                    <a:lumMod val="75000"/>
+                  </a:schemeClr>
+                </a:solidFill>
+                <a:latin typeface="Arial" panose="020B0604020202020204" pitchFamily="34" charset="0"/>
+                <a:cs typeface="Arial" panose="020B0604020202020204" pitchFamily="34" charset="0"/>
+              </a:rPr>
+              <a:t>value</a:t>
+            </a:r>
+            <a:r>
+              <a:rPr lang="en-US" dirty="0">
+                <a:latin typeface="Arial" panose="020B0604020202020204" pitchFamily="34" charset="0"/>
+                <a:cs typeface="Arial" panose="020B0604020202020204" pitchFamily="34" charset="0"/>
+              </a:rPr>
+              <a:t>) </a:t>
+            </a:r>
+            <a:r>
+              <a:rPr lang="bg-BG" dirty="0">
+                <a:solidFill>
+                  <a:schemeClr val="tx1"/>
+                </a:solidFill>
+                <a:latin typeface="Arial" panose="020B0604020202020204" pitchFamily="34" charset="0"/>
+                <a:cs typeface="Arial" panose="020B0604020202020204" pitchFamily="34" charset="0"/>
+              </a:rPr>
+              <a:t>–</a:t>
+            </a:r>
+            <a:r>
+              <a:rPr lang="bg-BG" dirty="0">
+                <a:latin typeface="Arial" panose="020B0604020202020204" pitchFamily="34" charset="0"/>
+                <a:cs typeface="Arial" panose="020B0604020202020204" pitchFamily="34" charset="0"/>
+              </a:rPr>
+              <a:t> </a:t>
+            </a:r>
+            <a:r>
+              <a:rPr lang="bg-BG" dirty="0">
+                <a:solidFill>
+                  <a:schemeClr val="tx1"/>
+                </a:solidFill>
+                <a:latin typeface="Arial" panose="020B0604020202020204" pitchFamily="34" charset="0"/>
+                <a:cs typeface="Arial" panose="020B0604020202020204" pitchFamily="34" charset="0"/>
+              </a:rPr>
+              <a:t>проверява дали има такава стойност в речника</a:t>
+            </a:r>
+          </a:p>
+          <a:p>
+            <a:r>
+              <a:rPr lang="en-US" dirty="0">
+                <a:solidFill>
+                  <a:schemeClr val="accent3">
+                    <a:lumMod val="60000"/>
+                    <a:lumOff val="40000"/>
+                  </a:schemeClr>
+                </a:solidFill>
+                <a:latin typeface="Arial" panose="020B0604020202020204" pitchFamily="34" charset="0"/>
+                <a:cs typeface="Arial" panose="020B0604020202020204" pitchFamily="34" charset="0"/>
+              </a:rPr>
+              <a:t>Clear() </a:t>
+            </a:r>
+            <a:r>
+              <a:rPr lang="en-US" dirty="0">
+                <a:solidFill>
+                  <a:schemeClr val="tx1"/>
+                </a:solidFill>
+                <a:latin typeface="Arial" panose="020B0604020202020204" pitchFamily="34" charset="0"/>
+                <a:cs typeface="Arial" panose="020B0604020202020204" pitchFamily="34" charset="0"/>
+              </a:rPr>
+              <a:t>– </a:t>
+            </a:r>
+            <a:r>
+              <a:rPr lang="bg-BG" dirty="0">
+                <a:solidFill>
+                  <a:schemeClr val="tx1"/>
+                </a:solidFill>
+                <a:latin typeface="Arial" panose="020B0604020202020204" pitchFamily="34" charset="0"/>
+                <a:cs typeface="Arial" panose="020B0604020202020204" pitchFamily="34" charset="0"/>
+              </a:rPr>
+              <a:t>изтрива всички елементи от речника</a:t>
+            </a:r>
+          </a:p>
+          <a:p>
+            <a:pPr marL="0" indent="0">
+              <a:buNone/>
+            </a:pPr>
+            <a:endParaRPr lang="bg-BG" dirty="0"/>
+          </a:p>
+          <a:p>
+            <a:r>
+              <a:rPr lang="en-US" dirty="0">
+                <a:solidFill>
+                  <a:schemeClr val="accent6">
+                    <a:lumMod val="60000"/>
+                    <a:lumOff val="40000"/>
+                  </a:schemeClr>
+                </a:solidFill>
+                <a:latin typeface="Arial" panose="020B0604020202020204" pitchFamily="34" charset="0"/>
+                <a:cs typeface="Arial" panose="020B0604020202020204" pitchFamily="34" charset="0"/>
+              </a:rPr>
+              <a:t>Count</a:t>
+            </a:r>
+            <a:r>
+              <a:rPr lang="en-US" dirty="0">
+                <a:latin typeface="Arial" panose="020B0604020202020204" pitchFamily="34" charset="0"/>
+                <a:cs typeface="Arial" panose="020B0604020202020204" pitchFamily="34" charset="0"/>
+              </a:rPr>
+              <a:t> </a:t>
+            </a:r>
+            <a:r>
+              <a:rPr lang="en-US" dirty="0">
+                <a:solidFill>
+                  <a:schemeClr val="tx1"/>
+                </a:solidFill>
+                <a:latin typeface="Arial" panose="020B0604020202020204" pitchFamily="34" charset="0"/>
+                <a:cs typeface="Arial" panose="020B0604020202020204" pitchFamily="34" charset="0"/>
+              </a:rPr>
+              <a:t>/property/</a:t>
+            </a:r>
+            <a:r>
+              <a:rPr lang="en-US" dirty="0">
+                <a:latin typeface="Arial" panose="020B0604020202020204" pitchFamily="34" charset="0"/>
+                <a:cs typeface="Arial" panose="020B0604020202020204" pitchFamily="34" charset="0"/>
+              </a:rPr>
+              <a:t> </a:t>
+            </a:r>
+            <a:r>
+              <a:rPr lang="en-US" dirty="0">
+                <a:solidFill>
+                  <a:schemeClr val="tx1"/>
+                </a:solidFill>
+                <a:latin typeface="Arial" panose="020B0604020202020204" pitchFamily="34" charset="0"/>
+                <a:cs typeface="Arial" panose="020B0604020202020204" pitchFamily="34" charset="0"/>
+              </a:rPr>
+              <a:t>- </a:t>
+            </a:r>
+            <a:r>
+              <a:rPr lang="bg-BG" dirty="0">
+                <a:solidFill>
+                  <a:schemeClr val="tx1"/>
+                </a:solidFill>
+                <a:latin typeface="Arial" panose="020B0604020202020204" pitchFamily="34" charset="0"/>
+                <a:cs typeface="Arial" panose="020B0604020202020204" pitchFamily="34" charset="0"/>
+              </a:rPr>
+              <a:t>връща броя на елементите в речника</a:t>
+            </a:r>
+            <a:endParaRPr lang="en-US" dirty="0">
+              <a:solidFill>
+                <a:schemeClr val="tx1"/>
+              </a:solidFill>
+              <a:latin typeface="Arial" panose="020B0604020202020204" pitchFamily="34" charset="0"/>
+              <a:cs typeface="Arial" panose="020B0604020202020204" pitchFamily="34" charset="0"/>
+            </a:endParaRPr>
+          </a:p>
+          <a:p>
+            <a:r>
+              <a:rPr lang="en-US" dirty="0">
+                <a:solidFill>
+                  <a:schemeClr val="accent6">
+                    <a:lumMod val="60000"/>
+                    <a:lumOff val="40000"/>
+                  </a:schemeClr>
+                </a:solidFill>
+                <a:latin typeface="Arial" panose="020B0604020202020204" pitchFamily="34" charset="0"/>
+                <a:cs typeface="Arial" panose="020B0604020202020204" pitchFamily="34" charset="0"/>
+              </a:rPr>
+              <a:t>Keys</a:t>
+            </a:r>
+            <a:r>
+              <a:rPr lang="en-US" dirty="0">
+                <a:latin typeface="Arial" panose="020B0604020202020204" pitchFamily="34" charset="0"/>
+                <a:cs typeface="Arial" panose="020B0604020202020204" pitchFamily="34" charset="0"/>
+              </a:rPr>
+              <a:t> </a:t>
+            </a:r>
+            <a:r>
+              <a:rPr lang="en-US" dirty="0">
+                <a:solidFill>
+                  <a:schemeClr val="tx1"/>
+                </a:solidFill>
+                <a:latin typeface="Arial" panose="020B0604020202020204" pitchFamily="34" charset="0"/>
+                <a:cs typeface="Arial" panose="020B0604020202020204" pitchFamily="34" charset="0"/>
+              </a:rPr>
+              <a:t>/property/</a:t>
+            </a:r>
+            <a:r>
+              <a:rPr lang="en-US" dirty="0">
+                <a:latin typeface="Arial" panose="020B0604020202020204" pitchFamily="34" charset="0"/>
+                <a:cs typeface="Arial" panose="020B0604020202020204" pitchFamily="34" charset="0"/>
+              </a:rPr>
+              <a:t> </a:t>
+            </a:r>
+            <a:r>
+              <a:rPr lang="en-US" dirty="0">
+                <a:solidFill>
+                  <a:schemeClr val="tx1"/>
+                </a:solidFill>
+                <a:latin typeface="Arial" panose="020B0604020202020204" pitchFamily="34" charset="0"/>
+                <a:cs typeface="Arial" panose="020B0604020202020204" pitchFamily="34" charset="0"/>
+              </a:rPr>
+              <a:t>- </a:t>
+            </a:r>
+            <a:r>
+              <a:rPr lang="bg-BG" dirty="0">
+                <a:solidFill>
+                  <a:schemeClr val="tx1"/>
+                </a:solidFill>
+                <a:latin typeface="Arial" panose="020B0604020202020204" pitchFamily="34" charset="0"/>
+                <a:cs typeface="Arial" panose="020B0604020202020204" pitchFamily="34" charset="0"/>
+              </a:rPr>
+              <a:t>връща ключовете на речника като колекция</a:t>
+            </a:r>
+            <a:endParaRPr lang="en-US" dirty="0">
+              <a:solidFill>
+                <a:schemeClr val="tx1"/>
+              </a:solidFill>
+              <a:latin typeface="Arial" panose="020B0604020202020204" pitchFamily="34" charset="0"/>
+              <a:cs typeface="Arial" panose="020B0604020202020204" pitchFamily="34" charset="0"/>
+            </a:endParaRPr>
+          </a:p>
+          <a:p>
+            <a:r>
+              <a:rPr lang="en-US" dirty="0">
+                <a:solidFill>
+                  <a:schemeClr val="accent6">
+                    <a:lumMod val="60000"/>
+                    <a:lumOff val="40000"/>
+                  </a:schemeClr>
+                </a:solidFill>
+                <a:latin typeface="Arial" panose="020B0604020202020204" pitchFamily="34" charset="0"/>
+                <a:cs typeface="Arial" panose="020B0604020202020204" pitchFamily="34" charset="0"/>
+              </a:rPr>
+              <a:t>Values</a:t>
+            </a:r>
+            <a:r>
+              <a:rPr lang="en-US" dirty="0">
+                <a:latin typeface="Arial" panose="020B0604020202020204" pitchFamily="34" charset="0"/>
+                <a:cs typeface="Arial" panose="020B0604020202020204" pitchFamily="34" charset="0"/>
+              </a:rPr>
+              <a:t> </a:t>
+            </a:r>
+            <a:r>
+              <a:rPr lang="en-US" dirty="0">
+                <a:solidFill>
+                  <a:schemeClr val="tx1"/>
+                </a:solidFill>
+                <a:latin typeface="Arial" panose="020B0604020202020204" pitchFamily="34" charset="0"/>
+                <a:cs typeface="Arial" panose="020B0604020202020204" pitchFamily="34" charset="0"/>
+              </a:rPr>
+              <a:t>/property/</a:t>
+            </a:r>
+            <a:r>
+              <a:rPr lang="en-US" dirty="0">
+                <a:latin typeface="Arial" panose="020B0604020202020204" pitchFamily="34" charset="0"/>
+                <a:cs typeface="Arial" panose="020B0604020202020204" pitchFamily="34" charset="0"/>
+              </a:rPr>
+              <a:t> </a:t>
+            </a:r>
+            <a:r>
+              <a:rPr lang="en-US" dirty="0">
+                <a:solidFill>
+                  <a:schemeClr val="tx1"/>
+                </a:solidFill>
+                <a:latin typeface="Arial" panose="020B0604020202020204" pitchFamily="34" charset="0"/>
+                <a:cs typeface="Arial" panose="020B0604020202020204" pitchFamily="34" charset="0"/>
+              </a:rPr>
+              <a:t>- </a:t>
+            </a:r>
+            <a:r>
+              <a:rPr lang="bg-BG" dirty="0">
+                <a:solidFill>
+                  <a:schemeClr val="tx1"/>
+                </a:solidFill>
+                <a:latin typeface="Arial" panose="020B0604020202020204" pitchFamily="34" charset="0"/>
+                <a:cs typeface="Arial" panose="020B0604020202020204" pitchFamily="34" charset="0"/>
+              </a:rPr>
+              <a:t>връща стойностите на речника като колекция</a:t>
+            </a:r>
+            <a:endParaRPr lang="en-US" dirty="0">
+              <a:solidFill>
+                <a:schemeClr val="tx1"/>
+              </a:solidFill>
+              <a:latin typeface="Arial" panose="020B0604020202020204" pitchFamily="34" charset="0"/>
+              <a:cs typeface="Arial" panose="020B0604020202020204" pitchFamily="34" charset="0"/>
+            </a:endParaRPr>
+          </a:p>
+          <a:p>
+            <a:endParaRPr lang="en-US" dirty="0">
+              <a:solidFill>
+                <a:schemeClr val="tx1"/>
+              </a:solidFill>
+              <a:latin typeface="Arial" panose="020B0604020202020204" pitchFamily="34" charset="0"/>
+              <a:cs typeface="Arial" panose="020B0604020202020204" pitchFamily="34" charset="0"/>
+            </a:endParaRPr>
+          </a:p>
+          <a:p>
+            <a:endParaRPr lang="bg-BG" dirty="0">
+              <a:solidFill>
+                <a:schemeClr val="tx1"/>
+              </a:solidFill>
+              <a:latin typeface="Arial" panose="020B0604020202020204" pitchFamily="34" charset="0"/>
+              <a:cs typeface="Arial" panose="020B0604020202020204" pitchFamily="34" charset="0"/>
+            </a:endParaRPr>
+          </a:p>
+          <a:p>
+            <a:endParaRPr lang="bg-BG" dirty="0"/>
+          </a:p>
+        </p:txBody>
+      </p:sp>
+    </p:spTree>
+    <p:extLst>
+      <p:ext uri="{BB962C8B-B14F-4D97-AF65-F5344CB8AC3E}">
+        <p14:creationId xmlns:p14="http://schemas.microsoft.com/office/powerpoint/2010/main" val="1874728992"/>
+      </p:ext>
+    </p:extLst>
+  </p:cSld>
+  <p:clrMapOvr>
+    <a:masterClrMapping/>
+  </p:clrMapOvr>
+</p:sld>
+</file>
+
+<file path=ppt/slides/slide32.xml><?xml version="1.0" encoding="utf-8"?>
+<p:sld xmlns:a="http://schemas.openxmlformats.org/drawingml/2006/main" xmlns:r="http://schemas.openxmlformats.org/officeDocument/2006/relationships" xmlns:p="http://schemas.openxmlformats.org/presentationml/2006/main">
+  <p:cSld>
+    <p:spTree>
+      <p:nvGrpSpPr>
+        <p:cNvPr id="1" name=""/>
+        <p:cNvGrpSpPr/>
+        <p:nvPr/>
+      </p:nvGrpSpPr>
+      <p:grpSpPr>
+        <a:xfrm>
+          <a:off x="0" y="0"/>
+          <a:ext cx="0" cy="0"/>
+          <a:chOff x="0" y="0"/>
+          <a:chExt cx="0" cy="0"/>
+        </a:xfrm>
+      </p:grpSpPr>
+      <p:sp>
+        <p:nvSpPr>
+          <p:cNvPr id="2" name="Заглавие 1">
+            <a:extLst>
+              <a:ext uri="{FF2B5EF4-FFF2-40B4-BE49-F238E27FC236}">
+                <a16:creationId xmlns:a16="http://schemas.microsoft.com/office/drawing/2014/main" id="{5BE81EE3-E59E-A8BA-68F7-759A744BC9BD}"/>
+              </a:ext>
+            </a:extLst>
+          </p:cNvPr>
+          <p:cNvSpPr>
+            <a:spLocks noGrp="1"/>
+          </p:cNvSpPr>
+          <p:nvPr>
+            <p:ph type="title"/>
+          </p:nvPr>
+        </p:nvSpPr>
+        <p:spPr/>
+        <p:txBody>
+          <a:bodyPr>
+            <a:normAutofit/>
+          </a:bodyPr>
+          <a:lstStyle/>
+          <a:p>
+            <a:pPr algn="ctr"/>
+            <a:r>
+              <a:rPr lang="bg-BG" dirty="0">
+                <a:solidFill>
+                  <a:schemeClr val="tx1"/>
+                </a:solidFill>
+                <a:latin typeface="Arial" panose="020B0604020202020204" pitchFamily="34" charset="0"/>
+                <a:cs typeface="Arial" panose="020B0604020202020204" pitchFamily="34" charset="0"/>
+              </a:rPr>
+              <a:t>Принтиране на речник</a:t>
+            </a:r>
+            <a:endParaRPr lang="en-US" dirty="0">
+              <a:solidFill>
+                <a:schemeClr val="tx1"/>
+              </a:solidFill>
+              <a:latin typeface="Arial" panose="020B0604020202020204" pitchFamily="34" charset="0"/>
+              <a:cs typeface="Arial" panose="020B0604020202020204" pitchFamily="34" charset="0"/>
+            </a:endParaRPr>
+          </a:p>
+        </p:txBody>
+      </p:sp>
+      <p:sp>
+        <p:nvSpPr>
+          <p:cNvPr id="3" name="Контейнер за съдържание 2">
+            <a:extLst>
+              <a:ext uri="{FF2B5EF4-FFF2-40B4-BE49-F238E27FC236}">
+                <a16:creationId xmlns:a16="http://schemas.microsoft.com/office/drawing/2014/main" id="{5B59009E-A341-F70D-A62B-32040E5F6E0B}"/>
+              </a:ext>
+            </a:extLst>
+          </p:cNvPr>
+          <p:cNvSpPr>
+            <a:spLocks noGrp="1"/>
+          </p:cNvSpPr>
+          <p:nvPr>
+            <p:ph idx="1"/>
+          </p:nvPr>
+        </p:nvSpPr>
+        <p:spPr>
+          <a:xfrm>
+            <a:off x="1317316" y="2180844"/>
+            <a:ext cx="9359099" cy="1938992"/>
+          </a:xfrm>
+        </p:spPr>
+        <p:txBody>
+          <a:bodyPr/>
+          <a:lstStyle/>
+          <a:p>
+            <a:pPr marL="0" indent="0">
+              <a:buNone/>
+            </a:pPr>
+            <a:endParaRPr lang="bg-BG" sz="2800" dirty="0">
+              <a:solidFill>
+                <a:schemeClr val="tx1"/>
+              </a:solidFill>
+              <a:latin typeface="Consolas" panose="020B0609020204030204" pitchFamily="49" charset="0"/>
+            </a:endParaRPr>
+          </a:p>
+          <a:p>
+            <a:pPr marL="0" indent="0">
+              <a:buNone/>
+            </a:pPr>
+            <a:endParaRPr lang="bg-BG" dirty="0">
+              <a:solidFill>
+                <a:schemeClr val="tx1"/>
+              </a:solidFill>
+              <a:latin typeface="Consolas" panose="020B0609020204030204" pitchFamily="49" charset="0"/>
+            </a:endParaRPr>
+          </a:p>
+          <a:p>
+            <a:endParaRPr lang="en-US" dirty="0"/>
+          </a:p>
+        </p:txBody>
+      </p:sp>
+      <p:sp>
+        <p:nvSpPr>
+          <p:cNvPr id="5" name="Текстово поле 4">
+            <a:extLst>
+              <a:ext uri="{FF2B5EF4-FFF2-40B4-BE49-F238E27FC236}">
+                <a16:creationId xmlns:a16="http://schemas.microsoft.com/office/drawing/2014/main" id="{244B509F-CD00-470B-1C98-34FA4474D0A5}"/>
+              </a:ext>
+            </a:extLst>
+          </p:cNvPr>
+          <p:cNvSpPr txBox="1"/>
+          <p:nvPr/>
+        </p:nvSpPr>
+        <p:spPr>
+          <a:xfrm>
+            <a:off x="1855433" y="1988637"/>
+            <a:ext cx="8282866" cy="1692771"/>
+          </a:xfrm>
+          <a:prstGeom prst="rect">
+            <a:avLst/>
+          </a:prstGeom>
+          <a:noFill/>
+        </p:spPr>
+        <p:txBody>
+          <a:bodyPr wrap="square">
+            <a:spAutoFit/>
+          </a:bodyPr>
+          <a:lstStyle/>
+          <a:p>
+            <a:pPr marL="0" indent="0">
+              <a:buNone/>
+            </a:pPr>
+            <a:endParaRPr lang="bg-BG" sz="2400" dirty="0">
+              <a:solidFill>
+                <a:schemeClr val="tx1"/>
+              </a:solidFill>
+              <a:latin typeface="Consolas" panose="020B0609020204030204" pitchFamily="49" charset="0"/>
+            </a:endParaRPr>
+          </a:p>
+          <a:p>
+            <a:pPr marL="0" indent="0">
+              <a:buNone/>
+            </a:pPr>
+            <a:r>
+              <a:rPr lang="nn-NO" sz="2000" dirty="0">
+                <a:solidFill>
+                  <a:schemeClr val="tx1"/>
+                </a:solidFill>
+                <a:latin typeface="Consolas" panose="020B0609020204030204" pitchFamily="49" charset="0"/>
+              </a:rPr>
+              <a:t>foreach (</a:t>
+            </a:r>
+            <a:r>
+              <a:rPr lang="en-US" sz="2000" dirty="0">
+                <a:solidFill>
+                  <a:schemeClr val="tx1"/>
+                </a:solidFill>
+                <a:latin typeface="Consolas" panose="020B0609020204030204" pitchFamily="49" charset="0"/>
+              </a:rPr>
+              <a:t>var </a:t>
+            </a:r>
+            <a:r>
+              <a:rPr lang="en-US" sz="2000" dirty="0">
+                <a:solidFill>
+                  <a:srgbClr val="00B0F0"/>
+                </a:solidFill>
+                <a:latin typeface="Consolas" panose="020B0609020204030204" pitchFamily="49" charset="0"/>
+              </a:rPr>
+              <a:t>item</a:t>
+            </a:r>
+            <a:r>
+              <a:rPr lang="en-US" sz="2000" dirty="0">
+                <a:solidFill>
+                  <a:schemeClr val="tx1"/>
+                </a:solidFill>
+                <a:latin typeface="Consolas" panose="020B0609020204030204" pitchFamily="49" charset="0"/>
+              </a:rPr>
+              <a:t> in </a:t>
+            </a:r>
+            <a:r>
+              <a:rPr lang="en-US" sz="2000" dirty="0">
+                <a:solidFill>
+                  <a:srgbClr val="92D050"/>
+                </a:solidFill>
+                <a:latin typeface="Consolas" panose="020B0609020204030204" pitchFamily="49" charset="0"/>
+              </a:rPr>
+              <a:t>items</a:t>
+            </a:r>
+            <a:r>
+              <a:rPr lang="nn-NO" sz="2000" dirty="0">
+                <a:solidFill>
+                  <a:schemeClr val="tx1"/>
+                </a:solidFill>
+                <a:latin typeface="Consolas" panose="020B0609020204030204" pitchFamily="49" charset="0"/>
+              </a:rPr>
+              <a:t>)</a:t>
+            </a:r>
+          </a:p>
+          <a:p>
+            <a:pPr marL="0" indent="0">
+              <a:buNone/>
+            </a:pPr>
+            <a:r>
+              <a:rPr lang="bg-BG" sz="2000" dirty="0">
+                <a:solidFill>
+                  <a:schemeClr val="tx1"/>
+                </a:solidFill>
+                <a:latin typeface="Consolas" panose="020B0609020204030204" pitchFamily="49" charset="0"/>
+              </a:rPr>
+              <a:t>    {</a:t>
+            </a:r>
+            <a:endParaRPr lang="bg-BG" sz="2000" dirty="0">
+              <a:solidFill>
+                <a:schemeClr val="tx2">
+                  <a:lumMod val="60000"/>
+                  <a:lumOff val="40000"/>
+                </a:schemeClr>
+              </a:solidFill>
+              <a:latin typeface="Consolas" panose="020B0609020204030204" pitchFamily="49" charset="0"/>
+            </a:endParaRPr>
+          </a:p>
+          <a:p>
+            <a:pPr marL="0" indent="0">
+              <a:buNone/>
+            </a:pPr>
+            <a:r>
+              <a:rPr lang="en-US" sz="2000" dirty="0">
+                <a:solidFill>
+                  <a:schemeClr val="tx2">
+                    <a:lumMod val="60000"/>
+                    <a:lumOff val="40000"/>
+                  </a:schemeClr>
+                </a:solidFill>
+                <a:latin typeface="Consolas" panose="020B0609020204030204" pitchFamily="49" charset="0"/>
+              </a:rPr>
+              <a:t> 		</a:t>
+            </a:r>
+            <a:r>
+              <a:rPr lang="en-US" sz="2000" dirty="0" err="1">
+                <a:latin typeface="Consolas" panose="020B0609020204030204" pitchFamily="49" charset="0"/>
+              </a:rPr>
+              <a:t>Console.WriteLine</a:t>
+            </a:r>
+            <a:r>
+              <a:rPr lang="en-US" sz="2000" dirty="0">
+                <a:solidFill>
+                  <a:schemeClr val="tx2">
+                    <a:lumMod val="60000"/>
+                    <a:lumOff val="40000"/>
+                  </a:schemeClr>
+                </a:solidFill>
+                <a:latin typeface="Consolas" panose="020B0609020204030204" pitchFamily="49" charset="0"/>
+              </a:rPr>
+              <a:t>(</a:t>
+            </a:r>
+            <a:r>
+              <a:rPr lang="en-US" sz="2000" dirty="0" err="1">
+                <a:solidFill>
+                  <a:srgbClr val="00B0F0"/>
+                </a:solidFill>
+                <a:latin typeface="Consolas" panose="020B0609020204030204" pitchFamily="49" charset="0"/>
+              </a:rPr>
+              <a:t>item</a:t>
+            </a:r>
+            <a:r>
+              <a:rPr lang="en-US" sz="2000" dirty="0" err="1">
+                <a:solidFill>
+                  <a:schemeClr val="tx1"/>
+                </a:solidFill>
+                <a:latin typeface="Consolas" panose="020B0609020204030204" pitchFamily="49" charset="0"/>
+              </a:rPr>
+              <a:t>.</a:t>
+            </a:r>
+            <a:r>
+              <a:rPr lang="en-US" sz="2000" dirty="0" err="1">
+                <a:solidFill>
+                  <a:srgbClr val="FFC000"/>
+                </a:solidFill>
+                <a:latin typeface="Consolas" panose="020B0609020204030204" pitchFamily="49" charset="0"/>
+              </a:rPr>
+              <a:t>Key</a:t>
+            </a:r>
+            <a:r>
+              <a:rPr lang="en-US" sz="2000" dirty="0">
+                <a:solidFill>
+                  <a:schemeClr val="tx1"/>
+                </a:solidFill>
+                <a:latin typeface="Consolas" panose="020B0609020204030204" pitchFamily="49" charset="0"/>
+              </a:rPr>
+              <a:t> + “ and ” + </a:t>
+            </a:r>
+            <a:r>
+              <a:rPr lang="en-US" sz="2000" dirty="0" err="1">
+                <a:solidFill>
+                  <a:srgbClr val="00B0F0"/>
+                </a:solidFill>
+                <a:latin typeface="Consolas" panose="020B0609020204030204" pitchFamily="49" charset="0"/>
+              </a:rPr>
+              <a:t>item</a:t>
+            </a:r>
+            <a:r>
+              <a:rPr lang="en-US" sz="2000" dirty="0" err="1">
+                <a:solidFill>
+                  <a:schemeClr val="tx1"/>
+                </a:solidFill>
+                <a:latin typeface="Consolas" panose="020B0609020204030204" pitchFamily="49" charset="0"/>
+              </a:rPr>
+              <a:t>.</a:t>
+            </a:r>
+            <a:r>
+              <a:rPr lang="en-US" sz="2000" dirty="0" err="1">
+                <a:solidFill>
+                  <a:srgbClr val="FFC000"/>
+                </a:solidFill>
+                <a:latin typeface="Consolas" panose="020B0609020204030204" pitchFamily="49" charset="0"/>
+              </a:rPr>
+              <a:t>Value</a:t>
+            </a:r>
+            <a:r>
+              <a:rPr lang="en-US" sz="2000" dirty="0">
+                <a:latin typeface="Consolas" panose="020B0609020204030204" pitchFamily="49" charset="0"/>
+              </a:rPr>
+              <a:t>	</a:t>
+            </a:r>
+            <a:r>
+              <a:rPr lang="nn-NO" sz="2000" dirty="0">
+                <a:latin typeface="Consolas" panose="020B0609020204030204" pitchFamily="49" charset="0"/>
+              </a:rPr>
+              <a:t>);</a:t>
+            </a:r>
+            <a:endParaRPr lang="en-US" sz="2000" dirty="0">
+              <a:latin typeface="Consolas" panose="020B0609020204030204" pitchFamily="49" charset="0"/>
+            </a:endParaRPr>
+          </a:p>
+          <a:p>
+            <a:pPr marL="0" indent="0">
+              <a:buNone/>
+            </a:pPr>
+            <a:r>
+              <a:rPr lang="bg-BG" sz="2000" dirty="0">
+                <a:solidFill>
+                  <a:schemeClr val="tx1"/>
+                </a:solidFill>
+                <a:latin typeface="Consolas" panose="020B0609020204030204" pitchFamily="49" charset="0"/>
+              </a:rPr>
+              <a:t>    }</a:t>
+            </a:r>
+          </a:p>
+        </p:txBody>
+      </p:sp>
+      <p:sp>
+        <p:nvSpPr>
+          <p:cNvPr id="6" name="Текстово поле 5">
+            <a:extLst>
+              <a:ext uri="{FF2B5EF4-FFF2-40B4-BE49-F238E27FC236}">
+                <a16:creationId xmlns:a16="http://schemas.microsoft.com/office/drawing/2014/main" id="{E6D827FB-9B63-6B7D-8160-EBF3DE0E1DA0}"/>
+              </a:ext>
+            </a:extLst>
+          </p:cNvPr>
+          <p:cNvSpPr txBox="1"/>
+          <p:nvPr/>
+        </p:nvSpPr>
+        <p:spPr>
+          <a:xfrm>
+            <a:off x="1743908" y="1712999"/>
+            <a:ext cx="3360752" cy="369332"/>
+          </a:xfrm>
+          <a:prstGeom prst="rect">
+            <a:avLst/>
+          </a:prstGeom>
+          <a:noFill/>
+        </p:spPr>
+        <p:txBody>
+          <a:bodyPr wrap="square" rtlCol="0">
+            <a:spAutoFit/>
+          </a:bodyPr>
+          <a:lstStyle/>
+          <a:p>
+            <a:r>
+              <a:rPr lang="bg-BG" dirty="0">
+                <a:latin typeface="Arial" panose="020B0604020202020204" pitchFamily="34" charset="0"/>
+                <a:cs typeface="Arial" panose="020B0604020202020204" pitchFamily="34" charset="0"/>
+              </a:rPr>
+              <a:t> С  </a:t>
+            </a:r>
+            <a:r>
+              <a:rPr lang="en-US" dirty="0">
+                <a:solidFill>
+                  <a:schemeClr val="accent6">
+                    <a:lumMod val="60000"/>
+                    <a:lumOff val="40000"/>
+                  </a:schemeClr>
+                </a:solidFill>
+                <a:latin typeface="Arial" panose="020B0604020202020204" pitchFamily="34" charset="0"/>
+                <a:cs typeface="Arial" panose="020B0604020202020204" pitchFamily="34" charset="0"/>
+              </a:rPr>
+              <a:t>foreach-</a:t>
+            </a:r>
+            <a:r>
+              <a:rPr lang="bg-BG" dirty="0">
+                <a:solidFill>
+                  <a:schemeClr val="accent6">
+                    <a:lumMod val="60000"/>
+                    <a:lumOff val="40000"/>
+                  </a:schemeClr>
+                </a:solidFill>
+                <a:latin typeface="Arial" panose="020B0604020202020204" pitchFamily="34" charset="0"/>
+                <a:cs typeface="Arial" panose="020B0604020202020204" pitchFamily="34" charset="0"/>
+              </a:rPr>
+              <a:t>цикъл</a:t>
+            </a:r>
+            <a:r>
+              <a:rPr lang="en-US" dirty="0">
+                <a:solidFill>
+                  <a:schemeClr val="accent6">
+                    <a:lumMod val="60000"/>
+                    <a:lumOff val="40000"/>
+                  </a:schemeClr>
+                </a:solidFill>
+                <a:latin typeface="Arial" panose="020B0604020202020204" pitchFamily="34" charset="0"/>
+                <a:cs typeface="Arial" panose="020B0604020202020204" pitchFamily="34" charset="0"/>
+              </a:rPr>
+              <a:t> </a:t>
+            </a:r>
+            <a:r>
+              <a:rPr lang="bg-BG" dirty="0">
+                <a:solidFill>
+                  <a:schemeClr val="accent6">
+                    <a:lumMod val="60000"/>
+                    <a:lumOff val="40000"/>
+                  </a:schemeClr>
+                </a:solidFill>
+                <a:latin typeface="Arial" panose="020B0604020202020204" pitchFamily="34" charset="0"/>
+                <a:cs typeface="Arial" panose="020B0604020202020204" pitchFamily="34" charset="0"/>
+              </a:rPr>
+              <a:t> </a:t>
+            </a:r>
+            <a:r>
+              <a:rPr lang="en-US" dirty="0">
+                <a:solidFill>
+                  <a:srgbClr val="92D050"/>
+                </a:solidFill>
+                <a:latin typeface="Arial" panose="020B0604020202020204" pitchFamily="34" charset="0"/>
+                <a:cs typeface="Arial" panose="020B0604020202020204" pitchFamily="34" charset="0"/>
+              </a:rPr>
+              <a:t>/</a:t>
+            </a:r>
+            <a:r>
+              <a:rPr lang="bg-BG" dirty="0">
+                <a:solidFill>
+                  <a:srgbClr val="92D050"/>
+                </a:solidFill>
+                <a:latin typeface="Arial" panose="020B0604020202020204" pitchFamily="34" charset="0"/>
+                <a:cs typeface="Arial" panose="020B0604020202020204" pitchFamily="34" charset="0"/>
+              </a:rPr>
+              <a:t>НОВО!!!</a:t>
+            </a:r>
+            <a:r>
+              <a:rPr lang="en-US" dirty="0">
+                <a:solidFill>
+                  <a:srgbClr val="92D050"/>
+                </a:solidFill>
+                <a:latin typeface="Arial" panose="020B0604020202020204" pitchFamily="34" charset="0"/>
+                <a:cs typeface="Arial" panose="020B0604020202020204" pitchFamily="34" charset="0"/>
+              </a:rPr>
+              <a:t>/</a:t>
+            </a:r>
+          </a:p>
+        </p:txBody>
+      </p:sp>
+      <p:sp>
+        <p:nvSpPr>
+          <p:cNvPr id="7" name="Текстово поле 6">
+            <a:extLst>
+              <a:ext uri="{FF2B5EF4-FFF2-40B4-BE49-F238E27FC236}">
+                <a16:creationId xmlns:a16="http://schemas.microsoft.com/office/drawing/2014/main" id="{ED07C795-261F-4E73-6872-1F2A611E3A7E}"/>
+              </a:ext>
+            </a:extLst>
+          </p:cNvPr>
+          <p:cNvSpPr txBox="1"/>
+          <p:nvPr/>
+        </p:nvSpPr>
+        <p:spPr>
+          <a:xfrm>
+            <a:off x="1743907" y="4171564"/>
+            <a:ext cx="5340473" cy="369332"/>
+          </a:xfrm>
+          <a:prstGeom prst="rect">
+            <a:avLst/>
+          </a:prstGeom>
+          <a:noFill/>
+        </p:spPr>
+        <p:txBody>
+          <a:bodyPr wrap="square" rtlCol="0">
+            <a:spAutoFit/>
+          </a:bodyPr>
+          <a:lstStyle/>
+          <a:p>
+            <a:r>
+              <a:rPr lang="bg-BG" dirty="0">
+                <a:latin typeface="Arial" panose="020B0604020202020204" pitchFamily="34" charset="0"/>
+                <a:cs typeface="Arial" panose="020B0604020202020204" pitchFamily="34" charset="0"/>
+              </a:rPr>
+              <a:t> С  </a:t>
+            </a:r>
+            <a:r>
+              <a:rPr lang="en-US" dirty="0">
+                <a:solidFill>
+                  <a:schemeClr val="accent6">
+                    <a:lumMod val="60000"/>
+                    <a:lumOff val="40000"/>
+                  </a:schemeClr>
+                </a:solidFill>
+                <a:latin typeface="Arial" panose="020B0604020202020204" pitchFamily="34" charset="0"/>
+                <a:cs typeface="Arial" panose="020B0604020202020204" pitchFamily="34" charset="0"/>
+              </a:rPr>
+              <a:t>for – </a:t>
+            </a:r>
+            <a:r>
+              <a:rPr lang="bg-BG" dirty="0">
+                <a:solidFill>
+                  <a:schemeClr val="accent6">
+                    <a:lumMod val="60000"/>
+                    <a:lumOff val="40000"/>
+                  </a:schemeClr>
+                </a:solidFill>
+                <a:latin typeface="Arial" panose="020B0604020202020204" pitchFamily="34" charset="0"/>
+                <a:cs typeface="Arial" panose="020B0604020202020204" pitchFamily="34" charset="0"/>
+              </a:rPr>
+              <a:t>цикъл</a:t>
+            </a:r>
+            <a:endParaRPr lang="en-US" dirty="0">
+              <a:solidFill>
+                <a:schemeClr val="accent6">
+                  <a:lumMod val="60000"/>
+                  <a:lumOff val="40000"/>
+                </a:schemeClr>
+              </a:solidFill>
+              <a:latin typeface="Arial" panose="020B0604020202020204" pitchFamily="34" charset="0"/>
+              <a:cs typeface="Arial" panose="020B0604020202020204" pitchFamily="34" charset="0"/>
+            </a:endParaRPr>
+          </a:p>
+        </p:txBody>
+      </p:sp>
+      <p:sp>
+        <p:nvSpPr>
+          <p:cNvPr id="8" name="Текстово поле 7">
+            <a:extLst>
+              <a:ext uri="{FF2B5EF4-FFF2-40B4-BE49-F238E27FC236}">
+                <a16:creationId xmlns:a16="http://schemas.microsoft.com/office/drawing/2014/main" id="{1BFC2047-E17C-F824-FEB2-38777CADFD6C}"/>
+              </a:ext>
+            </a:extLst>
+          </p:cNvPr>
+          <p:cNvSpPr txBox="1"/>
+          <p:nvPr/>
+        </p:nvSpPr>
+        <p:spPr>
+          <a:xfrm>
+            <a:off x="1855433" y="4492327"/>
+            <a:ext cx="7897242" cy="2000548"/>
+          </a:xfrm>
+          <a:prstGeom prst="rect">
+            <a:avLst/>
+          </a:prstGeom>
+          <a:noFill/>
+        </p:spPr>
+        <p:txBody>
+          <a:bodyPr wrap="square">
+            <a:spAutoFit/>
+          </a:bodyPr>
+          <a:lstStyle/>
+          <a:p>
+            <a:pPr marL="0" indent="0">
+              <a:buNone/>
+            </a:pPr>
+            <a:endParaRPr lang="bg-BG" sz="2400" dirty="0">
+              <a:solidFill>
+                <a:schemeClr val="tx1"/>
+              </a:solidFill>
+              <a:latin typeface="Consolas" panose="020B0609020204030204" pitchFamily="49" charset="0"/>
+            </a:endParaRPr>
+          </a:p>
+          <a:p>
+            <a:pPr marL="0" indent="0">
+              <a:buNone/>
+            </a:pPr>
+            <a:r>
+              <a:rPr lang="nn-NO" sz="2000" dirty="0">
+                <a:solidFill>
+                  <a:schemeClr val="tx1"/>
+                </a:solidFill>
+                <a:latin typeface="Consolas" panose="020B0609020204030204" pitchFamily="49" charset="0"/>
+              </a:rPr>
+              <a:t>for (int i = 0; i &lt; </a:t>
+            </a:r>
+            <a:r>
+              <a:rPr lang="en-US" sz="2000" dirty="0">
+                <a:solidFill>
+                  <a:srgbClr val="92D050"/>
+                </a:solidFill>
+                <a:latin typeface="Consolas" panose="020B0609020204030204" pitchFamily="49" charset="0"/>
+              </a:rPr>
+              <a:t>items</a:t>
+            </a:r>
+            <a:r>
+              <a:rPr lang="nn-NO" sz="2000" dirty="0">
+                <a:solidFill>
+                  <a:schemeClr val="tx1"/>
+                </a:solidFill>
+                <a:latin typeface="Consolas" panose="020B0609020204030204" pitchFamily="49" charset="0"/>
+              </a:rPr>
+              <a:t>.</a:t>
+            </a:r>
+            <a:r>
+              <a:rPr lang="nn-NO" sz="2000" dirty="0">
+                <a:solidFill>
+                  <a:srgbClr val="00B0F0"/>
+                </a:solidFill>
+                <a:latin typeface="Consolas" panose="020B0609020204030204" pitchFamily="49" charset="0"/>
+              </a:rPr>
+              <a:t>Count</a:t>
+            </a:r>
+            <a:r>
+              <a:rPr lang="nn-NO" sz="2000" dirty="0">
+                <a:solidFill>
+                  <a:schemeClr val="tx1"/>
+                </a:solidFill>
+                <a:latin typeface="Consolas" panose="020B0609020204030204" pitchFamily="49" charset="0"/>
+              </a:rPr>
+              <a:t>; i++)</a:t>
+            </a:r>
+          </a:p>
+          <a:p>
+            <a:pPr marL="0" indent="0">
+              <a:buNone/>
+            </a:pPr>
+            <a:r>
+              <a:rPr lang="bg-BG" sz="2000" dirty="0">
+                <a:solidFill>
+                  <a:schemeClr val="tx1"/>
+                </a:solidFill>
+                <a:latin typeface="Consolas" panose="020B0609020204030204" pitchFamily="49" charset="0"/>
+              </a:rPr>
+              <a:t>    {</a:t>
+            </a:r>
+            <a:endParaRPr lang="bg-BG" sz="2000" dirty="0">
+              <a:solidFill>
+                <a:schemeClr val="tx2">
+                  <a:lumMod val="60000"/>
+                  <a:lumOff val="40000"/>
+                </a:schemeClr>
+              </a:solidFill>
+              <a:latin typeface="Consolas" panose="020B0609020204030204" pitchFamily="49" charset="0"/>
+            </a:endParaRPr>
+          </a:p>
+          <a:p>
+            <a:pPr marL="0" indent="0">
+              <a:buNone/>
+            </a:pPr>
+            <a:r>
+              <a:rPr lang="en-US" sz="2000" dirty="0">
+                <a:solidFill>
+                  <a:schemeClr val="tx2">
+                    <a:lumMod val="60000"/>
+                    <a:lumOff val="40000"/>
+                  </a:schemeClr>
+                </a:solidFill>
+                <a:latin typeface="Consolas" panose="020B0609020204030204" pitchFamily="49" charset="0"/>
+              </a:rPr>
+              <a:t> 		</a:t>
+            </a:r>
+            <a:r>
+              <a:rPr lang="en-US" sz="2000" dirty="0" err="1">
+                <a:latin typeface="Consolas" panose="020B0609020204030204" pitchFamily="49" charset="0"/>
+              </a:rPr>
+              <a:t>Console.WriteLine</a:t>
+            </a:r>
+            <a:r>
+              <a:rPr lang="en-US" sz="2000" dirty="0">
+                <a:solidFill>
+                  <a:schemeClr val="tx2">
+                    <a:lumMod val="60000"/>
+                    <a:lumOff val="40000"/>
+                  </a:schemeClr>
+                </a:solidFill>
+                <a:latin typeface="Consolas" panose="020B0609020204030204" pitchFamily="49" charset="0"/>
+              </a:rPr>
+              <a:t>(</a:t>
+            </a:r>
+            <a:r>
+              <a:rPr lang="en-US" sz="2000" dirty="0">
+                <a:solidFill>
+                  <a:srgbClr val="92D050"/>
+                </a:solidFill>
+                <a:latin typeface="Consolas" panose="020B0609020204030204" pitchFamily="49" charset="0"/>
+              </a:rPr>
+              <a:t>items</a:t>
+            </a:r>
+            <a:r>
+              <a:rPr lang="bg-BG" sz="2000" dirty="0">
+                <a:solidFill>
+                  <a:schemeClr val="tx1"/>
+                </a:solidFill>
+                <a:latin typeface="Consolas" panose="020B0609020204030204" pitchFamily="49" charset="0"/>
+              </a:rPr>
+              <a:t>.</a:t>
+            </a:r>
+            <a:r>
+              <a:rPr lang="en-US" sz="2000" dirty="0" err="1">
+                <a:solidFill>
+                  <a:srgbClr val="FFFF00"/>
+                </a:solidFill>
+                <a:latin typeface="Consolas" panose="020B0609020204030204" pitchFamily="49" charset="0"/>
+              </a:rPr>
+              <a:t>ElementAt</a:t>
+            </a:r>
+            <a:r>
+              <a:rPr lang="nn-NO" sz="2000" dirty="0">
+                <a:solidFill>
+                  <a:srgbClr val="FFFF00"/>
+                </a:solidFill>
+                <a:latin typeface="Consolas" panose="020B0609020204030204" pitchFamily="49" charset="0"/>
+              </a:rPr>
+              <a:t>[i]</a:t>
+            </a:r>
+            <a:r>
+              <a:rPr lang="nn-NO" sz="2000" dirty="0">
+                <a:latin typeface="Consolas" panose="020B0609020204030204" pitchFamily="49" charset="0"/>
+              </a:rPr>
+              <a:t>.</a:t>
+            </a:r>
+            <a:r>
+              <a:rPr lang="nn-NO" sz="2000" dirty="0">
+                <a:solidFill>
+                  <a:srgbClr val="FFC000"/>
+                </a:solidFill>
+                <a:latin typeface="Consolas" panose="020B0609020204030204" pitchFamily="49" charset="0"/>
+              </a:rPr>
+              <a:t>Key</a:t>
+            </a:r>
+            <a:r>
+              <a:rPr lang="nn-NO" sz="2000" dirty="0">
+                <a:latin typeface="Consolas" panose="020B0609020204030204" pitchFamily="49" charset="0"/>
+              </a:rPr>
+              <a:t> + </a:t>
+            </a:r>
+          </a:p>
+          <a:p>
+            <a:pPr marL="0" indent="0">
+              <a:buNone/>
+            </a:pPr>
+            <a:r>
+              <a:rPr lang="en-US" sz="2000" dirty="0">
+                <a:solidFill>
+                  <a:schemeClr val="tx1"/>
+                </a:solidFill>
+                <a:latin typeface="Consolas" panose="020B0609020204030204" pitchFamily="49" charset="0"/>
+              </a:rPr>
+              <a:t>“ and ” </a:t>
+            </a:r>
+            <a:r>
+              <a:rPr lang="en-US" sz="2000" dirty="0">
+                <a:latin typeface="Consolas" panose="020B0609020204030204" pitchFamily="49" charset="0"/>
+              </a:rPr>
+              <a:t>+ </a:t>
+            </a:r>
+            <a:r>
+              <a:rPr lang="en-US" sz="2000" dirty="0" err="1">
+                <a:solidFill>
+                  <a:srgbClr val="92D050"/>
+                </a:solidFill>
+                <a:latin typeface="Consolas" panose="020B0609020204030204" pitchFamily="49" charset="0"/>
+              </a:rPr>
+              <a:t>items</a:t>
+            </a:r>
+            <a:r>
+              <a:rPr lang="en-US" sz="2000" dirty="0" err="1">
+                <a:latin typeface="Consolas" panose="020B0609020204030204" pitchFamily="49" charset="0"/>
+              </a:rPr>
+              <a:t>.</a:t>
+            </a:r>
+            <a:r>
+              <a:rPr lang="en-US" sz="2000" dirty="0" err="1">
+                <a:solidFill>
+                  <a:srgbClr val="FFFF00"/>
+                </a:solidFill>
+                <a:latin typeface="Consolas" panose="020B0609020204030204" pitchFamily="49" charset="0"/>
+              </a:rPr>
+              <a:t>ElementAt</a:t>
+            </a:r>
+            <a:r>
+              <a:rPr lang="en-US" sz="2000" dirty="0">
+                <a:solidFill>
+                  <a:srgbClr val="FFFF00"/>
+                </a:solidFill>
+                <a:latin typeface="Consolas" panose="020B0609020204030204" pitchFamily="49" charset="0"/>
+              </a:rPr>
+              <a:t>[</a:t>
+            </a:r>
+            <a:r>
+              <a:rPr lang="en-US" sz="2000" dirty="0" err="1">
+                <a:solidFill>
+                  <a:srgbClr val="FFFF00"/>
+                </a:solidFill>
+                <a:latin typeface="Consolas" panose="020B0609020204030204" pitchFamily="49" charset="0"/>
+              </a:rPr>
+              <a:t>i</a:t>
+            </a:r>
+            <a:r>
+              <a:rPr lang="en-US" sz="2000" dirty="0">
+                <a:solidFill>
+                  <a:srgbClr val="FFFF00"/>
+                </a:solidFill>
+                <a:latin typeface="Consolas" panose="020B0609020204030204" pitchFamily="49" charset="0"/>
+              </a:rPr>
+              <a:t>]</a:t>
+            </a:r>
+            <a:r>
+              <a:rPr lang="en-US" sz="2000" dirty="0">
+                <a:latin typeface="Consolas" panose="020B0609020204030204" pitchFamily="49" charset="0"/>
+              </a:rPr>
+              <a:t>.</a:t>
+            </a:r>
+            <a:r>
+              <a:rPr lang="en-US" sz="2000" dirty="0">
+                <a:solidFill>
+                  <a:srgbClr val="FFC000"/>
+                </a:solidFill>
+                <a:latin typeface="Consolas" panose="020B0609020204030204" pitchFamily="49" charset="0"/>
+              </a:rPr>
+              <a:t>Value</a:t>
+            </a:r>
+            <a:r>
+              <a:rPr lang="nn-NO" sz="2000" dirty="0">
+                <a:latin typeface="Consolas" panose="020B0609020204030204" pitchFamily="49" charset="0"/>
+              </a:rPr>
+              <a:t>);</a:t>
+            </a:r>
+            <a:endParaRPr lang="en-US" sz="2000" dirty="0">
+              <a:latin typeface="Consolas" panose="020B0609020204030204" pitchFamily="49" charset="0"/>
+            </a:endParaRPr>
+          </a:p>
+          <a:p>
+            <a:pPr marL="0" indent="0">
+              <a:buNone/>
+            </a:pPr>
+            <a:r>
+              <a:rPr lang="bg-BG" sz="2000" dirty="0">
+                <a:solidFill>
+                  <a:schemeClr val="tx1"/>
+                </a:solidFill>
+                <a:latin typeface="Consolas" panose="020B0609020204030204" pitchFamily="49" charset="0"/>
+              </a:rPr>
+              <a:t>    }</a:t>
+            </a:r>
+          </a:p>
+        </p:txBody>
+      </p:sp>
+    </p:spTree>
+    <p:extLst>
+      <p:ext uri="{BB962C8B-B14F-4D97-AF65-F5344CB8AC3E}">
+        <p14:creationId xmlns:p14="http://schemas.microsoft.com/office/powerpoint/2010/main" val="2170094764"/>
       </p:ext>
     </p:extLst>
   </p:cSld>

</xml_diff>

<commit_message>
Forach loop - done
</commit_message>
<xml_diff>
--- a/C# Intermediate.pptx
+++ b/C# Intermediate.pptx
@@ -37,6 +37,7 @@
     <p:sldId id="286" r:id="rId31"/>
     <p:sldId id="287" r:id="rId32"/>
     <p:sldId id="289" r:id="rId33"/>
+    <p:sldId id="290" r:id="rId34"/>
   </p:sldIdLst>
   <p:sldSz cx="12192000" cy="6858000"/>
   <p:notesSz cx="6858000" cy="9144000"/>
@@ -15550,12 +15551,18 @@
             <a:pPr algn="ctr"/>
             <a:r>
               <a:rPr lang="bg-BG" dirty="0">
+                <a:solidFill>
+                  <a:schemeClr val="tx1"/>
+                </a:solidFill>
                 <a:latin typeface="Arial" panose="020B0604020202020204" pitchFamily="34" charset="0"/>
                 <a:cs typeface="Arial" panose="020B0604020202020204" pitchFamily="34" charset="0"/>
               </a:rPr>
               <a:t>Асоциативни масиви</a:t>
             </a:r>
             <a:endParaRPr lang="en-US" dirty="0">
+              <a:solidFill>
+                <a:schemeClr val="tx1"/>
+              </a:solidFill>
               <a:latin typeface="Arial" panose="020B0604020202020204" pitchFamily="34" charset="0"/>
               <a:cs typeface="Arial" panose="020B0604020202020204" pitchFamily="34" charset="0"/>
             </a:endParaRPr>
@@ -15584,67 +15591,95 @@
           <a:lstStyle/>
           <a:p>
             <a:r>
+              <a:rPr lang="bg-BG" dirty="0">
+                <a:solidFill>
+                  <a:schemeClr val="tx1"/>
+                </a:solidFill>
+              </a:rPr>
+              <a:t>Това са масиви, които са индексирани чрез ключове, не чрез индекси като обикновените масиви.</a:t>
+            </a:r>
+          </a:p>
+          <a:p>
+            <a:endParaRPr lang="bg-BG" dirty="0"/>
+          </a:p>
+          <a:p>
+            <a:r>
+              <a:rPr lang="bg-BG" dirty="0">
+                <a:solidFill>
+                  <a:schemeClr val="tx1"/>
+                </a:solidFill>
+              </a:rPr>
+              <a:t>Съдържат двойки  </a:t>
+            </a:r>
+            <a:r>
+              <a:rPr lang="en-US" dirty="0">
+                <a:solidFill>
+                  <a:schemeClr val="tx1"/>
+                </a:solidFill>
+              </a:rPr>
+              <a:t>{</a:t>
+            </a:r>
+            <a:r>
+              <a:rPr lang="bg-BG" dirty="0">
+                <a:solidFill>
+                  <a:srgbClr val="FFFF00"/>
+                </a:solidFill>
+              </a:rPr>
+              <a:t>ключ</a:t>
+            </a:r>
+            <a:r>
               <a:rPr lang="bg-BG" dirty="0"/>
-              <a:t>Това са масиви, които са индексирани чрез </a:t>
+              <a:t> </a:t>
             </a:r>
             <a:r>
               <a:rPr lang="bg-BG" dirty="0">
                 <a:solidFill>
+                  <a:schemeClr val="tx1"/>
+                </a:solidFill>
+              </a:rPr>
+              <a:t>-&gt;</a:t>
+            </a:r>
+            <a:r>
+              <a:rPr lang="bg-BG" dirty="0"/>
+              <a:t> </a:t>
+            </a:r>
+            <a:r>
+              <a:rPr lang="bg-BG" dirty="0">
+                <a:solidFill>
                   <a:srgbClr val="FFFF00"/>
                 </a:solidFill>
               </a:rPr>
-              <a:t>ключове</a:t>
-            </a:r>
+              <a:t>стойност</a:t>
+            </a:r>
+            <a:r>
+              <a:rPr lang="en-US" dirty="0">
+                <a:solidFill>
+                  <a:schemeClr val="tx1"/>
+                </a:solidFill>
+              </a:rPr>
+              <a:t>}</a:t>
+            </a:r>
+            <a:endParaRPr lang="bg-BG" dirty="0">
+              <a:solidFill>
+                <a:schemeClr val="tx1"/>
+              </a:solidFill>
+            </a:endParaRPr>
+          </a:p>
+          <a:p>
+            <a:pPr marL="0" indent="0">
+              <a:buNone/>
+            </a:pPr>
             <a:r>
               <a:rPr lang="bg-BG" dirty="0"/>
-              <a:t>, не чрез индекси като обикновените масиви.</a:t>
-            </a:r>
-          </a:p>
-          <a:p>
-            <a:endParaRPr lang="bg-BG" dirty="0"/>
-          </a:p>
-          <a:p>
-            <a:r>
-              <a:rPr lang="bg-BG" dirty="0"/>
-              <a:t>Съдържат двойки  </a:t>
-            </a:r>
-            <a:r>
-              <a:rPr lang="en-US" dirty="0"/>
-              <a:t>{</a:t>
+              <a:t>   </a:t>
             </a:r>
             <a:r>
               <a:rPr lang="bg-BG" dirty="0">
                 <a:solidFill>
-                  <a:srgbClr val="FFFF00"/>
-                </a:solidFill>
-              </a:rPr>
-              <a:t>ключ</a:t>
-            </a:r>
-            <a:r>
-              <a:rPr lang="bg-BG" dirty="0"/>
-              <a:t> -&gt; </a:t>
-            </a:r>
-            <a:r>
-              <a:rPr lang="bg-BG" dirty="0">
-                <a:solidFill>
-                  <a:srgbClr val="FFFF00"/>
-                </a:solidFill>
-              </a:rPr>
-              <a:t>стойност</a:t>
-            </a:r>
-            <a:r>
-              <a:rPr lang="en-US" dirty="0"/>
-              <a:t>}</a:t>
-            </a:r>
-            <a:endParaRPr lang="bg-BG" dirty="0"/>
-          </a:p>
-          <a:p>
-            <a:pPr marL="0" indent="0">
-              <a:buNone/>
-            </a:pPr>
-            <a:r>
-              <a:rPr lang="bg-BG" dirty="0"/>
-              <a:t>   Пример:</a:t>
+                  <a:schemeClr val="tx1"/>
+                </a:solidFill>
+              </a:rPr>
+              <a:t>Пример:</a:t>
             </a:r>
           </a:p>
           <a:p>
@@ -15745,6 +15780,9 @@
             <a:pPr algn="ctr"/>
             <a:r>
               <a:rPr lang="en-US" dirty="0">
+                <a:solidFill>
+                  <a:schemeClr val="tx1"/>
+                </a:solidFill>
                 <a:latin typeface="Arial" panose="020B0604020202020204" pitchFamily="34" charset="0"/>
                 <a:cs typeface="Arial" panose="020B0604020202020204" pitchFamily="34" charset="0"/>
               </a:rPr>
@@ -15793,6 +15831,9 @@
             </a:r>
             <a:r>
               <a:rPr lang="bg-BG" dirty="0">
+                <a:solidFill>
+                  <a:schemeClr val="tx1"/>
+                </a:solidFill>
                 <a:latin typeface="Arial" panose="020B0604020202020204" pitchFamily="34" charset="0"/>
                 <a:cs typeface="Arial" panose="020B0604020202020204" pitchFamily="34" charset="0"/>
               </a:rPr>
@@ -15843,6 +15884,9 @@
           <a:p>
             <a:r>
               <a:rPr lang="bg-BG" dirty="0">
+                <a:solidFill>
+                  <a:schemeClr val="tx1"/>
+                </a:solidFill>
                 <a:latin typeface="Arial" panose="020B0604020202020204" pitchFamily="34" charset="0"/>
                 <a:cs typeface="Arial" panose="020B0604020202020204" pitchFamily="34" charset="0"/>
               </a:rPr>
@@ -15863,12 +15907,25 @@
                 <a:latin typeface="Arial" panose="020B0604020202020204" pitchFamily="34" charset="0"/>
                 <a:cs typeface="Arial" panose="020B0604020202020204" pitchFamily="34" charset="0"/>
               </a:rPr>
-              <a:t> (не могат да се повтарят)</a:t>
-            </a:r>
-          </a:p>
-          <a:p>
+              <a:t> </a:t>
+            </a:r>
             <a:r>
               <a:rPr lang="bg-BG" dirty="0">
+                <a:solidFill>
+                  <a:schemeClr val="tx1"/>
+                </a:solidFill>
+                <a:latin typeface="Arial" panose="020B0604020202020204" pitchFamily="34" charset="0"/>
+                <a:cs typeface="Arial" panose="020B0604020202020204" pitchFamily="34" charset="0"/>
+              </a:rPr>
+              <a:t>(не могат да се повтарят)</a:t>
+            </a:r>
+          </a:p>
+          <a:p>
+            <a:r>
+              <a:rPr lang="bg-BG" dirty="0">
+                <a:solidFill>
+                  <a:schemeClr val="tx1"/>
+                </a:solidFill>
                 <a:latin typeface="Arial" panose="020B0604020202020204" pitchFamily="34" charset="0"/>
                 <a:cs typeface="Arial" panose="020B0604020202020204" pitchFamily="34" charset="0"/>
               </a:rPr>
@@ -15924,7 +15981,24 @@
                 <a:latin typeface="Arial" panose="020B0604020202020204" pitchFamily="34" charset="0"/>
                 <a:cs typeface="Arial" panose="020B0604020202020204" pitchFamily="34" charset="0"/>
               </a:rPr>
-              <a:t> = new </a:t>
+              <a:t> = </a:t>
+            </a:r>
+            <a:r>
+              <a:rPr lang="en-US" dirty="0">
+                <a:solidFill>
+                  <a:schemeClr val="tx1"/>
+                </a:solidFill>
+                <a:latin typeface="Arial" panose="020B0604020202020204" pitchFamily="34" charset="0"/>
+                <a:cs typeface="Arial" panose="020B0604020202020204" pitchFamily="34" charset="0"/>
+              </a:rPr>
+              <a:t>new</a:t>
+            </a:r>
+            <a:r>
+              <a:rPr lang="en-US" dirty="0">
+                <a:latin typeface="Arial" panose="020B0604020202020204" pitchFamily="34" charset="0"/>
+                <a:cs typeface="Arial" panose="020B0604020202020204" pitchFamily="34" charset="0"/>
+              </a:rPr>
+              <a:t> </a:t>
             </a:r>
             <a:r>
               <a:rPr lang="en-US" dirty="0">
@@ -16709,6 +16783,9 @@
             <a:pPr algn="ctr"/>
             <a:r>
               <a:rPr lang="en-US" dirty="0" err="1">
+                <a:solidFill>
+                  <a:schemeClr val="tx1"/>
+                </a:solidFill>
                 <a:latin typeface="Arial" panose="020B0604020202020204" pitchFamily="34" charset="0"/>
                 <a:cs typeface="Arial" panose="020B0604020202020204" pitchFamily="34" charset="0"/>
               </a:rPr>
@@ -16716,6 +16793,9 @@
             </a:r>
             <a:r>
               <a:rPr lang="en-US" dirty="0">
+                <a:solidFill>
+                  <a:schemeClr val="tx1"/>
+                </a:solidFill>
                 <a:latin typeface="Arial" panose="020B0604020202020204" pitchFamily="34" charset="0"/>
                 <a:cs typeface="Arial" panose="020B0604020202020204" pitchFamily="34" charset="0"/>
               </a:rPr>
@@ -16749,6 +16829,9 @@
           <a:p>
             <a:r>
               <a:rPr lang="bg-BG" dirty="0">
+                <a:solidFill>
+                  <a:schemeClr val="tx1"/>
+                </a:solidFill>
                 <a:latin typeface="Arial" panose="020B0604020202020204" pitchFamily="34" charset="0"/>
                 <a:cs typeface="Arial" panose="020B0604020202020204" pitchFamily="34" charset="0"/>
               </a:rPr>
@@ -16804,7 +16887,24 @@
                 <a:latin typeface="Arial" panose="020B0604020202020204" pitchFamily="34" charset="0"/>
                 <a:cs typeface="Arial" panose="020B0604020202020204" pitchFamily="34" charset="0"/>
               </a:rPr>
-              <a:t> = new </a:t>
+              <a:t> = </a:t>
+            </a:r>
+            <a:r>
+              <a:rPr lang="en-US" dirty="0">
+                <a:solidFill>
+                  <a:schemeClr val="tx1"/>
+                </a:solidFill>
+                <a:latin typeface="Arial" panose="020B0604020202020204" pitchFamily="34" charset="0"/>
+                <a:cs typeface="Arial" panose="020B0604020202020204" pitchFamily="34" charset="0"/>
+              </a:rPr>
+              <a:t>new</a:t>
+            </a:r>
+            <a:r>
+              <a:rPr lang="en-US" dirty="0">
+                <a:latin typeface="Arial" panose="020B0604020202020204" pitchFamily="34" charset="0"/>
+                <a:cs typeface="Arial" panose="020B0604020202020204" pitchFamily="34" charset="0"/>
+              </a:rPr>
+              <a:t> </a:t>
             </a:r>
             <a:r>
               <a:rPr lang="en-US" dirty="0" err="1">
@@ -17207,12 +17307,18 @@
             <a:pPr algn="ctr"/>
             <a:r>
               <a:rPr lang="bg-BG" dirty="0">
+                <a:solidFill>
+                  <a:schemeClr val="tx1"/>
+                </a:solidFill>
                 <a:latin typeface="Arial" panose="020B0604020202020204" pitchFamily="34" charset="0"/>
                 <a:cs typeface="Arial" panose="020B0604020202020204" pitchFamily="34" charset="0"/>
               </a:rPr>
               <a:t>Основни методи за работа</a:t>
             </a:r>
             <a:endParaRPr lang="en-US" dirty="0">
+              <a:solidFill>
+                <a:schemeClr val="tx1"/>
+              </a:solidFill>
               <a:latin typeface="Arial" panose="020B0604020202020204" pitchFamily="34" charset="0"/>
               <a:cs typeface="Arial" panose="020B0604020202020204" pitchFamily="34" charset="0"/>
             </a:endParaRPr>
@@ -18701,6 +18807,799 @@
     <p:extLst>
       <p:ext uri="{BB962C8B-B14F-4D97-AF65-F5344CB8AC3E}">
         <p14:creationId xmlns:p14="http://schemas.microsoft.com/office/powerpoint/2010/main" val="2170094764"/>
+      </p:ext>
+    </p:extLst>
+  </p:cSld>
+  <p:clrMapOvr>
+    <a:masterClrMapping/>
+  </p:clrMapOvr>
+</p:sld>
+</file>
+
+<file path=ppt/slides/slide33.xml><?xml version="1.0" encoding="utf-8"?>
+<p:sld xmlns:a="http://schemas.openxmlformats.org/drawingml/2006/main" xmlns:r="http://schemas.openxmlformats.org/officeDocument/2006/relationships" xmlns:p="http://schemas.openxmlformats.org/presentationml/2006/main">
+  <p:cSld>
+    <p:spTree>
+      <p:nvGrpSpPr>
+        <p:cNvPr id="1" name=""/>
+        <p:cNvGrpSpPr/>
+        <p:nvPr/>
+      </p:nvGrpSpPr>
+      <p:grpSpPr>
+        <a:xfrm>
+          <a:off x="0" y="0"/>
+          <a:ext cx="0" cy="0"/>
+          <a:chOff x="0" y="0"/>
+          <a:chExt cx="0" cy="0"/>
+        </a:xfrm>
+      </p:grpSpPr>
+      <p:sp>
+        <p:nvSpPr>
+          <p:cNvPr id="2" name="Заглавие 1">
+            <a:extLst>
+              <a:ext uri="{FF2B5EF4-FFF2-40B4-BE49-F238E27FC236}">
+                <a16:creationId xmlns:a16="http://schemas.microsoft.com/office/drawing/2014/main" id="{823B6529-A2A6-1B5D-B08F-7544E4E484D2}"/>
+              </a:ext>
+            </a:extLst>
+          </p:cNvPr>
+          <p:cNvSpPr>
+            <a:spLocks noGrp="1"/>
+          </p:cNvSpPr>
+          <p:nvPr>
+            <p:ph type="title"/>
+          </p:nvPr>
+        </p:nvSpPr>
+        <p:spPr/>
+        <p:txBody>
+          <a:bodyPr/>
+          <a:lstStyle/>
+          <a:p>
+            <a:pPr algn="ctr"/>
+            <a:r>
+              <a:rPr lang="en-US" dirty="0">
+                <a:solidFill>
+                  <a:schemeClr val="tx1"/>
+                </a:solidFill>
+                <a:latin typeface="Arial" panose="020B0604020202020204" pitchFamily="34" charset="0"/>
+                <a:cs typeface="Arial" panose="020B0604020202020204" pitchFamily="34" charset="0"/>
+              </a:rPr>
+              <a:t>Foreach </a:t>
+            </a:r>
+            <a:r>
+              <a:rPr lang="bg-BG" dirty="0">
+                <a:solidFill>
+                  <a:schemeClr val="tx1"/>
+                </a:solidFill>
+                <a:latin typeface="Arial" panose="020B0604020202020204" pitchFamily="34" charset="0"/>
+                <a:cs typeface="Arial" panose="020B0604020202020204" pitchFamily="34" charset="0"/>
+              </a:rPr>
+              <a:t>цикъл</a:t>
+            </a:r>
+            <a:r>
+              <a:rPr lang="en-US" dirty="0">
+                <a:solidFill>
+                  <a:schemeClr val="tx1"/>
+                </a:solidFill>
+                <a:latin typeface="Arial" panose="020B0604020202020204" pitchFamily="34" charset="0"/>
+                <a:cs typeface="Arial" panose="020B0604020202020204" pitchFamily="34" charset="0"/>
+              </a:rPr>
+              <a:t> (</a:t>
+            </a:r>
+            <a:r>
+              <a:rPr lang="en-US" dirty="0" err="1">
+                <a:solidFill>
+                  <a:srgbClr val="FFFF00"/>
+                </a:solidFill>
+                <a:latin typeface="Arial" panose="020B0604020202020204" pitchFamily="34" charset="0"/>
+                <a:cs typeface="Arial" panose="020B0604020202020204" pitchFamily="34" charset="0"/>
+              </a:rPr>
+              <a:t>readonly</a:t>
+            </a:r>
+            <a:r>
+              <a:rPr lang="en-US" dirty="0">
+                <a:solidFill>
+                  <a:schemeClr val="tx1"/>
+                </a:solidFill>
+                <a:latin typeface="Arial" panose="020B0604020202020204" pitchFamily="34" charset="0"/>
+                <a:cs typeface="Arial" panose="020B0604020202020204" pitchFamily="34" charset="0"/>
+              </a:rPr>
+              <a:t>)</a:t>
+            </a:r>
+          </a:p>
+        </p:txBody>
+      </p:sp>
+      <p:sp>
+        <p:nvSpPr>
+          <p:cNvPr id="3" name="Контейнер за съдържание 2">
+            <a:extLst>
+              <a:ext uri="{FF2B5EF4-FFF2-40B4-BE49-F238E27FC236}">
+                <a16:creationId xmlns:a16="http://schemas.microsoft.com/office/drawing/2014/main" id="{1D4E7415-93FB-DB69-DD0C-8ECF32769562}"/>
+              </a:ext>
+            </a:extLst>
+          </p:cNvPr>
+          <p:cNvSpPr>
+            <a:spLocks noGrp="1"/>
+          </p:cNvSpPr>
+          <p:nvPr>
+            <p:ph idx="1"/>
+          </p:nvPr>
+        </p:nvSpPr>
+        <p:spPr/>
+        <p:txBody>
+          <a:bodyPr/>
+          <a:lstStyle/>
+          <a:p>
+            <a:pPr marL="0" indent="0">
+              <a:buNone/>
+            </a:pPr>
+            <a:r>
+              <a:rPr lang="bg-BG" sz="1600" dirty="0">
+                <a:solidFill>
+                  <a:schemeClr val="tx1"/>
+                </a:solidFill>
+                <a:latin typeface="Consolas" panose="020B0609020204030204" pitchFamily="49" charset="0"/>
+              </a:rPr>
+              <a:t>    </a:t>
+            </a:r>
+          </a:p>
+          <a:p>
+            <a:pPr marL="457200" lvl="1" indent="0">
+              <a:buNone/>
+            </a:pPr>
+            <a:r>
+              <a:rPr lang="bg-BG" sz="1200" dirty="0">
+                <a:solidFill>
+                  <a:schemeClr val="tx1"/>
+                </a:solidFill>
+                <a:latin typeface="Consolas" panose="020B0609020204030204" pitchFamily="49" charset="0"/>
+              </a:rPr>
+              <a:t>   </a:t>
+            </a:r>
+            <a:r>
+              <a:rPr lang="nn-NO" sz="1600" dirty="0">
+                <a:solidFill>
+                  <a:schemeClr val="tx1"/>
+                </a:solidFill>
+                <a:latin typeface="Consolas" panose="020B0609020204030204" pitchFamily="49" charset="0"/>
+              </a:rPr>
+              <a:t>foreach (</a:t>
+            </a:r>
+            <a:r>
+              <a:rPr lang="en-US" sz="1600" dirty="0">
+                <a:solidFill>
+                  <a:schemeClr val="tx1"/>
+                </a:solidFill>
+                <a:latin typeface="Consolas" panose="020B0609020204030204" pitchFamily="49" charset="0"/>
+              </a:rPr>
+              <a:t>var </a:t>
+            </a:r>
+            <a:r>
+              <a:rPr lang="en-US" sz="1600" dirty="0">
+                <a:solidFill>
+                  <a:srgbClr val="00B0F0"/>
+                </a:solidFill>
+                <a:latin typeface="Consolas" panose="020B0609020204030204" pitchFamily="49" charset="0"/>
+              </a:rPr>
+              <a:t>item</a:t>
+            </a:r>
+            <a:r>
+              <a:rPr lang="en-US" sz="1600" dirty="0">
+                <a:solidFill>
+                  <a:schemeClr val="tx1"/>
+                </a:solidFill>
+                <a:latin typeface="Consolas" panose="020B0609020204030204" pitchFamily="49" charset="0"/>
+              </a:rPr>
+              <a:t> in </a:t>
+            </a:r>
+            <a:r>
+              <a:rPr lang="en-US" sz="1600" dirty="0">
+                <a:solidFill>
+                  <a:srgbClr val="92D050"/>
+                </a:solidFill>
+                <a:latin typeface="Consolas" panose="020B0609020204030204" pitchFamily="49" charset="0"/>
+              </a:rPr>
+              <a:t>items</a:t>
+            </a:r>
+            <a:r>
+              <a:rPr lang="nn-NO" sz="1600" dirty="0">
+                <a:solidFill>
+                  <a:schemeClr val="tx1"/>
+                </a:solidFill>
+                <a:latin typeface="Consolas" panose="020B0609020204030204" pitchFamily="49" charset="0"/>
+              </a:rPr>
+              <a:t>)</a:t>
+            </a:r>
+          </a:p>
+          <a:p>
+            <a:pPr marL="457200" lvl="1" indent="0">
+              <a:buNone/>
+            </a:pPr>
+            <a:r>
+              <a:rPr lang="bg-BG" sz="1600" dirty="0">
+                <a:solidFill>
+                  <a:schemeClr val="tx1"/>
+                </a:solidFill>
+                <a:latin typeface="Consolas" panose="020B0609020204030204" pitchFamily="49" charset="0"/>
+              </a:rPr>
+              <a:t>  {</a:t>
+            </a:r>
+            <a:endParaRPr lang="bg-BG" sz="1600" dirty="0">
+              <a:solidFill>
+                <a:schemeClr val="tx2">
+                  <a:lumMod val="60000"/>
+                  <a:lumOff val="40000"/>
+                </a:schemeClr>
+              </a:solidFill>
+              <a:latin typeface="Consolas" panose="020B0609020204030204" pitchFamily="49" charset="0"/>
+            </a:endParaRPr>
+          </a:p>
+          <a:p>
+            <a:pPr marL="457200" lvl="1" indent="0">
+              <a:buNone/>
+            </a:pPr>
+            <a:r>
+              <a:rPr lang="en-US" sz="1600" dirty="0">
+                <a:solidFill>
+                  <a:schemeClr val="tx2">
+                    <a:lumMod val="60000"/>
+                    <a:lumOff val="40000"/>
+                  </a:schemeClr>
+                </a:solidFill>
+                <a:latin typeface="Consolas" panose="020B0609020204030204" pitchFamily="49" charset="0"/>
+              </a:rPr>
+              <a:t> </a:t>
+            </a:r>
+            <a:r>
+              <a:rPr lang="bg-BG" sz="1600" dirty="0">
+                <a:solidFill>
+                  <a:schemeClr val="tx2">
+                    <a:lumMod val="60000"/>
+                    <a:lumOff val="40000"/>
+                  </a:schemeClr>
+                </a:solidFill>
+                <a:latin typeface="Consolas" panose="020B0609020204030204" pitchFamily="49" charset="0"/>
+              </a:rPr>
+              <a:t>	</a:t>
+            </a:r>
+            <a:r>
+              <a:rPr lang="en-US" sz="1600" dirty="0">
+                <a:solidFill>
+                  <a:schemeClr val="tx2">
+                    <a:lumMod val="60000"/>
+                    <a:lumOff val="40000"/>
+                  </a:schemeClr>
+                </a:solidFill>
+                <a:latin typeface="Consolas" panose="020B0609020204030204" pitchFamily="49" charset="0"/>
+              </a:rPr>
+              <a:t> </a:t>
+            </a:r>
+            <a:r>
+              <a:rPr lang="en-US" sz="1600" dirty="0" err="1">
+                <a:latin typeface="Consolas" panose="020B0609020204030204" pitchFamily="49" charset="0"/>
+              </a:rPr>
+              <a:t>Console.WriteLine</a:t>
+            </a:r>
+            <a:r>
+              <a:rPr lang="en-US" sz="1600" dirty="0">
+                <a:solidFill>
+                  <a:schemeClr val="tx2">
+                    <a:lumMod val="60000"/>
+                    <a:lumOff val="40000"/>
+                  </a:schemeClr>
+                </a:solidFill>
+                <a:latin typeface="Consolas" panose="020B0609020204030204" pitchFamily="49" charset="0"/>
+              </a:rPr>
+              <a:t>(</a:t>
+            </a:r>
+            <a:r>
+              <a:rPr lang="en-US" sz="1600" dirty="0">
+                <a:solidFill>
+                  <a:srgbClr val="00B0F0"/>
+                </a:solidFill>
+                <a:latin typeface="Consolas" panose="020B0609020204030204" pitchFamily="49" charset="0"/>
+              </a:rPr>
+              <a:t>item</a:t>
+            </a:r>
+            <a:r>
+              <a:rPr lang="nn-NO" sz="1600" dirty="0">
+                <a:latin typeface="Consolas" panose="020B0609020204030204" pitchFamily="49" charset="0"/>
+              </a:rPr>
+              <a:t>);</a:t>
+            </a:r>
+            <a:endParaRPr lang="en-US" sz="1600" dirty="0">
+              <a:latin typeface="Consolas" panose="020B0609020204030204" pitchFamily="49" charset="0"/>
+            </a:endParaRPr>
+          </a:p>
+          <a:p>
+            <a:pPr marL="457200" lvl="1" indent="0">
+              <a:buNone/>
+            </a:pPr>
+            <a:r>
+              <a:rPr lang="bg-BG" sz="1600" dirty="0">
+                <a:solidFill>
+                  <a:schemeClr val="tx1"/>
+                </a:solidFill>
+                <a:latin typeface="Consolas" panose="020B0609020204030204" pitchFamily="49" charset="0"/>
+              </a:rPr>
+              <a:t>  }</a:t>
+            </a:r>
+          </a:p>
+          <a:p>
+            <a:endParaRPr lang="en-US" dirty="0"/>
+          </a:p>
+        </p:txBody>
+      </p:sp>
+      <p:sp>
+        <p:nvSpPr>
+          <p:cNvPr id="4" name="Текстово поле 3">
+            <a:extLst>
+              <a:ext uri="{FF2B5EF4-FFF2-40B4-BE49-F238E27FC236}">
+                <a16:creationId xmlns:a16="http://schemas.microsoft.com/office/drawing/2014/main" id="{AE5A3457-7F48-7769-4A57-6947DE2C0F45}"/>
+              </a:ext>
+            </a:extLst>
+          </p:cNvPr>
+          <p:cNvSpPr txBox="1"/>
+          <p:nvPr/>
+        </p:nvSpPr>
+        <p:spPr>
+          <a:xfrm>
+            <a:off x="1442065" y="1690688"/>
+            <a:ext cx="4177500" cy="707886"/>
+          </a:xfrm>
+          <a:prstGeom prst="rect">
+            <a:avLst/>
+          </a:prstGeom>
+          <a:noFill/>
+        </p:spPr>
+        <p:txBody>
+          <a:bodyPr wrap="square" rtlCol="0">
+            <a:spAutoFit/>
+          </a:bodyPr>
+          <a:lstStyle/>
+          <a:p>
+            <a:r>
+              <a:rPr lang="bg-BG" dirty="0">
+                <a:latin typeface="Arial" panose="020B0604020202020204" pitchFamily="34" charset="0"/>
+                <a:cs typeface="Arial" panose="020B0604020202020204" pitchFamily="34" charset="0"/>
+              </a:rPr>
+              <a:t> </a:t>
+            </a:r>
+            <a:r>
+              <a:rPr lang="bg-BG" sz="2000" dirty="0" err="1">
+                <a:latin typeface="Arial" panose="020B0604020202020204" pitchFamily="34" charset="0"/>
+                <a:cs typeface="Arial" panose="020B0604020202020204" pitchFamily="34" charset="0"/>
+              </a:rPr>
+              <a:t>итериране</a:t>
+            </a:r>
+            <a:r>
+              <a:rPr lang="bg-BG" sz="2000" dirty="0">
+                <a:latin typeface="Arial" panose="020B0604020202020204" pitchFamily="34" charset="0"/>
+                <a:cs typeface="Arial" panose="020B0604020202020204" pitchFamily="34" charset="0"/>
+              </a:rPr>
+              <a:t> върху </a:t>
+            </a:r>
+            <a:r>
+              <a:rPr lang="en-US" sz="2000" dirty="0">
+                <a:solidFill>
+                  <a:srgbClr val="FFC000"/>
+                </a:solidFill>
+                <a:latin typeface="Arial" panose="020B0604020202020204" pitchFamily="34" charset="0"/>
+                <a:cs typeface="Arial" panose="020B0604020202020204" pitchFamily="34" charset="0"/>
+              </a:rPr>
+              <a:t>List </a:t>
+            </a:r>
+            <a:r>
+              <a:rPr lang="bg-BG" sz="2000" dirty="0">
+                <a:latin typeface="Arial" panose="020B0604020202020204" pitchFamily="34" charset="0"/>
+                <a:cs typeface="Arial" panose="020B0604020202020204" pitchFamily="34" charset="0"/>
+              </a:rPr>
+              <a:t>или</a:t>
+            </a:r>
+            <a:r>
+              <a:rPr lang="bg-BG" sz="2000" dirty="0">
+                <a:solidFill>
+                  <a:srgbClr val="FFC000"/>
+                </a:solidFill>
+                <a:latin typeface="Arial" panose="020B0604020202020204" pitchFamily="34" charset="0"/>
+                <a:cs typeface="Arial" panose="020B0604020202020204" pitchFamily="34" charset="0"/>
+              </a:rPr>
+              <a:t> </a:t>
+            </a:r>
+            <a:r>
+              <a:rPr lang="en-US" sz="2000" dirty="0">
+                <a:solidFill>
+                  <a:srgbClr val="FFC000"/>
+                </a:solidFill>
+                <a:latin typeface="Arial" panose="020B0604020202020204" pitchFamily="34" charset="0"/>
+                <a:cs typeface="Arial" panose="020B0604020202020204" pitchFamily="34" charset="0"/>
+              </a:rPr>
+              <a:t>Array</a:t>
+            </a:r>
+          </a:p>
+          <a:p>
+            <a:endParaRPr lang="en-US" sz="2000" dirty="0">
+              <a:solidFill>
+                <a:srgbClr val="FFC000"/>
+              </a:solidFill>
+              <a:latin typeface="Arial" panose="020B0604020202020204" pitchFamily="34" charset="0"/>
+              <a:cs typeface="Arial" panose="020B0604020202020204" pitchFamily="34" charset="0"/>
+            </a:endParaRPr>
+          </a:p>
+        </p:txBody>
+      </p:sp>
+      <p:sp>
+        <p:nvSpPr>
+          <p:cNvPr id="5" name="Текстово поле 4">
+            <a:extLst>
+              <a:ext uri="{FF2B5EF4-FFF2-40B4-BE49-F238E27FC236}">
+                <a16:creationId xmlns:a16="http://schemas.microsoft.com/office/drawing/2014/main" id="{271DDA71-DA43-0632-B567-61161E3C48C3}"/>
+              </a:ext>
+            </a:extLst>
+          </p:cNvPr>
+          <p:cNvSpPr txBox="1"/>
+          <p:nvPr/>
+        </p:nvSpPr>
+        <p:spPr>
+          <a:xfrm>
+            <a:off x="1442064" y="4001294"/>
+            <a:ext cx="8980319" cy="2000548"/>
+          </a:xfrm>
+          <a:prstGeom prst="rect">
+            <a:avLst/>
+          </a:prstGeom>
+          <a:noFill/>
+        </p:spPr>
+        <p:txBody>
+          <a:bodyPr wrap="square" rtlCol="0">
+            <a:spAutoFit/>
+          </a:bodyPr>
+          <a:lstStyle/>
+          <a:p>
+            <a:pPr marL="457200" lvl="1" indent="0">
+              <a:buNone/>
+            </a:pPr>
+            <a:r>
+              <a:rPr lang="bg-BG" dirty="0">
+                <a:latin typeface="Arial" panose="020B0604020202020204" pitchFamily="34" charset="0"/>
+                <a:cs typeface="Arial" panose="020B0604020202020204" pitchFamily="34" charset="0"/>
+              </a:rPr>
+              <a:t> </a:t>
+            </a:r>
+            <a:r>
+              <a:rPr lang="bg-BG" sz="2000" dirty="0" err="1">
+                <a:latin typeface="Arial" panose="020B0604020202020204" pitchFamily="34" charset="0"/>
+                <a:cs typeface="Arial" panose="020B0604020202020204" pitchFamily="34" charset="0"/>
+              </a:rPr>
+              <a:t>итериране</a:t>
+            </a:r>
+            <a:r>
+              <a:rPr lang="bg-BG" sz="2000" dirty="0">
+                <a:latin typeface="Arial" panose="020B0604020202020204" pitchFamily="34" charset="0"/>
+                <a:cs typeface="Arial" panose="020B0604020202020204" pitchFamily="34" charset="0"/>
+              </a:rPr>
+              <a:t> върху </a:t>
+            </a:r>
+            <a:r>
+              <a:rPr lang="en-US" sz="2000" dirty="0">
+                <a:solidFill>
+                  <a:srgbClr val="FFC000"/>
+                </a:solidFill>
+                <a:latin typeface="Arial" panose="020B0604020202020204" pitchFamily="34" charset="0"/>
+                <a:cs typeface="Arial" panose="020B0604020202020204" pitchFamily="34" charset="0"/>
+              </a:rPr>
+              <a:t>Dictionary</a:t>
+            </a:r>
+            <a:r>
+              <a:rPr lang="bg-BG" sz="2000" dirty="0">
+                <a:solidFill>
+                  <a:srgbClr val="FFC000"/>
+                </a:solidFill>
+                <a:latin typeface="Arial" panose="020B0604020202020204" pitchFamily="34" charset="0"/>
+                <a:cs typeface="Arial" panose="020B0604020202020204" pitchFamily="34" charset="0"/>
+              </a:rPr>
+              <a:t> </a:t>
+            </a:r>
+            <a:r>
+              <a:rPr lang="bg-BG" sz="2000" dirty="0">
+                <a:latin typeface="Arial" panose="020B0604020202020204" pitchFamily="34" charset="0"/>
+                <a:cs typeface="Arial" panose="020B0604020202020204" pitchFamily="34" charset="0"/>
+              </a:rPr>
+              <a:t>или</a:t>
+            </a:r>
+            <a:r>
+              <a:rPr lang="en-US" sz="2000" dirty="0">
+                <a:solidFill>
+                  <a:srgbClr val="FFC000"/>
+                </a:solidFill>
+                <a:latin typeface="Arial" panose="020B0604020202020204" pitchFamily="34" charset="0"/>
+                <a:cs typeface="Arial" panose="020B0604020202020204" pitchFamily="34" charset="0"/>
+              </a:rPr>
+              <a:t> </a:t>
+            </a:r>
+            <a:r>
+              <a:rPr lang="en-US" sz="2000" dirty="0" err="1">
+                <a:solidFill>
+                  <a:srgbClr val="FFC000"/>
+                </a:solidFill>
+                <a:latin typeface="Arial" panose="020B0604020202020204" pitchFamily="34" charset="0"/>
+                <a:cs typeface="Arial" panose="020B0604020202020204" pitchFamily="34" charset="0"/>
+              </a:rPr>
+              <a:t>SortedDictionary</a:t>
+            </a:r>
+            <a:endParaRPr lang="en-US" sz="2000" dirty="0">
+              <a:solidFill>
+                <a:srgbClr val="FFC000"/>
+              </a:solidFill>
+              <a:latin typeface="Arial" panose="020B0604020202020204" pitchFamily="34" charset="0"/>
+              <a:cs typeface="Arial" panose="020B0604020202020204" pitchFamily="34" charset="0"/>
+            </a:endParaRPr>
+          </a:p>
+          <a:p>
+            <a:pPr marL="457200" lvl="1" indent="0">
+              <a:buNone/>
+            </a:pPr>
+            <a:endParaRPr lang="en-US" sz="2000" dirty="0">
+              <a:solidFill>
+                <a:srgbClr val="FFC000"/>
+              </a:solidFill>
+              <a:latin typeface="Arial" panose="020B0604020202020204" pitchFamily="34" charset="0"/>
+              <a:cs typeface="Arial" panose="020B0604020202020204" pitchFamily="34" charset="0"/>
+            </a:endParaRPr>
+          </a:p>
+          <a:p>
+            <a:pPr marL="457200" lvl="1" indent="0">
+              <a:buNone/>
+            </a:pPr>
+            <a:r>
+              <a:rPr lang="nn-NO" sz="1600" dirty="0">
+                <a:solidFill>
+                  <a:schemeClr val="tx1"/>
+                </a:solidFill>
+                <a:latin typeface="Consolas" panose="020B0609020204030204" pitchFamily="49" charset="0"/>
+              </a:rPr>
+              <a:t>foreach (</a:t>
+            </a:r>
+            <a:r>
+              <a:rPr lang="en-US" sz="1600" dirty="0">
+                <a:solidFill>
+                  <a:schemeClr val="tx1"/>
+                </a:solidFill>
+                <a:latin typeface="Consolas" panose="020B0609020204030204" pitchFamily="49" charset="0"/>
+              </a:rPr>
+              <a:t>var </a:t>
+            </a:r>
+            <a:r>
+              <a:rPr lang="en-US" sz="1600" dirty="0">
+                <a:solidFill>
+                  <a:srgbClr val="00B0F0"/>
+                </a:solidFill>
+                <a:latin typeface="Consolas" panose="020B0609020204030204" pitchFamily="49" charset="0"/>
+              </a:rPr>
+              <a:t>item</a:t>
+            </a:r>
+            <a:r>
+              <a:rPr lang="en-US" sz="1600" dirty="0">
+                <a:solidFill>
+                  <a:schemeClr val="tx1"/>
+                </a:solidFill>
+                <a:latin typeface="Consolas" panose="020B0609020204030204" pitchFamily="49" charset="0"/>
+              </a:rPr>
+              <a:t> in </a:t>
+            </a:r>
+            <a:r>
+              <a:rPr lang="en-US" sz="1600" dirty="0">
+                <a:solidFill>
+                  <a:srgbClr val="92D050"/>
+                </a:solidFill>
+                <a:latin typeface="Consolas" panose="020B0609020204030204" pitchFamily="49" charset="0"/>
+              </a:rPr>
+              <a:t>items</a:t>
+            </a:r>
+            <a:r>
+              <a:rPr lang="nn-NO" sz="1600" dirty="0">
+                <a:solidFill>
+                  <a:schemeClr val="tx1"/>
+                </a:solidFill>
+                <a:latin typeface="Consolas" panose="020B0609020204030204" pitchFamily="49" charset="0"/>
+              </a:rPr>
+              <a:t>)</a:t>
+            </a:r>
+          </a:p>
+          <a:p>
+            <a:pPr marL="457200" lvl="1" indent="0">
+              <a:buNone/>
+            </a:pPr>
+            <a:r>
+              <a:rPr lang="bg-BG" sz="1600" dirty="0">
+                <a:solidFill>
+                  <a:schemeClr val="tx1"/>
+                </a:solidFill>
+                <a:latin typeface="Consolas" panose="020B0609020204030204" pitchFamily="49" charset="0"/>
+              </a:rPr>
+              <a:t>  {</a:t>
+            </a:r>
+            <a:endParaRPr lang="bg-BG" sz="1600" dirty="0">
+              <a:solidFill>
+                <a:schemeClr val="tx2">
+                  <a:lumMod val="60000"/>
+                  <a:lumOff val="40000"/>
+                </a:schemeClr>
+              </a:solidFill>
+              <a:latin typeface="Consolas" panose="020B0609020204030204" pitchFamily="49" charset="0"/>
+            </a:endParaRPr>
+          </a:p>
+          <a:p>
+            <a:pPr marL="457200" lvl="1" indent="0">
+              <a:buNone/>
+            </a:pPr>
+            <a:r>
+              <a:rPr lang="en-US" sz="1600" dirty="0">
+                <a:solidFill>
+                  <a:schemeClr val="tx2">
+                    <a:lumMod val="60000"/>
+                    <a:lumOff val="40000"/>
+                  </a:schemeClr>
+                </a:solidFill>
+                <a:latin typeface="Consolas" panose="020B0609020204030204" pitchFamily="49" charset="0"/>
+              </a:rPr>
+              <a:t> </a:t>
+            </a:r>
+            <a:r>
+              <a:rPr lang="bg-BG" sz="1600" dirty="0">
+                <a:solidFill>
+                  <a:schemeClr val="tx2">
+                    <a:lumMod val="60000"/>
+                    <a:lumOff val="40000"/>
+                  </a:schemeClr>
+                </a:solidFill>
+                <a:latin typeface="Consolas" panose="020B0609020204030204" pitchFamily="49" charset="0"/>
+              </a:rPr>
+              <a:t>	</a:t>
+            </a:r>
+            <a:r>
+              <a:rPr lang="en-US" sz="1600" dirty="0">
+                <a:solidFill>
+                  <a:schemeClr val="tx2">
+                    <a:lumMod val="60000"/>
+                    <a:lumOff val="40000"/>
+                  </a:schemeClr>
+                </a:solidFill>
+                <a:latin typeface="Consolas" panose="020B0609020204030204" pitchFamily="49" charset="0"/>
+              </a:rPr>
+              <a:t> </a:t>
+            </a:r>
+            <a:r>
+              <a:rPr lang="en-US" sz="1600" dirty="0" err="1">
+                <a:latin typeface="Consolas" panose="020B0609020204030204" pitchFamily="49" charset="0"/>
+              </a:rPr>
+              <a:t>Console.WriteLine</a:t>
+            </a:r>
+            <a:r>
+              <a:rPr lang="en-US" sz="1600" dirty="0">
+                <a:solidFill>
+                  <a:schemeClr val="tx2">
+                    <a:lumMod val="60000"/>
+                    <a:lumOff val="40000"/>
+                  </a:schemeClr>
+                </a:solidFill>
+                <a:latin typeface="Consolas" panose="020B0609020204030204" pitchFamily="49" charset="0"/>
+              </a:rPr>
+              <a:t>(</a:t>
+            </a:r>
+            <a:r>
+              <a:rPr lang="en-US" sz="1600" dirty="0">
+                <a:latin typeface="Consolas" panose="020B0609020204030204" pitchFamily="49" charset="0"/>
+              </a:rPr>
+              <a:t>$“Key: {</a:t>
+            </a:r>
+            <a:r>
+              <a:rPr lang="en-US" sz="1600" dirty="0" err="1">
+                <a:solidFill>
+                  <a:srgbClr val="00B0F0"/>
+                </a:solidFill>
+                <a:latin typeface="Consolas" panose="020B0609020204030204" pitchFamily="49" charset="0"/>
+              </a:rPr>
+              <a:t>item</a:t>
+            </a:r>
+            <a:r>
+              <a:rPr lang="en-US" sz="1600" dirty="0" err="1">
+                <a:latin typeface="Consolas" panose="020B0609020204030204" pitchFamily="49" charset="0"/>
+              </a:rPr>
+              <a:t>.</a:t>
+            </a:r>
+            <a:r>
+              <a:rPr lang="en-US" sz="1600" dirty="0" err="1">
+                <a:solidFill>
+                  <a:srgbClr val="FFC000"/>
+                </a:solidFill>
+                <a:latin typeface="Consolas" panose="020B0609020204030204" pitchFamily="49" charset="0"/>
+              </a:rPr>
+              <a:t>Key</a:t>
+            </a:r>
+            <a:r>
+              <a:rPr lang="en-US" sz="1600" dirty="0">
+                <a:latin typeface="Consolas" panose="020B0609020204030204" pitchFamily="49" charset="0"/>
+              </a:rPr>
+              <a:t>} and Value: {</a:t>
+            </a:r>
+            <a:r>
+              <a:rPr lang="en-US" sz="1600" dirty="0" err="1">
+                <a:solidFill>
+                  <a:srgbClr val="00B0F0"/>
+                </a:solidFill>
+                <a:latin typeface="Consolas" panose="020B0609020204030204" pitchFamily="49" charset="0"/>
+              </a:rPr>
+              <a:t>item</a:t>
+            </a:r>
+            <a:r>
+              <a:rPr lang="en-US" sz="1600" dirty="0" err="1">
+                <a:latin typeface="Consolas" panose="020B0609020204030204" pitchFamily="49" charset="0"/>
+              </a:rPr>
+              <a:t>.</a:t>
+            </a:r>
+            <a:r>
+              <a:rPr lang="en-US" sz="1600" dirty="0" err="1">
+                <a:solidFill>
+                  <a:srgbClr val="FFC000"/>
+                </a:solidFill>
+                <a:latin typeface="Consolas" panose="020B0609020204030204" pitchFamily="49" charset="0"/>
+              </a:rPr>
+              <a:t>Value</a:t>
+            </a:r>
+            <a:r>
+              <a:rPr lang="en-US" sz="1600" dirty="0">
+                <a:latin typeface="Consolas" panose="020B0609020204030204" pitchFamily="49" charset="0"/>
+              </a:rPr>
+              <a:t>}</a:t>
+            </a:r>
+            <a:r>
+              <a:rPr lang="en-US" sz="1600" dirty="0">
+                <a:solidFill>
+                  <a:srgbClr val="00B0F0"/>
+                </a:solidFill>
+                <a:latin typeface="Consolas" panose="020B0609020204030204" pitchFamily="49" charset="0"/>
+              </a:rPr>
+              <a:t> </a:t>
+            </a:r>
+            <a:r>
+              <a:rPr lang="nn-NO" sz="1600" dirty="0">
+                <a:latin typeface="Consolas" panose="020B0609020204030204" pitchFamily="49" charset="0"/>
+              </a:rPr>
+              <a:t>);</a:t>
+            </a:r>
+            <a:endParaRPr lang="en-US" sz="1600" dirty="0">
+              <a:latin typeface="Consolas" panose="020B0609020204030204" pitchFamily="49" charset="0"/>
+            </a:endParaRPr>
+          </a:p>
+          <a:p>
+            <a:pPr marL="457200" lvl="1" indent="0">
+              <a:buNone/>
+            </a:pPr>
+            <a:r>
+              <a:rPr lang="bg-BG" sz="1600" dirty="0">
+                <a:solidFill>
+                  <a:schemeClr val="tx1"/>
+                </a:solidFill>
+                <a:latin typeface="Consolas" panose="020B0609020204030204" pitchFamily="49" charset="0"/>
+              </a:rPr>
+              <a:t>  }</a:t>
+            </a:r>
+          </a:p>
+          <a:p>
+            <a:endParaRPr lang="en-US" sz="2000" dirty="0">
+              <a:solidFill>
+                <a:srgbClr val="FFC000"/>
+              </a:solidFill>
+              <a:latin typeface="Arial" panose="020B0604020202020204" pitchFamily="34" charset="0"/>
+              <a:cs typeface="Arial" panose="020B0604020202020204" pitchFamily="34" charset="0"/>
+            </a:endParaRPr>
+          </a:p>
+        </p:txBody>
+      </p:sp>
+    </p:spTree>
+    <p:extLst>
+      <p:ext uri="{BB962C8B-B14F-4D97-AF65-F5344CB8AC3E}">
+        <p14:creationId xmlns:p14="http://schemas.microsoft.com/office/powerpoint/2010/main" val="4059067575"/>
       </p:ext>
     </p:extLst>
   </p:cSld>

</xml_diff>

<commit_message>
LINQ + Lambda expression
</commit_message>
<xml_diff>
--- a/C# Intermediate.pptx
+++ b/C# Intermediate.pptx
@@ -38,6 +38,16 @@
     <p:sldId id="287" r:id="rId32"/>
     <p:sldId id="289" r:id="rId33"/>
     <p:sldId id="290" r:id="rId34"/>
+    <p:sldId id="291" r:id="rId35"/>
+    <p:sldId id="292" r:id="rId36"/>
+    <p:sldId id="301" r:id="rId37"/>
+    <p:sldId id="293" r:id="rId38"/>
+    <p:sldId id="294" r:id="rId39"/>
+    <p:sldId id="295" r:id="rId40"/>
+    <p:sldId id="298" r:id="rId41"/>
+    <p:sldId id="297" r:id="rId42"/>
+    <p:sldId id="299" r:id="rId43"/>
+    <p:sldId id="300" r:id="rId44"/>
   </p:sldIdLst>
   <p:sldSz cx="12192000" cy="6858000"/>
   <p:notesSz cx="6858000" cy="9144000"/>
@@ -340,7 +350,7 @@
           <a:p>
             <a:fld id="{0BD89023-946D-4914-A444-F66256F52110}" type="datetimeFigureOut">
               <a:rPr lang="bg-BG" smtClean="0"/>
-              <a:t>20.11.2022 г.</a:t>
+              <a:t>26.11.2022 г.</a:t>
             </a:fld>
             <a:endParaRPr lang="bg-BG"/>
           </a:p>
@@ -621,7 +631,7 @@
           <a:p>
             <a:fld id="{0BD89023-946D-4914-A444-F66256F52110}" type="datetimeFigureOut">
               <a:rPr lang="bg-BG" smtClean="0"/>
-              <a:t>20.11.2022 г.</a:t>
+              <a:t>26.11.2022 г.</a:t>
             </a:fld>
             <a:endParaRPr lang="bg-BG"/>
           </a:p>
@@ -813,7 +823,7 @@
           <a:p>
             <a:fld id="{0BD89023-946D-4914-A444-F66256F52110}" type="datetimeFigureOut">
               <a:rPr lang="bg-BG" smtClean="0"/>
-              <a:t>20.11.2022 г.</a:t>
+              <a:t>26.11.2022 г.</a:t>
             </a:fld>
             <a:endParaRPr lang="bg-BG"/>
           </a:p>
@@ -1074,7 +1084,7 @@
           <a:p>
             <a:fld id="{0BD89023-946D-4914-A444-F66256F52110}" type="datetimeFigureOut">
               <a:rPr lang="bg-BG" smtClean="0"/>
-              <a:t>20.11.2022 г.</a:t>
+              <a:t>26.11.2022 г.</a:t>
             </a:fld>
             <a:endParaRPr lang="bg-BG"/>
           </a:p>
@@ -1500,7 +1510,7 @@
           <a:p>
             <a:fld id="{0BD89023-946D-4914-A444-F66256F52110}" type="datetimeFigureOut">
               <a:rPr lang="bg-BG" smtClean="0"/>
-              <a:t>20.11.2022 г.</a:t>
+              <a:t>26.11.2022 г.</a:t>
             </a:fld>
             <a:endParaRPr lang="bg-BG"/>
           </a:p>
@@ -2046,7 +2056,7 @@
           <a:p>
             <a:fld id="{0BD89023-946D-4914-A444-F66256F52110}" type="datetimeFigureOut">
               <a:rPr lang="bg-BG" smtClean="0"/>
-              <a:t>20.11.2022 г.</a:t>
+              <a:t>26.11.2022 г.</a:t>
             </a:fld>
             <a:endParaRPr lang="bg-BG"/>
           </a:p>
@@ -2877,7 +2887,7 @@
           <a:p>
             <a:fld id="{0BD89023-946D-4914-A444-F66256F52110}" type="datetimeFigureOut">
               <a:rPr lang="bg-BG" smtClean="0"/>
-              <a:t>20.11.2022 г.</a:t>
+              <a:t>26.11.2022 г.</a:t>
             </a:fld>
             <a:endParaRPr lang="bg-BG"/>
           </a:p>
@@ -3047,7 +3057,7 @@
           <a:p>
             <a:fld id="{0BD89023-946D-4914-A444-F66256F52110}" type="datetimeFigureOut">
               <a:rPr lang="bg-BG" smtClean="0"/>
-              <a:t>20.11.2022 г.</a:t>
+              <a:t>26.11.2022 г.</a:t>
             </a:fld>
             <a:endParaRPr lang="bg-BG"/>
           </a:p>
@@ -3227,7 +3237,7 @@
           <a:p>
             <a:fld id="{0BD89023-946D-4914-A444-F66256F52110}" type="datetimeFigureOut">
               <a:rPr lang="bg-BG" smtClean="0"/>
-              <a:t>20.11.2022 г.</a:t>
+              <a:t>26.11.2022 г.</a:t>
             </a:fld>
             <a:endParaRPr lang="bg-BG"/>
           </a:p>
@@ -3397,7 +3407,7 @@
           <a:p>
             <a:fld id="{0BD89023-946D-4914-A444-F66256F52110}" type="datetimeFigureOut">
               <a:rPr lang="bg-BG" smtClean="0"/>
-              <a:t>20.11.2022 г.</a:t>
+              <a:t>26.11.2022 г.</a:t>
             </a:fld>
             <a:endParaRPr lang="bg-BG"/>
           </a:p>
@@ -3654,7 +3664,7 @@
           <a:p>
             <a:fld id="{0BD89023-946D-4914-A444-F66256F52110}" type="datetimeFigureOut">
               <a:rPr lang="bg-BG" smtClean="0"/>
-              <a:t>20.11.2022 г.</a:t>
+              <a:t>26.11.2022 г.</a:t>
             </a:fld>
             <a:endParaRPr lang="bg-BG"/>
           </a:p>
@@ -3886,7 +3896,7 @@
           <a:p>
             <a:fld id="{0BD89023-946D-4914-A444-F66256F52110}" type="datetimeFigureOut">
               <a:rPr lang="bg-BG" smtClean="0"/>
-              <a:t>20.11.2022 г.</a:t>
+              <a:t>26.11.2022 г.</a:t>
             </a:fld>
             <a:endParaRPr lang="bg-BG"/>
           </a:p>
@@ -4279,7 +4289,7 @@
           <a:p>
             <a:fld id="{0BD89023-946D-4914-A444-F66256F52110}" type="datetimeFigureOut">
               <a:rPr lang="bg-BG" smtClean="0"/>
-              <a:t>20.11.2022 г.</a:t>
+              <a:t>26.11.2022 г.</a:t>
             </a:fld>
             <a:endParaRPr lang="bg-BG"/>
           </a:p>
@@ -4397,7 +4407,7 @@
           <a:p>
             <a:fld id="{0BD89023-946D-4914-A444-F66256F52110}" type="datetimeFigureOut">
               <a:rPr lang="bg-BG" smtClean="0"/>
-              <a:t>20.11.2022 г.</a:t>
+              <a:t>26.11.2022 г.</a:t>
             </a:fld>
             <a:endParaRPr lang="bg-BG"/>
           </a:p>
@@ -4492,7 +4502,7 @@
           <a:p>
             <a:fld id="{0BD89023-946D-4914-A444-F66256F52110}" type="datetimeFigureOut">
               <a:rPr lang="bg-BG" smtClean="0"/>
-              <a:t>20.11.2022 г.</a:t>
+              <a:t>26.11.2022 г.</a:t>
             </a:fld>
             <a:endParaRPr lang="bg-BG"/>
           </a:p>
@@ -4765,7 +4775,7 @@
           <a:p>
             <a:fld id="{0BD89023-946D-4914-A444-F66256F52110}" type="datetimeFigureOut">
               <a:rPr lang="bg-BG" smtClean="0"/>
-              <a:t>20.11.2022 г.</a:t>
+              <a:t>26.11.2022 г.</a:t>
             </a:fld>
             <a:endParaRPr lang="bg-BG"/>
           </a:p>
@@ -5046,7 +5056,7 @@
           <a:p>
             <a:fld id="{0BD89023-946D-4914-A444-F66256F52110}" type="datetimeFigureOut">
               <a:rPr lang="bg-BG" smtClean="0"/>
-              <a:t>20.11.2022 г.</a:t>
+              <a:t>26.11.2022 г.</a:t>
             </a:fld>
             <a:endParaRPr lang="bg-BG"/>
           </a:p>
@@ -5286,7 +5296,7 @@
           <a:p>
             <a:fld id="{0BD89023-946D-4914-A444-F66256F52110}" type="datetimeFigureOut">
               <a:rPr lang="bg-BG" smtClean="0"/>
-              <a:t>20.11.2022 г.</a:t>
+              <a:t>26.11.2022 г.</a:t>
             </a:fld>
             <a:endParaRPr lang="bg-BG"/>
           </a:p>
@@ -18875,36 +18885,13 @@
               </a:rPr>
               <a:t>цикъл</a:t>
             </a:r>
-            <a:r>
-              <a:rPr lang="en-US" dirty="0">
-                <a:solidFill>
-                  <a:schemeClr val="tx1"/>
-                </a:solidFill>
-                <a:latin typeface="Arial" panose="020B0604020202020204" pitchFamily="34" charset="0"/>
-                <a:cs typeface="Arial" panose="020B0604020202020204" pitchFamily="34" charset="0"/>
-              </a:rPr>
-              <a:t> (</a:t>
-            </a:r>
-            <a:r>
-              <a:rPr lang="en-US" dirty="0" err="1">
-                <a:solidFill>
-                  <a:srgbClr val="FFFF00"/>
-                </a:solidFill>
-                <a:latin typeface="Arial" panose="020B0604020202020204" pitchFamily="34" charset="0"/>
-                <a:cs typeface="Arial" panose="020B0604020202020204" pitchFamily="34" charset="0"/>
-              </a:rPr>
-              <a:t>readonly</a:t>
-            </a:r>
-            <a:r>
-              <a:rPr lang="en-US" dirty="0">
-                <a:solidFill>
-                  <a:schemeClr val="tx1"/>
-                </a:solidFill>
-                <a:latin typeface="Arial" panose="020B0604020202020204" pitchFamily="34" charset="0"/>
-                <a:cs typeface="Arial" panose="020B0604020202020204" pitchFamily="34" charset="0"/>
-              </a:rPr>
-              <a:t>)</a:t>
-            </a:r>
+            <a:endParaRPr lang="en-US" dirty="0">
+              <a:solidFill>
+                <a:schemeClr val="tx1"/>
+              </a:solidFill>
+              <a:latin typeface="Arial" panose="020B0604020202020204" pitchFamily="34" charset="0"/>
+              <a:cs typeface="Arial" panose="020B0604020202020204" pitchFamily="34" charset="0"/>
+            </a:endParaRPr>
           </a:p>
         </p:txBody>
       </p:sp>
@@ -18924,9 +18911,16 @@
             <p:ph idx="1"/>
           </p:nvPr>
         </p:nvSpPr>
-        <p:spPr/>
+        <p:spPr>
+          <a:xfrm>
+            <a:off x="1879120" y="2153806"/>
+            <a:ext cx="4786223" cy="1384369"/>
+          </a:xfrm>
+        </p:spPr>
         <p:txBody>
-          <a:bodyPr/>
+          <a:bodyPr>
+            <a:normAutofit lnSpcReduction="10000"/>
+          </a:bodyPr>
           <a:lstStyle/>
           <a:p>
             <a:pPr marL="0" indent="0">
@@ -19144,7 +19138,7 @@
         <p:spPr>
           <a:xfrm>
             <a:off x="1442065" y="1690688"/>
-            <a:ext cx="4177500" cy="707886"/>
+            <a:ext cx="5321044" cy="707886"/>
           </a:xfrm>
           <a:prstGeom prst="rect">
             <a:avLst/>
@@ -19165,7 +19159,14 @@
               <a:t> </a:t>
             </a:r>
             <a:r>
-              <a:rPr lang="bg-BG" sz="2000" dirty="0" err="1">
+              <a:rPr lang="en-US">
+                <a:latin typeface="Arial" panose="020B0604020202020204" pitchFamily="34" charset="0"/>
+                <a:cs typeface="Arial" panose="020B0604020202020204" pitchFamily="34" charset="0"/>
+              </a:rPr>
+              <a:t>     </a:t>
+            </a:r>
+            <a:r>
+              <a:rPr lang="bg-BG" sz="2000">
                 <a:latin typeface="Arial" panose="020B0604020202020204" pitchFamily="34" charset="0"/>
                 <a:cs typeface="Arial" panose="020B0604020202020204" pitchFamily="34" charset="0"/>
               </a:rPr>
@@ -19241,7 +19242,7 @@
         </p:nvSpPr>
         <p:spPr>
           <a:xfrm>
-            <a:off x="1442064" y="4001294"/>
+            <a:off x="2083043" y="4001293"/>
             <a:ext cx="8980319" cy="2000548"/>
           </a:xfrm>
           <a:prstGeom prst="rect">
@@ -19265,67 +19266,6 @@
               </a:rPr>
               <a:t> </a:t>
             </a:r>
-            <a:r>
-              <a:rPr lang="bg-BG" sz="2000" dirty="0" err="1">
-                <a:latin typeface="Arial" panose="020B0604020202020204" pitchFamily="34" charset="0"/>
-                <a:cs typeface="Arial" panose="020B0604020202020204" pitchFamily="34" charset="0"/>
-              </a:rPr>
-              <a:t>итериране</a:t>
-            </a:r>
-            <a:r>
-              <a:rPr lang="bg-BG" sz="2000" dirty="0">
-                <a:latin typeface="Arial" panose="020B0604020202020204" pitchFamily="34" charset="0"/>
-                <a:cs typeface="Arial" panose="020B0604020202020204" pitchFamily="34" charset="0"/>
-              </a:rPr>
-              <a:t> върху </a:t>
-            </a:r>
-            <a:r>
-              <a:rPr lang="en-US" sz="2000" dirty="0">
-                <a:solidFill>
-                  <a:srgbClr val="FFC000"/>
-                </a:solidFill>
-                <a:latin typeface="Arial" panose="020B0604020202020204" pitchFamily="34" charset="0"/>
-                <a:cs typeface="Arial" panose="020B0604020202020204" pitchFamily="34" charset="0"/>
-              </a:rPr>
-              <a:t>Dictionary</a:t>
-            </a:r>
-            <a:r>
-              <a:rPr lang="bg-BG" sz="2000" dirty="0">
-                <a:solidFill>
-                  <a:srgbClr val="FFC000"/>
-                </a:solidFill>
-                <a:latin typeface="Arial" panose="020B0604020202020204" pitchFamily="34" charset="0"/>
-                <a:cs typeface="Arial" panose="020B0604020202020204" pitchFamily="34" charset="0"/>
-              </a:rPr>
-              <a:t> </a:t>
-            </a:r>
-            <a:r>
-              <a:rPr lang="bg-BG" sz="2000" dirty="0">
-                <a:latin typeface="Arial" panose="020B0604020202020204" pitchFamily="34" charset="0"/>
-                <a:cs typeface="Arial" panose="020B0604020202020204" pitchFamily="34" charset="0"/>
-              </a:rPr>
-              <a:t>или</a:t>
-            </a:r>
-            <a:r>
-              <a:rPr lang="en-US" sz="2000" dirty="0">
-                <a:solidFill>
-                  <a:srgbClr val="FFC000"/>
-                </a:solidFill>
-                <a:latin typeface="Arial" panose="020B0604020202020204" pitchFamily="34" charset="0"/>
-                <a:cs typeface="Arial" panose="020B0604020202020204" pitchFamily="34" charset="0"/>
-              </a:rPr>
-              <a:t> </a:t>
-            </a:r>
-            <a:r>
-              <a:rPr lang="en-US" sz="2000" dirty="0" err="1">
-                <a:solidFill>
-                  <a:srgbClr val="FFC000"/>
-                </a:solidFill>
-                <a:latin typeface="Arial" panose="020B0604020202020204" pitchFamily="34" charset="0"/>
-                <a:cs typeface="Arial" panose="020B0604020202020204" pitchFamily="34" charset="0"/>
-              </a:rPr>
-              <a:t>SortedDictionary</a:t>
-            </a:r>
             <a:endParaRPr lang="en-US" sz="2000" dirty="0">
               <a:solidFill>
                 <a:srgbClr val="FFC000"/>
@@ -19416,7 +19356,7 @@
                 </a:solidFill>
                 <a:latin typeface="Consolas" panose="020B0609020204030204" pitchFamily="49" charset="0"/>
               </a:rPr>
-              <a:t>  {</a:t>
+              <a:t>{</a:t>
             </a:r>
             <a:endParaRPr lang="bg-BG" sz="1600" dirty="0">
               <a:solidFill>
@@ -19442,10 +19382,16 @@
                 </a:solidFill>
                 <a:latin typeface="Consolas" panose="020B0609020204030204" pitchFamily="49" charset="0"/>
               </a:rPr>
-              <a:t> </a:t>
-            </a:r>
-            <a:r>
-              <a:rPr lang="bg-BG" sz="1600" dirty="0">
+              <a:t>    </a:t>
+            </a:r>
+            <a:r>
+              <a:rPr lang="en-US" sz="1600" dirty="0" err="1">
+                <a:latin typeface="Consolas" panose="020B0609020204030204" pitchFamily="49" charset="0"/>
+              </a:rPr>
+              <a:t>Console.WriteLine</a:t>
+            </a:r>
+            <a:r>
+              <a:rPr lang="en-US" sz="1600" dirty="0">
                 <a:solidFill>
                   <a:schemeClr val="tx2">
                     <a:lumMod val="60000"/>
@@ -19454,36 +19400,6 @@
                 </a:solidFill>
                 <a:latin typeface="Consolas" panose="020B0609020204030204" pitchFamily="49" charset="0"/>
               </a:rPr>
-              <a:t>	</a:t>
-            </a:r>
-            <a:r>
-              <a:rPr lang="en-US" sz="1600" dirty="0">
-                <a:solidFill>
-                  <a:schemeClr val="tx2">
-                    <a:lumMod val="60000"/>
-                    <a:lumOff val="40000"/>
-                  </a:schemeClr>
-                </a:solidFill>
-                <a:latin typeface="Consolas" panose="020B0609020204030204" pitchFamily="49" charset="0"/>
-              </a:rPr>
-              <a:t> </a:t>
-            </a:r>
-            <a:r>
-              <a:rPr lang="en-US" sz="1600" dirty="0" err="1">
-                <a:latin typeface="Consolas" panose="020B0609020204030204" pitchFamily="49" charset="0"/>
-              </a:rPr>
-              <a:t>Console.WriteLine</a:t>
-            </a:r>
-            <a:r>
-              <a:rPr lang="en-US" sz="1600" dirty="0">
-                <a:solidFill>
-                  <a:schemeClr val="tx2">
-                    <a:lumMod val="60000"/>
-                    <a:lumOff val="40000"/>
-                  </a:schemeClr>
-                </a:solidFill>
-                <a:latin typeface="Consolas" panose="020B0609020204030204" pitchFamily="49" charset="0"/>
-              </a:rPr>
               <a:t>(</a:t>
             </a:r>
             <a:r>
@@ -19582,7 +19498,7 @@
                 </a:solidFill>
                 <a:latin typeface="Consolas" panose="020B0609020204030204" pitchFamily="49" charset="0"/>
               </a:rPr>
-              <a:t>  }</a:t>
+              <a:t>}</a:t>
             </a:r>
           </a:p>
           <a:p>
@@ -19596,10 +19512,1892 @@
           </a:p>
         </p:txBody>
       </p:sp>
+      <p:sp>
+        <p:nvSpPr>
+          <p:cNvPr id="6" name="Текстово поле 3">
+            <a:extLst>
+              <a:ext uri="{FF2B5EF4-FFF2-40B4-BE49-F238E27FC236}">
+                <a16:creationId xmlns:a16="http://schemas.microsoft.com/office/drawing/2014/main" id="{881DCF3B-082C-4A5F-27F1-0C450B1C8A2F}"/>
+              </a:ext>
+            </a:extLst>
+          </p:cNvPr>
+          <p:cNvSpPr txBox="1"/>
+          <p:nvPr/>
+        </p:nvSpPr>
+        <p:spPr>
+          <a:xfrm>
+            <a:off x="1344299" y="4001293"/>
+            <a:ext cx="5321044" cy="707886"/>
+          </a:xfrm>
+          <a:prstGeom prst="rect">
+            <a:avLst/>
+          </a:prstGeom>
+          <a:noFill/>
+        </p:spPr>
+        <p:txBody>
+          <a:bodyPr wrap="square" rtlCol="0">
+            <a:spAutoFit/>
+          </a:bodyPr>
+          <a:lstStyle/>
+          <a:p>
+            <a:r>
+              <a:rPr lang="bg-BG" dirty="0">
+                <a:latin typeface="Arial" panose="020B0604020202020204" pitchFamily="34" charset="0"/>
+                <a:cs typeface="Arial" panose="020B0604020202020204" pitchFamily="34" charset="0"/>
+              </a:rPr>
+              <a:t> 	</a:t>
+            </a:r>
+            <a:r>
+              <a:rPr lang="bg-BG" sz="2000" dirty="0" err="1">
+                <a:latin typeface="Arial" panose="020B0604020202020204" pitchFamily="34" charset="0"/>
+                <a:cs typeface="Arial" panose="020B0604020202020204" pitchFamily="34" charset="0"/>
+              </a:rPr>
+              <a:t>итериране</a:t>
+            </a:r>
+            <a:r>
+              <a:rPr lang="bg-BG" sz="2000" dirty="0">
+                <a:latin typeface="Arial" panose="020B0604020202020204" pitchFamily="34" charset="0"/>
+                <a:cs typeface="Arial" panose="020B0604020202020204" pitchFamily="34" charset="0"/>
+              </a:rPr>
+              <a:t> върху </a:t>
+            </a:r>
+            <a:r>
+              <a:rPr lang="en-US" sz="2000" dirty="0">
+                <a:solidFill>
+                  <a:srgbClr val="FFC000"/>
+                </a:solidFill>
+                <a:latin typeface="Arial" panose="020B0604020202020204" pitchFamily="34" charset="0"/>
+                <a:cs typeface="Arial" panose="020B0604020202020204" pitchFamily="34" charset="0"/>
+              </a:rPr>
+              <a:t>Dictionary</a:t>
+            </a:r>
+          </a:p>
+          <a:p>
+            <a:endParaRPr lang="en-US" sz="2000" dirty="0">
+              <a:solidFill>
+                <a:srgbClr val="FFC000"/>
+              </a:solidFill>
+              <a:latin typeface="Arial" panose="020B0604020202020204" pitchFamily="34" charset="0"/>
+              <a:cs typeface="Arial" panose="020B0604020202020204" pitchFamily="34" charset="0"/>
+            </a:endParaRPr>
+          </a:p>
+        </p:txBody>
+      </p:sp>
     </p:spTree>
     <p:extLst>
       <p:ext uri="{BB962C8B-B14F-4D97-AF65-F5344CB8AC3E}">
         <p14:creationId xmlns:p14="http://schemas.microsoft.com/office/powerpoint/2010/main" val="4059067575"/>
+      </p:ext>
+    </p:extLst>
+  </p:cSld>
+  <p:clrMapOvr>
+    <a:masterClrMapping/>
+  </p:clrMapOvr>
+</p:sld>
+</file>
+
+<file path=ppt/slides/slide34.xml><?xml version="1.0" encoding="utf-8"?>
+<p:sld xmlns:a="http://schemas.openxmlformats.org/drawingml/2006/main" xmlns:r="http://schemas.openxmlformats.org/officeDocument/2006/relationships" xmlns:p="http://schemas.openxmlformats.org/presentationml/2006/main">
+  <p:cSld>
+    <p:spTree>
+      <p:nvGrpSpPr>
+        <p:cNvPr id="1" name=""/>
+        <p:cNvGrpSpPr/>
+        <p:nvPr/>
+      </p:nvGrpSpPr>
+      <p:grpSpPr>
+        <a:xfrm>
+          <a:off x="0" y="0"/>
+          <a:ext cx="0" cy="0"/>
+          <a:chOff x="0" y="0"/>
+          <a:chExt cx="0" cy="0"/>
+        </a:xfrm>
+      </p:grpSpPr>
+      <p:sp>
+        <p:nvSpPr>
+          <p:cNvPr id="2" name="Title 1">
+            <a:extLst>
+              <a:ext uri="{FF2B5EF4-FFF2-40B4-BE49-F238E27FC236}">
+                <a16:creationId xmlns:a16="http://schemas.microsoft.com/office/drawing/2014/main" id="{327B17AE-3DE5-0580-CA23-2823E268666B}"/>
+              </a:ext>
+            </a:extLst>
+          </p:cNvPr>
+          <p:cNvSpPr>
+            <a:spLocks noGrp="1"/>
+          </p:cNvSpPr>
+          <p:nvPr>
+            <p:ph type="title"/>
+          </p:nvPr>
+        </p:nvSpPr>
+        <p:spPr/>
+        <p:txBody>
+          <a:bodyPr>
+            <a:normAutofit fontScale="90000"/>
+          </a:bodyPr>
+          <a:lstStyle/>
+          <a:p>
+            <a:pPr algn="ctr"/>
+            <a:r>
+              <a:rPr lang="en-US" dirty="0">
+                <a:solidFill>
+                  <a:schemeClr val="tx1"/>
+                </a:solidFill>
+                <a:latin typeface="Arial" panose="020B0604020202020204" pitchFamily="34" charset="0"/>
+                <a:cs typeface="Arial" panose="020B0604020202020204" pitchFamily="34" charset="0"/>
+              </a:rPr>
+              <a:t>LINQ (Language-Integrated Query)</a:t>
+            </a:r>
+            <a:br>
+              <a:rPr lang="en-US" dirty="0">
+                <a:solidFill>
+                  <a:schemeClr val="tx1"/>
+                </a:solidFill>
+                <a:latin typeface="Arial" panose="020B0604020202020204" pitchFamily="34" charset="0"/>
+                <a:cs typeface="Arial" panose="020B0604020202020204" pitchFamily="34" charset="0"/>
+              </a:rPr>
+            </a:br>
+            <a:r>
+              <a:rPr lang="en-US" dirty="0">
+                <a:solidFill>
+                  <a:schemeClr val="tx1"/>
+                </a:solidFill>
+                <a:latin typeface="Arial" panose="020B0604020202020204" pitchFamily="34" charset="0"/>
+                <a:cs typeface="Arial" panose="020B0604020202020204" pitchFamily="34" charset="0"/>
+              </a:rPr>
+              <a:t>/basics/</a:t>
+            </a:r>
+            <a:endParaRPr lang="bg-BG" dirty="0">
+              <a:solidFill>
+                <a:schemeClr val="tx1"/>
+              </a:solidFill>
+              <a:latin typeface="Arial" panose="020B0604020202020204" pitchFamily="34" charset="0"/>
+              <a:cs typeface="Arial" panose="020B0604020202020204" pitchFamily="34" charset="0"/>
+            </a:endParaRPr>
+          </a:p>
+        </p:txBody>
+      </p:sp>
+      <p:sp>
+        <p:nvSpPr>
+          <p:cNvPr id="3" name="Content Placeholder 2">
+            <a:extLst>
+              <a:ext uri="{FF2B5EF4-FFF2-40B4-BE49-F238E27FC236}">
+                <a16:creationId xmlns:a16="http://schemas.microsoft.com/office/drawing/2014/main" id="{E4F5C4C9-73BB-E5B9-A1C9-2AE7CB214690}"/>
+              </a:ext>
+            </a:extLst>
+          </p:cNvPr>
+          <p:cNvSpPr>
+            <a:spLocks noGrp="1"/>
+          </p:cNvSpPr>
+          <p:nvPr>
+            <p:ph idx="1"/>
+          </p:nvPr>
+        </p:nvSpPr>
+        <p:spPr>
+          <a:xfrm>
+            <a:off x="1059615" y="2222440"/>
+            <a:ext cx="10233800" cy="4351338"/>
+          </a:xfrm>
+        </p:spPr>
+        <p:txBody>
+          <a:bodyPr/>
+          <a:lstStyle/>
+          <a:p>
+            <a:pPr>
+              <a:buClr>
+                <a:schemeClr val="tx1"/>
+              </a:buClr>
+            </a:pPr>
+            <a:r>
+              <a:rPr lang="en-US" dirty="0">
+                <a:solidFill>
+                  <a:srgbClr val="FFFF00"/>
+                </a:solidFill>
+              </a:rPr>
+              <a:t>LINQ</a:t>
+            </a:r>
+            <a:r>
+              <a:rPr lang="en-US" dirty="0"/>
+              <a:t> </a:t>
+            </a:r>
+            <a:r>
+              <a:rPr lang="bg-BG" dirty="0">
+                <a:solidFill>
+                  <a:schemeClr val="tx1"/>
+                </a:solidFill>
+              </a:rPr>
+              <a:t>е набор от технологии, които ни дават възможност да правим заявки към различни източници на данни директно</a:t>
+            </a:r>
+            <a:r>
+              <a:rPr lang="en-US" dirty="0">
+                <a:solidFill>
+                  <a:schemeClr val="tx1"/>
+                </a:solidFill>
+              </a:rPr>
+              <a:t> </a:t>
+            </a:r>
+            <a:r>
+              <a:rPr lang="bg-BG" dirty="0">
+                <a:solidFill>
+                  <a:schemeClr val="tx1"/>
+                </a:solidFill>
+              </a:rPr>
+              <a:t>чрез езика </a:t>
+            </a:r>
+            <a:r>
+              <a:rPr lang="en-US" dirty="0">
+                <a:solidFill>
+                  <a:schemeClr val="tx1"/>
+                </a:solidFill>
+              </a:rPr>
+              <a:t>C#</a:t>
+            </a:r>
+            <a:r>
+              <a:rPr lang="bg-BG" dirty="0">
+                <a:solidFill>
+                  <a:schemeClr val="tx1"/>
+                </a:solidFill>
+              </a:rPr>
+              <a:t>.</a:t>
+            </a:r>
+          </a:p>
+          <a:p>
+            <a:endParaRPr lang="bg-BG" dirty="0">
+              <a:latin typeface="Arial" panose="020B0604020202020204" pitchFamily="34" charset="0"/>
+              <a:cs typeface="Arial" panose="020B0604020202020204" pitchFamily="34" charset="0"/>
+            </a:endParaRPr>
+          </a:p>
+          <a:p>
+            <a:r>
+              <a:rPr lang="bg-BG" dirty="0">
+                <a:solidFill>
+                  <a:schemeClr val="tx1"/>
+                </a:solidFill>
+                <a:latin typeface="Arial" panose="020B0604020202020204" pitchFamily="34" charset="0"/>
+                <a:cs typeface="Arial" panose="020B0604020202020204" pitchFamily="34" charset="0"/>
+              </a:rPr>
+              <a:t>Има два основни начина, по които можем да работим с </a:t>
+            </a:r>
+            <a:r>
+              <a:rPr lang="en-US" dirty="0">
+                <a:latin typeface="Arial" panose="020B0604020202020204" pitchFamily="34" charset="0"/>
+                <a:cs typeface="Arial" panose="020B0604020202020204" pitchFamily="34" charset="0"/>
+              </a:rPr>
+              <a:t>LINQ:</a:t>
+            </a:r>
+          </a:p>
+          <a:p>
+            <a:pPr lvl="1">
+              <a:buFont typeface="Wingdings" panose="05000000000000000000" pitchFamily="2" charset="2"/>
+              <a:buChar char="§"/>
+            </a:pPr>
+            <a:r>
+              <a:rPr lang="en-US" dirty="0">
+                <a:latin typeface="Arial" panose="020B0604020202020204" pitchFamily="34" charset="0"/>
+                <a:cs typeface="Arial" panose="020B0604020202020204" pitchFamily="34" charset="0"/>
+              </a:rPr>
+              <a:t>	</a:t>
+            </a:r>
+            <a:r>
+              <a:rPr lang="en-US" dirty="0">
+                <a:solidFill>
+                  <a:srgbClr val="FFFF00"/>
+                </a:solidFill>
+                <a:latin typeface="Arial" panose="020B0604020202020204" pitchFamily="34" charset="0"/>
+                <a:cs typeface="Arial" panose="020B0604020202020204" pitchFamily="34" charset="0"/>
+              </a:rPr>
+              <a:t>Query</a:t>
+            </a:r>
+            <a:r>
+              <a:rPr lang="en-US" dirty="0">
+                <a:latin typeface="Arial" panose="020B0604020202020204" pitchFamily="34" charset="0"/>
+                <a:cs typeface="Arial" panose="020B0604020202020204" pitchFamily="34" charset="0"/>
+              </a:rPr>
+              <a:t> </a:t>
+            </a:r>
+            <a:r>
+              <a:rPr lang="en-US" dirty="0">
+                <a:solidFill>
+                  <a:schemeClr val="tx1"/>
+                </a:solidFill>
+                <a:latin typeface="Arial" panose="020B0604020202020204" pitchFamily="34" charset="0"/>
+                <a:cs typeface="Arial" panose="020B0604020202020204" pitchFamily="34" charset="0"/>
+              </a:rPr>
+              <a:t>syntax</a:t>
+            </a:r>
+          </a:p>
+          <a:p>
+            <a:pPr lvl="1">
+              <a:buFont typeface="Wingdings" panose="05000000000000000000" pitchFamily="2" charset="2"/>
+              <a:buChar char="§"/>
+            </a:pPr>
+            <a:r>
+              <a:rPr lang="en-US" dirty="0">
+                <a:latin typeface="Arial" panose="020B0604020202020204" pitchFamily="34" charset="0"/>
+                <a:cs typeface="Arial" panose="020B0604020202020204" pitchFamily="34" charset="0"/>
+              </a:rPr>
+              <a:t>   </a:t>
+            </a:r>
+            <a:r>
+              <a:rPr lang="en-US" dirty="0">
+                <a:solidFill>
+                  <a:srgbClr val="92D050"/>
+                </a:solidFill>
+                <a:latin typeface="Arial" panose="020B0604020202020204" pitchFamily="34" charset="0"/>
+                <a:cs typeface="Arial" panose="020B0604020202020204" pitchFamily="34" charset="0"/>
+              </a:rPr>
+              <a:t>Method</a:t>
+            </a:r>
+            <a:r>
+              <a:rPr lang="en-US" dirty="0">
+                <a:latin typeface="Arial" panose="020B0604020202020204" pitchFamily="34" charset="0"/>
+                <a:cs typeface="Arial" panose="020B0604020202020204" pitchFamily="34" charset="0"/>
+              </a:rPr>
+              <a:t> </a:t>
+            </a:r>
+            <a:r>
+              <a:rPr lang="en-US" dirty="0">
+                <a:solidFill>
+                  <a:schemeClr val="tx1"/>
+                </a:solidFill>
+                <a:latin typeface="Arial" panose="020B0604020202020204" pitchFamily="34" charset="0"/>
+                <a:cs typeface="Arial" panose="020B0604020202020204" pitchFamily="34" charset="0"/>
+              </a:rPr>
+              <a:t>syntax (fluent syntax)</a:t>
+            </a:r>
+            <a:r>
+              <a:rPr lang="en-US" dirty="0"/>
+              <a:t>	</a:t>
+            </a:r>
+            <a:endParaRPr lang="bg-BG" dirty="0"/>
+          </a:p>
+        </p:txBody>
+      </p:sp>
+    </p:spTree>
+    <p:extLst>
+      <p:ext uri="{BB962C8B-B14F-4D97-AF65-F5344CB8AC3E}">
+        <p14:creationId xmlns:p14="http://schemas.microsoft.com/office/powerpoint/2010/main" val="18296858"/>
+      </p:ext>
+    </p:extLst>
+  </p:cSld>
+  <p:clrMapOvr>
+    <a:masterClrMapping/>
+  </p:clrMapOvr>
+</p:sld>
+</file>
+
+<file path=ppt/slides/slide35.xml><?xml version="1.0" encoding="utf-8"?>
+<p:sld xmlns:a="http://schemas.openxmlformats.org/drawingml/2006/main" xmlns:r="http://schemas.openxmlformats.org/officeDocument/2006/relationships" xmlns:p="http://schemas.openxmlformats.org/presentationml/2006/main">
+  <p:cSld>
+    <p:spTree>
+      <p:nvGrpSpPr>
+        <p:cNvPr id="1" name=""/>
+        <p:cNvGrpSpPr/>
+        <p:nvPr/>
+      </p:nvGrpSpPr>
+      <p:grpSpPr>
+        <a:xfrm>
+          <a:off x="0" y="0"/>
+          <a:ext cx="0" cy="0"/>
+          <a:chOff x="0" y="0"/>
+          <a:chExt cx="0" cy="0"/>
+        </a:xfrm>
+      </p:grpSpPr>
+      <p:sp>
+        <p:nvSpPr>
+          <p:cNvPr id="2" name="Title 1">
+            <a:extLst>
+              <a:ext uri="{FF2B5EF4-FFF2-40B4-BE49-F238E27FC236}">
+                <a16:creationId xmlns:a16="http://schemas.microsoft.com/office/drawing/2014/main" id="{FD12AADE-E5D5-AD10-B574-D6D464D3394C}"/>
+              </a:ext>
+            </a:extLst>
+          </p:cNvPr>
+          <p:cNvSpPr>
+            <a:spLocks noGrp="1"/>
+          </p:cNvSpPr>
+          <p:nvPr>
+            <p:ph type="title"/>
+          </p:nvPr>
+        </p:nvSpPr>
+        <p:spPr/>
+        <p:txBody>
+          <a:bodyPr/>
+          <a:lstStyle/>
+          <a:p>
+            <a:pPr algn="ctr"/>
+            <a:r>
+              <a:rPr lang="bg-BG" dirty="0">
+                <a:solidFill>
+                  <a:schemeClr val="tx1"/>
+                </a:solidFill>
+                <a:latin typeface="Arial" panose="020B0604020202020204" pitchFamily="34" charset="0"/>
+                <a:cs typeface="Arial" panose="020B0604020202020204" pitchFamily="34" charset="0"/>
+              </a:rPr>
+              <a:t>Различни източници на данни</a:t>
+            </a:r>
+          </a:p>
+        </p:txBody>
+      </p:sp>
+      <p:sp>
+        <p:nvSpPr>
+          <p:cNvPr id="3" name="Content Placeholder 2">
+            <a:extLst>
+              <a:ext uri="{FF2B5EF4-FFF2-40B4-BE49-F238E27FC236}">
+                <a16:creationId xmlns:a16="http://schemas.microsoft.com/office/drawing/2014/main" id="{673674F6-3C03-CD1B-C5ED-EE5DA29777AE}"/>
+              </a:ext>
+            </a:extLst>
+          </p:cNvPr>
+          <p:cNvSpPr>
+            <a:spLocks noGrp="1"/>
+          </p:cNvSpPr>
+          <p:nvPr>
+            <p:ph idx="1"/>
+          </p:nvPr>
+        </p:nvSpPr>
+        <p:spPr/>
+        <p:txBody>
+          <a:bodyPr/>
+          <a:lstStyle/>
+          <a:p>
+            <a:pPr marL="0" indent="0">
+              <a:buNone/>
+            </a:pPr>
+            <a:endParaRPr lang="en-US" sz="3600" dirty="0">
+              <a:latin typeface="Arial" panose="020B0604020202020204" pitchFamily="34" charset="0"/>
+              <a:cs typeface="Arial" panose="020B0604020202020204" pitchFamily="34" charset="0"/>
+            </a:endParaRPr>
+          </a:p>
+          <a:p>
+            <a:pPr marL="0" indent="0">
+              <a:buNone/>
+            </a:pPr>
+            <a:endParaRPr lang="en-US" dirty="0"/>
+          </a:p>
+          <a:p>
+            <a:endParaRPr lang="bg-BG" dirty="0"/>
+          </a:p>
+        </p:txBody>
+      </p:sp>
+      <p:pic>
+        <p:nvPicPr>
+          <p:cNvPr id="5" name="Picture 4" descr="Graphical user interface, application&#10;&#10;Description automatically generated">
+            <a:extLst>
+              <a:ext uri="{FF2B5EF4-FFF2-40B4-BE49-F238E27FC236}">
+                <a16:creationId xmlns:a16="http://schemas.microsoft.com/office/drawing/2014/main" id="{BEF89C34-725D-8568-B80C-299950ECEACD}"/>
+              </a:ext>
+            </a:extLst>
+          </p:cNvPr>
+          <p:cNvPicPr>
+            <a:picLocks noChangeAspect="1"/>
+          </p:cNvPicPr>
+          <p:nvPr/>
+        </p:nvPicPr>
+        <p:blipFill>
+          <a:blip r:embed="rId2">
+            <a:extLst>
+              <a:ext uri="{28A0092B-C50C-407E-A947-70E740481C1C}">
+                <a14:useLocalDpi xmlns:a14="http://schemas.microsoft.com/office/drawing/2010/main" val="0"/>
+              </a:ext>
+            </a:extLst>
+          </a:blip>
+          <a:stretch>
+            <a:fillRect/>
+          </a:stretch>
+        </p:blipFill>
+        <p:spPr>
+          <a:xfrm>
+            <a:off x="2941608" y="2083360"/>
+            <a:ext cx="5273526" cy="4228540"/>
+          </a:xfrm>
+          <a:prstGeom prst="rect">
+            <a:avLst/>
+          </a:prstGeom>
+        </p:spPr>
+      </p:pic>
+      <p:cxnSp>
+        <p:nvCxnSpPr>
+          <p:cNvPr id="7" name="Straight Arrow Connector 6">
+            <a:extLst>
+              <a:ext uri="{FF2B5EF4-FFF2-40B4-BE49-F238E27FC236}">
+                <a16:creationId xmlns:a16="http://schemas.microsoft.com/office/drawing/2014/main" id="{63053848-A45F-AFCF-2184-905DCAE1CB6E}"/>
+              </a:ext>
+            </a:extLst>
+          </p:cNvPr>
+          <p:cNvCxnSpPr/>
+          <p:nvPr/>
+        </p:nvCxnSpPr>
+        <p:spPr>
+          <a:xfrm>
+            <a:off x="4175185" y="4001294"/>
+            <a:ext cx="655607" cy="0"/>
+          </a:xfrm>
+          <a:prstGeom prst="straightConnector1">
+            <a:avLst/>
+          </a:prstGeom>
+          <a:ln>
+            <a:solidFill>
+              <a:schemeClr val="tx1"/>
+            </a:solidFill>
+            <a:tailEnd type="triangle"/>
+          </a:ln>
+        </p:spPr>
+        <p:style>
+          <a:lnRef idx="1">
+            <a:schemeClr val="accent1"/>
+          </a:lnRef>
+          <a:fillRef idx="0">
+            <a:schemeClr val="accent1"/>
+          </a:fillRef>
+          <a:effectRef idx="0">
+            <a:schemeClr val="accent1"/>
+          </a:effectRef>
+          <a:fontRef idx="minor">
+            <a:schemeClr val="tx1"/>
+          </a:fontRef>
+        </p:style>
+      </p:cxnSp>
+      <p:cxnSp>
+        <p:nvCxnSpPr>
+          <p:cNvPr id="11" name="Straight Arrow Connector 10">
+            <a:extLst>
+              <a:ext uri="{FF2B5EF4-FFF2-40B4-BE49-F238E27FC236}">
+                <a16:creationId xmlns:a16="http://schemas.microsoft.com/office/drawing/2014/main" id="{7D9ABF99-2CEA-70A3-CDC1-B7A08994728C}"/>
+              </a:ext>
+            </a:extLst>
+          </p:cNvPr>
+          <p:cNvCxnSpPr/>
+          <p:nvPr/>
+        </p:nvCxnSpPr>
+        <p:spPr>
+          <a:xfrm>
+            <a:off x="6096000" y="4001294"/>
+            <a:ext cx="494581" cy="0"/>
+          </a:xfrm>
+          <a:prstGeom prst="straightConnector1">
+            <a:avLst/>
+          </a:prstGeom>
+          <a:ln>
+            <a:solidFill>
+              <a:schemeClr val="tx1"/>
+            </a:solidFill>
+            <a:tailEnd type="triangle"/>
+          </a:ln>
+        </p:spPr>
+        <p:style>
+          <a:lnRef idx="1">
+            <a:schemeClr val="accent1"/>
+          </a:lnRef>
+          <a:fillRef idx="0">
+            <a:schemeClr val="accent1"/>
+          </a:fillRef>
+          <a:effectRef idx="0">
+            <a:schemeClr val="accent1"/>
+          </a:effectRef>
+          <a:fontRef idx="minor">
+            <a:schemeClr val="tx1"/>
+          </a:fontRef>
+        </p:style>
+      </p:cxnSp>
+      <p:cxnSp>
+        <p:nvCxnSpPr>
+          <p:cNvPr id="13" name="Straight Arrow Connector 12">
+            <a:extLst>
+              <a:ext uri="{FF2B5EF4-FFF2-40B4-BE49-F238E27FC236}">
+                <a16:creationId xmlns:a16="http://schemas.microsoft.com/office/drawing/2014/main" id="{1B0D5E43-79EB-FDBE-F21C-C8CE17E19FFC}"/>
+              </a:ext>
+            </a:extLst>
+          </p:cNvPr>
+          <p:cNvCxnSpPr/>
+          <p:nvPr/>
+        </p:nvCxnSpPr>
+        <p:spPr>
+          <a:xfrm flipV="1">
+            <a:off x="6607834" y="2605177"/>
+            <a:ext cx="215661" cy="1207698"/>
+          </a:xfrm>
+          <a:prstGeom prst="straightConnector1">
+            <a:avLst/>
+          </a:prstGeom>
+          <a:ln>
+            <a:solidFill>
+              <a:schemeClr val="tx1"/>
+            </a:solidFill>
+            <a:tailEnd type="triangle"/>
+          </a:ln>
+        </p:spPr>
+        <p:style>
+          <a:lnRef idx="1">
+            <a:schemeClr val="accent1"/>
+          </a:lnRef>
+          <a:fillRef idx="0">
+            <a:schemeClr val="accent1"/>
+          </a:fillRef>
+          <a:effectRef idx="0">
+            <a:schemeClr val="accent1"/>
+          </a:effectRef>
+          <a:fontRef idx="minor">
+            <a:schemeClr val="tx1"/>
+          </a:fontRef>
+        </p:style>
+      </p:cxnSp>
+      <p:cxnSp>
+        <p:nvCxnSpPr>
+          <p:cNvPr id="15" name="Straight Arrow Connector 14">
+            <a:extLst>
+              <a:ext uri="{FF2B5EF4-FFF2-40B4-BE49-F238E27FC236}">
+                <a16:creationId xmlns:a16="http://schemas.microsoft.com/office/drawing/2014/main" id="{CE86E969-3346-1CAE-EA68-A8842EC940E9}"/>
+              </a:ext>
+            </a:extLst>
+          </p:cNvPr>
+          <p:cNvCxnSpPr/>
+          <p:nvPr/>
+        </p:nvCxnSpPr>
+        <p:spPr>
+          <a:xfrm flipV="1">
+            <a:off x="6633713" y="3794079"/>
+            <a:ext cx="245853" cy="138023"/>
+          </a:xfrm>
+          <a:prstGeom prst="straightConnector1">
+            <a:avLst/>
+          </a:prstGeom>
+          <a:ln>
+            <a:solidFill>
+              <a:schemeClr val="tx1"/>
+            </a:solidFill>
+            <a:tailEnd type="triangle"/>
+          </a:ln>
+        </p:spPr>
+        <p:style>
+          <a:lnRef idx="1">
+            <a:schemeClr val="accent1"/>
+          </a:lnRef>
+          <a:fillRef idx="0">
+            <a:schemeClr val="accent1"/>
+          </a:fillRef>
+          <a:effectRef idx="0">
+            <a:schemeClr val="accent1"/>
+          </a:effectRef>
+          <a:fontRef idx="minor">
+            <a:schemeClr val="tx1"/>
+          </a:fontRef>
+        </p:style>
+      </p:cxnSp>
+      <p:cxnSp>
+        <p:nvCxnSpPr>
+          <p:cNvPr id="17" name="Straight Arrow Connector 16">
+            <a:extLst>
+              <a:ext uri="{FF2B5EF4-FFF2-40B4-BE49-F238E27FC236}">
+                <a16:creationId xmlns:a16="http://schemas.microsoft.com/office/drawing/2014/main" id="{13871E82-E6D5-950B-C3DE-6C97A1C83738}"/>
+              </a:ext>
+            </a:extLst>
+          </p:cNvPr>
+          <p:cNvCxnSpPr/>
+          <p:nvPr/>
+        </p:nvCxnSpPr>
+        <p:spPr>
+          <a:xfrm>
+            <a:off x="6590581" y="4080294"/>
+            <a:ext cx="288985" cy="94891"/>
+          </a:xfrm>
+          <a:prstGeom prst="straightConnector1">
+            <a:avLst/>
+          </a:prstGeom>
+          <a:ln>
+            <a:solidFill>
+              <a:schemeClr val="tx1"/>
+            </a:solidFill>
+            <a:tailEnd type="triangle"/>
+          </a:ln>
+        </p:spPr>
+        <p:style>
+          <a:lnRef idx="1">
+            <a:schemeClr val="accent1"/>
+          </a:lnRef>
+          <a:fillRef idx="0">
+            <a:schemeClr val="accent1"/>
+          </a:fillRef>
+          <a:effectRef idx="0">
+            <a:schemeClr val="accent1"/>
+          </a:effectRef>
+          <a:fontRef idx="minor">
+            <a:schemeClr val="tx1"/>
+          </a:fontRef>
+        </p:style>
+      </p:cxnSp>
+      <p:cxnSp>
+        <p:nvCxnSpPr>
+          <p:cNvPr id="19" name="Straight Arrow Connector 18">
+            <a:extLst>
+              <a:ext uri="{FF2B5EF4-FFF2-40B4-BE49-F238E27FC236}">
+                <a16:creationId xmlns:a16="http://schemas.microsoft.com/office/drawing/2014/main" id="{E04E06F8-66AC-DD23-9794-78967C8E1D23}"/>
+              </a:ext>
+            </a:extLst>
+          </p:cNvPr>
+          <p:cNvCxnSpPr/>
+          <p:nvPr/>
+        </p:nvCxnSpPr>
+        <p:spPr>
+          <a:xfrm>
+            <a:off x="6590581" y="4127739"/>
+            <a:ext cx="288985" cy="918714"/>
+          </a:xfrm>
+          <a:prstGeom prst="straightConnector1">
+            <a:avLst/>
+          </a:prstGeom>
+          <a:ln>
+            <a:solidFill>
+              <a:schemeClr val="tx1"/>
+            </a:solidFill>
+            <a:tailEnd type="triangle"/>
+          </a:ln>
+        </p:spPr>
+        <p:style>
+          <a:lnRef idx="1">
+            <a:schemeClr val="accent1"/>
+          </a:lnRef>
+          <a:fillRef idx="0">
+            <a:schemeClr val="accent1"/>
+          </a:fillRef>
+          <a:effectRef idx="0">
+            <a:schemeClr val="accent1"/>
+          </a:effectRef>
+          <a:fontRef idx="minor">
+            <a:schemeClr val="tx1"/>
+          </a:fontRef>
+        </p:style>
+      </p:cxnSp>
+      <p:sp>
+        <p:nvSpPr>
+          <p:cNvPr id="20" name="TextBox 19">
+            <a:extLst>
+              <a:ext uri="{FF2B5EF4-FFF2-40B4-BE49-F238E27FC236}">
+                <a16:creationId xmlns:a16="http://schemas.microsoft.com/office/drawing/2014/main" id="{BAFE2ACE-2977-8669-A506-085C797FC203}"/>
+              </a:ext>
+            </a:extLst>
+          </p:cNvPr>
+          <p:cNvSpPr txBox="1"/>
+          <p:nvPr/>
+        </p:nvSpPr>
+        <p:spPr>
+          <a:xfrm>
+            <a:off x="4175184" y="3423956"/>
+            <a:ext cx="655608" cy="369332"/>
+          </a:xfrm>
+          <a:prstGeom prst="rect">
+            <a:avLst/>
+          </a:prstGeom>
+          <a:noFill/>
+        </p:spPr>
+        <p:txBody>
+          <a:bodyPr wrap="square" rtlCol="0">
+            <a:spAutoFit/>
+          </a:bodyPr>
+          <a:lstStyle/>
+          <a:p>
+            <a:r>
+              <a:rPr lang="en-US" dirty="0"/>
+              <a:t>uses</a:t>
+            </a:r>
+            <a:endParaRPr lang="bg-BG" dirty="0"/>
+          </a:p>
+        </p:txBody>
+      </p:sp>
+      <p:sp>
+        <p:nvSpPr>
+          <p:cNvPr id="21" name="TextBox 20">
+            <a:extLst>
+              <a:ext uri="{FF2B5EF4-FFF2-40B4-BE49-F238E27FC236}">
+                <a16:creationId xmlns:a16="http://schemas.microsoft.com/office/drawing/2014/main" id="{39FBF3E9-EF50-CE56-6533-477DD09B5594}"/>
+              </a:ext>
+            </a:extLst>
+          </p:cNvPr>
+          <p:cNvSpPr txBox="1"/>
+          <p:nvPr/>
+        </p:nvSpPr>
+        <p:spPr>
+          <a:xfrm>
+            <a:off x="5704260" y="3407797"/>
+            <a:ext cx="1201183" cy="369332"/>
+          </a:xfrm>
+          <a:prstGeom prst="rect">
+            <a:avLst/>
+          </a:prstGeom>
+          <a:noFill/>
+        </p:spPr>
+        <p:txBody>
+          <a:bodyPr wrap="square" rtlCol="0">
+            <a:spAutoFit/>
+          </a:bodyPr>
+          <a:lstStyle/>
+          <a:p>
+            <a:r>
+              <a:rPr lang="en-US" dirty="0"/>
+              <a:t>to query</a:t>
+            </a:r>
+            <a:endParaRPr lang="bg-BG" dirty="0"/>
+          </a:p>
+        </p:txBody>
+      </p:sp>
+    </p:spTree>
+    <p:extLst>
+      <p:ext uri="{BB962C8B-B14F-4D97-AF65-F5344CB8AC3E}">
+        <p14:creationId xmlns:p14="http://schemas.microsoft.com/office/powerpoint/2010/main" val="2854625130"/>
+      </p:ext>
+    </p:extLst>
+  </p:cSld>
+  <p:clrMapOvr>
+    <a:masterClrMapping/>
+  </p:clrMapOvr>
+</p:sld>
+</file>
+
+<file path=ppt/slides/slide36.xml><?xml version="1.0" encoding="utf-8"?>
+<p:sld xmlns:a="http://schemas.openxmlformats.org/drawingml/2006/main" xmlns:r="http://schemas.openxmlformats.org/officeDocument/2006/relationships" xmlns:p="http://schemas.openxmlformats.org/presentationml/2006/main">
+  <p:cSld>
+    <p:spTree>
+      <p:nvGrpSpPr>
+        <p:cNvPr id="1" name=""/>
+        <p:cNvGrpSpPr/>
+        <p:nvPr/>
+      </p:nvGrpSpPr>
+      <p:grpSpPr>
+        <a:xfrm>
+          <a:off x="0" y="0"/>
+          <a:ext cx="0" cy="0"/>
+          <a:chOff x="0" y="0"/>
+          <a:chExt cx="0" cy="0"/>
+        </a:xfrm>
+      </p:grpSpPr>
+      <p:sp>
+        <p:nvSpPr>
+          <p:cNvPr id="2" name="Title 1">
+            <a:extLst>
+              <a:ext uri="{FF2B5EF4-FFF2-40B4-BE49-F238E27FC236}">
+                <a16:creationId xmlns:a16="http://schemas.microsoft.com/office/drawing/2014/main" id="{3F830A2C-1C4D-5755-1842-A1903F083F2A}"/>
+              </a:ext>
+            </a:extLst>
+          </p:cNvPr>
+          <p:cNvSpPr>
+            <a:spLocks noGrp="1"/>
+          </p:cNvSpPr>
+          <p:nvPr>
+            <p:ph type="title"/>
+          </p:nvPr>
+        </p:nvSpPr>
+        <p:spPr/>
+        <p:txBody>
+          <a:bodyPr/>
+          <a:lstStyle/>
+          <a:p>
+            <a:pPr algn="ctr"/>
+            <a:r>
+              <a:rPr lang="bg-BG" dirty="0">
+                <a:solidFill>
+                  <a:schemeClr val="tx1"/>
+                </a:solidFill>
+                <a:latin typeface="Arial" panose="020B0604020202020204" pitchFamily="34" charset="0"/>
+                <a:cs typeface="Arial" panose="020B0604020202020204" pitchFamily="34" charset="0"/>
+              </a:rPr>
+              <a:t>Предимства на </a:t>
+            </a:r>
+            <a:r>
+              <a:rPr lang="en-US" dirty="0">
+                <a:solidFill>
+                  <a:schemeClr val="tx1"/>
+                </a:solidFill>
+                <a:latin typeface="Arial" panose="020B0604020202020204" pitchFamily="34" charset="0"/>
+                <a:cs typeface="Arial" panose="020B0604020202020204" pitchFamily="34" charset="0"/>
+              </a:rPr>
+              <a:t>LINQ</a:t>
+            </a:r>
+            <a:endParaRPr lang="bg-BG" dirty="0">
+              <a:solidFill>
+                <a:schemeClr val="tx1"/>
+              </a:solidFill>
+              <a:latin typeface="Arial" panose="020B0604020202020204" pitchFamily="34" charset="0"/>
+              <a:cs typeface="Arial" panose="020B0604020202020204" pitchFamily="34" charset="0"/>
+            </a:endParaRPr>
+          </a:p>
+        </p:txBody>
+      </p:sp>
+      <p:sp>
+        <p:nvSpPr>
+          <p:cNvPr id="3" name="Content Placeholder 2">
+            <a:extLst>
+              <a:ext uri="{FF2B5EF4-FFF2-40B4-BE49-F238E27FC236}">
+                <a16:creationId xmlns:a16="http://schemas.microsoft.com/office/drawing/2014/main" id="{53521475-4D21-69A7-CEC3-11B10C5BF249}"/>
+              </a:ext>
+            </a:extLst>
+          </p:cNvPr>
+          <p:cNvSpPr>
+            <a:spLocks noGrp="1"/>
+          </p:cNvSpPr>
+          <p:nvPr>
+            <p:ph idx="1"/>
+          </p:nvPr>
+        </p:nvSpPr>
+        <p:spPr/>
+        <p:txBody>
+          <a:bodyPr/>
+          <a:lstStyle/>
+          <a:p>
+            <a:r>
+              <a:rPr lang="bg-BG" dirty="0">
+                <a:solidFill>
+                  <a:srgbClr val="FFFF00"/>
+                </a:solidFill>
+                <a:latin typeface="Arial" panose="020B0604020202020204" pitchFamily="34" charset="0"/>
+                <a:cs typeface="Arial" panose="020B0604020202020204" pitchFamily="34" charset="0"/>
+              </a:rPr>
+              <a:t>Четим код </a:t>
+            </a:r>
+            <a:r>
+              <a:rPr lang="bg-BG" dirty="0">
+                <a:solidFill>
+                  <a:schemeClr val="tx1"/>
+                </a:solidFill>
+                <a:latin typeface="Arial" panose="020B0604020202020204" pitchFamily="34" charset="0"/>
+                <a:cs typeface="Arial" panose="020B0604020202020204" pitchFamily="34" charset="0"/>
+              </a:rPr>
+              <a:t>– кодът който пишем е изключително разбираем</a:t>
+            </a:r>
+          </a:p>
+          <a:p>
+            <a:r>
+              <a:rPr lang="bg-BG" dirty="0">
+                <a:solidFill>
+                  <a:srgbClr val="FFFF00"/>
+                </a:solidFill>
+                <a:latin typeface="Arial" panose="020B0604020202020204" pitchFamily="34" charset="0"/>
+                <a:cs typeface="Arial" panose="020B0604020202020204" pitchFamily="34" charset="0"/>
+              </a:rPr>
+              <a:t>По-малко код </a:t>
+            </a:r>
+            <a:r>
+              <a:rPr lang="bg-BG" dirty="0">
+                <a:solidFill>
+                  <a:schemeClr val="tx1"/>
+                </a:solidFill>
+                <a:latin typeface="Arial" panose="020B0604020202020204" pitchFamily="34" charset="0"/>
+                <a:cs typeface="Arial" panose="020B0604020202020204" pitchFamily="34" charset="0"/>
+              </a:rPr>
+              <a:t>– кодът, който пишем е значително по-малко, отколкото, ако не използвахме </a:t>
+            </a:r>
+            <a:r>
+              <a:rPr lang="en-US" dirty="0">
+                <a:solidFill>
+                  <a:schemeClr val="tx1"/>
+                </a:solidFill>
+                <a:latin typeface="Arial" panose="020B0604020202020204" pitchFamily="34" charset="0"/>
+                <a:cs typeface="Arial" panose="020B0604020202020204" pitchFamily="34" charset="0"/>
+              </a:rPr>
+              <a:t>LINQ</a:t>
+            </a:r>
+          </a:p>
+          <a:p>
+            <a:r>
+              <a:rPr lang="bg-BG" dirty="0">
+                <a:solidFill>
+                  <a:srgbClr val="FFFF00"/>
+                </a:solidFill>
+                <a:latin typeface="Arial" panose="020B0604020202020204" pitchFamily="34" charset="0"/>
+                <a:cs typeface="Arial" panose="020B0604020202020204" pitchFamily="34" charset="0"/>
+              </a:rPr>
+              <a:t>Стандартен начин за заявки </a:t>
+            </a:r>
+            <a:r>
+              <a:rPr lang="bg-BG" dirty="0">
+                <a:solidFill>
+                  <a:schemeClr val="tx1"/>
+                </a:solidFill>
+                <a:latin typeface="Arial" panose="020B0604020202020204" pitchFamily="34" charset="0"/>
+                <a:cs typeface="Arial" panose="020B0604020202020204" pitchFamily="34" charset="0"/>
+              </a:rPr>
+              <a:t>–</a:t>
+            </a:r>
+            <a:r>
+              <a:rPr lang="bg-BG" dirty="0">
+                <a:latin typeface="Arial" panose="020B0604020202020204" pitchFamily="34" charset="0"/>
+                <a:cs typeface="Arial" panose="020B0604020202020204" pitchFamily="34" charset="0"/>
+              </a:rPr>
+              <a:t> </a:t>
+            </a:r>
+            <a:r>
+              <a:rPr lang="bg-BG" dirty="0">
+                <a:solidFill>
+                  <a:schemeClr val="tx1"/>
+                </a:solidFill>
+                <a:latin typeface="Arial" panose="020B0604020202020204" pitchFamily="34" charset="0"/>
+                <a:cs typeface="Arial" panose="020B0604020202020204" pitchFamily="34" charset="0"/>
+              </a:rPr>
+              <a:t>един и същ </a:t>
+            </a:r>
+            <a:r>
+              <a:rPr lang="en-US" dirty="0">
+                <a:solidFill>
+                  <a:schemeClr val="tx1"/>
+                </a:solidFill>
+                <a:latin typeface="Arial" panose="020B0604020202020204" pitchFamily="34" charset="0"/>
+                <a:cs typeface="Arial" panose="020B0604020202020204" pitchFamily="34" charset="0"/>
+              </a:rPr>
+              <a:t>LINQ </a:t>
+            </a:r>
+            <a:r>
+              <a:rPr lang="bg-BG" dirty="0">
+                <a:solidFill>
+                  <a:schemeClr val="tx1"/>
+                </a:solidFill>
+                <a:latin typeface="Arial" panose="020B0604020202020204" pitchFamily="34" charset="0"/>
+                <a:cs typeface="Arial" panose="020B0604020202020204" pitchFamily="34" charset="0"/>
+              </a:rPr>
+              <a:t>синтаксис се използва за заявки/работа към/с много източници на данни</a:t>
+            </a:r>
+          </a:p>
+          <a:p>
+            <a:r>
+              <a:rPr lang="en-US" dirty="0">
+                <a:solidFill>
+                  <a:srgbClr val="FFFF00"/>
+                </a:solidFill>
+                <a:latin typeface="Arial" panose="020B0604020202020204" pitchFamily="34" charset="0"/>
+                <a:cs typeface="Arial" panose="020B0604020202020204" pitchFamily="34" charset="0"/>
+              </a:rPr>
+              <a:t>Compile time safety </a:t>
+            </a:r>
+            <a:r>
+              <a:rPr lang="bg-BG" dirty="0">
+                <a:solidFill>
+                  <a:schemeClr val="tx1"/>
+                </a:solidFill>
+                <a:latin typeface="Arial" panose="020B0604020202020204" pitchFamily="34" charset="0"/>
+                <a:cs typeface="Arial" panose="020B0604020202020204" pitchFamily="34" charset="0"/>
+              </a:rPr>
+              <a:t>на заявките</a:t>
+            </a:r>
+            <a:endParaRPr lang="en-US" dirty="0">
+              <a:solidFill>
+                <a:schemeClr val="tx1"/>
+              </a:solidFill>
+              <a:latin typeface="Arial" panose="020B0604020202020204" pitchFamily="34" charset="0"/>
+              <a:cs typeface="Arial" panose="020B0604020202020204" pitchFamily="34" charset="0"/>
+            </a:endParaRPr>
+          </a:p>
+          <a:p>
+            <a:endParaRPr lang="bg-BG" dirty="0"/>
+          </a:p>
+          <a:p>
+            <a:endParaRPr lang="bg-BG" dirty="0"/>
+          </a:p>
+          <a:p>
+            <a:endParaRPr lang="bg-BG" dirty="0"/>
+          </a:p>
+        </p:txBody>
+      </p:sp>
+    </p:spTree>
+    <p:extLst>
+      <p:ext uri="{BB962C8B-B14F-4D97-AF65-F5344CB8AC3E}">
+        <p14:creationId xmlns:p14="http://schemas.microsoft.com/office/powerpoint/2010/main" val="2425369146"/>
+      </p:ext>
+    </p:extLst>
+  </p:cSld>
+  <p:clrMapOvr>
+    <a:masterClrMapping/>
+  </p:clrMapOvr>
+</p:sld>
+</file>
+
+<file path=ppt/slides/slide37.xml><?xml version="1.0" encoding="utf-8"?>
+<p:sld xmlns:a="http://schemas.openxmlformats.org/drawingml/2006/main" xmlns:r="http://schemas.openxmlformats.org/officeDocument/2006/relationships" xmlns:p="http://schemas.openxmlformats.org/presentationml/2006/main">
+  <p:cSld>
+    <p:spTree>
+      <p:nvGrpSpPr>
+        <p:cNvPr id="1" name=""/>
+        <p:cNvGrpSpPr/>
+        <p:nvPr/>
+      </p:nvGrpSpPr>
+      <p:grpSpPr>
+        <a:xfrm>
+          <a:off x="0" y="0"/>
+          <a:ext cx="0" cy="0"/>
+          <a:chOff x="0" y="0"/>
+          <a:chExt cx="0" cy="0"/>
+        </a:xfrm>
+      </p:grpSpPr>
+      <p:sp>
+        <p:nvSpPr>
+          <p:cNvPr id="2" name="Title 1">
+            <a:extLst>
+              <a:ext uri="{FF2B5EF4-FFF2-40B4-BE49-F238E27FC236}">
+                <a16:creationId xmlns:a16="http://schemas.microsoft.com/office/drawing/2014/main" id="{D0A9D00E-E3AC-627E-6943-8DC1EC3A0FF1}"/>
+              </a:ext>
+            </a:extLst>
+          </p:cNvPr>
+          <p:cNvSpPr>
+            <a:spLocks noGrp="1"/>
+          </p:cNvSpPr>
+          <p:nvPr>
+            <p:ph type="title"/>
+          </p:nvPr>
+        </p:nvSpPr>
+        <p:spPr/>
+        <p:txBody>
+          <a:bodyPr/>
+          <a:lstStyle/>
+          <a:p>
+            <a:pPr algn="ctr"/>
+            <a:r>
+              <a:rPr lang="bg-BG" dirty="0">
+                <a:solidFill>
+                  <a:schemeClr val="tx1"/>
+                </a:solidFill>
+                <a:latin typeface="Arial" panose="020B0604020202020204" pitchFamily="34" charset="0"/>
+                <a:cs typeface="Arial" panose="020B0604020202020204" pitchFamily="34" charset="0"/>
+              </a:rPr>
+              <a:t>Какво е </a:t>
+            </a:r>
+            <a:r>
+              <a:rPr lang="en-US" dirty="0">
+                <a:solidFill>
+                  <a:schemeClr val="tx1"/>
+                </a:solidFill>
+                <a:latin typeface="Arial" panose="020B0604020202020204" pitchFamily="34" charset="0"/>
+                <a:cs typeface="Arial" panose="020B0604020202020204" pitchFamily="34" charset="0"/>
+              </a:rPr>
+              <a:t>Lambda Expression?</a:t>
+            </a:r>
+            <a:endParaRPr lang="bg-BG" dirty="0">
+              <a:solidFill>
+                <a:schemeClr val="tx1"/>
+              </a:solidFill>
+              <a:latin typeface="Arial" panose="020B0604020202020204" pitchFamily="34" charset="0"/>
+              <a:cs typeface="Arial" panose="020B0604020202020204" pitchFamily="34" charset="0"/>
+            </a:endParaRPr>
+          </a:p>
+        </p:txBody>
+      </p:sp>
+      <p:sp>
+        <p:nvSpPr>
+          <p:cNvPr id="3" name="Content Placeholder 2">
+            <a:extLst>
+              <a:ext uri="{FF2B5EF4-FFF2-40B4-BE49-F238E27FC236}">
+                <a16:creationId xmlns:a16="http://schemas.microsoft.com/office/drawing/2014/main" id="{BDD13155-0712-5B19-0C88-FF24C0437EBD}"/>
+              </a:ext>
+            </a:extLst>
+          </p:cNvPr>
+          <p:cNvSpPr>
+            <a:spLocks noGrp="1"/>
+          </p:cNvSpPr>
+          <p:nvPr>
+            <p:ph idx="1"/>
+          </p:nvPr>
+        </p:nvSpPr>
+        <p:spPr/>
+        <p:txBody>
+          <a:bodyPr/>
+          <a:lstStyle/>
+          <a:p>
+            <a:r>
+              <a:rPr lang="en-US" dirty="0">
+                <a:solidFill>
+                  <a:srgbClr val="FFFF00"/>
+                </a:solidFill>
+              </a:rPr>
+              <a:t>Lambda expression</a:t>
+            </a:r>
+            <a:r>
+              <a:rPr lang="bg-BG" dirty="0">
+                <a:solidFill>
+                  <a:srgbClr val="FFFF00"/>
+                </a:solidFill>
+              </a:rPr>
+              <a:t> </a:t>
+            </a:r>
+            <a:r>
+              <a:rPr lang="bg-BG" dirty="0">
+                <a:solidFill>
+                  <a:schemeClr val="tx1"/>
+                </a:solidFill>
+              </a:rPr>
+              <a:t>е кратък блок от код, който взема някакви входни параметри, върши някаква работа и връща резултат.</a:t>
+            </a:r>
+            <a:r>
+              <a:rPr lang="en-US" dirty="0">
+                <a:solidFill>
+                  <a:schemeClr val="tx1"/>
+                </a:solidFill>
+              </a:rPr>
+              <a:t> </a:t>
+            </a:r>
+            <a:r>
+              <a:rPr lang="bg-BG" dirty="0">
+                <a:solidFill>
+                  <a:schemeClr val="tx1"/>
+                </a:solidFill>
+              </a:rPr>
+              <a:t>Използва се за направата на анонимни методи. </a:t>
+            </a:r>
+          </a:p>
+          <a:p>
+            <a:endParaRPr lang="bg-BG" dirty="0"/>
+          </a:p>
+          <a:p>
+            <a:r>
+              <a:rPr lang="bg-BG" dirty="0">
+                <a:solidFill>
+                  <a:schemeClr val="tx1"/>
+                </a:solidFill>
+              </a:rPr>
+              <a:t>Подобни са на методите, но </a:t>
+            </a:r>
+            <a:r>
+              <a:rPr lang="bg-BG" dirty="0">
+                <a:solidFill>
+                  <a:srgbClr val="92D050"/>
+                </a:solidFill>
+              </a:rPr>
+              <a:t>не се нуждаят от име</a:t>
+            </a:r>
+            <a:r>
+              <a:rPr lang="bg-BG" dirty="0"/>
+              <a:t>. </a:t>
+            </a:r>
+            <a:r>
+              <a:rPr lang="bg-BG" dirty="0">
+                <a:solidFill>
+                  <a:schemeClr val="tx1"/>
+                </a:solidFill>
+              </a:rPr>
+              <a:t>Познаваме ги от математиката.</a:t>
+            </a:r>
+          </a:p>
+          <a:p>
+            <a:endParaRPr lang="bg-BG" dirty="0"/>
+          </a:p>
+          <a:p>
+            <a:r>
+              <a:rPr lang="bg-BG" dirty="0">
+                <a:solidFill>
+                  <a:schemeClr val="tx1"/>
+                </a:solidFill>
+              </a:rPr>
+              <a:t>Използват се, когато метода (функцията) не е голяма и няма нужда да я правим със специално име.</a:t>
+            </a:r>
+          </a:p>
+        </p:txBody>
+      </p:sp>
+    </p:spTree>
+    <p:extLst>
+      <p:ext uri="{BB962C8B-B14F-4D97-AF65-F5344CB8AC3E}">
+        <p14:creationId xmlns:p14="http://schemas.microsoft.com/office/powerpoint/2010/main" val="2387751547"/>
+      </p:ext>
+    </p:extLst>
+  </p:cSld>
+  <p:clrMapOvr>
+    <a:masterClrMapping/>
+  </p:clrMapOvr>
+</p:sld>
+</file>
+
+<file path=ppt/slides/slide38.xml><?xml version="1.0" encoding="utf-8"?>
+<p:sld xmlns:a="http://schemas.openxmlformats.org/drawingml/2006/main" xmlns:r="http://schemas.openxmlformats.org/officeDocument/2006/relationships" xmlns:p="http://schemas.openxmlformats.org/presentationml/2006/main">
+  <p:cSld>
+    <p:spTree>
+      <p:nvGrpSpPr>
+        <p:cNvPr id="1" name=""/>
+        <p:cNvGrpSpPr/>
+        <p:nvPr/>
+      </p:nvGrpSpPr>
+      <p:grpSpPr>
+        <a:xfrm>
+          <a:off x="0" y="0"/>
+          <a:ext cx="0" cy="0"/>
+          <a:chOff x="0" y="0"/>
+          <a:chExt cx="0" cy="0"/>
+        </a:xfrm>
+      </p:grpSpPr>
+      <p:sp>
+        <p:nvSpPr>
+          <p:cNvPr id="2" name="Title 1">
+            <a:extLst>
+              <a:ext uri="{FF2B5EF4-FFF2-40B4-BE49-F238E27FC236}">
+                <a16:creationId xmlns:a16="http://schemas.microsoft.com/office/drawing/2014/main" id="{2D35F4B9-B2CA-82C6-8FC7-E5C635059DC3}"/>
+              </a:ext>
+            </a:extLst>
+          </p:cNvPr>
+          <p:cNvSpPr>
+            <a:spLocks noGrp="1"/>
+          </p:cNvSpPr>
+          <p:nvPr>
+            <p:ph type="title"/>
+          </p:nvPr>
+        </p:nvSpPr>
+        <p:spPr/>
+        <p:txBody>
+          <a:bodyPr>
+            <a:normAutofit fontScale="90000"/>
+          </a:bodyPr>
+          <a:lstStyle/>
+          <a:p>
+            <a:pPr algn="ctr"/>
+            <a:r>
+              <a:rPr lang="bg-BG" dirty="0">
+                <a:latin typeface="Arial" panose="020B0604020202020204" pitchFamily="34" charset="0"/>
+                <a:cs typeface="Arial" panose="020B0604020202020204" pitchFamily="34" charset="0"/>
+              </a:rPr>
+              <a:t>Синтаксис на </a:t>
+            </a:r>
+            <a:r>
+              <a:rPr lang="en-US" dirty="0">
+                <a:latin typeface="Arial" panose="020B0604020202020204" pitchFamily="34" charset="0"/>
+                <a:cs typeface="Arial" panose="020B0604020202020204" pitchFamily="34" charset="0"/>
+              </a:rPr>
+              <a:t>Lambda Expressions</a:t>
+            </a:r>
+            <a:endParaRPr lang="bg-BG" dirty="0">
+              <a:latin typeface="Arial" panose="020B0604020202020204" pitchFamily="34" charset="0"/>
+              <a:cs typeface="Arial" panose="020B0604020202020204" pitchFamily="34" charset="0"/>
+            </a:endParaRPr>
+          </a:p>
+        </p:txBody>
+      </p:sp>
+      <p:sp>
+        <p:nvSpPr>
+          <p:cNvPr id="3" name="Content Placeholder 2">
+            <a:extLst>
+              <a:ext uri="{FF2B5EF4-FFF2-40B4-BE49-F238E27FC236}">
+                <a16:creationId xmlns:a16="http://schemas.microsoft.com/office/drawing/2014/main" id="{BEC6A6E0-DA9B-1540-C2AE-DF9264044423}"/>
+              </a:ext>
+            </a:extLst>
+          </p:cNvPr>
+          <p:cNvSpPr>
+            <a:spLocks noGrp="1"/>
+          </p:cNvSpPr>
+          <p:nvPr>
+            <p:ph idx="1"/>
+          </p:nvPr>
+        </p:nvSpPr>
+        <p:spPr>
+          <a:xfrm>
+            <a:off x="1413298" y="3367655"/>
+            <a:ext cx="9197193" cy="885167"/>
+          </a:xfrm>
+        </p:spPr>
+        <p:txBody>
+          <a:bodyPr>
+            <a:normAutofit fontScale="92500"/>
+          </a:bodyPr>
+          <a:lstStyle/>
+          <a:p>
+            <a:pPr marL="0" indent="0">
+              <a:buNone/>
+            </a:pPr>
+            <a:r>
+              <a:rPr lang="en-US" sz="4000" b="1" i="0" dirty="0">
+                <a:solidFill>
+                  <a:schemeClr val="accent6">
+                    <a:lumMod val="40000"/>
+                    <a:lumOff val="60000"/>
+                  </a:schemeClr>
+                </a:solidFill>
+                <a:effectLst/>
+                <a:latin typeface="Consolas" panose="020B0609020204030204" pitchFamily="49" charset="0"/>
+              </a:rPr>
+              <a:t>(&lt;</a:t>
+            </a:r>
+            <a:r>
+              <a:rPr lang="en-US" sz="4000" dirty="0">
+                <a:solidFill>
+                  <a:schemeClr val="accent6">
+                    <a:lumMod val="40000"/>
+                    <a:lumOff val="60000"/>
+                  </a:schemeClr>
+                </a:solidFill>
+                <a:latin typeface="Consolas" panose="020B0609020204030204" pitchFamily="49" charset="0"/>
+              </a:rPr>
+              <a:t>input</a:t>
+            </a:r>
+            <a:r>
+              <a:rPr lang="en-US" sz="4000" b="1" dirty="0">
+                <a:solidFill>
+                  <a:schemeClr val="accent6">
+                    <a:lumMod val="40000"/>
+                    <a:lumOff val="60000"/>
+                  </a:schemeClr>
+                </a:solidFill>
+                <a:latin typeface="Consolas" panose="020B0609020204030204" pitchFamily="49" charset="0"/>
+              </a:rPr>
+              <a:t> </a:t>
+            </a:r>
+            <a:r>
+              <a:rPr lang="en-US" sz="4000" b="0" i="0" dirty="0">
+                <a:solidFill>
+                  <a:schemeClr val="accent6">
+                    <a:lumMod val="40000"/>
+                    <a:lumOff val="60000"/>
+                  </a:schemeClr>
+                </a:solidFill>
+                <a:effectLst/>
+                <a:latin typeface="Consolas" panose="020B0609020204030204" pitchFamily="49" charset="0"/>
+              </a:rPr>
+              <a:t>parameters</a:t>
+            </a:r>
+            <a:r>
+              <a:rPr lang="en-US" sz="4000" b="1" i="0" dirty="0">
+                <a:solidFill>
+                  <a:schemeClr val="accent6">
+                    <a:lumMod val="40000"/>
+                    <a:lumOff val="60000"/>
+                  </a:schemeClr>
+                </a:solidFill>
+                <a:effectLst/>
+                <a:latin typeface="Consolas" panose="020B0609020204030204" pitchFamily="49" charset="0"/>
+              </a:rPr>
+              <a:t>&gt;)</a:t>
+            </a:r>
+            <a:r>
+              <a:rPr lang="en-US" sz="4000" b="0" i="0" dirty="0">
+                <a:solidFill>
+                  <a:schemeClr val="accent6">
+                    <a:lumMod val="40000"/>
+                    <a:lumOff val="60000"/>
+                  </a:schemeClr>
+                </a:solidFill>
+                <a:effectLst/>
+                <a:latin typeface="Consolas" panose="020B0609020204030204" pitchFamily="49" charset="0"/>
+              </a:rPr>
+              <a:t> =</a:t>
+            </a:r>
+            <a:r>
+              <a:rPr lang="en-US" sz="4000" b="1" i="0" dirty="0">
+                <a:solidFill>
+                  <a:schemeClr val="accent6">
+                    <a:lumMod val="40000"/>
+                    <a:lumOff val="60000"/>
+                  </a:schemeClr>
+                </a:solidFill>
+                <a:effectLst/>
+                <a:latin typeface="Consolas" panose="020B0609020204030204" pitchFamily="49" charset="0"/>
+              </a:rPr>
+              <a:t>&gt;</a:t>
+            </a:r>
+            <a:r>
+              <a:rPr lang="en-US" sz="4000" b="0" i="0" dirty="0">
+                <a:solidFill>
+                  <a:schemeClr val="accent6">
+                    <a:lumMod val="40000"/>
+                    <a:lumOff val="60000"/>
+                  </a:schemeClr>
+                </a:solidFill>
+                <a:effectLst/>
+                <a:latin typeface="Consolas" panose="020B0609020204030204" pitchFamily="49" charset="0"/>
+              </a:rPr>
+              <a:t> expression</a:t>
+            </a:r>
+          </a:p>
+          <a:p>
+            <a:endParaRPr lang="en-US" dirty="0">
+              <a:solidFill>
+                <a:srgbClr val="F8F8F2"/>
+              </a:solidFill>
+              <a:latin typeface="Consolas" panose="020B0609020204030204" pitchFamily="49" charset="0"/>
+            </a:endParaRPr>
+          </a:p>
+          <a:p>
+            <a:pPr marL="457200" lvl="1" indent="0">
+              <a:buNone/>
+            </a:pPr>
+            <a:endParaRPr lang="en-US" dirty="0">
+              <a:solidFill>
+                <a:schemeClr val="tx1"/>
+              </a:solidFill>
+              <a:latin typeface="Consolas" panose="020B0609020204030204" pitchFamily="49" charset="0"/>
+            </a:endParaRPr>
+          </a:p>
+          <a:p>
+            <a:pPr marL="457200" lvl="1" indent="0">
+              <a:buNone/>
+            </a:pPr>
+            <a:endParaRPr lang="en-US" dirty="0">
+              <a:solidFill>
+                <a:schemeClr val="tx1"/>
+              </a:solidFill>
+              <a:latin typeface="Consolas" panose="020B0609020204030204" pitchFamily="49" charset="0"/>
+            </a:endParaRPr>
+          </a:p>
+          <a:p>
+            <a:pPr marL="457200" lvl="1" indent="0">
+              <a:buNone/>
+            </a:pPr>
+            <a:endParaRPr lang="bg-BG" dirty="0">
+              <a:solidFill>
+                <a:schemeClr val="tx1"/>
+              </a:solidFill>
+              <a:latin typeface="Consolas" panose="020B0609020204030204" pitchFamily="49" charset="0"/>
+            </a:endParaRPr>
+          </a:p>
+          <a:p>
+            <a:endParaRPr lang="bg-BG" b="0" i="0" dirty="0">
+              <a:solidFill>
+                <a:srgbClr val="F8F8F2"/>
+              </a:solidFill>
+              <a:effectLst/>
+              <a:latin typeface="consolas" panose="020B0609020204030204" pitchFamily="49" charset="0"/>
+            </a:endParaRPr>
+          </a:p>
+          <a:p>
+            <a:endParaRPr lang="bg-BG" dirty="0">
+              <a:solidFill>
+                <a:srgbClr val="F8F8F2"/>
+              </a:solidFill>
+              <a:latin typeface="consolas" panose="020B0609020204030204" pitchFamily="49" charset="0"/>
+            </a:endParaRPr>
+          </a:p>
+          <a:p>
+            <a:endParaRPr lang="bg-BG" dirty="0"/>
+          </a:p>
+        </p:txBody>
+      </p:sp>
+    </p:spTree>
+    <p:extLst>
+      <p:ext uri="{BB962C8B-B14F-4D97-AF65-F5344CB8AC3E}">
+        <p14:creationId xmlns:p14="http://schemas.microsoft.com/office/powerpoint/2010/main" val="2603364559"/>
+      </p:ext>
+    </p:extLst>
+  </p:cSld>
+  <p:clrMapOvr>
+    <a:masterClrMapping/>
+  </p:clrMapOvr>
+</p:sld>
+</file>
+
+<file path=ppt/slides/slide39.xml><?xml version="1.0" encoding="utf-8"?>
+<p:sld xmlns:a="http://schemas.openxmlformats.org/drawingml/2006/main" xmlns:r="http://schemas.openxmlformats.org/officeDocument/2006/relationships" xmlns:p="http://schemas.openxmlformats.org/presentationml/2006/main">
+  <p:cSld>
+    <p:spTree>
+      <p:nvGrpSpPr>
+        <p:cNvPr id="1" name=""/>
+        <p:cNvGrpSpPr/>
+        <p:nvPr/>
+      </p:nvGrpSpPr>
+      <p:grpSpPr>
+        <a:xfrm>
+          <a:off x="0" y="0"/>
+          <a:ext cx="0" cy="0"/>
+          <a:chOff x="0" y="0"/>
+          <a:chExt cx="0" cy="0"/>
+        </a:xfrm>
+      </p:grpSpPr>
+      <p:sp>
+        <p:nvSpPr>
+          <p:cNvPr id="2" name="Title 1">
+            <a:extLst>
+              <a:ext uri="{FF2B5EF4-FFF2-40B4-BE49-F238E27FC236}">
+                <a16:creationId xmlns:a16="http://schemas.microsoft.com/office/drawing/2014/main" id="{4B68C435-CE4F-4540-C0C5-A2AFFE0AC6CD}"/>
+              </a:ext>
+            </a:extLst>
+          </p:cNvPr>
+          <p:cNvSpPr>
+            <a:spLocks noGrp="1"/>
+          </p:cNvSpPr>
+          <p:nvPr>
+            <p:ph type="title"/>
+          </p:nvPr>
+        </p:nvSpPr>
+        <p:spPr/>
+        <p:txBody>
+          <a:bodyPr/>
+          <a:lstStyle/>
+          <a:p>
+            <a:pPr algn="ctr"/>
+            <a:r>
+              <a:rPr lang="bg-BG" dirty="0">
+                <a:latin typeface="Arial" panose="020B0604020202020204" pitchFamily="34" charset="0"/>
+                <a:cs typeface="Arial" panose="020B0604020202020204" pitchFamily="34" charset="0"/>
+              </a:rPr>
+              <a:t>Филтрация</a:t>
+            </a:r>
+            <a:r>
+              <a:rPr lang="en-US" dirty="0">
+                <a:latin typeface="Arial" panose="020B0604020202020204" pitchFamily="34" charset="0"/>
+                <a:cs typeface="Arial" panose="020B0604020202020204" pitchFamily="34" charset="0"/>
+              </a:rPr>
+              <a:t> (Where)</a:t>
+            </a:r>
+            <a:endParaRPr lang="bg-BG" dirty="0">
+              <a:latin typeface="Arial" panose="020B0604020202020204" pitchFamily="34" charset="0"/>
+              <a:cs typeface="Arial" panose="020B0604020202020204" pitchFamily="34" charset="0"/>
+            </a:endParaRPr>
+          </a:p>
+        </p:txBody>
+      </p:sp>
+      <p:sp>
+        <p:nvSpPr>
+          <p:cNvPr id="3" name="Content Placeholder 2">
+            <a:extLst>
+              <a:ext uri="{FF2B5EF4-FFF2-40B4-BE49-F238E27FC236}">
+                <a16:creationId xmlns:a16="http://schemas.microsoft.com/office/drawing/2014/main" id="{CF8E0F49-5D32-69BA-F4B7-61F3925EDC8B}"/>
+              </a:ext>
+            </a:extLst>
+          </p:cNvPr>
+          <p:cNvSpPr>
+            <a:spLocks noGrp="1"/>
+          </p:cNvSpPr>
+          <p:nvPr>
+            <p:ph idx="1"/>
+          </p:nvPr>
+        </p:nvSpPr>
+        <p:spPr>
+          <a:xfrm>
+            <a:off x="1283901" y="2558871"/>
+            <a:ext cx="10233800" cy="2573847"/>
+          </a:xfrm>
+        </p:spPr>
+        <p:txBody>
+          <a:bodyPr/>
+          <a:lstStyle/>
+          <a:p>
+            <a:pPr marL="0" indent="0">
+              <a:buNone/>
+            </a:pPr>
+            <a:r>
+              <a:rPr lang="en-US" sz="2400" dirty="0">
+                <a:solidFill>
+                  <a:schemeClr val="tx2">
+                    <a:lumMod val="75000"/>
+                  </a:schemeClr>
+                </a:solidFill>
+                <a:latin typeface="Consolas" panose="020B0609020204030204" pitchFamily="49" charset="0"/>
+              </a:rPr>
+              <a:t>List</a:t>
+            </a:r>
+            <a:r>
+              <a:rPr lang="en-US" sz="2400" dirty="0">
+                <a:solidFill>
+                  <a:schemeClr val="tx1"/>
+                </a:solidFill>
+                <a:latin typeface="Consolas" panose="020B0609020204030204" pitchFamily="49" charset="0"/>
+              </a:rPr>
+              <a:t>&lt;int&gt; </a:t>
+            </a:r>
+            <a:r>
+              <a:rPr lang="en-US" sz="2400" dirty="0">
+                <a:solidFill>
+                  <a:srgbClr val="92D050"/>
+                </a:solidFill>
+                <a:latin typeface="Consolas" panose="020B0609020204030204" pitchFamily="49" charset="0"/>
+              </a:rPr>
+              <a:t>numbers</a:t>
+            </a:r>
+            <a:r>
+              <a:rPr lang="en-US" sz="2400" dirty="0">
+                <a:solidFill>
+                  <a:schemeClr val="tx1"/>
+                </a:solidFill>
+                <a:latin typeface="Consolas" panose="020B0609020204030204" pitchFamily="49" charset="0"/>
+              </a:rPr>
+              <a:t> = </a:t>
+            </a:r>
+          </a:p>
+          <a:p>
+            <a:pPr marL="0" indent="0">
+              <a:buNone/>
+            </a:pPr>
+            <a:r>
+              <a:rPr lang="en-US" sz="2400" dirty="0">
+                <a:solidFill>
+                  <a:schemeClr val="tx1"/>
+                </a:solidFill>
+                <a:latin typeface="Consolas" panose="020B0609020204030204" pitchFamily="49" charset="0"/>
+              </a:rPr>
+              <a:t>	new </a:t>
+            </a:r>
+            <a:r>
+              <a:rPr lang="en-US" sz="2400" dirty="0">
+                <a:solidFill>
+                  <a:schemeClr val="tx2">
+                    <a:lumMod val="75000"/>
+                  </a:schemeClr>
+                </a:solidFill>
+                <a:latin typeface="Consolas" panose="020B0609020204030204" pitchFamily="49" charset="0"/>
+              </a:rPr>
+              <a:t>List</a:t>
+            </a:r>
+            <a:r>
+              <a:rPr lang="en-US" sz="2400" dirty="0">
+                <a:solidFill>
+                  <a:schemeClr val="tx1"/>
+                </a:solidFill>
+                <a:latin typeface="Consolas" panose="020B0609020204030204" pitchFamily="49" charset="0"/>
+              </a:rPr>
+              <a:t>&lt;int&gt;() { 1, 2, 3, 4, 5, 6, 7, 8 };</a:t>
+            </a:r>
+          </a:p>
+          <a:p>
+            <a:endParaRPr lang="en-US" sz="2400" dirty="0">
+              <a:solidFill>
+                <a:schemeClr val="tx1"/>
+              </a:solidFill>
+              <a:latin typeface="Consolas" panose="020B0609020204030204" pitchFamily="49" charset="0"/>
+            </a:endParaRPr>
+          </a:p>
+          <a:p>
+            <a:pPr marL="0" indent="0">
+              <a:buNone/>
+            </a:pPr>
+            <a:r>
+              <a:rPr lang="en-US" sz="2400" dirty="0">
+                <a:solidFill>
+                  <a:schemeClr val="tx2">
+                    <a:lumMod val="75000"/>
+                  </a:schemeClr>
+                </a:solidFill>
+                <a:latin typeface="Consolas" panose="020B0609020204030204" pitchFamily="49" charset="0"/>
+              </a:rPr>
+              <a:t>List</a:t>
+            </a:r>
+            <a:r>
+              <a:rPr lang="en-US" sz="2400" dirty="0">
+                <a:solidFill>
+                  <a:schemeClr val="tx1"/>
+                </a:solidFill>
+                <a:latin typeface="Consolas" panose="020B0609020204030204" pitchFamily="49" charset="0"/>
+              </a:rPr>
+              <a:t>&lt;int&gt; </a:t>
+            </a:r>
+            <a:r>
+              <a:rPr lang="en-US" sz="2400" dirty="0" err="1">
+                <a:solidFill>
+                  <a:srgbClr val="92D050"/>
+                </a:solidFill>
+                <a:latin typeface="Consolas" panose="020B0609020204030204" pitchFamily="49" charset="0"/>
+              </a:rPr>
+              <a:t>evenNumbers</a:t>
+            </a:r>
+            <a:r>
+              <a:rPr lang="en-US" sz="2400" dirty="0">
+                <a:solidFill>
+                  <a:schemeClr val="tx1"/>
+                </a:solidFill>
+                <a:latin typeface="Consolas" panose="020B0609020204030204" pitchFamily="49" charset="0"/>
+              </a:rPr>
+              <a:t> = </a:t>
+            </a:r>
+          </a:p>
+          <a:p>
+            <a:pPr marL="457200" lvl="1" indent="0">
+              <a:buNone/>
+            </a:pPr>
+            <a:r>
+              <a:rPr lang="en-US" dirty="0">
+                <a:solidFill>
+                  <a:schemeClr val="tx1"/>
+                </a:solidFill>
+                <a:latin typeface="Consolas" panose="020B0609020204030204" pitchFamily="49" charset="0"/>
+              </a:rPr>
+              <a:t>	</a:t>
+            </a:r>
+            <a:r>
+              <a:rPr lang="en-US" dirty="0" err="1">
+                <a:solidFill>
+                  <a:srgbClr val="92D050"/>
+                </a:solidFill>
+                <a:latin typeface="Consolas" panose="020B0609020204030204" pitchFamily="49" charset="0"/>
+              </a:rPr>
+              <a:t>myList</a:t>
+            </a:r>
+            <a:r>
+              <a:rPr lang="en-US" dirty="0" err="1">
+                <a:solidFill>
+                  <a:schemeClr val="tx1"/>
+                </a:solidFill>
+                <a:latin typeface="Consolas" panose="020B0609020204030204" pitchFamily="49" charset="0"/>
+              </a:rPr>
+              <a:t>.</a:t>
+            </a:r>
+            <a:r>
+              <a:rPr lang="en-US" dirty="0" err="1">
+                <a:solidFill>
+                  <a:srgbClr val="FFC000"/>
+                </a:solidFill>
+                <a:latin typeface="Consolas" panose="020B0609020204030204" pitchFamily="49" charset="0"/>
+              </a:rPr>
+              <a:t>Where</a:t>
+            </a:r>
+            <a:r>
+              <a:rPr lang="en-US" dirty="0">
+                <a:solidFill>
+                  <a:schemeClr val="tx1"/>
+                </a:solidFill>
+                <a:latin typeface="Consolas" panose="020B0609020204030204" pitchFamily="49" charset="0"/>
+              </a:rPr>
+              <a:t>(</a:t>
+            </a:r>
+            <a:r>
+              <a:rPr lang="en-US" dirty="0">
+                <a:solidFill>
+                  <a:srgbClr val="FFFF00"/>
+                </a:solidFill>
+                <a:latin typeface="Consolas" panose="020B0609020204030204" pitchFamily="49" charset="0"/>
+              </a:rPr>
+              <a:t>x </a:t>
+            </a:r>
+            <a:r>
+              <a:rPr lang="en-US" dirty="0">
+                <a:solidFill>
+                  <a:srgbClr val="FF0000"/>
+                </a:solidFill>
+                <a:latin typeface="Consolas" panose="020B0609020204030204" pitchFamily="49" charset="0"/>
+              </a:rPr>
+              <a:t>=&gt; </a:t>
+            </a:r>
+            <a:r>
+              <a:rPr lang="en-US" dirty="0">
+                <a:solidFill>
+                  <a:srgbClr val="FFFF00"/>
+                </a:solidFill>
+                <a:latin typeface="Consolas" panose="020B0609020204030204" pitchFamily="49" charset="0"/>
+              </a:rPr>
+              <a:t>x % 2 == 0</a:t>
+            </a:r>
+            <a:r>
+              <a:rPr lang="en-US" dirty="0">
+                <a:solidFill>
+                  <a:schemeClr val="tx1"/>
+                </a:solidFill>
+                <a:latin typeface="Consolas" panose="020B0609020204030204" pitchFamily="49" charset="0"/>
+              </a:rPr>
+              <a:t>).</a:t>
+            </a:r>
+            <a:r>
+              <a:rPr lang="en-US" dirty="0" err="1">
+                <a:solidFill>
+                  <a:schemeClr val="tx1"/>
+                </a:solidFill>
+                <a:latin typeface="Consolas" panose="020B0609020204030204" pitchFamily="49" charset="0"/>
+              </a:rPr>
+              <a:t>ToList</a:t>
+            </a:r>
+            <a:r>
+              <a:rPr lang="en-US" dirty="0">
+                <a:solidFill>
+                  <a:schemeClr val="tx1"/>
+                </a:solidFill>
+                <a:latin typeface="Consolas" panose="020B0609020204030204" pitchFamily="49" charset="0"/>
+              </a:rPr>
+              <a:t>();</a:t>
+            </a:r>
+          </a:p>
+          <a:p>
+            <a:pPr marL="0" indent="0">
+              <a:buNone/>
+            </a:pPr>
+            <a:endParaRPr lang="bg-BG" dirty="0"/>
+          </a:p>
+        </p:txBody>
+      </p:sp>
+    </p:spTree>
+    <p:extLst>
+      <p:ext uri="{BB962C8B-B14F-4D97-AF65-F5344CB8AC3E}">
+        <p14:creationId xmlns:p14="http://schemas.microsoft.com/office/powerpoint/2010/main" val="2219056405"/>
       </p:ext>
     </p:extLst>
   </p:cSld>
@@ -19799,6 +21597,1961 @@
     <p:extLst>
       <p:ext uri="{BB962C8B-B14F-4D97-AF65-F5344CB8AC3E}">
         <p14:creationId xmlns:p14="http://schemas.microsoft.com/office/powerpoint/2010/main" val="115207119"/>
+      </p:ext>
+    </p:extLst>
+  </p:cSld>
+  <p:clrMapOvr>
+    <a:masterClrMapping/>
+  </p:clrMapOvr>
+</p:sld>
+</file>
+
+<file path=ppt/slides/slide40.xml><?xml version="1.0" encoding="utf-8"?>
+<p:sld xmlns:a="http://schemas.openxmlformats.org/drawingml/2006/main" xmlns:r="http://schemas.openxmlformats.org/officeDocument/2006/relationships" xmlns:p="http://schemas.openxmlformats.org/presentationml/2006/main">
+  <p:cSld>
+    <p:spTree>
+      <p:nvGrpSpPr>
+        <p:cNvPr id="1" name=""/>
+        <p:cNvGrpSpPr/>
+        <p:nvPr/>
+      </p:nvGrpSpPr>
+      <p:grpSpPr>
+        <a:xfrm>
+          <a:off x="0" y="0"/>
+          <a:ext cx="0" cy="0"/>
+          <a:chOff x="0" y="0"/>
+          <a:chExt cx="0" cy="0"/>
+        </a:xfrm>
+      </p:grpSpPr>
+      <p:sp>
+        <p:nvSpPr>
+          <p:cNvPr id="2" name="Title 1">
+            <a:extLst>
+              <a:ext uri="{FF2B5EF4-FFF2-40B4-BE49-F238E27FC236}">
+                <a16:creationId xmlns:a16="http://schemas.microsoft.com/office/drawing/2014/main" id="{4B68C435-CE4F-4540-C0C5-A2AFFE0AC6CD}"/>
+              </a:ext>
+            </a:extLst>
+          </p:cNvPr>
+          <p:cNvSpPr>
+            <a:spLocks noGrp="1"/>
+          </p:cNvSpPr>
+          <p:nvPr>
+            <p:ph type="title"/>
+          </p:nvPr>
+        </p:nvSpPr>
+        <p:spPr>
+          <a:xfrm>
+            <a:off x="838200" y="365125"/>
+            <a:ext cx="10515600" cy="1687962"/>
+          </a:xfrm>
+        </p:spPr>
+        <p:txBody>
+          <a:bodyPr>
+            <a:normAutofit/>
+          </a:bodyPr>
+          <a:lstStyle/>
+          <a:p>
+            <a:pPr algn="ctr"/>
+            <a:r>
+              <a:rPr lang="bg-BG" dirty="0">
+                <a:latin typeface="Arial" panose="020B0604020202020204" pitchFamily="34" charset="0"/>
+                <a:cs typeface="Arial" panose="020B0604020202020204" pitchFamily="34" charset="0"/>
+              </a:rPr>
+              <a:t>Сортиране с</a:t>
+            </a:r>
+            <a:br>
+              <a:rPr lang="en-US" dirty="0">
+                <a:latin typeface="Arial" panose="020B0604020202020204" pitchFamily="34" charset="0"/>
+                <a:cs typeface="Arial" panose="020B0604020202020204" pitchFamily="34" charset="0"/>
+              </a:rPr>
+            </a:br>
+            <a:r>
+              <a:rPr lang="bg-BG" dirty="0">
+                <a:latin typeface="Arial" panose="020B0604020202020204" pitchFamily="34" charset="0"/>
+                <a:cs typeface="Arial" panose="020B0604020202020204" pitchFamily="34" charset="0"/>
+              </a:rPr>
+              <a:t>(</a:t>
+            </a:r>
+            <a:r>
+              <a:rPr lang="en-US" dirty="0" err="1">
+                <a:latin typeface="Arial" panose="020B0604020202020204" pitchFamily="34" charset="0"/>
+                <a:cs typeface="Arial" panose="020B0604020202020204" pitchFamily="34" charset="0"/>
+              </a:rPr>
+              <a:t>OrderBy</a:t>
+            </a:r>
+            <a:r>
+              <a:rPr lang="en-US" dirty="0">
+                <a:latin typeface="Arial" panose="020B0604020202020204" pitchFamily="34" charset="0"/>
+                <a:cs typeface="Arial" panose="020B0604020202020204" pitchFamily="34" charset="0"/>
+              </a:rPr>
+              <a:t> </a:t>
+            </a:r>
+            <a:r>
+              <a:rPr lang="bg-BG" dirty="0">
+                <a:latin typeface="Arial" panose="020B0604020202020204" pitchFamily="34" charset="0"/>
+                <a:cs typeface="Arial" panose="020B0604020202020204" pitchFamily="34" charset="0"/>
+              </a:rPr>
+              <a:t>и</a:t>
+            </a:r>
+            <a:r>
+              <a:rPr lang="en-US" dirty="0">
+                <a:latin typeface="Arial" panose="020B0604020202020204" pitchFamily="34" charset="0"/>
+                <a:cs typeface="Arial" panose="020B0604020202020204" pitchFamily="34" charset="0"/>
+              </a:rPr>
+              <a:t> </a:t>
+            </a:r>
+            <a:r>
+              <a:rPr lang="en-US" dirty="0" err="1">
+                <a:latin typeface="Arial" panose="020B0604020202020204" pitchFamily="34" charset="0"/>
+                <a:cs typeface="Arial" panose="020B0604020202020204" pitchFamily="34" charset="0"/>
+              </a:rPr>
+              <a:t>OrdereByDescending</a:t>
+            </a:r>
+            <a:r>
+              <a:rPr lang="bg-BG" dirty="0">
+                <a:latin typeface="Arial" panose="020B0604020202020204" pitchFamily="34" charset="0"/>
+                <a:cs typeface="Arial" panose="020B0604020202020204" pitchFamily="34" charset="0"/>
+              </a:rPr>
+              <a:t>)</a:t>
+            </a:r>
+          </a:p>
+        </p:txBody>
+      </p:sp>
+      <p:sp>
+        <p:nvSpPr>
+          <p:cNvPr id="3" name="Content Placeholder 2">
+            <a:extLst>
+              <a:ext uri="{FF2B5EF4-FFF2-40B4-BE49-F238E27FC236}">
+                <a16:creationId xmlns:a16="http://schemas.microsoft.com/office/drawing/2014/main" id="{CF8E0F49-5D32-69BA-F4B7-61F3925EDC8B}"/>
+              </a:ext>
+            </a:extLst>
+          </p:cNvPr>
+          <p:cNvSpPr>
+            <a:spLocks noGrp="1"/>
+          </p:cNvSpPr>
+          <p:nvPr>
+            <p:ph idx="1"/>
+          </p:nvPr>
+        </p:nvSpPr>
+        <p:spPr>
+          <a:xfrm>
+            <a:off x="1283901" y="2558871"/>
+            <a:ext cx="10233800" cy="3488246"/>
+          </a:xfrm>
+        </p:spPr>
+        <p:txBody>
+          <a:bodyPr>
+            <a:normAutofit/>
+          </a:bodyPr>
+          <a:lstStyle/>
+          <a:p>
+            <a:pPr marL="0" indent="0">
+              <a:buNone/>
+            </a:pPr>
+            <a:r>
+              <a:rPr lang="en-US" sz="2400" dirty="0">
+                <a:solidFill>
+                  <a:schemeClr val="tx2">
+                    <a:lumMod val="75000"/>
+                  </a:schemeClr>
+                </a:solidFill>
+                <a:latin typeface="Consolas" panose="020B0609020204030204" pitchFamily="49" charset="0"/>
+              </a:rPr>
+              <a:t>List</a:t>
+            </a:r>
+            <a:r>
+              <a:rPr lang="en-US" sz="2400" dirty="0">
+                <a:solidFill>
+                  <a:schemeClr val="tx1"/>
+                </a:solidFill>
+                <a:latin typeface="Consolas" panose="020B0609020204030204" pitchFamily="49" charset="0"/>
+              </a:rPr>
+              <a:t>&lt;int&gt; </a:t>
+            </a:r>
+            <a:r>
+              <a:rPr lang="en-US" sz="2400" dirty="0">
+                <a:solidFill>
+                  <a:srgbClr val="92D050"/>
+                </a:solidFill>
+                <a:latin typeface="Consolas" panose="020B0609020204030204" pitchFamily="49" charset="0"/>
+              </a:rPr>
+              <a:t>numbers</a:t>
+            </a:r>
+            <a:r>
+              <a:rPr lang="en-US" sz="2400" dirty="0">
+                <a:solidFill>
+                  <a:schemeClr val="tx1"/>
+                </a:solidFill>
+                <a:latin typeface="Consolas" panose="020B0609020204030204" pitchFamily="49" charset="0"/>
+              </a:rPr>
+              <a:t> = </a:t>
+            </a:r>
+          </a:p>
+          <a:p>
+            <a:pPr marL="0" indent="0">
+              <a:buNone/>
+            </a:pPr>
+            <a:r>
+              <a:rPr lang="en-US" sz="2400" dirty="0">
+                <a:solidFill>
+                  <a:schemeClr val="tx1"/>
+                </a:solidFill>
+                <a:latin typeface="Consolas" panose="020B0609020204030204" pitchFamily="49" charset="0"/>
+              </a:rPr>
+              <a:t>	new </a:t>
+            </a:r>
+            <a:r>
+              <a:rPr lang="en-US" sz="2400" dirty="0">
+                <a:solidFill>
+                  <a:schemeClr val="tx2">
+                    <a:lumMod val="75000"/>
+                  </a:schemeClr>
+                </a:solidFill>
+                <a:latin typeface="Consolas" panose="020B0609020204030204" pitchFamily="49" charset="0"/>
+              </a:rPr>
+              <a:t>List</a:t>
+            </a:r>
+            <a:r>
+              <a:rPr lang="en-US" sz="2400" dirty="0">
+                <a:solidFill>
+                  <a:schemeClr val="tx1"/>
+                </a:solidFill>
+                <a:latin typeface="Consolas" panose="020B0609020204030204" pitchFamily="49" charset="0"/>
+              </a:rPr>
+              <a:t>&lt;int&gt;() { 1</a:t>
+            </a:r>
+            <a:r>
+              <a:rPr lang="bg-BG" sz="2400" dirty="0">
+                <a:solidFill>
+                  <a:schemeClr val="tx1"/>
+                </a:solidFill>
+                <a:latin typeface="Consolas" panose="020B0609020204030204" pitchFamily="49" charset="0"/>
+              </a:rPr>
+              <a:t>3</a:t>
+            </a:r>
+            <a:r>
+              <a:rPr lang="en-US" sz="2400" dirty="0">
+                <a:solidFill>
+                  <a:schemeClr val="tx1"/>
+                </a:solidFill>
+                <a:latin typeface="Consolas" panose="020B0609020204030204" pitchFamily="49" charset="0"/>
+              </a:rPr>
+              <a:t>, 2, </a:t>
+            </a:r>
+            <a:r>
+              <a:rPr lang="bg-BG" sz="2400" dirty="0">
+                <a:solidFill>
+                  <a:schemeClr val="tx1"/>
+                </a:solidFill>
+                <a:latin typeface="Consolas" panose="020B0609020204030204" pitchFamily="49" charset="0"/>
+              </a:rPr>
+              <a:t>4</a:t>
+            </a:r>
+            <a:r>
+              <a:rPr lang="en-US" sz="2400" dirty="0">
+                <a:solidFill>
+                  <a:schemeClr val="tx1"/>
+                </a:solidFill>
+                <a:latin typeface="Consolas" panose="020B0609020204030204" pitchFamily="49" charset="0"/>
+              </a:rPr>
+              <a:t>, </a:t>
+            </a:r>
+            <a:r>
+              <a:rPr lang="bg-BG" sz="2400" dirty="0">
+                <a:solidFill>
+                  <a:schemeClr val="tx1"/>
+                </a:solidFill>
+                <a:latin typeface="Consolas" panose="020B0609020204030204" pitchFamily="49" charset="0"/>
+              </a:rPr>
+              <a:t>22</a:t>
+            </a:r>
+            <a:r>
+              <a:rPr lang="en-US" sz="2400" dirty="0">
+                <a:solidFill>
+                  <a:schemeClr val="tx1"/>
+                </a:solidFill>
+                <a:latin typeface="Consolas" panose="020B0609020204030204" pitchFamily="49" charset="0"/>
+              </a:rPr>
+              <a:t>, </a:t>
+            </a:r>
+            <a:r>
+              <a:rPr lang="bg-BG" sz="2400" dirty="0">
+                <a:solidFill>
+                  <a:schemeClr val="tx1"/>
+                </a:solidFill>
+                <a:latin typeface="Consolas" panose="020B0609020204030204" pitchFamily="49" charset="0"/>
+              </a:rPr>
+              <a:t>17</a:t>
+            </a:r>
+            <a:r>
+              <a:rPr lang="en-US" sz="2400" dirty="0">
+                <a:solidFill>
+                  <a:schemeClr val="tx1"/>
+                </a:solidFill>
+                <a:latin typeface="Consolas" panose="020B0609020204030204" pitchFamily="49" charset="0"/>
+              </a:rPr>
+              <a:t>, 6</a:t>
+            </a:r>
+            <a:r>
+              <a:rPr lang="bg-BG" sz="2400" dirty="0">
+                <a:solidFill>
+                  <a:schemeClr val="tx1"/>
+                </a:solidFill>
+                <a:latin typeface="Consolas" panose="020B0609020204030204" pitchFamily="49" charset="0"/>
+              </a:rPr>
+              <a:t>1</a:t>
+            </a:r>
+            <a:r>
+              <a:rPr lang="en-US" sz="2400" dirty="0">
+                <a:solidFill>
+                  <a:schemeClr val="tx1"/>
+                </a:solidFill>
+                <a:latin typeface="Consolas" panose="020B0609020204030204" pitchFamily="49" charset="0"/>
+              </a:rPr>
+              <a:t>, 7, </a:t>
+            </a:r>
+            <a:r>
+              <a:rPr lang="bg-BG" sz="2400" dirty="0">
+                <a:solidFill>
+                  <a:schemeClr val="tx1"/>
+                </a:solidFill>
+                <a:latin typeface="Consolas" panose="020B0609020204030204" pitchFamily="49" charset="0"/>
+              </a:rPr>
+              <a:t>25</a:t>
+            </a:r>
+            <a:r>
+              <a:rPr lang="en-US" sz="2400" dirty="0">
+                <a:solidFill>
+                  <a:schemeClr val="tx1"/>
+                </a:solidFill>
+                <a:latin typeface="Consolas" panose="020B0609020204030204" pitchFamily="49" charset="0"/>
+              </a:rPr>
+              <a:t> };</a:t>
+            </a:r>
+          </a:p>
+          <a:p>
+            <a:endParaRPr lang="en-US" sz="2400" dirty="0">
+              <a:solidFill>
+                <a:schemeClr val="tx1"/>
+              </a:solidFill>
+              <a:latin typeface="Consolas" panose="020B0609020204030204" pitchFamily="49" charset="0"/>
+            </a:endParaRPr>
+          </a:p>
+          <a:p>
+            <a:pPr marL="0" indent="0">
+              <a:buNone/>
+            </a:pPr>
+            <a:r>
+              <a:rPr lang="en-US" sz="2400" dirty="0">
+                <a:solidFill>
+                  <a:schemeClr val="tx2">
+                    <a:lumMod val="75000"/>
+                  </a:schemeClr>
+                </a:solidFill>
+                <a:latin typeface="Consolas" panose="020B0609020204030204" pitchFamily="49" charset="0"/>
+              </a:rPr>
+              <a:t>List</a:t>
+            </a:r>
+            <a:r>
+              <a:rPr lang="en-US" sz="2400" dirty="0">
+                <a:solidFill>
+                  <a:schemeClr val="tx1"/>
+                </a:solidFill>
+                <a:latin typeface="Consolas" panose="020B0609020204030204" pitchFamily="49" charset="0"/>
+              </a:rPr>
+              <a:t>&lt;int&gt;</a:t>
+            </a:r>
+            <a:r>
+              <a:rPr lang="en-US" sz="2400" dirty="0">
+                <a:solidFill>
+                  <a:schemeClr val="tx2">
+                    <a:lumMod val="75000"/>
+                  </a:schemeClr>
+                </a:solidFill>
+                <a:latin typeface="Consolas" panose="020B0609020204030204" pitchFamily="49" charset="0"/>
+              </a:rPr>
+              <a:t> </a:t>
+            </a:r>
+            <a:r>
+              <a:rPr lang="en-US" sz="2400" dirty="0" err="1">
+                <a:solidFill>
+                  <a:srgbClr val="92D050"/>
+                </a:solidFill>
+                <a:latin typeface="Consolas" panose="020B0609020204030204" pitchFamily="49" charset="0"/>
+              </a:rPr>
+              <a:t>orderedOrderBy</a:t>
+            </a:r>
+            <a:r>
+              <a:rPr lang="en-US" sz="2400" dirty="0">
+                <a:solidFill>
+                  <a:schemeClr val="tx1"/>
+                </a:solidFill>
+                <a:latin typeface="Consolas" panose="020B0609020204030204" pitchFamily="49" charset="0"/>
+              </a:rPr>
+              <a:t> = </a:t>
+            </a:r>
+          </a:p>
+          <a:p>
+            <a:pPr marL="457200" lvl="1" indent="0">
+              <a:buNone/>
+            </a:pPr>
+            <a:r>
+              <a:rPr lang="en-US" dirty="0">
+                <a:solidFill>
+                  <a:schemeClr val="tx1"/>
+                </a:solidFill>
+                <a:latin typeface="Consolas" panose="020B0609020204030204" pitchFamily="49" charset="0"/>
+              </a:rPr>
+              <a:t>	</a:t>
+            </a:r>
+            <a:r>
+              <a:rPr lang="en-US" dirty="0" err="1">
+                <a:solidFill>
+                  <a:srgbClr val="92D050"/>
+                </a:solidFill>
+                <a:latin typeface="Consolas" panose="020B0609020204030204" pitchFamily="49" charset="0"/>
+              </a:rPr>
+              <a:t>myList</a:t>
+            </a:r>
+            <a:r>
+              <a:rPr lang="en-US" dirty="0" err="1">
+                <a:solidFill>
+                  <a:schemeClr val="tx1"/>
+                </a:solidFill>
+                <a:latin typeface="Consolas" panose="020B0609020204030204" pitchFamily="49" charset="0"/>
+              </a:rPr>
+              <a:t>.</a:t>
+            </a:r>
+            <a:r>
+              <a:rPr lang="en-US" dirty="0" err="1">
+                <a:solidFill>
+                  <a:srgbClr val="FFC000"/>
+                </a:solidFill>
+                <a:latin typeface="Consolas" panose="020B0609020204030204" pitchFamily="49" charset="0"/>
+              </a:rPr>
+              <a:t>OrderBy</a:t>
+            </a:r>
+            <a:r>
+              <a:rPr lang="en-US" dirty="0">
+                <a:solidFill>
+                  <a:schemeClr val="tx1"/>
+                </a:solidFill>
+                <a:latin typeface="Consolas" panose="020B0609020204030204" pitchFamily="49" charset="0"/>
+              </a:rPr>
+              <a:t>(</a:t>
+            </a:r>
+            <a:r>
+              <a:rPr lang="en-US" dirty="0">
+                <a:solidFill>
+                  <a:srgbClr val="FFFF00"/>
+                </a:solidFill>
+                <a:latin typeface="Consolas" panose="020B0609020204030204" pitchFamily="49" charset="0"/>
+              </a:rPr>
+              <a:t>x </a:t>
+            </a:r>
+            <a:r>
+              <a:rPr lang="en-US" dirty="0">
+                <a:solidFill>
+                  <a:srgbClr val="FF0000"/>
+                </a:solidFill>
+                <a:latin typeface="Consolas" panose="020B0609020204030204" pitchFamily="49" charset="0"/>
+              </a:rPr>
+              <a:t>=&gt;</a:t>
+            </a:r>
+            <a:r>
+              <a:rPr lang="en-US" dirty="0">
+                <a:solidFill>
+                  <a:srgbClr val="FFFF00"/>
+                </a:solidFill>
+                <a:latin typeface="Consolas" panose="020B0609020204030204" pitchFamily="49" charset="0"/>
+              </a:rPr>
+              <a:t> x</a:t>
+            </a:r>
+            <a:r>
+              <a:rPr lang="en-US" dirty="0">
+                <a:solidFill>
+                  <a:schemeClr val="tx1"/>
+                </a:solidFill>
+                <a:latin typeface="Consolas" panose="020B0609020204030204" pitchFamily="49" charset="0"/>
+              </a:rPr>
+              <a:t>).</a:t>
+            </a:r>
+            <a:r>
+              <a:rPr lang="en-US" dirty="0" err="1">
+                <a:solidFill>
+                  <a:schemeClr val="tx1"/>
+                </a:solidFill>
+                <a:latin typeface="Consolas" panose="020B0609020204030204" pitchFamily="49" charset="0"/>
+              </a:rPr>
+              <a:t>ToList</a:t>
+            </a:r>
+            <a:r>
+              <a:rPr lang="en-US" dirty="0">
+                <a:solidFill>
+                  <a:schemeClr val="tx1"/>
+                </a:solidFill>
+                <a:latin typeface="Consolas" panose="020B0609020204030204" pitchFamily="49" charset="0"/>
+              </a:rPr>
+              <a:t>();</a:t>
+            </a:r>
+          </a:p>
+          <a:p>
+            <a:pPr marL="457200" lvl="1" indent="0">
+              <a:buNone/>
+            </a:pPr>
+            <a:endParaRPr lang="en-US" dirty="0">
+              <a:solidFill>
+                <a:schemeClr val="tx1"/>
+              </a:solidFill>
+              <a:latin typeface="Consolas" panose="020B0609020204030204" pitchFamily="49" charset="0"/>
+            </a:endParaRPr>
+          </a:p>
+          <a:p>
+            <a:pPr marL="0" indent="0">
+              <a:buNone/>
+            </a:pPr>
+            <a:r>
+              <a:rPr lang="en-US" sz="2400" dirty="0">
+                <a:solidFill>
+                  <a:schemeClr val="tx2">
+                    <a:lumMod val="75000"/>
+                  </a:schemeClr>
+                </a:solidFill>
+                <a:latin typeface="Consolas" panose="020B0609020204030204" pitchFamily="49" charset="0"/>
+              </a:rPr>
+              <a:t>List</a:t>
+            </a:r>
+            <a:r>
+              <a:rPr lang="en-US" sz="2400" dirty="0">
+                <a:solidFill>
+                  <a:schemeClr val="tx1"/>
+                </a:solidFill>
+                <a:latin typeface="Consolas" panose="020B0609020204030204" pitchFamily="49" charset="0"/>
+              </a:rPr>
+              <a:t>&lt;int&gt;</a:t>
+            </a:r>
+            <a:r>
+              <a:rPr lang="en-US" sz="2400" dirty="0">
+                <a:solidFill>
+                  <a:schemeClr val="tx2">
+                    <a:lumMod val="75000"/>
+                  </a:schemeClr>
+                </a:solidFill>
+                <a:latin typeface="Consolas" panose="020B0609020204030204" pitchFamily="49" charset="0"/>
+              </a:rPr>
+              <a:t> </a:t>
+            </a:r>
+            <a:r>
+              <a:rPr lang="en-US" sz="2400" dirty="0" err="1">
+                <a:solidFill>
+                  <a:srgbClr val="92D050"/>
+                </a:solidFill>
+                <a:latin typeface="Consolas" panose="020B0609020204030204" pitchFamily="49" charset="0"/>
+              </a:rPr>
+              <a:t>orderedOrderByDesc</a:t>
+            </a:r>
+            <a:r>
+              <a:rPr lang="en-US" sz="2400" dirty="0">
+                <a:solidFill>
+                  <a:schemeClr val="tx1"/>
+                </a:solidFill>
+                <a:latin typeface="Consolas" panose="020B0609020204030204" pitchFamily="49" charset="0"/>
+              </a:rPr>
+              <a:t> = </a:t>
+            </a:r>
+          </a:p>
+          <a:p>
+            <a:pPr marL="457200" lvl="1" indent="0">
+              <a:buNone/>
+            </a:pPr>
+            <a:r>
+              <a:rPr lang="en-US" dirty="0">
+                <a:solidFill>
+                  <a:schemeClr val="tx1"/>
+                </a:solidFill>
+                <a:latin typeface="Consolas" panose="020B0609020204030204" pitchFamily="49" charset="0"/>
+              </a:rPr>
+              <a:t>	</a:t>
+            </a:r>
+            <a:r>
+              <a:rPr lang="en-US" dirty="0" err="1">
+                <a:solidFill>
+                  <a:srgbClr val="92D050"/>
+                </a:solidFill>
+                <a:latin typeface="Consolas" panose="020B0609020204030204" pitchFamily="49" charset="0"/>
+              </a:rPr>
+              <a:t>myList</a:t>
+            </a:r>
+            <a:r>
+              <a:rPr lang="en-US" dirty="0" err="1">
+                <a:solidFill>
+                  <a:schemeClr val="tx1"/>
+                </a:solidFill>
+                <a:latin typeface="Consolas" panose="020B0609020204030204" pitchFamily="49" charset="0"/>
+              </a:rPr>
+              <a:t>.</a:t>
+            </a:r>
+            <a:r>
+              <a:rPr lang="en-US" dirty="0" err="1">
+                <a:solidFill>
+                  <a:srgbClr val="FFC000"/>
+                </a:solidFill>
+                <a:latin typeface="Consolas" panose="020B0609020204030204" pitchFamily="49" charset="0"/>
+              </a:rPr>
+              <a:t>OrderByDescending</a:t>
+            </a:r>
+            <a:r>
+              <a:rPr lang="en-US" dirty="0">
+                <a:solidFill>
+                  <a:schemeClr val="tx1"/>
+                </a:solidFill>
+                <a:latin typeface="Consolas" panose="020B0609020204030204" pitchFamily="49" charset="0"/>
+              </a:rPr>
+              <a:t>(</a:t>
+            </a:r>
+            <a:r>
+              <a:rPr lang="en-US" dirty="0">
+                <a:solidFill>
+                  <a:srgbClr val="FFFF00"/>
+                </a:solidFill>
+                <a:latin typeface="Consolas" panose="020B0609020204030204" pitchFamily="49" charset="0"/>
+              </a:rPr>
+              <a:t>x </a:t>
+            </a:r>
+            <a:r>
+              <a:rPr lang="en-US" dirty="0">
+                <a:solidFill>
+                  <a:srgbClr val="FF0000"/>
+                </a:solidFill>
+                <a:latin typeface="Consolas" panose="020B0609020204030204" pitchFamily="49" charset="0"/>
+              </a:rPr>
+              <a:t>=&gt;</a:t>
+            </a:r>
+            <a:r>
+              <a:rPr lang="en-US" dirty="0">
+                <a:solidFill>
+                  <a:srgbClr val="FFFF00"/>
+                </a:solidFill>
+                <a:latin typeface="Consolas" panose="020B0609020204030204" pitchFamily="49" charset="0"/>
+              </a:rPr>
+              <a:t> x</a:t>
+            </a:r>
+            <a:r>
+              <a:rPr lang="en-US" dirty="0">
+                <a:solidFill>
+                  <a:schemeClr val="tx1"/>
+                </a:solidFill>
+                <a:latin typeface="Consolas" panose="020B0609020204030204" pitchFamily="49" charset="0"/>
+              </a:rPr>
+              <a:t>).</a:t>
+            </a:r>
+            <a:r>
+              <a:rPr lang="en-US" dirty="0" err="1">
+                <a:solidFill>
+                  <a:schemeClr val="tx1"/>
+                </a:solidFill>
+                <a:latin typeface="Consolas" panose="020B0609020204030204" pitchFamily="49" charset="0"/>
+              </a:rPr>
+              <a:t>ToList</a:t>
+            </a:r>
+            <a:r>
+              <a:rPr lang="en-US" dirty="0">
+                <a:solidFill>
+                  <a:schemeClr val="tx1"/>
+                </a:solidFill>
+                <a:latin typeface="Consolas" panose="020B0609020204030204" pitchFamily="49" charset="0"/>
+              </a:rPr>
+              <a:t>();</a:t>
+            </a:r>
+          </a:p>
+          <a:p>
+            <a:pPr marL="457200" lvl="1" indent="0">
+              <a:buNone/>
+            </a:pPr>
+            <a:endParaRPr lang="en-US" dirty="0">
+              <a:solidFill>
+                <a:schemeClr val="tx1"/>
+              </a:solidFill>
+              <a:latin typeface="Consolas" panose="020B0609020204030204" pitchFamily="49" charset="0"/>
+            </a:endParaRPr>
+          </a:p>
+          <a:p>
+            <a:pPr marL="0" indent="0">
+              <a:buNone/>
+            </a:pPr>
+            <a:endParaRPr lang="bg-BG" dirty="0"/>
+          </a:p>
+        </p:txBody>
+      </p:sp>
+    </p:spTree>
+    <p:extLst>
+      <p:ext uri="{BB962C8B-B14F-4D97-AF65-F5344CB8AC3E}">
+        <p14:creationId xmlns:p14="http://schemas.microsoft.com/office/powerpoint/2010/main" val="3517562372"/>
+      </p:ext>
+    </p:extLst>
+  </p:cSld>
+  <p:clrMapOvr>
+    <a:masterClrMapping/>
+  </p:clrMapOvr>
+</p:sld>
+</file>
+
+<file path=ppt/slides/slide41.xml><?xml version="1.0" encoding="utf-8"?>
+<p:sld xmlns:a="http://schemas.openxmlformats.org/drawingml/2006/main" xmlns:r="http://schemas.openxmlformats.org/officeDocument/2006/relationships" xmlns:p="http://schemas.openxmlformats.org/presentationml/2006/main">
+  <p:cSld>
+    <p:spTree>
+      <p:nvGrpSpPr>
+        <p:cNvPr id="1" name=""/>
+        <p:cNvGrpSpPr/>
+        <p:nvPr/>
+      </p:nvGrpSpPr>
+      <p:grpSpPr>
+        <a:xfrm>
+          <a:off x="0" y="0"/>
+          <a:ext cx="0" cy="0"/>
+          <a:chOff x="0" y="0"/>
+          <a:chExt cx="0" cy="0"/>
+        </a:xfrm>
+      </p:grpSpPr>
+      <p:sp>
+        <p:nvSpPr>
+          <p:cNvPr id="2" name="Title 1">
+            <a:extLst>
+              <a:ext uri="{FF2B5EF4-FFF2-40B4-BE49-F238E27FC236}">
+                <a16:creationId xmlns:a16="http://schemas.microsoft.com/office/drawing/2014/main" id="{4B68C435-CE4F-4540-C0C5-A2AFFE0AC6CD}"/>
+              </a:ext>
+            </a:extLst>
+          </p:cNvPr>
+          <p:cNvSpPr>
+            <a:spLocks noGrp="1"/>
+          </p:cNvSpPr>
+          <p:nvPr>
+            <p:ph type="title"/>
+          </p:nvPr>
+        </p:nvSpPr>
+        <p:spPr/>
+        <p:txBody>
+          <a:bodyPr>
+            <a:normAutofit fontScale="90000"/>
+          </a:bodyPr>
+          <a:lstStyle/>
+          <a:p>
+            <a:pPr algn="ctr"/>
+            <a:r>
+              <a:rPr lang="bg-BG" dirty="0">
+                <a:latin typeface="Arial" panose="020B0604020202020204" pitchFamily="34" charset="0"/>
+                <a:cs typeface="Arial" panose="020B0604020202020204" pitchFamily="34" charset="0"/>
+              </a:rPr>
+              <a:t>Вземи първия по зададен критерий</a:t>
+            </a:r>
+            <a:r>
+              <a:rPr lang="en-US" dirty="0">
+                <a:latin typeface="Arial" panose="020B0604020202020204" pitchFamily="34" charset="0"/>
+                <a:cs typeface="Arial" panose="020B0604020202020204" pitchFamily="34" charset="0"/>
+              </a:rPr>
+              <a:t> (</a:t>
+            </a:r>
+            <a:r>
+              <a:rPr lang="en-US" dirty="0" err="1">
+                <a:latin typeface="Arial" panose="020B0604020202020204" pitchFamily="34" charset="0"/>
+                <a:cs typeface="Arial" panose="020B0604020202020204" pitchFamily="34" charset="0"/>
+              </a:rPr>
+              <a:t>FirstOrDefault</a:t>
+            </a:r>
+            <a:r>
+              <a:rPr lang="en-US" dirty="0">
+                <a:latin typeface="Arial" panose="020B0604020202020204" pitchFamily="34" charset="0"/>
+                <a:cs typeface="Arial" panose="020B0604020202020204" pitchFamily="34" charset="0"/>
+              </a:rPr>
+              <a:t>)</a:t>
+            </a:r>
+            <a:endParaRPr lang="bg-BG" dirty="0">
+              <a:latin typeface="Arial" panose="020B0604020202020204" pitchFamily="34" charset="0"/>
+              <a:cs typeface="Arial" panose="020B0604020202020204" pitchFamily="34" charset="0"/>
+            </a:endParaRPr>
+          </a:p>
+        </p:txBody>
+      </p:sp>
+      <p:sp>
+        <p:nvSpPr>
+          <p:cNvPr id="3" name="Content Placeholder 2">
+            <a:extLst>
+              <a:ext uri="{FF2B5EF4-FFF2-40B4-BE49-F238E27FC236}">
+                <a16:creationId xmlns:a16="http://schemas.microsoft.com/office/drawing/2014/main" id="{CF8E0F49-5D32-69BA-F4B7-61F3925EDC8B}"/>
+              </a:ext>
+            </a:extLst>
+          </p:cNvPr>
+          <p:cNvSpPr>
+            <a:spLocks noGrp="1"/>
+          </p:cNvSpPr>
+          <p:nvPr>
+            <p:ph idx="1"/>
+          </p:nvPr>
+        </p:nvSpPr>
+        <p:spPr>
+          <a:xfrm>
+            <a:off x="1283901" y="2558871"/>
+            <a:ext cx="10233800" cy="2573847"/>
+          </a:xfrm>
+        </p:spPr>
+        <p:txBody>
+          <a:bodyPr/>
+          <a:lstStyle/>
+          <a:p>
+            <a:pPr marL="0" indent="0">
+              <a:buNone/>
+            </a:pPr>
+            <a:r>
+              <a:rPr lang="en-US" sz="2400" dirty="0">
+                <a:solidFill>
+                  <a:schemeClr val="tx2">
+                    <a:lumMod val="75000"/>
+                  </a:schemeClr>
+                </a:solidFill>
+                <a:latin typeface="Consolas" panose="020B0609020204030204" pitchFamily="49" charset="0"/>
+              </a:rPr>
+              <a:t>List</a:t>
+            </a:r>
+            <a:r>
+              <a:rPr lang="en-US" sz="2400" dirty="0">
+                <a:solidFill>
+                  <a:schemeClr val="tx1"/>
+                </a:solidFill>
+                <a:latin typeface="Consolas" panose="020B0609020204030204" pitchFamily="49" charset="0"/>
+              </a:rPr>
+              <a:t>&lt;int&gt; </a:t>
+            </a:r>
+            <a:r>
+              <a:rPr lang="en-US" sz="2400" dirty="0">
+                <a:solidFill>
+                  <a:srgbClr val="92D050"/>
+                </a:solidFill>
+                <a:latin typeface="Consolas" panose="020B0609020204030204" pitchFamily="49" charset="0"/>
+              </a:rPr>
+              <a:t>numbers</a:t>
+            </a:r>
+            <a:r>
+              <a:rPr lang="en-US" sz="2400" dirty="0">
+                <a:solidFill>
+                  <a:schemeClr val="tx1"/>
+                </a:solidFill>
+                <a:latin typeface="Consolas" panose="020B0609020204030204" pitchFamily="49" charset="0"/>
+              </a:rPr>
+              <a:t> = </a:t>
+            </a:r>
+          </a:p>
+          <a:p>
+            <a:pPr marL="0" indent="0">
+              <a:buNone/>
+            </a:pPr>
+            <a:r>
+              <a:rPr lang="en-US" sz="2400" dirty="0">
+                <a:solidFill>
+                  <a:schemeClr val="tx1"/>
+                </a:solidFill>
+                <a:latin typeface="Consolas" panose="020B0609020204030204" pitchFamily="49" charset="0"/>
+              </a:rPr>
+              <a:t>	new </a:t>
+            </a:r>
+            <a:r>
+              <a:rPr lang="en-US" sz="2400" dirty="0">
+                <a:solidFill>
+                  <a:schemeClr val="tx2">
+                    <a:lumMod val="75000"/>
+                  </a:schemeClr>
+                </a:solidFill>
+                <a:latin typeface="Consolas" panose="020B0609020204030204" pitchFamily="49" charset="0"/>
+              </a:rPr>
+              <a:t>List</a:t>
+            </a:r>
+            <a:r>
+              <a:rPr lang="en-US" sz="2400" dirty="0">
+                <a:solidFill>
+                  <a:schemeClr val="tx1"/>
+                </a:solidFill>
+                <a:latin typeface="Consolas" panose="020B0609020204030204" pitchFamily="49" charset="0"/>
+              </a:rPr>
+              <a:t>&lt;int&gt;() { 1, 2, 3, 4, 5, 6, 7, 8 };</a:t>
+            </a:r>
+          </a:p>
+          <a:p>
+            <a:endParaRPr lang="en-US" sz="2400" dirty="0">
+              <a:solidFill>
+                <a:schemeClr val="tx1"/>
+              </a:solidFill>
+              <a:latin typeface="Consolas" panose="020B0609020204030204" pitchFamily="49" charset="0"/>
+            </a:endParaRPr>
+          </a:p>
+          <a:p>
+            <a:pPr marL="0" indent="0">
+              <a:buNone/>
+            </a:pPr>
+            <a:r>
+              <a:rPr lang="en-US" sz="2400" dirty="0">
+                <a:solidFill>
+                  <a:schemeClr val="tx2">
+                    <a:lumMod val="75000"/>
+                  </a:schemeClr>
+                </a:solidFill>
+                <a:latin typeface="Consolas" panose="020B0609020204030204" pitchFamily="49" charset="0"/>
+              </a:rPr>
+              <a:t>int </a:t>
+            </a:r>
+            <a:r>
+              <a:rPr lang="en-US" sz="2400" dirty="0" err="1">
+                <a:solidFill>
+                  <a:srgbClr val="92D050"/>
+                </a:solidFill>
+                <a:latin typeface="Consolas" panose="020B0609020204030204" pitchFamily="49" charset="0"/>
+              </a:rPr>
+              <a:t>firstEvenNum</a:t>
+            </a:r>
+            <a:r>
+              <a:rPr lang="en-US" sz="2400" dirty="0">
+                <a:solidFill>
+                  <a:schemeClr val="tx1"/>
+                </a:solidFill>
+                <a:latin typeface="Consolas" panose="020B0609020204030204" pitchFamily="49" charset="0"/>
+              </a:rPr>
+              <a:t> = </a:t>
+            </a:r>
+          </a:p>
+          <a:p>
+            <a:pPr marL="457200" lvl="1" indent="0">
+              <a:buNone/>
+            </a:pPr>
+            <a:r>
+              <a:rPr lang="en-US" dirty="0">
+                <a:solidFill>
+                  <a:schemeClr val="tx1"/>
+                </a:solidFill>
+                <a:latin typeface="Consolas" panose="020B0609020204030204" pitchFamily="49" charset="0"/>
+              </a:rPr>
+              <a:t>	</a:t>
+            </a:r>
+            <a:r>
+              <a:rPr lang="en-US" dirty="0" err="1">
+                <a:solidFill>
+                  <a:srgbClr val="92D050"/>
+                </a:solidFill>
+                <a:latin typeface="Consolas" panose="020B0609020204030204" pitchFamily="49" charset="0"/>
+              </a:rPr>
+              <a:t>myList</a:t>
+            </a:r>
+            <a:r>
+              <a:rPr lang="en-US" dirty="0" err="1">
+                <a:solidFill>
+                  <a:schemeClr val="tx1"/>
+                </a:solidFill>
+                <a:latin typeface="Consolas" panose="020B0609020204030204" pitchFamily="49" charset="0"/>
+              </a:rPr>
+              <a:t>.</a:t>
+            </a:r>
+            <a:r>
+              <a:rPr lang="en-US" dirty="0" err="1">
+                <a:solidFill>
+                  <a:srgbClr val="FFC000"/>
+                </a:solidFill>
+                <a:latin typeface="Consolas" panose="020B0609020204030204" pitchFamily="49" charset="0"/>
+              </a:rPr>
+              <a:t>FirstOrDefault</a:t>
+            </a:r>
+            <a:r>
+              <a:rPr lang="en-US" dirty="0">
+                <a:solidFill>
+                  <a:schemeClr val="tx1"/>
+                </a:solidFill>
+                <a:latin typeface="Consolas" panose="020B0609020204030204" pitchFamily="49" charset="0"/>
+              </a:rPr>
+              <a:t>(</a:t>
+            </a:r>
+            <a:r>
+              <a:rPr lang="en-US" dirty="0">
+                <a:solidFill>
+                  <a:srgbClr val="FFFF00"/>
+                </a:solidFill>
+                <a:latin typeface="Consolas" panose="020B0609020204030204" pitchFamily="49" charset="0"/>
+              </a:rPr>
+              <a:t>x </a:t>
+            </a:r>
+            <a:r>
+              <a:rPr lang="en-US" dirty="0">
+                <a:solidFill>
+                  <a:srgbClr val="FF0000"/>
+                </a:solidFill>
+                <a:latin typeface="Consolas" panose="020B0609020204030204" pitchFamily="49" charset="0"/>
+              </a:rPr>
+              <a:t>=&gt;</a:t>
+            </a:r>
+            <a:r>
+              <a:rPr lang="en-US" dirty="0">
+                <a:solidFill>
+                  <a:srgbClr val="FFFF00"/>
+                </a:solidFill>
+                <a:latin typeface="Consolas" panose="020B0609020204030204" pitchFamily="49" charset="0"/>
+              </a:rPr>
+              <a:t> x % 2 == 0</a:t>
+            </a:r>
+            <a:r>
+              <a:rPr lang="en-US" dirty="0">
+                <a:solidFill>
+                  <a:schemeClr val="tx1"/>
+                </a:solidFill>
+                <a:latin typeface="Consolas" panose="020B0609020204030204" pitchFamily="49" charset="0"/>
+              </a:rPr>
+              <a:t>);</a:t>
+            </a:r>
+          </a:p>
+          <a:p>
+            <a:pPr marL="0" indent="0">
+              <a:buNone/>
+            </a:pPr>
+            <a:endParaRPr lang="bg-BG" dirty="0"/>
+          </a:p>
+        </p:txBody>
+      </p:sp>
+    </p:spTree>
+    <p:extLst>
+      <p:ext uri="{BB962C8B-B14F-4D97-AF65-F5344CB8AC3E}">
+        <p14:creationId xmlns:p14="http://schemas.microsoft.com/office/powerpoint/2010/main" val="3192143942"/>
+      </p:ext>
+    </p:extLst>
+  </p:cSld>
+  <p:clrMapOvr>
+    <a:masterClrMapping/>
+  </p:clrMapOvr>
+</p:sld>
+</file>
+
+<file path=ppt/slides/slide42.xml><?xml version="1.0" encoding="utf-8"?>
+<p:sld xmlns:a="http://schemas.openxmlformats.org/drawingml/2006/main" xmlns:r="http://schemas.openxmlformats.org/officeDocument/2006/relationships" xmlns:p="http://schemas.openxmlformats.org/presentationml/2006/main">
+  <p:cSld>
+    <p:spTree>
+      <p:nvGrpSpPr>
+        <p:cNvPr id="1" name=""/>
+        <p:cNvGrpSpPr/>
+        <p:nvPr/>
+      </p:nvGrpSpPr>
+      <p:grpSpPr>
+        <a:xfrm>
+          <a:off x="0" y="0"/>
+          <a:ext cx="0" cy="0"/>
+          <a:chOff x="0" y="0"/>
+          <a:chExt cx="0" cy="0"/>
+        </a:xfrm>
+      </p:grpSpPr>
+      <p:sp>
+        <p:nvSpPr>
+          <p:cNvPr id="2" name="Title 1">
+            <a:extLst>
+              <a:ext uri="{FF2B5EF4-FFF2-40B4-BE49-F238E27FC236}">
+                <a16:creationId xmlns:a16="http://schemas.microsoft.com/office/drawing/2014/main" id="{4B68C435-CE4F-4540-C0C5-A2AFFE0AC6CD}"/>
+              </a:ext>
+            </a:extLst>
+          </p:cNvPr>
+          <p:cNvSpPr>
+            <a:spLocks noGrp="1"/>
+          </p:cNvSpPr>
+          <p:nvPr>
+            <p:ph type="title"/>
+          </p:nvPr>
+        </p:nvSpPr>
+        <p:spPr/>
+        <p:txBody>
+          <a:bodyPr>
+            <a:normAutofit/>
+          </a:bodyPr>
+          <a:lstStyle/>
+          <a:p>
+            <a:pPr algn="ctr"/>
+            <a:r>
+              <a:rPr lang="en-US" dirty="0">
+                <a:latin typeface="Arial" panose="020B0604020202020204" pitchFamily="34" charset="0"/>
+                <a:cs typeface="Arial" panose="020B0604020202020204" pitchFamily="34" charset="0"/>
+              </a:rPr>
+              <a:t>Max </a:t>
+            </a:r>
+            <a:r>
+              <a:rPr lang="bg-BG" dirty="0">
+                <a:latin typeface="Arial" panose="020B0604020202020204" pitchFamily="34" charset="0"/>
+                <a:cs typeface="Arial" panose="020B0604020202020204" pitchFamily="34" charset="0"/>
+              </a:rPr>
+              <a:t>и </a:t>
+            </a:r>
+            <a:r>
+              <a:rPr lang="en-US" dirty="0">
+                <a:latin typeface="Arial" panose="020B0604020202020204" pitchFamily="34" charset="0"/>
+                <a:cs typeface="Arial" panose="020B0604020202020204" pitchFamily="34" charset="0"/>
+              </a:rPr>
+              <a:t>Min</a:t>
+            </a:r>
+            <a:endParaRPr lang="bg-BG" dirty="0">
+              <a:latin typeface="Arial" panose="020B0604020202020204" pitchFamily="34" charset="0"/>
+              <a:cs typeface="Arial" panose="020B0604020202020204" pitchFamily="34" charset="0"/>
+            </a:endParaRPr>
+          </a:p>
+        </p:txBody>
+      </p:sp>
+      <p:sp>
+        <p:nvSpPr>
+          <p:cNvPr id="3" name="Content Placeholder 2">
+            <a:extLst>
+              <a:ext uri="{FF2B5EF4-FFF2-40B4-BE49-F238E27FC236}">
+                <a16:creationId xmlns:a16="http://schemas.microsoft.com/office/drawing/2014/main" id="{CF8E0F49-5D32-69BA-F4B7-61F3925EDC8B}"/>
+              </a:ext>
+            </a:extLst>
+          </p:cNvPr>
+          <p:cNvSpPr>
+            <a:spLocks noGrp="1"/>
+          </p:cNvSpPr>
+          <p:nvPr>
+            <p:ph idx="1"/>
+          </p:nvPr>
+        </p:nvSpPr>
+        <p:spPr>
+          <a:xfrm>
+            <a:off x="1232143" y="2153430"/>
+            <a:ext cx="10233800" cy="3841929"/>
+          </a:xfrm>
+        </p:spPr>
+        <p:txBody>
+          <a:bodyPr>
+            <a:normAutofit/>
+          </a:bodyPr>
+          <a:lstStyle/>
+          <a:p>
+            <a:pPr marL="0" indent="0">
+              <a:buNone/>
+            </a:pPr>
+            <a:r>
+              <a:rPr lang="en-US" sz="2400" dirty="0">
+                <a:solidFill>
+                  <a:schemeClr val="tx2">
+                    <a:lumMod val="75000"/>
+                  </a:schemeClr>
+                </a:solidFill>
+                <a:latin typeface="Consolas" panose="020B0609020204030204" pitchFamily="49" charset="0"/>
+              </a:rPr>
+              <a:t>List</a:t>
+            </a:r>
+            <a:r>
+              <a:rPr lang="en-US" sz="2400" dirty="0">
+                <a:solidFill>
+                  <a:schemeClr val="tx1"/>
+                </a:solidFill>
+                <a:latin typeface="Consolas" panose="020B0609020204030204" pitchFamily="49" charset="0"/>
+              </a:rPr>
+              <a:t>&lt;int&gt; </a:t>
+            </a:r>
+            <a:r>
+              <a:rPr lang="en-US" sz="2400" dirty="0">
+                <a:solidFill>
+                  <a:srgbClr val="92D050"/>
+                </a:solidFill>
+                <a:latin typeface="Consolas" panose="020B0609020204030204" pitchFamily="49" charset="0"/>
+              </a:rPr>
+              <a:t>numbers</a:t>
+            </a:r>
+            <a:r>
+              <a:rPr lang="en-US" sz="2400" dirty="0">
+                <a:solidFill>
+                  <a:schemeClr val="tx1"/>
+                </a:solidFill>
+                <a:latin typeface="Consolas" panose="020B0609020204030204" pitchFamily="49" charset="0"/>
+              </a:rPr>
+              <a:t> = </a:t>
+            </a:r>
+          </a:p>
+          <a:p>
+            <a:pPr marL="0" indent="0">
+              <a:buNone/>
+            </a:pPr>
+            <a:r>
+              <a:rPr lang="en-US" sz="2400" dirty="0">
+                <a:solidFill>
+                  <a:schemeClr val="tx1"/>
+                </a:solidFill>
+                <a:latin typeface="Consolas" panose="020B0609020204030204" pitchFamily="49" charset="0"/>
+              </a:rPr>
+              <a:t>	new </a:t>
+            </a:r>
+            <a:r>
+              <a:rPr lang="en-US" sz="2400" dirty="0">
+                <a:solidFill>
+                  <a:schemeClr val="tx2">
+                    <a:lumMod val="75000"/>
+                  </a:schemeClr>
+                </a:solidFill>
+                <a:latin typeface="Consolas" panose="020B0609020204030204" pitchFamily="49" charset="0"/>
+              </a:rPr>
+              <a:t>List</a:t>
+            </a:r>
+            <a:r>
+              <a:rPr lang="en-US" sz="2400" dirty="0">
+                <a:solidFill>
+                  <a:schemeClr val="tx1"/>
+                </a:solidFill>
+                <a:latin typeface="Consolas" panose="020B0609020204030204" pitchFamily="49" charset="0"/>
+              </a:rPr>
+              <a:t>&lt;int&gt;() { 1, 2, 3, 4, 5, 6, 7, 8 };</a:t>
+            </a:r>
+          </a:p>
+          <a:p>
+            <a:pPr marL="0" indent="0">
+              <a:buNone/>
+            </a:pPr>
+            <a:endParaRPr lang="en-US" sz="2400" dirty="0">
+              <a:solidFill>
+                <a:schemeClr val="tx1"/>
+              </a:solidFill>
+              <a:latin typeface="Consolas" panose="020B0609020204030204" pitchFamily="49" charset="0"/>
+            </a:endParaRPr>
+          </a:p>
+          <a:p>
+            <a:pPr marL="0" indent="0">
+              <a:buNone/>
+            </a:pPr>
+            <a:r>
+              <a:rPr lang="en-US" sz="2400" dirty="0">
+                <a:solidFill>
+                  <a:schemeClr val="tx2">
+                    <a:lumMod val="75000"/>
+                  </a:schemeClr>
+                </a:solidFill>
+                <a:latin typeface="Consolas" panose="020B0609020204030204" pitchFamily="49" charset="0"/>
+              </a:rPr>
+              <a:t>int </a:t>
+            </a:r>
+            <a:r>
+              <a:rPr lang="en-US" sz="2400" dirty="0" err="1">
+                <a:solidFill>
+                  <a:srgbClr val="92D050"/>
+                </a:solidFill>
+                <a:latin typeface="Consolas" panose="020B0609020204030204" pitchFamily="49" charset="0"/>
+              </a:rPr>
+              <a:t>maxNumber</a:t>
+            </a:r>
+            <a:r>
+              <a:rPr lang="en-US" sz="2400" dirty="0">
+                <a:solidFill>
+                  <a:schemeClr val="tx1"/>
+                </a:solidFill>
+                <a:latin typeface="Consolas" panose="020B0609020204030204" pitchFamily="49" charset="0"/>
+              </a:rPr>
+              <a:t> = </a:t>
+            </a:r>
+          </a:p>
+          <a:p>
+            <a:pPr marL="457200" lvl="1" indent="0">
+              <a:buNone/>
+            </a:pPr>
+            <a:r>
+              <a:rPr lang="en-US" dirty="0">
+                <a:solidFill>
+                  <a:schemeClr val="tx1"/>
+                </a:solidFill>
+                <a:latin typeface="Consolas" panose="020B0609020204030204" pitchFamily="49" charset="0"/>
+              </a:rPr>
+              <a:t>	</a:t>
+            </a:r>
+            <a:r>
+              <a:rPr lang="en-US" dirty="0" err="1">
+                <a:solidFill>
+                  <a:srgbClr val="92D050"/>
+                </a:solidFill>
+                <a:latin typeface="Consolas" panose="020B0609020204030204" pitchFamily="49" charset="0"/>
+              </a:rPr>
+              <a:t>myList</a:t>
+            </a:r>
+            <a:r>
+              <a:rPr lang="en-US" dirty="0" err="1">
+                <a:solidFill>
+                  <a:schemeClr val="tx1"/>
+                </a:solidFill>
+                <a:latin typeface="Consolas" panose="020B0609020204030204" pitchFamily="49" charset="0"/>
+              </a:rPr>
+              <a:t>.</a:t>
+            </a:r>
+            <a:r>
+              <a:rPr lang="en-US" dirty="0" err="1">
+                <a:solidFill>
+                  <a:srgbClr val="FFC000"/>
+                </a:solidFill>
+                <a:latin typeface="Consolas" panose="020B0609020204030204" pitchFamily="49" charset="0"/>
+              </a:rPr>
+              <a:t>Max</a:t>
+            </a:r>
+            <a:r>
+              <a:rPr lang="en-US" dirty="0">
+                <a:solidFill>
+                  <a:schemeClr val="tx1"/>
+                </a:solidFill>
+                <a:latin typeface="Consolas" panose="020B0609020204030204" pitchFamily="49" charset="0"/>
+              </a:rPr>
+              <a:t>(</a:t>
+            </a:r>
+            <a:r>
+              <a:rPr lang="en-US" dirty="0">
+                <a:solidFill>
+                  <a:srgbClr val="FFFF00"/>
+                </a:solidFill>
+                <a:latin typeface="Consolas" panose="020B0609020204030204" pitchFamily="49" charset="0"/>
+              </a:rPr>
+              <a:t>x </a:t>
+            </a:r>
+            <a:r>
+              <a:rPr lang="en-US" dirty="0">
+                <a:solidFill>
+                  <a:srgbClr val="FF0000"/>
+                </a:solidFill>
+                <a:latin typeface="Consolas" panose="020B0609020204030204" pitchFamily="49" charset="0"/>
+              </a:rPr>
+              <a:t>=&gt;</a:t>
+            </a:r>
+            <a:r>
+              <a:rPr lang="en-US" dirty="0">
+                <a:solidFill>
+                  <a:srgbClr val="FFFF00"/>
+                </a:solidFill>
+                <a:latin typeface="Consolas" panose="020B0609020204030204" pitchFamily="49" charset="0"/>
+              </a:rPr>
+              <a:t> x</a:t>
+            </a:r>
+            <a:r>
+              <a:rPr lang="en-US" dirty="0">
+                <a:solidFill>
+                  <a:schemeClr val="tx1"/>
+                </a:solidFill>
+                <a:latin typeface="Consolas" panose="020B0609020204030204" pitchFamily="49" charset="0"/>
+              </a:rPr>
+              <a:t>);</a:t>
+            </a:r>
+          </a:p>
+          <a:p>
+            <a:pPr marL="457200" lvl="1" indent="0">
+              <a:buNone/>
+            </a:pPr>
+            <a:endParaRPr lang="en-US" dirty="0">
+              <a:solidFill>
+                <a:schemeClr val="tx1"/>
+              </a:solidFill>
+              <a:latin typeface="Consolas" panose="020B0609020204030204" pitchFamily="49" charset="0"/>
+            </a:endParaRPr>
+          </a:p>
+          <a:p>
+            <a:pPr marL="0" indent="0">
+              <a:buNone/>
+            </a:pPr>
+            <a:r>
+              <a:rPr lang="en-US" sz="2400" dirty="0">
+                <a:solidFill>
+                  <a:schemeClr val="tx2">
+                    <a:lumMod val="75000"/>
+                  </a:schemeClr>
+                </a:solidFill>
+                <a:latin typeface="Consolas" panose="020B0609020204030204" pitchFamily="49" charset="0"/>
+              </a:rPr>
+              <a:t>int </a:t>
+            </a:r>
+            <a:r>
+              <a:rPr lang="en-US" sz="2400" dirty="0" err="1">
+                <a:solidFill>
+                  <a:srgbClr val="92D050"/>
+                </a:solidFill>
+                <a:latin typeface="Consolas" panose="020B0609020204030204" pitchFamily="49" charset="0"/>
+              </a:rPr>
+              <a:t>minNumber</a:t>
+            </a:r>
+            <a:r>
+              <a:rPr lang="en-US" sz="2400" dirty="0">
+                <a:solidFill>
+                  <a:schemeClr val="tx1"/>
+                </a:solidFill>
+                <a:latin typeface="Consolas" panose="020B0609020204030204" pitchFamily="49" charset="0"/>
+              </a:rPr>
+              <a:t> = </a:t>
+            </a:r>
+          </a:p>
+          <a:p>
+            <a:pPr marL="457200" lvl="1" indent="0">
+              <a:buNone/>
+            </a:pPr>
+            <a:r>
+              <a:rPr lang="en-US" dirty="0">
+                <a:solidFill>
+                  <a:schemeClr val="tx1"/>
+                </a:solidFill>
+                <a:latin typeface="Consolas" panose="020B0609020204030204" pitchFamily="49" charset="0"/>
+              </a:rPr>
+              <a:t>	</a:t>
+            </a:r>
+            <a:r>
+              <a:rPr lang="en-US" dirty="0" err="1">
+                <a:solidFill>
+                  <a:srgbClr val="92D050"/>
+                </a:solidFill>
+                <a:latin typeface="Consolas" panose="020B0609020204030204" pitchFamily="49" charset="0"/>
+              </a:rPr>
+              <a:t>myList</a:t>
+            </a:r>
+            <a:r>
+              <a:rPr lang="en-US" dirty="0" err="1">
+                <a:solidFill>
+                  <a:schemeClr val="tx1"/>
+                </a:solidFill>
+                <a:latin typeface="Consolas" panose="020B0609020204030204" pitchFamily="49" charset="0"/>
+              </a:rPr>
+              <a:t>.</a:t>
+            </a:r>
+            <a:r>
+              <a:rPr lang="en-US" dirty="0" err="1">
+                <a:solidFill>
+                  <a:srgbClr val="FFC000"/>
+                </a:solidFill>
+                <a:latin typeface="Consolas" panose="020B0609020204030204" pitchFamily="49" charset="0"/>
+              </a:rPr>
+              <a:t>Min</a:t>
+            </a:r>
+            <a:r>
+              <a:rPr lang="en-US" dirty="0">
+                <a:solidFill>
+                  <a:schemeClr val="tx1"/>
+                </a:solidFill>
+                <a:latin typeface="Consolas" panose="020B0609020204030204" pitchFamily="49" charset="0"/>
+              </a:rPr>
+              <a:t>(</a:t>
+            </a:r>
+            <a:r>
+              <a:rPr lang="en-US" dirty="0">
+                <a:solidFill>
+                  <a:srgbClr val="FFFF00"/>
+                </a:solidFill>
+                <a:latin typeface="Consolas" panose="020B0609020204030204" pitchFamily="49" charset="0"/>
+              </a:rPr>
+              <a:t>x </a:t>
+            </a:r>
+            <a:r>
+              <a:rPr lang="en-US" dirty="0">
+                <a:solidFill>
+                  <a:srgbClr val="FF0000"/>
+                </a:solidFill>
+                <a:latin typeface="Consolas" panose="020B0609020204030204" pitchFamily="49" charset="0"/>
+              </a:rPr>
+              <a:t>=&gt;</a:t>
+            </a:r>
+            <a:r>
+              <a:rPr lang="en-US" dirty="0">
+                <a:solidFill>
+                  <a:srgbClr val="FFFF00"/>
+                </a:solidFill>
+                <a:latin typeface="Consolas" panose="020B0609020204030204" pitchFamily="49" charset="0"/>
+              </a:rPr>
+              <a:t> x</a:t>
+            </a:r>
+            <a:r>
+              <a:rPr lang="en-US" dirty="0">
+                <a:solidFill>
+                  <a:schemeClr val="tx1"/>
+                </a:solidFill>
+                <a:latin typeface="Consolas" panose="020B0609020204030204" pitchFamily="49" charset="0"/>
+              </a:rPr>
+              <a:t>)</a:t>
+            </a:r>
+            <a:r>
+              <a:rPr lang="bg-BG" dirty="0">
+                <a:solidFill>
+                  <a:schemeClr val="tx1"/>
+                </a:solidFill>
+                <a:latin typeface="Consolas" panose="020B0609020204030204" pitchFamily="49" charset="0"/>
+              </a:rPr>
+              <a:t>;</a:t>
+            </a:r>
+            <a:endParaRPr lang="en-US" dirty="0">
+              <a:solidFill>
+                <a:schemeClr val="tx1"/>
+              </a:solidFill>
+              <a:latin typeface="Consolas" panose="020B0609020204030204" pitchFamily="49" charset="0"/>
+            </a:endParaRPr>
+          </a:p>
+          <a:p>
+            <a:pPr marL="457200" lvl="1" indent="0">
+              <a:buNone/>
+            </a:pPr>
+            <a:endParaRPr lang="en-US" dirty="0">
+              <a:solidFill>
+                <a:schemeClr val="tx1"/>
+              </a:solidFill>
+              <a:latin typeface="Consolas" panose="020B0609020204030204" pitchFamily="49" charset="0"/>
+            </a:endParaRPr>
+          </a:p>
+          <a:p>
+            <a:pPr marL="0" indent="0">
+              <a:buNone/>
+            </a:pPr>
+            <a:endParaRPr lang="bg-BG" dirty="0"/>
+          </a:p>
+        </p:txBody>
+      </p:sp>
+    </p:spTree>
+    <p:extLst>
+      <p:ext uri="{BB962C8B-B14F-4D97-AF65-F5344CB8AC3E}">
+        <p14:creationId xmlns:p14="http://schemas.microsoft.com/office/powerpoint/2010/main" val="3805865653"/>
+      </p:ext>
+    </p:extLst>
+  </p:cSld>
+  <p:clrMapOvr>
+    <a:masterClrMapping/>
+  </p:clrMapOvr>
+</p:sld>
+</file>
+
+<file path=ppt/slides/slide43.xml><?xml version="1.0" encoding="utf-8"?>
+<p:sld xmlns:a="http://schemas.openxmlformats.org/drawingml/2006/main" xmlns:r="http://schemas.openxmlformats.org/officeDocument/2006/relationships" xmlns:p="http://schemas.openxmlformats.org/presentationml/2006/main">
+  <p:cSld>
+    <p:spTree>
+      <p:nvGrpSpPr>
+        <p:cNvPr id="1" name=""/>
+        <p:cNvGrpSpPr/>
+        <p:nvPr/>
+      </p:nvGrpSpPr>
+      <p:grpSpPr>
+        <a:xfrm>
+          <a:off x="0" y="0"/>
+          <a:ext cx="0" cy="0"/>
+          <a:chOff x="0" y="0"/>
+          <a:chExt cx="0" cy="0"/>
+        </a:xfrm>
+      </p:grpSpPr>
+      <p:sp>
+        <p:nvSpPr>
+          <p:cNvPr id="2" name="Title 1">
+            <a:extLst>
+              <a:ext uri="{FF2B5EF4-FFF2-40B4-BE49-F238E27FC236}">
+                <a16:creationId xmlns:a16="http://schemas.microsoft.com/office/drawing/2014/main" id="{5576E643-4149-94C4-48BE-0562A1CEA7AD}"/>
+              </a:ext>
+            </a:extLst>
+          </p:cNvPr>
+          <p:cNvSpPr>
+            <a:spLocks noGrp="1"/>
+          </p:cNvSpPr>
+          <p:nvPr>
+            <p:ph type="title"/>
+          </p:nvPr>
+        </p:nvSpPr>
+        <p:spPr/>
+        <p:txBody>
+          <a:bodyPr/>
+          <a:lstStyle/>
+          <a:p>
+            <a:pPr algn="ctr"/>
+            <a:r>
+              <a:rPr lang="en-US" dirty="0">
+                <a:latin typeface="Arial" panose="020B0604020202020204" pitchFamily="34" charset="0"/>
+                <a:cs typeface="Arial" panose="020B0604020202020204" pitchFamily="34" charset="0"/>
+              </a:rPr>
+              <a:t>Chain-</a:t>
+            </a:r>
+            <a:r>
+              <a:rPr lang="bg-BG" dirty="0" err="1">
+                <a:latin typeface="Arial" panose="020B0604020202020204" pitchFamily="34" charset="0"/>
+                <a:cs typeface="Arial" panose="020B0604020202020204" pitchFamily="34" charset="0"/>
+              </a:rPr>
+              <a:t>ване</a:t>
+            </a:r>
+            <a:r>
+              <a:rPr lang="bg-BG" dirty="0">
+                <a:latin typeface="Arial" panose="020B0604020202020204" pitchFamily="34" charset="0"/>
+                <a:cs typeface="Arial" panose="020B0604020202020204" pitchFamily="34" charset="0"/>
+              </a:rPr>
+              <a:t> с </a:t>
+            </a:r>
+            <a:r>
+              <a:rPr lang="en-US" dirty="0">
+                <a:latin typeface="Arial" panose="020B0604020202020204" pitchFamily="34" charset="0"/>
+                <a:cs typeface="Arial" panose="020B0604020202020204" pitchFamily="34" charset="0"/>
+              </a:rPr>
+              <a:t>LINQ </a:t>
+            </a:r>
+            <a:endParaRPr lang="bg-BG" dirty="0">
+              <a:latin typeface="Arial" panose="020B0604020202020204" pitchFamily="34" charset="0"/>
+              <a:cs typeface="Arial" panose="020B0604020202020204" pitchFamily="34" charset="0"/>
+            </a:endParaRPr>
+          </a:p>
+        </p:txBody>
+      </p:sp>
+      <p:sp>
+        <p:nvSpPr>
+          <p:cNvPr id="3" name="Content Placeholder 2">
+            <a:extLst>
+              <a:ext uri="{FF2B5EF4-FFF2-40B4-BE49-F238E27FC236}">
+                <a16:creationId xmlns:a16="http://schemas.microsoft.com/office/drawing/2014/main" id="{9948D0A6-5EA3-A0B8-CEBA-0EC181173364}"/>
+              </a:ext>
+            </a:extLst>
+          </p:cNvPr>
+          <p:cNvSpPr>
+            <a:spLocks noGrp="1"/>
+          </p:cNvSpPr>
+          <p:nvPr>
+            <p:ph idx="1"/>
+          </p:nvPr>
+        </p:nvSpPr>
+        <p:spPr/>
+        <p:txBody>
+          <a:bodyPr/>
+          <a:lstStyle/>
+          <a:p>
+            <a:pPr marL="0" indent="0">
+              <a:buNone/>
+            </a:pPr>
+            <a:r>
+              <a:rPr lang="en-US" dirty="0">
+                <a:solidFill>
+                  <a:schemeClr val="tx2">
+                    <a:lumMod val="75000"/>
+                  </a:schemeClr>
+                </a:solidFill>
+                <a:latin typeface="Consolas" panose="020B0609020204030204" pitchFamily="49" charset="0"/>
+              </a:rPr>
+              <a:t>List</a:t>
+            </a:r>
+            <a:r>
+              <a:rPr lang="en-US" dirty="0">
+                <a:solidFill>
+                  <a:schemeClr val="tx1"/>
+                </a:solidFill>
+                <a:latin typeface="Consolas" panose="020B0609020204030204" pitchFamily="49" charset="0"/>
+              </a:rPr>
+              <a:t>&lt;int&gt; </a:t>
+            </a:r>
+            <a:r>
+              <a:rPr lang="en-US" dirty="0">
+                <a:solidFill>
+                  <a:srgbClr val="92D050"/>
+                </a:solidFill>
+                <a:latin typeface="Consolas" panose="020B0609020204030204" pitchFamily="49" charset="0"/>
+              </a:rPr>
+              <a:t>numbers</a:t>
+            </a:r>
+            <a:r>
+              <a:rPr lang="en-US" dirty="0">
+                <a:solidFill>
+                  <a:schemeClr val="tx1"/>
+                </a:solidFill>
+                <a:latin typeface="Consolas" panose="020B0609020204030204" pitchFamily="49" charset="0"/>
+              </a:rPr>
+              <a:t> = </a:t>
+            </a:r>
+          </a:p>
+          <a:p>
+            <a:pPr marL="0" indent="0">
+              <a:buNone/>
+            </a:pPr>
+            <a:r>
+              <a:rPr lang="en-US" dirty="0">
+                <a:solidFill>
+                  <a:schemeClr val="tx1"/>
+                </a:solidFill>
+                <a:latin typeface="Consolas" panose="020B0609020204030204" pitchFamily="49" charset="0"/>
+              </a:rPr>
+              <a:t>	new </a:t>
+            </a:r>
+            <a:r>
+              <a:rPr lang="en-US" dirty="0">
+                <a:solidFill>
+                  <a:schemeClr val="tx2">
+                    <a:lumMod val="75000"/>
+                  </a:schemeClr>
+                </a:solidFill>
+                <a:latin typeface="Consolas" panose="020B0609020204030204" pitchFamily="49" charset="0"/>
+              </a:rPr>
+              <a:t>List</a:t>
+            </a:r>
+            <a:r>
+              <a:rPr lang="en-US" dirty="0">
+                <a:solidFill>
+                  <a:schemeClr val="tx1"/>
+                </a:solidFill>
+                <a:latin typeface="Consolas" panose="020B0609020204030204" pitchFamily="49" charset="0"/>
+              </a:rPr>
+              <a:t>&lt;int&gt;() { 3, 2, 13, 9, 7, 6, 5, 8 };</a:t>
+            </a:r>
+          </a:p>
+          <a:p>
+            <a:pPr marL="0" indent="0">
+              <a:buNone/>
+            </a:pPr>
+            <a:endParaRPr lang="en-US" dirty="0">
+              <a:solidFill>
+                <a:schemeClr val="tx2">
+                  <a:lumMod val="75000"/>
+                </a:schemeClr>
+              </a:solidFill>
+              <a:latin typeface="Consolas" panose="020B0609020204030204" pitchFamily="49" charset="0"/>
+            </a:endParaRPr>
+          </a:p>
+          <a:p>
+            <a:pPr marL="0" indent="0">
+              <a:buNone/>
+            </a:pPr>
+            <a:r>
+              <a:rPr lang="en-US" dirty="0">
+                <a:solidFill>
+                  <a:schemeClr val="tx2">
+                    <a:lumMod val="75000"/>
+                  </a:schemeClr>
+                </a:solidFill>
+                <a:latin typeface="Consolas" panose="020B0609020204030204" pitchFamily="49" charset="0"/>
+              </a:rPr>
+              <a:t>List</a:t>
+            </a:r>
+            <a:r>
+              <a:rPr lang="en-US" dirty="0">
+                <a:solidFill>
+                  <a:schemeClr val="tx1"/>
+                </a:solidFill>
+                <a:latin typeface="Consolas" panose="020B0609020204030204" pitchFamily="49" charset="0"/>
+              </a:rPr>
+              <a:t>&lt;int&gt;</a:t>
+            </a:r>
+            <a:r>
+              <a:rPr lang="en-US" dirty="0">
+                <a:solidFill>
+                  <a:schemeClr val="tx2">
+                    <a:lumMod val="75000"/>
+                  </a:schemeClr>
+                </a:solidFill>
+                <a:latin typeface="Consolas" panose="020B0609020204030204" pitchFamily="49" charset="0"/>
+              </a:rPr>
+              <a:t> </a:t>
+            </a:r>
+            <a:r>
+              <a:rPr lang="en-US" dirty="0" err="1">
+                <a:solidFill>
+                  <a:srgbClr val="92D050"/>
+                </a:solidFill>
+                <a:latin typeface="Consolas" panose="020B0609020204030204" pitchFamily="49" charset="0"/>
+              </a:rPr>
+              <a:t>resultNumbers</a:t>
+            </a:r>
+            <a:r>
+              <a:rPr lang="en-US" dirty="0">
+                <a:solidFill>
+                  <a:schemeClr val="tx1"/>
+                </a:solidFill>
+                <a:latin typeface="Consolas" panose="020B0609020204030204" pitchFamily="49" charset="0"/>
+              </a:rPr>
+              <a:t> = </a:t>
+            </a:r>
+          </a:p>
+          <a:p>
+            <a:pPr marL="0" indent="0">
+              <a:buNone/>
+            </a:pPr>
+            <a:r>
+              <a:rPr lang="en-US" dirty="0">
+                <a:solidFill>
+                  <a:schemeClr val="tx1"/>
+                </a:solidFill>
+                <a:latin typeface="Consolas" panose="020B0609020204030204" pitchFamily="49" charset="0"/>
+              </a:rPr>
+              <a:t>	 </a:t>
+            </a:r>
+            <a:r>
+              <a:rPr lang="en-US" dirty="0">
+                <a:solidFill>
+                  <a:srgbClr val="92D050"/>
+                </a:solidFill>
+                <a:latin typeface="Consolas" panose="020B0609020204030204" pitchFamily="49" charset="0"/>
+              </a:rPr>
+              <a:t>numbers</a:t>
+            </a:r>
+          </a:p>
+          <a:p>
+            <a:pPr marL="457200" lvl="1" indent="0">
+              <a:buNone/>
+            </a:pPr>
+            <a:r>
+              <a:rPr lang="en-US" sz="2800" dirty="0">
+                <a:solidFill>
+                  <a:srgbClr val="92D050"/>
+                </a:solidFill>
+                <a:latin typeface="Consolas" panose="020B0609020204030204" pitchFamily="49" charset="0"/>
+              </a:rPr>
+              <a:t>		</a:t>
+            </a:r>
+            <a:r>
+              <a:rPr lang="en-US" sz="2800" dirty="0">
+                <a:solidFill>
+                  <a:schemeClr val="tx1"/>
+                </a:solidFill>
+                <a:latin typeface="Consolas" panose="020B0609020204030204" pitchFamily="49" charset="0"/>
+              </a:rPr>
+              <a:t>.</a:t>
+            </a:r>
+            <a:r>
+              <a:rPr lang="en-US" sz="2800" dirty="0">
+                <a:solidFill>
+                  <a:schemeClr val="accent6"/>
+                </a:solidFill>
+                <a:latin typeface="Consolas" panose="020B0609020204030204" pitchFamily="49" charset="0"/>
+              </a:rPr>
+              <a:t>Where</a:t>
+            </a:r>
+            <a:r>
+              <a:rPr lang="en-US" sz="2800" dirty="0">
+                <a:solidFill>
+                  <a:schemeClr val="tx1"/>
+                </a:solidFill>
+                <a:latin typeface="Consolas" panose="020B0609020204030204" pitchFamily="49" charset="0"/>
+              </a:rPr>
+              <a:t>(</a:t>
+            </a:r>
+            <a:r>
+              <a:rPr lang="en-US" sz="2800" dirty="0">
+                <a:solidFill>
+                  <a:srgbClr val="FFFF00"/>
+                </a:solidFill>
+                <a:latin typeface="Consolas" panose="020B0609020204030204" pitchFamily="49" charset="0"/>
+              </a:rPr>
+              <a:t>x </a:t>
+            </a:r>
+            <a:r>
+              <a:rPr lang="en-US" sz="2800" dirty="0">
+                <a:solidFill>
+                  <a:srgbClr val="FF0000"/>
+                </a:solidFill>
+                <a:latin typeface="Consolas" panose="020B0609020204030204" pitchFamily="49" charset="0"/>
+              </a:rPr>
+              <a:t>=&gt;</a:t>
+            </a:r>
+            <a:r>
+              <a:rPr lang="en-US" sz="2800" dirty="0">
+                <a:solidFill>
+                  <a:srgbClr val="FFFF00"/>
+                </a:solidFill>
+                <a:latin typeface="Consolas" panose="020B0609020204030204" pitchFamily="49" charset="0"/>
+              </a:rPr>
+              <a:t> x % 2 != 0</a:t>
+            </a:r>
+            <a:r>
+              <a:rPr lang="en-US" sz="2800" dirty="0">
+                <a:solidFill>
+                  <a:schemeClr val="tx1"/>
+                </a:solidFill>
+                <a:latin typeface="Consolas" panose="020B0609020204030204" pitchFamily="49" charset="0"/>
+              </a:rPr>
+              <a:t>)</a:t>
+            </a:r>
+          </a:p>
+          <a:p>
+            <a:pPr marL="914400" lvl="2" indent="0">
+              <a:buNone/>
+            </a:pPr>
+            <a:r>
+              <a:rPr lang="en-US" sz="2800" dirty="0">
+                <a:solidFill>
+                  <a:schemeClr val="tx1"/>
+                </a:solidFill>
+                <a:latin typeface="Consolas" panose="020B0609020204030204" pitchFamily="49" charset="0"/>
+              </a:rPr>
+              <a:t>	.</a:t>
+            </a:r>
+            <a:r>
+              <a:rPr lang="en-US" sz="2800" dirty="0" err="1">
+                <a:solidFill>
+                  <a:schemeClr val="accent6"/>
+                </a:solidFill>
+                <a:latin typeface="Consolas" panose="020B0609020204030204" pitchFamily="49" charset="0"/>
+              </a:rPr>
+              <a:t>OrderBy</a:t>
+            </a:r>
+            <a:r>
+              <a:rPr lang="en-US" sz="2800" dirty="0">
+                <a:solidFill>
+                  <a:schemeClr val="tx1"/>
+                </a:solidFill>
+                <a:latin typeface="Consolas" panose="020B0609020204030204" pitchFamily="49" charset="0"/>
+              </a:rPr>
+              <a:t>(</a:t>
+            </a:r>
+            <a:r>
+              <a:rPr lang="en-US" sz="2800" dirty="0">
+                <a:solidFill>
+                  <a:srgbClr val="FFFF00"/>
+                </a:solidFill>
+                <a:latin typeface="Consolas" panose="020B0609020204030204" pitchFamily="49" charset="0"/>
+              </a:rPr>
+              <a:t>x </a:t>
+            </a:r>
+            <a:r>
+              <a:rPr lang="en-US" sz="2800" dirty="0">
+                <a:solidFill>
+                  <a:srgbClr val="FF0000"/>
+                </a:solidFill>
+                <a:latin typeface="Consolas" panose="020B0609020204030204" pitchFamily="49" charset="0"/>
+              </a:rPr>
+              <a:t>=&gt;</a:t>
+            </a:r>
+            <a:r>
+              <a:rPr lang="en-US" sz="2800" dirty="0">
+                <a:solidFill>
+                  <a:srgbClr val="FFFF00"/>
+                </a:solidFill>
+                <a:latin typeface="Consolas" panose="020B0609020204030204" pitchFamily="49" charset="0"/>
+              </a:rPr>
+              <a:t> x</a:t>
+            </a:r>
+            <a:r>
+              <a:rPr lang="en-US" sz="2800" dirty="0">
+                <a:solidFill>
+                  <a:schemeClr val="tx1"/>
+                </a:solidFill>
+                <a:latin typeface="Consolas" panose="020B0609020204030204" pitchFamily="49" charset="0"/>
+              </a:rPr>
+              <a:t>)</a:t>
+            </a:r>
+          </a:p>
+          <a:p>
+            <a:pPr marL="914400" lvl="2" indent="0">
+              <a:buNone/>
+            </a:pPr>
+            <a:r>
+              <a:rPr lang="en-US" sz="2800" dirty="0">
+                <a:solidFill>
+                  <a:schemeClr val="tx1"/>
+                </a:solidFill>
+                <a:latin typeface="Consolas" panose="020B0609020204030204" pitchFamily="49" charset="0"/>
+              </a:rPr>
+              <a:t>	.</a:t>
+            </a:r>
+            <a:r>
+              <a:rPr lang="en-US" sz="2800" dirty="0" err="1">
+                <a:solidFill>
+                  <a:schemeClr val="accent6"/>
+                </a:solidFill>
+                <a:latin typeface="Consolas" panose="020B0609020204030204" pitchFamily="49" charset="0"/>
+              </a:rPr>
+              <a:t>ToList</a:t>
+            </a:r>
+            <a:r>
+              <a:rPr lang="en-US" sz="2800" dirty="0">
+                <a:solidFill>
+                  <a:schemeClr val="tx1"/>
+                </a:solidFill>
+                <a:latin typeface="Consolas" panose="020B0609020204030204" pitchFamily="49" charset="0"/>
+              </a:rPr>
+              <a:t>();</a:t>
+            </a:r>
+          </a:p>
+          <a:p>
+            <a:endParaRPr lang="bg-BG" dirty="0"/>
+          </a:p>
+        </p:txBody>
+      </p:sp>
+    </p:spTree>
+    <p:extLst>
+      <p:ext uri="{BB962C8B-B14F-4D97-AF65-F5344CB8AC3E}">
+        <p14:creationId xmlns:p14="http://schemas.microsoft.com/office/powerpoint/2010/main" val="2749377159"/>
       </p:ext>
     </p:extLst>
   </p:cSld>

</xml_diff>

<commit_message>
Slight fix in LINQ data
</commit_message>
<xml_diff>
--- a/C# Intermediate.pptx
+++ b/C# Intermediate.pptx
@@ -350,7 +350,7 @@
           <a:p>
             <a:fld id="{0BD89023-946D-4914-A444-F66256F52110}" type="datetimeFigureOut">
               <a:rPr lang="bg-BG" smtClean="0"/>
-              <a:t>26.11.2022 г.</a:t>
+              <a:t>27.11.2022 г.</a:t>
             </a:fld>
             <a:endParaRPr lang="bg-BG"/>
           </a:p>
@@ -631,7 +631,7 @@
           <a:p>
             <a:fld id="{0BD89023-946D-4914-A444-F66256F52110}" type="datetimeFigureOut">
               <a:rPr lang="bg-BG" smtClean="0"/>
-              <a:t>26.11.2022 г.</a:t>
+              <a:t>27.11.2022 г.</a:t>
             </a:fld>
             <a:endParaRPr lang="bg-BG"/>
           </a:p>
@@ -823,7 +823,7 @@
           <a:p>
             <a:fld id="{0BD89023-946D-4914-A444-F66256F52110}" type="datetimeFigureOut">
               <a:rPr lang="bg-BG" smtClean="0"/>
-              <a:t>26.11.2022 г.</a:t>
+              <a:t>27.11.2022 г.</a:t>
             </a:fld>
             <a:endParaRPr lang="bg-BG"/>
           </a:p>
@@ -1084,7 +1084,7 @@
           <a:p>
             <a:fld id="{0BD89023-946D-4914-A444-F66256F52110}" type="datetimeFigureOut">
               <a:rPr lang="bg-BG" smtClean="0"/>
-              <a:t>26.11.2022 г.</a:t>
+              <a:t>27.11.2022 г.</a:t>
             </a:fld>
             <a:endParaRPr lang="bg-BG"/>
           </a:p>
@@ -1510,7 +1510,7 @@
           <a:p>
             <a:fld id="{0BD89023-946D-4914-A444-F66256F52110}" type="datetimeFigureOut">
               <a:rPr lang="bg-BG" smtClean="0"/>
-              <a:t>26.11.2022 г.</a:t>
+              <a:t>27.11.2022 г.</a:t>
             </a:fld>
             <a:endParaRPr lang="bg-BG"/>
           </a:p>
@@ -2056,7 +2056,7 @@
           <a:p>
             <a:fld id="{0BD89023-946D-4914-A444-F66256F52110}" type="datetimeFigureOut">
               <a:rPr lang="bg-BG" smtClean="0"/>
-              <a:t>26.11.2022 г.</a:t>
+              <a:t>27.11.2022 г.</a:t>
             </a:fld>
             <a:endParaRPr lang="bg-BG"/>
           </a:p>
@@ -2887,7 +2887,7 @@
           <a:p>
             <a:fld id="{0BD89023-946D-4914-A444-F66256F52110}" type="datetimeFigureOut">
               <a:rPr lang="bg-BG" smtClean="0"/>
-              <a:t>26.11.2022 г.</a:t>
+              <a:t>27.11.2022 г.</a:t>
             </a:fld>
             <a:endParaRPr lang="bg-BG"/>
           </a:p>
@@ -3057,7 +3057,7 @@
           <a:p>
             <a:fld id="{0BD89023-946D-4914-A444-F66256F52110}" type="datetimeFigureOut">
               <a:rPr lang="bg-BG" smtClean="0"/>
-              <a:t>26.11.2022 г.</a:t>
+              <a:t>27.11.2022 г.</a:t>
             </a:fld>
             <a:endParaRPr lang="bg-BG"/>
           </a:p>
@@ -3237,7 +3237,7 @@
           <a:p>
             <a:fld id="{0BD89023-946D-4914-A444-F66256F52110}" type="datetimeFigureOut">
               <a:rPr lang="bg-BG" smtClean="0"/>
-              <a:t>26.11.2022 г.</a:t>
+              <a:t>27.11.2022 г.</a:t>
             </a:fld>
             <a:endParaRPr lang="bg-BG"/>
           </a:p>
@@ -3407,7 +3407,7 @@
           <a:p>
             <a:fld id="{0BD89023-946D-4914-A444-F66256F52110}" type="datetimeFigureOut">
               <a:rPr lang="bg-BG" smtClean="0"/>
-              <a:t>26.11.2022 г.</a:t>
+              <a:t>27.11.2022 г.</a:t>
             </a:fld>
             <a:endParaRPr lang="bg-BG"/>
           </a:p>
@@ -3664,7 +3664,7 @@
           <a:p>
             <a:fld id="{0BD89023-946D-4914-A444-F66256F52110}" type="datetimeFigureOut">
               <a:rPr lang="bg-BG" smtClean="0"/>
-              <a:t>26.11.2022 г.</a:t>
+              <a:t>27.11.2022 г.</a:t>
             </a:fld>
             <a:endParaRPr lang="bg-BG"/>
           </a:p>
@@ -3896,7 +3896,7 @@
           <a:p>
             <a:fld id="{0BD89023-946D-4914-A444-F66256F52110}" type="datetimeFigureOut">
               <a:rPr lang="bg-BG" smtClean="0"/>
-              <a:t>26.11.2022 г.</a:t>
+              <a:t>27.11.2022 г.</a:t>
             </a:fld>
             <a:endParaRPr lang="bg-BG"/>
           </a:p>
@@ -4289,7 +4289,7 @@
           <a:p>
             <a:fld id="{0BD89023-946D-4914-A444-F66256F52110}" type="datetimeFigureOut">
               <a:rPr lang="bg-BG" smtClean="0"/>
-              <a:t>26.11.2022 г.</a:t>
+              <a:t>27.11.2022 г.</a:t>
             </a:fld>
             <a:endParaRPr lang="bg-BG"/>
           </a:p>
@@ -4407,7 +4407,7 @@
           <a:p>
             <a:fld id="{0BD89023-946D-4914-A444-F66256F52110}" type="datetimeFigureOut">
               <a:rPr lang="bg-BG" smtClean="0"/>
-              <a:t>26.11.2022 г.</a:t>
+              <a:t>27.11.2022 г.</a:t>
             </a:fld>
             <a:endParaRPr lang="bg-BG"/>
           </a:p>
@@ -4502,7 +4502,7 @@
           <a:p>
             <a:fld id="{0BD89023-946D-4914-A444-F66256F52110}" type="datetimeFigureOut">
               <a:rPr lang="bg-BG" smtClean="0"/>
-              <a:t>26.11.2022 г.</a:t>
+              <a:t>27.11.2022 г.</a:t>
             </a:fld>
             <a:endParaRPr lang="bg-BG"/>
           </a:p>
@@ -4775,7 +4775,7 @@
           <a:p>
             <a:fld id="{0BD89023-946D-4914-A444-F66256F52110}" type="datetimeFigureOut">
               <a:rPr lang="bg-BG" smtClean="0"/>
-              <a:t>26.11.2022 г.</a:t>
+              <a:t>27.11.2022 г.</a:t>
             </a:fld>
             <a:endParaRPr lang="bg-BG"/>
           </a:p>
@@ -5056,7 +5056,7 @@
           <a:p>
             <a:fld id="{0BD89023-946D-4914-A444-F66256F52110}" type="datetimeFigureOut">
               <a:rPr lang="bg-BG" smtClean="0"/>
-              <a:t>26.11.2022 г.</a:t>
+              <a:t>27.11.2022 г.</a:t>
             </a:fld>
             <a:endParaRPr lang="bg-BG"/>
           </a:p>
@@ -5296,7 +5296,7 @@
           <a:p>
             <a:fld id="{0BD89023-946D-4914-A444-F66256F52110}" type="datetimeFigureOut">
               <a:rPr lang="bg-BG" smtClean="0"/>
-              <a:t>26.11.2022 г.</a:t>
+              <a:t>27.11.2022 г.</a:t>
             </a:fld>
             <a:endParaRPr lang="bg-BG"/>
           </a:p>
@@ -22530,16 +22530,25 @@
               <a:t>	</a:t>
             </a:r>
             <a:r>
-              <a:rPr lang="en-US" dirty="0" err="1">
+              <a:rPr lang="en-US" sz="2400" dirty="0">
                 <a:solidFill>
                   <a:srgbClr val="92D050"/>
                 </a:solidFill>
                 <a:latin typeface="Consolas" panose="020B0609020204030204" pitchFamily="49" charset="0"/>
               </a:rPr>
-              <a:t>myList</a:t>
-            </a:r>
-            <a:r>
-              <a:rPr lang="en-US" dirty="0" err="1">
+              <a:t> </a:t>
+            </a:r>
+            <a:r>
+              <a:rPr lang="en-US" sz="2400">
+                <a:solidFill>
+                  <a:srgbClr val="92D050"/>
+                </a:solidFill>
+                <a:latin typeface="Consolas" panose="020B0609020204030204" pitchFamily="49" charset="0"/>
+              </a:rPr>
+              <a:t>numbers</a:t>
+            </a:r>
+            <a:r>
+              <a:rPr lang="en-US">
                 <a:solidFill>
                   <a:schemeClr val="tx1"/>
                 </a:solidFill>

</xml_diff>

<commit_message>
Updates for Text Processing lecture
</commit_message>
<xml_diff>
--- a/C# Intermediate.pptx
+++ b/C# Intermediate.pptx
@@ -48,6 +48,15 @@
     <p:sldId id="297" r:id="rId42"/>
     <p:sldId id="299" r:id="rId43"/>
     <p:sldId id="300" r:id="rId44"/>
+    <p:sldId id="302" r:id="rId45"/>
+    <p:sldId id="303" r:id="rId46"/>
+    <p:sldId id="304" r:id="rId47"/>
+    <p:sldId id="305" r:id="rId48"/>
+    <p:sldId id="307" r:id="rId49"/>
+    <p:sldId id="308" r:id="rId50"/>
+    <p:sldId id="309" r:id="rId51"/>
+    <p:sldId id="310" r:id="rId52"/>
+    <p:sldId id="311" r:id="rId53"/>
   </p:sldIdLst>
   <p:sldSz cx="12192000" cy="6858000"/>
   <p:notesSz cx="6858000" cy="9144000"/>
@@ -350,7 +359,7 @@
           <a:p>
             <a:fld id="{0BD89023-946D-4914-A444-F66256F52110}" type="datetimeFigureOut">
               <a:rPr lang="bg-BG" smtClean="0"/>
-              <a:t>26.11.2022 г.</a:t>
+              <a:t>1.12.2022 г.</a:t>
             </a:fld>
             <a:endParaRPr lang="bg-BG"/>
           </a:p>
@@ -631,7 +640,7 @@
           <a:p>
             <a:fld id="{0BD89023-946D-4914-A444-F66256F52110}" type="datetimeFigureOut">
               <a:rPr lang="bg-BG" smtClean="0"/>
-              <a:t>26.11.2022 г.</a:t>
+              <a:t>1.12.2022 г.</a:t>
             </a:fld>
             <a:endParaRPr lang="bg-BG"/>
           </a:p>
@@ -823,7 +832,7 @@
           <a:p>
             <a:fld id="{0BD89023-946D-4914-A444-F66256F52110}" type="datetimeFigureOut">
               <a:rPr lang="bg-BG" smtClean="0"/>
-              <a:t>26.11.2022 г.</a:t>
+              <a:t>1.12.2022 г.</a:t>
             </a:fld>
             <a:endParaRPr lang="bg-BG"/>
           </a:p>
@@ -1084,7 +1093,7 @@
           <a:p>
             <a:fld id="{0BD89023-946D-4914-A444-F66256F52110}" type="datetimeFigureOut">
               <a:rPr lang="bg-BG" smtClean="0"/>
-              <a:t>26.11.2022 г.</a:t>
+              <a:t>1.12.2022 г.</a:t>
             </a:fld>
             <a:endParaRPr lang="bg-BG"/>
           </a:p>
@@ -1510,7 +1519,7 @@
           <a:p>
             <a:fld id="{0BD89023-946D-4914-A444-F66256F52110}" type="datetimeFigureOut">
               <a:rPr lang="bg-BG" smtClean="0"/>
-              <a:t>26.11.2022 г.</a:t>
+              <a:t>1.12.2022 г.</a:t>
             </a:fld>
             <a:endParaRPr lang="bg-BG"/>
           </a:p>
@@ -2056,7 +2065,7 @@
           <a:p>
             <a:fld id="{0BD89023-946D-4914-A444-F66256F52110}" type="datetimeFigureOut">
               <a:rPr lang="bg-BG" smtClean="0"/>
-              <a:t>26.11.2022 г.</a:t>
+              <a:t>1.12.2022 г.</a:t>
             </a:fld>
             <a:endParaRPr lang="bg-BG"/>
           </a:p>
@@ -2887,7 +2896,7 @@
           <a:p>
             <a:fld id="{0BD89023-946D-4914-A444-F66256F52110}" type="datetimeFigureOut">
               <a:rPr lang="bg-BG" smtClean="0"/>
-              <a:t>26.11.2022 г.</a:t>
+              <a:t>1.12.2022 г.</a:t>
             </a:fld>
             <a:endParaRPr lang="bg-BG"/>
           </a:p>
@@ -3057,7 +3066,7 @@
           <a:p>
             <a:fld id="{0BD89023-946D-4914-A444-F66256F52110}" type="datetimeFigureOut">
               <a:rPr lang="bg-BG" smtClean="0"/>
-              <a:t>26.11.2022 г.</a:t>
+              <a:t>1.12.2022 г.</a:t>
             </a:fld>
             <a:endParaRPr lang="bg-BG"/>
           </a:p>
@@ -3237,7 +3246,7 @@
           <a:p>
             <a:fld id="{0BD89023-946D-4914-A444-F66256F52110}" type="datetimeFigureOut">
               <a:rPr lang="bg-BG" smtClean="0"/>
-              <a:t>26.11.2022 г.</a:t>
+              <a:t>1.12.2022 г.</a:t>
             </a:fld>
             <a:endParaRPr lang="bg-BG"/>
           </a:p>
@@ -3407,7 +3416,7 @@
           <a:p>
             <a:fld id="{0BD89023-946D-4914-A444-F66256F52110}" type="datetimeFigureOut">
               <a:rPr lang="bg-BG" smtClean="0"/>
-              <a:t>26.11.2022 г.</a:t>
+              <a:t>1.12.2022 г.</a:t>
             </a:fld>
             <a:endParaRPr lang="bg-BG"/>
           </a:p>
@@ -3664,7 +3673,7 @@
           <a:p>
             <a:fld id="{0BD89023-946D-4914-A444-F66256F52110}" type="datetimeFigureOut">
               <a:rPr lang="bg-BG" smtClean="0"/>
-              <a:t>26.11.2022 г.</a:t>
+              <a:t>1.12.2022 г.</a:t>
             </a:fld>
             <a:endParaRPr lang="bg-BG"/>
           </a:p>
@@ -3896,7 +3905,7 @@
           <a:p>
             <a:fld id="{0BD89023-946D-4914-A444-F66256F52110}" type="datetimeFigureOut">
               <a:rPr lang="bg-BG" smtClean="0"/>
-              <a:t>26.11.2022 г.</a:t>
+              <a:t>1.12.2022 г.</a:t>
             </a:fld>
             <a:endParaRPr lang="bg-BG"/>
           </a:p>
@@ -4289,7 +4298,7 @@
           <a:p>
             <a:fld id="{0BD89023-946D-4914-A444-F66256F52110}" type="datetimeFigureOut">
               <a:rPr lang="bg-BG" smtClean="0"/>
-              <a:t>26.11.2022 г.</a:t>
+              <a:t>1.12.2022 г.</a:t>
             </a:fld>
             <a:endParaRPr lang="bg-BG"/>
           </a:p>
@@ -4407,7 +4416,7 @@
           <a:p>
             <a:fld id="{0BD89023-946D-4914-A444-F66256F52110}" type="datetimeFigureOut">
               <a:rPr lang="bg-BG" smtClean="0"/>
-              <a:t>26.11.2022 г.</a:t>
+              <a:t>1.12.2022 г.</a:t>
             </a:fld>
             <a:endParaRPr lang="bg-BG"/>
           </a:p>
@@ -4502,7 +4511,7 @@
           <a:p>
             <a:fld id="{0BD89023-946D-4914-A444-F66256F52110}" type="datetimeFigureOut">
               <a:rPr lang="bg-BG" smtClean="0"/>
-              <a:t>26.11.2022 г.</a:t>
+              <a:t>1.12.2022 г.</a:t>
             </a:fld>
             <a:endParaRPr lang="bg-BG"/>
           </a:p>
@@ -4775,7 +4784,7 @@
           <a:p>
             <a:fld id="{0BD89023-946D-4914-A444-F66256F52110}" type="datetimeFigureOut">
               <a:rPr lang="bg-BG" smtClean="0"/>
-              <a:t>26.11.2022 г.</a:t>
+              <a:t>1.12.2022 г.</a:t>
             </a:fld>
             <a:endParaRPr lang="bg-BG"/>
           </a:p>
@@ -5056,7 +5065,7 @@
           <a:p>
             <a:fld id="{0BD89023-946D-4914-A444-F66256F52110}" type="datetimeFigureOut">
               <a:rPr lang="bg-BG" smtClean="0"/>
-              <a:t>26.11.2022 г.</a:t>
+              <a:t>1.12.2022 г.</a:t>
             </a:fld>
             <a:endParaRPr lang="bg-BG"/>
           </a:p>
@@ -5296,7 +5305,7 @@
           <a:p>
             <a:fld id="{0BD89023-946D-4914-A444-F66256F52110}" type="datetimeFigureOut">
               <a:rPr lang="bg-BG" smtClean="0"/>
-              <a:t>26.11.2022 г.</a:t>
+              <a:t>1.12.2022 г.</a:t>
             </a:fld>
             <a:endParaRPr lang="bg-BG"/>
           </a:p>
@@ -23561,6 +23570,3204 @@
 </p:sld>
 </file>
 
+<file path=ppt/slides/slide44.xml><?xml version="1.0" encoding="utf-8"?>
+<p:sld xmlns:a="http://schemas.openxmlformats.org/drawingml/2006/main" xmlns:r="http://schemas.openxmlformats.org/officeDocument/2006/relationships" xmlns:p="http://schemas.openxmlformats.org/presentationml/2006/main">
+  <p:cSld>
+    <p:spTree>
+      <p:nvGrpSpPr>
+        <p:cNvPr id="1" name=""/>
+        <p:cNvGrpSpPr/>
+        <p:nvPr/>
+      </p:nvGrpSpPr>
+      <p:grpSpPr>
+        <a:xfrm>
+          <a:off x="0" y="0"/>
+          <a:ext cx="0" cy="0"/>
+          <a:chOff x="0" y="0"/>
+          <a:chExt cx="0" cy="0"/>
+        </a:xfrm>
+      </p:grpSpPr>
+      <p:sp>
+        <p:nvSpPr>
+          <p:cNvPr id="2" name="Title 1">
+            <a:extLst>
+              <a:ext uri="{FF2B5EF4-FFF2-40B4-BE49-F238E27FC236}">
+                <a16:creationId xmlns:a16="http://schemas.microsoft.com/office/drawing/2014/main" id="{0B90DFFE-23C0-1DAF-90E2-2283A6F51A4B}"/>
+              </a:ext>
+            </a:extLst>
+          </p:cNvPr>
+          <p:cNvSpPr>
+            <a:spLocks noGrp="1"/>
+          </p:cNvSpPr>
+          <p:nvPr>
+            <p:ph type="title"/>
+          </p:nvPr>
+        </p:nvSpPr>
+        <p:spPr/>
+        <p:txBody>
+          <a:bodyPr/>
+          <a:lstStyle/>
+          <a:p>
+            <a:pPr algn="ctr"/>
+            <a:r>
+              <a:rPr lang="en-US" dirty="0">
+                <a:solidFill>
+                  <a:schemeClr val="tx1"/>
+                </a:solidFill>
+                <a:latin typeface="Arial" panose="020B0604020202020204" pitchFamily="34" charset="0"/>
+                <a:cs typeface="Arial" panose="020B0604020202020204" pitchFamily="34" charset="0"/>
+              </a:rPr>
+              <a:t>Text Processing</a:t>
+            </a:r>
+            <a:endParaRPr lang="bg-BG" dirty="0">
+              <a:solidFill>
+                <a:schemeClr val="tx1"/>
+              </a:solidFill>
+              <a:latin typeface="Arial" panose="020B0604020202020204" pitchFamily="34" charset="0"/>
+              <a:cs typeface="Arial" panose="020B0604020202020204" pitchFamily="34" charset="0"/>
+            </a:endParaRPr>
+          </a:p>
+        </p:txBody>
+      </p:sp>
+      <p:sp>
+        <p:nvSpPr>
+          <p:cNvPr id="3" name="Content Placeholder 2">
+            <a:extLst>
+              <a:ext uri="{FF2B5EF4-FFF2-40B4-BE49-F238E27FC236}">
+                <a16:creationId xmlns:a16="http://schemas.microsoft.com/office/drawing/2014/main" id="{D0680567-74A3-280D-8F9E-D90EE3070DCE}"/>
+              </a:ext>
+            </a:extLst>
+          </p:cNvPr>
+          <p:cNvSpPr>
+            <a:spLocks noGrp="1"/>
+          </p:cNvSpPr>
+          <p:nvPr>
+            <p:ph idx="1"/>
+          </p:nvPr>
+        </p:nvSpPr>
+        <p:spPr/>
+        <p:txBody>
+          <a:bodyPr/>
+          <a:lstStyle/>
+          <a:p>
+            <a:r>
+              <a:rPr lang="bg-BG" dirty="0">
+                <a:solidFill>
+                  <a:schemeClr val="tx1"/>
+                </a:solidFill>
+              </a:rPr>
+              <a:t>Какво е стринг? – Стринговете са </a:t>
+            </a:r>
+            <a:r>
+              <a:rPr lang="bg-BG" dirty="0">
+                <a:solidFill>
+                  <a:srgbClr val="FFFF00"/>
+                </a:solidFill>
+              </a:rPr>
+              <a:t>поредица от символи </a:t>
+            </a:r>
+            <a:r>
+              <a:rPr lang="bg-BG" dirty="0">
+                <a:solidFill>
+                  <a:schemeClr val="tx1"/>
+                </a:solidFill>
+              </a:rPr>
+              <a:t>най-общо казано.</a:t>
+            </a:r>
+          </a:p>
+          <a:p>
+            <a:endParaRPr lang="bg-BG" dirty="0"/>
+          </a:p>
+          <a:p>
+            <a:r>
+              <a:rPr lang="bg-BG" dirty="0">
+                <a:solidFill>
+                  <a:schemeClr val="tx1"/>
+                </a:solidFill>
+              </a:rPr>
+              <a:t>В езика </a:t>
+            </a:r>
+            <a:r>
+              <a:rPr lang="en-US" dirty="0">
+                <a:solidFill>
+                  <a:schemeClr val="tx1"/>
+                </a:solidFill>
+              </a:rPr>
+              <a:t>C# </a:t>
+            </a:r>
+            <a:r>
+              <a:rPr lang="bg-BG" dirty="0">
+                <a:solidFill>
+                  <a:schemeClr val="tx1"/>
+                </a:solidFill>
+              </a:rPr>
+              <a:t>те са </a:t>
+            </a:r>
+            <a:r>
+              <a:rPr lang="en-US" dirty="0">
+                <a:solidFill>
+                  <a:srgbClr val="FFFF00"/>
+                </a:solidFill>
+              </a:rPr>
+              <a:t>immutable</a:t>
+            </a:r>
+            <a:r>
+              <a:rPr lang="en-US" dirty="0"/>
+              <a:t> </a:t>
+            </a:r>
+            <a:r>
+              <a:rPr lang="en-US" dirty="0">
+                <a:solidFill>
+                  <a:schemeClr val="tx1"/>
+                </a:solidFill>
+              </a:rPr>
+              <a:t>(read-only).</a:t>
+            </a:r>
+          </a:p>
+          <a:p>
+            <a:endParaRPr lang="en-US" dirty="0"/>
+          </a:p>
+          <a:p>
+            <a:r>
+              <a:rPr lang="bg-BG" dirty="0">
+                <a:solidFill>
+                  <a:schemeClr val="tx1"/>
+                </a:solidFill>
+              </a:rPr>
+              <a:t>Използват</a:t>
+            </a:r>
+            <a:r>
+              <a:rPr lang="bg-BG" dirty="0"/>
+              <a:t> </a:t>
+            </a:r>
+            <a:r>
+              <a:rPr lang="en-US" dirty="0">
+                <a:solidFill>
+                  <a:srgbClr val="FFFF00"/>
+                </a:solidFill>
+              </a:rPr>
+              <a:t>Unicode</a:t>
+            </a:r>
+            <a:endParaRPr lang="bg-BG" dirty="0">
+              <a:solidFill>
+                <a:srgbClr val="FFFF00"/>
+              </a:solidFill>
+            </a:endParaRPr>
+          </a:p>
+          <a:p>
+            <a:endParaRPr lang="bg-BG" dirty="0"/>
+          </a:p>
+        </p:txBody>
+      </p:sp>
+      <p:pic>
+        <p:nvPicPr>
+          <p:cNvPr id="5" name="Picture 4">
+            <a:extLst>
+              <a:ext uri="{FF2B5EF4-FFF2-40B4-BE49-F238E27FC236}">
+                <a16:creationId xmlns:a16="http://schemas.microsoft.com/office/drawing/2014/main" id="{89DE188C-FC87-DC56-B09F-2D4EB699C996}"/>
+              </a:ext>
+            </a:extLst>
+          </p:cNvPr>
+          <p:cNvPicPr>
+            <a:picLocks noChangeAspect="1"/>
+          </p:cNvPicPr>
+          <p:nvPr/>
+        </p:nvPicPr>
+        <p:blipFill>
+          <a:blip r:embed="rId2">
+            <a:extLst>
+              <a:ext uri="{28A0092B-C50C-407E-A947-70E740481C1C}">
+                <a14:useLocalDpi xmlns:a14="http://schemas.microsoft.com/office/drawing/2010/main" val="0"/>
+              </a:ext>
+            </a:extLst>
+          </a:blip>
+          <a:stretch>
+            <a:fillRect/>
+          </a:stretch>
+        </p:blipFill>
+        <p:spPr>
+          <a:xfrm>
+            <a:off x="1323885" y="5252318"/>
+            <a:ext cx="7319336" cy="544633"/>
+          </a:xfrm>
+          <a:prstGeom prst="rect">
+            <a:avLst/>
+          </a:prstGeom>
+        </p:spPr>
+      </p:pic>
+    </p:spTree>
+    <p:extLst>
+      <p:ext uri="{BB962C8B-B14F-4D97-AF65-F5344CB8AC3E}">
+        <p14:creationId xmlns:p14="http://schemas.microsoft.com/office/powerpoint/2010/main" val="3833005922"/>
+      </p:ext>
+    </p:extLst>
+  </p:cSld>
+  <p:clrMapOvr>
+    <a:masterClrMapping/>
+  </p:clrMapOvr>
+</p:sld>
+</file>
+
+<file path=ppt/slides/slide45.xml><?xml version="1.0" encoding="utf-8"?>
+<p:sld xmlns:a="http://schemas.openxmlformats.org/drawingml/2006/main" xmlns:r="http://schemas.openxmlformats.org/officeDocument/2006/relationships" xmlns:p="http://schemas.openxmlformats.org/presentationml/2006/main">
+  <p:cSld>
+    <p:spTree>
+      <p:nvGrpSpPr>
+        <p:cNvPr id="1" name=""/>
+        <p:cNvGrpSpPr/>
+        <p:nvPr/>
+      </p:nvGrpSpPr>
+      <p:grpSpPr>
+        <a:xfrm>
+          <a:off x="0" y="0"/>
+          <a:ext cx="0" cy="0"/>
+          <a:chOff x="0" y="0"/>
+          <a:chExt cx="0" cy="0"/>
+        </a:xfrm>
+      </p:grpSpPr>
+      <p:sp>
+        <p:nvSpPr>
+          <p:cNvPr id="2" name="Title 1">
+            <a:extLst>
+              <a:ext uri="{FF2B5EF4-FFF2-40B4-BE49-F238E27FC236}">
+                <a16:creationId xmlns:a16="http://schemas.microsoft.com/office/drawing/2014/main" id="{E6CC0F5A-9DB4-45D9-C5CF-577E5ED94380}"/>
+              </a:ext>
+            </a:extLst>
+          </p:cNvPr>
+          <p:cNvSpPr>
+            <a:spLocks noGrp="1"/>
+          </p:cNvSpPr>
+          <p:nvPr>
+            <p:ph type="title"/>
+          </p:nvPr>
+        </p:nvSpPr>
+        <p:spPr/>
+        <p:txBody>
+          <a:bodyPr>
+            <a:normAutofit fontScale="90000"/>
+          </a:bodyPr>
+          <a:lstStyle/>
+          <a:p>
+            <a:pPr algn="ctr"/>
+            <a:r>
+              <a:rPr lang="bg-BG" dirty="0">
+                <a:solidFill>
+                  <a:schemeClr val="tx1"/>
+                </a:solidFill>
+                <a:latin typeface="Arial" panose="020B0604020202020204" pitchFamily="34" charset="0"/>
+                <a:cs typeface="Arial" panose="020B0604020202020204" pitchFamily="34" charset="0"/>
+              </a:rPr>
+              <a:t>Инициализация и конкатениране (слепване) на стрингове</a:t>
+            </a:r>
+          </a:p>
+        </p:txBody>
+      </p:sp>
+      <p:sp>
+        <p:nvSpPr>
+          <p:cNvPr id="3" name="Content Placeholder 2">
+            <a:extLst>
+              <a:ext uri="{FF2B5EF4-FFF2-40B4-BE49-F238E27FC236}">
+                <a16:creationId xmlns:a16="http://schemas.microsoft.com/office/drawing/2014/main" id="{84C0AF07-CDE3-FAE6-8288-3C286EECC890}"/>
+              </a:ext>
+            </a:extLst>
+          </p:cNvPr>
+          <p:cNvSpPr>
+            <a:spLocks noGrp="1"/>
+          </p:cNvSpPr>
+          <p:nvPr>
+            <p:ph idx="1"/>
+          </p:nvPr>
+        </p:nvSpPr>
+        <p:spPr>
+          <a:xfrm>
+            <a:off x="501770" y="2053087"/>
+            <a:ext cx="11188460" cy="4037611"/>
+          </a:xfrm>
+        </p:spPr>
+        <p:txBody>
+          <a:bodyPr>
+            <a:normAutofit fontScale="92500" lnSpcReduction="10000"/>
+          </a:bodyPr>
+          <a:lstStyle/>
+          <a:p>
+            <a:pPr marL="0" indent="0">
+              <a:buNone/>
+            </a:pPr>
+            <a:r>
+              <a:rPr lang="en-US" i="1" dirty="0">
+                <a:solidFill>
+                  <a:srgbClr val="FFFF00"/>
+                </a:solidFill>
+                <a:latin typeface="Arial" panose="020B0604020202020204" pitchFamily="34" charset="0"/>
+                <a:cs typeface="Arial" panose="020B0604020202020204" pitchFamily="34" charset="0"/>
+              </a:rPr>
+              <a:t> </a:t>
+            </a:r>
+            <a:r>
+              <a:rPr lang="bg-BG" sz="2400" i="1" u="sng" dirty="0">
+                <a:solidFill>
+                  <a:srgbClr val="FFFF00"/>
+                </a:solidFill>
+                <a:latin typeface="Arial" panose="020B0604020202020204" pitchFamily="34" charset="0"/>
+                <a:cs typeface="Arial" panose="020B0604020202020204" pitchFamily="34" charset="0"/>
+              </a:rPr>
+              <a:t>Пример</a:t>
+            </a:r>
+            <a:r>
+              <a:rPr lang="bg-BG" sz="2400" i="1" u="sng" dirty="0">
+                <a:latin typeface="Arial" panose="020B0604020202020204" pitchFamily="34" charset="0"/>
+                <a:cs typeface="Arial" panose="020B0604020202020204" pitchFamily="34" charset="0"/>
+              </a:rPr>
+              <a:t>:</a:t>
+            </a:r>
+            <a:r>
+              <a:rPr lang="bg-BG" sz="2400" i="1" dirty="0">
+                <a:latin typeface="Arial" panose="020B0604020202020204" pitchFamily="34" charset="0"/>
+                <a:cs typeface="Arial" panose="020B0604020202020204" pitchFamily="34" charset="0"/>
+              </a:rPr>
+              <a:t> </a:t>
+            </a:r>
+            <a:r>
+              <a:rPr lang="bg-BG" sz="2400" i="1" dirty="0">
+                <a:solidFill>
+                  <a:schemeClr val="tx1"/>
+                </a:solidFill>
+                <a:latin typeface="Arial" panose="020B0604020202020204" pitchFamily="34" charset="0"/>
+                <a:cs typeface="Arial" panose="020B0604020202020204" pitchFamily="34" charset="0"/>
+              </a:rPr>
+              <a:t>Инициализиране</a:t>
+            </a:r>
+            <a:r>
+              <a:rPr lang="bg-BG" sz="2400" i="1" dirty="0">
+                <a:latin typeface="Arial" panose="020B0604020202020204" pitchFamily="34" charset="0"/>
+                <a:cs typeface="Arial" panose="020B0604020202020204" pitchFamily="34" charset="0"/>
+              </a:rPr>
+              <a:t>:</a:t>
+            </a:r>
+            <a:endParaRPr lang="bg-BG" sz="2400" i="1" dirty="0">
+              <a:solidFill>
+                <a:schemeClr val="tx2">
+                  <a:lumMod val="75000"/>
+                </a:schemeClr>
+              </a:solidFill>
+              <a:latin typeface="Arial" panose="020B0604020202020204" pitchFamily="34" charset="0"/>
+              <a:cs typeface="Arial" panose="020B0604020202020204" pitchFamily="34" charset="0"/>
+            </a:endParaRPr>
+          </a:p>
+          <a:p>
+            <a:pPr marL="0" indent="0">
+              <a:buNone/>
+            </a:pPr>
+            <a:r>
+              <a:rPr lang="en-US" sz="2400" dirty="0">
+                <a:solidFill>
+                  <a:schemeClr val="tx2">
+                    <a:lumMod val="75000"/>
+                  </a:schemeClr>
+                </a:solidFill>
+                <a:latin typeface="Consolas" panose="020B0609020204030204" pitchFamily="49" charset="0"/>
+              </a:rPr>
+              <a:t>string</a:t>
+            </a:r>
+            <a:r>
+              <a:rPr lang="en-US" sz="2400" dirty="0">
+                <a:latin typeface="Consolas" panose="020B0609020204030204" pitchFamily="49" charset="0"/>
+              </a:rPr>
+              <a:t> </a:t>
+            </a:r>
+            <a:r>
+              <a:rPr lang="en-US" sz="2400" dirty="0">
+                <a:solidFill>
+                  <a:schemeClr val="accent3"/>
+                </a:solidFill>
+                <a:latin typeface="Consolas" panose="020B0609020204030204" pitchFamily="49" charset="0"/>
+              </a:rPr>
+              <a:t>name</a:t>
+            </a:r>
+            <a:r>
+              <a:rPr lang="en-US" sz="2400" dirty="0">
+                <a:latin typeface="Consolas" panose="020B0609020204030204" pitchFamily="49" charset="0"/>
+              </a:rPr>
+              <a:t> = “</a:t>
+            </a:r>
+            <a:r>
+              <a:rPr lang="en-US" sz="2400" dirty="0">
+                <a:solidFill>
+                  <a:srgbClr val="FFC000"/>
+                </a:solidFill>
+                <a:latin typeface="Consolas" panose="020B0609020204030204" pitchFamily="49" charset="0"/>
+              </a:rPr>
+              <a:t>Velizar</a:t>
+            </a:r>
+            <a:r>
+              <a:rPr lang="en-US" sz="2400" dirty="0">
+                <a:latin typeface="Consolas" panose="020B0609020204030204" pitchFamily="49" charset="0"/>
+              </a:rPr>
+              <a:t>”;</a:t>
+            </a:r>
+            <a:endParaRPr lang="bg-BG" sz="2400" dirty="0">
+              <a:latin typeface="Consolas" panose="020B0609020204030204" pitchFamily="49" charset="0"/>
+            </a:endParaRPr>
+          </a:p>
+          <a:p>
+            <a:pPr marL="0" indent="0">
+              <a:buNone/>
+            </a:pPr>
+            <a:endParaRPr lang="en-US" sz="2400" dirty="0"/>
+          </a:p>
+          <a:p>
+            <a:pPr marL="0" indent="0">
+              <a:buNone/>
+            </a:pPr>
+            <a:r>
+              <a:rPr lang="bg-BG" sz="2400" dirty="0"/>
+              <a:t> </a:t>
+            </a:r>
+            <a:r>
+              <a:rPr lang="bg-BG" sz="2400" i="1" u="sng" dirty="0">
+                <a:solidFill>
+                  <a:srgbClr val="FFFF00"/>
+                </a:solidFill>
+                <a:latin typeface="Arial" panose="020B0604020202020204" pitchFamily="34" charset="0"/>
+                <a:cs typeface="Arial" panose="020B0604020202020204" pitchFamily="34" charset="0"/>
+              </a:rPr>
+              <a:t>Примери</a:t>
+            </a:r>
+            <a:r>
+              <a:rPr lang="bg-BG" sz="2400" i="1" u="sng" dirty="0">
+                <a:latin typeface="Arial" panose="020B0604020202020204" pitchFamily="34" charset="0"/>
+                <a:cs typeface="Arial" panose="020B0604020202020204" pitchFamily="34" charset="0"/>
+              </a:rPr>
+              <a:t>:</a:t>
+            </a:r>
+            <a:r>
+              <a:rPr lang="bg-BG" sz="2400" i="1" dirty="0">
+                <a:latin typeface="Arial" panose="020B0604020202020204" pitchFamily="34" charset="0"/>
+                <a:cs typeface="Arial" panose="020B0604020202020204" pitchFamily="34" charset="0"/>
+              </a:rPr>
+              <a:t> </a:t>
+            </a:r>
+            <a:r>
+              <a:rPr lang="bg-BG" sz="2400" i="1" dirty="0">
+                <a:solidFill>
+                  <a:schemeClr val="tx1"/>
+                </a:solidFill>
+                <a:latin typeface="Arial" panose="020B0604020202020204" pitchFamily="34" charset="0"/>
+                <a:cs typeface="Arial" panose="020B0604020202020204" pitchFamily="34" charset="0"/>
+              </a:rPr>
+              <a:t>Конкатениране</a:t>
+            </a:r>
+            <a:r>
+              <a:rPr lang="en-US" sz="2400" i="1" dirty="0">
+                <a:latin typeface="Arial" panose="020B0604020202020204" pitchFamily="34" charset="0"/>
+                <a:cs typeface="Arial" panose="020B0604020202020204" pitchFamily="34" charset="0"/>
+              </a:rPr>
+              <a:t> (</a:t>
+            </a:r>
+            <a:r>
+              <a:rPr lang="en-US" sz="2400" i="1" dirty="0">
+                <a:solidFill>
+                  <a:srgbClr val="C00000"/>
+                </a:solidFill>
+                <a:latin typeface="Arial" panose="020B0604020202020204" pitchFamily="34" charset="0"/>
+                <a:cs typeface="Arial" panose="020B0604020202020204" pitchFamily="34" charset="0"/>
+              </a:rPr>
+              <a:t>+</a:t>
+            </a:r>
+            <a:r>
+              <a:rPr lang="en-US" sz="2400" i="1" dirty="0">
+                <a:latin typeface="Arial" panose="020B0604020202020204" pitchFamily="34" charset="0"/>
+                <a:cs typeface="Arial" panose="020B0604020202020204" pitchFamily="34" charset="0"/>
+              </a:rPr>
+              <a:t>, </a:t>
+            </a:r>
+            <a:r>
+              <a:rPr lang="en-US" sz="2400" i="1" dirty="0">
+                <a:solidFill>
+                  <a:srgbClr val="C00000"/>
+                </a:solidFill>
+                <a:latin typeface="Arial" panose="020B0604020202020204" pitchFamily="34" charset="0"/>
+                <a:cs typeface="Arial" panose="020B0604020202020204" pitchFamily="34" charset="0"/>
+              </a:rPr>
+              <a:t>+=</a:t>
+            </a:r>
+            <a:r>
+              <a:rPr lang="en-US" sz="2400" i="1" dirty="0">
+                <a:latin typeface="Arial" panose="020B0604020202020204" pitchFamily="34" charset="0"/>
+                <a:cs typeface="Arial" panose="020B0604020202020204" pitchFamily="34" charset="0"/>
+              </a:rPr>
+              <a:t>, </a:t>
+            </a:r>
+            <a:r>
+              <a:rPr lang="en-US" sz="2400" i="1" dirty="0" err="1">
+                <a:solidFill>
+                  <a:srgbClr val="C00000"/>
+                </a:solidFill>
+                <a:latin typeface="Arial" panose="020B0604020202020204" pitchFamily="34" charset="0"/>
+                <a:cs typeface="Arial" panose="020B0604020202020204" pitchFamily="34" charset="0"/>
+              </a:rPr>
+              <a:t>Concat</a:t>
+            </a:r>
+            <a:r>
+              <a:rPr lang="en-US" sz="2400" i="1" dirty="0">
+                <a:latin typeface="Arial" panose="020B0604020202020204" pitchFamily="34" charset="0"/>
+                <a:cs typeface="Arial" panose="020B0604020202020204" pitchFamily="34" charset="0"/>
+              </a:rPr>
+              <a:t>)</a:t>
+            </a:r>
+            <a:r>
+              <a:rPr lang="bg-BG" sz="2400" i="1" dirty="0">
+                <a:latin typeface="Arial" panose="020B0604020202020204" pitchFamily="34" charset="0"/>
+                <a:cs typeface="Arial" panose="020B0604020202020204" pitchFamily="34" charset="0"/>
+              </a:rPr>
+              <a:t>:</a:t>
+            </a:r>
+          </a:p>
+          <a:p>
+            <a:pPr marL="0" indent="0">
+              <a:buNone/>
+            </a:pPr>
+            <a:r>
+              <a:rPr lang="en-US" sz="2400" dirty="0">
+                <a:solidFill>
+                  <a:schemeClr val="tx2">
+                    <a:lumMod val="75000"/>
+                  </a:schemeClr>
+                </a:solidFill>
+                <a:latin typeface="Consolas" panose="020B0609020204030204" pitchFamily="49" charset="0"/>
+              </a:rPr>
+              <a:t>string</a:t>
+            </a:r>
+            <a:r>
+              <a:rPr lang="en-US" sz="2400" dirty="0">
+                <a:latin typeface="Consolas" panose="020B0609020204030204" pitchFamily="49" charset="0"/>
+              </a:rPr>
+              <a:t> </a:t>
+            </a:r>
+            <a:r>
+              <a:rPr lang="en-US" sz="2400" dirty="0" err="1">
+                <a:solidFill>
+                  <a:schemeClr val="accent3"/>
+                </a:solidFill>
+                <a:latin typeface="Consolas" panose="020B0609020204030204" pitchFamily="49" charset="0"/>
+              </a:rPr>
+              <a:t>fullName</a:t>
+            </a:r>
+            <a:r>
+              <a:rPr lang="en-US" sz="2400" dirty="0">
+                <a:latin typeface="Consolas" panose="020B0609020204030204" pitchFamily="49" charset="0"/>
+              </a:rPr>
+              <a:t> = “</a:t>
+            </a:r>
+            <a:r>
+              <a:rPr lang="en-US" sz="2400" dirty="0">
+                <a:solidFill>
+                  <a:srgbClr val="FFC000"/>
+                </a:solidFill>
+                <a:latin typeface="Consolas" panose="020B0609020204030204" pitchFamily="49" charset="0"/>
+              </a:rPr>
+              <a:t>Velizar</a:t>
+            </a:r>
+            <a:r>
+              <a:rPr lang="en-US" sz="2400" dirty="0">
+                <a:latin typeface="Consolas" panose="020B0609020204030204" pitchFamily="49" charset="0"/>
+              </a:rPr>
+              <a:t>” </a:t>
+            </a:r>
+            <a:r>
+              <a:rPr lang="en-US" sz="2400" dirty="0">
+                <a:solidFill>
+                  <a:srgbClr val="C00000"/>
+                </a:solidFill>
+                <a:latin typeface="Consolas" panose="020B0609020204030204" pitchFamily="49" charset="0"/>
+              </a:rPr>
+              <a:t>+</a:t>
+            </a:r>
+            <a:r>
+              <a:rPr lang="en-US" sz="2400" dirty="0">
+                <a:latin typeface="Consolas" panose="020B0609020204030204" pitchFamily="49" charset="0"/>
+              </a:rPr>
+              <a:t> “</a:t>
+            </a:r>
+            <a:r>
+              <a:rPr lang="en-US" sz="2400" dirty="0">
+                <a:solidFill>
+                  <a:srgbClr val="FFC000"/>
+                </a:solidFill>
+                <a:latin typeface="Consolas" panose="020B0609020204030204" pitchFamily="49" charset="0"/>
+              </a:rPr>
+              <a:t>Gerasimov</a:t>
+            </a:r>
+            <a:r>
+              <a:rPr lang="en-US" sz="2400" dirty="0">
+                <a:latin typeface="Consolas" panose="020B0609020204030204" pitchFamily="49" charset="0"/>
+              </a:rPr>
+              <a:t>”;</a:t>
+            </a:r>
+          </a:p>
+          <a:p>
+            <a:pPr marL="0" indent="0">
+              <a:buNone/>
+            </a:pPr>
+            <a:endParaRPr lang="en-US" sz="2400" dirty="0">
+              <a:latin typeface="Consolas" panose="020B0609020204030204" pitchFamily="49" charset="0"/>
+            </a:endParaRPr>
+          </a:p>
+          <a:p>
+            <a:pPr marL="0" indent="0">
+              <a:buNone/>
+            </a:pPr>
+            <a:r>
+              <a:rPr lang="en-US" sz="2400" dirty="0">
+                <a:solidFill>
+                  <a:schemeClr val="tx2">
+                    <a:lumMod val="75000"/>
+                  </a:schemeClr>
+                </a:solidFill>
+                <a:latin typeface="Consolas" panose="020B0609020204030204" pitchFamily="49" charset="0"/>
+              </a:rPr>
+              <a:t>string</a:t>
+            </a:r>
+            <a:r>
+              <a:rPr lang="en-US" sz="2400" dirty="0">
+                <a:latin typeface="Consolas" panose="020B0609020204030204" pitchFamily="49" charset="0"/>
+              </a:rPr>
+              <a:t> </a:t>
+            </a:r>
+            <a:r>
+              <a:rPr lang="en-US" sz="2400" dirty="0" err="1">
+                <a:solidFill>
+                  <a:srgbClr val="92D050"/>
+                </a:solidFill>
+                <a:latin typeface="Consolas" panose="020B0609020204030204" pitchFamily="49" charset="0"/>
+              </a:rPr>
+              <a:t>fullName</a:t>
+            </a:r>
+            <a:r>
+              <a:rPr lang="en-US" sz="2400" dirty="0">
+                <a:latin typeface="Consolas" panose="020B0609020204030204" pitchFamily="49" charset="0"/>
+              </a:rPr>
+              <a:t> = “”;</a:t>
+            </a:r>
+          </a:p>
+          <a:p>
+            <a:pPr marL="0" indent="0">
+              <a:buNone/>
+            </a:pPr>
+            <a:r>
+              <a:rPr lang="en-US" sz="2400" dirty="0" err="1">
+                <a:solidFill>
+                  <a:srgbClr val="92D050"/>
+                </a:solidFill>
+                <a:latin typeface="Consolas" panose="020B0609020204030204" pitchFamily="49" charset="0"/>
+              </a:rPr>
+              <a:t>fullName</a:t>
+            </a:r>
+            <a:r>
+              <a:rPr lang="en-US" sz="2400" dirty="0">
+                <a:latin typeface="Consolas" panose="020B0609020204030204" pitchFamily="49" charset="0"/>
+              </a:rPr>
+              <a:t> </a:t>
+            </a:r>
+            <a:r>
+              <a:rPr lang="en-US" sz="2400" dirty="0">
+                <a:solidFill>
+                  <a:srgbClr val="C00000"/>
+                </a:solidFill>
+                <a:latin typeface="Consolas" panose="020B0609020204030204" pitchFamily="49" charset="0"/>
+              </a:rPr>
+              <a:t>+=</a:t>
+            </a:r>
+            <a:r>
+              <a:rPr lang="en-US" sz="2400" dirty="0">
+                <a:latin typeface="Consolas" panose="020B0609020204030204" pitchFamily="49" charset="0"/>
+              </a:rPr>
+              <a:t> “</a:t>
+            </a:r>
+            <a:r>
+              <a:rPr lang="en-US" sz="2400" dirty="0">
+                <a:solidFill>
+                  <a:srgbClr val="FFC000"/>
+                </a:solidFill>
+                <a:latin typeface="Consolas" panose="020B0609020204030204" pitchFamily="49" charset="0"/>
+              </a:rPr>
+              <a:t>Velizar</a:t>
+            </a:r>
+            <a:r>
+              <a:rPr lang="en-US" sz="2400" dirty="0">
+                <a:latin typeface="Consolas" panose="020B0609020204030204" pitchFamily="49" charset="0"/>
+              </a:rPr>
+              <a:t>” + “</a:t>
+            </a:r>
+            <a:r>
+              <a:rPr lang="en-US" sz="2400" dirty="0">
+                <a:solidFill>
+                  <a:srgbClr val="FFC000"/>
+                </a:solidFill>
+                <a:latin typeface="Consolas" panose="020B0609020204030204" pitchFamily="49" charset="0"/>
+              </a:rPr>
+              <a:t>Gerasimov</a:t>
+            </a:r>
+            <a:r>
+              <a:rPr lang="en-US" sz="2400" dirty="0">
+                <a:latin typeface="Consolas" panose="020B0609020204030204" pitchFamily="49" charset="0"/>
+              </a:rPr>
+              <a:t>”;</a:t>
+            </a:r>
+          </a:p>
+          <a:p>
+            <a:endParaRPr lang="en-US" sz="2400" dirty="0">
+              <a:latin typeface="Consolas" panose="020B0609020204030204" pitchFamily="49" charset="0"/>
+            </a:endParaRPr>
+          </a:p>
+          <a:p>
+            <a:pPr marL="0" indent="0">
+              <a:buNone/>
+            </a:pPr>
+            <a:r>
+              <a:rPr lang="en-US" sz="2400" dirty="0">
+                <a:solidFill>
+                  <a:schemeClr val="tx2">
+                    <a:lumMod val="75000"/>
+                  </a:schemeClr>
+                </a:solidFill>
+                <a:latin typeface="Consolas" panose="020B0609020204030204" pitchFamily="49" charset="0"/>
+              </a:rPr>
+              <a:t>string</a:t>
+            </a:r>
+            <a:r>
+              <a:rPr lang="en-US" sz="2400" dirty="0">
+                <a:latin typeface="Consolas" panose="020B0609020204030204" pitchFamily="49" charset="0"/>
+              </a:rPr>
+              <a:t> </a:t>
+            </a:r>
+            <a:r>
+              <a:rPr lang="en-US" sz="2400" dirty="0" err="1">
+                <a:solidFill>
+                  <a:srgbClr val="92D050"/>
+                </a:solidFill>
+                <a:latin typeface="Consolas" panose="020B0609020204030204" pitchFamily="49" charset="0"/>
+              </a:rPr>
+              <a:t>fullName</a:t>
+            </a:r>
+            <a:r>
+              <a:rPr lang="en-US" sz="2400" dirty="0">
+                <a:latin typeface="Consolas" panose="020B0609020204030204" pitchFamily="49" charset="0"/>
+              </a:rPr>
+              <a:t> = </a:t>
+            </a:r>
+            <a:r>
+              <a:rPr lang="en-US" sz="2400" dirty="0" err="1">
+                <a:solidFill>
+                  <a:schemeClr val="tx2">
+                    <a:lumMod val="75000"/>
+                  </a:schemeClr>
+                </a:solidFill>
+                <a:latin typeface="Consolas" panose="020B0609020204030204" pitchFamily="49" charset="0"/>
+              </a:rPr>
+              <a:t>string</a:t>
+            </a:r>
+            <a:r>
+              <a:rPr lang="en-US" sz="2400" dirty="0" err="1">
+                <a:latin typeface="Consolas" panose="020B0609020204030204" pitchFamily="49" charset="0"/>
+              </a:rPr>
+              <a:t>.</a:t>
+            </a:r>
+            <a:r>
+              <a:rPr lang="en-US" sz="2400" dirty="0" err="1">
+                <a:solidFill>
+                  <a:srgbClr val="C00000"/>
+                </a:solidFill>
+                <a:latin typeface="Consolas" panose="020B0609020204030204" pitchFamily="49" charset="0"/>
+              </a:rPr>
+              <a:t>Concat</a:t>
+            </a:r>
+            <a:r>
+              <a:rPr lang="en-US" sz="2400" dirty="0">
+                <a:latin typeface="Consolas" panose="020B0609020204030204" pitchFamily="49" charset="0"/>
+              </a:rPr>
+              <a:t>(“</a:t>
+            </a:r>
+            <a:r>
+              <a:rPr lang="en-US" sz="2400" dirty="0">
+                <a:solidFill>
+                  <a:srgbClr val="FFC000"/>
+                </a:solidFill>
+                <a:latin typeface="Consolas" panose="020B0609020204030204" pitchFamily="49" charset="0"/>
+              </a:rPr>
+              <a:t>Velizar</a:t>
+            </a:r>
+            <a:r>
+              <a:rPr lang="en-US" sz="2400" dirty="0">
+                <a:latin typeface="Consolas" panose="020B0609020204030204" pitchFamily="49" charset="0"/>
+              </a:rPr>
+              <a:t>”, “</a:t>
+            </a:r>
+            <a:r>
+              <a:rPr lang="en-US" sz="2400" dirty="0">
+                <a:solidFill>
+                  <a:srgbClr val="FFC000"/>
+                </a:solidFill>
+                <a:latin typeface="Consolas" panose="020B0609020204030204" pitchFamily="49" charset="0"/>
+              </a:rPr>
+              <a:t>Gerasimov</a:t>
+            </a:r>
+            <a:r>
+              <a:rPr lang="en-US" sz="2400" dirty="0">
+                <a:latin typeface="Consolas" panose="020B0609020204030204" pitchFamily="49" charset="0"/>
+              </a:rPr>
+              <a:t>”)</a:t>
+            </a:r>
+            <a:endParaRPr lang="bg-BG" sz="2400" dirty="0">
+              <a:latin typeface="Consolas" panose="020B0609020204030204" pitchFamily="49" charset="0"/>
+            </a:endParaRPr>
+          </a:p>
+        </p:txBody>
+      </p:sp>
+    </p:spTree>
+    <p:extLst>
+      <p:ext uri="{BB962C8B-B14F-4D97-AF65-F5344CB8AC3E}">
+        <p14:creationId xmlns:p14="http://schemas.microsoft.com/office/powerpoint/2010/main" val="4122542239"/>
+      </p:ext>
+    </p:extLst>
+  </p:cSld>
+  <p:clrMapOvr>
+    <a:masterClrMapping/>
+  </p:clrMapOvr>
+</p:sld>
+</file>
+
+<file path=ppt/slides/slide46.xml><?xml version="1.0" encoding="utf-8"?>
+<p:sld xmlns:a="http://schemas.openxmlformats.org/drawingml/2006/main" xmlns:r="http://schemas.openxmlformats.org/officeDocument/2006/relationships" xmlns:p="http://schemas.openxmlformats.org/presentationml/2006/main">
+  <p:cSld>
+    <p:spTree>
+      <p:nvGrpSpPr>
+        <p:cNvPr id="1" name=""/>
+        <p:cNvGrpSpPr/>
+        <p:nvPr/>
+      </p:nvGrpSpPr>
+      <p:grpSpPr>
+        <a:xfrm>
+          <a:off x="0" y="0"/>
+          <a:ext cx="0" cy="0"/>
+          <a:chOff x="0" y="0"/>
+          <a:chExt cx="0" cy="0"/>
+        </a:xfrm>
+      </p:grpSpPr>
+      <p:sp>
+        <p:nvSpPr>
+          <p:cNvPr id="2" name="Title 1">
+            <a:extLst>
+              <a:ext uri="{FF2B5EF4-FFF2-40B4-BE49-F238E27FC236}">
+                <a16:creationId xmlns:a16="http://schemas.microsoft.com/office/drawing/2014/main" id="{9217D3B9-F20E-DE85-F279-38554B5370AB}"/>
+              </a:ext>
+            </a:extLst>
+          </p:cNvPr>
+          <p:cNvSpPr>
+            <a:spLocks noGrp="1"/>
+          </p:cNvSpPr>
+          <p:nvPr>
+            <p:ph type="title"/>
+          </p:nvPr>
+        </p:nvSpPr>
+        <p:spPr/>
+        <p:txBody>
+          <a:bodyPr>
+            <a:normAutofit fontScale="90000"/>
+          </a:bodyPr>
+          <a:lstStyle/>
+          <a:p>
+            <a:pPr algn="ctr"/>
+            <a:r>
+              <a:rPr lang="bg-BG" dirty="0">
+                <a:latin typeface="Arial" panose="020B0604020202020204" pitchFamily="34" charset="0"/>
+                <a:cs typeface="Arial" panose="020B0604020202020204" pitchFamily="34" charset="0"/>
+              </a:rPr>
+              <a:t>Четене на стринг от конзолата и конвертиране от/към </a:t>
+            </a:r>
+            <a:r>
+              <a:rPr lang="en-US" dirty="0">
+                <a:latin typeface="Arial" panose="020B0604020202020204" pitchFamily="34" charset="0"/>
+                <a:cs typeface="Arial" panose="020B0604020202020204" pitchFamily="34" charset="0"/>
+              </a:rPr>
+              <a:t>char array</a:t>
+            </a:r>
+            <a:endParaRPr lang="bg-BG" dirty="0">
+              <a:latin typeface="Arial" panose="020B0604020202020204" pitchFamily="34" charset="0"/>
+              <a:cs typeface="Arial" panose="020B0604020202020204" pitchFamily="34" charset="0"/>
+            </a:endParaRPr>
+          </a:p>
+        </p:txBody>
+      </p:sp>
+      <p:sp>
+        <p:nvSpPr>
+          <p:cNvPr id="3" name="Content Placeholder 2">
+            <a:extLst>
+              <a:ext uri="{FF2B5EF4-FFF2-40B4-BE49-F238E27FC236}">
+                <a16:creationId xmlns:a16="http://schemas.microsoft.com/office/drawing/2014/main" id="{7F8EF8D3-6291-6152-FFD6-D366C2DD0873}"/>
+              </a:ext>
+            </a:extLst>
+          </p:cNvPr>
+          <p:cNvSpPr>
+            <a:spLocks noGrp="1"/>
+          </p:cNvSpPr>
+          <p:nvPr>
+            <p:ph idx="1"/>
+          </p:nvPr>
+        </p:nvSpPr>
+        <p:spPr>
+          <a:xfrm>
+            <a:off x="1120000" y="2484407"/>
+            <a:ext cx="10233800" cy="3692555"/>
+          </a:xfrm>
+        </p:spPr>
+        <p:txBody>
+          <a:bodyPr>
+            <a:normAutofit/>
+          </a:bodyPr>
+          <a:lstStyle/>
+          <a:p>
+            <a:pPr marL="0" indent="0">
+              <a:buNone/>
+            </a:pPr>
+            <a:r>
+              <a:rPr lang="bg-BG" sz="2800" i="1" u="sng" dirty="0">
+                <a:solidFill>
+                  <a:srgbClr val="FFFF00"/>
+                </a:solidFill>
+                <a:latin typeface="Arial" panose="020B0604020202020204" pitchFamily="34" charset="0"/>
+                <a:cs typeface="Arial" panose="020B0604020202020204" pitchFamily="34" charset="0"/>
+              </a:rPr>
+              <a:t>Пример</a:t>
+            </a:r>
+            <a:r>
+              <a:rPr lang="bg-BG" sz="2800" i="1" u="sng" dirty="0">
+                <a:latin typeface="Arial" panose="020B0604020202020204" pitchFamily="34" charset="0"/>
+                <a:cs typeface="Arial" panose="020B0604020202020204" pitchFamily="34" charset="0"/>
+              </a:rPr>
+              <a:t>:</a:t>
+            </a:r>
+            <a:r>
+              <a:rPr lang="bg-BG" sz="2800" i="1" dirty="0">
+                <a:latin typeface="Arial" panose="020B0604020202020204" pitchFamily="34" charset="0"/>
+                <a:cs typeface="Arial" panose="020B0604020202020204" pitchFamily="34" charset="0"/>
+              </a:rPr>
+              <a:t> </a:t>
+            </a:r>
+            <a:r>
+              <a:rPr lang="bg-BG" i="1" dirty="0">
+                <a:latin typeface="Arial" panose="020B0604020202020204" pitchFamily="34" charset="0"/>
+                <a:cs typeface="Arial" panose="020B0604020202020204" pitchFamily="34" charset="0"/>
+              </a:rPr>
+              <a:t>Четене от конзолата</a:t>
+            </a:r>
+            <a:r>
+              <a:rPr lang="bg-BG" sz="2800" dirty="0">
+                <a:latin typeface="Arial" panose="020B0604020202020204" pitchFamily="34" charset="0"/>
+                <a:cs typeface="Arial" panose="020B0604020202020204" pitchFamily="34" charset="0"/>
+              </a:rPr>
+              <a:t>:</a:t>
+            </a:r>
+            <a:endParaRPr lang="en-US" sz="2800" dirty="0">
+              <a:solidFill>
+                <a:schemeClr val="tx2">
+                  <a:lumMod val="75000"/>
+                </a:schemeClr>
+              </a:solidFill>
+              <a:latin typeface="Consolas" panose="020B0609020204030204" pitchFamily="49" charset="0"/>
+            </a:endParaRPr>
+          </a:p>
+          <a:p>
+            <a:pPr marL="0" indent="0">
+              <a:buNone/>
+            </a:pPr>
+            <a:r>
+              <a:rPr lang="en-US" sz="2800" dirty="0">
+                <a:solidFill>
+                  <a:schemeClr val="tx2">
+                    <a:lumMod val="75000"/>
+                  </a:schemeClr>
+                </a:solidFill>
+                <a:latin typeface="Consolas" panose="020B0609020204030204" pitchFamily="49" charset="0"/>
+              </a:rPr>
+              <a:t>string</a:t>
+            </a:r>
+            <a:r>
+              <a:rPr lang="en-US" sz="2800" dirty="0">
+                <a:latin typeface="Consolas" panose="020B0609020204030204" pitchFamily="49" charset="0"/>
+              </a:rPr>
+              <a:t> </a:t>
+            </a:r>
+            <a:r>
+              <a:rPr lang="en-US" sz="2800" dirty="0">
+                <a:solidFill>
+                  <a:schemeClr val="accent3"/>
+                </a:solidFill>
+                <a:latin typeface="Consolas" panose="020B0609020204030204" pitchFamily="49" charset="0"/>
+              </a:rPr>
+              <a:t>name</a:t>
+            </a:r>
+            <a:r>
+              <a:rPr lang="en-US" sz="2800" dirty="0">
+                <a:latin typeface="Consolas" panose="020B0609020204030204" pitchFamily="49" charset="0"/>
+              </a:rPr>
+              <a:t> = </a:t>
+            </a:r>
+            <a:r>
+              <a:rPr lang="en-US" sz="2800" dirty="0" err="1">
+                <a:latin typeface="Consolas" panose="020B0609020204030204" pitchFamily="49" charset="0"/>
+              </a:rPr>
+              <a:t>Console.ReadLine</a:t>
+            </a:r>
+            <a:r>
+              <a:rPr lang="en-US" sz="2800" dirty="0">
+                <a:latin typeface="Consolas" panose="020B0609020204030204" pitchFamily="49" charset="0"/>
+              </a:rPr>
+              <a:t>();</a:t>
+            </a:r>
+          </a:p>
+          <a:p>
+            <a:endParaRPr lang="bg-BG" sz="2800" dirty="0">
+              <a:latin typeface="Consolas" panose="020B0609020204030204" pitchFamily="49" charset="0"/>
+            </a:endParaRPr>
+          </a:p>
+          <a:p>
+            <a:pPr marL="0" indent="0">
+              <a:buNone/>
+            </a:pPr>
+            <a:r>
+              <a:rPr lang="bg-BG" sz="2800" i="1" u="sng" dirty="0">
+                <a:solidFill>
+                  <a:srgbClr val="FFFF00"/>
+                </a:solidFill>
+                <a:latin typeface="Arial" panose="020B0604020202020204" pitchFamily="34" charset="0"/>
+                <a:cs typeface="Arial" panose="020B0604020202020204" pitchFamily="34" charset="0"/>
+              </a:rPr>
+              <a:t>Пример</a:t>
+            </a:r>
+            <a:r>
+              <a:rPr lang="bg-BG" sz="2800" i="1" u="sng" dirty="0">
+                <a:latin typeface="Arial" panose="020B0604020202020204" pitchFamily="34" charset="0"/>
+                <a:cs typeface="Arial" panose="020B0604020202020204" pitchFamily="34" charset="0"/>
+              </a:rPr>
+              <a:t>:</a:t>
+            </a:r>
+            <a:r>
+              <a:rPr lang="bg-BG" sz="2800" i="1" dirty="0">
+                <a:latin typeface="Arial" panose="020B0604020202020204" pitchFamily="34" charset="0"/>
+                <a:cs typeface="Arial" panose="020B0604020202020204" pitchFamily="34" charset="0"/>
+              </a:rPr>
+              <a:t> </a:t>
+            </a:r>
+            <a:r>
+              <a:rPr lang="bg-BG" i="1" dirty="0">
+                <a:latin typeface="Arial" panose="020B0604020202020204" pitchFamily="34" charset="0"/>
+                <a:cs typeface="Arial" panose="020B0604020202020204" pitchFamily="34" charset="0"/>
+              </a:rPr>
+              <a:t>Конвертиране от/към </a:t>
+            </a:r>
+            <a:r>
+              <a:rPr lang="en-US" i="1" dirty="0">
+                <a:latin typeface="Arial" panose="020B0604020202020204" pitchFamily="34" charset="0"/>
+                <a:cs typeface="Arial" panose="020B0604020202020204" pitchFamily="34" charset="0"/>
+              </a:rPr>
+              <a:t>char array</a:t>
+            </a:r>
+            <a:r>
+              <a:rPr lang="bg-BG" sz="2800" dirty="0">
+                <a:latin typeface="Arial" panose="020B0604020202020204" pitchFamily="34" charset="0"/>
+                <a:cs typeface="Arial" panose="020B0604020202020204" pitchFamily="34" charset="0"/>
+              </a:rPr>
+              <a:t>:</a:t>
+            </a:r>
+            <a:endParaRPr lang="bg-BG" dirty="0">
+              <a:solidFill>
+                <a:schemeClr val="tx2">
+                  <a:lumMod val="75000"/>
+                </a:schemeClr>
+              </a:solidFill>
+              <a:latin typeface="Arial" panose="020B0604020202020204" pitchFamily="34" charset="0"/>
+              <a:cs typeface="Arial" panose="020B0604020202020204" pitchFamily="34" charset="0"/>
+            </a:endParaRPr>
+          </a:p>
+          <a:p>
+            <a:pPr marL="0" indent="0">
+              <a:buNone/>
+            </a:pPr>
+            <a:r>
+              <a:rPr lang="en-US" sz="2400" dirty="0">
+                <a:solidFill>
+                  <a:schemeClr val="tx2">
+                    <a:lumMod val="75000"/>
+                  </a:schemeClr>
+                </a:solidFill>
+                <a:latin typeface="Consolas" panose="020B0609020204030204" pitchFamily="49" charset="0"/>
+                <a:cs typeface="Arial" panose="020B0604020202020204" pitchFamily="34" charset="0"/>
+              </a:rPr>
+              <a:t>string </a:t>
+            </a:r>
+            <a:r>
+              <a:rPr lang="en-US" sz="2400" dirty="0" err="1">
+                <a:solidFill>
+                  <a:srgbClr val="92D050"/>
+                </a:solidFill>
+                <a:latin typeface="Consolas" panose="020B0609020204030204" pitchFamily="49" charset="0"/>
+                <a:cs typeface="Arial" panose="020B0604020202020204" pitchFamily="34" charset="0"/>
+              </a:rPr>
+              <a:t>someString</a:t>
+            </a:r>
+            <a:r>
+              <a:rPr lang="en-US" sz="2400" dirty="0">
+                <a:solidFill>
+                  <a:schemeClr val="tx2">
+                    <a:lumMod val="75000"/>
+                  </a:schemeClr>
+                </a:solidFill>
+                <a:latin typeface="Consolas" panose="020B0609020204030204" pitchFamily="49" charset="0"/>
+                <a:cs typeface="Arial" panose="020B0604020202020204" pitchFamily="34" charset="0"/>
+              </a:rPr>
+              <a:t> = </a:t>
+            </a:r>
+            <a:r>
+              <a:rPr lang="en-US" sz="2400" dirty="0">
+                <a:solidFill>
+                  <a:srgbClr val="FFFF00"/>
+                </a:solidFill>
+                <a:latin typeface="Consolas" panose="020B0609020204030204" pitchFamily="49" charset="0"/>
+                <a:cs typeface="Arial" panose="020B0604020202020204" pitchFamily="34" charset="0"/>
+              </a:rPr>
+              <a:t>new</a:t>
+            </a:r>
+            <a:r>
+              <a:rPr lang="en-US" sz="2400" dirty="0">
+                <a:solidFill>
+                  <a:schemeClr val="tx2">
+                    <a:lumMod val="75000"/>
+                  </a:schemeClr>
+                </a:solidFill>
+                <a:latin typeface="Consolas" panose="020B0609020204030204" pitchFamily="49" charset="0"/>
+                <a:cs typeface="Arial" panose="020B0604020202020204" pitchFamily="34" charset="0"/>
+              </a:rPr>
+              <a:t> string </a:t>
+            </a:r>
+            <a:r>
+              <a:rPr lang="en-US" sz="2400" dirty="0">
+                <a:solidFill>
+                  <a:schemeClr val="tx1"/>
+                </a:solidFill>
+                <a:latin typeface="Consolas" panose="020B0609020204030204" pitchFamily="49" charset="0"/>
+                <a:cs typeface="Arial" panose="020B0604020202020204" pitchFamily="34" charset="0"/>
+              </a:rPr>
+              <a:t>(</a:t>
+            </a:r>
+            <a:r>
+              <a:rPr lang="en-US" sz="2400" dirty="0">
+                <a:solidFill>
+                  <a:srgbClr val="FFFF00"/>
+                </a:solidFill>
+                <a:latin typeface="Consolas" panose="020B0609020204030204" pitchFamily="49" charset="0"/>
+                <a:cs typeface="Arial" panose="020B0604020202020204" pitchFamily="34" charset="0"/>
+              </a:rPr>
+              <a:t>new</a:t>
+            </a:r>
+            <a:r>
+              <a:rPr lang="en-US" sz="2400" dirty="0">
+                <a:solidFill>
+                  <a:schemeClr val="tx2">
+                    <a:lumMod val="75000"/>
+                  </a:schemeClr>
+                </a:solidFill>
+                <a:latin typeface="Consolas" panose="020B0609020204030204" pitchFamily="49" charset="0"/>
+                <a:cs typeface="Arial" panose="020B0604020202020204" pitchFamily="34" charset="0"/>
+              </a:rPr>
+              <a:t> char[] </a:t>
+            </a:r>
+            <a:r>
+              <a:rPr lang="en-US" sz="2400" dirty="0">
+                <a:solidFill>
+                  <a:srgbClr val="FFC000"/>
+                </a:solidFill>
+                <a:latin typeface="Consolas" panose="020B0609020204030204" pitchFamily="49" charset="0"/>
+                <a:cs typeface="Arial" panose="020B0604020202020204" pitchFamily="34" charset="0"/>
+              </a:rPr>
+              <a:t>{‘H’, ‘</a:t>
+            </a:r>
+            <a:r>
+              <a:rPr lang="en-US" sz="2400" dirty="0" err="1">
+                <a:solidFill>
+                  <a:srgbClr val="FFC000"/>
+                </a:solidFill>
+                <a:latin typeface="Consolas" panose="020B0609020204030204" pitchFamily="49" charset="0"/>
+                <a:cs typeface="Arial" panose="020B0604020202020204" pitchFamily="34" charset="0"/>
+              </a:rPr>
+              <a:t>i</a:t>
+            </a:r>
+            <a:r>
+              <a:rPr lang="en-US" sz="2400" dirty="0">
+                <a:solidFill>
+                  <a:srgbClr val="FFC000"/>
+                </a:solidFill>
+                <a:latin typeface="Consolas" panose="020B0609020204030204" pitchFamily="49" charset="0"/>
+                <a:cs typeface="Arial" panose="020B0604020202020204" pitchFamily="34" charset="0"/>
+              </a:rPr>
+              <a:t>’} </a:t>
+            </a:r>
+            <a:r>
+              <a:rPr lang="en-US" sz="2400" dirty="0">
+                <a:solidFill>
+                  <a:schemeClr val="tx1"/>
+                </a:solidFill>
+                <a:latin typeface="Consolas" panose="020B0609020204030204" pitchFamily="49" charset="0"/>
+                <a:cs typeface="Arial" panose="020B0604020202020204" pitchFamily="34" charset="0"/>
+              </a:rPr>
+              <a:t>)</a:t>
+            </a:r>
+            <a:r>
+              <a:rPr lang="bg-BG" sz="2400" dirty="0">
+                <a:solidFill>
+                  <a:schemeClr val="tx1"/>
+                </a:solidFill>
+                <a:latin typeface="Consolas" panose="020B0609020204030204" pitchFamily="49" charset="0"/>
+                <a:cs typeface="Arial" panose="020B0604020202020204" pitchFamily="34" charset="0"/>
+              </a:rPr>
+              <a:t>;</a:t>
+            </a:r>
+            <a:endParaRPr lang="en-US" sz="2400" dirty="0">
+              <a:solidFill>
+                <a:schemeClr val="tx1"/>
+              </a:solidFill>
+              <a:latin typeface="Consolas" panose="020B0609020204030204" pitchFamily="49" charset="0"/>
+              <a:cs typeface="Arial" panose="020B0604020202020204" pitchFamily="34" charset="0"/>
+            </a:endParaRPr>
+          </a:p>
+          <a:p>
+            <a:endParaRPr lang="en-US" sz="2400" dirty="0">
+              <a:solidFill>
+                <a:schemeClr val="tx2">
+                  <a:lumMod val="75000"/>
+                </a:schemeClr>
+              </a:solidFill>
+              <a:latin typeface="Consolas" panose="020B0609020204030204" pitchFamily="49" charset="0"/>
+            </a:endParaRPr>
+          </a:p>
+          <a:p>
+            <a:pPr marL="0" indent="0">
+              <a:buNone/>
+            </a:pPr>
+            <a:r>
+              <a:rPr lang="en-US" sz="2400" dirty="0">
+                <a:solidFill>
+                  <a:schemeClr val="tx2">
+                    <a:lumMod val="75000"/>
+                  </a:schemeClr>
+                </a:solidFill>
+                <a:latin typeface="Consolas" panose="020B0609020204030204" pitchFamily="49" charset="0"/>
+              </a:rPr>
+              <a:t>char[] </a:t>
+            </a:r>
+            <a:r>
+              <a:rPr lang="en-US" sz="2400" dirty="0" err="1">
+                <a:solidFill>
+                  <a:srgbClr val="92D050"/>
+                </a:solidFill>
+                <a:latin typeface="Consolas" panose="020B0609020204030204" pitchFamily="49" charset="0"/>
+              </a:rPr>
+              <a:t>charArray</a:t>
+            </a:r>
+            <a:r>
+              <a:rPr lang="en-US" sz="2400" dirty="0">
+                <a:latin typeface="Consolas" panose="020B0609020204030204" pitchFamily="49" charset="0"/>
+              </a:rPr>
+              <a:t> = </a:t>
+            </a:r>
+            <a:r>
+              <a:rPr lang="en-US" sz="2400" dirty="0" err="1">
+                <a:solidFill>
+                  <a:srgbClr val="92D050"/>
+                </a:solidFill>
+                <a:latin typeface="Consolas" panose="020B0609020204030204" pitchFamily="49" charset="0"/>
+              </a:rPr>
+              <a:t>someString</a:t>
+            </a:r>
+            <a:r>
+              <a:rPr lang="en-US" sz="2400" dirty="0" err="1">
+                <a:latin typeface="Consolas" panose="020B0609020204030204" pitchFamily="49" charset="0"/>
+              </a:rPr>
+              <a:t>.</a:t>
+            </a:r>
+            <a:r>
+              <a:rPr lang="en-US" sz="2400" dirty="0" err="1">
+                <a:solidFill>
+                  <a:schemeClr val="accent6">
+                    <a:lumMod val="60000"/>
+                    <a:lumOff val="40000"/>
+                  </a:schemeClr>
+                </a:solidFill>
+                <a:latin typeface="Consolas" panose="020B0609020204030204" pitchFamily="49" charset="0"/>
+              </a:rPr>
+              <a:t>ToCharArray</a:t>
+            </a:r>
+            <a:r>
+              <a:rPr lang="en-US" sz="2400" dirty="0">
+                <a:solidFill>
+                  <a:schemeClr val="accent6">
+                    <a:lumMod val="60000"/>
+                    <a:lumOff val="40000"/>
+                  </a:schemeClr>
+                </a:solidFill>
+                <a:latin typeface="Consolas" panose="020B0609020204030204" pitchFamily="49" charset="0"/>
+              </a:rPr>
+              <a:t>()</a:t>
+            </a:r>
+            <a:r>
+              <a:rPr lang="en-US" sz="2400" dirty="0">
+                <a:latin typeface="Consolas" panose="020B0609020204030204" pitchFamily="49" charset="0"/>
+              </a:rPr>
+              <a:t>;</a:t>
+            </a:r>
+            <a:endParaRPr lang="bg-BG" sz="2400" dirty="0">
+              <a:latin typeface="Consolas" panose="020B0609020204030204" pitchFamily="49" charset="0"/>
+            </a:endParaRPr>
+          </a:p>
+          <a:p>
+            <a:endParaRPr lang="bg-BG" dirty="0"/>
+          </a:p>
+        </p:txBody>
+      </p:sp>
+    </p:spTree>
+    <p:extLst>
+      <p:ext uri="{BB962C8B-B14F-4D97-AF65-F5344CB8AC3E}">
+        <p14:creationId xmlns:p14="http://schemas.microsoft.com/office/powerpoint/2010/main" val="2107874820"/>
+      </p:ext>
+    </p:extLst>
+  </p:cSld>
+  <p:clrMapOvr>
+    <a:masterClrMapping/>
+  </p:clrMapOvr>
+</p:sld>
+</file>
+
+<file path=ppt/slides/slide47.xml><?xml version="1.0" encoding="utf-8"?>
+<p:sld xmlns:a="http://schemas.openxmlformats.org/drawingml/2006/main" xmlns:r="http://schemas.openxmlformats.org/officeDocument/2006/relationships" xmlns:p="http://schemas.openxmlformats.org/presentationml/2006/main">
+  <p:cSld>
+    <p:spTree>
+      <p:nvGrpSpPr>
+        <p:cNvPr id="1" name=""/>
+        <p:cNvGrpSpPr/>
+        <p:nvPr/>
+      </p:nvGrpSpPr>
+      <p:grpSpPr>
+        <a:xfrm>
+          <a:off x="0" y="0"/>
+          <a:ext cx="0" cy="0"/>
+          <a:chOff x="0" y="0"/>
+          <a:chExt cx="0" cy="0"/>
+        </a:xfrm>
+      </p:grpSpPr>
+      <p:sp>
+        <p:nvSpPr>
+          <p:cNvPr id="2" name="Title 1">
+            <a:extLst>
+              <a:ext uri="{FF2B5EF4-FFF2-40B4-BE49-F238E27FC236}">
+                <a16:creationId xmlns:a16="http://schemas.microsoft.com/office/drawing/2014/main" id="{61D59F22-5523-C0A7-DE9B-987BCE50FD71}"/>
+              </a:ext>
+            </a:extLst>
+          </p:cNvPr>
+          <p:cNvSpPr>
+            <a:spLocks noGrp="1"/>
+          </p:cNvSpPr>
+          <p:nvPr>
+            <p:ph type="title"/>
+          </p:nvPr>
+        </p:nvSpPr>
+        <p:spPr/>
+        <p:txBody>
+          <a:bodyPr>
+            <a:normAutofit fontScale="90000"/>
+          </a:bodyPr>
+          <a:lstStyle/>
+          <a:p>
+            <a:pPr algn="ctr"/>
+            <a:r>
+              <a:rPr lang="bg-BG" dirty="0">
+                <a:solidFill>
+                  <a:schemeClr val="tx1"/>
+                </a:solidFill>
+                <a:latin typeface="Arial" panose="020B0604020202020204" pitchFamily="34" charset="0"/>
+                <a:cs typeface="Arial" panose="020B0604020202020204" pitchFamily="34" charset="0"/>
+              </a:rPr>
+              <a:t>Търсене в стринг</a:t>
+            </a:r>
+            <a:r>
+              <a:rPr lang="en-US" dirty="0">
+                <a:solidFill>
+                  <a:schemeClr val="tx1"/>
+                </a:solidFill>
+                <a:latin typeface="Arial" panose="020B0604020202020204" pitchFamily="34" charset="0"/>
+                <a:cs typeface="Arial" panose="020B0604020202020204" pitchFamily="34" charset="0"/>
+              </a:rPr>
+              <a:t> (1) – </a:t>
+            </a:r>
+            <a:r>
+              <a:rPr lang="en-US" dirty="0">
+                <a:solidFill>
+                  <a:srgbClr val="FFFF00"/>
+                </a:solidFill>
+                <a:latin typeface="Arial" panose="020B0604020202020204" pitchFamily="34" charset="0"/>
+                <a:cs typeface="Arial" panose="020B0604020202020204" pitchFamily="34" charset="0"/>
+              </a:rPr>
+              <a:t>Contains()</a:t>
+            </a:r>
+            <a:endParaRPr lang="bg-BG" dirty="0">
+              <a:solidFill>
+                <a:srgbClr val="FFFF00"/>
+              </a:solidFill>
+              <a:latin typeface="Arial" panose="020B0604020202020204" pitchFamily="34" charset="0"/>
+              <a:cs typeface="Arial" panose="020B0604020202020204" pitchFamily="34" charset="0"/>
+            </a:endParaRPr>
+          </a:p>
+        </p:txBody>
+      </p:sp>
+      <p:sp>
+        <p:nvSpPr>
+          <p:cNvPr id="3" name="Content Placeholder 2">
+            <a:extLst>
+              <a:ext uri="{FF2B5EF4-FFF2-40B4-BE49-F238E27FC236}">
+                <a16:creationId xmlns:a16="http://schemas.microsoft.com/office/drawing/2014/main" id="{3CFF27EA-E27B-9E5A-CD0A-50166314D161}"/>
+              </a:ext>
+            </a:extLst>
+          </p:cNvPr>
+          <p:cNvSpPr>
+            <a:spLocks noGrp="1"/>
+          </p:cNvSpPr>
+          <p:nvPr>
+            <p:ph idx="1"/>
+          </p:nvPr>
+        </p:nvSpPr>
+        <p:spPr/>
+        <p:txBody>
+          <a:bodyPr/>
+          <a:lstStyle/>
+          <a:p>
+            <a:r>
+              <a:rPr lang="en-US" dirty="0">
+                <a:solidFill>
+                  <a:srgbClr val="FFFF00"/>
+                </a:solidFill>
+                <a:latin typeface="Arial" panose="020B0604020202020204" pitchFamily="34" charset="0"/>
+                <a:cs typeface="Arial" panose="020B0604020202020204" pitchFamily="34" charset="0"/>
+              </a:rPr>
+              <a:t>Contains</a:t>
+            </a:r>
+            <a:r>
+              <a:rPr lang="en-US" dirty="0">
+                <a:latin typeface="Arial" panose="020B0604020202020204" pitchFamily="34" charset="0"/>
+                <a:cs typeface="Arial" panose="020B0604020202020204" pitchFamily="34" charset="0"/>
+              </a:rPr>
+              <a:t> </a:t>
+            </a:r>
+            <a:r>
+              <a:rPr lang="bg-BG" dirty="0">
+                <a:solidFill>
+                  <a:schemeClr val="tx1"/>
+                </a:solidFill>
+                <a:latin typeface="Arial" panose="020B0604020202020204" pitchFamily="34" charset="0"/>
+                <a:cs typeface="Arial" panose="020B0604020202020204" pitchFamily="34" charset="0"/>
+              </a:rPr>
+              <a:t>проверява дали един стринг съдържа друг стринг в себе си.</a:t>
+            </a:r>
+          </a:p>
+          <a:p>
+            <a:endParaRPr lang="bg-BG" dirty="0"/>
+          </a:p>
+          <a:p>
+            <a:endParaRPr lang="bg-BG" dirty="0"/>
+          </a:p>
+        </p:txBody>
+      </p:sp>
+      <p:sp>
+        <p:nvSpPr>
+          <p:cNvPr id="5" name="TextBox 4">
+            <a:extLst>
+              <a:ext uri="{FF2B5EF4-FFF2-40B4-BE49-F238E27FC236}">
+                <a16:creationId xmlns:a16="http://schemas.microsoft.com/office/drawing/2014/main" id="{EDF9AA5B-27EC-2197-E8C9-0068DDE4848F}"/>
+              </a:ext>
+            </a:extLst>
+          </p:cNvPr>
+          <p:cNvSpPr txBox="1"/>
+          <p:nvPr/>
+        </p:nvSpPr>
+        <p:spPr>
+          <a:xfrm>
+            <a:off x="2210161" y="3192100"/>
+            <a:ext cx="8105236" cy="2246769"/>
+          </a:xfrm>
+          <a:prstGeom prst="rect">
+            <a:avLst/>
+          </a:prstGeom>
+          <a:noFill/>
+        </p:spPr>
+        <p:txBody>
+          <a:bodyPr wrap="square">
+            <a:spAutoFit/>
+          </a:bodyPr>
+          <a:lstStyle/>
+          <a:p>
+            <a:pPr marL="0" indent="0">
+              <a:buNone/>
+            </a:pPr>
+            <a:r>
+              <a:rPr lang="bg-BG" sz="2000" i="1" u="sng" dirty="0">
+                <a:solidFill>
+                  <a:srgbClr val="FFFF00"/>
+                </a:solidFill>
+                <a:latin typeface="Arial" panose="020B0604020202020204" pitchFamily="34" charset="0"/>
+                <a:cs typeface="Arial" panose="020B0604020202020204" pitchFamily="34" charset="0"/>
+              </a:rPr>
+              <a:t>Пример</a:t>
+            </a:r>
+            <a:r>
+              <a:rPr lang="bg-BG" sz="2000" i="1" u="sng" dirty="0">
+                <a:latin typeface="Arial" panose="020B0604020202020204" pitchFamily="34" charset="0"/>
+                <a:cs typeface="Arial" panose="020B0604020202020204" pitchFamily="34" charset="0"/>
+              </a:rPr>
+              <a:t>:</a:t>
+            </a:r>
+            <a:r>
+              <a:rPr lang="bg-BG" sz="2000" i="1" dirty="0">
+                <a:latin typeface="Arial" panose="020B0604020202020204" pitchFamily="34" charset="0"/>
+                <a:cs typeface="Arial" panose="020B0604020202020204" pitchFamily="34" charset="0"/>
+              </a:rPr>
+              <a:t> </a:t>
+            </a:r>
+          </a:p>
+          <a:p>
+            <a:pPr marL="0" indent="0">
+              <a:buNone/>
+            </a:pPr>
+            <a:endParaRPr lang="bg-BG" sz="2000" i="1" dirty="0">
+              <a:solidFill>
+                <a:schemeClr val="tx2">
+                  <a:lumMod val="75000"/>
+                </a:schemeClr>
+              </a:solidFill>
+              <a:latin typeface="Arial" panose="020B0604020202020204" pitchFamily="34" charset="0"/>
+              <a:cs typeface="Arial" panose="020B0604020202020204" pitchFamily="34" charset="0"/>
+            </a:endParaRPr>
+          </a:p>
+          <a:p>
+            <a:pPr marL="0" indent="0">
+              <a:buNone/>
+            </a:pPr>
+            <a:r>
+              <a:rPr lang="en-US" sz="2000" dirty="0">
+                <a:solidFill>
+                  <a:schemeClr val="tx2">
+                    <a:lumMod val="75000"/>
+                  </a:schemeClr>
+                </a:solidFill>
+                <a:latin typeface="Consolas" panose="020B0609020204030204" pitchFamily="49" charset="0"/>
+              </a:rPr>
+              <a:t>string</a:t>
+            </a:r>
+            <a:r>
+              <a:rPr lang="en-US" sz="2000" dirty="0">
+                <a:latin typeface="Consolas" panose="020B0609020204030204" pitchFamily="49" charset="0"/>
+              </a:rPr>
+              <a:t> </a:t>
+            </a:r>
+            <a:r>
+              <a:rPr lang="en-US" sz="2000" dirty="0">
+                <a:solidFill>
+                  <a:schemeClr val="accent3"/>
+                </a:solidFill>
+                <a:latin typeface="Consolas" panose="020B0609020204030204" pitchFamily="49" charset="0"/>
+              </a:rPr>
+              <a:t>text = </a:t>
+            </a:r>
+            <a:r>
+              <a:rPr lang="en-US" sz="2000" dirty="0">
+                <a:solidFill>
+                  <a:srgbClr val="FFC000"/>
+                </a:solidFill>
+                <a:latin typeface="Consolas" panose="020B0609020204030204" pitchFamily="49" charset="0"/>
+              </a:rPr>
+              <a:t>“I like Peugeot, BMW and Audi.”</a:t>
+            </a:r>
+            <a:r>
+              <a:rPr lang="en-US" sz="2000" dirty="0">
+                <a:latin typeface="Consolas" panose="020B0609020204030204" pitchFamily="49" charset="0"/>
+              </a:rPr>
+              <a:t>;</a:t>
+            </a:r>
+          </a:p>
+          <a:p>
+            <a:pPr marL="0" indent="0">
+              <a:buNone/>
+            </a:pPr>
+            <a:endParaRPr lang="en-US" sz="2000" dirty="0">
+              <a:solidFill>
+                <a:schemeClr val="accent6">
+                  <a:lumMod val="60000"/>
+                  <a:lumOff val="40000"/>
+                </a:schemeClr>
+              </a:solidFill>
+              <a:latin typeface="Consolas" panose="020B0609020204030204" pitchFamily="49" charset="0"/>
+            </a:endParaRPr>
+          </a:p>
+          <a:p>
+            <a:pPr marL="0" indent="0">
+              <a:buNone/>
+            </a:pPr>
+            <a:r>
+              <a:rPr lang="en-US" sz="2000" dirty="0" err="1">
+                <a:latin typeface="Consolas" panose="020B0609020204030204" pitchFamily="49" charset="0"/>
+              </a:rPr>
+              <a:t>Console.WriteLine</a:t>
+            </a:r>
+            <a:r>
+              <a:rPr lang="en-US" sz="2000" dirty="0">
+                <a:latin typeface="Consolas" panose="020B0609020204030204" pitchFamily="49" charset="0"/>
+              </a:rPr>
+              <a:t>(</a:t>
+            </a:r>
+            <a:r>
+              <a:rPr lang="en-US" sz="2000" dirty="0" err="1">
+                <a:solidFill>
+                  <a:schemeClr val="accent3"/>
+                </a:solidFill>
+                <a:latin typeface="Consolas" panose="020B0609020204030204" pitchFamily="49" charset="0"/>
+              </a:rPr>
+              <a:t>text.</a:t>
+            </a:r>
+            <a:r>
+              <a:rPr lang="en-US" sz="2000" dirty="0" err="1">
+                <a:solidFill>
+                  <a:schemeClr val="accent6">
+                    <a:lumMod val="60000"/>
+                    <a:lumOff val="40000"/>
+                  </a:schemeClr>
+                </a:solidFill>
+                <a:latin typeface="Consolas" panose="020B0609020204030204" pitchFamily="49" charset="0"/>
+              </a:rPr>
+              <a:t>Contains</a:t>
+            </a:r>
+            <a:r>
+              <a:rPr lang="en-US" sz="2000" dirty="0">
+                <a:solidFill>
+                  <a:schemeClr val="accent3"/>
+                </a:solidFill>
+                <a:latin typeface="Consolas" panose="020B0609020204030204" pitchFamily="49" charset="0"/>
+              </a:rPr>
+              <a:t>(</a:t>
+            </a:r>
+            <a:r>
+              <a:rPr lang="en-US" sz="2000" dirty="0">
+                <a:solidFill>
+                  <a:srgbClr val="FFC000"/>
+                </a:solidFill>
+                <a:latin typeface="Consolas" panose="020B0609020204030204" pitchFamily="49" charset="0"/>
+              </a:rPr>
+              <a:t>“BMW”</a:t>
+            </a:r>
+            <a:r>
+              <a:rPr lang="en-US" sz="2000" dirty="0">
+                <a:solidFill>
+                  <a:schemeClr val="accent3"/>
+                </a:solidFill>
+                <a:latin typeface="Consolas" panose="020B0609020204030204" pitchFamily="49" charset="0"/>
+              </a:rPr>
+              <a:t>)</a:t>
+            </a:r>
+            <a:r>
+              <a:rPr lang="en-US" sz="2000" dirty="0">
+                <a:latin typeface="Consolas" panose="020B0609020204030204" pitchFamily="49" charset="0"/>
+              </a:rPr>
+              <a:t>);</a:t>
+            </a:r>
+            <a:r>
+              <a:rPr lang="en-US" sz="2000" dirty="0">
+                <a:solidFill>
+                  <a:schemeClr val="accent6">
+                    <a:lumMod val="60000"/>
+                    <a:lumOff val="40000"/>
+                  </a:schemeClr>
+                </a:solidFill>
+                <a:latin typeface="Consolas" panose="020B0609020204030204" pitchFamily="49" charset="0"/>
+              </a:rPr>
+              <a:t> 	  </a:t>
+            </a:r>
+            <a:r>
+              <a:rPr lang="en-US" sz="2000" dirty="0">
+                <a:latin typeface="Consolas" panose="020B0609020204030204" pitchFamily="49" charset="0"/>
+              </a:rPr>
+              <a:t>//</a:t>
+            </a:r>
+            <a:r>
+              <a:rPr lang="en-US" sz="2000" dirty="0">
+                <a:solidFill>
+                  <a:srgbClr val="92D050"/>
+                </a:solidFill>
+                <a:latin typeface="Consolas" panose="020B0609020204030204" pitchFamily="49" charset="0"/>
+              </a:rPr>
+              <a:t>True</a:t>
+            </a:r>
+          </a:p>
+          <a:p>
+            <a:r>
+              <a:rPr lang="en-US" sz="2000" dirty="0" err="1">
+                <a:latin typeface="Consolas" panose="020B0609020204030204" pitchFamily="49" charset="0"/>
+              </a:rPr>
+              <a:t>Console.WriteLine</a:t>
+            </a:r>
+            <a:r>
+              <a:rPr lang="en-US" sz="2000" dirty="0">
+                <a:latin typeface="Consolas" panose="020B0609020204030204" pitchFamily="49" charset="0"/>
+              </a:rPr>
+              <a:t>(</a:t>
+            </a:r>
+            <a:r>
+              <a:rPr lang="en-US" sz="2000" dirty="0" err="1">
+                <a:solidFill>
+                  <a:schemeClr val="accent3"/>
+                </a:solidFill>
+                <a:latin typeface="Consolas" panose="020B0609020204030204" pitchFamily="49" charset="0"/>
+              </a:rPr>
+              <a:t>text.</a:t>
+            </a:r>
+            <a:r>
+              <a:rPr lang="en-US" sz="2000" dirty="0" err="1">
+                <a:solidFill>
+                  <a:schemeClr val="accent6">
+                    <a:lumMod val="60000"/>
+                    <a:lumOff val="40000"/>
+                  </a:schemeClr>
+                </a:solidFill>
+                <a:latin typeface="Consolas" panose="020B0609020204030204" pitchFamily="49" charset="0"/>
+              </a:rPr>
+              <a:t>Contains</a:t>
+            </a:r>
+            <a:r>
+              <a:rPr lang="en-US" sz="2000" dirty="0">
+                <a:solidFill>
+                  <a:schemeClr val="accent3"/>
+                </a:solidFill>
+                <a:latin typeface="Consolas" panose="020B0609020204030204" pitchFamily="49" charset="0"/>
+              </a:rPr>
+              <a:t>(</a:t>
+            </a:r>
+            <a:r>
+              <a:rPr lang="en-US" sz="2000" dirty="0">
+                <a:solidFill>
+                  <a:srgbClr val="FFC000"/>
+                </a:solidFill>
+                <a:latin typeface="Consolas" panose="020B0609020204030204" pitchFamily="49" charset="0"/>
+              </a:rPr>
+              <a:t>“Mercedes”</a:t>
+            </a:r>
+            <a:r>
+              <a:rPr lang="en-US" sz="2000" dirty="0">
+                <a:solidFill>
+                  <a:schemeClr val="accent3"/>
+                </a:solidFill>
+                <a:latin typeface="Consolas" panose="020B0609020204030204" pitchFamily="49" charset="0"/>
+              </a:rPr>
+              <a:t>)</a:t>
+            </a:r>
+            <a:r>
+              <a:rPr lang="en-US" sz="2000" dirty="0">
+                <a:latin typeface="Consolas" panose="020B0609020204030204" pitchFamily="49" charset="0"/>
+              </a:rPr>
+              <a:t>);</a:t>
+            </a:r>
+            <a:r>
+              <a:rPr lang="en-US" sz="2000" dirty="0">
+                <a:solidFill>
+                  <a:schemeClr val="accent6">
+                    <a:lumMod val="60000"/>
+                    <a:lumOff val="40000"/>
+                  </a:schemeClr>
+                </a:solidFill>
+                <a:latin typeface="Consolas" panose="020B0609020204030204" pitchFamily="49" charset="0"/>
+              </a:rPr>
+              <a:t> </a:t>
+            </a:r>
+            <a:r>
+              <a:rPr lang="en-US" sz="2000" dirty="0">
+                <a:latin typeface="Consolas" panose="020B0609020204030204" pitchFamily="49" charset="0"/>
+              </a:rPr>
+              <a:t>//</a:t>
+            </a:r>
+            <a:r>
+              <a:rPr lang="en-US" sz="2000" dirty="0">
+                <a:solidFill>
+                  <a:srgbClr val="FF0000"/>
+                </a:solidFill>
+                <a:latin typeface="Consolas" panose="020B0609020204030204" pitchFamily="49" charset="0"/>
+              </a:rPr>
+              <a:t>False</a:t>
+            </a:r>
+          </a:p>
+          <a:p>
+            <a:pPr marL="0" indent="0">
+              <a:buNone/>
+            </a:pPr>
+            <a:endParaRPr lang="en-US" sz="2000" dirty="0">
+              <a:solidFill>
+                <a:schemeClr val="accent6">
+                  <a:lumMod val="60000"/>
+                  <a:lumOff val="40000"/>
+                </a:schemeClr>
+              </a:solidFill>
+              <a:latin typeface="Consolas" panose="020B0609020204030204" pitchFamily="49" charset="0"/>
+            </a:endParaRPr>
+          </a:p>
+        </p:txBody>
+      </p:sp>
+    </p:spTree>
+    <p:extLst>
+      <p:ext uri="{BB962C8B-B14F-4D97-AF65-F5344CB8AC3E}">
+        <p14:creationId xmlns:p14="http://schemas.microsoft.com/office/powerpoint/2010/main" val="4261314826"/>
+      </p:ext>
+    </p:extLst>
+  </p:cSld>
+  <p:clrMapOvr>
+    <a:masterClrMapping/>
+  </p:clrMapOvr>
+</p:sld>
+</file>
+
+<file path=ppt/slides/slide48.xml><?xml version="1.0" encoding="utf-8"?>
+<p:sld xmlns:a="http://schemas.openxmlformats.org/drawingml/2006/main" xmlns:r="http://schemas.openxmlformats.org/officeDocument/2006/relationships" xmlns:p="http://schemas.openxmlformats.org/presentationml/2006/main">
+  <p:cSld>
+    <p:spTree>
+      <p:nvGrpSpPr>
+        <p:cNvPr id="1" name=""/>
+        <p:cNvGrpSpPr/>
+        <p:nvPr/>
+      </p:nvGrpSpPr>
+      <p:grpSpPr>
+        <a:xfrm>
+          <a:off x="0" y="0"/>
+          <a:ext cx="0" cy="0"/>
+          <a:chOff x="0" y="0"/>
+          <a:chExt cx="0" cy="0"/>
+        </a:xfrm>
+      </p:grpSpPr>
+      <p:sp>
+        <p:nvSpPr>
+          <p:cNvPr id="2" name="Title 1">
+            <a:extLst>
+              <a:ext uri="{FF2B5EF4-FFF2-40B4-BE49-F238E27FC236}">
+                <a16:creationId xmlns:a16="http://schemas.microsoft.com/office/drawing/2014/main" id="{61D59F22-5523-C0A7-DE9B-987BCE50FD71}"/>
+              </a:ext>
+            </a:extLst>
+          </p:cNvPr>
+          <p:cNvSpPr>
+            <a:spLocks noGrp="1"/>
+          </p:cNvSpPr>
+          <p:nvPr>
+            <p:ph type="title"/>
+          </p:nvPr>
+        </p:nvSpPr>
+        <p:spPr/>
+        <p:txBody>
+          <a:bodyPr>
+            <a:normAutofit fontScale="90000"/>
+          </a:bodyPr>
+          <a:lstStyle/>
+          <a:p>
+            <a:pPr algn="ctr"/>
+            <a:r>
+              <a:rPr lang="bg-BG" dirty="0">
+                <a:latin typeface="Arial" panose="020B0604020202020204" pitchFamily="34" charset="0"/>
+                <a:cs typeface="Arial" panose="020B0604020202020204" pitchFamily="34" charset="0"/>
+              </a:rPr>
+              <a:t>Търсене в стринг</a:t>
+            </a:r>
+            <a:r>
+              <a:rPr lang="en-US" dirty="0">
+                <a:latin typeface="Arial" panose="020B0604020202020204" pitchFamily="34" charset="0"/>
+                <a:cs typeface="Arial" panose="020B0604020202020204" pitchFamily="34" charset="0"/>
+              </a:rPr>
+              <a:t> (2) – </a:t>
+            </a:r>
+            <a:r>
+              <a:rPr lang="en-US" dirty="0">
+                <a:solidFill>
+                  <a:srgbClr val="FFFF00"/>
+                </a:solidFill>
+                <a:latin typeface="Arial" panose="020B0604020202020204" pitchFamily="34" charset="0"/>
+                <a:cs typeface="Arial" panose="020B0604020202020204" pitchFamily="34" charset="0"/>
+              </a:rPr>
+              <a:t>Substring()</a:t>
+            </a:r>
+            <a:endParaRPr lang="bg-BG" dirty="0">
+              <a:solidFill>
+                <a:srgbClr val="FFFF00"/>
+              </a:solidFill>
+              <a:latin typeface="Arial" panose="020B0604020202020204" pitchFamily="34" charset="0"/>
+              <a:cs typeface="Arial" panose="020B0604020202020204" pitchFamily="34" charset="0"/>
+            </a:endParaRPr>
+          </a:p>
+        </p:txBody>
+      </p:sp>
+      <p:sp>
+        <p:nvSpPr>
+          <p:cNvPr id="3" name="Content Placeholder 2">
+            <a:extLst>
+              <a:ext uri="{FF2B5EF4-FFF2-40B4-BE49-F238E27FC236}">
+                <a16:creationId xmlns:a16="http://schemas.microsoft.com/office/drawing/2014/main" id="{3CFF27EA-E27B-9E5A-CD0A-50166314D161}"/>
+              </a:ext>
+            </a:extLst>
+          </p:cNvPr>
+          <p:cNvSpPr>
+            <a:spLocks noGrp="1"/>
+          </p:cNvSpPr>
+          <p:nvPr>
+            <p:ph idx="1"/>
+          </p:nvPr>
+        </p:nvSpPr>
+        <p:spPr/>
+        <p:txBody>
+          <a:bodyPr/>
+          <a:lstStyle/>
+          <a:p>
+            <a:r>
+              <a:rPr lang="en-US" dirty="0">
+                <a:solidFill>
+                  <a:srgbClr val="FFFF00"/>
+                </a:solidFill>
+                <a:latin typeface="Arial" panose="020B0604020202020204" pitchFamily="34" charset="0"/>
+                <a:cs typeface="Arial" panose="020B0604020202020204" pitchFamily="34" charset="0"/>
+              </a:rPr>
+              <a:t>Substring</a:t>
+            </a:r>
+            <a:r>
+              <a:rPr lang="en-US" dirty="0">
+                <a:latin typeface="Arial" panose="020B0604020202020204" pitchFamily="34" charset="0"/>
+                <a:cs typeface="Arial" panose="020B0604020202020204" pitchFamily="34" charset="0"/>
+              </a:rPr>
+              <a:t> </a:t>
+            </a:r>
+            <a:r>
+              <a:rPr lang="bg-BG" dirty="0">
+                <a:solidFill>
+                  <a:schemeClr val="tx1"/>
+                </a:solidFill>
+                <a:latin typeface="Arial" panose="020B0604020202020204" pitchFamily="34" charset="0"/>
+                <a:cs typeface="Arial" panose="020B0604020202020204" pitchFamily="34" charset="0"/>
+              </a:rPr>
+              <a:t>връща отрязък от стринг. Задават му се начален индекс и дължина</a:t>
+            </a:r>
+            <a:r>
+              <a:rPr lang="bg-BG" dirty="0">
+                <a:latin typeface="Arial" panose="020B0604020202020204" pitchFamily="34" charset="0"/>
+                <a:cs typeface="Arial" panose="020B0604020202020204" pitchFamily="34" charset="0"/>
+              </a:rPr>
+              <a:t>.</a:t>
+            </a:r>
+          </a:p>
+          <a:p>
+            <a:endParaRPr lang="bg-BG" dirty="0"/>
+          </a:p>
+          <a:p>
+            <a:endParaRPr lang="bg-BG" dirty="0"/>
+          </a:p>
+        </p:txBody>
+      </p:sp>
+      <p:sp>
+        <p:nvSpPr>
+          <p:cNvPr id="5" name="TextBox 4">
+            <a:extLst>
+              <a:ext uri="{FF2B5EF4-FFF2-40B4-BE49-F238E27FC236}">
+                <a16:creationId xmlns:a16="http://schemas.microsoft.com/office/drawing/2014/main" id="{EDF9AA5B-27EC-2197-E8C9-0068DDE4848F}"/>
+              </a:ext>
+            </a:extLst>
+          </p:cNvPr>
+          <p:cNvSpPr txBox="1"/>
+          <p:nvPr/>
+        </p:nvSpPr>
+        <p:spPr>
+          <a:xfrm>
+            <a:off x="2399942" y="3252484"/>
+            <a:ext cx="8105236" cy="2523768"/>
+          </a:xfrm>
+          <a:prstGeom prst="rect">
+            <a:avLst/>
+          </a:prstGeom>
+          <a:noFill/>
+        </p:spPr>
+        <p:txBody>
+          <a:bodyPr wrap="square">
+            <a:spAutoFit/>
+          </a:bodyPr>
+          <a:lstStyle/>
+          <a:p>
+            <a:pPr marL="0" indent="0">
+              <a:buNone/>
+            </a:pPr>
+            <a:r>
+              <a:rPr lang="bg-BG" sz="2000" i="1" u="sng" dirty="0">
+                <a:solidFill>
+                  <a:srgbClr val="FFFF00"/>
+                </a:solidFill>
+                <a:latin typeface="Arial" panose="020B0604020202020204" pitchFamily="34" charset="0"/>
+                <a:cs typeface="Arial" panose="020B0604020202020204" pitchFamily="34" charset="0"/>
+              </a:rPr>
+              <a:t>Пример</a:t>
+            </a:r>
+            <a:r>
+              <a:rPr lang="bg-BG" sz="2000" i="1" u="sng" dirty="0">
+                <a:latin typeface="Arial" panose="020B0604020202020204" pitchFamily="34" charset="0"/>
+                <a:cs typeface="Arial" panose="020B0604020202020204" pitchFamily="34" charset="0"/>
+              </a:rPr>
+              <a:t>:</a:t>
+            </a:r>
+            <a:r>
+              <a:rPr lang="bg-BG" sz="2000" i="1" dirty="0">
+                <a:latin typeface="Arial" panose="020B0604020202020204" pitchFamily="34" charset="0"/>
+                <a:cs typeface="Arial" panose="020B0604020202020204" pitchFamily="34" charset="0"/>
+              </a:rPr>
+              <a:t> </a:t>
+            </a:r>
+          </a:p>
+          <a:p>
+            <a:pPr marL="0" indent="0">
+              <a:buNone/>
+            </a:pPr>
+            <a:endParaRPr lang="bg-BG" sz="2000" i="1" dirty="0">
+              <a:solidFill>
+                <a:schemeClr val="tx2">
+                  <a:lumMod val="75000"/>
+                </a:schemeClr>
+              </a:solidFill>
+              <a:latin typeface="Arial" panose="020B0604020202020204" pitchFamily="34" charset="0"/>
+              <a:cs typeface="Arial" panose="020B0604020202020204" pitchFamily="34" charset="0"/>
+            </a:endParaRPr>
+          </a:p>
+          <a:p>
+            <a:pPr marL="0" indent="0">
+              <a:buNone/>
+            </a:pPr>
+            <a:r>
+              <a:rPr lang="en-US" sz="2000" dirty="0">
+                <a:solidFill>
+                  <a:schemeClr val="tx2">
+                    <a:lumMod val="75000"/>
+                  </a:schemeClr>
+                </a:solidFill>
+                <a:latin typeface="Consolas" panose="020B0609020204030204" pitchFamily="49" charset="0"/>
+              </a:rPr>
+              <a:t>string</a:t>
+            </a:r>
+            <a:r>
+              <a:rPr lang="en-US" sz="2000" dirty="0">
+                <a:latin typeface="Consolas" panose="020B0609020204030204" pitchFamily="49" charset="0"/>
+              </a:rPr>
+              <a:t> </a:t>
+            </a:r>
+            <a:r>
+              <a:rPr lang="en-US" sz="2000" dirty="0">
+                <a:solidFill>
+                  <a:schemeClr val="accent3"/>
+                </a:solidFill>
+                <a:latin typeface="Consolas" panose="020B0609020204030204" pitchFamily="49" charset="0"/>
+              </a:rPr>
+              <a:t>text = </a:t>
+            </a:r>
+            <a:r>
+              <a:rPr lang="en-US" sz="2000" dirty="0">
+                <a:solidFill>
+                  <a:srgbClr val="FFC000"/>
+                </a:solidFill>
+                <a:latin typeface="Consolas" panose="020B0609020204030204" pitchFamily="49" charset="0"/>
+              </a:rPr>
+              <a:t>“I like Peugeot, BMW and Audi.”</a:t>
+            </a:r>
+            <a:r>
+              <a:rPr lang="en-US" sz="2000" dirty="0">
+                <a:latin typeface="Consolas" panose="020B0609020204030204" pitchFamily="49" charset="0"/>
+              </a:rPr>
+              <a:t>;</a:t>
+            </a:r>
+          </a:p>
+          <a:p>
+            <a:pPr marL="0" indent="0">
+              <a:buNone/>
+            </a:pPr>
+            <a:endParaRPr lang="en-US" sz="2000" dirty="0">
+              <a:solidFill>
+                <a:schemeClr val="accent6">
+                  <a:lumMod val="60000"/>
+                  <a:lumOff val="40000"/>
+                </a:schemeClr>
+              </a:solidFill>
+              <a:latin typeface="Consolas" panose="020B0609020204030204" pitchFamily="49" charset="0"/>
+            </a:endParaRPr>
+          </a:p>
+          <a:p>
+            <a:pPr marL="0" indent="0">
+              <a:buNone/>
+            </a:pPr>
+            <a:r>
+              <a:rPr lang="en-US" sz="2000" dirty="0">
+                <a:solidFill>
+                  <a:schemeClr val="tx2">
+                    <a:lumMod val="75000"/>
+                  </a:schemeClr>
+                </a:solidFill>
+                <a:latin typeface="Consolas" panose="020B0609020204030204" pitchFamily="49" charset="0"/>
+              </a:rPr>
+              <a:t>string</a:t>
+            </a:r>
+            <a:r>
+              <a:rPr lang="en-US" sz="2000" dirty="0">
+                <a:solidFill>
+                  <a:srgbClr val="92D050"/>
+                </a:solidFill>
+                <a:latin typeface="Consolas" panose="020B0609020204030204" pitchFamily="49" charset="0"/>
+              </a:rPr>
+              <a:t> </a:t>
+            </a:r>
+            <a:r>
+              <a:rPr lang="en-US" sz="2000" dirty="0" err="1">
+                <a:solidFill>
+                  <a:srgbClr val="92D050"/>
+                </a:solidFill>
+                <a:latin typeface="Consolas" panose="020B0609020204030204" pitchFamily="49" charset="0"/>
+              </a:rPr>
+              <a:t>partialString</a:t>
+            </a:r>
+            <a:r>
+              <a:rPr lang="en-US" sz="2000" dirty="0">
+                <a:solidFill>
+                  <a:srgbClr val="92D050"/>
+                </a:solidFill>
+                <a:latin typeface="Consolas" panose="020B0609020204030204" pitchFamily="49" charset="0"/>
+              </a:rPr>
+              <a:t> = </a:t>
+            </a:r>
+            <a:r>
+              <a:rPr lang="en-US" sz="2000" dirty="0" err="1">
+                <a:solidFill>
+                  <a:schemeClr val="accent3"/>
+                </a:solidFill>
+                <a:latin typeface="Consolas" panose="020B0609020204030204" pitchFamily="49" charset="0"/>
+              </a:rPr>
+              <a:t>text</a:t>
+            </a:r>
+            <a:r>
+              <a:rPr lang="en-US" sz="2000" dirty="0" err="1">
+                <a:solidFill>
+                  <a:schemeClr val="accent6">
+                    <a:lumMod val="60000"/>
+                    <a:lumOff val="40000"/>
+                  </a:schemeClr>
+                </a:solidFill>
+                <a:latin typeface="Consolas" panose="020B0609020204030204" pitchFamily="49" charset="0"/>
+              </a:rPr>
+              <a:t>.Substring</a:t>
+            </a:r>
+            <a:r>
+              <a:rPr lang="en-US" sz="2000" dirty="0">
+                <a:latin typeface="Consolas" panose="020B0609020204030204" pitchFamily="49" charset="0"/>
+              </a:rPr>
+              <a:t>(</a:t>
+            </a:r>
+            <a:r>
+              <a:rPr lang="en-US" sz="2000" dirty="0">
+                <a:solidFill>
+                  <a:schemeClr val="accent3"/>
+                </a:solidFill>
+                <a:latin typeface="Consolas" panose="020B0609020204030204" pitchFamily="49" charset="0"/>
+              </a:rPr>
+              <a:t>16, 4</a:t>
+            </a:r>
+            <a:r>
+              <a:rPr lang="en-US" sz="2000" dirty="0">
+                <a:latin typeface="Consolas" panose="020B0609020204030204" pitchFamily="49" charset="0"/>
+              </a:rPr>
+              <a:t>);</a:t>
+            </a:r>
+          </a:p>
+          <a:p>
+            <a:pPr marL="0" indent="0">
+              <a:buNone/>
+            </a:pPr>
+            <a:endParaRPr lang="en-US" sz="2000" dirty="0">
+              <a:latin typeface="Consolas" panose="020B0609020204030204" pitchFamily="49" charset="0"/>
+            </a:endParaRPr>
+          </a:p>
+          <a:p>
+            <a:pPr marL="0" indent="0">
+              <a:buNone/>
+            </a:pPr>
+            <a:r>
+              <a:rPr lang="en-US" sz="2000" dirty="0" err="1">
+                <a:latin typeface="Consolas" panose="020B0609020204030204" pitchFamily="49" charset="0"/>
+              </a:rPr>
+              <a:t>Console.WriteLine</a:t>
+            </a:r>
+            <a:r>
+              <a:rPr lang="en-US" sz="2000" dirty="0">
+                <a:latin typeface="Consolas" panose="020B0609020204030204" pitchFamily="49" charset="0"/>
+              </a:rPr>
+              <a:t>(</a:t>
+            </a:r>
+            <a:r>
+              <a:rPr lang="en-US" sz="2000" dirty="0" err="1">
+                <a:solidFill>
+                  <a:srgbClr val="92D050"/>
+                </a:solidFill>
+                <a:latin typeface="Consolas" panose="020B0609020204030204" pitchFamily="49" charset="0"/>
+              </a:rPr>
+              <a:t>partialString</a:t>
+            </a:r>
+            <a:r>
+              <a:rPr lang="en-US" sz="2000" dirty="0">
+                <a:latin typeface="Consolas" panose="020B0609020204030204" pitchFamily="49" charset="0"/>
+              </a:rPr>
+              <a:t>); //BMW</a:t>
+            </a:r>
+          </a:p>
+          <a:p>
+            <a:pPr marL="0" indent="0">
+              <a:buNone/>
+            </a:pPr>
+            <a:endParaRPr lang="en-US" sz="1800" dirty="0">
+              <a:solidFill>
+                <a:schemeClr val="accent6">
+                  <a:lumMod val="60000"/>
+                  <a:lumOff val="40000"/>
+                </a:schemeClr>
+              </a:solidFill>
+              <a:latin typeface="Consolas" panose="020B0609020204030204" pitchFamily="49" charset="0"/>
+            </a:endParaRPr>
+          </a:p>
+        </p:txBody>
+      </p:sp>
+    </p:spTree>
+    <p:extLst>
+      <p:ext uri="{BB962C8B-B14F-4D97-AF65-F5344CB8AC3E}">
+        <p14:creationId xmlns:p14="http://schemas.microsoft.com/office/powerpoint/2010/main" val="616547875"/>
+      </p:ext>
+    </p:extLst>
+  </p:cSld>
+  <p:clrMapOvr>
+    <a:masterClrMapping/>
+  </p:clrMapOvr>
+</p:sld>
+</file>
+
+<file path=ppt/slides/slide49.xml><?xml version="1.0" encoding="utf-8"?>
+<p:sld xmlns:a="http://schemas.openxmlformats.org/drawingml/2006/main" xmlns:r="http://schemas.openxmlformats.org/officeDocument/2006/relationships" xmlns:p="http://schemas.openxmlformats.org/presentationml/2006/main">
+  <p:cSld>
+    <p:spTree>
+      <p:nvGrpSpPr>
+        <p:cNvPr id="1" name=""/>
+        <p:cNvGrpSpPr/>
+        <p:nvPr/>
+      </p:nvGrpSpPr>
+      <p:grpSpPr>
+        <a:xfrm>
+          <a:off x="0" y="0"/>
+          <a:ext cx="0" cy="0"/>
+          <a:chOff x="0" y="0"/>
+          <a:chExt cx="0" cy="0"/>
+        </a:xfrm>
+      </p:grpSpPr>
+      <p:sp>
+        <p:nvSpPr>
+          <p:cNvPr id="2" name="Title 1">
+            <a:extLst>
+              <a:ext uri="{FF2B5EF4-FFF2-40B4-BE49-F238E27FC236}">
+                <a16:creationId xmlns:a16="http://schemas.microsoft.com/office/drawing/2014/main" id="{61D59F22-5523-C0A7-DE9B-987BCE50FD71}"/>
+              </a:ext>
+            </a:extLst>
+          </p:cNvPr>
+          <p:cNvSpPr>
+            <a:spLocks noGrp="1"/>
+          </p:cNvSpPr>
+          <p:nvPr>
+            <p:ph type="title"/>
+          </p:nvPr>
+        </p:nvSpPr>
+        <p:spPr/>
+        <p:txBody>
+          <a:bodyPr>
+            <a:normAutofit fontScale="90000"/>
+          </a:bodyPr>
+          <a:lstStyle/>
+          <a:p>
+            <a:pPr algn="ctr"/>
+            <a:r>
+              <a:rPr lang="bg-BG" dirty="0">
+                <a:solidFill>
+                  <a:schemeClr val="tx1"/>
+                </a:solidFill>
+                <a:latin typeface="Arial" panose="020B0604020202020204" pitchFamily="34" charset="0"/>
+                <a:cs typeface="Arial" panose="020B0604020202020204" pitchFamily="34" charset="0"/>
+              </a:rPr>
+              <a:t>Търсене в стринг</a:t>
+            </a:r>
+            <a:r>
+              <a:rPr lang="en-US" dirty="0">
+                <a:solidFill>
+                  <a:schemeClr val="tx1"/>
+                </a:solidFill>
+                <a:latin typeface="Arial" panose="020B0604020202020204" pitchFamily="34" charset="0"/>
+                <a:cs typeface="Arial" panose="020B0604020202020204" pitchFamily="34" charset="0"/>
+              </a:rPr>
+              <a:t> (3) – </a:t>
+            </a:r>
+            <a:r>
+              <a:rPr lang="en-US" dirty="0" err="1">
+                <a:solidFill>
+                  <a:srgbClr val="FFFF00"/>
+                </a:solidFill>
+                <a:latin typeface="Arial" panose="020B0604020202020204" pitchFamily="34" charset="0"/>
+                <a:cs typeface="Arial" panose="020B0604020202020204" pitchFamily="34" charset="0"/>
+              </a:rPr>
+              <a:t>IndexOf</a:t>
+            </a:r>
+            <a:r>
+              <a:rPr lang="en-US" dirty="0">
+                <a:solidFill>
+                  <a:srgbClr val="FFFF00"/>
+                </a:solidFill>
+                <a:latin typeface="Arial" panose="020B0604020202020204" pitchFamily="34" charset="0"/>
+                <a:cs typeface="Arial" panose="020B0604020202020204" pitchFamily="34" charset="0"/>
+              </a:rPr>
+              <a:t>()</a:t>
+            </a:r>
+            <a:r>
+              <a:rPr lang="bg-BG" dirty="0">
+                <a:solidFill>
+                  <a:srgbClr val="FFFF00"/>
+                </a:solidFill>
+                <a:latin typeface="Arial" panose="020B0604020202020204" pitchFamily="34" charset="0"/>
+                <a:cs typeface="Arial" panose="020B0604020202020204" pitchFamily="34" charset="0"/>
+              </a:rPr>
+              <a:t> </a:t>
+            </a:r>
+            <a:r>
+              <a:rPr lang="bg-BG" dirty="0">
+                <a:solidFill>
+                  <a:schemeClr val="tx1"/>
+                </a:solidFill>
+                <a:latin typeface="Arial" panose="020B0604020202020204" pitchFamily="34" charset="0"/>
+                <a:cs typeface="Arial" panose="020B0604020202020204" pitchFamily="34" charset="0"/>
+              </a:rPr>
+              <a:t>и</a:t>
+            </a:r>
+            <a:r>
+              <a:rPr lang="bg-BG" dirty="0">
+                <a:solidFill>
+                  <a:srgbClr val="FFFF00"/>
+                </a:solidFill>
+                <a:latin typeface="Arial" panose="020B0604020202020204" pitchFamily="34" charset="0"/>
+                <a:cs typeface="Arial" panose="020B0604020202020204" pitchFamily="34" charset="0"/>
+              </a:rPr>
+              <a:t> </a:t>
+            </a:r>
+            <a:r>
+              <a:rPr lang="en-US" dirty="0" err="1">
+                <a:solidFill>
+                  <a:srgbClr val="FFFF00"/>
+                </a:solidFill>
+                <a:latin typeface="Arial" panose="020B0604020202020204" pitchFamily="34" charset="0"/>
+                <a:cs typeface="Arial" panose="020B0604020202020204" pitchFamily="34" charset="0"/>
+              </a:rPr>
+              <a:t>LastIndexOf</a:t>
+            </a:r>
+            <a:endParaRPr lang="bg-BG" dirty="0">
+              <a:solidFill>
+                <a:srgbClr val="FFFF00"/>
+              </a:solidFill>
+              <a:latin typeface="Arial" panose="020B0604020202020204" pitchFamily="34" charset="0"/>
+              <a:cs typeface="Arial" panose="020B0604020202020204" pitchFamily="34" charset="0"/>
+            </a:endParaRPr>
+          </a:p>
+        </p:txBody>
+      </p:sp>
+      <p:sp>
+        <p:nvSpPr>
+          <p:cNvPr id="3" name="Content Placeholder 2">
+            <a:extLst>
+              <a:ext uri="{FF2B5EF4-FFF2-40B4-BE49-F238E27FC236}">
+                <a16:creationId xmlns:a16="http://schemas.microsoft.com/office/drawing/2014/main" id="{3CFF27EA-E27B-9E5A-CD0A-50166314D161}"/>
+              </a:ext>
+            </a:extLst>
+          </p:cNvPr>
+          <p:cNvSpPr>
+            <a:spLocks noGrp="1"/>
+          </p:cNvSpPr>
+          <p:nvPr>
+            <p:ph idx="1"/>
+          </p:nvPr>
+        </p:nvSpPr>
+        <p:spPr/>
+        <p:txBody>
+          <a:bodyPr/>
+          <a:lstStyle/>
+          <a:p>
+            <a:r>
+              <a:rPr lang="en-US" sz="2400" dirty="0" err="1">
+                <a:solidFill>
+                  <a:srgbClr val="FFFF00"/>
+                </a:solidFill>
+                <a:latin typeface="Arial" panose="020B0604020202020204" pitchFamily="34" charset="0"/>
+                <a:cs typeface="Arial" panose="020B0604020202020204" pitchFamily="34" charset="0"/>
+              </a:rPr>
+              <a:t>IndexOf</a:t>
+            </a:r>
+            <a:r>
+              <a:rPr lang="en-US" sz="2400" dirty="0">
+                <a:latin typeface="Arial" panose="020B0604020202020204" pitchFamily="34" charset="0"/>
+                <a:cs typeface="Arial" panose="020B0604020202020204" pitchFamily="34" charset="0"/>
+              </a:rPr>
+              <a:t> </a:t>
+            </a:r>
+            <a:r>
+              <a:rPr lang="bg-BG" sz="2400" dirty="0">
+                <a:solidFill>
+                  <a:schemeClr val="tx1"/>
+                </a:solidFill>
+                <a:latin typeface="Arial" panose="020B0604020202020204" pitchFamily="34" charset="0"/>
+                <a:cs typeface="Arial" panose="020B0604020202020204" pitchFamily="34" charset="0"/>
+              </a:rPr>
+              <a:t>връща</a:t>
+            </a:r>
+            <a:r>
+              <a:rPr lang="en-US" sz="2400" dirty="0">
+                <a:solidFill>
+                  <a:schemeClr val="tx1"/>
+                </a:solidFill>
+                <a:latin typeface="Arial" panose="020B0604020202020204" pitchFamily="34" charset="0"/>
+                <a:cs typeface="Arial" panose="020B0604020202020204" pitchFamily="34" charset="0"/>
+              </a:rPr>
+              <a:t> </a:t>
+            </a:r>
+            <a:r>
+              <a:rPr lang="bg-BG" sz="2400" dirty="0">
+                <a:solidFill>
+                  <a:schemeClr val="tx1"/>
+                </a:solidFill>
+                <a:latin typeface="Arial" panose="020B0604020202020204" pitchFamily="34" charset="0"/>
+                <a:cs typeface="Arial" panose="020B0604020202020204" pitchFamily="34" charset="0"/>
+              </a:rPr>
+              <a:t>индекса на първият срещнат стринг като този, който е подаден като входен параметър.</a:t>
+            </a:r>
+          </a:p>
+          <a:p>
+            <a:endParaRPr lang="bg-BG" dirty="0"/>
+          </a:p>
+          <a:p>
+            <a:endParaRPr lang="bg-BG" dirty="0"/>
+          </a:p>
+        </p:txBody>
+      </p:sp>
+      <p:sp>
+        <p:nvSpPr>
+          <p:cNvPr id="6" name="Content Placeholder 2">
+            <a:extLst>
+              <a:ext uri="{FF2B5EF4-FFF2-40B4-BE49-F238E27FC236}">
+                <a16:creationId xmlns:a16="http://schemas.microsoft.com/office/drawing/2014/main" id="{D926C7F3-F7BF-EE40-02CE-FF85C0677A7F}"/>
+              </a:ext>
+            </a:extLst>
+          </p:cNvPr>
+          <p:cNvSpPr txBox="1">
+            <a:spLocks/>
+          </p:cNvSpPr>
+          <p:nvPr/>
+        </p:nvSpPr>
+        <p:spPr>
+          <a:xfrm>
+            <a:off x="1327034" y="2881222"/>
+            <a:ext cx="10233800" cy="3692555"/>
+          </a:xfrm>
+          <a:prstGeom prst="rect">
+            <a:avLst/>
+          </a:prstGeom>
+        </p:spPr>
+        <p:txBody>
+          <a:bodyPr vert="horz" lIns="91440" tIns="45720" rIns="91440" bIns="45720" rtlCol="0">
+            <a:normAutofit/>
+          </a:bodyPr>
+          <a:lstStyle>
+            <a:lvl1pPr marL="228600" indent="-228600" algn="l" defTabSz="914400" rtl="0" eaLnBrk="1" latinLnBrk="0" hangingPunct="1">
+              <a:lnSpc>
+                <a:spcPct val="90000"/>
+              </a:lnSpc>
+              <a:spcBef>
+                <a:spcPts val="1000"/>
+              </a:spcBef>
+              <a:buFont typeface="Arial" panose="020B0604020202020204" pitchFamily="34" charset="0"/>
+              <a:buChar char="•"/>
+              <a:defRPr sz="2800" kern="1200">
+                <a:gradFill>
+                  <a:gsLst>
+                    <a:gs pos="34000">
+                      <a:schemeClr val="tx1">
+                        <a:lumMod val="93000"/>
+                      </a:schemeClr>
+                    </a:gs>
+                    <a:gs pos="0">
+                      <a:schemeClr val="bg1">
+                        <a:lumMod val="25000"/>
+                        <a:lumOff val="75000"/>
+                      </a:schemeClr>
+                    </a:gs>
+                    <a:gs pos="100000">
+                      <a:schemeClr val="tx2">
+                        <a:lumMod val="0"/>
+                        <a:lumOff val="100000"/>
+                      </a:schemeClr>
+                    </a:gs>
+                  </a:gsLst>
+                  <a:lin ang="4800000" scaled="0"/>
+                </a:gradFill>
+                <a:latin typeface="+mn-lt"/>
+                <a:ea typeface="+mn-ea"/>
+                <a:cs typeface="+mn-cs"/>
+              </a:defRPr>
+            </a:lvl1pPr>
+            <a:lvl2pPr marL="685800" indent="-228600" algn="l" defTabSz="914400" rtl="0" eaLnBrk="1" latinLnBrk="0" hangingPunct="1">
+              <a:lnSpc>
+                <a:spcPct val="90000"/>
+              </a:lnSpc>
+              <a:spcBef>
+                <a:spcPts val="500"/>
+              </a:spcBef>
+              <a:buFont typeface="Arial" panose="020B0604020202020204" pitchFamily="34" charset="0"/>
+              <a:buChar char="•"/>
+              <a:defRPr sz="2400" kern="1200">
+                <a:gradFill>
+                  <a:gsLst>
+                    <a:gs pos="34000">
+                      <a:schemeClr val="tx1">
+                        <a:lumMod val="93000"/>
+                      </a:schemeClr>
+                    </a:gs>
+                    <a:gs pos="0">
+                      <a:schemeClr val="bg1">
+                        <a:lumMod val="25000"/>
+                        <a:lumOff val="75000"/>
+                      </a:schemeClr>
+                    </a:gs>
+                    <a:gs pos="100000">
+                      <a:schemeClr val="tx2">
+                        <a:lumMod val="0"/>
+                        <a:lumOff val="100000"/>
+                      </a:schemeClr>
+                    </a:gs>
+                  </a:gsLst>
+                  <a:lin ang="4800000" scaled="0"/>
+                </a:gradFill>
+                <a:latin typeface="+mn-lt"/>
+                <a:ea typeface="+mn-ea"/>
+                <a:cs typeface="+mn-cs"/>
+              </a:defRPr>
+            </a:lvl2pPr>
+            <a:lvl3pPr marL="1143000" indent="-228600" algn="l" defTabSz="914400" rtl="0" eaLnBrk="1" latinLnBrk="0" hangingPunct="1">
+              <a:lnSpc>
+                <a:spcPct val="90000"/>
+              </a:lnSpc>
+              <a:spcBef>
+                <a:spcPts val="500"/>
+              </a:spcBef>
+              <a:buFont typeface="Arial" panose="020B0604020202020204" pitchFamily="34" charset="0"/>
+              <a:buChar char="•"/>
+              <a:defRPr sz="2000" kern="1200">
+                <a:gradFill>
+                  <a:gsLst>
+                    <a:gs pos="34000">
+                      <a:schemeClr val="tx1">
+                        <a:lumMod val="93000"/>
+                      </a:schemeClr>
+                    </a:gs>
+                    <a:gs pos="0">
+                      <a:schemeClr val="bg1">
+                        <a:lumMod val="25000"/>
+                        <a:lumOff val="75000"/>
+                      </a:schemeClr>
+                    </a:gs>
+                    <a:gs pos="100000">
+                      <a:schemeClr val="tx2">
+                        <a:lumMod val="0"/>
+                        <a:lumOff val="100000"/>
+                      </a:schemeClr>
+                    </a:gs>
+                  </a:gsLst>
+                  <a:lin ang="4800000" scaled="0"/>
+                </a:gradFill>
+                <a:latin typeface="+mn-lt"/>
+                <a:ea typeface="+mn-ea"/>
+                <a:cs typeface="+mn-cs"/>
+              </a:defRPr>
+            </a:lvl3pPr>
+            <a:lvl4pPr marL="1600200" indent="-228600" algn="l" defTabSz="914400" rtl="0" eaLnBrk="1" latinLnBrk="0" hangingPunct="1">
+              <a:lnSpc>
+                <a:spcPct val="90000"/>
+              </a:lnSpc>
+              <a:spcBef>
+                <a:spcPts val="500"/>
+              </a:spcBef>
+              <a:buFont typeface="Arial" panose="020B0604020202020204" pitchFamily="34" charset="0"/>
+              <a:buChar char="•"/>
+              <a:defRPr sz="1800" kern="1200">
+                <a:gradFill>
+                  <a:gsLst>
+                    <a:gs pos="34000">
+                      <a:schemeClr val="tx1">
+                        <a:lumMod val="93000"/>
+                      </a:schemeClr>
+                    </a:gs>
+                    <a:gs pos="0">
+                      <a:schemeClr val="bg1">
+                        <a:lumMod val="25000"/>
+                        <a:lumOff val="75000"/>
+                      </a:schemeClr>
+                    </a:gs>
+                    <a:gs pos="100000">
+                      <a:schemeClr val="tx2">
+                        <a:lumMod val="0"/>
+                        <a:lumOff val="100000"/>
+                      </a:schemeClr>
+                    </a:gs>
+                  </a:gsLst>
+                  <a:lin ang="4800000" scaled="0"/>
+                </a:gradFill>
+                <a:latin typeface="+mn-lt"/>
+                <a:ea typeface="+mn-ea"/>
+                <a:cs typeface="+mn-cs"/>
+              </a:defRPr>
+            </a:lvl4pPr>
+            <a:lvl5pPr marL="2057400" indent="-228600" algn="l" defTabSz="914400" rtl="0" eaLnBrk="1" latinLnBrk="0" hangingPunct="1">
+              <a:lnSpc>
+                <a:spcPct val="90000"/>
+              </a:lnSpc>
+              <a:spcBef>
+                <a:spcPts val="500"/>
+              </a:spcBef>
+              <a:buFont typeface="Arial" panose="020B0604020202020204" pitchFamily="34" charset="0"/>
+              <a:buChar char="•"/>
+              <a:defRPr sz="1800" kern="1200">
+                <a:gradFill>
+                  <a:gsLst>
+                    <a:gs pos="34000">
+                      <a:schemeClr val="tx1">
+                        <a:lumMod val="93000"/>
+                      </a:schemeClr>
+                    </a:gs>
+                    <a:gs pos="0">
+                      <a:schemeClr val="bg1">
+                        <a:lumMod val="25000"/>
+                        <a:lumOff val="75000"/>
+                      </a:schemeClr>
+                    </a:gs>
+                    <a:gs pos="100000">
+                      <a:schemeClr val="tx2">
+                        <a:lumMod val="0"/>
+                        <a:lumOff val="100000"/>
+                      </a:schemeClr>
+                    </a:gs>
+                  </a:gsLst>
+                  <a:lin ang="4800000" scaled="0"/>
+                </a:gradFill>
+                <a:latin typeface="+mn-lt"/>
+                <a:ea typeface="+mn-ea"/>
+                <a:cs typeface="+mn-cs"/>
+              </a:defRPr>
+            </a:lvl5pPr>
+            <a:lvl6pPr marL="2514600" indent="-228600" algn="l" defTabSz="914400" rtl="0" eaLnBrk="1" latinLnBrk="0" hangingPunct="1">
+              <a:lnSpc>
+                <a:spcPct val="90000"/>
+              </a:lnSpc>
+              <a:spcBef>
+                <a:spcPts val="500"/>
+              </a:spcBef>
+              <a:buFont typeface="Arial" panose="020B0604020202020204" pitchFamily="34" charset="0"/>
+              <a:buChar char="•"/>
+              <a:defRPr sz="1800" kern="1200">
+                <a:solidFill>
+                  <a:schemeClr val="tx1"/>
+                </a:solidFill>
+                <a:latin typeface="+mn-lt"/>
+                <a:ea typeface="+mn-ea"/>
+                <a:cs typeface="+mn-cs"/>
+              </a:defRPr>
+            </a:lvl6pPr>
+            <a:lvl7pPr marL="2971800" indent="-228600" algn="l" defTabSz="914400" rtl="0" eaLnBrk="1" latinLnBrk="0" hangingPunct="1">
+              <a:lnSpc>
+                <a:spcPct val="90000"/>
+              </a:lnSpc>
+              <a:spcBef>
+                <a:spcPts val="500"/>
+              </a:spcBef>
+              <a:buFont typeface="Arial" panose="020B0604020202020204" pitchFamily="34" charset="0"/>
+              <a:buChar char="•"/>
+              <a:defRPr sz="1800" kern="1200">
+                <a:solidFill>
+                  <a:schemeClr val="tx1"/>
+                </a:solidFill>
+                <a:latin typeface="+mn-lt"/>
+                <a:ea typeface="+mn-ea"/>
+                <a:cs typeface="+mn-cs"/>
+              </a:defRPr>
+            </a:lvl7pPr>
+            <a:lvl8pPr marL="3429000" indent="-228600" algn="l" defTabSz="914400" rtl="0" eaLnBrk="1" latinLnBrk="0" hangingPunct="1">
+              <a:lnSpc>
+                <a:spcPct val="90000"/>
+              </a:lnSpc>
+              <a:spcBef>
+                <a:spcPts val="500"/>
+              </a:spcBef>
+              <a:buFont typeface="Arial" panose="020B0604020202020204" pitchFamily="34" charset="0"/>
+              <a:buChar char="•"/>
+              <a:defRPr sz="1800" kern="1200">
+                <a:solidFill>
+                  <a:schemeClr val="tx1"/>
+                </a:solidFill>
+                <a:latin typeface="+mn-lt"/>
+                <a:ea typeface="+mn-ea"/>
+                <a:cs typeface="+mn-cs"/>
+              </a:defRPr>
+            </a:lvl8pPr>
+            <a:lvl9pPr marL="3886200" indent="-228600" algn="l" defTabSz="914400" rtl="0" eaLnBrk="1" latinLnBrk="0" hangingPunct="1">
+              <a:lnSpc>
+                <a:spcPct val="90000"/>
+              </a:lnSpc>
+              <a:spcBef>
+                <a:spcPts val="500"/>
+              </a:spcBef>
+              <a:buFont typeface="Arial" panose="020B0604020202020204" pitchFamily="34" charset="0"/>
+              <a:buChar char="•"/>
+              <a:defRPr sz="1800" kern="1200">
+                <a:solidFill>
+                  <a:schemeClr val="tx1"/>
+                </a:solidFill>
+                <a:latin typeface="+mn-lt"/>
+                <a:ea typeface="+mn-ea"/>
+                <a:cs typeface="+mn-cs"/>
+              </a:defRPr>
+            </a:lvl9pPr>
+          </a:lstStyle>
+          <a:p>
+            <a:pPr marL="0" indent="0">
+              <a:buFont typeface="Arial" panose="020B0604020202020204" pitchFamily="34" charset="0"/>
+              <a:buNone/>
+            </a:pPr>
+            <a:r>
+              <a:rPr lang="bg-BG" sz="2000" i="1" u="sng" dirty="0">
+                <a:solidFill>
+                  <a:srgbClr val="FFFF00"/>
+                </a:solidFill>
+                <a:latin typeface="Arial" panose="020B0604020202020204" pitchFamily="34" charset="0"/>
+                <a:cs typeface="Arial" panose="020B0604020202020204" pitchFamily="34" charset="0"/>
+              </a:rPr>
+              <a:t>Пример</a:t>
+            </a:r>
+            <a:r>
+              <a:rPr lang="bg-BG" sz="2000" i="1" u="sng" dirty="0">
+                <a:latin typeface="Arial" panose="020B0604020202020204" pitchFamily="34" charset="0"/>
+                <a:cs typeface="Arial" panose="020B0604020202020204" pitchFamily="34" charset="0"/>
+              </a:rPr>
+              <a:t>:</a:t>
+            </a:r>
+            <a:endParaRPr lang="en-US" sz="2000" dirty="0">
+              <a:solidFill>
+                <a:schemeClr val="tx2">
+                  <a:lumMod val="75000"/>
+                </a:schemeClr>
+              </a:solidFill>
+              <a:latin typeface="Consolas" panose="020B0609020204030204" pitchFamily="49" charset="0"/>
+            </a:endParaRPr>
+          </a:p>
+          <a:p>
+            <a:pPr marL="0" indent="0">
+              <a:buFont typeface="Arial" panose="020B0604020202020204" pitchFamily="34" charset="0"/>
+              <a:buNone/>
+            </a:pPr>
+            <a:r>
+              <a:rPr lang="en-US" sz="2000" dirty="0">
+                <a:solidFill>
+                  <a:schemeClr val="tx2">
+                    <a:lumMod val="75000"/>
+                  </a:schemeClr>
+                </a:solidFill>
+                <a:latin typeface="Consolas" panose="020B0609020204030204" pitchFamily="49" charset="0"/>
+              </a:rPr>
+              <a:t>string</a:t>
+            </a:r>
+            <a:r>
+              <a:rPr lang="en-US" sz="2000" dirty="0">
+                <a:latin typeface="Consolas" panose="020B0609020204030204" pitchFamily="49" charset="0"/>
+              </a:rPr>
+              <a:t> </a:t>
+            </a:r>
+            <a:r>
+              <a:rPr lang="en-US" sz="2000" dirty="0">
+                <a:solidFill>
+                  <a:schemeClr val="accent3"/>
+                </a:solidFill>
+                <a:latin typeface="Consolas" panose="020B0609020204030204" pitchFamily="49" charset="0"/>
+              </a:rPr>
+              <a:t>cars</a:t>
+            </a:r>
+            <a:r>
+              <a:rPr lang="en-US" sz="2000" dirty="0">
+                <a:latin typeface="Consolas" panose="020B0609020204030204" pitchFamily="49" charset="0"/>
+              </a:rPr>
+              <a:t> = </a:t>
+            </a:r>
+            <a:r>
+              <a:rPr lang="en-US" sz="2000" dirty="0">
+                <a:solidFill>
+                  <a:schemeClr val="accent6"/>
+                </a:solidFill>
+                <a:latin typeface="Consolas" panose="020B0609020204030204" pitchFamily="49" charset="0"/>
+              </a:rPr>
+              <a:t>“BMW, Audi, Peugeot, Renault, Skoda”</a:t>
+            </a:r>
+            <a:r>
+              <a:rPr lang="en-US" sz="2000" dirty="0">
+                <a:solidFill>
+                  <a:schemeClr val="tx1"/>
+                </a:solidFill>
+                <a:latin typeface="Consolas" panose="020B0609020204030204" pitchFamily="49" charset="0"/>
+              </a:rPr>
+              <a:t>;</a:t>
+            </a:r>
+          </a:p>
+          <a:p>
+            <a:pPr marL="0" indent="0">
+              <a:buNone/>
+            </a:pPr>
+            <a:r>
+              <a:rPr lang="en-US" sz="2000" dirty="0" err="1">
+                <a:solidFill>
+                  <a:schemeClr val="tx1"/>
+                </a:solidFill>
+                <a:latin typeface="Consolas" panose="020B0609020204030204" pitchFamily="49" charset="0"/>
+              </a:rPr>
+              <a:t>Console.WriteLine</a:t>
+            </a:r>
+            <a:r>
+              <a:rPr lang="en-US" sz="2000" dirty="0">
+                <a:latin typeface="Consolas" panose="020B0609020204030204" pitchFamily="49" charset="0"/>
+              </a:rPr>
+              <a:t>(</a:t>
+            </a:r>
+            <a:r>
+              <a:rPr lang="en-US" sz="2000" dirty="0" err="1">
+                <a:solidFill>
+                  <a:schemeClr val="accent3"/>
+                </a:solidFill>
+                <a:latin typeface="Consolas" panose="020B0609020204030204" pitchFamily="49" charset="0"/>
+              </a:rPr>
+              <a:t>cars.</a:t>
+            </a:r>
+            <a:r>
+              <a:rPr lang="en-US" sz="2000" dirty="0" err="1">
+                <a:solidFill>
+                  <a:schemeClr val="accent6">
+                    <a:lumMod val="60000"/>
+                    <a:lumOff val="40000"/>
+                  </a:schemeClr>
+                </a:solidFill>
+                <a:latin typeface="Consolas" panose="020B0609020204030204" pitchFamily="49" charset="0"/>
+              </a:rPr>
+              <a:t>IndexOf</a:t>
+            </a:r>
+            <a:r>
+              <a:rPr lang="en-US" sz="2000" dirty="0">
+                <a:solidFill>
+                  <a:schemeClr val="tx1"/>
+                </a:solidFill>
+                <a:latin typeface="Consolas" panose="020B0609020204030204" pitchFamily="49" charset="0"/>
+              </a:rPr>
+              <a:t>(</a:t>
+            </a:r>
+            <a:r>
+              <a:rPr lang="en-US" sz="2000" dirty="0">
+                <a:solidFill>
+                  <a:schemeClr val="accent6"/>
+                </a:solidFill>
+                <a:latin typeface="Consolas" panose="020B0609020204030204" pitchFamily="49" charset="0"/>
+              </a:rPr>
+              <a:t>“Peugeot”</a:t>
+            </a:r>
+            <a:r>
+              <a:rPr lang="en-US" sz="2000" dirty="0">
+                <a:solidFill>
+                  <a:schemeClr val="tx1"/>
+                </a:solidFill>
+                <a:latin typeface="Consolas" panose="020B0609020204030204" pitchFamily="49" charset="0"/>
+              </a:rPr>
+              <a:t>)</a:t>
+            </a:r>
+            <a:r>
+              <a:rPr lang="en-US" sz="2000" dirty="0">
+                <a:latin typeface="Consolas" panose="020B0609020204030204" pitchFamily="49" charset="0"/>
+              </a:rPr>
+              <a:t>); 		//11</a:t>
+            </a:r>
+          </a:p>
+          <a:p>
+            <a:pPr marL="0" indent="0">
+              <a:buFont typeface="Arial" panose="020B0604020202020204" pitchFamily="34" charset="0"/>
+              <a:buNone/>
+            </a:pPr>
+            <a:endParaRPr lang="en-US" sz="2000" dirty="0">
+              <a:latin typeface="Consolas" panose="020B0609020204030204" pitchFamily="49" charset="0"/>
+            </a:endParaRPr>
+          </a:p>
+          <a:p>
+            <a:pPr marL="0" indent="0">
+              <a:buNone/>
+            </a:pPr>
+            <a:r>
+              <a:rPr lang="en-US" sz="2400" dirty="0" err="1">
+                <a:solidFill>
+                  <a:srgbClr val="FFFF00"/>
+                </a:solidFill>
+                <a:latin typeface="Arial" panose="020B0604020202020204" pitchFamily="34" charset="0"/>
+                <a:cs typeface="Arial" panose="020B0604020202020204" pitchFamily="34" charset="0"/>
+              </a:rPr>
+              <a:t>LastIndexOf</a:t>
+            </a:r>
+            <a:r>
+              <a:rPr lang="en-US" sz="2400" dirty="0">
+                <a:latin typeface="Arial" panose="020B0604020202020204" pitchFamily="34" charset="0"/>
+                <a:cs typeface="Arial" panose="020B0604020202020204" pitchFamily="34" charset="0"/>
+              </a:rPr>
+              <a:t> </a:t>
+            </a:r>
+            <a:r>
+              <a:rPr lang="bg-BG" sz="2400" dirty="0">
+                <a:solidFill>
+                  <a:schemeClr val="tx1"/>
+                </a:solidFill>
+                <a:latin typeface="Arial" panose="020B0604020202020204" pitchFamily="34" charset="0"/>
+                <a:cs typeface="Arial" panose="020B0604020202020204" pitchFamily="34" charset="0"/>
+              </a:rPr>
+              <a:t>връща</a:t>
+            </a:r>
+            <a:r>
+              <a:rPr lang="en-US" sz="2400" dirty="0">
+                <a:solidFill>
+                  <a:schemeClr val="tx1"/>
+                </a:solidFill>
+                <a:latin typeface="Arial" panose="020B0604020202020204" pitchFamily="34" charset="0"/>
+                <a:cs typeface="Arial" panose="020B0604020202020204" pitchFamily="34" charset="0"/>
+              </a:rPr>
+              <a:t> </a:t>
+            </a:r>
+            <a:r>
+              <a:rPr lang="bg-BG" sz="2400" dirty="0">
+                <a:solidFill>
+                  <a:schemeClr val="tx1"/>
+                </a:solidFill>
+                <a:latin typeface="Arial" panose="020B0604020202020204" pitchFamily="34" charset="0"/>
+                <a:cs typeface="Arial" panose="020B0604020202020204" pitchFamily="34" charset="0"/>
+              </a:rPr>
+              <a:t>индекса на последният срещнат стринг като този, който е подаден като входен параметър.</a:t>
+            </a:r>
+          </a:p>
+          <a:p>
+            <a:pPr marL="0" indent="0">
+              <a:buFont typeface="Arial" panose="020B0604020202020204" pitchFamily="34" charset="0"/>
+              <a:buNone/>
+            </a:pPr>
+            <a:r>
+              <a:rPr lang="bg-BG" sz="2000" i="1" u="sng" dirty="0">
+                <a:solidFill>
+                  <a:srgbClr val="FFFF00"/>
+                </a:solidFill>
+                <a:latin typeface="Arial" panose="020B0604020202020204" pitchFamily="34" charset="0"/>
+                <a:cs typeface="Arial" panose="020B0604020202020204" pitchFamily="34" charset="0"/>
+              </a:rPr>
+              <a:t>Пример</a:t>
+            </a:r>
+            <a:r>
+              <a:rPr lang="bg-BG" sz="2000" i="1" u="sng" dirty="0">
+                <a:latin typeface="Arial" panose="020B0604020202020204" pitchFamily="34" charset="0"/>
+                <a:cs typeface="Arial" panose="020B0604020202020204" pitchFamily="34" charset="0"/>
+              </a:rPr>
+              <a:t>:</a:t>
+            </a:r>
+            <a:r>
+              <a:rPr lang="bg-BG" sz="2000" i="1" dirty="0">
+                <a:latin typeface="Arial" panose="020B0604020202020204" pitchFamily="34" charset="0"/>
+                <a:cs typeface="Arial" panose="020B0604020202020204" pitchFamily="34" charset="0"/>
+              </a:rPr>
+              <a:t> </a:t>
+            </a:r>
+            <a:endParaRPr lang="en-US" sz="2000" i="1" dirty="0">
+              <a:latin typeface="Arial" panose="020B0604020202020204" pitchFamily="34" charset="0"/>
+              <a:cs typeface="Arial" panose="020B0604020202020204" pitchFamily="34" charset="0"/>
+            </a:endParaRPr>
+          </a:p>
+          <a:p>
+            <a:pPr marL="0" indent="0">
+              <a:buFont typeface="Arial" panose="020B0604020202020204" pitchFamily="34" charset="0"/>
+              <a:buNone/>
+            </a:pPr>
+            <a:r>
+              <a:rPr lang="en-US" sz="2000" dirty="0">
+                <a:solidFill>
+                  <a:schemeClr val="tx2">
+                    <a:lumMod val="75000"/>
+                  </a:schemeClr>
+                </a:solidFill>
+                <a:latin typeface="Consolas" panose="020B0609020204030204" pitchFamily="49" charset="0"/>
+              </a:rPr>
+              <a:t>string</a:t>
+            </a:r>
+            <a:r>
+              <a:rPr lang="en-US" sz="2000" dirty="0">
+                <a:latin typeface="Consolas" panose="020B0609020204030204" pitchFamily="49" charset="0"/>
+              </a:rPr>
+              <a:t> </a:t>
+            </a:r>
+            <a:r>
+              <a:rPr lang="en-US" sz="2000" dirty="0">
+                <a:solidFill>
+                  <a:schemeClr val="accent3"/>
+                </a:solidFill>
+                <a:latin typeface="Consolas" panose="020B0609020204030204" pitchFamily="49" charset="0"/>
+              </a:rPr>
+              <a:t>cars</a:t>
+            </a:r>
+            <a:r>
+              <a:rPr lang="en-US" sz="2000" dirty="0">
+                <a:latin typeface="Consolas" panose="020B0609020204030204" pitchFamily="49" charset="0"/>
+              </a:rPr>
+              <a:t> = </a:t>
+            </a:r>
+            <a:r>
+              <a:rPr lang="en-US" sz="2000" dirty="0">
+                <a:solidFill>
+                  <a:schemeClr val="accent6"/>
+                </a:solidFill>
+                <a:latin typeface="Consolas" panose="020B0609020204030204" pitchFamily="49" charset="0"/>
+              </a:rPr>
+              <a:t>“BMW, Audi, Peugeot, Renault, Skoda, Peugeot”</a:t>
+            </a:r>
+            <a:r>
+              <a:rPr lang="en-US" sz="2000" dirty="0">
+                <a:solidFill>
+                  <a:schemeClr val="tx1"/>
+                </a:solidFill>
+                <a:latin typeface="Consolas" panose="020B0609020204030204" pitchFamily="49" charset="0"/>
+              </a:rPr>
+              <a:t>;</a:t>
+            </a:r>
+          </a:p>
+          <a:p>
+            <a:pPr marL="0" indent="0">
+              <a:buNone/>
+            </a:pPr>
+            <a:r>
+              <a:rPr lang="en-US" sz="2000" dirty="0" err="1">
+                <a:solidFill>
+                  <a:schemeClr val="tx1"/>
+                </a:solidFill>
+                <a:latin typeface="Consolas" panose="020B0609020204030204" pitchFamily="49" charset="0"/>
+              </a:rPr>
+              <a:t>Console.WriteLine</a:t>
+            </a:r>
+            <a:r>
+              <a:rPr lang="en-US" sz="2000" dirty="0">
+                <a:latin typeface="Consolas" panose="020B0609020204030204" pitchFamily="49" charset="0"/>
+              </a:rPr>
+              <a:t>(</a:t>
+            </a:r>
+            <a:r>
+              <a:rPr lang="en-US" sz="2000" dirty="0" err="1">
+                <a:solidFill>
+                  <a:schemeClr val="accent3"/>
+                </a:solidFill>
+                <a:latin typeface="Consolas" panose="020B0609020204030204" pitchFamily="49" charset="0"/>
+              </a:rPr>
+              <a:t>cars.</a:t>
+            </a:r>
+            <a:r>
+              <a:rPr lang="en-US" sz="2000" dirty="0" err="1">
+                <a:solidFill>
+                  <a:schemeClr val="accent6">
+                    <a:lumMod val="60000"/>
+                    <a:lumOff val="40000"/>
+                  </a:schemeClr>
+                </a:solidFill>
+                <a:latin typeface="Consolas" panose="020B0609020204030204" pitchFamily="49" charset="0"/>
+              </a:rPr>
+              <a:t>LastIndexOf</a:t>
+            </a:r>
+            <a:r>
+              <a:rPr lang="en-US" sz="2000" dirty="0">
+                <a:solidFill>
+                  <a:schemeClr val="tx1"/>
+                </a:solidFill>
+                <a:latin typeface="Consolas" panose="020B0609020204030204" pitchFamily="49" charset="0"/>
+              </a:rPr>
+              <a:t>(</a:t>
+            </a:r>
+            <a:r>
+              <a:rPr lang="en-US" sz="2000" dirty="0">
+                <a:solidFill>
+                  <a:schemeClr val="accent6"/>
+                </a:solidFill>
+                <a:latin typeface="Consolas" panose="020B0609020204030204" pitchFamily="49" charset="0"/>
+              </a:rPr>
+              <a:t>“Peugeot”</a:t>
+            </a:r>
+            <a:r>
+              <a:rPr lang="en-US" sz="2000" dirty="0">
+                <a:solidFill>
+                  <a:schemeClr val="tx1"/>
+                </a:solidFill>
+                <a:latin typeface="Consolas" panose="020B0609020204030204" pitchFamily="49" charset="0"/>
+              </a:rPr>
+              <a:t>)</a:t>
+            </a:r>
+            <a:r>
+              <a:rPr lang="en-US" sz="2000" dirty="0">
+                <a:latin typeface="Consolas" panose="020B0609020204030204" pitchFamily="49" charset="0"/>
+              </a:rPr>
+              <a:t>); 	//36</a:t>
+            </a:r>
+          </a:p>
+          <a:p>
+            <a:endParaRPr lang="en-US" sz="2000" dirty="0">
+              <a:solidFill>
+                <a:schemeClr val="tx2">
+                  <a:lumMod val="75000"/>
+                </a:schemeClr>
+              </a:solidFill>
+              <a:latin typeface="Consolas" panose="020B0609020204030204" pitchFamily="49" charset="0"/>
+            </a:endParaRPr>
+          </a:p>
+          <a:p>
+            <a:endParaRPr lang="bg-BG" dirty="0"/>
+          </a:p>
+        </p:txBody>
+      </p:sp>
+    </p:spTree>
+    <p:extLst>
+      <p:ext uri="{BB962C8B-B14F-4D97-AF65-F5344CB8AC3E}">
+        <p14:creationId xmlns:p14="http://schemas.microsoft.com/office/powerpoint/2010/main" val="3188517240"/>
+      </p:ext>
+    </p:extLst>
+  </p:cSld>
+  <p:clrMapOvr>
+    <a:masterClrMapping/>
+  </p:clrMapOvr>
+</p:sld>
+</file>
+
 <file path=ppt/slides/slide5.xml><?xml version="1.0" encoding="utf-8"?>
 <p:sld xmlns:a="http://schemas.openxmlformats.org/drawingml/2006/main" xmlns:r="http://schemas.openxmlformats.org/officeDocument/2006/relationships" xmlns:p="http://schemas.openxmlformats.org/presentationml/2006/main">
   <p:cSld>
@@ -24219,6 +27426,1397 @@
     <p:extLst>
       <p:ext uri="{BB962C8B-B14F-4D97-AF65-F5344CB8AC3E}">
         <p14:creationId xmlns:p14="http://schemas.microsoft.com/office/powerpoint/2010/main" val="2201331115"/>
+      </p:ext>
+    </p:extLst>
+  </p:cSld>
+  <p:clrMapOvr>
+    <a:masterClrMapping/>
+  </p:clrMapOvr>
+</p:sld>
+</file>
+
+<file path=ppt/slides/slide50.xml><?xml version="1.0" encoding="utf-8"?>
+<p:sld xmlns:a="http://schemas.openxmlformats.org/drawingml/2006/main" xmlns:r="http://schemas.openxmlformats.org/officeDocument/2006/relationships" xmlns:p="http://schemas.openxmlformats.org/presentationml/2006/main">
+  <p:cSld>
+    <p:spTree>
+      <p:nvGrpSpPr>
+        <p:cNvPr id="1" name=""/>
+        <p:cNvGrpSpPr/>
+        <p:nvPr/>
+      </p:nvGrpSpPr>
+      <p:grpSpPr>
+        <a:xfrm>
+          <a:off x="0" y="0"/>
+          <a:ext cx="0" cy="0"/>
+          <a:chOff x="0" y="0"/>
+          <a:chExt cx="0" cy="0"/>
+        </a:xfrm>
+      </p:grpSpPr>
+      <p:sp>
+        <p:nvSpPr>
+          <p:cNvPr id="2" name="Title 1">
+            <a:extLst>
+              <a:ext uri="{FF2B5EF4-FFF2-40B4-BE49-F238E27FC236}">
+                <a16:creationId xmlns:a16="http://schemas.microsoft.com/office/drawing/2014/main" id="{2D2602BA-9334-9B8F-1F20-7488B9CFFB21}"/>
+              </a:ext>
+            </a:extLst>
+          </p:cNvPr>
+          <p:cNvSpPr>
+            <a:spLocks noGrp="1"/>
+          </p:cNvSpPr>
+          <p:nvPr>
+            <p:ph type="title"/>
+          </p:nvPr>
+        </p:nvSpPr>
+        <p:spPr/>
+        <p:txBody>
+          <a:bodyPr/>
+          <a:lstStyle/>
+          <a:p>
+            <a:pPr algn="ctr"/>
+            <a:r>
+              <a:rPr lang="en-US" dirty="0">
+                <a:solidFill>
+                  <a:schemeClr val="tx1"/>
+                </a:solidFill>
+                <a:latin typeface="Arial" panose="020B0604020202020204" pitchFamily="34" charset="0"/>
+                <a:cs typeface="Arial" panose="020B0604020202020204" pitchFamily="34" charset="0"/>
+              </a:rPr>
+              <a:t>Splitting </a:t>
+            </a:r>
+            <a:r>
+              <a:rPr lang="bg-BG" dirty="0">
+                <a:solidFill>
+                  <a:schemeClr val="tx1"/>
+                </a:solidFill>
+                <a:latin typeface="Arial" panose="020B0604020202020204" pitchFamily="34" charset="0"/>
+                <a:cs typeface="Arial" panose="020B0604020202020204" pitchFamily="34" charset="0"/>
+              </a:rPr>
+              <a:t>със </a:t>
+            </a:r>
+            <a:r>
+              <a:rPr lang="en-US" dirty="0">
+                <a:solidFill>
+                  <a:srgbClr val="FFFF00"/>
+                </a:solidFill>
+                <a:latin typeface="Arial" panose="020B0604020202020204" pitchFamily="34" charset="0"/>
+                <a:cs typeface="Arial" panose="020B0604020202020204" pitchFamily="34" charset="0"/>
+              </a:rPr>
+              <a:t>Split() </a:t>
+            </a:r>
+            <a:r>
+              <a:rPr lang="en-US" dirty="0">
+                <a:solidFill>
+                  <a:schemeClr val="tx1"/>
+                </a:solidFill>
+                <a:latin typeface="Arial" panose="020B0604020202020204" pitchFamily="34" charset="0"/>
+                <a:cs typeface="Arial" panose="020B0604020202020204" pitchFamily="34" charset="0"/>
+              </a:rPr>
+              <a:t>(1)</a:t>
+            </a:r>
+            <a:endParaRPr lang="bg-BG" dirty="0">
+              <a:solidFill>
+                <a:schemeClr val="tx1"/>
+              </a:solidFill>
+              <a:latin typeface="Arial" panose="020B0604020202020204" pitchFamily="34" charset="0"/>
+              <a:cs typeface="Arial" panose="020B0604020202020204" pitchFamily="34" charset="0"/>
+            </a:endParaRPr>
+          </a:p>
+        </p:txBody>
+      </p:sp>
+      <p:sp>
+        <p:nvSpPr>
+          <p:cNvPr id="3" name="Content Placeholder 2">
+            <a:extLst>
+              <a:ext uri="{FF2B5EF4-FFF2-40B4-BE49-F238E27FC236}">
+                <a16:creationId xmlns:a16="http://schemas.microsoft.com/office/drawing/2014/main" id="{C14CAAA9-8B59-E929-BB57-512E76B5952F}"/>
+              </a:ext>
+            </a:extLst>
+          </p:cNvPr>
+          <p:cNvSpPr>
+            <a:spLocks noGrp="1"/>
+          </p:cNvSpPr>
+          <p:nvPr>
+            <p:ph idx="1"/>
+          </p:nvPr>
+        </p:nvSpPr>
+        <p:spPr/>
+        <p:txBody>
+          <a:bodyPr/>
+          <a:lstStyle/>
+          <a:p>
+            <a:r>
+              <a:rPr lang="en-US" dirty="0">
+                <a:solidFill>
+                  <a:srgbClr val="FFFF00"/>
+                </a:solidFill>
+              </a:rPr>
+              <a:t>Split</a:t>
+            </a:r>
+            <a:r>
+              <a:rPr lang="en-US" dirty="0"/>
+              <a:t> </a:t>
+            </a:r>
+            <a:r>
+              <a:rPr lang="bg-BG" dirty="0">
+                <a:solidFill>
+                  <a:schemeClr val="tx1"/>
+                </a:solidFill>
+              </a:rPr>
+              <a:t>освен да </a:t>
+            </a:r>
+            <a:r>
+              <a:rPr lang="bg-BG" dirty="0" err="1">
+                <a:solidFill>
+                  <a:schemeClr val="tx1"/>
+                </a:solidFill>
+              </a:rPr>
+              <a:t>сплитва</a:t>
+            </a:r>
+            <a:r>
+              <a:rPr lang="bg-BG" dirty="0">
+                <a:solidFill>
+                  <a:schemeClr val="tx1"/>
+                </a:solidFill>
+              </a:rPr>
+              <a:t> само чрез един сепаратор (1 символ), може да </a:t>
+            </a:r>
+            <a:r>
+              <a:rPr lang="bg-BG" dirty="0" err="1">
+                <a:solidFill>
+                  <a:schemeClr val="tx1"/>
+                </a:solidFill>
+              </a:rPr>
+              <a:t>сплитва</a:t>
+            </a:r>
+            <a:r>
+              <a:rPr lang="bg-BG" dirty="0">
+                <a:solidFill>
+                  <a:schemeClr val="tx1"/>
+                </a:solidFill>
+              </a:rPr>
+              <a:t> и по няколко зададени символа</a:t>
+            </a:r>
+            <a:r>
+              <a:rPr lang="en-US" dirty="0">
+                <a:solidFill>
+                  <a:schemeClr val="tx1"/>
+                </a:solidFill>
+              </a:rPr>
+              <a:t> </a:t>
+            </a:r>
+            <a:r>
+              <a:rPr lang="bg-BG" dirty="0">
+                <a:solidFill>
+                  <a:schemeClr val="tx1"/>
+                </a:solidFill>
+              </a:rPr>
+              <a:t>в </a:t>
+            </a:r>
+            <a:r>
+              <a:rPr lang="en-US" dirty="0">
+                <a:solidFill>
+                  <a:schemeClr val="tx1"/>
+                </a:solidFill>
+              </a:rPr>
+              <a:t>char array.</a:t>
+            </a:r>
+          </a:p>
+          <a:p>
+            <a:pPr marL="0" indent="0">
+              <a:buNone/>
+            </a:pPr>
+            <a:endParaRPr lang="bg-BG" sz="5400" dirty="0">
+              <a:solidFill>
+                <a:schemeClr val="tx1"/>
+              </a:solidFill>
+              <a:latin typeface="Arial" panose="020B0604020202020204" pitchFamily="34" charset="0"/>
+              <a:ea typeface="+mj-ea"/>
+              <a:cs typeface="Arial" panose="020B0604020202020204" pitchFamily="34" charset="0"/>
+            </a:endParaRPr>
+          </a:p>
+          <a:p>
+            <a:pPr marL="0" indent="0">
+              <a:buFont typeface="Arial" panose="020B0604020202020204" pitchFamily="34" charset="0"/>
+              <a:buNone/>
+            </a:pPr>
+            <a:r>
+              <a:rPr lang="bg-BG" sz="2400" i="1" u="sng" dirty="0">
+                <a:solidFill>
+                  <a:srgbClr val="FFFF00"/>
+                </a:solidFill>
+                <a:latin typeface="Arial" panose="020B0604020202020204" pitchFamily="34" charset="0"/>
+                <a:cs typeface="Arial" panose="020B0604020202020204" pitchFamily="34" charset="0"/>
+              </a:rPr>
+              <a:t>Пример</a:t>
+            </a:r>
+            <a:r>
+              <a:rPr lang="bg-BG" sz="2400" i="1" u="sng" dirty="0">
+                <a:latin typeface="Arial" panose="020B0604020202020204" pitchFamily="34" charset="0"/>
+                <a:cs typeface="Arial" panose="020B0604020202020204" pitchFamily="34" charset="0"/>
+              </a:rPr>
+              <a:t>:</a:t>
+            </a:r>
+            <a:endParaRPr lang="en-US" sz="2400" dirty="0">
+              <a:solidFill>
+                <a:schemeClr val="tx2">
+                  <a:lumMod val="75000"/>
+                </a:schemeClr>
+              </a:solidFill>
+              <a:latin typeface="Consolas" panose="020B0609020204030204" pitchFamily="49" charset="0"/>
+            </a:endParaRPr>
+          </a:p>
+          <a:p>
+            <a:pPr marL="0" indent="0">
+              <a:buFont typeface="Arial" panose="020B0604020202020204" pitchFamily="34" charset="0"/>
+              <a:buNone/>
+            </a:pPr>
+            <a:r>
+              <a:rPr lang="en-US" sz="2400" dirty="0">
+                <a:solidFill>
+                  <a:schemeClr val="tx2">
+                    <a:lumMod val="75000"/>
+                  </a:schemeClr>
+                </a:solidFill>
+                <a:latin typeface="Consolas" panose="020B0609020204030204" pitchFamily="49" charset="0"/>
+              </a:rPr>
+              <a:t>string</a:t>
+            </a:r>
+            <a:r>
+              <a:rPr lang="en-US" sz="2400" dirty="0">
+                <a:latin typeface="Consolas" panose="020B0609020204030204" pitchFamily="49" charset="0"/>
+              </a:rPr>
+              <a:t> </a:t>
+            </a:r>
+            <a:r>
+              <a:rPr lang="en-US" sz="2400" dirty="0">
+                <a:solidFill>
+                  <a:schemeClr val="accent3"/>
+                </a:solidFill>
+                <a:latin typeface="Consolas" panose="020B0609020204030204" pitchFamily="49" charset="0"/>
+              </a:rPr>
+              <a:t>text</a:t>
+            </a:r>
+            <a:r>
+              <a:rPr lang="en-US" sz="2400" dirty="0">
+                <a:latin typeface="Consolas" panose="020B0609020204030204" pitchFamily="49" charset="0"/>
+              </a:rPr>
+              <a:t> = </a:t>
+            </a:r>
+            <a:r>
+              <a:rPr lang="en-US" sz="2400" dirty="0">
+                <a:solidFill>
+                  <a:schemeClr val="accent6"/>
+                </a:solidFill>
+                <a:latin typeface="Consolas" panose="020B0609020204030204" pitchFamily="49" charset="0"/>
+              </a:rPr>
+              <a:t>“Hello, I am </a:t>
+            </a:r>
+            <a:r>
+              <a:rPr lang="en-US" sz="2400" dirty="0" err="1">
+                <a:solidFill>
+                  <a:schemeClr val="accent6"/>
+                </a:solidFill>
+                <a:latin typeface="Consolas" panose="020B0609020204030204" pitchFamily="49" charset="0"/>
+              </a:rPr>
+              <a:t>Zako</a:t>
+            </a:r>
+            <a:r>
+              <a:rPr lang="en-US" sz="2400" dirty="0">
+                <a:solidFill>
+                  <a:schemeClr val="accent6"/>
+                </a:solidFill>
+                <a:latin typeface="Consolas" panose="020B0609020204030204" pitchFamily="49" charset="0"/>
+              </a:rPr>
+              <a:t>!”</a:t>
+            </a:r>
+            <a:r>
+              <a:rPr lang="en-US" sz="2400" dirty="0">
+                <a:solidFill>
+                  <a:schemeClr val="tx1"/>
+                </a:solidFill>
+                <a:latin typeface="Consolas" panose="020B0609020204030204" pitchFamily="49" charset="0"/>
+              </a:rPr>
+              <a:t>;</a:t>
+            </a:r>
+          </a:p>
+          <a:p>
+            <a:pPr marL="0" indent="0">
+              <a:buNone/>
+            </a:pPr>
+            <a:r>
+              <a:rPr lang="en-US" sz="2400" dirty="0">
+                <a:solidFill>
+                  <a:schemeClr val="tx2">
+                    <a:lumMod val="75000"/>
+                  </a:schemeClr>
+                </a:solidFill>
+                <a:latin typeface="Consolas" panose="020B0609020204030204" pitchFamily="49" charset="0"/>
+              </a:rPr>
+              <a:t>string[]</a:t>
+            </a:r>
+            <a:r>
+              <a:rPr lang="en-US" sz="2400" dirty="0">
+                <a:latin typeface="Consolas" panose="020B0609020204030204" pitchFamily="49" charset="0"/>
+              </a:rPr>
+              <a:t> </a:t>
+            </a:r>
+            <a:r>
+              <a:rPr lang="en-US" sz="2400" dirty="0">
+                <a:solidFill>
+                  <a:srgbClr val="92D050"/>
+                </a:solidFill>
+                <a:latin typeface="Consolas" panose="020B0609020204030204" pitchFamily="49" charset="0"/>
+              </a:rPr>
+              <a:t>parts</a:t>
+            </a:r>
+            <a:r>
+              <a:rPr lang="en-US" sz="2400" dirty="0">
+                <a:latin typeface="Consolas" panose="020B0609020204030204" pitchFamily="49" charset="0"/>
+              </a:rPr>
+              <a:t> = </a:t>
+            </a:r>
+            <a:r>
+              <a:rPr lang="en-US" sz="2400" dirty="0" err="1">
+                <a:solidFill>
+                  <a:schemeClr val="accent3"/>
+                </a:solidFill>
+                <a:latin typeface="Consolas" panose="020B0609020204030204" pitchFamily="49" charset="0"/>
+              </a:rPr>
+              <a:t>text</a:t>
+            </a:r>
+            <a:r>
+              <a:rPr lang="en-US" sz="2400" dirty="0" err="1">
+                <a:solidFill>
+                  <a:schemeClr val="accent6">
+                    <a:lumMod val="40000"/>
+                    <a:lumOff val="60000"/>
+                  </a:schemeClr>
+                </a:solidFill>
+                <a:latin typeface="Consolas" panose="020B0609020204030204" pitchFamily="49" charset="0"/>
+              </a:rPr>
+              <a:t>.Split</a:t>
+            </a:r>
+            <a:r>
+              <a:rPr lang="en-US" sz="2400" dirty="0">
+                <a:solidFill>
+                  <a:schemeClr val="accent3"/>
+                </a:solidFill>
+                <a:latin typeface="Consolas" panose="020B0609020204030204" pitchFamily="49" charset="0"/>
+              </a:rPr>
+              <a:t>(</a:t>
+            </a:r>
+            <a:r>
+              <a:rPr lang="en-US" sz="2400" dirty="0">
+                <a:solidFill>
+                  <a:srgbClr val="FFFF00"/>
+                </a:solidFill>
+                <a:latin typeface="Consolas" panose="020B0609020204030204" pitchFamily="49" charset="0"/>
+              </a:rPr>
+              <a:t>new</a:t>
+            </a:r>
+            <a:r>
+              <a:rPr lang="en-US" sz="2400" dirty="0">
+                <a:solidFill>
+                  <a:schemeClr val="accent3"/>
+                </a:solidFill>
+                <a:latin typeface="Consolas" panose="020B0609020204030204" pitchFamily="49" charset="0"/>
+              </a:rPr>
+              <a:t> </a:t>
+            </a:r>
+            <a:r>
+              <a:rPr lang="en-US" sz="2400" dirty="0">
+                <a:solidFill>
+                  <a:schemeClr val="tx2">
+                    <a:lumMod val="75000"/>
+                  </a:schemeClr>
+                </a:solidFill>
+                <a:latin typeface="Consolas" panose="020B0609020204030204" pitchFamily="49" charset="0"/>
+              </a:rPr>
+              <a:t>char[] </a:t>
+            </a:r>
+            <a:r>
+              <a:rPr lang="en-US" sz="2400" dirty="0">
+                <a:solidFill>
+                  <a:schemeClr val="accent6"/>
+                </a:solidFill>
+                <a:latin typeface="Consolas" panose="020B0609020204030204" pitchFamily="49" charset="0"/>
+              </a:rPr>
+              <a:t>{‘,’, ‘ ’, ‘!’</a:t>
+            </a:r>
+            <a:r>
+              <a:rPr lang="en-US" sz="2400" dirty="0">
+                <a:solidFill>
+                  <a:schemeClr val="accent3"/>
+                </a:solidFill>
+                <a:latin typeface="Consolas" panose="020B0609020204030204" pitchFamily="49" charset="0"/>
+              </a:rPr>
+              <a:t>});</a:t>
+            </a:r>
+          </a:p>
+          <a:p>
+            <a:pPr marL="0" indent="0">
+              <a:buNone/>
+            </a:pPr>
+            <a:endParaRPr lang="en-US" sz="2400" dirty="0">
+              <a:solidFill>
+                <a:schemeClr val="accent3"/>
+              </a:solidFill>
+              <a:latin typeface="Consolas" panose="020B0609020204030204" pitchFamily="49" charset="0"/>
+            </a:endParaRPr>
+          </a:p>
+          <a:p>
+            <a:pPr marL="0" indent="0">
+              <a:buNone/>
+            </a:pPr>
+            <a:r>
+              <a:rPr lang="en-US" sz="2400" dirty="0">
+                <a:solidFill>
+                  <a:schemeClr val="accent2">
+                    <a:lumMod val="60000"/>
+                    <a:lumOff val="40000"/>
+                  </a:schemeClr>
+                </a:solidFill>
+                <a:latin typeface="Consolas" panose="020B0609020204030204" pitchFamily="49" charset="0"/>
+              </a:rPr>
+              <a:t>//Result: </a:t>
+            </a:r>
+            <a:r>
+              <a:rPr lang="en-US" sz="2400" dirty="0">
+                <a:solidFill>
+                  <a:schemeClr val="accent3"/>
+                </a:solidFill>
+                <a:latin typeface="Consolas" panose="020B0609020204030204" pitchFamily="49" charset="0"/>
+              </a:rPr>
+              <a:t>“Hello”, “I”, “am”, “</a:t>
+            </a:r>
+            <a:r>
+              <a:rPr lang="en-US" sz="2400" dirty="0" err="1">
+                <a:solidFill>
+                  <a:schemeClr val="accent3"/>
+                </a:solidFill>
+                <a:latin typeface="Consolas" panose="020B0609020204030204" pitchFamily="49" charset="0"/>
+              </a:rPr>
+              <a:t>Zako</a:t>
+            </a:r>
+            <a:r>
+              <a:rPr lang="en-US" sz="2400" dirty="0">
+                <a:solidFill>
+                  <a:schemeClr val="accent3"/>
+                </a:solidFill>
+                <a:latin typeface="Consolas" panose="020B0609020204030204" pitchFamily="49" charset="0"/>
+              </a:rPr>
+              <a:t>”</a:t>
+            </a:r>
+            <a:endParaRPr lang="bg-BG" sz="2400" dirty="0"/>
+          </a:p>
+        </p:txBody>
+      </p:sp>
+    </p:spTree>
+    <p:extLst>
+      <p:ext uri="{BB962C8B-B14F-4D97-AF65-F5344CB8AC3E}">
+        <p14:creationId xmlns:p14="http://schemas.microsoft.com/office/powerpoint/2010/main" val="1630653540"/>
+      </p:ext>
+    </p:extLst>
+  </p:cSld>
+  <p:clrMapOvr>
+    <a:masterClrMapping/>
+  </p:clrMapOvr>
+</p:sld>
+</file>
+
+<file path=ppt/slides/slide51.xml><?xml version="1.0" encoding="utf-8"?>
+<p:sld xmlns:a="http://schemas.openxmlformats.org/drawingml/2006/main" xmlns:r="http://schemas.openxmlformats.org/officeDocument/2006/relationships" xmlns:p="http://schemas.openxmlformats.org/presentationml/2006/main">
+  <p:cSld>
+    <p:spTree>
+      <p:nvGrpSpPr>
+        <p:cNvPr id="1" name=""/>
+        <p:cNvGrpSpPr/>
+        <p:nvPr/>
+      </p:nvGrpSpPr>
+      <p:grpSpPr>
+        <a:xfrm>
+          <a:off x="0" y="0"/>
+          <a:ext cx="0" cy="0"/>
+          <a:chOff x="0" y="0"/>
+          <a:chExt cx="0" cy="0"/>
+        </a:xfrm>
+      </p:grpSpPr>
+      <p:sp>
+        <p:nvSpPr>
+          <p:cNvPr id="2" name="Title 1">
+            <a:extLst>
+              <a:ext uri="{FF2B5EF4-FFF2-40B4-BE49-F238E27FC236}">
+                <a16:creationId xmlns:a16="http://schemas.microsoft.com/office/drawing/2014/main" id="{2D2602BA-9334-9B8F-1F20-7488B9CFFB21}"/>
+              </a:ext>
+            </a:extLst>
+          </p:cNvPr>
+          <p:cNvSpPr>
+            <a:spLocks noGrp="1"/>
+          </p:cNvSpPr>
+          <p:nvPr>
+            <p:ph type="title"/>
+          </p:nvPr>
+        </p:nvSpPr>
+        <p:spPr/>
+        <p:txBody>
+          <a:bodyPr/>
+          <a:lstStyle/>
+          <a:p>
+            <a:pPr algn="ctr"/>
+            <a:r>
+              <a:rPr lang="en-US" dirty="0">
+                <a:solidFill>
+                  <a:schemeClr val="tx1"/>
+                </a:solidFill>
+                <a:latin typeface="Arial" panose="020B0604020202020204" pitchFamily="34" charset="0"/>
+                <a:cs typeface="Arial" panose="020B0604020202020204" pitchFamily="34" charset="0"/>
+              </a:rPr>
+              <a:t>Splitting </a:t>
+            </a:r>
+            <a:r>
+              <a:rPr lang="bg-BG" dirty="0">
+                <a:solidFill>
+                  <a:schemeClr val="tx1"/>
+                </a:solidFill>
+                <a:latin typeface="Arial" panose="020B0604020202020204" pitchFamily="34" charset="0"/>
+                <a:cs typeface="Arial" panose="020B0604020202020204" pitchFamily="34" charset="0"/>
+              </a:rPr>
+              <a:t>със </a:t>
+            </a:r>
+            <a:r>
+              <a:rPr lang="en-US" dirty="0">
+                <a:solidFill>
+                  <a:srgbClr val="FFFF00"/>
+                </a:solidFill>
+                <a:latin typeface="Arial" panose="020B0604020202020204" pitchFamily="34" charset="0"/>
+                <a:cs typeface="Arial" panose="020B0604020202020204" pitchFamily="34" charset="0"/>
+              </a:rPr>
+              <a:t>Split() </a:t>
+            </a:r>
+            <a:r>
+              <a:rPr lang="en-US" dirty="0">
+                <a:solidFill>
+                  <a:schemeClr val="tx1"/>
+                </a:solidFill>
+                <a:latin typeface="Arial" panose="020B0604020202020204" pitchFamily="34" charset="0"/>
+                <a:cs typeface="Arial" panose="020B0604020202020204" pitchFamily="34" charset="0"/>
+              </a:rPr>
+              <a:t>(2)</a:t>
+            </a:r>
+            <a:endParaRPr lang="bg-BG" dirty="0">
+              <a:solidFill>
+                <a:schemeClr val="tx1"/>
+              </a:solidFill>
+              <a:latin typeface="Arial" panose="020B0604020202020204" pitchFamily="34" charset="0"/>
+              <a:cs typeface="Arial" panose="020B0604020202020204" pitchFamily="34" charset="0"/>
+            </a:endParaRPr>
+          </a:p>
+        </p:txBody>
+      </p:sp>
+      <p:sp>
+        <p:nvSpPr>
+          <p:cNvPr id="3" name="Content Placeholder 2">
+            <a:extLst>
+              <a:ext uri="{FF2B5EF4-FFF2-40B4-BE49-F238E27FC236}">
+                <a16:creationId xmlns:a16="http://schemas.microsoft.com/office/drawing/2014/main" id="{C14CAAA9-8B59-E929-BB57-512E76B5952F}"/>
+              </a:ext>
+            </a:extLst>
+          </p:cNvPr>
+          <p:cNvSpPr>
+            <a:spLocks noGrp="1"/>
+          </p:cNvSpPr>
+          <p:nvPr>
+            <p:ph idx="1"/>
+          </p:nvPr>
+        </p:nvSpPr>
+        <p:spPr>
+          <a:xfrm>
+            <a:off x="690113" y="1825625"/>
+            <a:ext cx="10663687" cy="4351338"/>
+          </a:xfrm>
+        </p:spPr>
+        <p:txBody>
+          <a:bodyPr>
+            <a:normAutofit/>
+          </a:bodyPr>
+          <a:lstStyle/>
+          <a:p>
+            <a:r>
+              <a:rPr lang="en-US" dirty="0">
+                <a:solidFill>
+                  <a:srgbClr val="FFFF00"/>
+                </a:solidFill>
+              </a:rPr>
+              <a:t>Split</a:t>
+            </a:r>
+            <a:r>
+              <a:rPr lang="en-US" dirty="0"/>
+              <a:t> </a:t>
+            </a:r>
+            <a:r>
+              <a:rPr lang="bg-BG" dirty="0">
+                <a:solidFill>
+                  <a:schemeClr val="tx1"/>
+                </a:solidFill>
+              </a:rPr>
+              <a:t>метода може да получи и допълнителен параметър, който е отговорен за премахването на празните елементи или за премахването на празните полета от вече резултатни елементи.</a:t>
+            </a:r>
+            <a:endParaRPr lang="bg-BG" sz="5400" dirty="0">
+              <a:solidFill>
+                <a:schemeClr val="tx1"/>
+              </a:solidFill>
+              <a:latin typeface="Arial" panose="020B0604020202020204" pitchFamily="34" charset="0"/>
+              <a:ea typeface="+mj-ea"/>
+              <a:cs typeface="Arial" panose="020B0604020202020204" pitchFamily="34" charset="0"/>
+            </a:endParaRPr>
+          </a:p>
+          <a:p>
+            <a:pPr marL="0" indent="0">
+              <a:buFont typeface="Arial" panose="020B0604020202020204" pitchFamily="34" charset="0"/>
+              <a:buNone/>
+            </a:pPr>
+            <a:r>
+              <a:rPr lang="bg-BG" sz="2400" i="1" u="sng" dirty="0">
+                <a:solidFill>
+                  <a:srgbClr val="FFFF00"/>
+                </a:solidFill>
+                <a:latin typeface="Arial" panose="020B0604020202020204" pitchFamily="34" charset="0"/>
+                <a:cs typeface="Arial" panose="020B0604020202020204" pitchFamily="34" charset="0"/>
+              </a:rPr>
+              <a:t>Пример</a:t>
+            </a:r>
+            <a:r>
+              <a:rPr lang="bg-BG" sz="2400" i="1" u="sng" dirty="0">
+                <a:latin typeface="Arial" panose="020B0604020202020204" pitchFamily="34" charset="0"/>
+                <a:cs typeface="Arial" panose="020B0604020202020204" pitchFamily="34" charset="0"/>
+              </a:rPr>
+              <a:t>:</a:t>
+            </a:r>
+            <a:endParaRPr lang="en-US" sz="2400" dirty="0">
+              <a:solidFill>
+                <a:schemeClr val="tx2">
+                  <a:lumMod val="75000"/>
+                </a:schemeClr>
+              </a:solidFill>
+              <a:latin typeface="Consolas" panose="020B0609020204030204" pitchFamily="49" charset="0"/>
+            </a:endParaRPr>
+          </a:p>
+          <a:p>
+            <a:pPr marL="0" indent="0">
+              <a:buFont typeface="Arial" panose="020B0604020202020204" pitchFamily="34" charset="0"/>
+              <a:buNone/>
+            </a:pPr>
+            <a:r>
+              <a:rPr lang="en-US" sz="2000" dirty="0">
+                <a:solidFill>
+                  <a:schemeClr val="tx2">
+                    <a:lumMod val="75000"/>
+                  </a:schemeClr>
+                </a:solidFill>
+                <a:latin typeface="Consolas" panose="020B0609020204030204" pitchFamily="49" charset="0"/>
+              </a:rPr>
+              <a:t>string</a:t>
+            </a:r>
+            <a:r>
+              <a:rPr lang="en-US" sz="2000" dirty="0">
+                <a:latin typeface="Consolas" panose="020B0609020204030204" pitchFamily="49" charset="0"/>
+              </a:rPr>
+              <a:t> </a:t>
+            </a:r>
+            <a:r>
+              <a:rPr lang="en-US" sz="2000" dirty="0">
+                <a:solidFill>
+                  <a:schemeClr val="accent3"/>
+                </a:solidFill>
+                <a:latin typeface="Consolas" panose="020B0609020204030204" pitchFamily="49" charset="0"/>
+              </a:rPr>
+              <a:t>text</a:t>
+            </a:r>
+            <a:r>
+              <a:rPr lang="en-US" sz="2000" dirty="0">
+                <a:latin typeface="Consolas" panose="020B0609020204030204" pitchFamily="49" charset="0"/>
+              </a:rPr>
+              <a:t> = </a:t>
+            </a:r>
+            <a:r>
+              <a:rPr lang="en-US" sz="2000" dirty="0">
+                <a:solidFill>
+                  <a:schemeClr val="accent6"/>
+                </a:solidFill>
+                <a:latin typeface="Consolas" panose="020B0609020204030204" pitchFamily="49" charset="0"/>
+              </a:rPr>
+              <a:t>“Hello,,, I am </a:t>
+            </a:r>
+            <a:r>
+              <a:rPr lang="en-US" sz="2000" dirty="0" err="1">
+                <a:solidFill>
+                  <a:schemeClr val="accent6"/>
+                </a:solidFill>
+                <a:latin typeface="Consolas" panose="020B0609020204030204" pitchFamily="49" charset="0"/>
+              </a:rPr>
+              <a:t>Zako</a:t>
+            </a:r>
+            <a:r>
+              <a:rPr lang="en-US" sz="2000" dirty="0">
+                <a:solidFill>
+                  <a:schemeClr val="accent6"/>
+                </a:solidFill>
+                <a:latin typeface="Consolas" panose="020B0609020204030204" pitchFamily="49" charset="0"/>
+              </a:rPr>
+              <a:t>!”</a:t>
+            </a:r>
+            <a:r>
+              <a:rPr lang="en-US" sz="2000" dirty="0">
+                <a:solidFill>
+                  <a:schemeClr val="tx1"/>
+                </a:solidFill>
+                <a:latin typeface="Consolas" panose="020B0609020204030204" pitchFamily="49" charset="0"/>
+              </a:rPr>
+              <a:t>;</a:t>
+            </a:r>
+          </a:p>
+          <a:p>
+            <a:pPr marL="0" indent="0">
+              <a:buNone/>
+            </a:pPr>
+            <a:r>
+              <a:rPr lang="en-US" sz="2000" dirty="0">
+                <a:solidFill>
+                  <a:schemeClr val="tx2">
+                    <a:lumMod val="75000"/>
+                  </a:schemeClr>
+                </a:solidFill>
+                <a:latin typeface="Consolas" panose="020B0609020204030204" pitchFamily="49" charset="0"/>
+              </a:rPr>
+              <a:t>string[]</a:t>
+            </a:r>
+            <a:r>
+              <a:rPr lang="en-US" sz="2000" dirty="0">
+                <a:latin typeface="Consolas" panose="020B0609020204030204" pitchFamily="49" charset="0"/>
+              </a:rPr>
+              <a:t> </a:t>
+            </a:r>
+            <a:r>
+              <a:rPr lang="en-US" sz="2000" dirty="0">
+                <a:solidFill>
+                  <a:srgbClr val="92D050"/>
+                </a:solidFill>
+                <a:latin typeface="Consolas" panose="020B0609020204030204" pitchFamily="49" charset="0"/>
+              </a:rPr>
+              <a:t>parts</a:t>
+            </a:r>
+            <a:r>
+              <a:rPr lang="en-US" sz="2000" dirty="0">
+                <a:latin typeface="Consolas" panose="020B0609020204030204" pitchFamily="49" charset="0"/>
+              </a:rPr>
+              <a:t> = </a:t>
+            </a:r>
+            <a:r>
+              <a:rPr lang="en-US" sz="2000" dirty="0" err="1">
+                <a:solidFill>
+                  <a:schemeClr val="accent3"/>
+                </a:solidFill>
+                <a:latin typeface="Consolas" panose="020B0609020204030204" pitchFamily="49" charset="0"/>
+              </a:rPr>
+              <a:t>text</a:t>
+            </a:r>
+            <a:r>
+              <a:rPr lang="en-US" sz="2000" dirty="0" err="1">
+                <a:solidFill>
+                  <a:schemeClr val="accent6">
+                    <a:lumMod val="40000"/>
+                    <a:lumOff val="60000"/>
+                  </a:schemeClr>
+                </a:solidFill>
+                <a:latin typeface="Consolas" panose="020B0609020204030204" pitchFamily="49" charset="0"/>
+              </a:rPr>
+              <a:t>.Split</a:t>
+            </a:r>
+            <a:r>
+              <a:rPr lang="en-US" sz="2000" dirty="0">
+                <a:solidFill>
+                  <a:schemeClr val="accent3"/>
+                </a:solidFill>
+                <a:latin typeface="Consolas" panose="020B0609020204030204" pitchFamily="49" charset="0"/>
+              </a:rPr>
+              <a:t>(</a:t>
+            </a:r>
+            <a:r>
+              <a:rPr lang="en-US" sz="2000" dirty="0">
+                <a:solidFill>
+                  <a:schemeClr val="accent6"/>
+                </a:solidFill>
+                <a:latin typeface="Consolas" panose="020B0609020204030204" pitchFamily="49" charset="0"/>
+              </a:rPr>
+              <a:t>‘,’</a:t>
+            </a:r>
+            <a:r>
+              <a:rPr lang="bg-BG" sz="2000" dirty="0">
+                <a:solidFill>
+                  <a:schemeClr val="accent6"/>
+                </a:solidFill>
+                <a:latin typeface="Consolas" panose="020B0609020204030204" pitchFamily="49" charset="0"/>
+              </a:rPr>
+              <a:t>, </a:t>
+            </a:r>
+            <a:r>
+              <a:rPr lang="en-US" sz="2000" dirty="0" err="1">
+                <a:solidFill>
+                  <a:schemeClr val="accent6"/>
+                </a:solidFill>
+                <a:latin typeface="Consolas" panose="020B0609020204030204" pitchFamily="49" charset="0"/>
+              </a:rPr>
+              <a:t>StringSplitOptions.RemoveEmptyEntries</a:t>
+            </a:r>
+            <a:r>
+              <a:rPr lang="en-US" sz="2000" dirty="0">
+                <a:solidFill>
+                  <a:schemeClr val="accent3"/>
+                </a:solidFill>
+                <a:latin typeface="Consolas" panose="020B0609020204030204" pitchFamily="49" charset="0"/>
+              </a:rPr>
+              <a:t>);</a:t>
+            </a:r>
+          </a:p>
+          <a:p>
+            <a:pPr marL="0" indent="0">
+              <a:buNone/>
+            </a:pPr>
+            <a:r>
+              <a:rPr lang="en-US" sz="2000" dirty="0">
+                <a:solidFill>
+                  <a:schemeClr val="tx2">
+                    <a:lumMod val="75000"/>
+                  </a:schemeClr>
+                </a:solidFill>
+                <a:latin typeface="Consolas" panose="020B0609020204030204" pitchFamily="49" charset="0"/>
+              </a:rPr>
+              <a:t>string[]</a:t>
+            </a:r>
+            <a:r>
+              <a:rPr lang="en-US" sz="2000" dirty="0">
+                <a:latin typeface="Consolas" panose="020B0609020204030204" pitchFamily="49" charset="0"/>
+              </a:rPr>
+              <a:t> </a:t>
+            </a:r>
+            <a:r>
+              <a:rPr lang="en-US" sz="2000" dirty="0">
+                <a:solidFill>
+                  <a:srgbClr val="92D050"/>
+                </a:solidFill>
+                <a:latin typeface="Consolas" panose="020B0609020204030204" pitchFamily="49" charset="0"/>
+              </a:rPr>
+              <a:t>parts</a:t>
+            </a:r>
+            <a:r>
+              <a:rPr lang="en-US" sz="2000" dirty="0">
+                <a:latin typeface="Consolas" panose="020B0609020204030204" pitchFamily="49" charset="0"/>
+              </a:rPr>
+              <a:t> = </a:t>
+            </a:r>
+            <a:r>
+              <a:rPr lang="en-US" sz="2000" dirty="0" err="1">
+                <a:solidFill>
+                  <a:schemeClr val="accent3"/>
+                </a:solidFill>
+                <a:latin typeface="Consolas" panose="020B0609020204030204" pitchFamily="49" charset="0"/>
+              </a:rPr>
+              <a:t>text</a:t>
+            </a:r>
+            <a:r>
+              <a:rPr lang="en-US" sz="2000" dirty="0" err="1">
+                <a:solidFill>
+                  <a:schemeClr val="accent6">
+                    <a:lumMod val="40000"/>
+                    <a:lumOff val="60000"/>
+                  </a:schemeClr>
+                </a:solidFill>
+                <a:latin typeface="Consolas" panose="020B0609020204030204" pitchFamily="49" charset="0"/>
+              </a:rPr>
+              <a:t>.Split</a:t>
+            </a:r>
+            <a:r>
+              <a:rPr lang="en-US" sz="2000" dirty="0">
+                <a:solidFill>
+                  <a:schemeClr val="accent3"/>
+                </a:solidFill>
+                <a:latin typeface="Consolas" panose="020B0609020204030204" pitchFamily="49" charset="0"/>
+              </a:rPr>
+              <a:t>(</a:t>
+            </a:r>
+            <a:r>
+              <a:rPr lang="en-US" sz="2000" dirty="0">
+                <a:solidFill>
+                  <a:schemeClr val="accent6"/>
+                </a:solidFill>
+                <a:latin typeface="Consolas" panose="020B0609020204030204" pitchFamily="49" charset="0"/>
+              </a:rPr>
+              <a:t>‘,’</a:t>
+            </a:r>
+            <a:r>
+              <a:rPr lang="bg-BG" sz="2000" dirty="0">
+                <a:solidFill>
+                  <a:schemeClr val="accent6"/>
+                </a:solidFill>
+                <a:latin typeface="Consolas" panose="020B0609020204030204" pitchFamily="49" charset="0"/>
+              </a:rPr>
+              <a:t>, </a:t>
+            </a:r>
+            <a:r>
+              <a:rPr lang="en-US" sz="2000" dirty="0" err="1">
+                <a:solidFill>
+                  <a:schemeClr val="accent6"/>
+                </a:solidFill>
+                <a:latin typeface="Consolas" panose="020B0609020204030204" pitchFamily="49" charset="0"/>
+              </a:rPr>
+              <a:t>StringSplitOptions.TrimEntries</a:t>
+            </a:r>
+            <a:r>
+              <a:rPr lang="en-US" sz="2000" dirty="0">
+                <a:solidFill>
+                  <a:schemeClr val="accent3"/>
+                </a:solidFill>
+                <a:latin typeface="Consolas" panose="020B0609020204030204" pitchFamily="49" charset="0"/>
+              </a:rPr>
+              <a:t>);</a:t>
+            </a:r>
+          </a:p>
+          <a:p>
+            <a:pPr marL="0" indent="0">
+              <a:buNone/>
+            </a:pPr>
+            <a:endParaRPr lang="en-US" sz="2400" dirty="0">
+              <a:solidFill>
+                <a:schemeClr val="accent3"/>
+              </a:solidFill>
+              <a:latin typeface="Consolas" panose="020B0609020204030204" pitchFamily="49" charset="0"/>
+            </a:endParaRPr>
+          </a:p>
+          <a:p>
+            <a:pPr marL="0" indent="0">
+              <a:buNone/>
+            </a:pPr>
+            <a:endParaRPr lang="en-US" sz="2400" dirty="0">
+              <a:solidFill>
+                <a:schemeClr val="accent3"/>
+              </a:solidFill>
+              <a:latin typeface="Consolas" panose="020B0609020204030204" pitchFamily="49" charset="0"/>
+            </a:endParaRPr>
+          </a:p>
+        </p:txBody>
+      </p:sp>
+    </p:spTree>
+    <p:extLst>
+      <p:ext uri="{BB962C8B-B14F-4D97-AF65-F5344CB8AC3E}">
+        <p14:creationId xmlns:p14="http://schemas.microsoft.com/office/powerpoint/2010/main" val="867362300"/>
+      </p:ext>
+    </p:extLst>
+  </p:cSld>
+  <p:clrMapOvr>
+    <a:masterClrMapping/>
+  </p:clrMapOvr>
+</p:sld>
+</file>
+
+<file path=ppt/slides/slide52.xml><?xml version="1.0" encoding="utf-8"?>
+<p:sld xmlns:a="http://schemas.openxmlformats.org/drawingml/2006/main" xmlns:r="http://schemas.openxmlformats.org/officeDocument/2006/relationships" xmlns:p="http://schemas.openxmlformats.org/presentationml/2006/main">
+  <p:cSld>
+    <p:spTree>
+      <p:nvGrpSpPr>
+        <p:cNvPr id="1" name=""/>
+        <p:cNvGrpSpPr/>
+        <p:nvPr/>
+      </p:nvGrpSpPr>
+      <p:grpSpPr>
+        <a:xfrm>
+          <a:off x="0" y="0"/>
+          <a:ext cx="0" cy="0"/>
+          <a:chOff x="0" y="0"/>
+          <a:chExt cx="0" cy="0"/>
+        </a:xfrm>
+      </p:grpSpPr>
+      <p:sp>
+        <p:nvSpPr>
+          <p:cNvPr id="2" name="Title 1">
+            <a:extLst>
+              <a:ext uri="{FF2B5EF4-FFF2-40B4-BE49-F238E27FC236}">
+                <a16:creationId xmlns:a16="http://schemas.microsoft.com/office/drawing/2014/main" id="{44718EED-B5D9-90DC-57E0-7A61DC49E75A}"/>
+              </a:ext>
+            </a:extLst>
+          </p:cNvPr>
+          <p:cNvSpPr>
+            <a:spLocks noGrp="1"/>
+          </p:cNvSpPr>
+          <p:nvPr>
+            <p:ph type="title"/>
+          </p:nvPr>
+        </p:nvSpPr>
+        <p:spPr/>
+        <p:txBody>
+          <a:bodyPr/>
+          <a:lstStyle/>
+          <a:p>
+            <a:pPr algn="ctr"/>
+            <a:r>
+              <a:rPr lang="en-US" dirty="0">
+                <a:solidFill>
+                  <a:schemeClr val="tx1"/>
+                </a:solidFill>
+                <a:latin typeface="Arial" panose="020B0604020202020204" pitchFamily="34" charset="0"/>
+                <a:cs typeface="Arial" panose="020B0604020202020204" pitchFamily="34" charset="0"/>
+              </a:rPr>
+              <a:t>Replacing </a:t>
+            </a:r>
+            <a:r>
+              <a:rPr lang="bg-BG" dirty="0">
+                <a:solidFill>
+                  <a:schemeClr val="tx1"/>
+                </a:solidFill>
+                <a:latin typeface="Arial" panose="020B0604020202020204" pitchFamily="34" charset="0"/>
+                <a:cs typeface="Arial" panose="020B0604020202020204" pitchFamily="34" charset="0"/>
+              </a:rPr>
+              <a:t>с </a:t>
+            </a:r>
+            <a:r>
+              <a:rPr lang="en-US" dirty="0">
+                <a:solidFill>
+                  <a:srgbClr val="FFFF00"/>
+                </a:solidFill>
+                <a:latin typeface="Arial" panose="020B0604020202020204" pitchFamily="34" charset="0"/>
+                <a:cs typeface="Arial" panose="020B0604020202020204" pitchFamily="34" charset="0"/>
+              </a:rPr>
+              <a:t>Replace</a:t>
+            </a:r>
+            <a:endParaRPr lang="bg-BG" dirty="0">
+              <a:solidFill>
+                <a:srgbClr val="FFFF00"/>
+              </a:solidFill>
+              <a:latin typeface="Arial" panose="020B0604020202020204" pitchFamily="34" charset="0"/>
+              <a:cs typeface="Arial" panose="020B0604020202020204" pitchFamily="34" charset="0"/>
+            </a:endParaRPr>
+          </a:p>
+        </p:txBody>
+      </p:sp>
+      <p:sp>
+        <p:nvSpPr>
+          <p:cNvPr id="3" name="Content Placeholder 2">
+            <a:extLst>
+              <a:ext uri="{FF2B5EF4-FFF2-40B4-BE49-F238E27FC236}">
+                <a16:creationId xmlns:a16="http://schemas.microsoft.com/office/drawing/2014/main" id="{36E44389-7B62-2328-36DD-C410C56CB2A4}"/>
+              </a:ext>
+            </a:extLst>
+          </p:cNvPr>
+          <p:cNvSpPr>
+            <a:spLocks noGrp="1"/>
+          </p:cNvSpPr>
+          <p:nvPr>
+            <p:ph idx="1"/>
+          </p:nvPr>
+        </p:nvSpPr>
+        <p:spPr>
+          <a:xfrm>
+            <a:off x="431321" y="1825625"/>
+            <a:ext cx="10922479" cy="4351338"/>
+          </a:xfrm>
+        </p:spPr>
+        <p:txBody>
+          <a:bodyPr/>
+          <a:lstStyle/>
+          <a:p>
+            <a:r>
+              <a:rPr lang="en-US" dirty="0">
+                <a:solidFill>
+                  <a:srgbClr val="FFFF00"/>
+                </a:solidFill>
+              </a:rPr>
+              <a:t>Replace</a:t>
+            </a:r>
+            <a:r>
+              <a:rPr lang="en-US" dirty="0"/>
+              <a:t> </a:t>
+            </a:r>
+            <a:r>
+              <a:rPr lang="bg-BG" dirty="0">
+                <a:solidFill>
+                  <a:schemeClr val="tx1"/>
+                </a:solidFill>
+              </a:rPr>
+              <a:t>заменя всички появявания на даден стринг в стринг с друг стринг.</a:t>
+            </a:r>
+          </a:p>
+          <a:p>
+            <a:endParaRPr lang="bg-BG" dirty="0"/>
+          </a:p>
+          <a:p>
+            <a:r>
+              <a:rPr lang="bg-BG" sz="2800" i="1" u="sng" dirty="0">
+                <a:solidFill>
+                  <a:srgbClr val="FFFF00"/>
+                </a:solidFill>
+                <a:latin typeface="Arial" panose="020B0604020202020204" pitchFamily="34" charset="0"/>
+                <a:cs typeface="Arial" panose="020B0604020202020204" pitchFamily="34" charset="0"/>
+              </a:rPr>
+              <a:t>Пример</a:t>
+            </a:r>
+            <a:r>
+              <a:rPr lang="bg-BG" sz="2800" i="1" u="sng" dirty="0">
+                <a:latin typeface="Arial" panose="020B0604020202020204" pitchFamily="34" charset="0"/>
+                <a:cs typeface="Arial" panose="020B0604020202020204" pitchFamily="34" charset="0"/>
+              </a:rPr>
+              <a:t>:</a:t>
+            </a:r>
+            <a:endParaRPr lang="en-US" sz="2800" dirty="0">
+              <a:solidFill>
+                <a:schemeClr val="tx2">
+                  <a:lumMod val="75000"/>
+                </a:schemeClr>
+              </a:solidFill>
+              <a:latin typeface="Consolas" panose="020B0609020204030204" pitchFamily="49" charset="0"/>
+            </a:endParaRPr>
+          </a:p>
+          <a:p>
+            <a:pPr marL="0" indent="0">
+              <a:buNone/>
+            </a:pPr>
+            <a:endParaRPr lang="bg-BG" sz="2400" dirty="0"/>
+          </a:p>
+          <a:p>
+            <a:pPr marL="457200" lvl="1" indent="0">
+              <a:buNone/>
+            </a:pPr>
+            <a:r>
+              <a:rPr lang="en-US" sz="2000" dirty="0">
+                <a:solidFill>
+                  <a:schemeClr val="tx2">
+                    <a:lumMod val="75000"/>
+                  </a:schemeClr>
+                </a:solidFill>
+                <a:latin typeface="Consolas" panose="020B0609020204030204" pitchFamily="49" charset="0"/>
+              </a:rPr>
+              <a:t>string</a:t>
+            </a:r>
+            <a:r>
+              <a:rPr lang="en-US" sz="2000" dirty="0">
+                <a:latin typeface="Consolas" panose="020B0609020204030204" pitchFamily="49" charset="0"/>
+              </a:rPr>
+              <a:t> </a:t>
+            </a:r>
+            <a:r>
+              <a:rPr lang="en-US" sz="2000" dirty="0">
+                <a:solidFill>
+                  <a:schemeClr val="accent3"/>
+                </a:solidFill>
+                <a:latin typeface="Consolas" panose="020B0609020204030204" pitchFamily="49" charset="0"/>
+              </a:rPr>
+              <a:t>text</a:t>
+            </a:r>
+            <a:r>
+              <a:rPr lang="en-US" sz="2000" dirty="0">
+                <a:latin typeface="Consolas" panose="020B0609020204030204" pitchFamily="49" charset="0"/>
+              </a:rPr>
+              <a:t> = </a:t>
+            </a:r>
+            <a:r>
+              <a:rPr lang="en-US" sz="2000" dirty="0">
+                <a:solidFill>
+                  <a:schemeClr val="accent6"/>
+                </a:solidFill>
+                <a:latin typeface="Consolas" panose="020B0609020204030204" pitchFamily="49" charset="0"/>
+              </a:rPr>
+              <a:t>“Hello </a:t>
+            </a:r>
+            <a:r>
+              <a:rPr lang="en-US" sz="2000" dirty="0" err="1">
+                <a:solidFill>
+                  <a:schemeClr val="accent6"/>
+                </a:solidFill>
+                <a:latin typeface="Consolas" panose="020B0609020204030204" pitchFamily="49" charset="0"/>
+              </a:rPr>
+              <a:t>zako</a:t>
+            </a:r>
+            <a:r>
+              <a:rPr lang="en-US" sz="2000" dirty="0">
+                <a:solidFill>
+                  <a:schemeClr val="accent6"/>
+                </a:solidFill>
+                <a:latin typeface="Consolas" panose="020B0609020204030204" pitchFamily="49" charset="0"/>
+              </a:rPr>
+              <a:t> </a:t>
+            </a:r>
+            <a:r>
+              <a:rPr lang="en-US" sz="2000" dirty="0" err="1">
+                <a:solidFill>
+                  <a:schemeClr val="accent6"/>
+                </a:solidFill>
+                <a:latin typeface="Consolas" panose="020B0609020204030204" pitchFamily="49" charset="0"/>
+              </a:rPr>
+              <a:t>zako</a:t>
+            </a:r>
+            <a:r>
+              <a:rPr lang="en-US" sz="2000" dirty="0">
+                <a:solidFill>
+                  <a:schemeClr val="accent6"/>
+                </a:solidFill>
+                <a:latin typeface="Consolas" panose="020B0609020204030204" pitchFamily="49" charset="0"/>
+              </a:rPr>
+              <a:t>”</a:t>
+            </a:r>
+            <a:r>
+              <a:rPr lang="en-US" sz="2000" dirty="0">
+                <a:solidFill>
+                  <a:schemeClr val="tx1"/>
+                </a:solidFill>
+                <a:latin typeface="Consolas" panose="020B0609020204030204" pitchFamily="49" charset="0"/>
+              </a:rPr>
+              <a:t>;</a:t>
+            </a:r>
+          </a:p>
+          <a:p>
+            <a:pPr marL="457200" lvl="1" indent="0">
+              <a:buNone/>
+            </a:pPr>
+            <a:r>
+              <a:rPr lang="en-US" dirty="0">
+                <a:solidFill>
+                  <a:schemeClr val="tx2">
+                    <a:lumMod val="75000"/>
+                  </a:schemeClr>
+                </a:solidFill>
+              </a:rPr>
+              <a:t>string</a:t>
+            </a:r>
+            <a:r>
+              <a:rPr lang="en-US" dirty="0"/>
+              <a:t> </a:t>
+            </a:r>
+            <a:r>
+              <a:rPr lang="en-US" dirty="0" err="1">
+                <a:solidFill>
+                  <a:srgbClr val="92D050"/>
+                </a:solidFill>
+              </a:rPr>
+              <a:t>newText</a:t>
+            </a:r>
+            <a:r>
+              <a:rPr lang="en-US" dirty="0"/>
+              <a:t> = </a:t>
+            </a:r>
+            <a:r>
+              <a:rPr lang="en-US" dirty="0" err="1">
+                <a:solidFill>
+                  <a:srgbClr val="92D050"/>
+                </a:solidFill>
+              </a:rPr>
+              <a:t>text</a:t>
+            </a:r>
+            <a:r>
+              <a:rPr lang="en-US" dirty="0" err="1"/>
+              <a:t>.</a:t>
+            </a:r>
+            <a:r>
+              <a:rPr lang="en-US" dirty="0" err="1">
+                <a:solidFill>
+                  <a:schemeClr val="accent6">
+                    <a:lumMod val="60000"/>
+                    <a:lumOff val="40000"/>
+                  </a:schemeClr>
+                </a:solidFill>
+              </a:rPr>
+              <a:t>Replace</a:t>
+            </a:r>
+            <a:r>
+              <a:rPr lang="en-US" dirty="0"/>
+              <a:t>(“</a:t>
+            </a:r>
+            <a:r>
+              <a:rPr lang="en-US" dirty="0" err="1">
+                <a:solidFill>
+                  <a:schemeClr val="accent6"/>
+                </a:solidFill>
+                <a:latin typeface="Consolas" panose="020B0609020204030204" pitchFamily="49" charset="0"/>
+              </a:rPr>
+              <a:t>zako</a:t>
+            </a:r>
+            <a:r>
+              <a:rPr lang="en-US" dirty="0"/>
+              <a:t>”, “</a:t>
+            </a:r>
+            <a:r>
+              <a:rPr lang="en-US" dirty="0" err="1">
+                <a:solidFill>
+                  <a:schemeClr val="accent6"/>
+                </a:solidFill>
+                <a:latin typeface="Consolas" panose="020B0609020204030204" pitchFamily="49" charset="0"/>
+              </a:rPr>
+              <a:t>kako</a:t>
+            </a:r>
+            <a:r>
+              <a:rPr lang="en-US" dirty="0"/>
+              <a:t>”);</a:t>
+            </a:r>
+            <a:endParaRPr lang="bg-BG" dirty="0"/>
+          </a:p>
+          <a:p>
+            <a:endParaRPr lang="en-US" dirty="0"/>
+          </a:p>
+          <a:p>
+            <a:r>
+              <a:rPr lang="en-US" dirty="0">
+                <a:solidFill>
+                  <a:schemeClr val="tx1"/>
+                </a:solidFill>
+              </a:rPr>
+              <a:t>//</a:t>
+            </a:r>
+            <a:r>
+              <a:rPr lang="en-US" sz="2800" dirty="0">
+                <a:solidFill>
+                  <a:schemeClr val="tx1"/>
+                </a:solidFill>
+                <a:latin typeface="Consolas" panose="020B0609020204030204" pitchFamily="49" charset="0"/>
+              </a:rPr>
+              <a:t>Hello </a:t>
+            </a:r>
+            <a:r>
+              <a:rPr lang="en-US" sz="2800" dirty="0" err="1">
+                <a:solidFill>
+                  <a:schemeClr val="tx1"/>
+                </a:solidFill>
+                <a:latin typeface="Consolas" panose="020B0609020204030204" pitchFamily="49" charset="0"/>
+              </a:rPr>
+              <a:t>kako</a:t>
+            </a:r>
+            <a:r>
+              <a:rPr lang="en-US" sz="2800" dirty="0">
+                <a:solidFill>
+                  <a:schemeClr val="tx1"/>
+                </a:solidFill>
+                <a:latin typeface="Consolas" panose="020B0609020204030204" pitchFamily="49" charset="0"/>
+              </a:rPr>
+              <a:t> </a:t>
+            </a:r>
+            <a:r>
+              <a:rPr lang="en-US" sz="2800" dirty="0" err="1">
+                <a:solidFill>
+                  <a:schemeClr val="tx1"/>
+                </a:solidFill>
+                <a:latin typeface="Consolas" panose="020B0609020204030204" pitchFamily="49" charset="0"/>
+              </a:rPr>
+              <a:t>kako</a:t>
+            </a:r>
+            <a:endParaRPr lang="bg-BG" dirty="0">
+              <a:solidFill>
+                <a:schemeClr val="tx1"/>
+              </a:solidFill>
+            </a:endParaRPr>
+          </a:p>
+        </p:txBody>
+      </p:sp>
+    </p:spTree>
+    <p:extLst>
+      <p:ext uri="{BB962C8B-B14F-4D97-AF65-F5344CB8AC3E}">
+        <p14:creationId xmlns:p14="http://schemas.microsoft.com/office/powerpoint/2010/main" val="3081727771"/>
       </p:ext>
     </p:extLst>
   </p:cSld>

</xml_diff>

<commit_message>
C# TextProcessing last changes
</commit_message>
<xml_diff>
--- a/C# Intermediate.pptx
+++ b/C# Intermediate.pptx
@@ -368,7 +368,7 @@
           <a:p>
             <a:fld id="{0BD89023-946D-4914-A444-F66256F52110}" type="datetimeFigureOut">
               <a:rPr lang="bg-BG" smtClean="0"/>
-              <a:t>2.12.2022 г.</a:t>
+              <a:t>5.12.2022 г.</a:t>
             </a:fld>
             <a:endParaRPr lang="bg-BG"/>
           </a:p>
@@ -649,7 +649,7 @@
           <a:p>
             <a:fld id="{0BD89023-946D-4914-A444-F66256F52110}" type="datetimeFigureOut">
               <a:rPr lang="bg-BG" smtClean="0"/>
-              <a:t>2.12.2022 г.</a:t>
+              <a:t>5.12.2022 г.</a:t>
             </a:fld>
             <a:endParaRPr lang="bg-BG"/>
           </a:p>
@@ -841,7 +841,7 @@
           <a:p>
             <a:fld id="{0BD89023-946D-4914-A444-F66256F52110}" type="datetimeFigureOut">
               <a:rPr lang="bg-BG" smtClean="0"/>
-              <a:t>2.12.2022 г.</a:t>
+              <a:t>5.12.2022 г.</a:t>
             </a:fld>
             <a:endParaRPr lang="bg-BG"/>
           </a:p>
@@ -1102,7 +1102,7 @@
           <a:p>
             <a:fld id="{0BD89023-946D-4914-A444-F66256F52110}" type="datetimeFigureOut">
               <a:rPr lang="bg-BG" smtClean="0"/>
-              <a:t>2.12.2022 г.</a:t>
+              <a:t>5.12.2022 г.</a:t>
             </a:fld>
             <a:endParaRPr lang="bg-BG"/>
           </a:p>
@@ -1528,7 +1528,7 @@
           <a:p>
             <a:fld id="{0BD89023-946D-4914-A444-F66256F52110}" type="datetimeFigureOut">
               <a:rPr lang="bg-BG" smtClean="0"/>
-              <a:t>2.12.2022 г.</a:t>
+              <a:t>5.12.2022 г.</a:t>
             </a:fld>
             <a:endParaRPr lang="bg-BG"/>
           </a:p>
@@ -2074,7 +2074,7 @@
           <a:p>
             <a:fld id="{0BD89023-946D-4914-A444-F66256F52110}" type="datetimeFigureOut">
               <a:rPr lang="bg-BG" smtClean="0"/>
-              <a:t>2.12.2022 г.</a:t>
+              <a:t>5.12.2022 г.</a:t>
             </a:fld>
             <a:endParaRPr lang="bg-BG"/>
           </a:p>
@@ -2905,7 +2905,7 @@
           <a:p>
             <a:fld id="{0BD89023-946D-4914-A444-F66256F52110}" type="datetimeFigureOut">
               <a:rPr lang="bg-BG" smtClean="0"/>
-              <a:t>2.12.2022 г.</a:t>
+              <a:t>5.12.2022 г.</a:t>
             </a:fld>
             <a:endParaRPr lang="bg-BG"/>
           </a:p>
@@ -3075,7 +3075,7 @@
           <a:p>
             <a:fld id="{0BD89023-946D-4914-A444-F66256F52110}" type="datetimeFigureOut">
               <a:rPr lang="bg-BG" smtClean="0"/>
-              <a:t>2.12.2022 г.</a:t>
+              <a:t>5.12.2022 г.</a:t>
             </a:fld>
             <a:endParaRPr lang="bg-BG"/>
           </a:p>
@@ -3255,7 +3255,7 @@
           <a:p>
             <a:fld id="{0BD89023-946D-4914-A444-F66256F52110}" type="datetimeFigureOut">
               <a:rPr lang="bg-BG" smtClean="0"/>
-              <a:t>2.12.2022 г.</a:t>
+              <a:t>5.12.2022 г.</a:t>
             </a:fld>
             <a:endParaRPr lang="bg-BG"/>
           </a:p>
@@ -3425,7 +3425,7 @@
           <a:p>
             <a:fld id="{0BD89023-946D-4914-A444-F66256F52110}" type="datetimeFigureOut">
               <a:rPr lang="bg-BG" smtClean="0"/>
-              <a:t>2.12.2022 г.</a:t>
+              <a:t>5.12.2022 г.</a:t>
             </a:fld>
             <a:endParaRPr lang="bg-BG"/>
           </a:p>
@@ -3682,7 +3682,7 @@
           <a:p>
             <a:fld id="{0BD89023-946D-4914-A444-F66256F52110}" type="datetimeFigureOut">
               <a:rPr lang="bg-BG" smtClean="0"/>
-              <a:t>2.12.2022 г.</a:t>
+              <a:t>5.12.2022 г.</a:t>
             </a:fld>
             <a:endParaRPr lang="bg-BG"/>
           </a:p>
@@ -3914,7 +3914,7 @@
           <a:p>
             <a:fld id="{0BD89023-946D-4914-A444-F66256F52110}" type="datetimeFigureOut">
               <a:rPr lang="bg-BG" smtClean="0"/>
-              <a:t>2.12.2022 г.</a:t>
+              <a:t>5.12.2022 г.</a:t>
             </a:fld>
             <a:endParaRPr lang="bg-BG"/>
           </a:p>
@@ -4307,7 +4307,7 @@
           <a:p>
             <a:fld id="{0BD89023-946D-4914-A444-F66256F52110}" type="datetimeFigureOut">
               <a:rPr lang="bg-BG" smtClean="0"/>
-              <a:t>2.12.2022 г.</a:t>
+              <a:t>5.12.2022 г.</a:t>
             </a:fld>
             <a:endParaRPr lang="bg-BG"/>
           </a:p>
@@ -4425,7 +4425,7 @@
           <a:p>
             <a:fld id="{0BD89023-946D-4914-A444-F66256F52110}" type="datetimeFigureOut">
               <a:rPr lang="bg-BG" smtClean="0"/>
-              <a:t>2.12.2022 г.</a:t>
+              <a:t>5.12.2022 г.</a:t>
             </a:fld>
             <a:endParaRPr lang="bg-BG"/>
           </a:p>
@@ -4520,7 +4520,7 @@
           <a:p>
             <a:fld id="{0BD89023-946D-4914-A444-F66256F52110}" type="datetimeFigureOut">
               <a:rPr lang="bg-BG" smtClean="0"/>
-              <a:t>2.12.2022 г.</a:t>
+              <a:t>5.12.2022 г.</a:t>
             </a:fld>
             <a:endParaRPr lang="bg-BG"/>
           </a:p>
@@ -4793,7 +4793,7 @@
           <a:p>
             <a:fld id="{0BD89023-946D-4914-A444-F66256F52110}" type="datetimeFigureOut">
               <a:rPr lang="bg-BG" smtClean="0"/>
-              <a:t>2.12.2022 г.</a:t>
+              <a:t>5.12.2022 г.</a:t>
             </a:fld>
             <a:endParaRPr lang="bg-BG"/>
           </a:p>
@@ -5074,7 +5074,7 @@
           <a:p>
             <a:fld id="{0BD89023-946D-4914-A444-F66256F52110}" type="datetimeFigureOut">
               <a:rPr lang="bg-BG" smtClean="0"/>
-              <a:t>2.12.2022 г.</a:t>
+              <a:t>5.12.2022 г.</a:t>
             </a:fld>
             <a:endParaRPr lang="bg-BG"/>
           </a:p>
@@ -5314,7 +5314,7 @@
           <a:p>
             <a:fld id="{0BD89023-946D-4914-A444-F66256F52110}" type="datetimeFigureOut">
               <a:rPr lang="bg-BG" smtClean="0"/>
-              <a:t>2.12.2022 г.</a:t>
+              <a:t>5.12.2022 г.</a:t>
             </a:fld>
             <a:endParaRPr lang="bg-BG"/>
           </a:p>
@@ -23757,11 +23757,46 @@
               </a:rPr>
               <a:t>Unicode</a:t>
             </a:r>
-            <a:endParaRPr lang="bg-BG" dirty="0">
-              <a:solidFill>
-                <a:srgbClr val="FFFF00"/>
-              </a:solidFill>
-            </a:endParaRPr>
+            <a:r>
+              <a:rPr lang="bg-BG" dirty="0">
+                <a:solidFill>
+                  <a:srgbClr val="FFFF00"/>
+                </a:solidFill>
+              </a:rPr>
+              <a:t> </a:t>
+            </a:r>
+            <a:r>
+              <a:rPr lang="bg-BG" dirty="0">
+                <a:solidFill>
+                  <a:schemeClr val="tx1"/>
+                </a:solidFill>
+              </a:rPr>
+              <a:t>–</a:t>
+            </a:r>
+            <a:r>
+              <a:rPr lang="bg-BG" dirty="0">
+                <a:solidFill>
+                  <a:srgbClr val="FFFF00"/>
+                </a:solidFill>
+              </a:rPr>
+              <a:t> </a:t>
+            </a:r>
+            <a:r>
+              <a:rPr lang="bg-BG" dirty="0">
+                <a:solidFill>
+                  <a:schemeClr val="tx1"/>
+                </a:solidFill>
+              </a:rPr>
+              <a:t>международен стандарт за кодиране на символи от всякакви езици (дори мъртви), включително математически, технически и пунктуационни символи</a:t>
+            </a:r>
+            <a:r>
+              <a:rPr lang="bg-BG" dirty="0">
+                <a:solidFill>
+                  <a:srgbClr val="FFFF00"/>
+                </a:solidFill>
+              </a:rPr>
+              <a:t>.</a:t>
+            </a:r>
           </a:p>
           <a:p>
             <a:endParaRPr lang="bg-BG" dirty="0"/>
@@ -23796,7 +23831,7 @@
         </p:blipFill>
         <p:spPr>
           <a:xfrm>
-            <a:off x="1323885" y="5252318"/>
+            <a:off x="1358391" y="5838914"/>
             <a:ext cx="7319336" cy="544633"/>
           </a:xfrm>
           <a:prstGeom prst="rect">
@@ -24403,7 +24438,7 @@
               <a:rPr lang="en-US" sz="2400" dirty="0">
                 <a:latin typeface="Consolas" panose="020B0609020204030204" pitchFamily="49" charset="0"/>
               </a:rPr>
-              <a:t>” + “</a:t>
+              <a:t>” + “ </a:t>
             </a:r>
             <a:r>
               <a:rPr lang="en-US" sz="2400" dirty="0">
@@ -24770,7 +24805,7 @@
                 <a:latin typeface="Arial" panose="020B0604020202020204" pitchFamily="34" charset="0"/>
                 <a:cs typeface="Arial" panose="020B0604020202020204" pitchFamily="34" charset="0"/>
               </a:rPr>
-              <a:t>Конвертиране от/към </a:t>
+              <a:t>Конвертиране към </a:t>
             </a:r>
             <a:r>
               <a:rPr lang="en-US" i="1" dirty="0">
@@ -24801,26 +24836,15 @@
               <a:buNone/>
             </a:pPr>
             <a:r>
-              <a:rPr lang="en-US" sz="2400" dirty="0">
+              <a:rPr lang="en-US" sz="2400">
                 <a:solidFill>
                   <a:schemeClr val="tx2">
                     <a:lumMod val="75000"/>
                   </a:schemeClr>
                 </a:solidFill>
                 <a:latin typeface="Consolas" panose="020B0609020204030204" pitchFamily="49" charset="0"/>
-                <a:cs typeface="Arial" panose="020B0604020202020204" pitchFamily="34" charset="0"/>
-              </a:rPr>
-              <a:t>string </a:t>
-            </a:r>
-            <a:r>
-              <a:rPr lang="en-US" sz="2400" dirty="0" err="1">
-                <a:solidFill>
-                  <a:srgbClr val="92D050"/>
-                </a:solidFill>
-                <a:latin typeface="Consolas" panose="020B0609020204030204" pitchFamily="49" charset="0"/>
-                <a:cs typeface="Arial" panose="020B0604020202020204" pitchFamily="34" charset="0"/>
-              </a:rPr>
-              <a:t>someString</a:t>
+              </a:rPr>
+              <a:t>char</a:t>
             </a:r>
             <a:r>
               <a:rPr lang="en-US" sz="2400" dirty="0">
@@ -24830,146 +24854,8 @@
                   </a:schemeClr>
                 </a:solidFill>
                 <a:latin typeface="Consolas" panose="020B0609020204030204" pitchFamily="49" charset="0"/>
-                <a:cs typeface="Arial" panose="020B0604020202020204" pitchFamily="34" charset="0"/>
-              </a:rPr>
-              <a:t> = </a:t>
-            </a:r>
-            <a:r>
-              <a:rPr lang="en-US" sz="2400" dirty="0">
-                <a:solidFill>
-                  <a:srgbClr val="FFFF00"/>
-                </a:solidFill>
-                <a:latin typeface="Consolas" panose="020B0609020204030204" pitchFamily="49" charset="0"/>
-                <a:cs typeface="Arial" panose="020B0604020202020204" pitchFamily="34" charset="0"/>
-              </a:rPr>
-              <a:t>new</a:t>
-            </a:r>
-            <a:r>
-              <a:rPr lang="en-US" sz="2400" dirty="0">
-                <a:solidFill>
-                  <a:schemeClr val="tx2">
-                    <a:lumMod val="75000"/>
-                  </a:schemeClr>
-                </a:solidFill>
-                <a:latin typeface="Consolas" panose="020B0609020204030204" pitchFamily="49" charset="0"/>
-                <a:cs typeface="Arial" panose="020B0604020202020204" pitchFamily="34" charset="0"/>
-              </a:rPr>
-              <a:t> string </a:t>
-            </a:r>
-            <a:r>
-              <a:rPr lang="en-US" sz="2400" dirty="0">
-                <a:solidFill>
-                  <a:schemeClr val="tx1"/>
-                </a:solidFill>
-                <a:latin typeface="Consolas" panose="020B0609020204030204" pitchFamily="49" charset="0"/>
-                <a:cs typeface="Arial" panose="020B0604020202020204" pitchFamily="34" charset="0"/>
-              </a:rPr>
-              <a:t>(</a:t>
-            </a:r>
-            <a:r>
-              <a:rPr lang="en-US" sz="2400" dirty="0">
-                <a:solidFill>
-                  <a:srgbClr val="FFFF00"/>
-                </a:solidFill>
-                <a:latin typeface="Consolas" panose="020B0609020204030204" pitchFamily="49" charset="0"/>
-                <a:cs typeface="Arial" panose="020B0604020202020204" pitchFamily="34" charset="0"/>
-              </a:rPr>
-              <a:t>new</a:t>
-            </a:r>
-            <a:r>
-              <a:rPr lang="en-US" sz="2400" dirty="0">
-                <a:solidFill>
-                  <a:schemeClr val="tx2">
-                    <a:lumMod val="75000"/>
-                  </a:schemeClr>
-                </a:solidFill>
-                <a:latin typeface="Consolas" panose="020B0609020204030204" pitchFamily="49" charset="0"/>
-                <a:cs typeface="Arial" panose="020B0604020202020204" pitchFamily="34" charset="0"/>
-              </a:rPr>
-              <a:t> char[] </a:t>
-            </a:r>
-            <a:r>
-              <a:rPr lang="en-US" sz="2400" dirty="0">
-                <a:solidFill>
-                  <a:srgbClr val="FFC000"/>
-                </a:solidFill>
-                <a:latin typeface="Consolas" panose="020B0609020204030204" pitchFamily="49" charset="0"/>
-                <a:cs typeface="Arial" panose="020B0604020202020204" pitchFamily="34" charset="0"/>
-              </a:rPr>
-              <a:t>{‘H’, ‘</a:t>
-            </a:r>
-            <a:r>
-              <a:rPr lang="en-US" sz="2400" dirty="0" err="1">
-                <a:solidFill>
-                  <a:srgbClr val="FFC000"/>
-                </a:solidFill>
-                <a:latin typeface="Consolas" panose="020B0609020204030204" pitchFamily="49" charset="0"/>
-                <a:cs typeface="Arial" panose="020B0604020202020204" pitchFamily="34" charset="0"/>
-              </a:rPr>
-              <a:t>i</a:t>
-            </a:r>
-            <a:r>
-              <a:rPr lang="en-US" sz="2400" dirty="0">
-                <a:solidFill>
-                  <a:srgbClr val="FFC000"/>
-                </a:solidFill>
-                <a:latin typeface="Consolas" panose="020B0609020204030204" pitchFamily="49" charset="0"/>
-                <a:cs typeface="Arial" panose="020B0604020202020204" pitchFamily="34" charset="0"/>
-              </a:rPr>
-              <a:t>’} </a:t>
-            </a:r>
-            <a:r>
-              <a:rPr lang="en-US" sz="2400" dirty="0">
-                <a:solidFill>
-                  <a:schemeClr val="tx1"/>
-                </a:solidFill>
-                <a:latin typeface="Consolas" panose="020B0609020204030204" pitchFamily="49" charset="0"/>
-                <a:cs typeface="Arial" panose="020B0604020202020204" pitchFamily="34" charset="0"/>
-              </a:rPr>
-              <a:t>)</a:t>
-            </a:r>
-            <a:r>
-              <a:rPr lang="bg-BG" sz="2400" dirty="0">
-                <a:solidFill>
-                  <a:schemeClr val="tx1"/>
-                </a:solidFill>
-                <a:latin typeface="Consolas" panose="020B0609020204030204" pitchFamily="49" charset="0"/>
-                <a:cs typeface="Arial" panose="020B0604020202020204" pitchFamily="34" charset="0"/>
-              </a:rPr>
-              <a:t>;</a:t>
-            </a:r>
-            <a:endParaRPr lang="en-US" sz="2400" dirty="0">
-              <a:solidFill>
-                <a:schemeClr val="tx1"/>
-              </a:solidFill>
-              <a:latin typeface="Consolas" panose="020B0609020204030204" pitchFamily="49" charset="0"/>
-              <a:cs typeface="Arial" panose="020B0604020202020204" pitchFamily="34" charset="0"/>
-            </a:endParaRPr>
-          </a:p>
-          <a:p>
-            <a:endParaRPr lang="en-US" sz="2400" dirty="0">
-              <a:solidFill>
-                <a:schemeClr val="tx2">
-                  <a:lumMod val="75000"/>
-                </a:schemeClr>
-              </a:solidFill>
-              <a:latin typeface="Consolas" panose="020B0609020204030204" pitchFamily="49" charset="0"/>
-            </a:endParaRPr>
-          </a:p>
-          <a:p>
-            <a:pPr marL="0" indent="0">
-              <a:buNone/>
-            </a:pPr>
-            <a:r>
-              <a:rPr lang="en-US" sz="2400" dirty="0">
-                <a:solidFill>
-                  <a:schemeClr val="tx2">
-                    <a:lumMod val="75000"/>
-                  </a:schemeClr>
-                </a:solidFill>
-                <a:latin typeface="Consolas" panose="020B0609020204030204" pitchFamily="49" charset="0"/>
-              </a:rPr>
-              <a:t>char[] </a:t>
+              </a:rPr>
+              <a:t>[] </a:t>
             </a:r>
             <a:r>
               <a:rPr lang="en-US" sz="2400" dirty="0" err="1">
@@ -25289,7 +25175,22 @@
                 </a:solidFill>
                 <a:latin typeface="Consolas" panose="020B0609020204030204" pitchFamily="49" charset="0"/>
               </a:rPr>
-              <a:t>text = </a:t>
+              <a:t>text </a:t>
+            </a:r>
+            <a:r>
+              <a:rPr lang="en-US" sz="2000" dirty="0">
+                <a:latin typeface="Consolas" panose="020B0609020204030204" pitchFamily="49" charset="0"/>
+              </a:rPr>
+              <a:t>=</a:t>
+            </a:r>
+            <a:r>
+              <a:rPr lang="en-US" sz="2000" dirty="0">
+                <a:solidFill>
+                  <a:schemeClr val="accent3"/>
+                </a:solidFill>
+                <a:latin typeface="Consolas" panose="020B0609020204030204" pitchFamily="49" charset="0"/>
+              </a:rPr>
+              <a:t> </a:t>
             </a:r>
             <a:r>
               <a:rPr lang="en-US" sz="2000" dirty="0">
@@ -25780,7 +25681,22 @@
                 </a:solidFill>
                 <a:latin typeface="Consolas" panose="020B0609020204030204" pitchFamily="49" charset="0"/>
               </a:rPr>
-              <a:t>text = </a:t>
+              <a:t>text </a:t>
+            </a:r>
+            <a:r>
+              <a:rPr lang="en-US" sz="2000" dirty="0">
+                <a:latin typeface="Consolas" panose="020B0609020204030204" pitchFamily="49" charset="0"/>
+              </a:rPr>
+              <a:t>=</a:t>
+            </a:r>
+            <a:r>
+              <a:rPr lang="en-US" sz="2000" dirty="0">
+                <a:solidFill>
+                  <a:schemeClr val="accent3"/>
+                </a:solidFill>
+                <a:latin typeface="Consolas" panose="020B0609020204030204" pitchFamily="49" charset="0"/>
+              </a:rPr>
+              <a:t> </a:t>
             </a:r>
             <a:r>
               <a:rPr lang="en-US" sz="2000" dirty="0">
@@ -25852,7 +25768,22 @@
                 </a:solidFill>
                 <a:latin typeface="Consolas" panose="020B0609020204030204" pitchFamily="49" charset="0"/>
               </a:rPr>
-              <a:t> = </a:t>
+              <a:t> </a:t>
+            </a:r>
+            <a:r>
+              <a:rPr lang="en-US" sz="2000" dirty="0">
+                <a:latin typeface="Consolas" panose="020B0609020204030204" pitchFamily="49" charset="0"/>
+              </a:rPr>
+              <a:t>=</a:t>
+            </a:r>
+            <a:r>
+              <a:rPr lang="en-US" sz="2000" dirty="0">
+                <a:solidFill>
+                  <a:srgbClr val="92D050"/>
+                </a:solidFill>
+                <a:latin typeface="Consolas" panose="020B0609020204030204" pitchFamily="49" charset="0"/>
+              </a:rPr>
+              <a:t> </a:t>
             </a:r>
             <a:r>
               <a:rPr lang="en-US" sz="2000" dirty="0" err="1">
@@ -28867,6 +28798,9 @@
             <a:endParaRPr lang="en-US" dirty="0"/>
           </a:p>
           <a:p>
+            <a:pPr marL="0" indent="0">
+              <a:buNone/>
+            </a:pPr>
             <a:r>
               <a:rPr lang="en-US" dirty="0">
                 <a:solidFill>
@@ -29288,6 +29222,9 @@
           <a:bodyPr/>
           <a:lstStyle/>
           <a:p>
+            <a:pPr marL="0" indent="0">
+              <a:buNone/>
+            </a:pPr>
             <a:r>
               <a:rPr lang="en-US" dirty="0">
                 <a:solidFill>
@@ -29342,6 +29279,9 @@
             </a:r>
           </a:p>
           <a:p>
+            <a:pPr marL="0" indent="0">
+              <a:buNone/>
+            </a:pPr>
             <a:r>
               <a:rPr lang="en-US" dirty="0" err="1">
                 <a:solidFill>
@@ -29395,6 +29335,9 @@
             </a:r>
           </a:p>
           <a:p>
+            <a:pPr marL="0" indent="0">
+              <a:buNone/>
+            </a:pPr>
             <a:r>
               <a:rPr lang="en-US" dirty="0" err="1">
                 <a:solidFill>
@@ -29432,6 +29375,9 @@
             </a:r>
           </a:p>
           <a:p>
+            <a:pPr marL="0" indent="0">
+              <a:buNone/>
+            </a:pPr>
             <a:r>
               <a:rPr lang="en-US" dirty="0" err="1">
                 <a:solidFill>
@@ -29473,6 +29419,9 @@
             </a:r>
           </a:p>
           <a:p>
+            <a:pPr marL="0" indent="0">
+              <a:buNone/>
+            </a:pPr>
             <a:r>
               <a:rPr lang="en-US" dirty="0" err="1"/>
               <a:t>Console.WriteLine</a:t>
@@ -29673,6 +29622,9 @@
           </a:bodyPr>
           <a:lstStyle/>
           <a:p>
+            <a:pPr marL="0" indent="0">
+              <a:buNone/>
+            </a:pPr>
             <a:r>
               <a:rPr lang="en-US" dirty="0">
                 <a:solidFill>
@@ -29727,6 +29679,9 @@
             </a:r>
           </a:p>
           <a:p>
+            <a:pPr marL="0" indent="0">
+              <a:buNone/>
+            </a:pPr>
             <a:r>
               <a:rPr lang="en-US" dirty="0" err="1">
                 <a:solidFill>
@@ -29780,6 +29735,9 @@
             </a:r>
           </a:p>
           <a:p>
+            <a:pPr marL="0" indent="0">
+              <a:buNone/>
+            </a:pPr>
             <a:r>
               <a:rPr lang="en-US" dirty="0" err="1">
                 <a:solidFill>
@@ -29828,6 +29786,9 @@
             </a:r>
           </a:p>
           <a:p>
+            <a:pPr marL="0" indent="0">
+              <a:buNone/>
+            </a:pPr>
             <a:r>
               <a:rPr lang="en-US" dirty="0" err="1">
                 <a:solidFill>
@@ -29880,6 +29841,9 @@
             </a:r>
           </a:p>
           <a:p>
+            <a:pPr marL="0" indent="0">
+              <a:buNone/>
+            </a:pPr>
             <a:r>
               <a:rPr lang="en-US" dirty="0" err="1"/>
               <a:t>Console.WriteLine</a:t>
@@ -29906,6 +29870,9 @@
             <a:endParaRPr lang="bg-BG" dirty="0"/>
           </a:p>
           <a:p>
+            <a:pPr marL="0" indent="0">
+              <a:buNone/>
+            </a:pPr>
             <a:r>
               <a:rPr lang="en-US" dirty="0">
                 <a:solidFill>
@@ -29938,6 +29905,9 @@
             </a:endParaRPr>
           </a:p>
           <a:p>
+            <a:pPr marL="0" indent="0">
+              <a:buNone/>
+            </a:pPr>
             <a:r>
               <a:rPr lang="en-US" dirty="0">
                 <a:solidFill>
@@ -29951,6 +29921,9 @@
             </a:r>
           </a:p>
           <a:p>
+            <a:pPr marL="0" indent="0">
+              <a:buNone/>
+            </a:pPr>
             <a:r>
               <a:rPr lang="en-US" dirty="0">
                 <a:solidFill>
@@ -30097,6 +30070,9 @@
           </a:bodyPr>
           <a:lstStyle/>
           <a:p>
+            <a:pPr marL="0" indent="0">
+              <a:buNone/>
+            </a:pPr>
             <a:r>
               <a:rPr lang="en-US" dirty="0">
                 <a:solidFill>
@@ -30151,6 +30127,9 @@
             </a:r>
           </a:p>
           <a:p>
+            <a:pPr marL="0" indent="0">
+              <a:buNone/>
+            </a:pPr>
             <a:r>
               <a:rPr lang="en-US" dirty="0" err="1">
                 <a:solidFill>
@@ -30210,6 +30189,9 @@
             <a:endParaRPr lang="en-US" dirty="0"/>
           </a:p>
           <a:p>
+            <a:pPr marL="0" indent="0">
+              <a:buNone/>
+            </a:pPr>
             <a:r>
               <a:rPr lang="en-US" dirty="0" err="1"/>
               <a:t>Console.WriteLine</a:t>
@@ -30355,6 +30337,9 @@
           </a:bodyPr>
           <a:lstStyle/>
           <a:p>
+            <a:pPr marL="0" indent="0">
+              <a:buNone/>
+            </a:pPr>
             <a:r>
               <a:rPr lang="en-US" dirty="0">
                 <a:solidFill>
@@ -30409,6 +30394,9 @@
             </a:r>
           </a:p>
           <a:p>
+            <a:pPr marL="0" indent="0">
+              <a:buNone/>
+            </a:pPr>
             <a:r>
               <a:rPr lang="en-US" dirty="0" err="1">
                 <a:solidFill>
@@ -30465,6 +30453,9 @@
             <a:endParaRPr lang="en-US" dirty="0"/>
           </a:p>
           <a:p>
+            <a:pPr marL="0" indent="0">
+              <a:buNone/>
+            </a:pPr>
             <a:r>
               <a:rPr lang="en-US" dirty="0" err="1"/>
               <a:t>Console.WriteLine</a:t>
@@ -30758,6 +30749,9 @@
             <a:endParaRPr lang="en-US" dirty="0"/>
           </a:p>
           <a:p>
+            <a:pPr marL="0" indent="0">
+              <a:buNone/>
+            </a:pPr>
             <a:r>
               <a:rPr lang="en-US" dirty="0" err="1"/>
               <a:t>Console.WriteLine</a:t>
@@ -31467,6 +31461,9 @@
             <a:endParaRPr lang="en-US" dirty="0"/>
           </a:p>
           <a:p>
+            <a:pPr marL="0" indent="0">
+              <a:buNone/>
+            </a:pPr>
             <a:r>
               <a:rPr lang="en-US" dirty="0" err="1"/>
               <a:t>Console.WriteLine</a:t>

</xml_diff>

<commit_message>
Workshop (1) - slide
</commit_message>
<xml_diff>
--- a/C# Intermediate.pptx
+++ b/C# Intermediate.pptx
@@ -66,6 +66,7 @@
     <p:sldId id="317" r:id="rId60"/>
     <p:sldId id="318" r:id="rId61"/>
     <p:sldId id="319" r:id="rId62"/>
+    <p:sldId id="321" r:id="rId63"/>
   </p:sldIdLst>
   <p:sldSz cx="12192000" cy="6858000"/>
   <p:notesSz cx="6858000" cy="9144000"/>
@@ -368,7 +369,7 @@
           <a:p>
             <a:fld id="{0BD89023-946D-4914-A444-F66256F52110}" type="datetimeFigureOut">
               <a:rPr lang="bg-BG" smtClean="0"/>
-              <a:t>5.12.2022 г.</a:t>
+              <a:t>10.12.2022 г.</a:t>
             </a:fld>
             <a:endParaRPr lang="bg-BG"/>
           </a:p>
@@ -649,7 +650,7 @@
           <a:p>
             <a:fld id="{0BD89023-946D-4914-A444-F66256F52110}" type="datetimeFigureOut">
               <a:rPr lang="bg-BG" smtClean="0"/>
-              <a:t>5.12.2022 г.</a:t>
+              <a:t>10.12.2022 г.</a:t>
             </a:fld>
             <a:endParaRPr lang="bg-BG"/>
           </a:p>
@@ -841,7 +842,7 @@
           <a:p>
             <a:fld id="{0BD89023-946D-4914-A444-F66256F52110}" type="datetimeFigureOut">
               <a:rPr lang="bg-BG" smtClean="0"/>
-              <a:t>5.12.2022 г.</a:t>
+              <a:t>10.12.2022 г.</a:t>
             </a:fld>
             <a:endParaRPr lang="bg-BG"/>
           </a:p>
@@ -1102,7 +1103,7 @@
           <a:p>
             <a:fld id="{0BD89023-946D-4914-A444-F66256F52110}" type="datetimeFigureOut">
               <a:rPr lang="bg-BG" smtClean="0"/>
-              <a:t>5.12.2022 г.</a:t>
+              <a:t>10.12.2022 г.</a:t>
             </a:fld>
             <a:endParaRPr lang="bg-BG"/>
           </a:p>
@@ -1528,7 +1529,7 @@
           <a:p>
             <a:fld id="{0BD89023-946D-4914-A444-F66256F52110}" type="datetimeFigureOut">
               <a:rPr lang="bg-BG" smtClean="0"/>
-              <a:t>5.12.2022 г.</a:t>
+              <a:t>10.12.2022 г.</a:t>
             </a:fld>
             <a:endParaRPr lang="bg-BG"/>
           </a:p>
@@ -2074,7 +2075,7 @@
           <a:p>
             <a:fld id="{0BD89023-946D-4914-A444-F66256F52110}" type="datetimeFigureOut">
               <a:rPr lang="bg-BG" smtClean="0"/>
-              <a:t>5.12.2022 г.</a:t>
+              <a:t>10.12.2022 г.</a:t>
             </a:fld>
             <a:endParaRPr lang="bg-BG"/>
           </a:p>
@@ -2905,7 +2906,7 @@
           <a:p>
             <a:fld id="{0BD89023-946D-4914-A444-F66256F52110}" type="datetimeFigureOut">
               <a:rPr lang="bg-BG" smtClean="0"/>
-              <a:t>5.12.2022 г.</a:t>
+              <a:t>10.12.2022 г.</a:t>
             </a:fld>
             <a:endParaRPr lang="bg-BG"/>
           </a:p>
@@ -3075,7 +3076,7 @@
           <a:p>
             <a:fld id="{0BD89023-946D-4914-A444-F66256F52110}" type="datetimeFigureOut">
               <a:rPr lang="bg-BG" smtClean="0"/>
-              <a:t>5.12.2022 г.</a:t>
+              <a:t>10.12.2022 г.</a:t>
             </a:fld>
             <a:endParaRPr lang="bg-BG"/>
           </a:p>
@@ -3255,7 +3256,7 @@
           <a:p>
             <a:fld id="{0BD89023-946D-4914-A444-F66256F52110}" type="datetimeFigureOut">
               <a:rPr lang="bg-BG" smtClean="0"/>
-              <a:t>5.12.2022 г.</a:t>
+              <a:t>10.12.2022 г.</a:t>
             </a:fld>
             <a:endParaRPr lang="bg-BG"/>
           </a:p>
@@ -3425,7 +3426,7 @@
           <a:p>
             <a:fld id="{0BD89023-946D-4914-A444-F66256F52110}" type="datetimeFigureOut">
               <a:rPr lang="bg-BG" smtClean="0"/>
-              <a:t>5.12.2022 г.</a:t>
+              <a:t>10.12.2022 г.</a:t>
             </a:fld>
             <a:endParaRPr lang="bg-BG"/>
           </a:p>
@@ -3682,7 +3683,7 @@
           <a:p>
             <a:fld id="{0BD89023-946D-4914-A444-F66256F52110}" type="datetimeFigureOut">
               <a:rPr lang="bg-BG" smtClean="0"/>
-              <a:t>5.12.2022 г.</a:t>
+              <a:t>10.12.2022 г.</a:t>
             </a:fld>
             <a:endParaRPr lang="bg-BG"/>
           </a:p>
@@ -3914,7 +3915,7 @@
           <a:p>
             <a:fld id="{0BD89023-946D-4914-A444-F66256F52110}" type="datetimeFigureOut">
               <a:rPr lang="bg-BG" smtClean="0"/>
-              <a:t>5.12.2022 г.</a:t>
+              <a:t>10.12.2022 г.</a:t>
             </a:fld>
             <a:endParaRPr lang="bg-BG"/>
           </a:p>
@@ -4307,7 +4308,7 @@
           <a:p>
             <a:fld id="{0BD89023-946D-4914-A444-F66256F52110}" type="datetimeFigureOut">
               <a:rPr lang="bg-BG" smtClean="0"/>
-              <a:t>5.12.2022 г.</a:t>
+              <a:t>10.12.2022 г.</a:t>
             </a:fld>
             <a:endParaRPr lang="bg-BG"/>
           </a:p>
@@ -4425,7 +4426,7 @@
           <a:p>
             <a:fld id="{0BD89023-946D-4914-A444-F66256F52110}" type="datetimeFigureOut">
               <a:rPr lang="bg-BG" smtClean="0"/>
-              <a:t>5.12.2022 г.</a:t>
+              <a:t>10.12.2022 г.</a:t>
             </a:fld>
             <a:endParaRPr lang="bg-BG"/>
           </a:p>
@@ -4520,7 +4521,7 @@
           <a:p>
             <a:fld id="{0BD89023-946D-4914-A444-F66256F52110}" type="datetimeFigureOut">
               <a:rPr lang="bg-BG" smtClean="0"/>
-              <a:t>5.12.2022 г.</a:t>
+              <a:t>10.12.2022 г.</a:t>
             </a:fld>
             <a:endParaRPr lang="bg-BG"/>
           </a:p>
@@ -4793,7 +4794,7 @@
           <a:p>
             <a:fld id="{0BD89023-946D-4914-A444-F66256F52110}" type="datetimeFigureOut">
               <a:rPr lang="bg-BG" smtClean="0"/>
-              <a:t>5.12.2022 г.</a:t>
+              <a:t>10.12.2022 г.</a:t>
             </a:fld>
             <a:endParaRPr lang="bg-BG"/>
           </a:p>
@@ -5074,7 +5075,7 @@
           <a:p>
             <a:fld id="{0BD89023-946D-4914-A444-F66256F52110}" type="datetimeFigureOut">
               <a:rPr lang="bg-BG" smtClean="0"/>
-              <a:t>5.12.2022 г.</a:t>
+              <a:t>10.12.2022 г.</a:t>
             </a:fld>
             <a:endParaRPr lang="bg-BG"/>
           </a:p>
@@ -5314,7 +5315,7 @@
           <a:p>
             <a:fld id="{0BD89023-946D-4914-A444-F66256F52110}" type="datetimeFigureOut">
               <a:rPr lang="bg-BG" smtClean="0"/>
-              <a:t>5.12.2022 г.</a:t>
+              <a:t>10.12.2022 г.</a:t>
             </a:fld>
             <a:endParaRPr lang="bg-BG"/>
           </a:p>
@@ -31800,6 +31801,193 @@
     <p:extLst>
       <p:ext uri="{BB962C8B-B14F-4D97-AF65-F5344CB8AC3E}">
         <p14:creationId xmlns:p14="http://schemas.microsoft.com/office/powerpoint/2010/main" val="1045124840"/>
+      </p:ext>
+    </p:extLst>
+  </p:cSld>
+  <p:clrMapOvr>
+    <a:masterClrMapping/>
+  </p:clrMapOvr>
+</p:sld>
+</file>
+
+<file path=ppt/slides/slide62.xml><?xml version="1.0" encoding="utf-8"?>
+<p:sld xmlns:a="http://schemas.openxmlformats.org/drawingml/2006/main" xmlns:r="http://schemas.openxmlformats.org/officeDocument/2006/relationships" xmlns:p="http://schemas.openxmlformats.org/presentationml/2006/main">
+  <p:cSld>
+    <p:spTree>
+      <p:nvGrpSpPr>
+        <p:cNvPr id="1" name=""/>
+        <p:cNvGrpSpPr/>
+        <p:nvPr/>
+      </p:nvGrpSpPr>
+      <p:grpSpPr>
+        <a:xfrm>
+          <a:off x="0" y="0"/>
+          <a:ext cx="0" cy="0"/>
+          <a:chOff x="0" y="0"/>
+          <a:chExt cx="0" cy="0"/>
+        </a:xfrm>
+      </p:grpSpPr>
+      <p:sp>
+        <p:nvSpPr>
+          <p:cNvPr id="2" name="Заглавие 1">
+            <a:extLst>
+              <a:ext uri="{FF2B5EF4-FFF2-40B4-BE49-F238E27FC236}">
+                <a16:creationId xmlns:a16="http://schemas.microsoft.com/office/drawing/2014/main" id="{0636EA0E-1E15-903E-FD03-C14A71869D4B}"/>
+              </a:ext>
+            </a:extLst>
+          </p:cNvPr>
+          <p:cNvSpPr>
+            <a:spLocks noGrp="1"/>
+          </p:cNvSpPr>
+          <p:nvPr>
+            <p:ph type="title"/>
+          </p:nvPr>
+        </p:nvSpPr>
+        <p:spPr/>
+        <p:txBody>
+          <a:bodyPr/>
+          <a:lstStyle/>
+          <a:p>
+            <a:pPr algn="ctr"/>
+            <a:r>
+              <a:rPr lang="en-US" dirty="0" err="1">
+                <a:latin typeface="Arial" panose="020B0604020202020204" pitchFamily="34" charset="0"/>
+                <a:cs typeface="Arial" panose="020B0604020202020204" pitchFamily="34" charset="0"/>
+              </a:rPr>
+              <a:t>WorkShop</a:t>
+            </a:r>
+            <a:r>
+              <a:rPr lang="en-US" dirty="0">
+                <a:latin typeface="Arial" panose="020B0604020202020204" pitchFamily="34" charset="0"/>
+                <a:cs typeface="Arial" panose="020B0604020202020204" pitchFamily="34" charset="0"/>
+              </a:rPr>
+              <a:t> (1)</a:t>
+            </a:r>
+          </a:p>
+        </p:txBody>
+      </p:sp>
+      <p:sp>
+        <p:nvSpPr>
+          <p:cNvPr id="3" name="Контейнер за съдържание 2">
+            <a:extLst>
+              <a:ext uri="{FF2B5EF4-FFF2-40B4-BE49-F238E27FC236}">
+                <a16:creationId xmlns:a16="http://schemas.microsoft.com/office/drawing/2014/main" id="{FA413057-95B4-4EEE-F993-AD4CDC04789E}"/>
+              </a:ext>
+            </a:extLst>
+          </p:cNvPr>
+          <p:cNvSpPr>
+            <a:spLocks noGrp="1"/>
+          </p:cNvSpPr>
+          <p:nvPr>
+            <p:ph idx="1"/>
+          </p:nvPr>
+        </p:nvSpPr>
+        <p:spPr/>
+        <p:txBody>
+          <a:bodyPr/>
+          <a:lstStyle/>
+          <a:p>
+            <a:r>
+              <a:rPr lang="bg-BG" dirty="0">
+                <a:latin typeface="Arial" panose="020B0604020202020204" pitchFamily="34" charset="0"/>
+                <a:cs typeface="Arial" panose="020B0604020202020204" pitchFamily="34" charset="0"/>
+              </a:rPr>
+              <a:t>Работа с методи (</a:t>
+            </a:r>
+            <a:r>
+              <a:rPr lang="en-US" dirty="0">
+                <a:latin typeface="Arial" panose="020B0604020202020204" pitchFamily="34" charset="0"/>
+                <a:cs typeface="Arial" panose="020B0604020202020204" pitchFamily="34" charset="0"/>
+              </a:rPr>
+              <a:t>void </a:t>
+            </a:r>
+            <a:r>
+              <a:rPr lang="bg-BG" dirty="0">
+                <a:latin typeface="Arial" panose="020B0604020202020204" pitchFamily="34" charset="0"/>
+                <a:cs typeface="Arial" panose="020B0604020202020204" pitchFamily="34" charset="0"/>
+              </a:rPr>
+              <a:t>и с </a:t>
+            </a:r>
+            <a:r>
+              <a:rPr lang="en-US" dirty="0">
+                <a:latin typeface="Arial" panose="020B0604020202020204" pitchFamily="34" charset="0"/>
+                <a:cs typeface="Arial" panose="020B0604020202020204" pitchFamily="34" charset="0"/>
+              </a:rPr>
+              <a:t>return type</a:t>
+            </a:r>
+            <a:r>
+              <a:rPr lang="bg-BG" dirty="0">
+                <a:latin typeface="Arial" panose="020B0604020202020204" pitchFamily="34" charset="0"/>
+                <a:cs typeface="Arial" panose="020B0604020202020204" pitchFamily="34" charset="0"/>
+              </a:rPr>
+              <a:t>)</a:t>
+            </a:r>
+            <a:endParaRPr lang="en-US" dirty="0">
+              <a:latin typeface="Arial" panose="020B0604020202020204" pitchFamily="34" charset="0"/>
+              <a:cs typeface="Arial" panose="020B0604020202020204" pitchFamily="34" charset="0"/>
+            </a:endParaRPr>
+          </a:p>
+          <a:p>
+            <a:r>
+              <a:rPr lang="bg-BG" dirty="0">
+                <a:latin typeface="Arial" panose="020B0604020202020204" pitchFamily="34" charset="0"/>
+                <a:cs typeface="Arial" panose="020B0604020202020204" pitchFamily="34" charset="0"/>
+              </a:rPr>
+              <a:t>Работа с масиви</a:t>
+            </a:r>
+          </a:p>
+          <a:p>
+            <a:r>
+              <a:rPr lang="bg-BG" dirty="0">
+                <a:latin typeface="Arial" panose="020B0604020202020204" pitchFamily="34" charset="0"/>
+                <a:cs typeface="Arial" panose="020B0604020202020204" pitchFamily="34" charset="0"/>
+              </a:rPr>
+              <a:t>Работа с листове (списъци)</a:t>
+            </a:r>
+          </a:p>
+          <a:p>
+            <a:r>
+              <a:rPr lang="bg-BG" dirty="0">
+                <a:latin typeface="Arial" panose="020B0604020202020204" pitchFamily="34" charset="0"/>
+                <a:cs typeface="Arial" panose="020B0604020202020204" pitchFamily="34" charset="0"/>
+              </a:rPr>
+              <a:t>Работа с асоциативни масиви</a:t>
+            </a:r>
+          </a:p>
+          <a:p>
+            <a:r>
+              <a:rPr lang="bg-BG" dirty="0">
+                <a:latin typeface="Arial" panose="020B0604020202020204" pitchFamily="34" charset="0"/>
+                <a:cs typeface="Arial" panose="020B0604020202020204" pitchFamily="34" charset="0"/>
+              </a:rPr>
+              <a:t>Работа с </a:t>
+            </a:r>
+            <a:r>
+              <a:rPr lang="en-US" dirty="0">
+                <a:latin typeface="Arial" panose="020B0604020202020204" pitchFamily="34" charset="0"/>
+                <a:cs typeface="Arial" panose="020B0604020202020204" pitchFamily="34" charset="0"/>
+              </a:rPr>
+              <a:t>LINQ</a:t>
+            </a:r>
+          </a:p>
+          <a:p>
+            <a:r>
+              <a:rPr lang="bg-BG" dirty="0">
+                <a:latin typeface="Arial" panose="020B0604020202020204" pitchFamily="34" charset="0"/>
+                <a:cs typeface="Arial" panose="020B0604020202020204" pitchFamily="34" charset="0"/>
+              </a:rPr>
+              <a:t>Работа с текст</a:t>
+            </a:r>
+          </a:p>
+          <a:p>
+            <a:endParaRPr lang="en-US" dirty="0"/>
+          </a:p>
+        </p:txBody>
+      </p:sp>
+    </p:spTree>
+    <p:extLst>
+      <p:ext uri="{BB962C8B-B14F-4D97-AF65-F5344CB8AC3E}">
+        <p14:creationId xmlns:p14="http://schemas.microsoft.com/office/powerpoint/2010/main" val="825301493"/>
       </p:ext>
     </p:extLst>
   </p:cSld>

</xml_diff>

<commit_message>
Structs tutorial - done
</commit_message>
<xml_diff>
--- a/C# Intermediate.pptx
+++ b/C# Intermediate.pptx
@@ -76,6 +76,12 @@
     <p:sldId id="327" r:id="rId70"/>
     <p:sldId id="329" r:id="rId71"/>
     <p:sldId id="330" r:id="rId72"/>
+    <p:sldId id="331" r:id="rId73"/>
+    <p:sldId id="332" r:id="rId74"/>
+    <p:sldId id="333" r:id="rId75"/>
+    <p:sldId id="334" r:id="rId76"/>
+    <p:sldId id="335" r:id="rId77"/>
+    <p:sldId id="336" r:id="rId78"/>
   </p:sldIdLst>
   <p:sldSz cx="12192000" cy="6858000"/>
   <p:notesSz cx="6858000" cy="9144000"/>
@@ -378,7 +384,7 @@
           <a:p>
             <a:fld id="{0BD89023-946D-4914-A444-F66256F52110}" type="datetimeFigureOut">
               <a:rPr lang="bg-BG" smtClean="0"/>
-              <a:t>7.1.2023 г.</a:t>
+              <a:t>12.1.2023 г.</a:t>
             </a:fld>
             <a:endParaRPr lang="bg-BG"/>
           </a:p>
@@ -659,7 +665,7 @@
           <a:p>
             <a:fld id="{0BD89023-946D-4914-A444-F66256F52110}" type="datetimeFigureOut">
               <a:rPr lang="bg-BG" smtClean="0"/>
-              <a:t>7.1.2023 г.</a:t>
+              <a:t>12.1.2023 г.</a:t>
             </a:fld>
             <a:endParaRPr lang="bg-BG"/>
           </a:p>
@@ -851,7 +857,7 @@
           <a:p>
             <a:fld id="{0BD89023-946D-4914-A444-F66256F52110}" type="datetimeFigureOut">
               <a:rPr lang="bg-BG" smtClean="0"/>
-              <a:t>7.1.2023 г.</a:t>
+              <a:t>12.1.2023 г.</a:t>
             </a:fld>
             <a:endParaRPr lang="bg-BG"/>
           </a:p>
@@ -1112,7 +1118,7 @@
           <a:p>
             <a:fld id="{0BD89023-946D-4914-A444-F66256F52110}" type="datetimeFigureOut">
               <a:rPr lang="bg-BG" smtClean="0"/>
-              <a:t>7.1.2023 г.</a:t>
+              <a:t>12.1.2023 г.</a:t>
             </a:fld>
             <a:endParaRPr lang="bg-BG"/>
           </a:p>
@@ -1538,7 +1544,7 @@
           <a:p>
             <a:fld id="{0BD89023-946D-4914-A444-F66256F52110}" type="datetimeFigureOut">
               <a:rPr lang="bg-BG" smtClean="0"/>
-              <a:t>7.1.2023 г.</a:t>
+              <a:t>12.1.2023 г.</a:t>
             </a:fld>
             <a:endParaRPr lang="bg-BG"/>
           </a:p>
@@ -2084,7 +2090,7 @@
           <a:p>
             <a:fld id="{0BD89023-946D-4914-A444-F66256F52110}" type="datetimeFigureOut">
               <a:rPr lang="bg-BG" smtClean="0"/>
-              <a:t>7.1.2023 г.</a:t>
+              <a:t>12.1.2023 г.</a:t>
             </a:fld>
             <a:endParaRPr lang="bg-BG"/>
           </a:p>
@@ -2915,7 +2921,7 @@
           <a:p>
             <a:fld id="{0BD89023-946D-4914-A444-F66256F52110}" type="datetimeFigureOut">
               <a:rPr lang="bg-BG" smtClean="0"/>
-              <a:t>7.1.2023 г.</a:t>
+              <a:t>12.1.2023 г.</a:t>
             </a:fld>
             <a:endParaRPr lang="bg-BG"/>
           </a:p>
@@ -3085,7 +3091,7 @@
           <a:p>
             <a:fld id="{0BD89023-946D-4914-A444-F66256F52110}" type="datetimeFigureOut">
               <a:rPr lang="bg-BG" smtClean="0"/>
-              <a:t>7.1.2023 г.</a:t>
+              <a:t>12.1.2023 г.</a:t>
             </a:fld>
             <a:endParaRPr lang="bg-BG"/>
           </a:p>
@@ -3265,7 +3271,7 @@
           <a:p>
             <a:fld id="{0BD89023-946D-4914-A444-F66256F52110}" type="datetimeFigureOut">
               <a:rPr lang="bg-BG" smtClean="0"/>
-              <a:t>7.1.2023 г.</a:t>
+              <a:t>12.1.2023 г.</a:t>
             </a:fld>
             <a:endParaRPr lang="bg-BG"/>
           </a:p>
@@ -3435,7 +3441,7 @@
           <a:p>
             <a:fld id="{0BD89023-946D-4914-A444-F66256F52110}" type="datetimeFigureOut">
               <a:rPr lang="bg-BG" smtClean="0"/>
-              <a:t>7.1.2023 г.</a:t>
+              <a:t>12.1.2023 г.</a:t>
             </a:fld>
             <a:endParaRPr lang="bg-BG"/>
           </a:p>
@@ -3692,7 +3698,7 @@
           <a:p>
             <a:fld id="{0BD89023-946D-4914-A444-F66256F52110}" type="datetimeFigureOut">
               <a:rPr lang="bg-BG" smtClean="0"/>
-              <a:t>7.1.2023 г.</a:t>
+              <a:t>12.1.2023 г.</a:t>
             </a:fld>
             <a:endParaRPr lang="bg-BG"/>
           </a:p>
@@ -3924,7 +3930,7 @@
           <a:p>
             <a:fld id="{0BD89023-946D-4914-A444-F66256F52110}" type="datetimeFigureOut">
               <a:rPr lang="bg-BG" smtClean="0"/>
-              <a:t>7.1.2023 г.</a:t>
+              <a:t>12.1.2023 г.</a:t>
             </a:fld>
             <a:endParaRPr lang="bg-BG"/>
           </a:p>
@@ -4317,7 +4323,7 @@
           <a:p>
             <a:fld id="{0BD89023-946D-4914-A444-F66256F52110}" type="datetimeFigureOut">
               <a:rPr lang="bg-BG" smtClean="0"/>
-              <a:t>7.1.2023 г.</a:t>
+              <a:t>12.1.2023 г.</a:t>
             </a:fld>
             <a:endParaRPr lang="bg-BG"/>
           </a:p>
@@ -4435,7 +4441,7 @@
           <a:p>
             <a:fld id="{0BD89023-946D-4914-A444-F66256F52110}" type="datetimeFigureOut">
               <a:rPr lang="bg-BG" smtClean="0"/>
-              <a:t>7.1.2023 г.</a:t>
+              <a:t>12.1.2023 г.</a:t>
             </a:fld>
             <a:endParaRPr lang="bg-BG"/>
           </a:p>
@@ -4530,7 +4536,7 @@
           <a:p>
             <a:fld id="{0BD89023-946D-4914-A444-F66256F52110}" type="datetimeFigureOut">
               <a:rPr lang="bg-BG" smtClean="0"/>
-              <a:t>7.1.2023 г.</a:t>
+              <a:t>12.1.2023 г.</a:t>
             </a:fld>
             <a:endParaRPr lang="bg-BG"/>
           </a:p>
@@ -4803,7 +4809,7 @@
           <a:p>
             <a:fld id="{0BD89023-946D-4914-A444-F66256F52110}" type="datetimeFigureOut">
               <a:rPr lang="bg-BG" smtClean="0"/>
-              <a:t>7.1.2023 г.</a:t>
+              <a:t>12.1.2023 г.</a:t>
             </a:fld>
             <a:endParaRPr lang="bg-BG"/>
           </a:p>
@@ -5084,7 +5090,7 @@
           <a:p>
             <a:fld id="{0BD89023-946D-4914-A444-F66256F52110}" type="datetimeFigureOut">
               <a:rPr lang="bg-BG" smtClean="0"/>
-              <a:t>7.1.2023 г.</a:t>
+              <a:t>12.1.2023 г.</a:t>
             </a:fld>
             <a:endParaRPr lang="bg-BG"/>
           </a:p>
@@ -5324,7 +5330,7 @@
           <a:p>
             <a:fld id="{0BD89023-946D-4914-A444-F66256F52110}" type="datetimeFigureOut">
               <a:rPr lang="bg-BG" smtClean="0"/>
-              <a:t>7.1.2023 г.</a:t>
+              <a:t>12.1.2023 г.</a:t>
             </a:fld>
             <a:endParaRPr lang="bg-BG"/>
           </a:p>
@@ -36161,6 +36167,1783 @@
     <p:extLst>
       <p:ext uri="{BB962C8B-B14F-4D97-AF65-F5344CB8AC3E}">
         <p14:creationId xmlns:p14="http://schemas.microsoft.com/office/powerpoint/2010/main" val="3647820106"/>
+      </p:ext>
+    </p:extLst>
+  </p:cSld>
+  <p:clrMapOvr>
+    <a:masterClrMapping/>
+  </p:clrMapOvr>
+</p:sld>
+</file>
+
+<file path=ppt/slides/slide72.xml><?xml version="1.0" encoding="utf-8"?>
+<p:sld xmlns:a="http://schemas.openxmlformats.org/drawingml/2006/main" xmlns:r="http://schemas.openxmlformats.org/officeDocument/2006/relationships" xmlns:p="http://schemas.openxmlformats.org/presentationml/2006/main">
+  <p:cSld>
+    <p:spTree>
+      <p:nvGrpSpPr>
+        <p:cNvPr id="1" name=""/>
+        <p:cNvGrpSpPr/>
+        <p:nvPr/>
+      </p:nvGrpSpPr>
+      <p:grpSpPr>
+        <a:xfrm>
+          <a:off x="0" y="0"/>
+          <a:ext cx="0" cy="0"/>
+          <a:chOff x="0" y="0"/>
+          <a:chExt cx="0" cy="0"/>
+        </a:xfrm>
+      </p:grpSpPr>
+      <p:sp>
+        <p:nvSpPr>
+          <p:cNvPr id="2" name="Title 1">
+            <a:extLst>
+              <a:ext uri="{FF2B5EF4-FFF2-40B4-BE49-F238E27FC236}">
+                <a16:creationId xmlns:a16="http://schemas.microsoft.com/office/drawing/2014/main" id="{832359AC-BB8B-C928-C34A-B3904A48C218}"/>
+              </a:ext>
+            </a:extLst>
+          </p:cNvPr>
+          <p:cNvSpPr>
+            <a:spLocks noGrp="1"/>
+          </p:cNvSpPr>
+          <p:nvPr>
+            <p:ph type="title"/>
+          </p:nvPr>
+        </p:nvSpPr>
+        <p:spPr/>
+        <p:txBody>
+          <a:bodyPr/>
+          <a:lstStyle/>
+          <a:p>
+            <a:pPr algn="ctr"/>
+            <a:r>
+              <a:rPr lang="bg-BG" dirty="0">
+                <a:latin typeface="Arial" panose="020B0604020202020204" pitchFamily="34" charset="0"/>
+                <a:cs typeface="Arial" panose="020B0604020202020204" pitchFamily="34" charset="0"/>
+              </a:rPr>
+              <a:t>Структури (</a:t>
+            </a:r>
+            <a:r>
+              <a:rPr lang="en-US" dirty="0">
+                <a:solidFill>
+                  <a:srgbClr val="FFFF00"/>
+                </a:solidFill>
+                <a:latin typeface="Arial" panose="020B0604020202020204" pitchFamily="34" charset="0"/>
+                <a:cs typeface="Arial" panose="020B0604020202020204" pitchFamily="34" charset="0"/>
+              </a:rPr>
+              <a:t>structures</a:t>
+            </a:r>
+            <a:r>
+              <a:rPr lang="bg-BG" dirty="0">
+                <a:latin typeface="Arial" panose="020B0604020202020204" pitchFamily="34" charset="0"/>
+                <a:cs typeface="Arial" panose="020B0604020202020204" pitchFamily="34" charset="0"/>
+              </a:rPr>
+              <a:t>)</a:t>
+            </a:r>
+          </a:p>
+        </p:txBody>
+      </p:sp>
+      <p:sp>
+        <p:nvSpPr>
+          <p:cNvPr id="3" name="Content Placeholder 2">
+            <a:extLst>
+              <a:ext uri="{FF2B5EF4-FFF2-40B4-BE49-F238E27FC236}">
+                <a16:creationId xmlns:a16="http://schemas.microsoft.com/office/drawing/2014/main" id="{E0DC1A77-D08E-E895-6F87-9D87DA0F6A98}"/>
+              </a:ext>
+            </a:extLst>
+          </p:cNvPr>
+          <p:cNvSpPr>
+            <a:spLocks noGrp="1"/>
+          </p:cNvSpPr>
+          <p:nvPr>
+            <p:ph idx="1"/>
+          </p:nvPr>
+        </p:nvSpPr>
+        <p:spPr/>
+        <p:txBody>
+          <a:bodyPr/>
+          <a:lstStyle/>
+          <a:p>
+            <a:r>
+              <a:rPr lang="bg-BG" dirty="0">
+                <a:latin typeface="Arial" panose="020B0604020202020204" pitchFamily="34" charset="0"/>
+                <a:cs typeface="Arial" panose="020B0604020202020204" pitchFamily="34" charset="0"/>
+              </a:rPr>
+              <a:t>Структурите са композитен тип данни, който съдържа в себе си данни от друг тип. </a:t>
+            </a:r>
+          </a:p>
+          <a:p>
+            <a:pPr algn="ctr"/>
+            <a:endParaRPr lang="bg-BG" dirty="0">
+              <a:latin typeface="Arial" panose="020B0604020202020204" pitchFamily="34" charset="0"/>
+              <a:cs typeface="Arial" panose="020B0604020202020204" pitchFamily="34" charset="0"/>
+            </a:endParaRPr>
+          </a:p>
+          <a:p>
+            <a:r>
+              <a:rPr lang="bg-BG" dirty="0">
+                <a:latin typeface="Arial" panose="020B0604020202020204" pitchFamily="34" charset="0"/>
+                <a:cs typeface="Arial" panose="020B0604020202020204" pitchFamily="34" charset="0"/>
+              </a:rPr>
+              <a:t>Структурите са </a:t>
+            </a:r>
+            <a:r>
+              <a:rPr lang="en-US" dirty="0">
+                <a:solidFill>
+                  <a:srgbClr val="FFFF00"/>
+                </a:solidFill>
+                <a:latin typeface="Arial" panose="020B0604020202020204" pitchFamily="34" charset="0"/>
+                <a:cs typeface="Arial" panose="020B0604020202020204" pitchFamily="34" charset="0"/>
+              </a:rPr>
+              <a:t>value type </a:t>
+            </a:r>
+            <a:r>
+              <a:rPr lang="en-US" dirty="0">
+                <a:latin typeface="Arial" panose="020B0604020202020204" pitchFamily="34" charset="0"/>
+                <a:cs typeface="Arial" panose="020B0604020202020204" pitchFamily="34" charset="0"/>
+              </a:rPr>
+              <a:t>(</a:t>
+            </a:r>
+            <a:r>
+              <a:rPr lang="bg-BG" dirty="0">
+                <a:latin typeface="Arial" panose="020B0604020202020204" pitchFamily="34" charset="0"/>
+                <a:cs typeface="Arial" panose="020B0604020202020204" pitchFamily="34" charset="0"/>
+              </a:rPr>
+              <a:t>стойностен тип</a:t>
+            </a:r>
+            <a:r>
+              <a:rPr lang="en-US" dirty="0">
+                <a:latin typeface="Arial" panose="020B0604020202020204" pitchFamily="34" charset="0"/>
+                <a:cs typeface="Arial" panose="020B0604020202020204" pitchFamily="34" charset="0"/>
+              </a:rPr>
+              <a:t>)</a:t>
+            </a:r>
+            <a:r>
+              <a:rPr lang="bg-BG" dirty="0">
+                <a:latin typeface="Arial" panose="020B0604020202020204" pitchFamily="34" charset="0"/>
+                <a:cs typeface="Arial" panose="020B0604020202020204" pitchFamily="34" charset="0"/>
+              </a:rPr>
+              <a:t>, а </a:t>
+            </a:r>
+            <a:r>
+              <a:rPr lang="bg-BG" dirty="0">
+                <a:solidFill>
+                  <a:srgbClr val="FF0000"/>
+                </a:solidFill>
+                <a:latin typeface="Arial" panose="020B0604020202020204" pitchFamily="34" charset="0"/>
+                <a:cs typeface="Arial" panose="020B0604020202020204" pitchFamily="34" charset="0"/>
+              </a:rPr>
+              <a:t>НЕ</a:t>
+            </a:r>
+            <a:r>
+              <a:rPr lang="bg-BG" dirty="0">
+                <a:latin typeface="Arial" panose="020B0604020202020204" pitchFamily="34" charset="0"/>
+                <a:cs typeface="Arial" panose="020B0604020202020204" pitchFamily="34" charset="0"/>
+              </a:rPr>
+              <a:t> референтен тип.</a:t>
+            </a:r>
+          </a:p>
+          <a:p>
+            <a:endParaRPr lang="bg-BG" dirty="0">
+              <a:latin typeface="Arial" panose="020B0604020202020204" pitchFamily="34" charset="0"/>
+              <a:cs typeface="Arial" panose="020B0604020202020204" pitchFamily="34" charset="0"/>
+            </a:endParaRPr>
+          </a:p>
+          <a:p>
+            <a:pPr>
+              <a:buClr>
+                <a:schemeClr val="tx1"/>
+              </a:buClr>
+            </a:pPr>
+            <a:r>
+              <a:rPr lang="bg-BG" dirty="0">
+                <a:solidFill>
+                  <a:srgbClr val="FFFF00"/>
+                </a:solidFill>
+                <a:latin typeface="Arial" panose="020B0604020202020204" pitchFamily="34" charset="0"/>
+                <a:cs typeface="Arial" panose="020B0604020202020204" pitchFamily="34" charset="0"/>
+              </a:rPr>
+              <a:t>Инстанциите</a:t>
+            </a:r>
+            <a:r>
+              <a:rPr lang="bg-BG" dirty="0">
+                <a:latin typeface="Arial" panose="020B0604020202020204" pitchFamily="34" charset="0"/>
+                <a:cs typeface="Arial" panose="020B0604020202020204" pitchFamily="34" charset="0"/>
+              </a:rPr>
+              <a:t> на структурите се създават в </a:t>
+            </a:r>
+            <a:r>
+              <a:rPr lang="en-US" dirty="0">
+                <a:solidFill>
+                  <a:srgbClr val="FFFF00"/>
+                </a:solidFill>
+                <a:latin typeface="Arial" panose="020B0604020202020204" pitchFamily="34" charset="0"/>
+                <a:cs typeface="Arial" panose="020B0604020202020204" pitchFamily="34" charset="0"/>
+              </a:rPr>
+              <a:t>stack-</a:t>
+            </a:r>
+            <a:r>
+              <a:rPr lang="bg-BG" dirty="0">
+                <a:solidFill>
+                  <a:srgbClr val="FFFF00"/>
+                </a:solidFill>
+                <a:latin typeface="Arial" panose="020B0604020202020204" pitchFamily="34" charset="0"/>
+                <a:cs typeface="Arial" panose="020B0604020202020204" pitchFamily="34" charset="0"/>
+              </a:rPr>
+              <a:t>а</a:t>
+            </a:r>
+            <a:r>
+              <a:rPr lang="bg-BG" dirty="0">
+                <a:latin typeface="Arial" panose="020B0604020202020204" pitchFamily="34" charset="0"/>
+                <a:cs typeface="Arial" panose="020B0604020202020204" pitchFamily="34" charset="0"/>
+              </a:rPr>
+              <a:t>, а не в </a:t>
+            </a:r>
+            <a:r>
+              <a:rPr lang="en-US" dirty="0">
+                <a:latin typeface="Arial" panose="020B0604020202020204" pitchFamily="34" charset="0"/>
+                <a:cs typeface="Arial" panose="020B0604020202020204" pitchFamily="34" charset="0"/>
+              </a:rPr>
+              <a:t>heap-</a:t>
+            </a:r>
+            <a:r>
+              <a:rPr lang="bg-BG" dirty="0">
+                <a:latin typeface="Arial" panose="020B0604020202020204" pitchFamily="34" charset="0"/>
+                <a:cs typeface="Arial" panose="020B0604020202020204" pitchFamily="34" charset="0"/>
+              </a:rPr>
+              <a:t>а</a:t>
+            </a:r>
+          </a:p>
+        </p:txBody>
+      </p:sp>
+    </p:spTree>
+    <p:extLst>
+      <p:ext uri="{BB962C8B-B14F-4D97-AF65-F5344CB8AC3E}">
+        <p14:creationId xmlns:p14="http://schemas.microsoft.com/office/powerpoint/2010/main" val="327252299"/>
+      </p:ext>
+    </p:extLst>
+  </p:cSld>
+  <p:clrMapOvr>
+    <a:masterClrMapping/>
+  </p:clrMapOvr>
+</p:sld>
+</file>
+
+<file path=ppt/slides/slide73.xml><?xml version="1.0" encoding="utf-8"?>
+<p:sld xmlns:a="http://schemas.openxmlformats.org/drawingml/2006/main" xmlns:r="http://schemas.openxmlformats.org/officeDocument/2006/relationships" xmlns:p="http://schemas.openxmlformats.org/presentationml/2006/main">
+  <p:cSld>
+    <p:spTree>
+      <p:nvGrpSpPr>
+        <p:cNvPr id="1" name=""/>
+        <p:cNvGrpSpPr/>
+        <p:nvPr/>
+      </p:nvGrpSpPr>
+      <p:grpSpPr>
+        <a:xfrm>
+          <a:off x="0" y="0"/>
+          <a:ext cx="0" cy="0"/>
+          <a:chOff x="0" y="0"/>
+          <a:chExt cx="0" cy="0"/>
+        </a:xfrm>
+      </p:grpSpPr>
+      <p:sp>
+        <p:nvSpPr>
+          <p:cNvPr id="2" name="Title 1">
+            <a:extLst>
+              <a:ext uri="{FF2B5EF4-FFF2-40B4-BE49-F238E27FC236}">
+                <a16:creationId xmlns:a16="http://schemas.microsoft.com/office/drawing/2014/main" id="{D84997C2-9D7C-ADD8-DF79-AD9306F9E4CC}"/>
+              </a:ext>
+            </a:extLst>
+          </p:cNvPr>
+          <p:cNvSpPr>
+            <a:spLocks noGrp="1"/>
+          </p:cNvSpPr>
+          <p:nvPr>
+            <p:ph type="title"/>
+          </p:nvPr>
+        </p:nvSpPr>
+        <p:spPr/>
+        <p:txBody>
+          <a:bodyPr/>
+          <a:lstStyle/>
+          <a:p>
+            <a:pPr algn="ctr"/>
+            <a:r>
+              <a:rPr lang="bg-BG" dirty="0">
+                <a:solidFill>
+                  <a:schemeClr val="tx1"/>
+                </a:solidFill>
+                <a:latin typeface="Arial" panose="020B0604020202020204" pitchFamily="34" charset="0"/>
+                <a:cs typeface="Arial" panose="020B0604020202020204" pitchFamily="34" charset="0"/>
+              </a:rPr>
+              <a:t>Пример за структура</a:t>
+            </a:r>
+            <a:r>
+              <a:rPr lang="en-US" dirty="0">
+                <a:solidFill>
+                  <a:schemeClr val="tx1"/>
+                </a:solidFill>
+                <a:latin typeface="Arial" panose="020B0604020202020204" pitchFamily="34" charset="0"/>
+                <a:cs typeface="Arial" panose="020B0604020202020204" pitchFamily="34" charset="0"/>
+              </a:rPr>
+              <a:t> </a:t>
+            </a:r>
+            <a:r>
+              <a:rPr lang="bg-BG" dirty="0">
+                <a:solidFill>
+                  <a:schemeClr val="tx1"/>
+                </a:solidFill>
+                <a:latin typeface="Arial" panose="020B0604020202020204" pitchFamily="34" charset="0"/>
+                <a:cs typeface="Arial" panose="020B0604020202020204" pitchFamily="34" charset="0"/>
+              </a:rPr>
+              <a:t>и клас</a:t>
+            </a:r>
+          </a:p>
+        </p:txBody>
+      </p:sp>
+      <p:sp>
+        <p:nvSpPr>
+          <p:cNvPr id="4" name="Content Placeholder 3">
+            <a:extLst>
+              <a:ext uri="{FF2B5EF4-FFF2-40B4-BE49-F238E27FC236}">
+                <a16:creationId xmlns:a16="http://schemas.microsoft.com/office/drawing/2014/main" id="{BC54C566-3771-EAD9-620E-2F083E928BB2}"/>
+              </a:ext>
+            </a:extLst>
+          </p:cNvPr>
+          <p:cNvSpPr txBox="1">
+            <a:spLocks noGrp="1"/>
+          </p:cNvSpPr>
+          <p:nvPr>
+            <p:ph idx="1"/>
+          </p:nvPr>
+        </p:nvSpPr>
+        <p:spPr>
+          <a:xfrm>
+            <a:off x="838200" y="1661389"/>
+            <a:ext cx="4857205" cy="6203237"/>
+          </a:xfrm>
+          <a:prstGeom prst="rect">
+            <a:avLst/>
+          </a:prstGeom>
+          <a:noFill/>
+        </p:spPr>
+        <p:txBody>
+          <a:bodyPr wrap="square">
+            <a:spAutoFit/>
+          </a:bodyPr>
+          <a:lstStyle/>
+          <a:p>
+            <a:pPr marL="0" indent="0">
+              <a:buNone/>
+            </a:pPr>
+            <a:r>
+              <a:rPr lang="en-US" dirty="0">
+                <a:solidFill>
+                  <a:srgbClr val="FFFF00"/>
+                </a:solidFill>
+                <a:latin typeface="Console"/>
+              </a:rPr>
+              <a:t>struct</a:t>
+            </a:r>
+            <a:r>
+              <a:rPr lang="en-US" dirty="0">
+                <a:latin typeface="Console"/>
+              </a:rPr>
+              <a:t> </a:t>
+            </a:r>
+            <a:r>
+              <a:rPr lang="en-US" dirty="0">
+                <a:solidFill>
+                  <a:srgbClr val="92D050"/>
+                </a:solidFill>
+                <a:latin typeface="Console"/>
+              </a:rPr>
+              <a:t>Point</a:t>
+            </a:r>
+            <a:r>
+              <a:rPr lang="bg-BG" dirty="0">
+                <a:solidFill>
+                  <a:srgbClr val="92D050"/>
+                </a:solidFill>
+                <a:latin typeface="Console"/>
+              </a:rPr>
+              <a:t>				</a:t>
+            </a:r>
+            <a:endParaRPr lang="en-US" dirty="0">
+              <a:solidFill>
+                <a:srgbClr val="92D050"/>
+              </a:solidFill>
+              <a:latin typeface="Console"/>
+            </a:endParaRPr>
+          </a:p>
+          <a:p>
+            <a:pPr marL="0" indent="0">
+              <a:buNone/>
+            </a:pPr>
+            <a:r>
+              <a:rPr lang="en-US" dirty="0">
+                <a:latin typeface="Console"/>
+              </a:rPr>
+              <a:t> {</a:t>
+            </a:r>
+          </a:p>
+          <a:p>
+            <a:pPr marL="0" indent="0">
+              <a:buNone/>
+            </a:pPr>
+            <a:r>
+              <a:rPr lang="en-US" dirty="0">
+                <a:latin typeface="Console"/>
+              </a:rPr>
+              <a:t>        </a:t>
+            </a:r>
+            <a:r>
+              <a:rPr lang="en-US" dirty="0">
+                <a:solidFill>
+                  <a:schemeClr val="tx2">
+                    <a:lumMod val="75000"/>
+                  </a:schemeClr>
+                </a:solidFill>
+                <a:latin typeface="Console"/>
+              </a:rPr>
+              <a:t>private</a:t>
+            </a:r>
+            <a:r>
+              <a:rPr lang="en-US" dirty="0">
+                <a:solidFill>
+                  <a:srgbClr val="FFC000"/>
+                </a:solidFill>
+                <a:latin typeface="Console"/>
+                <a:cs typeface="Arial" panose="020B0604020202020204" pitchFamily="34" charset="0"/>
+              </a:rPr>
+              <a:t> </a:t>
+            </a:r>
+            <a:r>
+              <a:rPr lang="en-US" dirty="0">
+                <a:solidFill>
+                  <a:schemeClr val="tx1"/>
+                </a:solidFill>
+                <a:latin typeface="Console"/>
+              </a:rPr>
+              <a:t>int</a:t>
+            </a:r>
+            <a:r>
+              <a:rPr lang="en-US" dirty="0">
+                <a:latin typeface="Console"/>
+              </a:rPr>
+              <a:t> </a:t>
+            </a:r>
+            <a:r>
+              <a:rPr lang="en-US" dirty="0">
+                <a:solidFill>
+                  <a:schemeClr val="accent2">
+                    <a:lumMod val="75000"/>
+                  </a:schemeClr>
+                </a:solidFill>
+                <a:latin typeface="Console"/>
+              </a:rPr>
+              <a:t>_x</a:t>
+            </a:r>
+            <a:r>
+              <a:rPr lang="en-US" dirty="0">
+                <a:latin typeface="Console"/>
+              </a:rPr>
+              <a:t>;	</a:t>
+            </a:r>
+          </a:p>
+          <a:p>
+            <a:pPr marL="0" indent="0">
+              <a:buNone/>
+            </a:pPr>
+            <a:r>
+              <a:rPr lang="en-US" dirty="0">
+                <a:latin typeface="Console"/>
+              </a:rPr>
+              <a:t>        </a:t>
+            </a:r>
+            <a:r>
+              <a:rPr lang="en-US" dirty="0">
+                <a:solidFill>
+                  <a:schemeClr val="tx2">
+                    <a:lumMod val="75000"/>
+                  </a:schemeClr>
+                </a:solidFill>
+                <a:latin typeface="Console"/>
+              </a:rPr>
+              <a:t>private</a:t>
+            </a:r>
+            <a:r>
+              <a:rPr lang="en-US" dirty="0">
+                <a:solidFill>
+                  <a:srgbClr val="FFC000"/>
+                </a:solidFill>
+                <a:latin typeface="Console"/>
+                <a:cs typeface="Arial" panose="020B0604020202020204" pitchFamily="34" charset="0"/>
+              </a:rPr>
+              <a:t> </a:t>
+            </a:r>
+            <a:r>
+              <a:rPr lang="en-US" dirty="0">
+                <a:solidFill>
+                  <a:schemeClr val="tx1"/>
+                </a:solidFill>
+                <a:latin typeface="Console"/>
+              </a:rPr>
+              <a:t>int</a:t>
+            </a:r>
+            <a:r>
+              <a:rPr lang="en-US" dirty="0">
+                <a:latin typeface="Console"/>
+              </a:rPr>
+              <a:t> </a:t>
+            </a:r>
+            <a:r>
+              <a:rPr lang="en-US" dirty="0">
+                <a:solidFill>
+                  <a:schemeClr val="accent2">
+                    <a:lumMod val="75000"/>
+                  </a:schemeClr>
+                </a:solidFill>
+                <a:latin typeface="Console"/>
+              </a:rPr>
+              <a:t>_y</a:t>
+            </a:r>
+            <a:r>
+              <a:rPr lang="en-US" dirty="0">
+                <a:latin typeface="Console"/>
+              </a:rPr>
+              <a:t>;		</a:t>
+            </a:r>
+          </a:p>
+          <a:p>
+            <a:pPr marL="0" indent="0">
+              <a:buNone/>
+            </a:pPr>
+            <a:r>
+              <a:rPr lang="en-US" dirty="0">
+                <a:latin typeface="Console"/>
+              </a:rPr>
+              <a:t>        </a:t>
+            </a:r>
+          </a:p>
+          <a:p>
+            <a:pPr marL="0" indent="0">
+              <a:buNone/>
+            </a:pPr>
+            <a:r>
+              <a:rPr lang="en-US" dirty="0">
+                <a:latin typeface="Console"/>
+              </a:rPr>
+              <a:t>        </a:t>
+            </a:r>
+            <a:r>
+              <a:rPr lang="en-US" dirty="0">
+                <a:solidFill>
+                  <a:schemeClr val="tx2">
+                    <a:lumMod val="75000"/>
+                  </a:schemeClr>
+                </a:solidFill>
+                <a:latin typeface="Console"/>
+              </a:rPr>
+              <a:t>public</a:t>
+            </a:r>
+            <a:r>
+              <a:rPr lang="en-US" dirty="0">
+                <a:latin typeface="Console"/>
+              </a:rPr>
+              <a:t> </a:t>
+            </a:r>
+            <a:r>
+              <a:rPr lang="en-US" dirty="0">
+                <a:solidFill>
+                  <a:srgbClr val="92D050"/>
+                </a:solidFill>
+                <a:latin typeface="Console"/>
+              </a:rPr>
+              <a:t>Point</a:t>
+            </a:r>
+            <a:r>
+              <a:rPr lang="en-US" dirty="0">
+                <a:latin typeface="Console"/>
+              </a:rPr>
+              <a:t>(int x, int y){</a:t>
+            </a:r>
+          </a:p>
+          <a:p>
+            <a:pPr marL="0" indent="0">
+              <a:buNone/>
+            </a:pPr>
+            <a:r>
+              <a:rPr lang="en-US" dirty="0">
+                <a:latin typeface="Console"/>
+              </a:rPr>
+              <a:t>	</a:t>
+            </a:r>
+            <a:r>
+              <a:rPr lang="en-US" dirty="0">
+                <a:solidFill>
+                  <a:schemeClr val="accent2">
+                    <a:lumMod val="75000"/>
+                  </a:schemeClr>
+                </a:solidFill>
+                <a:latin typeface="Console"/>
+              </a:rPr>
+              <a:t>_x</a:t>
+            </a:r>
+            <a:r>
+              <a:rPr lang="en-US" dirty="0">
+                <a:latin typeface="Console"/>
+              </a:rPr>
+              <a:t> = x;</a:t>
+            </a:r>
+          </a:p>
+          <a:p>
+            <a:pPr marL="0" indent="0">
+              <a:buNone/>
+            </a:pPr>
+            <a:r>
+              <a:rPr lang="en-US" dirty="0">
+                <a:latin typeface="Console"/>
+              </a:rPr>
+              <a:t>	</a:t>
+            </a:r>
+            <a:r>
+              <a:rPr lang="en-US" dirty="0">
+                <a:solidFill>
+                  <a:schemeClr val="accent2">
+                    <a:lumMod val="75000"/>
+                  </a:schemeClr>
+                </a:solidFill>
+                <a:latin typeface="Console"/>
+              </a:rPr>
+              <a:t>_y</a:t>
+            </a:r>
+            <a:r>
+              <a:rPr lang="en-US" dirty="0">
+                <a:latin typeface="Console"/>
+              </a:rPr>
+              <a:t> = y;</a:t>
+            </a:r>
+          </a:p>
+          <a:p>
+            <a:pPr marL="0" indent="0">
+              <a:buNone/>
+            </a:pPr>
+            <a:r>
+              <a:rPr lang="en-US" dirty="0">
+                <a:latin typeface="Console"/>
+              </a:rPr>
+              <a:t>  }	</a:t>
+            </a:r>
+            <a:r>
+              <a:rPr lang="en-US" sz="3200" dirty="0">
+                <a:latin typeface="Console"/>
+              </a:rPr>
+              <a:t>			</a:t>
+            </a:r>
+            <a:endParaRPr lang="en-US" sz="3200" dirty="0">
+              <a:solidFill>
+                <a:srgbClr val="FF0000"/>
+              </a:solidFill>
+              <a:latin typeface="Console"/>
+            </a:endParaRPr>
+          </a:p>
+          <a:p>
+            <a:pPr marL="0" indent="0">
+              <a:buNone/>
+            </a:pPr>
+            <a:endParaRPr lang="en-US" sz="3200" dirty="0">
+              <a:latin typeface="Console"/>
+            </a:endParaRPr>
+          </a:p>
+          <a:p>
+            <a:pPr marL="0" indent="0">
+              <a:buNone/>
+            </a:pPr>
+            <a:r>
+              <a:rPr lang="en-US" sz="3200" dirty="0">
+                <a:latin typeface="Console"/>
+              </a:rPr>
+              <a:t>}</a:t>
+            </a:r>
+            <a:endParaRPr lang="bg-BG" sz="3200" dirty="0">
+              <a:latin typeface="Console"/>
+            </a:endParaRPr>
+          </a:p>
+          <a:p>
+            <a:pPr marL="457200" lvl="1" indent="0">
+              <a:buNone/>
+            </a:pPr>
+            <a:endParaRPr lang="en-US" sz="2400" dirty="0">
+              <a:latin typeface="Consolas" panose="020B0609020204030204" pitchFamily="49" charset="0"/>
+            </a:endParaRPr>
+          </a:p>
+        </p:txBody>
+      </p:sp>
+      <p:sp>
+        <p:nvSpPr>
+          <p:cNvPr id="3" name="Content Placeholder 3">
+            <a:extLst>
+              <a:ext uri="{FF2B5EF4-FFF2-40B4-BE49-F238E27FC236}">
+                <a16:creationId xmlns:a16="http://schemas.microsoft.com/office/drawing/2014/main" id="{413600CB-97C9-EE28-8CC5-50FAB53A17D4}"/>
+              </a:ext>
+            </a:extLst>
+          </p:cNvPr>
+          <p:cNvSpPr txBox="1">
+            <a:spLocks/>
+          </p:cNvSpPr>
+          <p:nvPr/>
+        </p:nvSpPr>
+        <p:spPr>
+          <a:xfrm>
+            <a:off x="6233160" y="1577477"/>
+            <a:ext cx="4857205" cy="6203237"/>
+          </a:xfrm>
+          <a:prstGeom prst="rect">
+            <a:avLst/>
+          </a:prstGeom>
+          <a:noFill/>
+        </p:spPr>
+        <p:txBody>
+          <a:bodyPr vert="horz" wrap="square" lIns="91440" tIns="45720" rIns="91440" bIns="45720" rtlCol="0">
+            <a:spAutoFit/>
+          </a:bodyPr>
+          <a:lstStyle>
+            <a:lvl1pPr marL="228600" indent="-228600" algn="l" defTabSz="914400" rtl="0" eaLnBrk="1" latinLnBrk="0" hangingPunct="1">
+              <a:lnSpc>
+                <a:spcPct val="90000"/>
+              </a:lnSpc>
+              <a:spcBef>
+                <a:spcPts val="1000"/>
+              </a:spcBef>
+              <a:buFont typeface="Arial" panose="020B0604020202020204" pitchFamily="34" charset="0"/>
+              <a:buChar char="•"/>
+              <a:defRPr sz="2800" kern="1200">
+                <a:gradFill>
+                  <a:gsLst>
+                    <a:gs pos="34000">
+                      <a:schemeClr val="tx1">
+                        <a:lumMod val="93000"/>
+                      </a:schemeClr>
+                    </a:gs>
+                    <a:gs pos="0">
+                      <a:schemeClr val="bg1">
+                        <a:lumMod val="25000"/>
+                        <a:lumOff val="75000"/>
+                      </a:schemeClr>
+                    </a:gs>
+                    <a:gs pos="100000">
+                      <a:schemeClr val="tx2">
+                        <a:lumMod val="0"/>
+                        <a:lumOff val="100000"/>
+                      </a:schemeClr>
+                    </a:gs>
+                  </a:gsLst>
+                  <a:lin ang="4800000" scaled="0"/>
+                </a:gradFill>
+                <a:latin typeface="+mn-lt"/>
+                <a:ea typeface="+mn-ea"/>
+                <a:cs typeface="+mn-cs"/>
+              </a:defRPr>
+            </a:lvl1pPr>
+            <a:lvl2pPr marL="685800" indent="-228600" algn="l" defTabSz="914400" rtl="0" eaLnBrk="1" latinLnBrk="0" hangingPunct="1">
+              <a:lnSpc>
+                <a:spcPct val="90000"/>
+              </a:lnSpc>
+              <a:spcBef>
+                <a:spcPts val="500"/>
+              </a:spcBef>
+              <a:buFont typeface="Arial" panose="020B0604020202020204" pitchFamily="34" charset="0"/>
+              <a:buChar char="•"/>
+              <a:defRPr sz="2400" kern="1200">
+                <a:gradFill>
+                  <a:gsLst>
+                    <a:gs pos="34000">
+                      <a:schemeClr val="tx1">
+                        <a:lumMod val="93000"/>
+                      </a:schemeClr>
+                    </a:gs>
+                    <a:gs pos="0">
+                      <a:schemeClr val="bg1">
+                        <a:lumMod val="25000"/>
+                        <a:lumOff val="75000"/>
+                      </a:schemeClr>
+                    </a:gs>
+                    <a:gs pos="100000">
+                      <a:schemeClr val="tx2">
+                        <a:lumMod val="0"/>
+                        <a:lumOff val="100000"/>
+                      </a:schemeClr>
+                    </a:gs>
+                  </a:gsLst>
+                  <a:lin ang="4800000" scaled="0"/>
+                </a:gradFill>
+                <a:latin typeface="+mn-lt"/>
+                <a:ea typeface="+mn-ea"/>
+                <a:cs typeface="+mn-cs"/>
+              </a:defRPr>
+            </a:lvl2pPr>
+            <a:lvl3pPr marL="1143000" indent="-228600" algn="l" defTabSz="914400" rtl="0" eaLnBrk="1" latinLnBrk="0" hangingPunct="1">
+              <a:lnSpc>
+                <a:spcPct val="90000"/>
+              </a:lnSpc>
+              <a:spcBef>
+                <a:spcPts val="500"/>
+              </a:spcBef>
+              <a:buFont typeface="Arial" panose="020B0604020202020204" pitchFamily="34" charset="0"/>
+              <a:buChar char="•"/>
+              <a:defRPr sz="2000" kern="1200">
+                <a:gradFill>
+                  <a:gsLst>
+                    <a:gs pos="34000">
+                      <a:schemeClr val="tx1">
+                        <a:lumMod val="93000"/>
+                      </a:schemeClr>
+                    </a:gs>
+                    <a:gs pos="0">
+                      <a:schemeClr val="bg1">
+                        <a:lumMod val="25000"/>
+                        <a:lumOff val="75000"/>
+                      </a:schemeClr>
+                    </a:gs>
+                    <a:gs pos="100000">
+                      <a:schemeClr val="tx2">
+                        <a:lumMod val="0"/>
+                        <a:lumOff val="100000"/>
+                      </a:schemeClr>
+                    </a:gs>
+                  </a:gsLst>
+                  <a:lin ang="4800000" scaled="0"/>
+                </a:gradFill>
+                <a:latin typeface="+mn-lt"/>
+                <a:ea typeface="+mn-ea"/>
+                <a:cs typeface="+mn-cs"/>
+              </a:defRPr>
+            </a:lvl3pPr>
+            <a:lvl4pPr marL="1600200" indent="-228600" algn="l" defTabSz="914400" rtl="0" eaLnBrk="1" latinLnBrk="0" hangingPunct="1">
+              <a:lnSpc>
+                <a:spcPct val="90000"/>
+              </a:lnSpc>
+              <a:spcBef>
+                <a:spcPts val="500"/>
+              </a:spcBef>
+              <a:buFont typeface="Arial" panose="020B0604020202020204" pitchFamily="34" charset="0"/>
+              <a:buChar char="•"/>
+              <a:defRPr sz="1800" kern="1200">
+                <a:gradFill>
+                  <a:gsLst>
+                    <a:gs pos="34000">
+                      <a:schemeClr val="tx1">
+                        <a:lumMod val="93000"/>
+                      </a:schemeClr>
+                    </a:gs>
+                    <a:gs pos="0">
+                      <a:schemeClr val="bg1">
+                        <a:lumMod val="25000"/>
+                        <a:lumOff val="75000"/>
+                      </a:schemeClr>
+                    </a:gs>
+                    <a:gs pos="100000">
+                      <a:schemeClr val="tx2">
+                        <a:lumMod val="0"/>
+                        <a:lumOff val="100000"/>
+                      </a:schemeClr>
+                    </a:gs>
+                  </a:gsLst>
+                  <a:lin ang="4800000" scaled="0"/>
+                </a:gradFill>
+                <a:latin typeface="+mn-lt"/>
+                <a:ea typeface="+mn-ea"/>
+                <a:cs typeface="+mn-cs"/>
+              </a:defRPr>
+            </a:lvl4pPr>
+            <a:lvl5pPr marL="2057400" indent="-228600" algn="l" defTabSz="914400" rtl="0" eaLnBrk="1" latinLnBrk="0" hangingPunct="1">
+              <a:lnSpc>
+                <a:spcPct val="90000"/>
+              </a:lnSpc>
+              <a:spcBef>
+                <a:spcPts val="500"/>
+              </a:spcBef>
+              <a:buFont typeface="Arial" panose="020B0604020202020204" pitchFamily="34" charset="0"/>
+              <a:buChar char="•"/>
+              <a:defRPr sz="1800" kern="1200">
+                <a:gradFill>
+                  <a:gsLst>
+                    <a:gs pos="34000">
+                      <a:schemeClr val="tx1">
+                        <a:lumMod val="93000"/>
+                      </a:schemeClr>
+                    </a:gs>
+                    <a:gs pos="0">
+                      <a:schemeClr val="bg1">
+                        <a:lumMod val="25000"/>
+                        <a:lumOff val="75000"/>
+                      </a:schemeClr>
+                    </a:gs>
+                    <a:gs pos="100000">
+                      <a:schemeClr val="tx2">
+                        <a:lumMod val="0"/>
+                        <a:lumOff val="100000"/>
+                      </a:schemeClr>
+                    </a:gs>
+                  </a:gsLst>
+                  <a:lin ang="4800000" scaled="0"/>
+                </a:gradFill>
+                <a:latin typeface="+mn-lt"/>
+                <a:ea typeface="+mn-ea"/>
+                <a:cs typeface="+mn-cs"/>
+              </a:defRPr>
+            </a:lvl5pPr>
+            <a:lvl6pPr marL="2514600" indent="-228600" algn="l" defTabSz="914400" rtl="0" eaLnBrk="1" latinLnBrk="0" hangingPunct="1">
+              <a:lnSpc>
+                <a:spcPct val="90000"/>
+              </a:lnSpc>
+              <a:spcBef>
+                <a:spcPts val="500"/>
+              </a:spcBef>
+              <a:buFont typeface="Arial" panose="020B0604020202020204" pitchFamily="34" charset="0"/>
+              <a:buChar char="•"/>
+              <a:defRPr sz="1800" kern="1200">
+                <a:solidFill>
+                  <a:schemeClr val="tx1"/>
+                </a:solidFill>
+                <a:latin typeface="+mn-lt"/>
+                <a:ea typeface="+mn-ea"/>
+                <a:cs typeface="+mn-cs"/>
+              </a:defRPr>
+            </a:lvl6pPr>
+            <a:lvl7pPr marL="2971800" indent="-228600" algn="l" defTabSz="914400" rtl="0" eaLnBrk="1" latinLnBrk="0" hangingPunct="1">
+              <a:lnSpc>
+                <a:spcPct val="90000"/>
+              </a:lnSpc>
+              <a:spcBef>
+                <a:spcPts val="500"/>
+              </a:spcBef>
+              <a:buFont typeface="Arial" panose="020B0604020202020204" pitchFamily="34" charset="0"/>
+              <a:buChar char="•"/>
+              <a:defRPr sz="1800" kern="1200">
+                <a:solidFill>
+                  <a:schemeClr val="tx1"/>
+                </a:solidFill>
+                <a:latin typeface="+mn-lt"/>
+                <a:ea typeface="+mn-ea"/>
+                <a:cs typeface="+mn-cs"/>
+              </a:defRPr>
+            </a:lvl7pPr>
+            <a:lvl8pPr marL="3429000" indent="-228600" algn="l" defTabSz="914400" rtl="0" eaLnBrk="1" latinLnBrk="0" hangingPunct="1">
+              <a:lnSpc>
+                <a:spcPct val="90000"/>
+              </a:lnSpc>
+              <a:spcBef>
+                <a:spcPts val="500"/>
+              </a:spcBef>
+              <a:buFont typeface="Arial" panose="020B0604020202020204" pitchFamily="34" charset="0"/>
+              <a:buChar char="•"/>
+              <a:defRPr sz="1800" kern="1200">
+                <a:solidFill>
+                  <a:schemeClr val="tx1"/>
+                </a:solidFill>
+                <a:latin typeface="+mn-lt"/>
+                <a:ea typeface="+mn-ea"/>
+                <a:cs typeface="+mn-cs"/>
+              </a:defRPr>
+            </a:lvl8pPr>
+            <a:lvl9pPr marL="3886200" indent="-228600" algn="l" defTabSz="914400" rtl="0" eaLnBrk="1" latinLnBrk="0" hangingPunct="1">
+              <a:lnSpc>
+                <a:spcPct val="90000"/>
+              </a:lnSpc>
+              <a:spcBef>
+                <a:spcPts val="500"/>
+              </a:spcBef>
+              <a:buFont typeface="Arial" panose="020B0604020202020204" pitchFamily="34" charset="0"/>
+              <a:buChar char="•"/>
+              <a:defRPr sz="1800" kern="1200">
+                <a:solidFill>
+                  <a:schemeClr val="tx1"/>
+                </a:solidFill>
+                <a:latin typeface="+mn-lt"/>
+                <a:ea typeface="+mn-ea"/>
+                <a:cs typeface="+mn-cs"/>
+              </a:defRPr>
+            </a:lvl9pPr>
+          </a:lstStyle>
+          <a:p>
+            <a:pPr marL="0" indent="0">
+              <a:buFont typeface="Arial" panose="020B0604020202020204" pitchFamily="34" charset="0"/>
+              <a:buNone/>
+            </a:pPr>
+            <a:r>
+              <a:rPr lang="en-US" dirty="0">
+                <a:solidFill>
+                  <a:srgbClr val="FFFF00"/>
+                </a:solidFill>
+                <a:latin typeface="Console"/>
+              </a:rPr>
+              <a:t>class</a:t>
+            </a:r>
+            <a:r>
+              <a:rPr lang="en-US" dirty="0">
+                <a:latin typeface="Console"/>
+              </a:rPr>
+              <a:t> </a:t>
+            </a:r>
+            <a:r>
+              <a:rPr lang="en-US" dirty="0">
+                <a:solidFill>
+                  <a:srgbClr val="92D050"/>
+                </a:solidFill>
+                <a:latin typeface="Console"/>
+              </a:rPr>
+              <a:t>Point</a:t>
+            </a:r>
+            <a:r>
+              <a:rPr lang="bg-BG" dirty="0">
+                <a:solidFill>
+                  <a:srgbClr val="92D050"/>
+                </a:solidFill>
+                <a:latin typeface="Console"/>
+              </a:rPr>
+              <a:t>				</a:t>
+            </a:r>
+            <a:endParaRPr lang="en-US" dirty="0">
+              <a:solidFill>
+                <a:srgbClr val="92D050"/>
+              </a:solidFill>
+              <a:latin typeface="Console"/>
+            </a:endParaRPr>
+          </a:p>
+          <a:p>
+            <a:pPr marL="0" indent="0">
+              <a:buFont typeface="Arial" panose="020B0604020202020204" pitchFamily="34" charset="0"/>
+              <a:buNone/>
+            </a:pPr>
+            <a:r>
+              <a:rPr lang="en-US" dirty="0">
+                <a:latin typeface="Console"/>
+              </a:rPr>
+              <a:t> {</a:t>
+            </a:r>
+          </a:p>
+          <a:p>
+            <a:pPr marL="0" indent="0">
+              <a:buFont typeface="Arial" panose="020B0604020202020204" pitchFamily="34" charset="0"/>
+              <a:buNone/>
+            </a:pPr>
+            <a:r>
+              <a:rPr lang="en-US" dirty="0">
+                <a:latin typeface="Console"/>
+              </a:rPr>
+              <a:t>        </a:t>
+            </a:r>
+            <a:r>
+              <a:rPr lang="en-US" dirty="0">
+                <a:solidFill>
+                  <a:schemeClr val="tx2">
+                    <a:lumMod val="75000"/>
+                  </a:schemeClr>
+                </a:solidFill>
+                <a:latin typeface="Console"/>
+              </a:rPr>
+              <a:t>private</a:t>
+            </a:r>
+            <a:r>
+              <a:rPr lang="en-US" dirty="0">
+                <a:solidFill>
+                  <a:srgbClr val="FFC000"/>
+                </a:solidFill>
+                <a:latin typeface="Console"/>
+                <a:cs typeface="Arial" panose="020B0604020202020204" pitchFamily="34" charset="0"/>
+              </a:rPr>
+              <a:t> </a:t>
+            </a:r>
+            <a:r>
+              <a:rPr lang="en-US" dirty="0">
+                <a:solidFill>
+                  <a:schemeClr val="tx1"/>
+                </a:solidFill>
+                <a:latin typeface="Console"/>
+              </a:rPr>
+              <a:t>int</a:t>
+            </a:r>
+            <a:r>
+              <a:rPr lang="en-US" dirty="0">
+                <a:latin typeface="Console"/>
+              </a:rPr>
+              <a:t> </a:t>
+            </a:r>
+            <a:r>
+              <a:rPr lang="en-US" dirty="0">
+                <a:solidFill>
+                  <a:schemeClr val="accent2">
+                    <a:lumMod val="75000"/>
+                  </a:schemeClr>
+                </a:solidFill>
+                <a:latin typeface="Console"/>
+              </a:rPr>
+              <a:t>_x</a:t>
+            </a:r>
+            <a:r>
+              <a:rPr lang="en-US" dirty="0">
+                <a:latin typeface="Console"/>
+              </a:rPr>
+              <a:t>;	</a:t>
+            </a:r>
+          </a:p>
+          <a:p>
+            <a:pPr marL="0" indent="0">
+              <a:buFont typeface="Arial" panose="020B0604020202020204" pitchFamily="34" charset="0"/>
+              <a:buNone/>
+            </a:pPr>
+            <a:r>
+              <a:rPr lang="en-US" dirty="0">
+                <a:latin typeface="Console"/>
+              </a:rPr>
+              <a:t>        </a:t>
+            </a:r>
+            <a:r>
+              <a:rPr lang="en-US" dirty="0">
+                <a:solidFill>
+                  <a:schemeClr val="tx2">
+                    <a:lumMod val="75000"/>
+                  </a:schemeClr>
+                </a:solidFill>
+                <a:latin typeface="Console"/>
+              </a:rPr>
+              <a:t>private</a:t>
+            </a:r>
+            <a:r>
+              <a:rPr lang="en-US" dirty="0">
+                <a:solidFill>
+                  <a:srgbClr val="FFC000"/>
+                </a:solidFill>
+                <a:latin typeface="Console"/>
+                <a:cs typeface="Arial" panose="020B0604020202020204" pitchFamily="34" charset="0"/>
+              </a:rPr>
+              <a:t> </a:t>
+            </a:r>
+            <a:r>
+              <a:rPr lang="en-US" dirty="0">
+                <a:solidFill>
+                  <a:schemeClr val="tx1"/>
+                </a:solidFill>
+                <a:latin typeface="Console"/>
+              </a:rPr>
+              <a:t>int</a:t>
+            </a:r>
+            <a:r>
+              <a:rPr lang="en-US" dirty="0">
+                <a:latin typeface="Console"/>
+              </a:rPr>
+              <a:t> </a:t>
+            </a:r>
+            <a:r>
+              <a:rPr lang="en-US" dirty="0">
+                <a:solidFill>
+                  <a:schemeClr val="accent2">
+                    <a:lumMod val="75000"/>
+                  </a:schemeClr>
+                </a:solidFill>
+                <a:latin typeface="Console"/>
+              </a:rPr>
+              <a:t>_y</a:t>
+            </a:r>
+            <a:r>
+              <a:rPr lang="en-US" dirty="0">
+                <a:latin typeface="Console"/>
+              </a:rPr>
+              <a:t>;		</a:t>
+            </a:r>
+          </a:p>
+          <a:p>
+            <a:pPr marL="0" indent="0">
+              <a:buFont typeface="Arial" panose="020B0604020202020204" pitchFamily="34" charset="0"/>
+              <a:buNone/>
+            </a:pPr>
+            <a:r>
+              <a:rPr lang="en-US" dirty="0">
+                <a:latin typeface="Console"/>
+              </a:rPr>
+              <a:t>        </a:t>
+            </a:r>
+          </a:p>
+          <a:p>
+            <a:pPr marL="0" indent="0">
+              <a:buFont typeface="Arial" panose="020B0604020202020204" pitchFamily="34" charset="0"/>
+              <a:buNone/>
+            </a:pPr>
+            <a:r>
+              <a:rPr lang="en-US" dirty="0">
+                <a:latin typeface="Console"/>
+              </a:rPr>
+              <a:t>        </a:t>
+            </a:r>
+            <a:r>
+              <a:rPr lang="en-US" dirty="0">
+                <a:solidFill>
+                  <a:schemeClr val="tx2">
+                    <a:lumMod val="75000"/>
+                  </a:schemeClr>
+                </a:solidFill>
+                <a:latin typeface="Console"/>
+              </a:rPr>
+              <a:t>public</a:t>
+            </a:r>
+            <a:r>
+              <a:rPr lang="en-US" dirty="0">
+                <a:latin typeface="Console"/>
+              </a:rPr>
+              <a:t> </a:t>
+            </a:r>
+            <a:r>
+              <a:rPr lang="en-US" dirty="0">
+                <a:solidFill>
+                  <a:srgbClr val="92D050"/>
+                </a:solidFill>
+                <a:latin typeface="Console"/>
+              </a:rPr>
+              <a:t>Point</a:t>
+            </a:r>
+            <a:r>
+              <a:rPr lang="en-US" dirty="0">
+                <a:latin typeface="Console"/>
+              </a:rPr>
+              <a:t>(int x, int y){</a:t>
+            </a:r>
+          </a:p>
+          <a:p>
+            <a:pPr marL="0" indent="0">
+              <a:buFont typeface="Arial" panose="020B0604020202020204" pitchFamily="34" charset="0"/>
+              <a:buNone/>
+            </a:pPr>
+            <a:r>
+              <a:rPr lang="en-US" dirty="0">
+                <a:latin typeface="Console"/>
+              </a:rPr>
+              <a:t>	</a:t>
+            </a:r>
+            <a:r>
+              <a:rPr lang="en-US" dirty="0">
+                <a:solidFill>
+                  <a:schemeClr val="accent2">
+                    <a:lumMod val="75000"/>
+                  </a:schemeClr>
+                </a:solidFill>
+                <a:latin typeface="Console"/>
+              </a:rPr>
+              <a:t>_x</a:t>
+            </a:r>
+            <a:r>
+              <a:rPr lang="en-US" dirty="0">
+                <a:latin typeface="Console"/>
+              </a:rPr>
+              <a:t> = x;</a:t>
+            </a:r>
+          </a:p>
+          <a:p>
+            <a:pPr marL="0" indent="0">
+              <a:buFont typeface="Arial" panose="020B0604020202020204" pitchFamily="34" charset="0"/>
+              <a:buNone/>
+            </a:pPr>
+            <a:r>
+              <a:rPr lang="en-US" dirty="0">
+                <a:latin typeface="Console"/>
+              </a:rPr>
+              <a:t>	</a:t>
+            </a:r>
+            <a:r>
+              <a:rPr lang="en-US" dirty="0">
+                <a:solidFill>
+                  <a:schemeClr val="accent2">
+                    <a:lumMod val="75000"/>
+                  </a:schemeClr>
+                </a:solidFill>
+                <a:latin typeface="Console"/>
+              </a:rPr>
+              <a:t>_y</a:t>
+            </a:r>
+            <a:r>
+              <a:rPr lang="en-US" dirty="0">
+                <a:latin typeface="Console"/>
+              </a:rPr>
+              <a:t> = y;</a:t>
+            </a:r>
+          </a:p>
+          <a:p>
+            <a:pPr marL="0" indent="0">
+              <a:buFont typeface="Arial" panose="020B0604020202020204" pitchFamily="34" charset="0"/>
+              <a:buNone/>
+            </a:pPr>
+            <a:r>
+              <a:rPr lang="en-US" dirty="0">
+                <a:latin typeface="Console"/>
+              </a:rPr>
+              <a:t>  }	</a:t>
+            </a:r>
+            <a:r>
+              <a:rPr lang="en-US" sz="3200" dirty="0">
+                <a:latin typeface="Console"/>
+              </a:rPr>
+              <a:t>			</a:t>
+            </a:r>
+            <a:endParaRPr lang="en-US" sz="3200" dirty="0">
+              <a:solidFill>
+                <a:srgbClr val="FF0000"/>
+              </a:solidFill>
+              <a:latin typeface="Console"/>
+            </a:endParaRPr>
+          </a:p>
+          <a:p>
+            <a:pPr marL="0" indent="0">
+              <a:buFont typeface="Arial" panose="020B0604020202020204" pitchFamily="34" charset="0"/>
+              <a:buNone/>
+            </a:pPr>
+            <a:endParaRPr lang="en-US" sz="3200" dirty="0">
+              <a:latin typeface="Console"/>
+            </a:endParaRPr>
+          </a:p>
+          <a:p>
+            <a:pPr marL="0" indent="0">
+              <a:buFont typeface="Arial" panose="020B0604020202020204" pitchFamily="34" charset="0"/>
+              <a:buNone/>
+            </a:pPr>
+            <a:r>
+              <a:rPr lang="en-US" sz="3200" dirty="0">
+                <a:latin typeface="Console"/>
+              </a:rPr>
+              <a:t>}</a:t>
+            </a:r>
+            <a:endParaRPr lang="bg-BG" sz="3200" dirty="0">
+              <a:latin typeface="Console"/>
+            </a:endParaRPr>
+          </a:p>
+          <a:p>
+            <a:pPr marL="457200" lvl="1" indent="0">
+              <a:buFont typeface="Arial" panose="020B0604020202020204" pitchFamily="34" charset="0"/>
+              <a:buNone/>
+            </a:pPr>
+            <a:endParaRPr lang="en-US" dirty="0">
+              <a:latin typeface="Consolas" panose="020B0609020204030204" pitchFamily="49" charset="0"/>
+            </a:endParaRPr>
+          </a:p>
+        </p:txBody>
+      </p:sp>
+    </p:spTree>
+    <p:extLst>
+      <p:ext uri="{BB962C8B-B14F-4D97-AF65-F5344CB8AC3E}">
+        <p14:creationId xmlns:p14="http://schemas.microsoft.com/office/powerpoint/2010/main" val="1139132051"/>
+      </p:ext>
+    </p:extLst>
+  </p:cSld>
+  <p:clrMapOvr>
+    <a:masterClrMapping/>
+  </p:clrMapOvr>
+</p:sld>
+</file>
+
+<file path=ppt/slides/slide74.xml><?xml version="1.0" encoding="utf-8"?>
+<p:sld xmlns:a="http://schemas.openxmlformats.org/drawingml/2006/main" xmlns:r="http://schemas.openxmlformats.org/officeDocument/2006/relationships" xmlns:p="http://schemas.openxmlformats.org/presentationml/2006/main">
+  <p:cSld>
+    <p:spTree>
+      <p:nvGrpSpPr>
+        <p:cNvPr id="1" name=""/>
+        <p:cNvGrpSpPr/>
+        <p:nvPr/>
+      </p:nvGrpSpPr>
+      <p:grpSpPr>
+        <a:xfrm>
+          <a:off x="0" y="0"/>
+          <a:ext cx="0" cy="0"/>
+          <a:chOff x="0" y="0"/>
+          <a:chExt cx="0" cy="0"/>
+        </a:xfrm>
+      </p:grpSpPr>
+      <p:sp>
+        <p:nvSpPr>
+          <p:cNvPr id="2" name="Title 1">
+            <a:extLst>
+              <a:ext uri="{FF2B5EF4-FFF2-40B4-BE49-F238E27FC236}">
+                <a16:creationId xmlns:a16="http://schemas.microsoft.com/office/drawing/2014/main" id="{F4BC517D-5338-7131-C1D4-500CDF8FBA8B}"/>
+              </a:ext>
+            </a:extLst>
+          </p:cNvPr>
+          <p:cNvSpPr>
+            <a:spLocks noGrp="1"/>
+          </p:cNvSpPr>
+          <p:nvPr>
+            <p:ph type="title"/>
+          </p:nvPr>
+        </p:nvSpPr>
+        <p:spPr/>
+        <p:txBody>
+          <a:bodyPr>
+            <a:normAutofit fontScale="90000"/>
+          </a:bodyPr>
+          <a:lstStyle/>
+          <a:p>
+            <a:pPr algn="ctr"/>
+            <a:r>
+              <a:rPr lang="bg-BG" dirty="0">
+                <a:latin typeface="Arial" panose="020B0604020202020204" pitchFamily="34" charset="0"/>
+                <a:cs typeface="Arial" panose="020B0604020202020204" pitchFamily="34" charset="0"/>
+              </a:rPr>
+              <a:t>Място на съхранение (</a:t>
+            </a:r>
+            <a:r>
+              <a:rPr lang="en-US" dirty="0">
+                <a:latin typeface="Arial" panose="020B0604020202020204" pitchFamily="34" charset="0"/>
+                <a:cs typeface="Arial" panose="020B0604020202020204" pitchFamily="34" charset="0"/>
+              </a:rPr>
+              <a:t>structures</a:t>
+            </a:r>
+            <a:r>
+              <a:rPr lang="bg-BG" dirty="0">
+                <a:latin typeface="Arial" panose="020B0604020202020204" pitchFamily="34" charset="0"/>
+                <a:cs typeface="Arial" panose="020B0604020202020204" pitchFamily="34" charset="0"/>
+              </a:rPr>
+              <a:t>)</a:t>
+            </a:r>
+          </a:p>
+        </p:txBody>
+      </p:sp>
+      <p:pic>
+        <p:nvPicPr>
+          <p:cNvPr id="9" name="Content Placeholder 8" descr="A picture containing square&#10;&#10;Description automatically generated">
+            <a:extLst>
+              <a:ext uri="{FF2B5EF4-FFF2-40B4-BE49-F238E27FC236}">
+                <a16:creationId xmlns:a16="http://schemas.microsoft.com/office/drawing/2014/main" id="{9C265A76-8089-B946-230C-EC7E99D54BB9}"/>
+              </a:ext>
+            </a:extLst>
+          </p:cNvPr>
+          <p:cNvPicPr>
+            <a:picLocks noGrp="1" noChangeAspect="1"/>
+          </p:cNvPicPr>
+          <p:nvPr>
+            <p:ph idx="1"/>
+          </p:nvPr>
+        </p:nvPicPr>
+        <p:blipFill>
+          <a:blip r:embed="rId2">
+            <a:extLst>
+              <a:ext uri="{28A0092B-C50C-407E-A947-70E740481C1C}">
+                <a14:useLocalDpi xmlns:a14="http://schemas.microsoft.com/office/drawing/2010/main" val="0"/>
+              </a:ext>
+            </a:extLst>
+          </a:blip>
+          <a:stretch>
+            <a:fillRect/>
+          </a:stretch>
+        </p:blipFill>
+        <p:spPr>
+          <a:xfrm>
+            <a:off x="3232150" y="2472531"/>
+            <a:ext cx="6010275" cy="3057525"/>
+          </a:xfrm>
+        </p:spPr>
+      </p:pic>
+    </p:spTree>
+    <p:extLst>
+      <p:ext uri="{BB962C8B-B14F-4D97-AF65-F5344CB8AC3E}">
+        <p14:creationId xmlns:p14="http://schemas.microsoft.com/office/powerpoint/2010/main" val="1189449609"/>
+      </p:ext>
+    </p:extLst>
+  </p:cSld>
+  <p:clrMapOvr>
+    <a:masterClrMapping/>
+  </p:clrMapOvr>
+</p:sld>
+</file>
+
+<file path=ppt/slides/slide75.xml><?xml version="1.0" encoding="utf-8"?>
+<p:sld xmlns:a="http://schemas.openxmlformats.org/drawingml/2006/main" xmlns:r="http://schemas.openxmlformats.org/officeDocument/2006/relationships" xmlns:p="http://schemas.openxmlformats.org/presentationml/2006/main">
+  <p:cSld>
+    <p:spTree>
+      <p:nvGrpSpPr>
+        <p:cNvPr id="1" name=""/>
+        <p:cNvGrpSpPr/>
+        <p:nvPr/>
+      </p:nvGrpSpPr>
+      <p:grpSpPr>
+        <a:xfrm>
+          <a:off x="0" y="0"/>
+          <a:ext cx="0" cy="0"/>
+          <a:chOff x="0" y="0"/>
+          <a:chExt cx="0" cy="0"/>
+        </a:xfrm>
+      </p:grpSpPr>
+      <p:sp>
+        <p:nvSpPr>
+          <p:cNvPr id="2" name="Title 1">
+            <a:extLst>
+              <a:ext uri="{FF2B5EF4-FFF2-40B4-BE49-F238E27FC236}">
+                <a16:creationId xmlns:a16="http://schemas.microsoft.com/office/drawing/2014/main" id="{F4BC517D-5338-7131-C1D4-500CDF8FBA8B}"/>
+              </a:ext>
+            </a:extLst>
+          </p:cNvPr>
+          <p:cNvSpPr>
+            <a:spLocks noGrp="1"/>
+          </p:cNvSpPr>
+          <p:nvPr>
+            <p:ph type="title"/>
+          </p:nvPr>
+        </p:nvSpPr>
+        <p:spPr/>
+        <p:txBody>
+          <a:bodyPr>
+            <a:normAutofit/>
+          </a:bodyPr>
+          <a:lstStyle/>
+          <a:p>
+            <a:pPr algn="ctr"/>
+            <a:r>
+              <a:rPr lang="bg-BG" dirty="0">
+                <a:latin typeface="Arial" panose="020B0604020202020204" pitchFamily="34" charset="0"/>
+                <a:cs typeface="Arial" panose="020B0604020202020204" pitchFamily="34" charset="0"/>
+              </a:rPr>
+              <a:t>Място на съхранение (класове)</a:t>
+            </a:r>
+          </a:p>
+        </p:txBody>
+      </p:sp>
+      <p:pic>
+        <p:nvPicPr>
+          <p:cNvPr id="13" name="Content Placeholder 12" descr="Graphical user interface, text&#10;&#10;Description automatically generated">
+            <a:extLst>
+              <a:ext uri="{FF2B5EF4-FFF2-40B4-BE49-F238E27FC236}">
+                <a16:creationId xmlns:a16="http://schemas.microsoft.com/office/drawing/2014/main" id="{0F2F12C7-6139-B2BD-40D4-309E186273F6}"/>
+              </a:ext>
+            </a:extLst>
+          </p:cNvPr>
+          <p:cNvPicPr>
+            <a:picLocks noGrp="1" noChangeAspect="1"/>
+          </p:cNvPicPr>
+          <p:nvPr>
+            <p:ph idx="1"/>
+          </p:nvPr>
+        </p:nvPicPr>
+        <p:blipFill>
+          <a:blip r:embed="rId2">
+            <a:extLst>
+              <a:ext uri="{28A0092B-C50C-407E-A947-70E740481C1C}">
+                <a14:useLocalDpi xmlns:a14="http://schemas.microsoft.com/office/drawing/2010/main" val="0"/>
+              </a:ext>
+            </a:extLst>
+          </a:blip>
+          <a:stretch>
+            <a:fillRect/>
+          </a:stretch>
+        </p:blipFill>
+        <p:spPr>
+          <a:xfrm>
+            <a:off x="3232150" y="2472531"/>
+            <a:ext cx="6010275" cy="3057525"/>
+          </a:xfrm>
+        </p:spPr>
+      </p:pic>
+    </p:spTree>
+    <p:extLst>
+      <p:ext uri="{BB962C8B-B14F-4D97-AF65-F5344CB8AC3E}">
+        <p14:creationId xmlns:p14="http://schemas.microsoft.com/office/powerpoint/2010/main" val="1946129822"/>
+      </p:ext>
+    </p:extLst>
+  </p:cSld>
+  <p:clrMapOvr>
+    <a:masterClrMapping/>
+  </p:clrMapOvr>
+</p:sld>
+</file>
+
+<file path=ppt/slides/slide76.xml><?xml version="1.0" encoding="utf-8"?>
+<p:sld xmlns:a="http://schemas.openxmlformats.org/drawingml/2006/main" xmlns:r="http://schemas.openxmlformats.org/officeDocument/2006/relationships" xmlns:p="http://schemas.openxmlformats.org/presentationml/2006/main">
+  <p:cSld>
+    <p:spTree>
+      <p:nvGrpSpPr>
+        <p:cNvPr id="1" name=""/>
+        <p:cNvGrpSpPr/>
+        <p:nvPr/>
+      </p:nvGrpSpPr>
+      <p:grpSpPr>
+        <a:xfrm>
+          <a:off x="0" y="0"/>
+          <a:ext cx="0" cy="0"/>
+          <a:chOff x="0" y="0"/>
+          <a:chExt cx="0" cy="0"/>
+        </a:xfrm>
+      </p:grpSpPr>
+      <p:sp>
+        <p:nvSpPr>
+          <p:cNvPr id="2" name="Title 1">
+            <a:extLst>
+              <a:ext uri="{FF2B5EF4-FFF2-40B4-BE49-F238E27FC236}">
+                <a16:creationId xmlns:a16="http://schemas.microsoft.com/office/drawing/2014/main" id="{C71502DE-6682-CE40-F9A8-4635F593DD9D}"/>
+              </a:ext>
+            </a:extLst>
+          </p:cNvPr>
+          <p:cNvSpPr>
+            <a:spLocks noGrp="1"/>
+          </p:cNvSpPr>
+          <p:nvPr>
+            <p:ph type="title"/>
+          </p:nvPr>
+        </p:nvSpPr>
+        <p:spPr/>
+        <p:txBody>
+          <a:bodyPr/>
+          <a:lstStyle/>
+          <a:p>
+            <a:pPr algn="ctr"/>
+            <a:r>
+              <a:rPr lang="en-US" dirty="0">
+                <a:latin typeface="Arial" panose="020B0604020202020204" pitchFamily="34" charset="0"/>
+                <a:cs typeface="Arial" panose="020B0604020202020204" pitchFamily="34" charset="0"/>
+              </a:rPr>
+              <a:t>Structure assignment</a:t>
+            </a:r>
+            <a:endParaRPr lang="bg-BG" dirty="0">
+              <a:latin typeface="Arial" panose="020B0604020202020204" pitchFamily="34" charset="0"/>
+              <a:cs typeface="Arial" panose="020B0604020202020204" pitchFamily="34" charset="0"/>
+            </a:endParaRPr>
+          </a:p>
+        </p:txBody>
+      </p:sp>
+      <p:pic>
+        <p:nvPicPr>
+          <p:cNvPr id="5" name="Content Placeholder 4" descr="Text&#10;&#10;Description automatically generated with low confidence">
+            <a:extLst>
+              <a:ext uri="{FF2B5EF4-FFF2-40B4-BE49-F238E27FC236}">
+                <a16:creationId xmlns:a16="http://schemas.microsoft.com/office/drawing/2014/main" id="{CB2921B9-4AB4-FFF6-0E08-F48798F0F97E}"/>
+              </a:ext>
+            </a:extLst>
+          </p:cNvPr>
+          <p:cNvPicPr>
+            <a:picLocks noGrp="1" noChangeAspect="1"/>
+          </p:cNvPicPr>
+          <p:nvPr>
+            <p:ph idx="1"/>
+          </p:nvPr>
+        </p:nvPicPr>
+        <p:blipFill>
+          <a:blip r:embed="rId2">
+            <a:extLst>
+              <a:ext uri="{28A0092B-C50C-407E-A947-70E740481C1C}">
+                <a14:useLocalDpi xmlns:a14="http://schemas.microsoft.com/office/drawing/2010/main" val="0"/>
+              </a:ext>
+            </a:extLst>
+          </a:blip>
+          <a:stretch>
+            <a:fillRect/>
+          </a:stretch>
+        </p:blipFill>
+        <p:spPr>
+          <a:xfrm>
+            <a:off x="3232150" y="2186781"/>
+            <a:ext cx="6010275" cy="3629025"/>
+          </a:xfrm>
+        </p:spPr>
+      </p:pic>
+    </p:spTree>
+    <p:extLst>
+      <p:ext uri="{BB962C8B-B14F-4D97-AF65-F5344CB8AC3E}">
+        <p14:creationId xmlns:p14="http://schemas.microsoft.com/office/powerpoint/2010/main" val="2902046526"/>
+      </p:ext>
+    </p:extLst>
+  </p:cSld>
+  <p:clrMapOvr>
+    <a:masterClrMapping/>
+  </p:clrMapOvr>
+</p:sld>
+</file>
+
+<file path=ppt/slides/slide77.xml><?xml version="1.0" encoding="utf-8"?>
+<p:sld xmlns:a="http://schemas.openxmlformats.org/drawingml/2006/main" xmlns:r="http://schemas.openxmlformats.org/officeDocument/2006/relationships" xmlns:p="http://schemas.openxmlformats.org/presentationml/2006/main">
+  <p:cSld>
+    <p:spTree>
+      <p:nvGrpSpPr>
+        <p:cNvPr id="1" name=""/>
+        <p:cNvGrpSpPr/>
+        <p:nvPr/>
+      </p:nvGrpSpPr>
+      <p:grpSpPr>
+        <a:xfrm>
+          <a:off x="0" y="0"/>
+          <a:ext cx="0" cy="0"/>
+          <a:chOff x="0" y="0"/>
+          <a:chExt cx="0" cy="0"/>
+        </a:xfrm>
+      </p:grpSpPr>
+      <p:sp>
+        <p:nvSpPr>
+          <p:cNvPr id="2" name="Title 1">
+            <a:extLst>
+              <a:ext uri="{FF2B5EF4-FFF2-40B4-BE49-F238E27FC236}">
+                <a16:creationId xmlns:a16="http://schemas.microsoft.com/office/drawing/2014/main" id="{C71502DE-6682-CE40-F9A8-4635F593DD9D}"/>
+              </a:ext>
+            </a:extLst>
+          </p:cNvPr>
+          <p:cNvSpPr>
+            <a:spLocks noGrp="1"/>
+          </p:cNvSpPr>
+          <p:nvPr>
+            <p:ph type="title"/>
+          </p:nvPr>
+        </p:nvSpPr>
+        <p:spPr/>
+        <p:txBody>
+          <a:bodyPr/>
+          <a:lstStyle/>
+          <a:p>
+            <a:pPr algn="ctr"/>
+            <a:r>
+              <a:rPr lang="en-US" dirty="0">
+                <a:latin typeface="Arial" panose="020B0604020202020204" pitchFamily="34" charset="0"/>
+                <a:cs typeface="Arial" panose="020B0604020202020204" pitchFamily="34" charset="0"/>
+              </a:rPr>
+              <a:t>Class assignment</a:t>
+            </a:r>
+            <a:endParaRPr lang="bg-BG" dirty="0">
+              <a:latin typeface="Arial" panose="020B0604020202020204" pitchFamily="34" charset="0"/>
+              <a:cs typeface="Arial" panose="020B0604020202020204" pitchFamily="34" charset="0"/>
+            </a:endParaRPr>
+          </a:p>
+        </p:txBody>
+      </p:sp>
+      <p:pic>
+        <p:nvPicPr>
+          <p:cNvPr id="11" name="Content Placeholder 10" descr="Graphical user interface, application&#10;&#10;Description automatically generated">
+            <a:extLst>
+              <a:ext uri="{FF2B5EF4-FFF2-40B4-BE49-F238E27FC236}">
+                <a16:creationId xmlns:a16="http://schemas.microsoft.com/office/drawing/2014/main" id="{DCB958DA-6A21-D17B-F5D2-FEB5C1C591C3}"/>
+              </a:ext>
+            </a:extLst>
+          </p:cNvPr>
+          <p:cNvPicPr>
+            <a:picLocks noGrp="1" noChangeAspect="1"/>
+          </p:cNvPicPr>
+          <p:nvPr>
+            <p:ph idx="1"/>
+          </p:nvPr>
+        </p:nvPicPr>
+        <p:blipFill>
+          <a:blip r:embed="rId2">
+            <a:extLst>
+              <a:ext uri="{28A0092B-C50C-407E-A947-70E740481C1C}">
+                <a14:useLocalDpi xmlns:a14="http://schemas.microsoft.com/office/drawing/2010/main" val="0"/>
+              </a:ext>
+            </a:extLst>
+          </a:blip>
+          <a:stretch>
+            <a:fillRect/>
+          </a:stretch>
+        </p:blipFill>
+        <p:spPr>
+          <a:xfrm>
+            <a:off x="3232150" y="2139156"/>
+            <a:ext cx="6010275" cy="3724275"/>
+          </a:xfrm>
+        </p:spPr>
+      </p:pic>
+    </p:spTree>
+    <p:extLst>
+      <p:ext uri="{BB962C8B-B14F-4D97-AF65-F5344CB8AC3E}">
+        <p14:creationId xmlns:p14="http://schemas.microsoft.com/office/powerpoint/2010/main" val="1631117840"/>
       </p:ext>
     </p:extLst>
   </p:cSld>
@@ -37536,4 +39319,10 @@
     </a:ext>
   </a:extLst>
 </a:theme>
+</file>
+
+<file path=docMetadata/LabelInfo.xml><?xml version="1.0" encoding="utf-8"?>
+<clbl:labelList xmlns:clbl="http://schemas.microsoft.com/office/2020/mipLabelMetadata">
+  <clbl:label id="{78ba2ad2-1b1e-4cec-9ee3-2fdbfa21151f}" enabled="1" method="Privileged" siteId="{8c09d8d5-1d78-4adf-9d10-a13cdacb0929}" contentBits="0" removed="0"/>
+</clbl:labelList>
 </file>
</xml_diff>

<commit_message>
Adding of new info + new topic -> Nullable types
</commit_message>
<xml_diff>
--- a/C# Intermediate.pptx
+++ b/C# Intermediate.pptx
@@ -84,6 +84,10 @@
     <p:sldId id="336" r:id="rId78"/>
     <p:sldId id="337" r:id="rId79"/>
     <p:sldId id="338" r:id="rId80"/>
+    <p:sldId id="339" r:id="rId81"/>
+    <p:sldId id="341" r:id="rId82"/>
+    <p:sldId id="343" r:id="rId83"/>
+    <p:sldId id="344" r:id="rId84"/>
   </p:sldIdLst>
   <p:sldSz cx="12192000" cy="6858000"/>
   <p:notesSz cx="6858000" cy="9144000"/>
@@ -386,7 +390,7 @@
           <a:p>
             <a:fld id="{0BD89023-946D-4914-A444-F66256F52110}" type="datetimeFigureOut">
               <a:rPr lang="bg-BG" smtClean="0"/>
-              <a:t>24.2.2023 г.</a:t>
+              <a:t>22.9.2023 г.</a:t>
             </a:fld>
             <a:endParaRPr lang="bg-BG"/>
           </a:p>
@@ -667,7 +671,7 @@
           <a:p>
             <a:fld id="{0BD89023-946D-4914-A444-F66256F52110}" type="datetimeFigureOut">
               <a:rPr lang="bg-BG" smtClean="0"/>
-              <a:t>24.2.2023 г.</a:t>
+              <a:t>22.9.2023 г.</a:t>
             </a:fld>
             <a:endParaRPr lang="bg-BG"/>
           </a:p>
@@ -859,7 +863,7 @@
           <a:p>
             <a:fld id="{0BD89023-946D-4914-A444-F66256F52110}" type="datetimeFigureOut">
               <a:rPr lang="bg-BG" smtClean="0"/>
-              <a:t>24.2.2023 г.</a:t>
+              <a:t>22.9.2023 г.</a:t>
             </a:fld>
             <a:endParaRPr lang="bg-BG"/>
           </a:p>
@@ -1120,7 +1124,7 @@
           <a:p>
             <a:fld id="{0BD89023-946D-4914-A444-F66256F52110}" type="datetimeFigureOut">
               <a:rPr lang="bg-BG" smtClean="0"/>
-              <a:t>24.2.2023 г.</a:t>
+              <a:t>22.9.2023 г.</a:t>
             </a:fld>
             <a:endParaRPr lang="bg-BG"/>
           </a:p>
@@ -1546,7 +1550,7 @@
           <a:p>
             <a:fld id="{0BD89023-946D-4914-A444-F66256F52110}" type="datetimeFigureOut">
               <a:rPr lang="bg-BG" smtClean="0"/>
-              <a:t>24.2.2023 г.</a:t>
+              <a:t>22.9.2023 г.</a:t>
             </a:fld>
             <a:endParaRPr lang="bg-BG"/>
           </a:p>
@@ -2092,7 +2096,7 @@
           <a:p>
             <a:fld id="{0BD89023-946D-4914-A444-F66256F52110}" type="datetimeFigureOut">
               <a:rPr lang="bg-BG" smtClean="0"/>
-              <a:t>24.2.2023 г.</a:t>
+              <a:t>22.9.2023 г.</a:t>
             </a:fld>
             <a:endParaRPr lang="bg-BG"/>
           </a:p>
@@ -2923,7 +2927,7 @@
           <a:p>
             <a:fld id="{0BD89023-946D-4914-A444-F66256F52110}" type="datetimeFigureOut">
               <a:rPr lang="bg-BG" smtClean="0"/>
-              <a:t>24.2.2023 г.</a:t>
+              <a:t>22.9.2023 г.</a:t>
             </a:fld>
             <a:endParaRPr lang="bg-BG"/>
           </a:p>
@@ -3093,7 +3097,7 @@
           <a:p>
             <a:fld id="{0BD89023-946D-4914-A444-F66256F52110}" type="datetimeFigureOut">
               <a:rPr lang="bg-BG" smtClean="0"/>
-              <a:t>24.2.2023 г.</a:t>
+              <a:t>22.9.2023 г.</a:t>
             </a:fld>
             <a:endParaRPr lang="bg-BG"/>
           </a:p>
@@ -3273,7 +3277,7 @@
           <a:p>
             <a:fld id="{0BD89023-946D-4914-A444-F66256F52110}" type="datetimeFigureOut">
               <a:rPr lang="bg-BG" smtClean="0"/>
-              <a:t>24.2.2023 г.</a:t>
+              <a:t>22.9.2023 г.</a:t>
             </a:fld>
             <a:endParaRPr lang="bg-BG"/>
           </a:p>
@@ -3443,7 +3447,7 @@
           <a:p>
             <a:fld id="{0BD89023-946D-4914-A444-F66256F52110}" type="datetimeFigureOut">
               <a:rPr lang="bg-BG" smtClean="0"/>
-              <a:t>24.2.2023 г.</a:t>
+              <a:t>22.9.2023 г.</a:t>
             </a:fld>
             <a:endParaRPr lang="bg-BG"/>
           </a:p>
@@ -3700,7 +3704,7 @@
           <a:p>
             <a:fld id="{0BD89023-946D-4914-A444-F66256F52110}" type="datetimeFigureOut">
               <a:rPr lang="bg-BG" smtClean="0"/>
-              <a:t>24.2.2023 г.</a:t>
+              <a:t>22.9.2023 г.</a:t>
             </a:fld>
             <a:endParaRPr lang="bg-BG"/>
           </a:p>
@@ -3932,7 +3936,7 @@
           <a:p>
             <a:fld id="{0BD89023-946D-4914-A444-F66256F52110}" type="datetimeFigureOut">
               <a:rPr lang="bg-BG" smtClean="0"/>
-              <a:t>24.2.2023 г.</a:t>
+              <a:t>22.9.2023 г.</a:t>
             </a:fld>
             <a:endParaRPr lang="bg-BG"/>
           </a:p>
@@ -4325,7 +4329,7 @@
           <a:p>
             <a:fld id="{0BD89023-946D-4914-A444-F66256F52110}" type="datetimeFigureOut">
               <a:rPr lang="bg-BG" smtClean="0"/>
-              <a:t>24.2.2023 г.</a:t>
+              <a:t>22.9.2023 г.</a:t>
             </a:fld>
             <a:endParaRPr lang="bg-BG"/>
           </a:p>
@@ -4443,7 +4447,7 @@
           <a:p>
             <a:fld id="{0BD89023-946D-4914-A444-F66256F52110}" type="datetimeFigureOut">
               <a:rPr lang="bg-BG" smtClean="0"/>
-              <a:t>24.2.2023 г.</a:t>
+              <a:t>22.9.2023 г.</a:t>
             </a:fld>
             <a:endParaRPr lang="bg-BG"/>
           </a:p>
@@ -4538,7 +4542,7 @@
           <a:p>
             <a:fld id="{0BD89023-946D-4914-A444-F66256F52110}" type="datetimeFigureOut">
               <a:rPr lang="bg-BG" smtClean="0"/>
-              <a:t>24.2.2023 г.</a:t>
+              <a:t>22.9.2023 г.</a:t>
             </a:fld>
             <a:endParaRPr lang="bg-BG"/>
           </a:p>
@@ -4811,7 +4815,7 @@
           <a:p>
             <a:fld id="{0BD89023-946D-4914-A444-F66256F52110}" type="datetimeFigureOut">
               <a:rPr lang="bg-BG" smtClean="0"/>
-              <a:t>24.2.2023 г.</a:t>
+              <a:t>22.9.2023 г.</a:t>
             </a:fld>
             <a:endParaRPr lang="bg-BG"/>
           </a:p>
@@ -5092,7 +5096,7 @@
           <a:p>
             <a:fld id="{0BD89023-946D-4914-A444-F66256F52110}" type="datetimeFigureOut">
               <a:rPr lang="bg-BG" smtClean="0"/>
-              <a:t>24.2.2023 г.</a:t>
+              <a:t>22.9.2023 г.</a:t>
             </a:fld>
             <a:endParaRPr lang="bg-BG"/>
           </a:p>
@@ -5332,7 +5336,7 @@
           <a:p>
             <a:fld id="{0BD89023-946D-4914-A444-F66256F52110}" type="datetimeFigureOut">
               <a:rPr lang="bg-BG" smtClean="0"/>
-              <a:t>24.2.2023 г.</a:t>
+              <a:t>22.9.2023 г.</a:t>
             </a:fld>
             <a:endParaRPr lang="bg-BG"/>
           </a:p>
@@ -38083,13 +38087,8 @@
             </a:r>
             <a:r>
               <a:rPr lang="bg-BG" dirty="0"/>
-              <a:t> </a:t>
-            </a:r>
-            <a:r>
-              <a:rPr lang="bg-BG"/>
-              <a:t>константи.</a:t>
-            </a:r>
-            <a:endParaRPr lang="bg-BG" dirty="0"/>
+              <a:t> константи.</a:t>
+            </a:r>
           </a:p>
           <a:p>
             <a:endParaRPr lang="bg-BG" dirty="0"/>
@@ -38742,6 +38741,2103 @@
     <p:extLst>
       <p:ext uri="{BB962C8B-B14F-4D97-AF65-F5344CB8AC3E}">
         <p14:creationId xmlns:p14="http://schemas.microsoft.com/office/powerpoint/2010/main" val="2720964658"/>
+      </p:ext>
+    </p:extLst>
+  </p:cSld>
+  <p:clrMapOvr>
+    <a:masterClrMapping/>
+  </p:clrMapOvr>
+</p:sld>
+</file>
+
+<file path=ppt/slides/slide80.xml><?xml version="1.0" encoding="utf-8"?>
+<p:sld xmlns:a="http://schemas.openxmlformats.org/drawingml/2006/main" xmlns:r="http://schemas.openxmlformats.org/officeDocument/2006/relationships" xmlns:p="http://schemas.openxmlformats.org/presentationml/2006/main">
+  <p:cSld>
+    <p:spTree>
+      <p:nvGrpSpPr>
+        <p:cNvPr id="1" name=""/>
+        <p:cNvGrpSpPr/>
+        <p:nvPr/>
+      </p:nvGrpSpPr>
+      <p:grpSpPr>
+        <a:xfrm>
+          <a:off x="0" y="0"/>
+          <a:ext cx="0" cy="0"/>
+          <a:chOff x="0" y="0"/>
+          <a:chExt cx="0" cy="0"/>
+        </a:xfrm>
+      </p:grpSpPr>
+      <p:sp>
+        <p:nvSpPr>
+          <p:cNvPr id="2" name="Title 1">
+            <a:extLst>
+              <a:ext uri="{FF2B5EF4-FFF2-40B4-BE49-F238E27FC236}">
+                <a16:creationId xmlns:a16="http://schemas.microsoft.com/office/drawing/2014/main" id="{77913CDD-620C-DD70-9A59-E686C922C3F0}"/>
+              </a:ext>
+            </a:extLst>
+          </p:cNvPr>
+          <p:cNvSpPr>
+            <a:spLocks noGrp="1"/>
+          </p:cNvSpPr>
+          <p:nvPr>
+            <p:ph type="title"/>
+          </p:nvPr>
+        </p:nvSpPr>
+        <p:spPr/>
+        <p:txBody>
+          <a:bodyPr/>
+          <a:lstStyle/>
+          <a:p>
+            <a:pPr algn="ctr"/>
+            <a:r>
+              <a:rPr lang="en-US" dirty="0">
+                <a:latin typeface="Arial" panose="020B0604020202020204" pitchFamily="34" charset="0"/>
+                <a:cs typeface="Arial" panose="020B0604020202020204" pitchFamily="34" charset="0"/>
+              </a:rPr>
+              <a:t>Regular Expressions - </a:t>
+            </a:r>
+            <a:r>
+              <a:rPr lang="en-US" dirty="0" err="1">
+                <a:solidFill>
+                  <a:srgbClr val="FFFF00"/>
+                </a:solidFill>
+                <a:latin typeface="Arial" panose="020B0604020202020204" pitchFamily="34" charset="0"/>
+                <a:cs typeface="Arial" panose="020B0604020202020204" pitchFamily="34" charset="0"/>
+              </a:rPr>
+              <a:t>RegEx</a:t>
+            </a:r>
+            <a:endParaRPr lang="bg-BG" dirty="0">
+              <a:solidFill>
+                <a:srgbClr val="FFFF00"/>
+              </a:solidFill>
+              <a:latin typeface="Arial" panose="020B0604020202020204" pitchFamily="34" charset="0"/>
+              <a:cs typeface="Arial" panose="020B0604020202020204" pitchFamily="34" charset="0"/>
+            </a:endParaRPr>
+          </a:p>
+        </p:txBody>
+      </p:sp>
+      <p:sp>
+        <p:nvSpPr>
+          <p:cNvPr id="3" name="Content Placeholder 2">
+            <a:extLst>
+              <a:ext uri="{FF2B5EF4-FFF2-40B4-BE49-F238E27FC236}">
+                <a16:creationId xmlns:a16="http://schemas.microsoft.com/office/drawing/2014/main" id="{E5543F26-C3FE-6E18-8E96-C71CC7139DF1}"/>
+              </a:ext>
+            </a:extLst>
+          </p:cNvPr>
+          <p:cNvSpPr>
+            <a:spLocks noGrp="1"/>
+          </p:cNvSpPr>
+          <p:nvPr>
+            <p:ph idx="1"/>
+          </p:nvPr>
+        </p:nvSpPr>
+        <p:spPr/>
+        <p:txBody>
+          <a:bodyPr/>
+          <a:lstStyle/>
+          <a:p>
+            <a:r>
+              <a:rPr lang="bg-BG" dirty="0">
+                <a:latin typeface="Arial" panose="020B0604020202020204" pitchFamily="34" charset="0"/>
+                <a:cs typeface="Arial" panose="020B0604020202020204" pitchFamily="34" charset="0"/>
+              </a:rPr>
+              <a:t>Регулярните изрази (</a:t>
+            </a:r>
+            <a:r>
+              <a:rPr lang="en-US" dirty="0">
+                <a:latin typeface="Arial" panose="020B0604020202020204" pitchFamily="34" charset="0"/>
+                <a:cs typeface="Arial" panose="020B0604020202020204" pitchFamily="34" charset="0"/>
+              </a:rPr>
+              <a:t>Regular expressions</a:t>
+            </a:r>
+            <a:r>
+              <a:rPr lang="bg-BG" dirty="0">
+                <a:latin typeface="Arial" panose="020B0604020202020204" pitchFamily="34" charset="0"/>
+                <a:cs typeface="Arial" panose="020B0604020202020204" pitchFamily="34" charset="0"/>
+              </a:rPr>
+              <a:t>)</a:t>
+            </a:r>
+            <a:r>
+              <a:rPr lang="en-US" dirty="0">
+                <a:latin typeface="Arial" panose="020B0604020202020204" pitchFamily="34" charset="0"/>
+                <a:cs typeface="Arial" panose="020B0604020202020204" pitchFamily="34" charset="0"/>
+              </a:rPr>
+              <a:t> </a:t>
+            </a:r>
+            <a:r>
+              <a:rPr lang="bg-BG" dirty="0">
+                <a:latin typeface="Arial" panose="020B0604020202020204" pitchFamily="34" charset="0"/>
+                <a:cs typeface="Arial" panose="020B0604020202020204" pitchFamily="34" charset="0"/>
+              </a:rPr>
+              <a:t>са изрази, които описват шаблон, по-който можем да търсим в текст.</a:t>
+            </a:r>
+          </a:p>
+          <a:p>
+            <a:endParaRPr lang="bg-BG" dirty="0">
+              <a:latin typeface="Arial" panose="020B0604020202020204" pitchFamily="34" charset="0"/>
+              <a:cs typeface="Arial" panose="020B0604020202020204" pitchFamily="34" charset="0"/>
+            </a:endParaRPr>
+          </a:p>
+          <a:p>
+            <a:r>
+              <a:rPr lang="bg-BG" dirty="0">
+                <a:latin typeface="Arial" panose="020B0604020202020204" pitchFamily="34" charset="0"/>
+                <a:cs typeface="Arial" panose="020B0604020202020204" pitchFamily="34" charset="0"/>
+              </a:rPr>
+              <a:t>Регулярните изрази могат да съдържат в себе си: </a:t>
+            </a:r>
+            <a:r>
+              <a:rPr lang="bg-BG" dirty="0">
+                <a:solidFill>
+                  <a:srgbClr val="92D050"/>
+                </a:solidFill>
+                <a:latin typeface="Arial" panose="020B0604020202020204" pitchFamily="34" charset="0"/>
+                <a:cs typeface="Arial" panose="020B0604020202020204" pitchFamily="34" charset="0"/>
+              </a:rPr>
+              <a:t>цифри</a:t>
+            </a:r>
+            <a:r>
+              <a:rPr lang="bg-BG" dirty="0">
+                <a:latin typeface="Arial" panose="020B0604020202020204" pitchFamily="34" charset="0"/>
+                <a:cs typeface="Arial" panose="020B0604020202020204" pitchFamily="34" charset="0"/>
+              </a:rPr>
+              <a:t>, </a:t>
+            </a:r>
+            <a:r>
+              <a:rPr lang="bg-BG" dirty="0">
+                <a:solidFill>
+                  <a:srgbClr val="92D050"/>
+                </a:solidFill>
+                <a:latin typeface="Arial" panose="020B0604020202020204" pitchFamily="34" charset="0"/>
+                <a:cs typeface="Arial" panose="020B0604020202020204" pitchFamily="34" charset="0"/>
+              </a:rPr>
+              <a:t>букви</a:t>
+            </a:r>
+            <a:r>
+              <a:rPr lang="bg-BG" dirty="0">
+                <a:latin typeface="Arial" panose="020B0604020202020204" pitchFamily="34" charset="0"/>
+                <a:cs typeface="Arial" panose="020B0604020202020204" pitchFamily="34" charset="0"/>
+              </a:rPr>
+              <a:t>, </a:t>
+            </a:r>
+            <a:r>
+              <a:rPr lang="bg-BG" dirty="0">
+                <a:solidFill>
+                  <a:srgbClr val="92D050"/>
+                </a:solidFill>
+                <a:latin typeface="Arial" panose="020B0604020202020204" pitchFamily="34" charset="0"/>
+                <a:cs typeface="Arial" panose="020B0604020202020204" pitchFamily="34" charset="0"/>
+              </a:rPr>
+              <a:t>специални символи</a:t>
+            </a:r>
+            <a:r>
+              <a:rPr lang="bg-BG" dirty="0">
+                <a:latin typeface="Arial" panose="020B0604020202020204" pitchFamily="34" charset="0"/>
+                <a:cs typeface="Arial" panose="020B0604020202020204" pitchFamily="34" charset="0"/>
+              </a:rPr>
+              <a:t> и др.</a:t>
+            </a:r>
+          </a:p>
+          <a:p>
+            <a:endParaRPr lang="bg-BG" dirty="0">
+              <a:latin typeface="Arial" panose="020B0604020202020204" pitchFamily="34" charset="0"/>
+              <a:cs typeface="Arial" panose="020B0604020202020204" pitchFamily="34" charset="0"/>
+            </a:endParaRPr>
+          </a:p>
+          <a:p>
+            <a:r>
+              <a:rPr lang="bg-BG" dirty="0">
+                <a:latin typeface="Arial" panose="020B0604020202020204" pitchFamily="34" charset="0"/>
+                <a:cs typeface="Arial" panose="020B0604020202020204" pitchFamily="34" charset="0"/>
+              </a:rPr>
+              <a:t>Пример: </a:t>
+            </a:r>
+            <a:r>
+              <a:rPr lang="en-US" dirty="0">
+                <a:solidFill>
+                  <a:schemeClr val="accent3"/>
+                </a:solidFill>
+                <a:latin typeface="Arial" panose="020B0604020202020204" pitchFamily="34" charset="0"/>
+                <a:cs typeface="Arial" panose="020B0604020202020204" pitchFamily="34" charset="0"/>
+              </a:rPr>
+              <a:t>[A-Z][a-z]+ [A-Z][a-z]+</a:t>
+            </a:r>
+          </a:p>
+          <a:p>
+            <a:pPr marL="0" indent="0">
+              <a:buNone/>
+            </a:pPr>
+            <a:r>
+              <a:rPr lang="en-US" dirty="0">
+                <a:solidFill>
+                  <a:schemeClr val="accent3"/>
+                </a:solidFill>
+                <a:latin typeface="Arial" panose="020B0604020202020204" pitchFamily="34" charset="0"/>
+                <a:cs typeface="Arial" panose="020B0604020202020204" pitchFamily="34" charset="0"/>
+              </a:rPr>
+              <a:t>  </a:t>
+            </a:r>
+            <a:r>
+              <a:rPr lang="en-US" dirty="0">
+                <a:solidFill>
+                  <a:srgbClr val="FFFF00"/>
+                </a:solidFill>
+                <a:latin typeface="Arial" panose="020B0604020202020204" pitchFamily="34" charset="0"/>
+                <a:cs typeface="Arial" panose="020B0604020202020204" pitchFamily="34" charset="0"/>
+              </a:rPr>
+              <a:t>V</a:t>
+            </a:r>
+            <a:r>
+              <a:rPr lang="en-US" dirty="0">
+                <a:latin typeface="Arial" panose="020B0604020202020204" pitchFamily="34" charset="0"/>
+                <a:cs typeface="Arial" panose="020B0604020202020204" pitchFamily="34" charset="0"/>
+              </a:rPr>
+              <a:t>elizar </a:t>
+            </a:r>
+            <a:r>
+              <a:rPr lang="en-US" dirty="0">
+                <a:solidFill>
+                  <a:srgbClr val="FFFF00"/>
+                </a:solidFill>
+                <a:latin typeface="Arial" panose="020B0604020202020204" pitchFamily="34" charset="0"/>
+                <a:cs typeface="Arial" panose="020B0604020202020204" pitchFamily="34" charset="0"/>
+              </a:rPr>
+              <a:t>G</a:t>
+            </a:r>
+            <a:r>
+              <a:rPr lang="en-US" dirty="0">
+                <a:latin typeface="Arial" panose="020B0604020202020204" pitchFamily="34" charset="0"/>
+                <a:cs typeface="Arial" panose="020B0604020202020204" pitchFamily="34" charset="0"/>
+              </a:rPr>
+              <a:t>erasimov</a:t>
+            </a:r>
+            <a:endParaRPr lang="bg-BG" dirty="0">
+              <a:latin typeface="Arial" panose="020B0604020202020204" pitchFamily="34" charset="0"/>
+              <a:cs typeface="Arial" panose="020B0604020202020204" pitchFamily="34" charset="0"/>
+            </a:endParaRPr>
+          </a:p>
+          <a:p>
+            <a:endParaRPr lang="bg-BG" dirty="0"/>
+          </a:p>
+          <a:p>
+            <a:endParaRPr lang="bg-BG" dirty="0"/>
+          </a:p>
+        </p:txBody>
+      </p:sp>
+    </p:spTree>
+    <p:extLst>
+      <p:ext uri="{BB962C8B-B14F-4D97-AF65-F5344CB8AC3E}">
+        <p14:creationId xmlns:p14="http://schemas.microsoft.com/office/powerpoint/2010/main" val="1487788082"/>
+      </p:ext>
+    </p:extLst>
+  </p:cSld>
+  <p:clrMapOvr>
+    <a:masterClrMapping/>
+  </p:clrMapOvr>
+</p:sld>
+</file>
+
+<file path=ppt/slides/slide81.xml><?xml version="1.0" encoding="utf-8"?>
+<p:sld xmlns:a="http://schemas.openxmlformats.org/drawingml/2006/main" xmlns:r="http://schemas.openxmlformats.org/officeDocument/2006/relationships" xmlns:p="http://schemas.openxmlformats.org/presentationml/2006/main">
+  <p:cSld>
+    <p:spTree>
+      <p:nvGrpSpPr>
+        <p:cNvPr id="1" name=""/>
+        <p:cNvGrpSpPr/>
+        <p:nvPr/>
+      </p:nvGrpSpPr>
+      <p:grpSpPr>
+        <a:xfrm>
+          <a:off x="0" y="0"/>
+          <a:ext cx="0" cy="0"/>
+          <a:chOff x="0" y="0"/>
+          <a:chExt cx="0" cy="0"/>
+        </a:xfrm>
+      </p:grpSpPr>
+      <p:sp>
+        <p:nvSpPr>
+          <p:cNvPr id="2" name="Title 1">
+            <a:extLst>
+              <a:ext uri="{FF2B5EF4-FFF2-40B4-BE49-F238E27FC236}">
+                <a16:creationId xmlns:a16="http://schemas.microsoft.com/office/drawing/2014/main" id="{613FEC73-7FFA-D346-CF3B-6EC4680F41F0}"/>
+              </a:ext>
+            </a:extLst>
+          </p:cNvPr>
+          <p:cNvSpPr>
+            <a:spLocks noGrp="1"/>
+          </p:cNvSpPr>
+          <p:nvPr>
+            <p:ph type="title"/>
+          </p:nvPr>
+        </p:nvSpPr>
+        <p:spPr/>
+        <p:txBody>
+          <a:bodyPr/>
+          <a:lstStyle/>
+          <a:p>
+            <a:pPr algn="ctr"/>
+            <a:r>
+              <a:rPr lang="bg-BG" dirty="0">
+                <a:latin typeface="Arial" panose="020B0604020202020204" pitchFamily="34" charset="0"/>
+                <a:cs typeface="Arial" panose="020B0604020202020204" pitchFamily="34" charset="0"/>
+              </a:rPr>
+              <a:t>Примери</a:t>
+            </a:r>
+          </a:p>
+        </p:txBody>
+      </p:sp>
+      <p:sp>
+        <p:nvSpPr>
+          <p:cNvPr id="3" name="Content Placeholder 2">
+            <a:extLst>
+              <a:ext uri="{FF2B5EF4-FFF2-40B4-BE49-F238E27FC236}">
+                <a16:creationId xmlns:a16="http://schemas.microsoft.com/office/drawing/2014/main" id="{2D2E7A40-2C3A-8C73-184E-3BB5D99F3216}"/>
+              </a:ext>
+            </a:extLst>
+          </p:cNvPr>
+          <p:cNvSpPr>
+            <a:spLocks noGrp="1"/>
+          </p:cNvSpPr>
+          <p:nvPr>
+            <p:ph idx="1"/>
+          </p:nvPr>
+        </p:nvSpPr>
+        <p:spPr/>
+        <p:txBody>
+          <a:bodyPr/>
+          <a:lstStyle/>
+          <a:p>
+            <a:pPr marL="0" indent="0">
+              <a:buNone/>
+            </a:pPr>
+            <a:r>
+              <a:rPr lang="en-US" dirty="0" err="1"/>
+              <a:t>regPattern</a:t>
+            </a:r>
+            <a:r>
+              <a:rPr lang="en-US" dirty="0"/>
+              <a:t>: </a:t>
+            </a:r>
+            <a:r>
+              <a:rPr lang="en-US" dirty="0">
+                <a:solidFill>
+                  <a:schemeClr val="accent6">
+                    <a:lumMod val="75000"/>
+                  </a:schemeClr>
+                </a:solidFill>
+              </a:rPr>
+              <a:t>[A-Z][a-z]+ [A-Z][a-z]+</a:t>
+            </a:r>
+          </a:p>
+          <a:p>
+            <a:pPr marL="0" indent="0">
+              <a:buNone/>
+            </a:pPr>
+            <a:r>
+              <a:rPr lang="en-US" dirty="0">
+                <a:solidFill>
+                  <a:srgbClr val="92D050"/>
+                </a:solidFill>
+              </a:rPr>
+              <a:t>Velizar Gerasimov</a:t>
+            </a:r>
+            <a:r>
+              <a:rPr lang="en-US" dirty="0">
+                <a:solidFill>
+                  <a:schemeClr val="tx1"/>
+                </a:solidFill>
+              </a:rPr>
+              <a:t>, </a:t>
+            </a:r>
+            <a:r>
+              <a:rPr lang="en-US" dirty="0" err="1">
+                <a:solidFill>
+                  <a:srgbClr val="92D050"/>
+                </a:solidFill>
+              </a:rPr>
+              <a:t>Nikol</a:t>
+            </a:r>
+            <a:r>
+              <a:rPr lang="en-US" dirty="0">
+                <a:solidFill>
+                  <a:srgbClr val="92D050"/>
+                </a:solidFill>
+              </a:rPr>
+              <a:t> Gerasimova</a:t>
+            </a:r>
+            <a:r>
+              <a:rPr lang="en-US" dirty="0">
+                <a:solidFill>
+                  <a:schemeClr val="tx1"/>
+                </a:solidFill>
+              </a:rPr>
+              <a:t>, </a:t>
+            </a:r>
+            <a:r>
+              <a:rPr lang="en-US" dirty="0">
+                <a:solidFill>
+                  <a:srgbClr val="92D050"/>
+                </a:solidFill>
+              </a:rPr>
+              <a:t>Mario Gerasimov</a:t>
+            </a:r>
+            <a:r>
+              <a:rPr lang="en-US" dirty="0">
+                <a:solidFill>
+                  <a:schemeClr val="tx1"/>
+                </a:solidFill>
+              </a:rPr>
+              <a:t>, </a:t>
+            </a:r>
+            <a:r>
+              <a:rPr lang="en-US" dirty="0" err="1">
+                <a:solidFill>
+                  <a:schemeClr val="tx1"/>
+                </a:solidFill>
+              </a:rPr>
+              <a:t>petko</a:t>
+            </a:r>
+            <a:r>
+              <a:rPr lang="en-US" dirty="0">
+                <a:solidFill>
+                  <a:schemeClr val="tx1"/>
+                </a:solidFill>
+              </a:rPr>
+              <a:t> </a:t>
+            </a:r>
+            <a:r>
+              <a:rPr lang="en-US" dirty="0" err="1">
+                <a:solidFill>
+                  <a:schemeClr val="tx1"/>
+                </a:solidFill>
+              </a:rPr>
+              <a:t>iotov</a:t>
+            </a:r>
+            <a:r>
+              <a:rPr lang="en-US" dirty="0">
+                <a:solidFill>
+                  <a:schemeClr val="tx1"/>
+                </a:solidFill>
+              </a:rPr>
+              <a:t>, </a:t>
+            </a:r>
+            <a:r>
+              <a:rPr lang="en-US" dirty="0" err="1">
+                <a:solidFill>
+                  <a:schemeClr val="tx1"/>
+                </a:solidFill>
+              </a:rPr>
+              <a:t>mihaela</a:t>
+            </a:r>
+            <a:r>
+              <a:rPr lang="en-US" dirty="0">
+                <a:solidFill>
+                  <a:schemeClr val="tx1"/>
+                </a:solidFill>
+              </a:rPr>
+              <a:t> </a:t>
+            </a:r>
+            <a:r>
+              <a:rPr lang="en-US" dirty="0" err="1">
+                <a:solidFill>
+                  <a:schemeClr val="tx1"/>
+                </a:solidFill>
+              </a:rPr>
+              <a:t>metodieva</a:t>
+            </a:r>
+            <a:r>
+              <a:rPr lang="en-US" dirty="0">
+                <a:solidFill>
+                  <a:schemeClr val="tx1"/>
+                </a:solidFill>
+              </a:rPr>
+              <a:t>, </a:t>
+            </a:r>
+            <a:r>
+              <a:rPr lang="en-US" dirty="0">
+                <a:solidFill>
+                  <a:srgbClr val="92D050"/>
+                </a:solidFill>
+              </a:rPr>
+              <a:t>Peter </a:t>
+            </a:r>
+            <a:r>
+              <a:rPr lang="en-US" dirty="0" err="1">
+                <a:solidFill>
+                  <a:srgbClr val="92D050"/>
+                </a:solidFill>
+              </a:rPr>
+              <a:t>Stoichkov</a:t>
+            </a:r>
+            <a:endParaRPr lang="bg-BG" dirty="0">
+              <a:solidFill>
+                <a:srgbClr val="92D050"/>
+              </a:solidFill>
+            </a:endParaRPr>
+          </a:p>
+          <a:p>
+            <a:pPr marL="0" indent="0">
+              <a:buNone/>
+            </a:pPr>
+            <a:endParaRPr lang="bg-BG" dirty="0">
+              <a:solidFill>
+                <a:srgbClr val="92D050"/>
+              </a:solidFill>
+            </a:endParaRPr>
+          </a:p>
+          <a:p>
+            <a:pPr marL="0" indent="0">
+              <a:buNone/>
+            </a:pPr>
+            <a:r>
+              <a:rPr lang="en-US" dirty="0" err="1">
+                <a:solidFill>
+                  <a:schemeClr val="tx1"/>
+                </a:solidFill>
+              </a:rPr>
+              <a:t>regPattern</a:t>
+            </a:r>
+            <a:r>
+              <a:rPr lang="en-US" dirty="0">
+                <a:solidFill>
+                  <a:schemeClr val="tx1"/>
+                </a:solidFill>
+              </a:rPr>
+              <a:t>: </a:t>
+            </a:r>
+            <a:r>
+              <a:rPr lang="en-US" dirty="0">
+                <a:solidFill>
+                  <a:schemeClr val="accent6">
+                    <a:lumMod val="75000"/>
+                  </a:schemeClr>
+                </a:solidFill>
+              </a:rPr>
+              <a:t>[A-Z][a-z]+ \d+</a:t>
+            </a:r>
+          </a:p>
+          <a:p>
+            <a:pPr marL="0" indent="0">
+              <a:buNone/>
+            </a:pPr>
+            <a:r>
+              <a:rPr lang="en-US" dirty="0">
+                <a:solidFill>
+                  <a:schemeClr val="accent3"/>
+                </a:solidFill>
+                <a:latin typeface="Arial" panose="020B0604020202020204" pitchFamily="34" charset="0"/>
+                <a:cs typeface="Arial" panose="020B0604020202020204" pitchFamily="34" charset="0"/>
+              </a:rPr>
+              <a:t>June 24</a:t>
+            </a:r>
+            <a:r>
+              <a:rPr lang="en-US" dirty="0">
+                <a:solidFill>
+                  <a:schemeClr val="tx1"/>
+                </a:solidFill>
+                <a:latin typeface="Arial" panose="020B0604020202020204" pitchFamily="34" charset="0"/>
+                <a:cs typeface="Arial" panose="020B0604020202020204" pitchFamily="34" charset="0"/>
+              </a:rPr>
+              <a:t>, </a:t>
+            </a:r>
+            <a:r>
+              <a:rPr lang="en-US" dirty="0">
+                <a:solidFill>
+                  <a:schemeClr val="accent3"/>
+                </a:solidFill>
+                <a:latin typeface="Arial" panose="020B0604020202020204" pitchFamily="34" charset="0"/>
+                <a:cs typeface="Arial" panose="020B0604020202020204" pitchFamily="34" charset="0"/>
+              </a:rPr>
+              <a:t>March 15</a:t>
+            </a:r>
+            <a:r>
+              <a:rPr lang="en-US" dirty="0">
+                <a:solidFill>
+                  <a:schemeClr val="tx1"/>
+                </a:solidFill>
+                <a:latin typeface="Arial" panose="020B0604020202020204" pitchFamily="34" charset="0"/>
+                <a:cs typeface="Arial" panose="020B0604020202020204" pitchFamily="34" charset="0"/>
+              </a:rPr>
+              <a:t>, </a:t>
+            </a:r>
+            <a:r>
+              <a:rPr lang="en-US" dirty="0">
+                <a:solidFill>
+                  <a:schemeClr val="accent3"/>
+                </a:solidFill>
+                <a:latin typeface="Arial" panose="020B0604020202020204" pitchFamily="34" charset="0"/>
+                <a:cs typeface="Arial" panose="020B0604020202020204" pitchFamily="34" charset="0"/>
+              </a:rPr>
+              <a:t>September 24</a:t>
+            </a:r>
+            <a:r>
+              <a:rPr lang="en-US" dirty="0">
+                <a:solidFill>
+                  <a:schemeClr val="tx1"/>
+                </a:solidFill>
+                <a:latin typeface="Arial" panose="020B0604020202020204" pitchFamily="34" charset="0"/>
+                <a:cs typeface="Arial" panose="020B0604020202020204" pitchFamily="34" charset="0"/>
+              </a:rPr>
+              <a:t>, </a:t>
+            </a:r>
+            <a:r>
+              <a:rPr lang="en-US" dirty="0">
+                <a:solidFill>
+                  <a:schemeClr val="accent3"/>
+                </a:solidFill>
+                <a:latin typeface="Arial" panose="020B0604020202020204" pitchFamily="34" charset="0"/>
+                <a:cs typeface="Arial" panose="020B0604020202020204" pitchFamily="34" charset="0"/>
+              </a:rPr>
+              <a:t>January 30</a:t>
+            </a:r>
+            <a:r>
+              <a:rPr lang="en-US" dirty="0">
+                <a:solidFill>
+                  <a:schemeClr val="tx1"/>
+                </a:solidFill>
+                <a:latin typeface="Arial" panose="020B0604020202020204" pitchFamily="34" charset="0"/>
+                <a:cs typeface="Arial" panose="020B0604020202020204" pitchFamily="34" charset="0"/>
+              </a:rPr>
+              <a:t>, 31 Dec, </a:t>
+            </a:r>
+            <a:r>
+              <a:rPr lang="en-US" dirty="0" err="1">
+                <a:solidFill>
+                  <a:schemeClr val="tx1"/>
+                </a:solidFill>
+                <a:latin typeface="Arial" panose="020B0604020202020204" pitchFamily="34" charset="0"/>
+                <a:cs typeface="Arial" panose="020B0604020202020204" pitchFamily="34" charset="0"/>
+              </a:rPr>
+              <a:t>july</a:t>
+            </a:r>
+            <a:r>
+              <a:rPr lang="en-US" dirty="0">
+                <a:solidFill>
+                  <a:schemeClr val="tx1"/>
+                </a:solidFill>
+                <a:latin typeface="Arial" panose="020B0604020202020204" pitchFamily="34" charset="0"/>
+                <a:cs typeface="Arial" panose="020B0604020202020204" pitchFamily="34" charset="0"/>
+              </a:rPr>
+              <a:t> 01</a:t>
+            </a:r>
+            <a:endParaRPr lang="bg-BG" dirty="0">
+              <a:solidFill>
+                <a:schemeClr val="tx1"/>
+              </a:solidFill>
+              <a:latin typeface="Arial" panose="020B0604020202020204" pitchFamily="34" charset="0"/>
+              <a:cs typeface="Arial" panose="020B0604020202020204" pitchFamily="34" charset="0"/>
+            </a:endParaRPr>
+          </a:p>
+        </p:txBody>
+      </p:sp>
+    </p:spTree>
+    <p:extLst>
+      <p:ext uri="{BB962C8B-B14F-4D97-AF65-F5344CB8AC3E}">
+        <p14:creationId xmlns:p14="http://schemas.microsoft.com/office/powerpoint/2010/main" val="20284970"/>
+      </p:ext>
+    </p:extLst>
+  </p:cSld>
+  <p:clrMapOvr>
+    <a:masterClrMapping/>
+  </p:clrMapOvr>
+</p:sld>
+</file>
+
+<file path=ppt/slides/slide82.xml><?xml version="1.0" encoding="utf-8"?>
+<p:sld xmlns:a="http://schemas.openxmlformats.org/drawingml/2006/main" xmlns:r="http://schemas.openxmlformats.org/officeDocument/2006/relationships" xmlns:p="http://schemas.openxmlformats.org/presentationml/2006/main">
+  <p:cSld>
+    <p:spTree>
+      <p:nvGrpSpPr>
+        <p:cNvPr id="1" name=""/>
+        <p:cNvGrpSpPr/>
+        <p:nvPr/>
+      </p:nvGrpSpPr>
+      <p:grpSpPr>
+        <a:xfrm>
+          <a:off x="0" y="0"/>
+          <a:ext cx="0" cy="0"/>
+          <a:chOff x="0" y="0"/>
+          <a:chExt cx="0" cy="0"/>
+        </a:xfrm>
+      </p:grpSpPr>
+      <p:sp>
+        <p:nvSpPr>
+          <p:cNvPr id="2" name="Title 1">
+            <a:extLst>
+              <a:ext uri="{FF2B5EF4-FFF2-40B4-BE49-F238E27FC236}">
+                <a16:creationId xmlns:a16="http://schemas.microsoft.com/office/drawing/2014/main" id="{C1FF2DCC-3CC6-516F-345E-777FC37BDA88}"/>
+              </a:ext>
+            </a:extLst>
+          </p:cNvPr>
+          <p:cNvSpPr>
+            <a:spLocks noGrp="1"/>
+          </p:cNvSpPr>
+          <p:nvPr>
+            <p:ph type="title"/>
+          </p:nvPr>
+        </p:nvSpPr>
+        <p:spPr/>
+        <p:txBody>
+          <a:bodyPr/>
+          <a:lstStyle/>
+          <a:p>
+            <a:pPr algn="ctr"/>
+            <a:r>
+              <a:rPr lang="en-US" dirty="0">
+                <a:latin typeface="Arial" panose="020B0604020202020204" pitchFamily="34" charset="0"/>
+                <a:cs typeface="Arial" panose="020B0604020202020204" pitchFamily="34" charset="0"/>
+              </a:rPr>
+              <a:t>C# Regex</a:t>
+            </a:r>
+            <a:endParaRPr lang="bg-BG" dirty="0">
+              <a:latin typeface="Arial" panose="020B0604020202020204" pitchFamily="34" charset="0"/>
+              <a:cs typeface="Arial" panose="020B0604020202020204" pitchFamily="34" charset="0"/>
+            </a:endParaRPr>
+          </a:p>
+        </p:txBody>
+      </p:sp>
+      <p:sp>
+        <p:nvSpPr>
+          <p:cNvPr id="3" name="Content Placeholder 2">
+            <a:extLst>
+              <a:ext uri="{FF2B5EF4-FFF2-40B4-BE49-F238E27FC236}">
+                <a16:creationId xmlns:a16="http://schemas.microsoft.com/office/drawing/2014/main" id="{B23BBA30-AA2F-1804-A250-17D8EBB71675}"/>
+              </a:ext>
+            </a:extLst>
+          </p:cNvPr>
+          <p:cNvSpPr>
+            <a:spLocks noGrp="1"/>
+          </p:cNvSpPr>
+          <p:nvPr>
+            <p:ph idx="1"/>
+          </p:nvPr>
+        </p:nvSpPr>
+        <p:spPr>
+          <a:xfrm>
+            <a:off x="1120000" y="1825624"/>
+            <a:ext cx="10233800" cy="4453255"/>
+          </a:xfrm>
+        </p:spPr>
+        <p:txBody>
+          <a:bodyPr>
+            <a:normAutofit fontScale="77500" lnSpcReduction="20000"/>
+          </a:bodyPr>
+          <a:lstStyle/>
+          <a:p>
+            <a:r>
+              <a:rPr lang="en-US" dirty="0"/>
+              <a:t>C# </a:t>
+            </a:r>
+            <a:r>
+              <a:rPr lang="bg-BG" dirty="0"/>
+              <a:t>подържа вграден </a:t>
+            </a:r>
+            <a:r>
+              <a:rPr lang="en-US" dirty="0"/>
+              <a:t>regular expression </a:t>
+            </a:r>
+            <a:r>
+              <a:rPr lang="bg-BG" dirty="0"/>
+              <a:t>клас – </a:t>
+            </a:r>
+            <a:r>
+              <a:rPr lang="en-US" dirty="0" err="1">
+                <a:solidFill>
+                  <a:schemeClr val="accent6"/>
+                </a:solidFill>
+              </a:rPr>
+              <a:t>RegEx</a:t>
+            </a:r>
+            <a:endParaRPr lang="en-US" dirty="0">
+              <a:solidFill>
+                <a:schemeClr val="accent6"/>
+              </a:solidFill>
+            </a:endParaRPr>
+          </a:p>
+          <a:p>
+            <a:endParaRPr lang="en-US" dirty="0">
+              <a:solidFill>
+                <a:schemeClr val="accent6"/>
+              </a:solidFill>
+            </a:endParaRPr>
+          </a:p>
+          <a:p>
+            <a:pPr marL="0" indent="0">
+              <a:buNone/>
+            </a:pPr>
+            <a:r>
+              <a:rPr lang="en-US" sz="2100" dirty="0">
+                <a:solidFill>
+                  <a:srgbClr val="000000"/>
+                </a:solidFill>
+                <a:latin typeface="Console"/>
+              </a:rPr>
+              <a:t> </a:t>
+            </a:r>
+            <a:r>
+              <a:rPr lang="en-US" sz="2100" dirty="0">
+                <a:solidFill>
+                  <a:schemeClr val="accent4">
+                    <a:lumMod val="60000"/>
+                    <a:lumOff val="40000"/>
+                  </a:schemeClr>
+                </a:solidFill>
+                <a:latin typeface="Console"/>
+              </a:rPr>
+              <a:t>string</a:t>
+            </a:r>
+            <a:r>
+              <a:rPr lang="en-US" sz="2100" dirty="0">
+                <a:solidFill>
+                  <a:srgbClr val="000000"/>
+                </a:solidFill>
+                <a:latin typeface="Console"/>
+              </a:rPr>
+              <a:t> </a:t>
+            </a:r>
+            <a:r>
+              <a:rPr lang="en-US" sz="2100" dirty="0">
+                <a:solidFill>
+                  <a:schemeClr val="accent2"/>
+                </a:solidFill>
+                <a:latin typeface="Console"/>
+              </a:rPr>
+              <a:t>names</a:t>
+            </a:r>
+            <a:r>
+              <a:rPr lang="en-US" sz="2100" dirty="0">
+                <a:solidFill>
+                  <a:srgbClr val="000000"/>
+                </a:solidFill>
+                <a:latin typeface="Console"/>
+              </a:rPr>
+              <a:t> </a:t>
+            </a:r>
+            <a:r>
+              <a:rPr lang="en-US" sz="2100" dirty="0">
+                <a:solidFill>
+                  <a:schemeClr val="tx1"/>
+                </a:solidFill>
+                <a:latin typeface="Console"/>
+              </a:rPr>
+              <a:t>=</a:t>
+            </a:r>
+            <a:r>
+              <a:rPr lang="en-US" sz="2100" dirty="0">
+                <a:solidFill>
+                  <a:srgbClr val="000000"/>
+                </a:solidFill>
+                <a:latin typeface="Console"/>
+              </a:rPr>
+              <a:t> </a:t>
+            </a:r>
+            <a:r>
+              <a:rPr lang="en-US" sz="2100" dirty="0">
+                <a:solidFill>
+                  <a:schemeClr val="tx1"/>
+                </a:solidFill>
+                <a:latin typeface="Console"/>
+              </a:rPr>
+              <a:t>"Velizar Gerasimov, </a:t>
+            </a:r>
+            <a:r>
+              <a:rPr lang="en-US" sz="2100" dirty="0" err="1">
+                <a:solidFill>
+                  <a:schemeClr val="tx1"/>
+                </a:solidFill>
+                <a:latin typeface="Console"/>
+              </a:rPr>
+              <a:t>Nikol</a:t>
+            </a:r>
+            <a:r>
+              <a:rPr lang="en-US" sz="2100" dirty="0">
+                <a:solidFill>
+                  <a:schemeClr val="tx1"/>
+                </a:solidFill>
+                <a:latin typeface="Console"/>
+              </a:rPr>
+              <a:t> Gerasimova, Mario Gerasimov," +</a:t>
+            </a:r>
+          </a:p>
+          <a:p>
+            <a:pPr marL="0" indent="0">
+              <a:buNone/>
+            </a:pPr>
+            <a:r>
+              <a:rPr lang="en-US" sz="2100" dirty="0">
+                <a:solidFill>
+                  <a:schemeClr val="tx1"/>
+                </a:solidFill>
+                <a:latin typeface="Console"/>
+              </a:rPr>
+              <a:t>                " </a:t>
+            </a:r>
+            <a:r>
+              <a:rPr lang="en-US" sz="2100" dirty="0" err="1">
+                <a:solidFill>
+                  <a:schemeClr val="tx1"/>
+                </a:solidFill>
+                <a:latin typeface="Console"/>
+              </a:rPr>
+              <a:t>petko</a:t>
+            </a:r>
+            <a:r>
+              <a:rPr lang="en-US" sz="2100" dirty="0">
+                <a:solidFill>
+                  <a:schemeClr val="tx1"/>
+                </a:solidFill>
+                <a:latin typeface="Console"/>
+              </a:rPr>
+              <a:t> </a:t>
+            </a:r>
+            <a:r>
+              <a:rPr lang="en-US" sz="2100" dirty="0" err="1">
+                <a:solidFill>
+                  <a:schemeClr val="tx1"/>
+                </a:solidFill>
+                <a:latin typeface="Console"/>
+              </a:rPr>
+              <a:t>iotov</a:t>
+            </a:r>
+            <a:r>
+              <a:rPr lang="en-US" sz="2100" dirty="0">
+                <a:solidFill>
+                  <a:schemeClr val="tx1"/>
+                </a:solidFill>
+                <a:latin typeface="Console"/>
+              </a:rPr>
+              <a:t>, </a:t>
+            </a:r>
+            <a:r>
+              <a:rPr lang="en-US" sz="2100" dirty="0" err="1">
+                <a:solidFill>
+                  <a:schemeClr val="tx1"/>
+                </a:solidFill>
+                <a:latin typeface="Console"/>
+              </a:rPr>
+              <a:t>mihaela</a:t>
+            </a:r>
+            <a:r>
+              <a:rPr lang="en-US" sz="2100" dirty="0">
+                <a:solidFill>
+                  <a:schemeClr val="tx1"/>
+                </a:solidFill>
+                <a:latin typeface="Console"/>
+              </a:rPr>
+              <a:t> </a:t>
+            </a:r>
+            <a:r>
+              <a:rPr lang="en-US" sz="2100" dirty="0" err="1">
+                <a:solidFill>
+                  <a:schemeClr val="tx1"/>
+                </a:solidFill>
+                <a:latin typeface="Console"/>
+              </a:rPr>
+              <a:t>metodieva</a:t>
+            </a:r>
+            <a:r>
+              <a:rPr lang="en-US" sz="2100" dirty="0">
+                <a:solidFill>
+                  <a:schemeClr val="tx1"/>
+                </a:solidFill>
+                <a:latin typeface="Console"/>
+              </a:rPr>
+              <a:t>, Peter </a:t>
+            </a:r>
+            <a:r>
+              <a:rPr lang="en-US" sz="2100" dirty="0" err="1">
+                <a:solidFill>
+                  <a:schemeClr val="tx1"/>
+                </a:solidFill>
+                <a:latin typeface="Console"/>
+              </a:rPr>
+              <a:t>Stoichkov</a:t>
+            </a:r>
+            <a:r>
+              <a:rPr lang="en-US" sz="2100" dirty="0">
+                <a:solidFill>
+                  <a:schemeClr val="tx1"/>
+                </a:solidFill>
+                <a:latin typeface="Console"/>
+              </a:rPr>
+              <a:t>";</a:t>
+            </a:r>
+          </a:p>
+          <a:p>
+            <a:pPr marL="0" indent="0">
+              <a:buNone/>
+            </a:pPr>
+            <a:endParaRPr lang="bg-BG" sz="2100" dirty="0">
+              <a:solidFill>
+                <a:srgbClr val="000000"/>
+              </a:solidFill>
+              <a:latin typeface="Console"/>
+            </a:endParaRPr>
+          </a:p>
+          <a:p>
+            <a:pPr marL="0" indent="0">
+              <a:buNone/>
+            </a:pPr>
+            <a:r>
+              <a:rPr lang="en-US" sz="2100" dirty="0">
+                <a:solidFill>
+                  <a:srgbClr val="000000"/>
+                </a:solidFill>
+                <a:latin typeface="Console"/>
+              </a:rPr>
+              <a:t>            </a:t>
+            </a:r>
+            <a:r>
+              <a:rPr lang="en-US" sz="2100" dirty="0">
+                <a:solidFill>
+                  <a:schemeClr val="accent4">
+                    <a:lumMod val="60000"/>
+                    <a:lumOff val="40000"/>
+                  </a:schemeClr>
+                </a:solidFill>
+                <a:latin typeface="Console"/>
+              </a:rPr>
+              <a:t>string</a:t>
+            </a:r>
+            <a:r>
+              <a:rPr lang="en-US" sz="2100" dirty="0">
+                <a:solidFill>
+                  <a:srgbClr val="000000"/>
+                </a:solidFill>
+                <a:latin typeface="Console"/>
+              </a:rPr>
+              <a:t> </a:t>
+            </a:r>
+            <a:r>
+              <a:rPr lang="en-US" sz="2100" dirty="0">
+                <a:solidFill>
+                  <a:schemeClr val="accent2"/>
+                </a:solidFill>
+                <a:latin typeface="Console"/>
+              </a:rPr>
+              <a:t>pattern</a:t>
+            </a:r>
+            <a:r>
+              <a:rPr lang="en-US" sz="2100" dirty="0">
+                <a:solidFill>
+                  <a:srgbClr val="000000"/>
+                </a:solidFill>
+                <a:latin typeface="Console"/>
+              </a:rPr>
+              <a:t> </a:t>
+            </a:r>
+            <a:r>
+              <a:rPr lang="en-US" sz="2100" dirty="0">
+                <a:solidFill>
+                  <a:schemeClr val="tx1"/>
+                </a:solidFill>
+                <a:latin typeface="Console"/>
+              </a:rPr>
+              <a:t>=</a:t>
+            </a:r>
+            <a:r>
+              <a:rPr lang="en-US" sz="2100" dirty="0">
+                <a:solidFill>
+                  <a:srgbClr val="000000"/>
+                </a:solidFill>
+                <a:latin typeface="Console"/>
+              </a:rPr>
+              <a:t> </a:t>
+            </a:r>
+            <a:r>
+              <a:rPr lang="en-US" sz="2100" dirty="0">
+                <a:solidFill>
+                  <a:schemeClr val="accent5">
+                    <a:lumMod val="60000"/>
+                    <a:lumOff val="40000"/>
+                  </a:schemeClr>
+                </a:solidFill>
+                <a:latin typeface="Console"/>
+              </a:rPr>
+              <a:t>@"[A-Z][a-z]+ [A-Z][a-z]+";</a:t>
+            </a:r>
+            <a:r>
+              <a:rPr lang="bg-BG" sz="2100" dirty="0">
+                <a:solidFill>
+                  <a:schemeClr val="accent5">
+                    <a:lumMod val="60000"/>
+                    <a:lumOff val="40000"/>
+                  </a:schemeClr>
+                </a:solidFill>
+                <a:latin typeface="Console"/>
+              </a:rPr>
+              <a:t> </a:t>
+            </a:r>
+            <a:r>
+              <a:rPr lang="en-US" sz="2100" dirty="0">
+                <a:solidFill>
+                  <a:schemeClr val="accent5">
+                    <a:lumMod val="60000"/>
+                    <a:lumOff val="40000"/>
+                  </a:schemeClr>
+                </a:solidFill>
+                <a:latin typeface="Console"/>
+              </a:rPr>
+              <a:t>		</a:t>
+            </a:r>
+            <a:r>
+              <a:rPr lang="bg-BG" sz="2100" dirty="0">
+                <a:solidFill>
+                  <a:srgbClr val="FFFF00"/>
+                </a:solidFill>
+                <a:latin typeface="Console"/>
+              </a:rPr>
+              <a:t>//</a:t>
+            </a:r>
+            <a:r>
+              <a:rPr lang="en-US" sz="2100" dirty="0">
+                <a:solidFill>
+                  <a:srgbClr val="FFFF00"/>
+                </a:solidFill>
+                <a:latin typeface="Console"/>
+              </a:rPr>
+              <a:t>Check in </a:t>
+            </a:r>
+            <a:r>
+              <a:rPr lang="en-US" sz="2100" dirty="0" err="1">
+                <a:solidFill>
+                  <a:srgbClr val="FFFF00"/>
+                </a:solidFill>
+                <a:latin typeface="Console"/>
+              </a:rPr>
+              <a:t>RegExr</a:t>
+            </a:r>
+            <a:r>
+              <a:rPr lang="en-US" sz="2100" dirty="0">
+                <a:solidFill>
+                  <a:srgbClr val="FFFF00"/>
+                </a:solidFill>
+                <a:latin typeface="Console"/>
+              </a:rPr>
+              <a:t> or RegEx101</a:t>
+            </a:r>
+          </a:p>
+          <a:p>
+            <a:pPr marL="0" indent="0">
+              <a:buNone/>
+            </a:pPr>
+            <a:endParaRPr lang="bg-BG" sz="2100" dirty="0">
+              <a:solidFill>
+                <a:srgbClr val="000000"/>
+              </a:solidFill>
+              <a:latin typeface="Console"/>
+            </a:endParaRPr>
+          </a:p>
+          <a:p>
+            <a:pPr marL="0" indent="0">
+              <a:buNone/>
+            </a:pPr>
+            <a:r>
+              <a:rPr lang="en-US" sz="2100" dirty="0">
+                <a:solidFill>
+                  <a:srgbClr val="000000"/>
+                </a:solidFill>
+                <a:latin typeface="Console"/>
+              </a:rPr>
+              <a:t>            </a:t>
+            </a:r>
+            <a:r>
+              <a:rPr lang="en-US" sz="2100" dirty="0">
+                <a:solidFill>
+                  <a:schemeClr val="accent4">
+                    <a:lumMod val="60000"/>
+                    <a:lumOff val="40000"/>
+                  </a:schemeClr>
+                </a:solidFill>
+                <a:latin typeface="Console"/>
+              </a:rPr>
+              <a:t>Regex</a:t>
+            </a:r>
+            <a:r>
+              <a:rPr lang="en-US" sz="2100" dirty="0">
+                <a:solidFill>
+                  <a:srgbClr val="000000"/>
+                </a:solidFill>
+                <a:latin typeface="Console"/>
+              </a:rPr>
+              <a:t> </a:t>
+            </a:r>
+            <a:r>
+              <a:rPr lang="en-US" sz="2100" dirty="0" err="1">
+                <a:solidFill>
+                  <a:schemeClr val="accent2"/>
+                </a:solidFill>
+                <a:latin typeface="Console"/>
+              </a:rPr>
+              <a:t>regEx</a:t>
+            </a:r>
+            <a:r>
+              <a:rPr lang="en-US" sz="2100" dirty="0">
+                <a:solidFill>
+                  <a:srgbClr val="000000"/>
+                </a:solidFill>
+                <a:latin typeface="Console"/>
+              </a:rPr>
+              <a:t> </a:t>
+            </a:r>
+            <a:r>
+              <a:rPr lang="en-US" sz="2100" dirty="0">
+                <a:solidFill>
+                  <a:schemeClr val="tx1"/>
+                </a:solidFill>
+                <a:latin typeface="Console"/>
+              </a:rPr>
+              <a:t>= </a:t>
+            </a:r>
+            <a:r>
+              <a:rPr lang="en-US" sz="2100" dirty="0">
+                <a:solidFill>
+                  <a:schemeClr val="accent6">
+                    <a:lumMod val="75000"/>
+                  </a:schemeClr>
+                </a:solidFill>
+                <a:latin typeface="Console"/>
+              </a:rPr>
+              <a:t>new</a:t>
+            </a:r>
+            <a:r>
+              <a:rPr lang="en-US" sz="2100" dirty="0">
+                <a:solidFill>
+                  <a:srgbClr val="000000"/>
+                </a:solidFill>
+                <a:latin typeface="Console"/>
+              </a:rPr>
+              <a:t> </a:t>
+            </a:r>
+            <a:r>
+              <a:rPr lang="en-US" sz="2100" dirty="0">
+                <a:solidFill>
+                  <a:schemeClr val="accent4">
+                    <a:lumMod val="60000"/>
+                    <a:lumOff val="40000"/>
+                  </a:schemeClr>
+                </a:solidFill>
+                <a:latin typeface="Console"/>
+              </a:rPr>
+              <a:t>Regex</a:t>
+            </a:r>
+            <a:r>
+              <a:rPr lang="en-US" sz="2100" dirty="0">
+                <a:solidFill>
+                  <a:schemeClr val="tx1"/>
+                </a:solidFill>
+                <a:latin typeface="Console"/>
+              </a:rPr>
+              <a:t>(</a:t>
+            </a:r>
+            <a:r>
+              <a:rPr lang="en-US" sz="2100" dirty="0">
+                <a:solidFill>
+                  <a:schemeClr val="accent2"/>
+                </a:solidFill>
+                <a:latin typeface="Console"/>
+              </a:rPr>
+              <a:t>pattern</a:t>
+            </a:r>
+            <a:r>
+              <a:rPr lang="en-US" sz="2100" dirty="0">
+                <a:solidFill>
+                  <a:schemeClr val="tx1"/>
+                </a:solidFill>
+                <a:latin typeface="Console"/>
+              </a:rPr>
+              <a:t>);</a:t>
+            </a:r>
+          </a:p>
+          <a:p>
+            <a:pPr marL="0" indent="0">
+              <a:buNone/>
+            </a:pPr>
+            <a:endParaRPr lang="bg-BG" sz="2100" dirty="0">
+              <a:solidFill>
+                <a:srgbClr val="0000FF"/>
+              </a:solidFill>
+              <a:latin typeface="Console"/>
+            </a:endParaRPr>
+          </a:p>
+          <a:p>
+            <a:pPr marL="0" indent="0">
+              <a:buNone/>
+            </a:pPr>
+            <a:r>
+              <a:rPr lang="en-US" sz="2100" dirty="0">
+                <a:solidFill>
+                  <a:srgbClr val="000000"/>
+                </a:solidFill>
+                <a:latin typeface="Console"/>
+              </a:rPr>
+              <a:t>            </a:t>
+            </a:r>
+            <a:r>
+              <a:rPr lang="en-US" sz="2100" dirty="0" err="1">
+                <a:solidFill>
+                  <a:schemeClr val="accent4">
+                    <a:lumMod val="60000"/>
+                    <a:lumOff val="40000"/>
+                  </a:schemeClr>
+                </a:solidFill>
+                <a:latin typeface="Console"/>
+              </a:rPr>
+              <a:t>MatchCollection</a:t>
+            </a:r>
+            <a:r>
+              <a:rPr lang="en-US" sz="2100" dirty="0">
+                <a:solidFill>
+                  <a:srgbClr val="000000"/>
+                </a:solidFill>
+                <a:latin typeface="Console"/>
+              </a:rPr>
+              <a:t> </a:t>
+            </a:r>
+            <a:r>
+              <a:rPr lang="en-US" sz="2100" dirty="0" err="1">
+                <a:solidFill>
+                  <a:schemeClr val="accent2"/>
+                </a:solidFill>
+                <a:latin typeface="Console"/>
+              </a:rPr>
+              <a:t>matchCollection</a:t>
+            </a:r>
+            <a:r>
+              <a:rPr lang="en-US" sz="2100" dirty="0">
+                <a:solidFill>
+                  <a:srgbClr val="000000"/>
+                </a:solidFill>
+                <a:latin typeface="Console"/>
+              </a:rPr>
+              <a:t> </a:t>
+            </a:r>
+            <a:r>
+              <a:rPr lang="en-US" sz="2100" dirty="0">
+                <a:solidFill>
+                  <a:schemeClr val="tx1"/>
+                </a:solidFill>
+                <a:latin typeface="Console"/>
+              </a:rPr>
+              <a:t>=</a:t>
+            </a:r>
+            <a:r>
+              <a:rPr lang="en-US" sz="2100" dirty="0">
+                <a:solidFill>
+                  <a:srgbClr val="000000"/>
+                </a:solidFill>
+                <a:latin typeface="Console"/>
+              </a:rPr>
+              <a:t> </a:t>
+            </a:r>
+            <a:r>
+              <a:rPr lang="en-US" sz="2100" dirty="0" err="1">
+                <a:solidFill>
+                  <a:schemeClr val="accent2"/>
+                </a:solidFill>
+                <a:latin typeface="Console"/>
+              </a:rPr>
+              <a:t>regEx</a:t>
+            </a:r>
+            <a:r>
+              <a:rPr lang="en-US" sz="2100" dirty="0" err="1">
+                <a:solidFill>
+                  <a:srgbClr val="000000"/>
+                </a:solidFill>
+                <a:latin typeface="Console"/>
+              </a:rPr>
+              <a:t>.</a:t>
+            </a:r>
+            <a:r>
+              <a:rPr lang="en-US" sz="2100" dirty="0" err="1">
+                <a:solidFill>
+                  <a:schemeClr val="accent1">
+                    <a:lumMod val="60000"/>
+                    <a:lumOff val="40000"/>
+                  </a:schemeClr>
+                </a:solidFill>
+                <a:latin typeface="Console"/>
+              </a:rPr>
+              <a:t>Matches</a:t>
+            </a:r>
+            <a:r>
+              <a:rPr lang="en-US" sz="2100" dirty="0">
+                <a:solidFill>
+                  <a:schemeClr val="tx1"/>
+                </a:solidFill>
+                <a:latin typeface="Console"/>
+              </a:rPr>
+              <a:t>(</a:t>
+            </a:r>
+            <a:r>
+              <a:rPr lang="en-US" sz="2100" dirty="0">
+                <a:solidFill>
+                  <a:schemeClr val="accent2"/>
+                </a:solidFill>
+                <a:latin typeface="Console"/>
+              </a:rPr>
+              <a:t>names</a:t>
+            </a:r>
+            <a:r>
+              <a:rPr lang="en-US" sz="2100" dirty="0">
+                <a:solidFill>
+                  <a:schemeClr val="tx1"/>
+                </a:solidFill>
+                <a:latin typeface="Console"/>
+              </a:rPr>
+              <a:t>);</a:t>
+            </a:r>
+          </a:p>
+          <a:p>
+            <a:pPr marL="0" indent="0">
+              <a:buNone/>
+            </a:pPr>
+            <a:r>
+              <a:rPr lang="en-US" sz="2100" dirty="0">
+                <a:solidFill>
+                  <a:srgbClr val="000000"/>
+                </a:solidFill>
+                <a:latin typeface="Console"/>
+              </a:rPr>
+              <a:t>            </a:t>
+            </a:r>
+            <a:r>
+              <a:rPr lang="en-US" sz="2100" dirty="0">
+                <a:solidFill>
+                  <a:schemeClr val="accent4">
+                    <a:lumMod val="60000"/>
+                    <a:lumOff val="40000"/>
+                  </a:schemeClr>
+                </a:solidFill>
+                <a:latin typeface="Console"/>
+              </a:rPr>
+              <a:t>foreach</a:t>
+            </a:r>
+            <a:r>
+              <a:rPr lang="en-US" sz="2100" dirty="0">
+                <a:solidFill>
+                  <a:srgbClr val="000000"/>
+                </a:solidFill>
+                <a:latin typeface="Console"/>
+              </a:rPr>
+              <a:t> </a:t>
+            </a:r>
+            <a:r>
+              <a:rPr lang="en-US" sz="2100" dirty="0">
+                <a:solidFill>
+                  <a:schemeClr val="tx1"/>
+                </a:solidFill>
+                <a:latin typeface="Console"/>
+              </a:rPr>
+              <a:t>(</a:t>
+            </a:r>
+            <a:r>
+              <a:rPr lang="en-US" sz="2100" dirty="0">
+                <a:solidFill>
+                  <a:schemeClr val="accent4">
+                    <a:lumMod val="60000"/>
+                    <a:lumOff val="40000"/>
+                  </a:schemeClr>
+                </a:solidFill>
+                <a:latin typeface="Console"/>
+              </a:rPr>
+              <a:t>Match</a:t>
+            </a:r>
+            <a:r>
+              <a:rPr lang="en-US" sz="2100" dirty="0">
+                <a:solidFill>
+                  <a:srgbClr val="000000"/>
+                </a:solidFill>
+                <a:latin typeface="Console"/>
+              </a:rPr>
+              <a:t> </a:t>
+            </a:r>
+            <a:r>
+              <a:rPr lang="en-US" sz="2100" dirty="0" err="1">
+                <a:solidFill>
+                  <a:schemeClr val="tx1"/>
+                </a:solidFill>
+                <a:latin typeface="Console"/>
+              </a:rPr>
+              <a:t>match</a:t>
+            </a:r>
+            <a:r>
+              <a:rPr lang="en-US" sz="2100" dirty="0">
+                <a:solidFill>
+                  <a:srgbClr val="000000"/>
+                </a:solidFill>
+                <a:latin typeface="Console"/>
+              </a:rPr>
+              <a:t> </a:t>
+            </a:r>
+            <a:r>
+              <a:rPr lang="en-US" sz="2100" dirty="0">
+                <a:solidFill>
+                  <a:schemeClr val="accent3"/>
+                </a:solidFill>
+                <a:latin typeface="Console"/>
+              </a:rPr>
+              <a:t>in </a:t>
+            </a:r>
+            <a:r>
+              <a:rPr lang="en-US" sz="2100" dirty="0" err="1">
+                <a:solidFill>
+                  <a:schemeClr val="tx1"/>
+                </a:solidFill>
+                <a:latin typeface="Console"/>
+              </a:rPr>
+              <a:t>matchCollection</a:t>
+            </a:r>
+            <a:r>
+              <a:rPr lang="en-US" sz="2100" dirty="0">
+                <a:solidFill>
+                  <a:schemeClr val="tx1"/>
+                </a:solidFill>
+                <a:latin typeface="Console"/>
+              </a:rPr>
+              <a:t>)</a:t>
+            </a:r>
+          </a:p>
+          <a:p>
+            <a:pPr marL="0" indent="0">
+              <a:buNone/>
+            </a:pPr>
+            <a:r>
+              <a:rPr lang="bg-BG" sz="2100" dirty="0">
+                <a:solidFill>
+                  <a:schemeClr val="tx1"/>
+                </a:solidFill>
+                <a:latin typeface="Console"/>
+              </a:rPr>
+              <a:t>            {</a:t>
+            </a:r>
+          </a:p>
+          <a:p>
+            <a:pPr marL="0" indent="0">
+              <a:buNone/>
+            </a:pPr>
+            <a:r>
+              <a:rPr lang="en-US" sz="2100" dirty="0">
+                <a:solidFill>
+                  <a:schemeClr val="tx1"/>
+                </a:solidFill>
+                <a:latin typeface="Console"/>
+              </a:rPr>
+              <a:t>                </a:t>
+            </a:r>
+            <a:r>
+              <a:rPr lang="en-US" sz="2100" dirty="0" err="1">
+                <a:solidFill>
+                  <a:schemeClr val="accent3"/>
+                </a:solidFill>
+                <a:latin typeface="Console"/>
+              </a:rPr>
+              <a:t>Console</a:t>
+            </a:r>
+            <a:r>
+              <a:rPr lang="en-US" sz="2100" dirty="0" err="1">
+                <a:solidFill>
+                  <a:schemeClr val="tx1"/>
+                </a:solidFill>
+                <a:latin typeface="Console"/>
+              </a:rPr>
+              <a:t>.</a:t>
+            </a:r>
+            <a:r>
+              <a:rPr lang="en-US" sz="2100" dirty="0" err="1">
+                <a:solidFill>
+                  <a:schemeClr val="accent1">
+                    <a:lumMod val="60000"/>
+                    <a:lumOff val="40000"/>
+                  </a:schemeClr>
+                </a:solidFill>
+                <a:latin typeface="Console"/>
+              </a:rPr>
+              <a:t>Write</a:t>
+            </a:r>
+            <a:r>
+              <a:rPr lang="en-US" sz="2100" dirty="0">
+                <a:solidFill>
+                  <a:schemeClr val="tx1"/>
+                </a:solidFill>
+                <a:latin typeface="Console"/>
+              </a:rPr>
+              <a:t>($"{</a:t>
+            </a:r>
+            <a:r>
+              <a:rPr lang="en-US" sz="2100" err="1">
+                <a:solidFill>
+                  <a:schemeClr val="tx1"/>
+                </a:solidFill>
+                <a:latin typeface="Console"/>
+              </a:rPr>
+              <a:t>match</a:t>
+            </a:r>
+            <a:r>
+              <a:rPr lang="en-US" sz="2100">
+                <a:solidFill>
+                  <a:schemeClr val="tx1"/>
+                </a:solidFill>
+                <a:latin typeface="Console"/>
+              </a:rPr>
+              <a:t>.Value} </a:t>
+            </a:r>
+            <a:r>
+              <a:rPr lang="en-US" sz="2100" dirty="0">
+                <a:solidFill>
+                  <a:schemeClr val="tx1"/>
+                </a:solidFill>
+                <a:latin typeface="Console"/>
+              </a:rPr>
+              <a:t>");</a:t>
+            </a:r>
+          </a:p>
+          <a:p>
+            <a:pPr marL="0" indent="0">
+              <a:buNone/>
+            </a:pPr>
+            <a:r>
+              <a:rPr lang="bg-BG" sz="2100" dirty="0">
+                <a:solidFill>
+                  <a:schemeClr val="tx1"/>
+                </a:solidFill>
+                <a:latin typeface="Console"/>
+              </a:rPr>
+              <a:t>            }</a:t>
+            </a:r>
+            <a:endParaRPr lang="en-US" sz="2100" dirty="0">
+              <a:solidFill>
+                <a:schemeClr val="tx1"/>
+              </a:solidFill>
+              <a:latin typeface="Console"/>
+            </a:endParaRPr>
+          </a:p>
+          <a:p>
+            <a:endParaRPr lang="bg-BG" dirty="0"/>
+          </a:p>
+        </p:txBody>
+      </p:sp>
+    </p:spTree>
+    <p:extLst>
+      <p:ext uri="{BB962C8B-B14F-4D97-AF65-F5344CB8AC3E}">
+        <p14:creationId xmlns:p14="http://schemas.microsoft.com/office/powerpoint/2010/main" val="2980968886"/>
+      </p:ext>
+    </p:extLst>
+  </p:cSld>
+  <p:clrMapOvr>
+    <a:masterClrMapping/>
+  </p:clrMapOvr>
+</p:sld>
+</file>
+
+<file path=ppt/slides/slide83.xml><?xml version="1.0" encoding="utf-8"?>
+<p:sld xmlns:a="http://schemas.openxmlformats.org/drawingml/2006/main" xmlns:r="http://schemas.openxmlformats.org/officeDocument/2006/relationships" xmlns:p="http://schemas.openxmlformats.org/presentationml/2006/main">
+  <p:cSld>
+    <p:spTree>
+      <p:nvGrpSpPr>
+        <p:cNvPr id="1" name=""/>
+        <p:cNvGrpSpPr/>
+        <p:nvPr/>
+      </p:nvGrpSpPr>
+      <p:grpSpPr>
+        <a:xfrm>
+          <a:off x="0" y="0"/>
+          <a:ext cx="0" cy="0"/>
+          <a:chOff x="0" y="0"/>
+          <a:chExt cx="0" cy="0"/>
+        </a:xfrm>
+      </p:grpSpPr>
+      <p:sp>
+        <p:nvSpPr>
+          <p:cNvPr id="2" name="Title 1">
+            <a:extLst>
+              <a:ext uri="{FF2B5EF4-FFF2-40B4-BE49-F238E27FC236}">
+                <a16:creationId xmlns:a16="http://schemas.microsoft.com/office/drawing/2014/main" id="{A178F44A-A1C3-3BEA-E711-CF242E4E53C3}"/>
+              </a:ext>
+            </a:extLst>
+          </p:cNvPr>
+          <p:cNvSpPr>
+            <a:spLocks noGrp="1"/>
+          </p:cNvSpPr>
+          <p:nvPr>
+            <p:ph type="title"/>
+          </p:nvPr>
+        </p:nvSpPr>
+        <p:spPr/>
+        <p:txBody>
+          <a:bodyPr/>
+          <a:lstStyle/>
+          <a:p>
+            <a:pPr algn="ctr"/>
+            <a:r>
+              <a:rPr lang="en-US" dirty="0">
+                <a:latin typeface="Arial" panose="020B0604020202020204" pitchFamily="34" charset="0"/>
+                <a:cs typeface="Arial" panose="020B0604020202020204" pitchFamily="34" charset="0"/>
+              </a:rPr>
+              <a:t>C# Nullable types</a:t>
+            </a:r>
+            <a:endParaRPr lang="bg-BG" dirty="0">
+              <a:latin typeface="Arial" panose="020B0604020202020204" pitchFamily="34" charset="0"/>
+              <a:cs typeface="Arial" panose="020B0604020202020204" pitchFamily="34" charset="0"/>
+            </a:endParaRPr>
+          </a:p>
+        </p:txBody>
+      </p:sp>
+      <p:sp>
+        <p:nvSpPr>
+          <p:cNvPr id="3" name="Content Placeholder 2">
+            <a:extLst>
+              <a:ext uri="{FF2B5EF4-FFF2-40B4-BE49-F238E27FC236}">
+                <a16:creationId xmlns:a16="http://schemas.microsoft.com/office/drawing/2014/main" id="{EC0CDC2F-5BFA-8D42-E6E2-AA617B3583D2}"/>
+              </a:ext>
+            </a:extLst>
+          </p:cNvPr>
+          <p:cNvSpPr>
+            <a:spLocks noGrp="1"/>
+          </p:cNvSpPr>
+          <p:nvPr>
+            <p:ph idx="1"/>
+          </p:nvPr>
+        </p:nvSpPr>
+        <p:spPr/>
+        <p:txBody>
+          <a:bodyPr>
+            <a:normAutofit/>
+          </a:bodyPr>
+          <a:lstStyle/>
+          <a:p>
+            <a:r>
+              <a:rPr lang="en-US" dirty="0">
+                <a:solidFill>
+                  <a:srgbClr val="FFFF00"/>
+                </a:solidFill>
+              </a:rPr>
+              <a:t>null</a:t>
+            </a:r>
+            <a:r>
+              <a:rPr lang="en-US" dirty="0"/>
+              <a:t> </a:t>
+            </a:r>
+            <a:r>
+              <a:rPr lang="bg-BG" dirty="0"/>
+              <a:t>е ключова дума в езика </a:t>
+            </a:r>
+            <a:r>
+              <a:rPr lang="en-US" dirty="0"/>
+              <a:t>C#</a:t>
+            </a:r>
+            <a:r>
+              <a:rPr lang="bg-BG" dirty="0"/>
+              <a:t>, която значи </a:t>
+            </a:r>
+            <a:r>
+              <a:rPr lang="bg-BG" dirty="0">
+                <a:solidFill>
+                  <a:srgbClr val="92D050"/>
+                </a:solidFill>
+              </a:rPr>
+              <a:t>„липса на стойност“</a:t>
+            </a:r>
+            <a:r>
+              <a:rPr lang="bg-BG" dirty="0">
+                <a:solidFill>
+                  <a:schemeClr val="tx1"/>
+                </a:solidFill>
+              </a:rPr>
+              <a:t>.</a:t>
+            </a:r>
+            <a:endParaRPr lang="en-US" dirty="0">
+              <a:solidFill>
+                <a:schemeClr val="tx1"/>
+              </a:solidFill>
+            </a:endParaRPr>
+          </a:p>
+          <a:p>
+            <a:r>
+              <a:rPr lang="en-US" dirty="0">
+                <a:solidFill>
+                  <a:srgbClr val="92D050"/>
+                </a:solidFill>
+                <a:latin typeface="Arial" panose="020B0604020202020204" pitchFamily="34" charset="0"/>
+                <a:cs typeface="Arial" panose="020B0604020202020204" pitchFamily="34" charset="0"/>
+              </a:rPr>
+              <a:t>C# 2.0 </a:t>
+            </a:r>
+            <a:r>
+              <a:rPr lang="bg-BG" dirty="0">
+                <a:solidFill>
+                  <a:schemeClr val="tx1"/>
+                </a:solidFill>
+                <a:latin typeface="Arial" panose="020B0604020202020204" pitchFamily="34" charset="0"/>
+                <a:cs typeface="Arial" panose="020B0604020202020204" pitchFamily="34" charset="0"/>
+              </a:rPr>
+              <a:t>въвежда възможността </a:t>
+            </a:r>
+            <a:r>
+              <a:rPr lang="en-US" dirty="0">
+                <a:solidFill>
+                  <a:srgbClr val="92D050"/>
+                </a:solidFill>
+                <a:latin typeface="Arial" panose="020B0604020202020204" pitchFamily="34" charset="0"/>
+                <a:cs typeface="Arial" panose="020B0604020202020204" pitchFamily="34" charset="0"/>
+              </a:rPr>
+              <a:t>value</a:t>
+            </a:r>
+            <a:r>
+              <a:rPr lang="en-US" dirty="0">
+                <a:solidFill>
+                  <a:schemeClr val="tx1"/>
+                </a:solidFill>
+                <a:latin typeface="Arial" panose="020B0604020202020204" pitchFamily="34" charset="0"/>
+                <a:cs typeface="Arial" panose="020B0604020202020204" pitchFamily="34" charset="0"/>
+              </a:rPr>
+              <a:t> </a:t>
+            </a:r>
+            <a:r>
+              <a:rPr lang="bg-BG" dirty="0">
+                <a:solidFill>
+                  <a:schemeClr val="tx1"/>
+                </a:solidFill>
+                <a:latin typeface="Arial" panose="020B0604020202020204" pitchFamily="34" charset="0"/>
+                <a:cs typeface="Arial" panose="020B0604020202020204" pitchFamily="34" charset="0"/>
+              </a:rPr>
+              <a:t>типовете да могат да бъдат </a:t>
+            </a:r>
+            <a:r>
+              <a:rPr lang="en-US" dirty="0">
+                <a:solidFill>
+                  <a:srgbClr val="FFFF00"/>
+                </a:solidFill>
+                <a:latin typeface="Arial" panose="020B0604020202020204" pitchFamily="34" charset="0"/>
+                <a:cs typeface="Arial" panose="020B0604020202020204" pitchFamily="34" charset="0"/>
+              </a:rPr>
+              <a:t>nullable</a:t>
+            </a:r>
+            <a:r>
+              <a:rPr lang="en-US" dirty="0">
+                <a:solidFill>
+                  <a:schemeClr val="tx1"/>
+                </a:solidFill>
+                <a:latin typeface="Arial" panose="020B0604020202020204" pitchFamily="34" charset="0"/>
+                <a:cs typeface="Arial" panose="020B0604020202020204" pitchFamily="34" charset="0"/>
+              </a:rPr>
+              <a:t>.</a:t>
+            </a:r>
+          </a:p>
+          <a:p>
+            <a:r>
+              <a:rPr lang="bg-BG" dirty="0">
+                <a:solidFill>
+                  <a:schemeClr val="tx1"/>
+                </a:solidFill>
+                <a:latin typeface="Arial" panose="020B0604020202020204" pitchFamily="34" charset="0"/>
+                <a:cs typeface="Arial" panose="020B0604020202020204" pitchFamily="34" charset="0"/>
+              </a:rPr>
+              <a:t>Присвояване на</a:t>
+            </a:r>
+            <a:r>
+              <a:rPr lang="en-US" dirty="0">
+                <a:solidFill>
+                  <a:schemeClr val="tx1"/>
+                </a:solidFill>
+                <a:latin typeface="Arial" panose="020B0604020202020204" pitchFamily="34" charset="0"/>
+                <a:cs typeface="Arial" panose="020B0604020202020204" pitchFamily="34" charset="0"/>
+              </a:rPr>
+              <a:t> </a:t>
+            </a:r>
+            <a:r>
+              <a:rPr lang="en-US" dirty="0">
+                <a:solidFill>
+                  <a:srgbClr val="FFFF00"/>
+                </a:solidFill>
+                <a:latin typeface="Arial" panose="020B0604020202020204" pitchFamily="34" charset="0"/>
+                <a:cs typeface="Arial" panose="020B0604020202020204" pitchFamily="34" charset="0"/>
+              </a:rPr>
+              <a:t>nullable</a:t>
+            </a:r>
+            <a:r>
+              <a:rPr lang="en-US" dirty="0">
+                <a:solidFill>
+                  <a:schemeClr val="tx1"/>
+                </a:solidFill>
+                <a:latin typeface="Arial" panose="020B0604020202020204" pitchFamily="34" charset="0"/>
+                <a:cs typeface="Arial" panose="020B0604020202020204" pitchFamily="34" charset="0"/>
+              </a:rPr>
+              <a:t> value </a:t>
+            </a:r>
+            <a:r>
+              <a:rPr lang="bg-BG" dirty="0">
+                <a:solidFill>
+                  <a:schemeClr val="tx1"/>
+                </a:solidFill>
+                <a:latin typeface="Arial" panose="020B0604020202020204" pitchFamily="34" charset="0"/>
+                <a:cs typeface="Arial" panose="020B0604020202020204" pitchFamily="34" charset="0"/>
+              </a:rPr>
+              <a:t>тип към </a:t>
+            </a:r>
+            <a:r>
+              <a:rPr lang="en-US" dirty="0">
+                <a:solidFill>
+                  <a:srgbClr val="FFFF00"/>
+                </a:solidFill>
+                <a:latin typeface="Arial" panose="020B0604020202020204" pitchFamily="34" charset="0"/>
+                <a:cs typeface="Arial" panose="020B0604020202020204" pitchFamily="34" charset="0"/>
+              </a:rPr>
+              <a:t>non-nullable</a:t>
+            </a:r>
+            <a:r>
+              <a:rPr lang="en-US" dirty="0">
+                <a:solidFill>
+                  <a:schemeClr val="tx1"/>
+                </a:solidFill>
+                <a:latin typeface="Arial" panose="020B0604020202020204" pitchFamily="34" charset="0"/>
+                <a:cs typeface="Arial" panose="020B0604020202020204" pitchFamily="34" charset="0"/>
+              </a:rPr>
+              <a:t> </a:t>
+            </a:r>
+            <a:r>
+              <a:rPr lang="bg-BG" dirty="0">
+                <a:solidFill>
+                  <a:schemeClr val="tx1"/>
+                </a:solidFill>
+                <a:latin typeface="Arial" panose="020B0604020202020204" pitchFamily="34" charset="0"/>
+                <a:cs typeface="Arial" panose="020B0604020202020204" pitchFamily="34" charset="0"/>
+              </a:rPr>
+              <a:t>такъв</a:t>
+            </a:r>
+            <a:r>
+              <a:rPr lang="en-US" dirty="0">
+                <a:solidFill>
+                  <a:schemeClr val="tx1"/>
+                </a:solidFill>
+                <a:latin typeface="Arial" panose="020B0604020202020204" pitchFamily="34" charset="0"/>
+                <a:cs typeface="Arial" panose="020B0604020202020204" pitchFamily="34" charset="0"/>
+              </a:rPr>
+              <a:t> </a:t>
+            </a:r>
+            <a:r>
+              <a:rPr lang="bg-BG" dirty="0">
+                <a:solidFill>
+                  <a:schemeClr val="tx1"/>
+                </a:solidFill>
+                <a:latin typeface="Arial" panose="020B0604020202020204" pitchFamily="34" charset="0"/>
+                <a:cs typeface="Arial" panose="020B0604020202020204" pitchFamily="34" charset="0"/>
+              </a:rPr>
+              <a:t>става със специален синтаксис.</a:t>
+            </a:r>
+            <a:endParaRPr lang="en-US" dirty="0">
+              <a:solidFill>
+                <a:schemeClr val="tx1"/>
+              </a:solidFill>
+              <a:latin typeface="Arial" panose="020B0604020202020204" pitchFamily="34" charset="0"/>
+              <a:cs typeface="Arial" panose="020B0604020202020204" pitchFamily="34" charset="0"/>
+            </a:endParaRPr>
+          </a:p>
+          <a:p>
+            <a:r>
+              <a:rPr lang="bg-BG" dirty="0">
+                <a:solidFill>
+                  <a:schemeClr val="tx1"/>
+                </a:solidFill>
+              </a:rPr>
+              <a:t>Стойността по подразбиране за </a:t>
+            </a:r>
+            <a:r>
+              <a:rPr lang="bg-BG" dirty="0">
+                <a:solidFill>
+                  <a:srgbClr val="92D050"/>
+                </a:solidFill>
+              </a:rPr>
+              <a:t>референтните</a:t>
+            </a:r>
+            <a:r>
+              <a:rPr lang="bg-BG" dirty="0">
+                <a:solidFill>
+                  <a:schemeClr val="tx1"/>
+                </a:solidFill>
+              </a:rPr>
+              <a:t> типове данни е </a:t>
+            </a:r>
+            <a:r>
+              <a:rPr lang="en-US" dirty="0">
+                <a:solidFill>
+                  <a:srgbClr val="FFFF00"/>
+                </a:solidFill>
+              </a:rPr>
+              <a:t>null</a:t>
+            </a:r>
+            <a:r>
+              <a:rPr lang="en-US" dirty="0">
+                <a:solidFill>
+                  <a:schemeClr val="tx1"/>
+                </a:solidFill>
+              </a:rPr>
+              <a:t>.</a:t>
+            </a:r>
+            <a:endParaRPr lang="en-US" dirty="0">
+              <a:solidFill>
+                <a:schemeClr val="tx1"/>
+              </a:solidFill>
+              <a:latin typeface="Arial" panose="020B0604020202020204" pitchFamily="34" charset="0"/>
+              <a:cs typeface="Arial" panose="020B0604020202020204" pitchFamily="34" charset="0"/>
+            </a:endParaRPr>
+          </a:p>
+          <a:p>
+            <a:r>
+              <a:rPr lang="en-US" dirty="0">
+                <a:solidFill>
+                  <a:srgbClr val="92D050"/>
+                </a:solidFill>
+                <a:latin typeface="Arial" panose="020B0604020202020204" pitchFamily="34" charset="0"/>
+                <a:cs typeface="Arial" panose="020B0604020202020204" pitchFamily="34" charset="0"/>
+              </a:rPr>
+              <a:t>C# 8.0 </a:t>
+            </a:r>
+            <a:r>
+              <a:rPr lang="bg-BG" dirty="0">
+                <a:solidFill>
+                  <a:schemeClr val="tx1"/>
+                </a:solidFill>
+                <a:latin typeface="Arial" panose="020B0604020202020204" pitchFamily="34" charset="0"/>
+                <a:cs typeface="Arial" panose="020B0604020202020204" pitchFamily="34" charset="0"/>
+              </a:rPr>
+              <a:t>въвежда възможността за </a:t>
+            </a:r>
+            <a:r>
+              <a:rPr lang="en-US" dirty="0">
+                <a:solidFill>
+                  <a:srgbClr val="FFFF00"/>
+                </a:solidFill>
+                <a:latin typeface="Arial" panose="020B0604020202020204" pitchFamily="34" charset="0"/>
+                <a:cs typeface="Arial" panose="020B0604020202020204" pitchFamily="34" charset="0"/>
+              </a:rPr>
+              <a:t>nullable</a:t>
+            </a:r>
+            <a:r>
+              <a:rPr lang="en-US" dirty="0">
+                <a:solidFill>
+                  <a:srgbClr val="92D050"/>
+                </a:solidFill>
+                <a:latin typeface="Arial" panose="020B0604020202020204" pitchFamily="34" charset="0"/>
+                <a:cs typeface="Arial" panose="020B0604020202020204" pitchFamily="34" charset="0"/>
+              </a:rPr>
+              <a:t> – reference types</a:t>
+            </a:r>
+            <a:endParaRPr lang="bg-BG" dirty="0">
+              <a:solidFill>
+                <a:srgbClr val="92D050"/>
+              </a:solidFill>
+              <a:latin typeface="Arial" panose="020B0604020202020204" pitchFamily="34" charset="0"/>
+              <a:cs typeface="Arial" panose="020B0604020202020204" pitchFamily="34" charset="0"/>
+            </a:endParaRPr>
+          </a:p>
+        </p:txBody>
+      </p:sp>
+    </p:spTree>
+    <p:extLst>
+      <p:ext uri="{BB962C8B-B14F-4D97-AF65-F5344CB8AC3E}">
+        <p14:creationId xmlns:p14="http://schemas.microsoft.com/office/powerpoint/2010/main" val="3156739034"/>
       </p:ext>
     </p:extLst>
   </p:cSld>

</xml_diff>

<commit_message>
Bitwise operators - updates
</commit_message>
<xml_diff>
--- a/C# Intermediate.pptx
+++ b/C# Intermediate.pptx
@@ -5,7 +5,7 @@
     <p:sldMasterId id="2147483660" r:id="rId1"/>
   </p:sldMasterIdLst>
   <p:notesMasterIdLst>
-    <p:notesMasterId r:id="rId89"/>
+    <p:notesMasterId r:id="rId90"/>
   </p:notesMasterIdLst>
   <p:sldIdLst>
     <p:sldId id="256" r:id="rId2"/>
@@ -95,6 +95,7 @@
     <p:sldId id="346" r:id="rId86"/>
     <p:sldId id="347" r:id="rId87"/>
     <p:sldId id="348" r:id="rId88"/>
+    <p:sldId id="349" r:id="rId89"/>
   </p:sldIdLst>
   <p:sldSz cx="12192000" cy="6858000"/>
   <p:notesSz cx="6858000" cy="9144000"/>
@@ -41732,42 +41733,6 @@
           </a:prstGeom>
         </p:spPr>
       </p:pic>
-      <p:pic>
-        <p:nvPicPr>
-          <p:cNvPr id="9" name="Picture 8" descr="A close-up of a black and pink grid&#10;&#10;Description automatically generated">
-            <a:extLst>
-              <a:ext uri="{FF2B5EF4-FFF2-40B4-BE49-F238E27FC236}">
-                <a16:creationId xmlns:a16="http://schemas.microsoft.com/office/drawing/2014/main" id="{0C66CC87-FDFF-CD6B-18EB-D9E4A406D1DB}"/>
-              </a:ext>
-            </a:extLst>
-          </p:cNvPr>
-          <p:cNvPicPr>
-            <a:picLocks noChangeAspect="1"/>
-          </p:cNvPicPr>
-          <p:nvPr/>
-        </p:nvPicPr>
-        <p:blipFill>
-          <a:blip r:embed="rId5">
-            <a:extLst>
-              <a:ext uri="{28A0092B-C50C-407E-A947-70E740481C1C}">
-                <a14:useLocalDpi xmlns:a14="http://schemas.microsoft.com/office/drawing/2010/main" val="0"/>
-              </a:ext>
-            </a:extLst>
-          </a:blip>
-          <a:stretch>
-            <a:fillRect/>
-          </a:stretch>
-        </p:blipFill>
-        <p:spPr>
-          <a:xfrm>
-            <a:off x="6096000" y="5239687"/>
-            <a:ext cx="4772025" cy="1152525"/>
-          </a:xfrm>
-          <a:prstGeom prst="rect">
-            <a:avLst/>
-          </a:prstGeom>
-        </p:spPr>
-      </p:pic>
       <p:sp>
         <p:nvSpPr>
           <p:cNvPr id="10" name="TextBox 9">
@@ -41924,7 +41889,7 @@
                 <a:latin typeface="Arial" panose="020B0604020202020204" pitchFamily="34" charset="0"/>
                 <a:cs typeface="Arial" panose="020B0604020202020204" pitchFamily="34" charset="0"/>
               </a:rPr>
-              <a:t>101</a:t>
+              <a:t>110</a:t>
             </a:r>
             <a:r>
               <a:rPr lang="en-US" dirty="0">
@@ -41934,7 +41899,7 @@
                 <a:latin typeface="Arial" panose="020B0604020202020204" pitchFamily="34" charset="0"/>
                 <a:cs typeface="Arial" panose="020B0604020202020204" pitchFamily="34" charset="0"/>
               </a:rPr>
-              <a:t> -&gt; 00000101 (</a:t>
+              <a:t> -&gt; 00000110 (</a:t>
             </a:r>
             <a:r>
               <a:rPr lang="en-US" dirty="0">
@@ -41962,6 +41927,126 @@
               <a:solidFill>
                 <a:srgbClr val="92D050"/>
               </a:solidFill>
+              <a:latin typeface="Arial" panose="020B0604020202020204" pitchFamily="34" charset="0"/>
+              <a:cs typeface="Arial" panose="020B0604020202020204" pitchFamily="34" charset="0"/>
+            </a:endParaRPr>
+          </a:p>
+        </p:txBody>
+      </p:sp>
+      <p:pic>
+        <p:nvPicPr>
+          <p:cNvPr id="8" name="Picture 7" descr="A screenshot of a math game&#10;&#10;Description automatically generated">
+            <a:extLst>
+              <a:ext uri="{FF2B5EF4-FFF2-40B4-BE49-F238E27FC236}">
+                <a16:creationId xmlns:a16="http://schemas.microsoft.com/office/drawing/2014/main" id="{E0903480-5BC2-9595-1FA3-9BAC3C31F83D}"/>
+              </a:ext>
+            </a:extLst>
+          </p:cNvPr>
+          <p:cNvPicPr>
+            <a:picLocks noChangeAspect="1"/>
+          </p:cNvPicPr>
+          <p:nvPr/>
+        </p:nvPicPr>
+        <p:blipFill>
+          <a:blip r:embed="rId5">
+            <a:extLst>
+              <a:ext uri="{28A0092B-C50C-407E-A947-70E740481C1C}">
+                <a14:useLocalDpi xmlns:a14="http://schemas.microsoft.com/office/drawing/2010/main" val="0"/>
+              </a:ext>
+            </a:extLst>
+          </a:blip>
+          <a:stretch>
+            <a:fillRect/>
+          </a:stretch>
+        </p:blipFill>
+        <p:spPr>
+          <a:xfrm>
+            <a:off x="6095999" y="5348182"/>
+            <a:ext cx="2095682" cy="1044030"/>
+          </a:xfrm>
+          <a:prstGeom prst="rect">
+            <a:avLst/>
+          </a:prstGeom>
+        </p:spPr>
+      </p:pic>
+      <p:cxnSp>
+        <p:nvCxnSpPr>
+          <p:cNvPr id="13" name="Straight Arrow Connector 12">
+            <a:extLst>
+              <a:ext uri="{FF2B5EF4-FFF2-40B4-BE49-F238E27FC236}">
+                <a16:creationId xmlns:a16="http://schemas.microsoft.com/office/drawing/2014/main" id="{13A9B6ED-36C7-6271-5D93-17C38EFE6165}"/>
+              </a:ext>
+            </a:extLst>
+          </p:cNvPr>
+          <p:cNvCxnSpPr/>
+          <p:nvPr/>
+        </p:nvCxnSpPr>
+        <p:spPr>
+          <a:xfrm flipV="1">
+            <a:off x="8338657" y="5738070"/>
+            <a:ext cx="889233" cy="132127"/>
+          </a:xfrm>
+          <a:prstGeom prst="straightConnector1">
+            <a:avLst/>
+          </a:prstGeom>
+          <a:ln>
+            <a:solidFill>
+              <a:schemeClr val="tx1"/>
+            </a:solidFill>
+            <a:tailEnd type="triangle"/>
+          </a:ln>
+        </p:spPr>
+        <p:style>
+          <a:lnRef idx="1">
+            <a:schemeClr val="accent1"/>
+          </a:lnRef>
+          <a:fillRef idx="0">
+            <a:schemeClr val="accent1"/>
+          </a:fillRef>
+          <a:effectRef idx="0">
+            <a:schemeClr val="accent1"/>
+          </a:effectRef>
+          <a:fontRef idx="minor">
+            <a:schemeClr val="tx1"/>
+          </a:fontRef>
+        </p:style>
+      </p:cxnSp>
+      <p:sp>
+        <p:nvSpPr>
+          <p:cNvPr id="14" name="TextBox 13">
+            <a:extLst>
+              <a:ext uri="{FF2B5EF4-FFF2-40B4-BE49-F238E27FC236}">
+                <a16:creationId xmlns:a16="http://schemas.microsoft.com/office/drawing/2014/main" id="{AFE5F3F6-59BF-7842-E1CD-09CB80C01602}"/>
+              </a:ext>
+            </a:extLst>
+          </p:cNvPr>
+          <p:cNvSpPr txBox="1"/>
+          <p:nvPr/>
+        </p:nvSpPr>
+        <p:spPr>
+          <a:xfrm>
+            <a:off x="9278224" y="5553404"/>
+            <a:ext cx="662730" cy="369332"/>
+          </a:xfrm>
+          <a:prstGeom prst="rect">
+            <a:avLst/>
+          </a:prstGeom>
+          <a:noFill/>
+        </p:spPr>
+        <p:txBody>
+          <a:bodyPr wrap="square" rtlCol="0">
+            <a:spAutoFit/>
+          </a:bodyPr>
+          <a:lstStyle/>
+          <a:p>
+            <a:r>
+              <a:rPr lang="en-US" dirty="0">
+                <a:latin typeface="Arial" panose="020B0604020202020204" pitchFamily="34" charset="0"/>
+                <a:cs typeface="Arial" panose="020B0604020202020204" pitchFamily="34" charset="0"/>
+              </a:rPr>
+              <a:t>110</a:t>
+            </a:r>
+            <a:endParaRPr lang="bg-BG" dirty="0">
               <a:latin typeface="Arial" panose="020B0604020202020204" pitchFamily="34" charset="0"/>
               <a:cs typeface="Arial" panose="020B0604020202020204" pitchFamily="34" charset="0"/>
             </a:endParaRPr>
@@ -42655,6 +42740,249 @@
     <p:extLst>
       <p:ext uri="{BB962C8B-B14F-4D97-AF65-F5344CB8AC3E}">
         <p14:creationId xmlns:p14="http://schemas.microsoft.com/office/powerpoint/2010/main" val="4006507521"/>
+      </p:ext>
+    </p:extLst>
+  </p:cSld>
+  <p:clrMapOvr>
+    <a:masterClrMapping/>
+  </p:clrMapOvr>
+</p:sld>
+</file>
+
+<file path=ppt/slides/slide88.xml><?xml version="1.0" encoding="utf-8"?>
+<p:sld xmlns:a="http://schemas.openxmlformats.org/drawingml/2006/main" xmlns:r="http://schemas.openxmlformats.org/officeDocument/2006/relationships" xmlns:p="http://schemas.openxmlformats.org/presentationml/2006/main">
+  <p:cSld>
+    <p:spTree>
+      <p:nvGrpSpPr>
+        <p:cNvPr id="1" name=""/>
+        <p:cNvGrpSpPr/>
+        <p:nvPr/>
+      </p:nvGrpSpPr>
+      <p:grpSpPr>
+        <a:xfrm>
+          <a:off x="0" y="0"/>
+          <a:ext cx="0" cy="0"/>
+          <a:chOff x="0" y="0"/>
+          <a:chExt cx="0" cy="0"/>
+        </a:xfrm>
+      </p:grpSpPr>
+      <p:sp>
+        <p:nvSpPr>
+          <p:cNvPr id="2" name="Title 1">
+            <a:extLst>
+              <a:ext uri="{FF2B5EF4-FFF2-40B4-BE49-F238E27FC236}">
+                <a16:creationId xmlns:a16="http://schemas.microsoft.com/office/drawing/2014/main" id="{A11B6DA7-2FF4-320B-BB94-667D8468FD60}"/>
+              </a:ext>
+            </a:extLst>
+          </p:cNvPr>
+          <p:cNvSpPr>
+            <a:spLocks noGrp="1"/>
+          </p:cNvSpPr>
+          <p:nvPr>
+            <p:ph type="title"/>
+          </p:nvPr>
+        </p:nvSpPr>
+        <p:spPr/>
+        <p:txBody>
+          <a:bodyPr>
+            <a:normAutofit fontScale="90000"/>
+          </a:bodyPr>
+          <a:lstStyle/>
+          <a:p>
+            <a:pPr algn="ctr"/>
+            <a:r>
+              <a:rPr lang="bg-BG" dirty="0">
+                <a:latin typeface="Arial" panose="020B0604020202020204" pitchFamily="34" charset="0"/>
+                <a:cs typeface="Arial" panose="020B0604020202020204" pitchFamily="34" charset="0"/>
+              </a:rPr>
+              <a:t>Манипулиране на битове - употреба</a:t>
+            </a:r>
+          </a:p>
+        </p:txBody>
+      </p:sp>
+      <p:sp>
+        <p:nvSpPr>
+          <p:cNvPr id="3" name="Content Placeholder 2">
+            <a:extLst>
+              <a:ext uri="{FF2B5EF4-FFF2-40B4-BE49-F238E27FC236}">
+                <a16:creationId xmlns:a16="http://schemas.microsoft.com/office/drawing/2014/main" id="{9F85CD47-39DC-FC82-DD47-676C483F38AE}"/>
+              </a:ext>
+            </a:extLst>
+          </p:cNvPr>
+          <p:cNvSpPr>
+            <a:spLocks noGrp="1"/>
+          </p:cNvSpPr>
+          <p:nvPr>
+            <p:ph idx="1"/>
+          </p:nvPr>
+        </p:nvSpPr>
+        <p:spPr>
+          <a:xfrm>
+            <a:off x="1120000" y="2063691"/>
+            <a:ext cx="10233800" cy="4113271"/>
+          </a:xfrm>
+        </p:spPr>
+        <p:txBody>
+          <a:bodyPr/>
+          <a:lstStyle/>
+          <a:p>
+            <a:r>
+              <a:rPr lang="bg-BG" dirty="0">
+                <a:latin typeface="Arial" panose="020B0604020202020204" pitchFamily="34" charset="0"/>
+                <a:cs typeface="Arial" panose="020B0604020202020204" pitchFamily="34" charset="0"/>
+              </a:rPr>
+              <a:t>Обработката на битове е от голяма важност в много части на компютърната наука като </a:t>
+            </a:r>
+            <a:r>
+              <a:rPr lang="en-US" dirty="0">
+                <a:solidFill>
+                  <a:srgbClr val="92D050"/>
+                </a:solidFill>
+                <a:latin typeface="Arial" panose="020B0604020202020204" pitchFamily="34" charset="0"/>
+                <a:cs typeface="Arial" panose="020B0604020202020204" pitchFamily="34" charset="0"/>
+              </a:rPr>
+              <a:t>network protocols</a:t>
+            </a:r>
+            <a:r>
+              <a:rPr lang="en-US" dirty="0">
+                <a:latin typeface="Arial" panose="020B0604020202020204" pitchFamily="34" charset="0"/>
+                <a:cs typeface="Arial" panose="020B0604020202020204" pitchFamily="34" charset="0"/>
+              </a:rPr>
+              <a:t>, </a:t>
+            </a:r>
+            <a:r>
+              <a:rPr lang="en-US" dirty="0">
+                <a:solidFill>
+                  <a:srgbClr val="92D050"/>
+                </a:solidFill>
+                <a:latin typeface="Arial" panose="020B0604020202020204" pitchFamily="34" charset="0"/>
+                <a:cs typeface="Arial" panose="020B0604020202020204" pitchFamily="34" charset="0"/>
+              </a:rPr>
+              <a:t>data storage, file systems</a:t>
+            </a:r>
+            <a:r>
+              <a:rPr lang="en-US" dirty="0">
+                <a:latin typeface="Arial" panose="020B0604020202020204" pitchFamily="34" charset="0"/>
+                <a:cs typeface="Arial" panose="020B0604020202020204" pitchFamily="34" charset="0"/>
+              </a:rPr>
+              <a:t>, </a:t>
+            </a:r>
+            <a:r>
+              <a:rPr lang="en-US" dirty="0">
+                <a:solidFill>
+                  <a:srgbClr val="92D050"/>
+                </a:solidFill>
+                <a:latin typeface="Arial" panose="020B0604020202020204" pitchFamily="34" charset="0"/>
+                <a:cs typeface="Arial" panose="020B0604020202020204" pitchFamily="34" charset="0"/>
+              </a:rPr>
+              <a:t>memory management</a:t>
+            </a:r>
+            <a:r>
+              <a:rPr lang="en-US" dirty="0">
+                <a:latin typeface="Arial" panose="020B0604020202020204" pitchFamily="34" charset="0"/>
+                <a:cs typeface="Arial" panose="020B0604020202020204" pitchFamily="34" charset="0"/>
+              </a:rPr>
+              <a:t>, </a:t>
+            </a:r>
+            <a:r>
+              <a:rPr lang="en-US" dirty="0">
+                <a:solidFill>
+                  <a:srgbClr val="92D050"/>
+                </a:solidFill>
+                <a:latin typeface="Arial" panose="020B0604020202020204" pitchFamily="34" charset="0"/>
+                <a:cs typeface="Arial" panose="020B0604020202020204" pitchFamily="34" charset="0"/>
+              </a:rPr>
+              <a:t>video streaming</a:t>
+            </a:r>
+            <a:r>
+              <a:rPr lang="en-US" dirty="0">
+                <a:latin typeface="Arial" panose="020B0604020202020204" pitchFamily="34" charset="0"/>
+                <a:cs typeface="Arial" panose="020B0604020202020204" pitchFamily="34" charset="0"/>
+              </a:rPr>
+              <a:t>, </a:t>
+            </a:r>
+            <a:r>
+              <a:rPr lang="en-US" dirty="0">
+                <a:solidFill>
+                  <a:srgbClr val="92D050"/>
+                </a:solidFill>
+                <a:latin typeface="Arial" panose="020B0604020202020204" pitchFamily="34" charset="0"/>
+                <a:cs typeface="Arial" panose="020B0604020202020204" pitchFamily="34" charset="0"/>
+              </a:rPr>
+              <a:t>data compression</a:t>
+            </a:r>
+            <a:r>
+              <a:rPr lang="en-US" dirty="0">
+                <a:latin typeface="Arial" panose="020B0604020202020204" pitchFamily="34" charset="0"/>
+                <a:cs typeface="Arial" panose="020B0604020202020204" pitchFamily="34" charset="0"/>
+              </a:rPr>
+              <a:t>, </a:t>
+            </a:r>
+            <a:r>
+              <a:rPr lang="en-US" dirty="0">
+                <a:solidFill>
+                  <a:srgbClr val="92D050"/>
+                </a:solidFill>
+                <a:latin typeface="Arial" panose="020B0604020202020204" pitchFamily="34" charset="0"/>
+                <a:cs typeface="Arial" panose="020B0604020202020204" pitchFamily="34" charset="0"/>
+              </a:rPr>
+              <a:t>data encryption</a:t>
+            </a:r>
+            <a:r>
+              <a:rPr lang="en-US" dirty="0">
+                <a:latin typeface="Arial" panose="020B0604020202020204" pitchFamily="34" charset="0"/>
+                <a:cs typeface="Arial" panose="020B0604020202020204" pitchFamily="34" charset="0"/>
+              </a:rPr>
+              <a:t>, </a:t>
+            </a:r>
+            <a:r>
+              <a:rPr lang="en-US" dirty="0">
+                <a:solidFill>
+                  <a:srgbClr val="92D050"/>
+                </a:solidFill>
+                <a:latin typeface="Arial" panose="020B0604020202020204" pitchFamily="34" charset="0"/>
+                <a:cs typeface="Arial" panose="020B0604020202020204" pitchFamily="34" charset="0"/>
+              </a:rPr>
+              <a:t>graphics</a:t>
+            </a:r>
+            <a:r>
+              <a:rPr lang="en-US" dirty="0">
+                <a:latin typeface="Arial" panose="020B0604020202020204" pitchFamily="34" charset="0"/>
+                <a:cs typeface="Arial" panose="020B0604020202020204" pitchFamily="34" charset="0"/>
+              </a:rPr>
+              <a:t>, </a:t>
+            </a:r>
+            <a:r>
+              <a:rPr lang="en-US" dirty="0">
+                <a:solidFill>
+                  <a:srgbClr val="92D050"/>
+                </a:solidFill>
+                <a:latin typeface="Arial" panose="020B0604020202020204" pitchFamily="34" charset="0"/>
+                <a:cs typeface="Arial" panose="020B0604020202020204" pitchFamily="34" charset="0"/>
+              </a:rPr>
+              <a:t>low level programming</a:t>
+            </a:r>
+            <a:r>
+              <a:rPr lang="en-US" dirty="0">
+                <a:latin typeface="Arial" panose="020B0604020202020204" pitchFamily="34" charset="0"/>
+                <a:cs typeface="Arial" panose="020B0604020202020204" pitchFamily="34" charset="0"/>
+              </a:rPr>
+              <a:t> </a:t>
+            </a:r>
+            <a:r>
+              <a:rPr lang="bg-BG" dirty="0">
+                <a:latin typeface="Arial" panose="020B0604020202020204" pitchFamily="34" charset="0"/>
+                <a:cs typeface="Arial" panose="020B0604020202020204" pitchFamily="34" charset="0"/>
+              </a:rPr>
+              <a:t>и много още.</a:t>
+            </a:r>
+          </a:p>
+        </p:txBody>
+      </p:sp>
+    </p:spTree>
+    <p:extLst>
+      <p:ext uri="{BB962C8B-B14F-4D97-AF65-F5344CB8AC3E}">
+        <p14:creationId xmlns:p14="http://schemas.microsoft.com/office/powerpoint/2010/main" val="2848896032"/>
       </p:ext>
     </p:extLst>
   </p:cSld>

</xml_diff>

<commit_message>
Final data added to C# Intermediate
</commit_message>
<xml_diff>
--- a/C# Intermediate.pptx
+++ b/C# Intermediate.pptx
@@ -5,7 +5,7 @@
     <p:sldMasterId id="2147483660" r:id="rId1"/>
   </p:sldMasterIdLst>
   <p:notesMasterIdLst>
-    <p:notesMasterId r:id="rId96"/>
+    <p:notesMasterId r:id="rId102"/>
   </p:notesMasterIdLst>
   <p:sldIdLst>
     <p:sldId id="256" r:id="rId2"/>
@@ -92,16 +92,22 @@
     <p:sldId id="343" r:id="rId83"/>
     <p:sldId id="344" r:id="rId84"/>
     <p:sldId id="351" r:id="rId85"/>
-    <p:sldId id="352" r:id="rId86"/>
-    <p:sldId id="353" r:id="rId87"/>
-    <p:sldId id="354" r:id="rId88"/>
-    <p:sldId id="346" r:id="rId89"/>
-    <p:sldId id="350" r:id="rId90"/>
-    <p:sldId id="355" r:id="rId91"/>
-    <p:sldId id="345" r:id="rId92"/>
-    <p:sldId id="347" r:id="rId93"/>
-    <p:sldId id="348" r:id="rId94"/>
-    <p:sldId id="349" r:id="rId95"/>
+    <p:sldId id="359" r:id="rId86"/>
+    <p:sldId id="358" r:id="rId87"/>
+    <p:sldId id="352" r:id="rId88"/>
+    <p:sldId id="353" r:id="rId89"/>
+    <p:sldId id="354" r:id="rId90"/>
+    <p:sldId id="346" r:id="rId91"/>
+    <p:sldId id="350" r:id="rId92"/>
+    <p:sldId id="355" r:id="rId93"/>
+    <p:sldId id="356" r:id="rId94"/>
+    <p:sldId id="357" r:id="rId95"/>
+    <p:sldId id="360" r:id="rId96"/>
+    <p:sldId id="345" r:id="rId97"/>
+    <p:sldId id="347" r:id="rId98"/>
+    <p:sldId id="348" r:id="rId99"/>
+    <p:sldId id="361" r:id="rId100"/>
+    <p:sldId id="349" r:id="rId101"/>
   </p:sldIdLst>
   <p:sldSz cx="12192000" cy="6858000"/>
   <p:notesSz cx="6858000" cy="9144000"/>
@@ -290,7 +296,7 @@
           <a:p>
             <a:fld id="{885E0A30-EC03-41DC-B392-345B5CA3E630}" type="datetimeFigureOut">
               <a:rPr lang="bg-BG" smtClean="0"/>
-              <a:t>7.10.2023 г.</a:t>
+              <a:t>4.1.2024 г.</a:t>
             </a:fld>
             <a:endParaRPr lang="bg-BG"/>
           </a:p>
@@ -623,7 +629,7 @@
           <a:p>
             <a:fld id="{50902568-8BE2-4EC5-8EAF-6FCA7E1E32AC}" type="slidenum">
               <a:rPr lang="bg-BG" smtClean="0"/>
-              <a:t>86</a:t>
+              <a:t>88</a:t>
             </a:fld>
             <a:endParaRPr lang="bg-BG"/>
           </a:p>
@@ -707,7 +713,7 @@
           <a:p>
             <a:fld id="{50902568-8BE2-4EC5-8EAF-6FCA7E1E32AC}" type="slidenum">
               <a:rPr lang="bg-BG" smtClean="0"/>
-              <a:t>87</a:t>
+              <a:t>89</a:t>
             </a:fld>
             <a:endParaRPr lang="bg-BG"/>
           </a:p>
@@ -791,7 +797,7 @@
           <a:p>
             <a:fld id="{50902568-8BE2-4EC5-8EAF-6FCA7E1E32AC}" type="slidenum">
               <a:rPr lang="bg-BG" smtClean="0"/>
-              <a:t>88</a:t>
+              <a:t>90</a:t>
             </a:fld>
             <a:endParaRPr lang="bg-BG"/>
           </a:p>
@@ -875,7 +881,7 @@
           <a:p>
             <a:fld id="{50902568-8BE2-4EC5-8EAF-6FCA7E1E32AC}" type="slidenum">
               <a:rPr lang="bg-BG" smtClean="0"/>
-              <a:t>89</a:t>
+              <a:t>91</a:t>
             </a:fld>
             <a:endParaRPr lang="bg-BG"/>
           </a:p>
@@ -959,7 +965,7 @@
           <a:p>
             <a:fld id="{50902568-8BE2-4EC5-8EAF-6FCA7E1E32AC}" type="slidenum">
               <a:rPr lang="bg-BG" smtClean="0"/>
-              <a:t>90</a:t>
+              <a:t>92</a:t>
             </a:fld>
             <a:endParaRPr lang="bg-BG"/>
           </a:p>
@@ -969,6 +975,174 @@
     <p:extLst>
       <p:ext uri="{BB962C8B-B14F-4D97-AF65-F5344CB8AC3E}">
         <p14:creationId xmlns:p14="http://schemas.microsoft.com/office/powerpoint/2010/main" val="3118825299"/>
+      </p:ext>
+    </p:extLst>
+  </p:cSld>
+  <p:clrMapOvr>
+    <a:masterClrMapping/>
+  </p:clrMapOvr>
+</p:notes>
+</file>
+
+<file path=ppt/notesSlides/notesSlide6.xml><?xml version="1.0" encoding="utf-8"?>
+<p:notes xmlns:a="http://schemas.openxmlformats.org/drawingml/2006/main" xmlns:r="http://schemas.openxmlformats.org/officeDocument/2006/relationships" xmlns:p="http://schemas.openxmlformats.org/presentationml/2006/main">
+  <p:cSld>
+    <p:spTree>
+      <p:nvGrpSpPr>
+        <p:cNvPr id="1" name=""/>
+        <p:cNvGrpSpPr/>
+        <p:nvPr/>
+      </p:nvGrpSpPr>
+      <p:grpSpPr>
+        <a:xfrm>
+          <a:off x="0" y="0"/>
+          <a:ext cx="0" cy="0"/>
+          <a:chOff x="0" y="0"/>
+          <a:chExt cx="0" cy="0"/>
+        </a:xfrm>
+      </p:grpSpPr>
+      <p:sp>
+        <p:nvSpPr>
+          <p:cNvPr id="2" name="Slide Image Placeholder 1"/>
+          <p:cNvSpPr>
+            <a:spLocks noGrp="1" noRot="1" noChangeAspect="1"/>
+          </p:cNvSpPr>
+          <p:nvPr>
+            <p:ph type="sldImg"/>
+          </p:nvPr>
+        </p:nvSpPr>
+        <p:spPr/>
+      </p:sp>
+      <p:sp>
+        <p:nvSpPr>
+          <p:cNvPr id="3" name="Notes Placeholder 2"/>
+          <p:cNvSpPr>
+            <a:spLocks noGrp="1"/>
+          </p:cNvSpPr>
+          <p:nvPr>
+            <p:ph type="body" idx="1"/>
+          </p:nvPr>
+        </p:nvSpPr>
+        <p:spPr/>
+        <p:txBody>
+          <a:bodyPr/>
+          <a:lstStyle/>
+          <a:p>
+            <a:endParaRPr lang="bg-BG" dirty="0"/>
+          </a:p>
+        </p:txBody>
+      </p:sp>
+      <p:sp>
+        <p:nvSpPr>
+          <p:cNvPr id="4" name="Slide Number Placeholder 3"/>
+          <p:cNvSpPr>
+            <a:spLocks noGrp="1"/>
+          </p:cNvSpPr>
+          <p:nvPr>
+            <p:ph type="sldNum" sz="quarter" idx="5"/>
+          </p:nvPr>
+        </p:nvSpPr>
+        <p:spPr/>
+        <p:txBody>
+          <a:bodyPr/>
+          <a:lstStyle/>
+          <a:p>
+            <a:fld id="{50902568-8BE2-4EC5-8EAF-6FCA7E1E32AC}" type="slidenum">
+              <a:rPr lang="bg-BG" smtClean="0"/>
+              <a:t>93</a:t>
+            </a:fld>
+            <a:endParaRPr lang="bg-BG"/>
+          </a:p>
+        </p:txBody>
+      </p:sp>
+    </p:spTree>
+    <p:extLst>
+      <p:ext uri="{BB962C8B-B14F-4D97-AF65-F5344CB8AC3E}">
+        <p14:creationId xmlns:p14="http://schemas.microsoft.com/office/powerpoint/2010/main" val="3411318140"/>
+      </p:ext>
+    </p:extLst>
+  </p:cSld>
+  <p:clrMapOvr>
+    <a:masterClrMapping/>
+  </p:clrMapOvr>
+</p:notes>
+</file>
+
+<file path=ppt/notesSlides/notesSlide7.xml><?xml version="1.0" encoding="utf-8"?>
+<p:notes xmlns:a="http://schemas.openxmlformats.org/drawingml/2006/main" xmlns:r="http://schemas.openxmlformats.org/officeDocument/2006/relationships" xmlns:p="http://schemas.openxmlformats.org/presentationml/2006/main">
+  <p:cSld>
+    <p:spTree>
+      <p:nvGrpSpPr>
+        <p:cNvPr id="1" name=""/>
+        <p:cNvGrpSpPr/>
+        <p:nvPr/>
+      </p:nvGrpSpPr>
+      <p:grpSpPr>
+        <a:xfrm>
+          <a:off x="0" y="0"/>
+          <a:ext cx="0" cy="0"/>
+          <a:chOff x="0" y="0"/>
+          <a:chExt cx="0" cy="0"/>
+        </a:xfrm>
+      </p:grpSpPr>
+      <p:sp>
+        <p:nvSpPr>
+          <p:cNvPr id="2" name="Slide Image Placeholder 1"/>
+          <p:cNvSpPr>
+            <a:spLocks noGrp="1" noRot="1" noChangeAspect="1"/>
+          </p:cNvSpPr>
+          <p:nvPr>
+            <p:ph type="sldImg"/>
+          </p:nvPr>
+        </p:nvSpPr>
+        <p:spPr/>
+      </p:sp>
+      <p:sp>
+        <p:nvSpPr>
+          <p:cNvPr id="3" name="Notes Placeholder 2"/>
+          <p:cNvSpPr>
+            <a:spLocks noGrp="1"/>
+          </p:cNvSpPr>
+          <p:nvPr>
+            <p:ph type="body" idx="1"/>
+          </p:nvPr>
+        </p:nvSpPr>
+        <p:spPr/>
+        <p:txBody>
+          <a:bodyPr/>
+          <a:lstStyle/>
+          <a:p>
+            <a:endParaRPr lang="bg-BG" dirty="0"/>
+          </a:p>
+        </p:txBody>
+      </p:sp>
+      <p:sp>
+        <p:nvSpPr>
+          <p:cNvPr id="4" name="Slide Number Placeholder 3"/>
+          <p:cNvSpPr>
+            <a:spLocks noGrp="1"/>
+          </p:cNvSpPr>
+          <p:nvPr>
+            <p:ph type="sldNum" sz="quarter" idx="5"/>
+          </p:nvPr>
+        </p:nvSpPr>
+        <p:spPr/>
+        <p:txBody>
+          <a:bodyPr/>
+          <a:lstStyle/>
+          <a:p>
+            <a:fld id="{50902568-8BE2-4EC5-8EAF-6FCA7E1E32AC}" type="slidenum">
+              <a:rPr lang="bg-BG" smtClean="0"/>
+              <a:t>94</a:t>
+            </a:fld>
+            <a:endParaRPr lang="bg-BG"/>
+          </a:p>
+        </p:txBody>
+      </p:sp>
+    </p:spTree>
+    <p:extLst>
+      <p:ext uri="{BB962C8B-B14F-4D97-AF65-F5344CB8AC3E}">
+        <p14:creationId xmlns:p14="http://schemas.microsoft.com/office/powerpoint/2010/main" val="4112593637"/>
       </p:ext>
     </p:extLst>
   </p:cSld>
@@ -1174,7 +1348,7 @@
           <a:p>
             <a:fld id="{0BD89023-946D-4914-A444-F66256F52110}" type="datetimeFigureOut">
               <a:rPr lang="bg-BG" smtClean="0"/>
-              <a:t>7.10.2023 г.</a:t>
+              <a:t>4.1.2024 г.</a:t>
             </a:fld>
             <a:endParaRPr lang="bg-BG"/>
           </a:p>
@@ -1455,7 +1629,7 @@
           <a:p>
             <a:fld id="{0BD89023-946D-4914-A444-F66256F52110}" type="datetimeFigureOut">
               <a:rPr lang="bg-BG" smtClean="0"/>
-              <a:t>7.10.2023 г.</a:t>
+              <a:t>4.1.2024 г.</a:t>
             </a:fld>
             <a:endParaRPr lang="bg-BG"/>
           </a:p>
@@ -1647,7 +1821,7 @@
           <a:p>
             <a:fld id="{0BD89023-946D-4914-A444-F66256F52110}" type="datetimeFigureOut">
               <a:rPr lang="bg-BG" smtClean="0"/>
-              <a:t>7.10.2023 г.</a:t>
+              <a:t>4.1.2024 г.</a:t>
             </a:fld>
             <a:endParaRPr lang="bg-BG"/>
           </a:p>
@@ -1908,7 +2082,7 @@
           <a:p>
             <a:fld id="{0BD89023-946D-4914-A444-F66256F52110}" type="datetimeFigureOut">
               <a:rPr lang="bg-BG" smtClean="0"/>
-              <a:t>7.10.2023 г.</a:t>
+              <a:t>4.1.2024 г.</a:t>
             </a:fld>
             <a:endParaRPr lang="bg-BG"/>
           </a:p>
@@ -2334,7 +2508,7 @@
           <a:p>
             <a:fld id="{0BD89023-946D-4914-A444-F66256F52110}" type="datetimeFigureOut">
               <a:rPr lang="bg-BG" smtClean="0"/>
-              <a:t>7.10.2023 г.</a:t>
+              <a:t>4.1.2024 г.</a:t>
             </a:fld>
             <a:endParaRPr lang="bg-BG"/>
           </a:p>
@@ -2880,7 +3054,7 @@
           <a:p>
             <a:fld id="{0BD89023-946D-4914-A444-F66256F52110}" type="datetimeFigureOut">
               <a:rPr lang="bg-BG" smtClean="0"/>
-              <a:t>7.10.2023 г.</a:t>
+              <a:t>4.1.2024 г.</a:t>
             </a:fld>
             <a:endParaRPr lang="bg-BG"/>
           </a:p>
@@ -3711,7 +3885,7 @@
           <a:p>
             <a:fld id="{0BD89023-946D-4914-A444-F66256F52110}" type="datetimeFigureOut">
               <a:rPr lang="bg-BG" smtClean="0"/>
-              <a:t>7.10.2023 г.</a:t>
+              <a:t>4.1.2024 г.</a:t>
             </a:fld>
             <a:endParaRPr lang="bg-BG"/>
           </a:p>
@@ -3881,7 +4055,7 @@
           <a:p>
             <a:fld id="{0BD89023-946D-4914-A444-F66256F52110}" type="datetimeFigureOut">
               <a:rPr lang="bg-BG" smtClean="0"/>
-              <a:t>7.10.2023 г.</a:t>
+              <a:t>4.1.2024 г.</a:t>
             </a:fld>
             <a:endParaRPr lang="bg-BG"/>
           </a:p>
@@ -4061,7 +4235,7 @@
           <a:p>
             <a:fld id="{0BD89023-946D-4914-A444-F66256F52110}" type="datetimeFigureOut">
               <a:rPr lang="bg-BG" smtClean="0"/>
-              <a:t>7.10.2023 г.</a:t>
+              <a:t>4.1.2024 г.</a:t>
             </a:fld>
             <a:endParaRPr lang="bg-BG"/>
           </a:p>
@@ -4231,7 +4405,7 @@
           <a:p>
             <a:fld id="{0BD89023-946D-4914-A444-F66256F52110}" type="datetimeFigureOut">
               <a:rPr lang="bg-BG" smtClean="0"/>
-              <a:t>7.10.2023 г.</a:t>
+              <a:t>4.1.2024 г.</a:t>
             </a:fld>
             <a:endParaRPr lang="bg-BG"/>
           </a:p>
@@ -4488,7 +4662,7 @@
           <a:p>
             <a:fld id="{0BD89023-946D-4914-A444-F66256F52110}" type="datetimeFigureOut">
               <a:rPr lang="bg-BG" smtClean="0"/>
-              <a:t>7.10.2023 г.</a:t>
+              <a:t>4.1.2024 г.</a:t>
             </a:fld>
             <a:endParaRPr lang="bg-BG"/>
           </a:p>
@@ -4720,7 +4894,7 @@
           <a:p>
             <a:fld id="{0BD89023-946D-4914-A444-F66256F52110}" type="datetimeFigureOut">
               <a:rPr lang="bg-BG" smtClean="0"/>
-              <a:t>7.10.2023 г.</a:t>
+              <a:t>4.1.2024 г.</a:t>
             </a:fld>
             <a:endParaRPr lang="bg-BG"/>
           </a:p>
@@ -5113,7 +5287,7 @@
           <a:p>
             <a:fld id="{0BD89023-946D-4914-A444-F66256F52110}" type="datetimeFigureOut">
               <a:rPr lang="bg-BG" smtClean="0"/>
-              <a:t>7.10.2023 г.</a:t>
+              <a:t>4.1.2024 г.</a:t>
             </a:fld>
             <a:endParaRPr lang="bg-BG"/>
           </a:p>
@@ -5231,7 +5405,7 @@
           <a:p>
             <a:fld id="{0BD89023-946D-4914-A444-F66256F52110}" type="datetimeFigureOut">
               <a:rPr lang="bg-BG" smtClean="0"/>
-              <a:t>7.10.2023 г.</a:t>
+              <a:t>4.1.2024 г.</a:t>
             </a:fld>
             <a:endParaRPr lang="bg-BG"/>
           </a:p>
@@ -5326,7 +5500,7 @@
           <a:p>
             <a:fld id="{0BD89023-946D-4914-A444-F66256F52110}" type="datetimeFigureOut">
               <a:rPr lang="bg-BG" smtClean="0"/>
-              <a:t>7.10.2023 г.</a:t>
+              <a:t>4.1.2024 г.</a:t>
             </a:fld>
             <a:endParaRPr lang="bg-BG"/>
           </a:p>
@@ -5599,7 +5773,7 @@
           <a:p>
             <a:fld id="{0BD89023-946D-4914-A444-F66256F52110}" type="datetimeFigureOut">
               <a:rPr lang="bg-BG" smtClean="0"/>
-              <a:t>7.10.2023 г.</a:t>
+              <a:t>4.1.2024 г.</a:t>
             </a:fld>
             <a:endParaRPr lang="bg-BG"/>
           </a:p>
@@ -5880,7 +6054,7 @@
           <a:p>
             <a:fld id="{0BD89023-946D-4914-A444-F66256F52110}" type="datetimeFigureOut">
               <a:rPr lang="bg-BG" smtClean="0"/>
-              <a:t>7.10.2023 г.</a:t>
+              <a:t>4.1.2024 г.</a:t>
             </a:fld>
             <a:endParaRPr lang="bg-BG"/>
           </a:p>
@@ -6120,7 +6294,7 @@
           <a:p>
             <a:fld id="{0BD89023-946D-4914-A444-F66256F52110}" type="datetimeFigureOut">
               <a:rPr lang="bg-BG" smtClean="0"/>
-              <a:t>7.10.2023 г.</a:t>
+              <a:t>4.1.2024 г.</a:t>
             </a:fld>
             <a:endParaRPr lang="bg-BG"/>
           </a:p>
@@ -7545,6 +7719,287 @@
 </p:sld>
 </file>
 
+<file path=ppt/slides/slide100.xml><?xml version="1.0" encoding="utf-8"?>
+<p:sld xmlns:a="http://schemas.openxmlformats.org/drawingml/2006/main" xmlns:r="http://schemas.openxmlformats.org/officeDocument/2006/relationships" xmlns:p="http://schemas.openxmlformats.org/presentationml/2006/main">
+  <p:cSld>
+    <p:spTree>
+      <p:nvGrpSpPr>
+        <p:cNvPr id="1" name=""/>
+        <p:cNvGrpSpPr/>
+        <p:nvPr/>
+      </p:nvGrpSpPr>
+      <p:grpSpPr>
+        <a:xfrm>
+          <a:off x="0" y="0"/>
+          <a:ext cx="0" cy="0"/>
+          <a:chOff x="0" y="0"/>
+          <a:chExt cx="0" cy="0"/>
+        </a:xfrm>
+      </p:grpSpPr>
+      <p:sp>
+        <p:nvSpPr>
+          <p:cNvPr id="2" name="Title 1">
+            <a:extLst>
+              <a:ext uri="{FF2B5EF4-FFF2-40B4-BE49-F238E27FC236}">
+                <a16:creationId xmlns:a16="http://schemas.microsoft.com/office/drawing/2014/main" id="{A11B6DA7-2FF4-320B-BB94-667D8468FD60}"/>
+              </a:ext>
+            </a:extLst>
+          </p:cNvPr>
+          <p:cNvSpPr>
+            <a:spLocks noGrp="1"/>
+          </p:cNvSpPr>
+          <p:nvPr>
+            <p:ph type="title"/>
+          </p:nvPr>
+        </p:nvSpPr>
+        <p:spPr/>
+        <p:txBody>
+          <a:bodyPr>
+            <a:normAutofit fontScale="90000"/>
+          </a:bodyPr>
+          <a:lstStyle/>
+          <a:p>
+            <a:pPr algn="ctr"/>
+            <a:r>
+              <a:rPr lang="bg-BG" dirty="0">
+                <a:latin typeface="Arial" panose="020B0604020202020204" pitchFamily="34" charset="0"/>
+                <a:cs typeface="Arial" panose="020B0604020202020204" pitchFamily="34" charset="0"/>
+              </a:rPr>
+              <a:t>Манипулиране на битове - употреба</a:t>
+            </a:r>
+          </a:p>
+        </p:txBody>
+      </p:sp>
+      <p:sp>
+        <p:nvSpPr>
+          <p:cNvPr id="3" name="Content Placeholder 2">
+            <a:extLst>
+              <a:ext uri="{FF2B5EF4-FFF2-40B4-BE49-F238E27FC236}">
+                <a16:creationId xmlns:a16="http://schemas.microsoft.com/office/drawing/2014/main" id="{9F85CD47-39DC-FC82-DD47-676C483F38AE}"/>
+              </a:ext>
+            </a:extLst>
+          </p:cNvPr>
+          <p:cNvSpPr>
+            <a:spLocks noGrp="1"/>
+          </p:cNvSpPr>
+          <p:nvPr>
+            <p:ph idx="1"/>
+          </p:nvPr>
+        </p:nvSpPr>
+        <p:spPr>
+          <a:xfrm>
+            <a:off x="1120000" y="2063691"/>
+            <a:ext cx="10233800" cy="4113271"/>
+          </a:xfrm>
+        </p:spPr>
+        <p:txBody>
+          <a:bodyPr>
+            <a:normAutofit lnSpcReduction="10000"/>
+          </a:bodyPr>
+          <a:lstStyle/>
+          <a:p>
+            <a:r>
+              <a:rPr lang="bg-BG" dirty="0">
+                <a:latin typeface="Arial" panose="020B0604020202020204" pitchFamily="34" charset="0"/>
+                <a:cs typeface="Arial" panose="020B0604020202020204" pitchFamily="34" charset="0"/>
+              </a:rPr>
+              <a:t>Обработката на битове е от голяма важност в много части на компютърната наука като </a:t>
+            </a:r>
+            <a:r>
+              <a:rPr lang="en-US" dirty="0">
+                <a:solidFill>
+                  <a:srgbClr val="92D050"/>
+                </a:solidFill>
+                <a:latin typeface="Arial" panose="020B0604020202020204" pitchFamily="34" charset="0"/>
+                <a:cs typeface="Arial" panose="020B0604020202020204" pitchFamily="34" charset="0"/>
+              </a:rPr>
+              <a:t>network protocols</a:t>
+            </a:r>
+            <a:r>
+              <a:rPr lang="en-US" dirty="0">
+                <a:latin typeface="Arial" panose="020B0604020202020204" pitchFamily="34" charset="0"/>
+                <a:cs typeface="Arial" panose="020B0604020202020204" pitchFamily="34" charset="0"/>
+              </a:rPr>
+              <a:t>, </a:t>
+            </a:r>
+            <a:r>
+              <a:rPr lang="en-US" dirty="0">
+                <a:solidFill>
+                  <a:srgbClr val="92D050"/>
+                </a:solidFill>
+                <a:latin typeface="Arial" panose="020B0604020202020204" pitchFamily="34" charset="0"/>
+                <a:cs typeface="Arial" panose="020B0604020202020204" pitchFamily="34" charset="0"/>
+              </a:rPr>
+              <a:t>data storage, file systems</a:t>
+            </a:r>
+            <a:r>
+              <a:rPr lang="en-US" dirty="0">
+                <a:latin typeface="Arial" panose="020B0604020202020204" pitchFamily="34" charset="0"/>
+                <a:cs typeface="Arial" panose="020B0604020202020204" pitchFamily="34" charset="0"/>
+              </a:rPr>
+              <a:t>, </a:t>
+            </a:r>
+            <a:r>
+              <a:rPr lang="en-US" dirty="0">
+                <a:solidFill>
+                  <a:srgbClr val="92D050"/>
+                </a:solidFill>
+                <a:latin typeface="Arial" panose="020B0604020202020204" pitchFamily="34" charset="0"/>
+                <a:cs typeface="Arial" panose="020B0604020202020204" pitchFamily="34" charset="0"/>
+              </a:rPr>
+              <a:t>memory management</a:t>
+            </a:r>
+            <a:r>
+              <a:rPr lang="en-US" dirty="0">
+                <a:latin typeface="Arial" panose="020B0604020202020204" pitchFamily="34" charset="0"/>
+                <a:cs typeface="Arial" panose="020B0604020202020204" pitchFamily="34" charset="0"/>
+              </a:rPr>
+              <a:t>, </a:t>
+            </a:r>
+            <a:r>
+              <a:rPr lang="en-US" dirty="0">
+                <a:solidFill>
+                  <a:srgbClr val="92D050"/>
+                </a:solidFill>
+                <a:latin typeface="Arial" panose="020B0604020202020204" pitchFamily="34" charset="0"/>
+                <a:cs typeface="Arial" panose="020B0604020202020204" pitchFamily="34" charset="0"/>
+              </a:rPr>
+              <a:t>video streaming</a:t>
+            </a:r>
+            <a:r>
+              <a:rPr lang="en-US" dirty="0">
+                <a:latin typeface="Arial" panose="020B0604020202020204" pitchFamily="34" charset="0"/>
+                <a:cs typeface="Arial" panose="020B0604020202020204" pitchFamily="34" charset="0"/>
+              </a:rPr>
+              <a:t>, </a:t>
+            </a:r>
+            <a:r>
+              <a:rPr lang="en-US" dirty="0">
+                <a:solidFill>
+                  <a:srgbClr val="92D050"/>
+                </a:solidFill>
+                <a:latin typeface="Arial" panose="020B0604020202020204" pitchFamily="34" charset="0"/>
+                <a:cs typeface="Arial" panose="020B0604020202020204" pitchFamily="34" charset="0"/>
+              </a:rPr>
+              <a:t>data compression</a:t>
+            </a:r>
+            <a:r>
+              <a:rPr lang="en-US" dirty="0">
+                <a:latin typeface="Arial" panose="020B0604020202020204" pitchFamily="34" charset="0"/>
+                <a:cs typeface="Arial" panose="020B0604020202020204" pitchFamily="34" charset="0"/>
+              </a:rPr>
+              <a:t>, </a:t>
+            </a:r>
+            <a:r>
+              <a:rPr lang="en-US" dirty="0">
+                <a:solidFill>
+                  <a:srgbClr val="92D050"/>
+                </a:solidFill>
+                <a:latin typeface="Arial" panose="020B0604020202020204" pitchFamily="34" charset="0"/>
+                <a:cs typeface="Arial" panose="020B0604020202020204" pitchFamily="34" charset="0"/>
+              </a:rPr>
+              <a:t>data encryption</a:t>
+            </a:r>
+            <a:r>
+              <a:rPr lang="en-US" dirty="0">
+                <a:latin typeface="Arial" panose="020B0604020202020204" pitchFamily="34" charset="0"/>
+                <a:cs typeface="Arial" panose="020B0604020202020204" pitchFamily="34" charset="0"/>
+              </a:rPr>
+              <a:t>, </a:t>
+            </a:r>
+            <a:r>
+              <a:rPr lang="en-US" dirty="0">
+                <a:solidFill>
+                  <a:srgbClr val="92D050"/>
+                </a:solidFill>
+                <a:latin typeface="Arial" panose="020B0604020202020204" pitchFamily="34" charset="0"/>
+                <a:cs typeface="Arial" panose="020B0604020202020204" pitchFamily="34" charset="0"/>
+              </a:rPr>
+              <a:t>graphics</a:t>
+            </a:r>
+            <a:r>
+              <a:rPr lang="en-US" dirty="0">
+                <a:latin typeface="Arial" panose="020B0604020202020204" pitchFamily="34" charset="0"/>
+                <a:cs typeface="Arial" panose="020B0604020202020204" pitchFamily="34" charset="0"/>
+              </a:rPr>
+              <a:t>, </a:t>
+            </a:r>
+            <a:r>
+              <a:rPr lang="en-US" dirty="0">
+                <a:solidFill>
+                  <a:srgbClr val="92D050"/>
+                </a:solidFill>
+                <a:latin typeface="Arial" panose="020B0604020202020204" pitchFamily="34" charset="0"/>
+                <a:cs typeface="Arial" panose="020B0604020202020204" pitchFamily="34" charset="0"/>
+              </a:rPr>
+              <a:t>low level programming</a:t>
+            </a:r>
+            <a:r>
+              <a:rPr lang="en-US" dirty="0">
+                <a:latin typeface="Arial" panose="020B0604020202020204" pitchFamily="34" charset="0"/>
+                <a:cs typeface="Arial" panose="020B0604020202020204" pitchFamily="34" charset="0"/>
+              </a:rPr>
+              <a:t> </a:t>
+            </a:r>
+            <a:r>
+              <a:rPr lang="bg-BG" dirty="0">
+                <a:latin typeface="Arial" panose="020B0604020202020204" pitchFamily="34" charset="0"/>
+                <a:cs typeface="Arial" panose="020B0604020202020204" pitchFamily="34" charset="0"/>
+              </a:rPr>
+              <a:t>и много още.</a:t>
+            </a:r>
+          </a:p>
+          <a:p>
+            <a:endParaRPr lang="bg-BG" dirty="0">
+              <a:latin typeface="Arial" panose="020B0604020202020204" pitchFamily="34" charset="0"/>
+              <a:cs typeface="Arial" panose="020B0604020202020204" pitchFamily="34" charset="0"/>
+            </a:endParaRPr>
+          </a:p>
+          <a:p>
+            <a:r>
+              <a:rPr lang="bg-BG" i="1" u="sng" dirty="0">
+                <a:latin typeface="Arial" panose="020B0604020202020204" pitchFamily="34" charset="0"/>
+                <a:cs typeface="Arial" panose="020B0604020202020204" pitchFamily="34" charset="0"/>
+              </a:rPr>
+              <a:t>За допълнителна информация вижте в описанието на видеото. Там са посочени интересни статии</a:t>
+            </a:r>
+            <a:r>
+              <a:rPr lang="en-US" i="1" u="sng" dirty="0">
+                <a:latin typeface="Arial" panose="020B0604020202020204" pitchFamily="34" charset="0"/>
+                <a:cs typeface="Arial" panose="020B0604020202020204" pitchFamily="34" charset="0"/>
+              </a:rPr>
+              <a:t> </a:t>
+            </a:r>
+            <a:r>
+              <a:rPr lang="bg-BG" i="1" u="sng">
+                <a:latin typeface="Arial" panose="020B0604020202020204" pitchFamily="34" charset="0"/>
+                <a:cs typeface="Arial" panose="020B0604020202020204" pitchFamily="34" charset="0"/>
+              </a:rPr>
+              <a:t>и видеа </a:t>
+            </a:r>
+            <a:r>
+              <a:rPr lang="bg-BG" i="1" u="sng" dirty="0">
+                <a:latin typeface="Arial" panose="020B0604020202020204" pitchFamily="34" charset="0"/>
+                <a:cs typeface="Arial" panose="020B0604020202020204" pitchFamily="34" charset="0"/>
+              </a:rPr>
+              <a:t>свързани с използването на битови операции в различни области.</a:t>
+            </a:r>
+          </a:p>
+        </p:txBody>
+      </p:sp>
+    </p:spTree>
+    <p:extLst>
+      <p:ext uri="{BB962C8B-B14F-4D97-AF65-F5344CB8AC3E}">
+        <p14:creationId xmlns:p14="http://schemas.microsoft.com/office/powerpoint/2010/main" val="2848896032"/>
+      </p:ext>
+    </p:extLst>
+  </p:cSld>
+  <p:clrMapOvr>
+    <a:masterClrMapping/>
+  </p:clrMapOvr>
+</p:sld>
+</file>
+
 <file path=ppt/slides/slide11.xml><?xml version="1.0" encoding="utf-8"?>
 <p:sld xmlns:a="http://schemas.openxmlformats.org/drawingml/2006/main" xmlns:r="http://schemas.openxmlformats.org/officeDocument/2006/relationships" xmlns:p="http://schemas.openxmlformats.org/presentationml/2006/main">
   <p:cSld>
@@ -41700,7 +42155,9 @@
         </p:nvSpPr>
         <p:spPr/>
         <p:txBody>
-          <a:bodyPr/>
+          <a:bodyPr>
+            <a:normAutofit/>
+          </a:bodyPr>
           <a:lstStyle/>
           <a:p>
             <a:r>
@@ -41759,7 +42216,7 @@
             <a:pPr marL="0" indent="0">
               <a:buNone/>
             </a:pPr>
-            <a:endParaRPr lang="bg-BG" dirty="0">
+            <a:endParaRPr lang="en-US" dirty="0">
               <a:latin typeface="Arial" panose="020B0604020202020204" pitchFamily="34" charset="0"/>
               <a:cs typeface="Arial" panose="020B0604020202020204" pitchFamily="34" charset="0"/>
             </a:endParaRPr>
@@ -41767,6 +42224,75 @@
           <a:p>
             <a:r>
               <a:rPr lang="bg-BG" dirty="0">
+                <a:solidFill>
+                  <a:srgbClr val="92D050"/>
+                </a:solidFill>
+                <a:latin typeface="Arial" panose="020B0604020202020204" pitchFamily="34" charset="0"/>
+                <a:cs typeface="Arial" panose="020B0604020202020204" pitchFamily="34" charset="0"/>
+              </a:rPr>
+              <a:t>Непозиционни</a:t>
+            </a:r>
+            <a:r>
+              <a:rPr lang="bg-BG" dirty="0">
+                <a:latin typeface="Arial" panose="020B0604020202020204" pitchFamily="34" charset="0"/>
+                <a:cs typeface="Arial" panose="020B0604020202020204" pitchFamily="34" charset="0"/>
+              </a:rPr>
+              <a:t>:</a:t>
+            </a:r>
+          </a:p>
+          <a:p>
+            <a:pPr lvl="1"/>
+            <a:r>
+              <a:rPr lang="bg-BG" dirty="0">
+                <a:solidFill>
+                  <a:srgbClr val="FFFF00"/>
+                </a:solidFill>
+                <a:latin typeface="Arial" panose="020B0604020202020204" pitchFamily="34" charset="0"/>
+                <a:cs typeface="Arial" panose="020B0604020202020204" pitchFamily="34" charset="0"/>
+              </a:rPr>
+              <a:t>Римската</a:t>
+            </a:r>
+            <a:r>
+              <a:rPr lang="bg-BG" dirty="0">
+                <a:latin typeface="Arial" panose="020B0604020202020204" pitchFamily="34" charset="0"/>
+                <a:cs typeface="Arial" panose="020B0604020202020204" pitchFamily="34" charset="0"/>
+              </a:rPr>
+              <a:t>, </a:t>
+            </a:r>
+            <a:r>
+              <a:rPr lang="bg-BG" dirty="0">
+                <a:solidFill>
+                  <a:srgbClr val="FFFF00"/>
+                </a:solidFill>
+                <a:latin typeface="Arial" panose="020B0604020202020204" pitchFamily="34" charset="0"/>
+                <a:cs typeface="Arial" panose="020B0604020202020204" pitchFamily="34" charset="0"/>
+              </a:rPr>
+              <a:t>Гръцката</a:t>
+            </a:r>
+            <a:r>
+              <a:rPr lang="bg-BG" dirty="0">
+                <a:latin typeface="Arial" panose="020B0604020202020204" pitchFamily="34" charset="0"/>
+                <a:cs typeface="Arial" panose="020B0604020202020204" pitchFamily="34" charset="0"/>
+              </a:rPr>
+              <a:t> бройна система</a:t>
+            </a:r>
+          </a:p>
+          <a:p>
+            <a:r>
+              <a:rPr lang="bg-BG" dirty="0">
+                <a:solidFill>
+                  <a:srgbClr val="92D050"/>
+                </a:solidFill>
+                <a:latin typeface="Arial" panose="020B0604020202020204" pitchFamily="34" charset="0"/>
+                <a:cs typeface="Arial" panose="020B0604020202020204" pitchFamily="34" charset="0"/>
+              </a:rPr>
+              <a:t>Позиционни</a:t>
+            </a:r>
+          </a:p>
+          <a:p>
+            <a:pPr lvl="1"/>
+            <a:r>
+              <a:rPr lang="bg-BG" dirty="0">
                 <a:latin typeface="Arial" panose="020B0604020202020204" pitchFamily="34" charset="0"/>
                 <a:cs typeface="Arial" panose="020B0604020202020204" pitchFamily="34" charset="0"/>
               </a:rPr>
@@ -41808,6 +42334,7 @@
             </a:r>
           </a:p>
           <a:p>
+            <a:pPr lvl="1"/>
             <a:r>
               <a:rPr lang="bg-BG" dirty="0">
                 <a:latin typeface="Arial" panose="020B0604020202020204" pitchFamily="34" charset="0"/>
@@ -41851,6 +42378,7 @@
             </a:r>
           </a:p>
           <a:p>
+            <a:pPr lvl="1"/>
             <a:r>
               <a:rPr lang="bg-BG" dirty="0">
                 <a:latin typeface="Arial" panose="020B0604020202020204" pitchFamily="34" charset="0"/>
@@ -41892,6 +42420,28 @@
               </a:rPr>
               <a:t>16</a:t>
             </a:r>
+            <a:endParaRPr lang="bg-BG" dirty="0">
+              <a:solidFill>
+                <a:srgbClr val="92D050"/>
+              </a:solidFill>
+              <a:latin typeface="Arial" panose="020B0604020202020204" pitchFamily="34" charset="0"/>
+              <a:cs typeface="Arial" panose="020B0604020202020204" pitchFamily="34" charset="0"/>
+            </a:endParaRPr>
+          </a:p>
+          <a:p>
+            <a:pPr lvl="1"/>
+            <a:endParaRPr lang="bg-BG" dirty="0">
+              <a:solidFill>
+                <a:srgbClr val="92D050"/>
+              </a:solidFill>
+              <a:latin typeface="Arial" panose="020B0604020202020204" pitchFamily="34" charset="0"/>
+              <a:cs typeface="Arial" panose="020B0604020202020204" pitchFamily="34" charset="0"/>
+            </a:endParaRPr>
+          </a:p>
+          <a:p>
+            <a:pPr marL="457200" lvl="1" indent="0">
+              <a:buNone/>
+            </a:pPr>
             <a:endParaRPr lang="bg-BG" dirty="0">
               <a:solidFill>
                 <a:srgbClr val="92D050"/>
@@ -41916,6 +42466,532 @@
 </file>
 
 <file path=ppt/slides/slide85.xml><?xml version="1.0" encoding="utf-8"?>
+<p:sld xmlns:a="http://schemas.openxmlformats.org/drawingml/2006/main" xmlns:r="http://schemas.openxmlformats.org/officeDocument/2006/relationships" xmlns:p="http://schemas.openxmlformats.org/presentationml/2006/main">
+  <p:cSld>
+    <p:spTree>
+      <p:nvGrpSpPr>
+        <p:cNvPr id="1" name=""/>
+        <p:cNvGrpSpPr/>
+        <p:nvPr/>
+      </p:nvGrpSpPr>
+      <p:grpSpPr>
+        <a:xfrm>
+          <a:off x="0" y="0"/>
+          <a:ext cx="0" cy="0"/>
+          <a:chOff x="0" y="0"/>
+          <a:chExt cx="0" cy="0"/>
+        </a:xfrm>
+      </p:grpSpPr>
+      <p:sp>
+        <p:nvSpPr>
+          <p:cNvPr id="2" name="Title 1">
+            <a:extLst>
+              <a:ext uri="{FF2B5EF4-FFF2-40B4-BE49-F238E27FC236}">
+                <a16:creationId xmlns:a16="http://schemas.microsoft.com/office/drawing/2014/main" id="{D444362D-8E74-D508-4650-710162AF6215}"/>
+              </a:ext>
+            </a:extLst>
+          </p:cNvPr>
+          <p:cNvSpPr>
+            <a:spLocks noGrp="1"/>
+          </p:cNvSpPr>
+          <p:nvPr>
+            <p:ph type="title"/>
+          </p:nvPr>
+        </p:nvSpPr>
+        <p:spPr/>
+        <p:txBody>
+          <a:bodyPr/>
+          <a:lstStyle/>
+          <a:p>
+            <a:pPr algn="ctr"/>
+            <a:r>
+              <a:rPr lang="bg-BG" dirty="0">
+                <a:latin typeface="Arial" panose="020B0604020202020204" pitchFamily="34" charset="0"/>
+                <a:cs typeface="Arial" panose="020B0604020202020204" pitchFamily="34" charset="0"/>
+              </a:rPr>
+              <a:t>Бройни системи - дефиниции</a:t>
+            </a:r>
+          </a:p>
+        </p:txBody>
+      </p:sp>
+      <p:sp>
+        <p:nvSpPr>
+          <p:cNvPr id="3" name="Content Placeholder 2">
+            <a:extLst>
+              <a:ext uri="{FF2B5EF4-FFF2-40B4-BE49-F238E27FC236}">
+                <a16:creationId xmlns:a16="http://schemas.microsoft.com/office/drawing/2014/main" id="{016DE151-FD7B-78BF-DEFB-FF4B78EFB1F5}"/>
+              </a:ext>
+            </a:extLst>
+          </p:cNvPr>
+          <p:cNvSpPr>
+            <a:spLocks noGrp="1"/>
+          </p:cNvSpPr>
+          <p:nvPr>
+            <p:ph idx="1"/>
+          </p:nvPr>
+        </p:nvSpPr>
+        <p:spPr>
+          <a:xfrm>
+            <a:off x="1120000" y="1825625"/>
+            <a:ext cx="10233800" cy="2637318"/>
+          </a:xfrm>
+        </p:spPr>
+        <p:txBody>
+          <a:bodyPr/>
+          <a:lstStyle/>
+          <a:p>
+            <a:r>
+              <a:rPr lang="bg-BG" dirty="0">
+                <a:solidFill>
+                  <a:srgbClr val="FFFF00"/>
+                </a:solidFill>
+              </a:rPr>
+              <a:t>Непозиционни</a:t>
+            </a:r>
+            <a:r>
+              <a:rPr lang="bg-BG" dirty="0"/>
+              <a:t> - Това са бройни системи, при които стойността на всяка цифра е постоянна и не зависи по никакъв начин от нейното място в числото</a:t>
+            </a:r>
+          </a:p>
+          <a:p>
+            <a:r>
+              <a:rPr lang="bg-BG" dirty="0">
+                <a:solidFill>
+                  <a:srgbClr val="FFFF00"/>
+                </a:solidFill>
+              </a:rPr>
+              <a:t>Позиционни</a:t>
+            </a:r>
+            <a:r>
+              <a:rPr lang="bg-BG" dirty="0"/>
+              <a:t> – Това са бройни системи, при които мястото на цифрата има значение за крайната стойност на числото. </a:t>
+            </a:r>
+          </a:p>
+          <a:p>
+            <a:endParaRPr lang="bg-BG" dirty="0"/>
+          </a:p>
+          <a:p>
+            <a:endParaRPr lang="bg-BG" dirty="0"/>
+          </a:p>
+        </p:txBody>
+      </p:sp>
+    </p:spTree>
+    <p:extLst>
+      <p:ext uri="{BB962C8B-B14F-4D97-AF65-F5344CB8AC3E}">
+        <p14:creationId xmlns:p14="http://schemas.microsoft.com/office/powerpoint/2010/main" val="3066426271"/>
+      </p:ext>
+    </p:extLst>
+  </p:cSld>
+  <p:clrMapOvr>
+    <a:masterClrMapping/>
+  </p:clrMapOvr>
+</p:sld>
+</file>
+
+<file path=ppt/slides/slide86.xml><?xml version="1.0" encoding="utf-8"?>
+<p:sld xmlns:a="http://schemas.openxmlformats.org/drawingml/2006/main" xmlns:r="http://schemas.openxmlformats.org/officeDocument/2006/relationships" xmlns:p="http://schemas.openxmlformats.org/presentationml/2006/main">
+  <p:cSld>
+    <p:spTree>
+      <p:nvGrpSpPr>
+        <p:cNvPr id="1" name=""/>
+        <p:cNvGrpSpPr/>
+        <p:nvPr/>
+      </p:nvGrpSpPr>
+      <p:grpSpPr>
+        <a:xfrm>
+          <a:off x="0" y="0"/>
+          <a:ext cx="0" cy="0"/>
+          <a:chOff x="0" y="0"/>
+          <a:chExt cx="0" cy="0"/>
+        </a:xfrm>
+      </p:grpSpPr>
+      <p:sp>
+        <p:nvSpPr>
+          <p:cNvPr id="2" name="Title 1">
+            <a:extLst>
+              <a:ext uri="{FF2B5EF4-FFF2-40B4-BE49-F238E27FC236}">
+                <a16:creationId xmlns:a16="http://schemas.microsoft.com/office/drawing/2014/main" id="{4D4730D9-F142-1F3A-8BE4-9166A89AF969}"/>
+              </a:ext>
+            </a:extLst>
+          </p:cNvPr>
+          <p:cNvSpPr>
+            <a:spLocks noGrp="1"/>
+          </p:cNvSpPr>
+          <p:nvPr>
+            <p:ph type="title"/>
+          </p:nvPr>
+        </p:nvSpPr>
+        <p:spPr/>
+        <p:txBody>
+          <a:bodyPr/>
+          <a:lstStyle/>
+          <a:p>
+            <a:pPr algn="ctr"/>
+            <a:r>
+              <a:rPr lang="bg-BG" dirty="0">
+                <a:latin typeface="Arial" panose="020B0604020202020204" pitchFamily="34" charset="0"/>
+                <a:cs typeface="Arial" panose="020B0604020202020204" pitchFamily="34" charset="0"/>
+              </a:rPr>
+              <a:t>Римска бройна система</a:t>
+            </a:r>
+          </a:p>
+        </p:txBody>
+      </p:sp>
+      <p:sp>
+        <p:nvSpPr>
+          <p:cNvPr id="3" name="Content Placeholder 2">
+            <a:extLst>
+              <a:ext uri="{FF2B5EF4-FFF2-40B4-BE49-F238E27FC236}">
+                <a16:creationId xmlns:a16="http://schemas.microsoft.com/office/drawing/2014/main" id="{CB2B2856-0CD0-5CE5-7B17-8F5ADD1F49D7}"/>
+              </a:ext>
+            </a:extLst>
+          </p:cNvPr>
+          <p:cNvSpPr>
+            <a:spLocks noGrp="1"/>
+          </p:cNvSpPr>
+          <p:nvPr>
+            <p:ph idx="1"/>
+          </p:nvPr>
+        </p:nvSpPr>
+        <p:spPr/>
+        <p:txBody>
+          <a:bodyPr/>
+          <a:lstStyle/>
+          <a:p>
+            <a:r>
+              <a:rPr lang="bg-BG" dirty="0">
+                <a:solidFill>
+                  <a:srgbClr val="FFFF00"/>
+                </a:solidFill>
+                <a:latin typeface="Arial" panose="020B0604020202020204" pitchFamily="34" charset="0"/>
+                <a:cs typeface="Arial" panose="020B0604020202020204" pitchFamily="34" charset="0"/>
+              </a:rPr>
+              <a:t>Римската</a:t>
+            </a:r>
+            <a:r>
+              <a:rPr lang="bg-BG" dirty="0">
+                <a:latin typeface="Arial" panose="020B0604020202020204" pitchFamily="34" charset="0"/>
+                <a:cs typeface="Arial" panose="020B0604020202020204" pitchFamily="34" charset="0"/>
+              </a:rPr>
+              <a:t> бройна система е непозиционна система, която използва следните знаци:</a:t>
+            </a:r>
+          </a:p>
+          <a:p>
+            <a:pPr lvl="1"/>
+            <a:r>
+              <a:rPr lang="en-US" dirty="0">
+                <a:solidFill>
+                  <a:srgbClr val="FFFF00"/>
+                </a:solidFill>
+                <a:latin typeface="Arial" panose="020B0604020202020204" pitchFamily="34" charset="0"/>
+                <a:cs typeface="Arial" panose="020B0604020202020204" pitchFamily="34" charset="0"/>
+              </a:rPr>
+              <a:t>M</a:t>
+            </a:r>
+            <a:r>
+              <a:rPr lang="en-US" dirty="0">
+                <a:latin typeface="Arial" panose="020B0604020202020204" pitchFamily="34" charset="0"/>
+                <a:cs typeface="Arial" panose="020B0604020202020204" pitchFamily="34" charset="0"/>
+              </a:rPr>
+              <a:t> (</a:t>
+            </a:r>
+            <a:r>
+              <a:rPr lang="bg-BG" dirty="0">
+                <a:latin typeface="Arial" panose="020B0604020202020204" pitchFamily="34" charset="0"/>
+                <a:cs typeface="Arial" panose="020B0604020202020204" pitchFamily="34" charset="0"/>
+              </a:rPr>
+              <a:t>за 1000</a:t>
+            </a:r>
+            <a:r>
+              <a:rPr lang="en-US" dirty="0">
+                <a:latin typeface="Arial" panose="020B0604020202020204" pitchFamily="34" charset="0"/>
+                <a:cs typeface="Arial" panose="020B0604020202020204" pitchFamily="34" charset="0"/>
+              </a:rPr>
+              <a:t>)</a:t>
+            </a:r>
+            <a:r>
+              <a:rPr lang="bg-BG" dirty="0">
+                <a:latin typeface="Arial" panose="020B0604020202020204" pitchFamily="34" charset="0"/>
+                <a:cs typeface="Arial" panose="020B0604020202020204" pitchFamily="34" charset="0"/>
+              </a:rPr>
+              <a:t>, </a:t>
+            </a:r>
+            <a:r>
+              <a:rPr lang="en-US" dirty="0">
+                <a:solidFill>
+                  <a:srgbClr val="FFFF00"/>
+                </a:solidFill>
+                <a:latin typeface="Arial" panose="020B0604020202020204" pitchFamily="34" charset="0"/>
+                <a:cs typeface="Arial" panose="020B0604020202020204" pitchFamily="34" charset="0"/>
+              </a:rPr>
+              <a:t>D</a:t>
+            </a:r>
+            <a:r>
+              <a:rPr lang="en-US" dirty="0">
+                <a:latin typeface="Arial" panose="020B0604020202020204" pitchFamily="34" charset="0"/>
+                <a:cs typeface="Arial" panose="020B0604020202020204" pitchFamily="34" charset="0"/>
+              </a:rPr>
+              <a:t> (</a:t>
+            </a:r>
+            <a:r>
+              <a:rPr lang="bg-BG" dirty="0">
+                <a:latin typeface="Arial" panose="020B0604020202020204" pitchFamily="34" charset="0"/>
+                <a:cs typeface="Arial" panose="020B0604020202020204" pitchFamily="34" charset="0"/>
+              </a:rPr>
+              <a:t>за 500</a:t>
+            </a:r>
+            <a:r>
+              <a:rPr lang="en-US" dirty="0">
+                <a:latin typeface="Arial" panose="020B0604020202020204" pitchFamily="34" charset="0"/>
+                <a:cs typeface="Arial" panose="020B0604020202020204" pitchFamily="34" charset="0"/>
+              </a:rPr>
+              <a:t>)</a:t>
+            </a:r>
+            <a:r>
+              <a:rPr lang="bg-BG" dirty="0">
+                <a:latin typeface="Arial" panose="020B0604020202020204" pitchFamily="34" charset="0"/>
+                <a:cs typeface="Arial" panose="020B0604020202020204" pitchFamily="34" charset="0"/>
+              </a:rPr>
+              <a:t>, </a:t>
+            </a:r>
+            <a:r>
+              <a:rPr lang="en-US" dirty="0">
+                <a:solidFill>
+                  <a:srgbClr val="FFFF00"/>
+                </a:solidFill>
+                <a:latin typeface="Arial" panose="020B0604020202020204" pitchFamily="34" charset="0"/>
+                <a:cs typeface="Arial" panose="020B0604020202020204" pitchFamily="34" charset="0"/>
+              </a:rPr>
+              <a:t>C</a:t>
+            </a:r>
+            <a:r>
+              <a:rPr lang="en-US" dirty="0">
+                <a:latin typeface="Arial" panose="020B0604020202020204" pitchFamily="34" charset="0"/>
+                <a:cs typeface="Arial" panose="020B0604020202020204" pitchFamily="34" charset="0"/>
+              </a:rPr>
+              <a:t> (</a:t>
+            </a:r>
+            <a:r>
+              <a:rPr lang="bg-BG" dirty="0">
+                <a:latin typeface="Arial" panose="020B0604020202020204" pitchFamily="34" charset="0"/>
+                <a:cs typeface="Arial" panose="020B0604020202020204" pitchFamily="34" charset="0"/>
+              </a:rPr>
+              <a:t>за </a:t>
+            </a:r>
+            <a:r>
+              <a:rPr lang="en-US" dirty="0">
+                <a:latin typeface="Arial" panose="020B0604020202020204" pitchFamily="34" charset="0"/>
+                <a:cs typeface="Arial" panose="020B0604020202020204" pitchFamily="34" charset="0"/>
+              </a:rPr>
+              <a:t>100), </a:t>
+            </a:r>
+            <a:r>
+              <a:rPr lang="en-US" dirty="0">
+                <a:solidFill>
+                  <a:srgbClr val="FFFF00"/>
+                </a:solidFill>
+                <a:latin typeface="Arial" panose="020B0604020202020204" pitchFamily="34" charset="0"/>
+                <a:cs typeface="Arial" panose="020B0604020202020204" pitchFamily="34" charset="0"/>
+              </a:rPr>
+              <a:t>L</a:t>
+            </a:r>
+            <a:r>
+              <a:rPr lang="en-US" dirty="0">
+                <a:latin typeface="Arial" panose="020B0604020202020204" pitchFamily="34" charset="0"/>
+                <a:cs typeface="Arial" panose="020B0604020202020204" pitchFamily="34" charset="0"/>
+              </a:rPr>
+              <a:t> (</a:t>
+            </a:r>
+            <a:r>
+              <a:rPr lang="bg-BG" dirty="0">
+                <a:latin typeface="Arial" panose="020B0604020202020204" pitchFamily="34" charset="0"/>
+                <a:cs typeface="Arial" panose="020B0604020202020204" pitchFamily="34" charset="0"/>
+              </a:rPr>
+              <a:t>за 50</a:t>
+            </a:r>
+            <a:r>
+              <a:rPr lang="en-US" dirty="0">
+                <a:latin typeface="Arial" panose="020B0604020202020204" pitchFamily="34" charset="0"/>
+                <a:cs typeface="Arial" panose="020B0604020202020204" pitchFamily="34" charset="0"/>
+              </a:rPr>
+              <a:t>)</a:t>
+            </a:r>
+            <a:r>
+              <a:rPr lang="bg-BG" dirty="0">
+                <a:latin typeface="Arial" panose="020B0604020202020204" pitchFamily="34" charset="0"/>
+                <a:cs typeface="Arial" panose="020B0604020202020204" pitchFamily="34" charset="0"/>
+              </a:rPr>
+              <a:t>, </a:t>
+            </a:r>
+            <a:r>
+              <a:rPr lang="en-US" dirty="0">
+                <a:solidFill>
+                  <a:srgbClr val="FFFF00"/>
+                </a:solidFill>
+                <a:latin typeface="Arial" panose="020B0604020202020204" pitchFamily="34" charset="0"/>
+                <a:cs typeface="Arial" panose="020B0604020202020204" pitchFamily="34" charset="0"/>
+              </a:rPr>
+              <a:t>X</a:t>
+            </a:r>
+            <a:r>
+              <a:rPr lang="en-US" dirty="0">
+                <a:latin typeface="Arial" panose="020B0604020202020204" pitchFamily="34" charset="0"/>
+                <a:cs typeface="Arial" panose="020B0604020202020204" pitchFamily="34" charset="0"/>
+              </a:rPr>
+              <a:t> (</a:t>
+            </a:r>
+            <a:r>
+              <a:rPr lang="bg-BG" dirty="0">
+                <a:latin typeface="Arial" panose="020B0604020202020204" pitchFamily="34" charset="0"/>
+                <a:cs typeface="Arial" panose="020B0604020202020204" pitchFamily="34" charset="0"/>
+              </a:rPr>
+              <a:t>за 10</a:t>
+            </a:r>
+            <a:r>
+              <a:rPr lang="en-US" dirty="0">
+                <a:latin typeface="Arial" panose="020B0604020202020204" pitchFamily="34" charset="0"/>
+                <a:cs typeface="Arial" panose="020B0604020202020204" pitchFamily="34" charset="0"/>
+              </a:rPr>
+              <a:t>)</a:t>
+            </a:r>
+            <a:r>
+              <a:rPr lang="bg-BG" dirty="0">
+                <a:latin typeface="Arial" panose="020B0604020202020204" pitchFamily="34" charset="0"/>
+                <a:cs typeface="Arial" panose="020B0604020202020204" pitchFamily="34" charset="0"/>
+              </a:rPr>
+              <a:t>, </a:t>
+            </a:r>
+            <a:r>
+              <a:rPr lang="en-US" dirty="0">
+                <a:solidFill>
+                  <a:srgbClr val="FFFF00"/>
+                </a:solidFill>
+                <a:latin typeface="Arial" panose="020B0604020202020204" pitchFamily="34" charset="0"/>
+                <a:cs typeface="Arial" panose="020B0604020202020204" pitchFamily="34" charset="0"/>
+              </a:rPr>
+              <a:t>V</a:t>
+            </a:r>
+            <a:r>
+              <a:rPr lang="en-US" dirty="0">
+                <a:latin typeface="Arial" panose="020B0604020202020204" pitchFamily="34" charset="0"/>
+                <a:cs typeface="Arial" panose="020B0604020202020204" pitchFamily="34" charset="0"/>
+              </a:rPr>
+              <a:t> (</a:t>
+            </a:r>
+            <a:r>
+              <a:rPr lang="bg-BG" dirty="0">
+                <a:latin typeface="Arial" panose="020B0604020202020204" pitchFamily="34" charset="0"/>
+                <a:cs typeface="Arial" panose="020B0604020202020204" pitchFamily="34" charset="0"/>
+              </a:rPr>
+              <a:t>за 5</a:t>
+            </a:r>
+            <a:r>
+              <a:rPr lang="en-US" dirty="0">
+                <a:latin typeface="Arial" panose="020B0604020202020204" pitchFamily="34" charset="0"/>
+                <a:cs typeface="Arial" panose="020B0604020202020204" pitchFamily="34" charset="0"/>
+              </a:rPr>
+              <a:t>)</a:t>
+            </a:r>
+            <a:r>
+              <a:rPr lang="bg-BG" dirty="0">
+                <a:latin typeface="Arial" panose="020B0604020202020204" pitchFamily="34" charset="0"/>
+                <a:cs typeface="Arial" panose="020B0604020202020204" pitchFamily="34" charset="0"/>
+              </a:rPr>
+              <a:t>, </a:t>
+            </a:r>
+            <a:r>
+              <a:rPr lang="en-US" dirty="0">
+                <a:solidFill>
+                  <a:srgbClr val="FFFF00"/>
+                </a:solidFill>
+                <a:latin typeface="Arial" panose="020B0604020202020204" pitchFamily="34" charset="0"/>
+                <a:cs typeface="Arial" panose="020B0604020202020204" pitchFamily="34" charset="0"/>
+              </a:rPr>
+              <a:t>I</a:t>
+            </a:r>
+            <a:r>
+              <a:rPr lang="en-US" dirty="0">
+                <a:latin typeface="Arial" panose="020B0604020202020204" pitchFamily="34" charset="0"/>
+                <a:cs typeface="Arial" panose="020B0604020202020204" pitchFamily="34" charset="0"/>
+              </a:rPr>
+              <a:t> (</a:t>
+            </a:r>
+            <a:r>
+              <a:rPr lang="bg-BG" dirty="0">
+                <a:latin typeface="Arial" panose="020B0604020202020204" pitchFamily="34" charset="0"/>
+                <a:cs typeface="Arial" panose="020B0604020202020204" pitchFamily="34" charset="0"/>
+              </a:rPr>
+              <a:t>за 1</a:t>
+            </a:r>
+            <a:r>
+              <a:rPr lang="en-US" dirty="0">
+                <a:latin typeface="Arial" panose="020B0604020202020204" pitchFamily="34" charset="0"/>
+                <a:cs typeface="Arial" panose="020B0604020202020204" pitchFamily="34" charset="0"/>
+              </a:rPr>
+              <a:t>)</a:t>
+            </a:r>
+          </a:p>
+          <a:p>
+            <a:pPr marL="457200" lvl="1" indent="0">
+              <a:buNone/>
+            </a:pPr>
+            <a:endParaRPr lang="bg-BG" dirty="0">
+              <a:latin typeface="Arial" panose="020B0604020202020204" pitchFamily="34" charset="0"/>
+              <a:cs typeface="Arial" panose="020B0604020202020204" pitchFamily="34" charset="0"/>
+            </a:endParaRPr>
+          </a:p>
+        </p:txBody>
+      </p:sp>
+      <p:pic>
+        <p:nvPicPr>
+          <p:cNvPr id="5" name="Picture 4" descr="A blue background with white numbers&#10;&#10;Description automatically generated">
+            <a:extLst>
+              <a:ext uri="{FF2B5EF4-FFF2-40B4-BE49-F238E27FC236}">
+                <a16:creationId xmlns:a16="http://schemas.microsoft.com/office/drawing/2014/main" id="{E54C7662-211A-302E-2EE2-5984BAFFAAAD}"/>
+              </a:ext>
+            </a:extLst>
+          </p:cNvPr>
+          <p:cNvPicPr>
+            <a:picLocks noChangeAspect="1"/>
+          </p:cNvPicPr>
+          <p:nvPr/>
+        </p:nvPicPr>
+        <p:blipFill>
+          <a:blip r:embed="rId2">
+            <a:extLst>
+              <a:ext uri="{28A0092B-C50C-407E-A947-70E740481C1C}">
+                <a14:useLocalDpi xmlns:a14="http://schemas.microsoft.com/office/drawing/2010/main" val="0"/>
+              </a:ext>
+            </a:extLst>
+          </a:blip>
+          <a:stretch>
+            <a:fillRect/>
+          </a:stretch>
+        </p:blipFill>
+        <p:spPr>
+          <a:xfrm>
+            <a:off x="3179209" y="3298055"/>
+            <a:ext cx="6085372" cy="3194820"/>
+          </a:xfrm>
+          <a:prstGeom prst="rect">
+            <a:avLst/>
+          </a:prstGeom>
+        </p:spPr>
+      </p:pic>
+    </p:spTree>
+    <p:extLst>
+      <p:ext uri="{BB962C8B-B14F-4D97-AF65-F5344CB8AC3E}">
+        <p14:creationId xmlns:p14="http://schemas.microsoft.com/office/powerpoint/2010/main" val="2221561252"/>
+      </p:ext>
+    </p:extLst>
+  </p:cSld>
+  <p:clrMapOvr>
+    <a:masterClrMapping/>
+  </p:clrMapOvr>
+</p:sld>
+</file>
+
+<file path=ppt/slides/slide87.xml><?xml version="1.0" encoding="utf-8"?>
 <p:sld xmlns:a="http://schemas.openxmlformats.org/drawingml/2006/main" xmlns:r="http://schemas.openxmlformats.org/officeDocument/2006/relationships" xmlns:p="http://schemas.openxmlformats.org/presentationml/2006/main">
   <p:cSld>
     <p:spTree>
@@ -42104,7 +43180,7 @@
 </p:sld>
 </file>
 
-<file path=ppt/slides/slide86.xml><?xml version="1.0" encoding="utf-8"?>
+<file path=ppt/slides/slide88.xml><?xml version="1.0" encoding="utf-8"?>
 <p:sld xmlns:a="http://schemas.openxmlformats.org/drawingml/2006/main" xmlns:r="http://schemas.openxmlformats.org/officeDocument/2006/relationships" xmlns:p="http://schemas.openxmlformats.org/presentationml/2006/main">
   <p:cSld>
     <p:spTree>
@@ -42371,7 +43447,7 @@
 </p:sld>
 </file>
 
-<file path=ppt/slides/slide87.xml><?xml version="1.0" encoding="utf-8"?>
+<file path=ppt/slides/slide89.xml><?xml version="1.0" encoding="utf-8"?>
 <p:sld xmlns:a="http://schemas.openxmlformats.org/drawingml/2006/main" xmlns:r="http://schemas.openxmlformats.org/officeDocument/2006/relationships" xmlns:p="http://schemas.openxmlformats.org/presentationml/2006/main">
   <p:cSld>
     <p:spTree>
@@ -42631,560 +43707,6 @@
     <p:extLst>
       <p:ext uri="{BB962C8B-B14F-4D97-AF65-F5344CB8AC3E}">
         <p14:creationId xmlns:p14="http://schemas.microsoft.com/office/powerpoint/2010/main" val="442139905"/>
-      </p:ext>
-    </p:extLst>
-  </p:cSld>
-  <p:clrMapOvr>
-    <a:masterClrMapping/>
-  </p:clrMapOvr>
-</p:sld>
-</file>
-
-<file path=ppt/slides/slide88.xml><?xml version="1.0" encoding="utf-8"?>
-<p:sld xmlns:a="http://schemas.openxmlformats.org/drawingml/2006/main" xmlns:r="http://schemas.openxmlformats.org/officeDocument/2006/relationships" xmlns:p="http://schemas.openxmlformats.org/presentationml/2006/main">
-  <p:cSld>
-    <p:spTree>
-      <p:nvGrpSpPr>
-        <p:cNvPr id="1" name=""/>
-        <p:cNvGrpSpPr/>
-        <p:nvPr/>
-      </p:nvGrpSpPr>
-      <p:grpSpPr>
-        <a:xfrm>
-          <a:off x="0" y="0"/>
-          <a:ext cx="0" cy="0"/>
-          <a:chOff x="0" y="0"/>
-          <a:chExt cx="0" cy="0"/>
-        </a:xfrm>
-      </p:grpSpPr>
-      <p:sp>
-        <p:nvSpPr>
-          <p:cNvPr id="2" name="Title 1">
-            <a:extLst>
-              <a:ext uri="{FF2B5EF4-FFF2-40B4-BE49-F238E27FC236}">
-                <a16:creationId xmlns:a16="http://schemas.microsoft.com/office/drawing/2014/main" id="{E62531BD-125F-15E9-DB94-E914FAB3400B}"/>
-              </a:ext>
-            </a:extLst>
-          </p:cNvPr>
-          <p:cNvSpPr>
-            <a:spLocks noGrp="1"/>
-          </p:cNvSpPr>
-          <p:nvPr>
-            <p:ph type="title"/>
-          </p:nvPr>
-        </p:nvSpPr>
-        <p:spPr/>
-        <p:txBody>
-          <a:bodyPr>
-            <a:normAutofit fontScale="90000"/>
-          </a:bodyPr>
-          <a:lstStyle/>
-          <a:p>
-            <a:pPr algn="ctr"/>
-            <a:r>
-              <a:rPr lang="bg-BG" dirty="0">
-                <a:latin typeface="Arial" panose="020B0604020202020204" pitchFamily="34" charset="0"/>
-                <a:cs typeface="Arial" panose="020B0604020202020204" pitchFamily="34" charset="0"/>
-              </a:rPr>
-              <a:t>От десетична към двоична бройна система</a:t>
-            </a:r>
-          </a:p>
-        </p:txBody>
-      </p:sp>
-      <p:pic>
-        <p:nvPicPr>
-          <p:cNvPr id="5" name="Content Placeholder 4" descr="A table with numbers and symbols&#10;&#10;Description automatically generated">
-            <a:extLst>
-              <a:ext uri="{FF2B5EF4-FFF2-40B4-BE49-F238E27FC236}">
-                <a16:creationId xmlns:a16="http://schemas.microsoft.com/office/drawing/2014/main" id="{B664799A-D75A-B636-83FF-88C175A947D4}"/>
-              </a:ext>
-            </a:extLst>
-          </p:cNvPr>
-          <p:cNvPicPr>
-            <a:picLocks noGrp="1" noChangeAspect="1"/>
-          </p:cNvPicPr>
-          <p:nvPr>
-            <p:ph idx="1"/>
-          </p:nvPr>
-        </p:nvPicPr>
-        <p:blipFill>
-          <a:blip r:embed="rId3">
-            <a:extLst>
-              <a:ext uri="{28A0092B-C50C-407E-A947-70E740481C1C}">
-                <a14:useLocalDpi xmlns:a14="http://schemas.microsoft.com/office/drawing/2010/main" val="0"/>
-              </a:ext>
-            </a:extLst>
-          </a:blip>
-          <a:stretch>
-            <a:fillRect/>
-          </a:stretch>
-        </p:blipFill>
-        <p:spPr>
-          <a:xfrm>
-            <a:off x="838200" y="2237639"/>
-            <a:ext cx="4413425" cy="4154573"/>
-          </a:xfrm>
-        </p:spPr>
-      </p:pic>
-      <p:pic>
-        <p:nvPicPr>
-          <p:cNvPr id="7" name="Picture 6" descr="A close-up of a graph&#10;&#10;Description automatically generated">
-            <a:extLst>
-              <a:ext uri="{FF2B5EF4-FFF2-40B4-BE49-F238E27FC236}">
-                <a16:creationId xmlns:a16="http://schemas.microsoft.com/office/drawing/2014/main" id="{81CC5040-7E27-8281-187E-3B26820F3084}"/>
-              </a:ext>
-            </a:extLst>
-          </p:cNvPr>
-          <p:cNvPicPr>
-            <a:picLocks noChangeAspect="1"/>
-          </p:cNvPicPr>
-          <p:nvPr/>
-        </p:nvPicPr>
-        <p:blipFill>
-          <a:blip r:embed="rId4">
-            <a:extLst>
-              <a:ext uri="{28A0092B-C50C-407E-A947-70E740481C1C}">
-                <a14:useLocalDpi xmlns:a14="http://schemas.microsoft.com/office/drawing/2010/main" val="0"/>
-              </a:ext>
-            </a:extLst>
-          </a:blip>
-          <a:stretch>
-            <a:fillRect/>
-          </a:stretch>
-        </p:blipFill>
-        <p:spPr>
-          <a:xfrm>
-            <a:off x="6096000" y="2543167"/>
-            <a:ext cx="5182948" cy="1771666"/>
-          </a:xfrm>
-          <a:prstGeom prst="rect">
-            <a:avLst/>
-          </a:prstGeom>
-        </p:spPr>
-      </p:pic>
-      <p:sp>
-        <p:nvSpPr>
-          <p:cNvPr id="10" name="TextBox 9">
-            <a:extLst>
-              <a:ext uri="{FF2B5EF4-FFF2-40B4-BE49-F238E27FC236}">
-                <a16:creationId xmlns:a16="http://schemas.microsoft.com/office/drawing/2014/main" id="{81063023-F391-7400-6DD4-3C80F97B9022}"/>
-              </a:ext>
-            </a:extLst>
-          </p:cNvPr>
-          <p:cNvSpPr txBox="1"/>
-          <p:nvPr/>
-        </p:nvSpPr>
-        <p:spPr>
-          <a:xfrm>
-            <a:off x="6095999" y="2052973"/>
-            <a:ext cx="3618452" cy="369332"/>
-          </a:xfrm>
-          <a:prstGeom prst="rect">
-            <a:avLst/>
-          </a:prstGeom>
-          <a:noFill/>
-        </p:spPr>
-        <p:txBody>
-          <a:bodyPr wrap="square" rtlCol="0">
-            <a:spAutoFit/>
-          </a:bodyPr>
-          <a:lstStyle/>
-          <a:p>
-            <a:r>
-              <a:rPr lang="en-US" dirty="0">
-                <a:solidFill>
-                  <a:srgbClr val="FFC000"/>
-                </a:solidFill>
-                <a:latin typeface="Arial" panose="020B0604020202020204" pitchFamily="34" charset="0"/>
-                <a:cs typeface="Arial" panose="020B0604020202020204" pitchFamily="34" charset="0"/>
-              </a:rPr>
-              <a:t>11</a:t>
-            </a:r>
-            <a:r>
-              <a:rPr lang="en-US" dirty="0">
-                <a:solidFill>
-                  <a:srgbClr val="92D050"/>
-                </a:solidFill>
-                <a:latin typeface="Arial" panose="020B0604020202020204" pitchFamily="34" charset="0"/>
-                <a:cs typeface="Arial" panose="020B0604020202020204" pitchFamily="34" charset="0"/>
-              </a:rPr>
-              <a:t> -&gt; </a:t>
-            </a:r>
-            <a:r>
-              <a:rPr lang="en-US" dirty="0">
-                <a:solidFill>
-                  <a:srgbClr val="FFC000"/>
-                </a:solidFill>
-                <a:latin typeface="Arial" panose="020B0604020202020204" pitchFamily="34" charset="0"/>
-                <a:cs typeface="Arial" panose="020B0604020202020204" pitchFamily="34" charset="0"/>
-              </a:rPr>
-              <a:t>1011</a:t>
-            </a:r>
-            <a:r>
-              <a:rPr lang="en-US" dirty="0">
-                <a:solidFill>
-                  <a:srgbClr val="92D050"/>
-                </a:solidFill>
-                <a:latin typeface="Arial" panose="020B0604020202020204" pitchFamily="34" charset="0"/>
-                <a:cs typeface="Arial" panose="020B0604020202020204" pitchFamily="34" charset="0"/>
-              </a:rPr>
-              <a:t> -&gt; 00001011 (</a:t>
-            </a:r>
-            <a:r>
-              <a:rPr lang="en-US" dirty="0">
-                <a:solidFill>
-                  <a:schemeClr val="tx2">
-                    <a:lumMod val="75000"/>
-                  </a:schemeClr>
-                </a:solidFill>
-                <a:latin typeface="Arial" panose="020B0604020202020204" pitchFamily="34" charset="0"/>
-                <a:cs typeface="Arial" panose="020B0604020202020204" pitchFamily="34" charset="0"/>
-              </a:rPr>
-              <a:t>8 bits</a:t>
-            </a:r>
-            <a:r>
-              <a:rPr lang="en-US" dirty="0">
-                <a:solidFill>
-                  <a:srgbClr val="92D050"/>
-                </a:solidFill>
-                <a:latin typeface="Arial" panose="020B0604020202020204" pitchFamily="34" charset="0"/>
-                <a:cs typeface="Arial" panose="020B0604020202020204" pitchFamily="34" charset="0"/>
-              </a:rPr>
-              <a:t>)</a:t>
-            </a:r>
-            <a:endParaRPr lang="bg-BG" dirty="0">
-              <a:solidFill>
-                <a:srgbClr val="92D050"/>
-              </a:solidFill>
-              <a:latin typeface="Arial" panose="020B0604020202020204" pitchFamily="34" charset="0"/>
-              <a:cs typeface="Arial" panose="020B0604020202020204" pitchFamily="34" charset="0"/>
-            </a:endParaRPr>
-          </a:p>
-        </p:txBody>
-      </p:sp>
-      <p:sp>
-        <p:nvSpPr>
-          <p:cNvPr id="11" name="TextBox 10">
-            <a:extLst>
-              <a:ext uri="{FF2B5EF4-FFF2-40B4-BE49-F238E27FC236}">
-                <a16:creationId xmlns:a16="http://schemas.microsoft.com/office/drawing/2014/main" id="{92AF663E-D0BC-F8D4-8573-5783F60E23AC}"/>
-              </a:ext>
-            </a:extLst>
-          </p:cNvPr>
-          <p:cNvSpPr txBox="1"/>
-          <p:nvPr/>
-        </p:nvSpPr>
-        <p:spPr>
-          <a:xfrm>
-            <a:off x="6171500" y="4797980"/>
-            <a:ext cx="3224170" cy="369332"/>
-          </a:xfrm>
-          <a:prstGeom prst="rect">
-            <a:avLst/>
-          </a:prstGeom>
-          <a:noFill/>
-        </p:spPr>
-        <p:txBody>
-          <a:bodyPr wrap="square" rtlCol="0">
-            <a:spAutoFit/>
-          </a:bodyPr>
-          <a:lstStyle/>
-          <a:p>
-            <a:r>
-              <a:rPr lang="en-US" dirty="0">
-                <a:solidFill>
-                  <a:srgbClr val="FFC000"/>
-                </a:solidFill>
-                <a:latin typeface="Arial" panose="020B0604020202020204" pitchFamily="34" charset="0"/>
-                <a:cs typeface="Arial" panose="020B0604020202020204" pitchFamily="34" charset="0"/>
-              </a:rPr>
-              <a:t>6 </a:t>
-            </a:r>
-            <a:r>
-              <a:rPr lang="en-US" dirty="0">
-                <a:solidFill>
-                  <a:srgbClr val="92D050"/>
-                </a:solidFill>
-                <a:latin typeface="Arial" panose="020B0604020202020204" pitchFamily="34" charset="0"/>
-                <a:cs typeface="Arial" panose="020B0604020202020204" pitchFamily="34" charset="0"/>
-              </a:rPr>
-              <a:t>-&gt; </a:t>
-            </a:r>
-            <a:r>
-              <a:rPr lang="en-US" dirty="0">
-                <a:solidFill>
-                  <a:srgbClr val="FFC000"/>
-                </a:solidFill>
-                <a:latin typeface="Arial" panose="020B0604020202020204" pitchFamily="34" charset="0"/>
-                <a:cs typeface="Arial" panose="020B0604020202020204" pitchFamily="34" charset="0"/>
-              </a:rPr>
-              <a:t>110</a:t>
-            </a:r>
-            <a:r>
-              <a:rPr lang="en-US" dirty="0">
-                <a:solidFill>
-                  <a:srgbClr val="92D050"/>
-                </a:solidFill>
-                <a:latin typeface="Arial" panose="020B0604020202020204" pitchFamily="34" charset="0"/>
-                <a:cs typeface="Arial" panose="020B0604020202020204" pitchFamily="34" charset="0"/>
-              </a:rPr>
-              <a:t> -&gt; 00000110 (</a:t>
-            </a:r>
-            <a:r>
-              <a:rPr lang="en-US" dirty="0">
-                <a:solidFill>
-                  <a:schemeClr val="tx2">
-                    <a:lumMod val="75000"/>
-                  </a:schemeClr>
-                </a:solidFill>
-                <a:latin typeface="Arial" panose="020B0604020202020204" pitchFamily="34" charset="0"/>
-                <a:cs typeface="Arial" panose="020B0604020202020204" pitchFamily="34" charset="0"/>
-              </a:rPr>
-              <a:t>8 bits</a:t>
-            </a:r>
-            <a:r>
-              <a:rPr lang="en-US" dirty="0">
-                <a:solidFill>
-                  <a:srgbClr val="92D050"/>
-                </a:solidFill>
-                <a:latin typeface="Arial" panose="020B0604020202020204" pitchFamily="34" charset="0"/>
-                <a:cs typeface="Arial" panose="020B0604020202020204" pitchFamily="34" charset="0"/>
-              </a:rPr>
-              <a:t>)</a:t>
-            </a:r>
-            <a:endParaRPr lang="bg-BG" dirty="0">
-              <a:solidFill>
-                <a:srgbClr val="92D050"/>
-              </a:solidFill>
-              <a:latin typeface="Arial" panose="020B0604020202020204" pitchFamily="34" charset="0"/>
-              <a:cs typeface="Arial" panose="020B0604020202020204" pitchFamily="34" charset="0"/>
-            </a:endParaRPr>
-          </a:p>
-        </p:txBody>
-      </p:sp>
-      <p:pic>
-        <p:nvPicPr>
-          <p:cNvPr id="8" name="Picture 7" descr="A screenshot of a math game&#10;&#10;Description automatically generated">
-            <a:extLst>
-              <a:ext uri="{FF2B5EF4-FFF2-40B4-BE49-F238E27FC236}">
-                <a16:creationId xmlns:a16="http://schemas.microsoft.com/office/drawing/2014/main" id="{E0903480-5BC2-9595-1FA3-9BAC3C31F83D}"/>
-              </a:ext>
-            </a:extLst>
-          </p:cNvPr>
-          <p:cNvPicPr>
-            <a:picLocks noChangeAspect="1"/>
-          </p:cNvPicPr>
-          <p:nvPr/>
-        </p:nvPicPr>
-        <p:blipFill>
-          <a:blip r:embed="rId5">
-            <a:extLst>
-              <a:ext uri="{28A0092B-C50C-407E-A947-70E740481C1C}">
-                <a14:useLocalDpi xmlns:a14="http://schemas.microsoft.com/office/drawing/2010/main" val="0"/>
-              </a:ext>
-            </a:extLst>
-          </a:blip>
-          <a:stretch>
-            <a:fillRect/>
-          </a:stretch>
-        </p:blipFill>
-        <p:spPr>
-          <a:xfrm>
-            <a:off x="6095999" y="5348182"/>
-            <a:ext cx="2095682" cy="1044030"/>
-          </a:xfrm>
-          <a:prstGeom prst="rect">
-            <a:avLst/>
-          </a:prstGeom>
-        </p:spPr>
-      </p:pic>
-      <p:cxnSp>
-        <p:nvCxnSpPr>
-          <p:cNvPr id="13" name="Straight Arrow Connector 12">
-            <a:extLst>
-              <a:ext uri="{FF2B5EF4-FFF2-40B4-BE49-F238E27FC236}">
-                <a16:creationId xmlns:a16="http://schemas.microsoft.com/office/drawing/2014/main" id="{13A9B6ED-36C7-6271-5D93-17C38EFE6165}"/>
-              </a:ext>
-            </a:extLst>
-          </p:cNvPr>
-          <p:cNvCxnSpPr/>
-          <p:nvPr/>
-        </p:nvCxnSpPr>
-        <p:spPr>
-          <a:xfrm flipV="1">
-            <a:off x="8338657" y="5738070"/>
-            <a:ext cx="889233" cy="132127"/>
-          </a:xfrm>
-          <a:prstGeom prst="straightConnector1">
-            <a:avLst/>
-          </a:prstGeom>
-          <a:ln>
-            <a:solidFill>
-              <a:schemeClr val="tx1"/>
-            </a:solidFill>
-            <a:tailEnd type="triangle"/>
-          </a:ln>
-        </p:spPr>
-        <p:style>
-          <a:lnRef idx="1">
-            <a:schemeClr val="accent1"/>
-          </a:lnRef>
-          <a:fillRef idx="0">
-            <a:schemeClr val="accent1"/>
-          </a:fillRef>
-          <a:effectRef idx="0">
-            <a:schemeClr val="accent1"/>
-          </a:effectRef>
-          <a:fontRef idx="minor">
-            <a:schemeClr val="tx1"/>
-          </a:fontRef>
-        </p:style>
-      </p:cxnSp>
-      <p:sp>
-        <p:nvSpPr>
-          <p:cNvPr id="14" name="TextBox 13">
-            <a:extLst>
-              <a:ext uri="{FF2B5EF4-FFF2-40B4-BE49-F238E27FC236}">
-                <a16:creationId xmlns:a16="http://schemas.microsoft.com/office/drawing/2014/main" id="{AFE5F3F6-59BF-7842-E1CD-09CB80C01602}"/>
-              </a:ext>
-            </a:extLst>
-          </p:cNvPr>
-          <p:cNvSpPr txBox="1"/>
-          <p:nvPr/>
-        </p:nvSpPr>
-        <p:spPr>
-          <a:xfrm>
-            <a:off x="9278224" y="5553404"/>
-            <a:ext cx="662730" cy="369332"/>
-          </a:xfrm>
-          <a:prstGeom prst="rect">
-            <a:avLst/>
-          </a:prstGeom>
-          <a:noFill/>
-        </p:spPr>
-        <p:txBody>
-          <a:bodyPr wrap="square" rtlCol="0">
-            <a:spAutoFit/>
-          </a:bodyPr>
-          <a:lstStyle/>
-          <a:p>
-            <a:r>
-              <a:rPr lang="en-US" dirty="0">
-                <a:latin typeface="Arial" panose="020B0604020202020204" pitchFamily="34" charset="0"/>
-                <a:cs typeface="Arial" panose="020B0604020202020204" pitchFamily="34" charset="0"/>
-              </a:rPr>
-              <a:t>110</a:t>
-            </a:r>
-            <a:endParaRPr lang="bg-BG" dirty="0">
-              <a:latin typeface="Arial" panose="020B0604020202020204" pitchFamily="34" charset="0"/>
-              <a:cs typeface="Arial" panose="020B0604020202020204" pitchFamily="34" charset="0"/>
-            </a:endParaRPr>
-          </a:p>
-        </p:txBody>
-      </p:sp>
-    </p:spTree>
-    <p:extLst>
-      <p:ext uri="{BB962C8B-B14F-4D97-AF65-F5344CB8AC3E}">
-        <p14:creationId xmlns:p14="http://schemas.microsoft.com/office/powerpoint/2010/main" val="1505226045"/>
-      </p:ext>
-    </p:extLst>
-  </p:cSld>
-  <p:clrMapOvr>
-    <a:masterClrMapping/>
-  </p:clrMapOvr>
-</p:sld>
-</file>
-
-<file path=ppt/slides/slide89.xml><?xml version="1.0" encoding="utf-8"?>
-<p:sld xmlns:a="http://schemas.openxmlformats.org/drawingml/2006/main" xmlns:r="http://schemas.openxmlformats.org/officeDocument/2006/relationships" xmlns:p="http://schemas.openxmlformats.org/presentationml/2006/main">
-  <p:cSld>
-    <p:spTree>
-      <p:nvGrpSpPr>
-        <p:cNvPr id="1" name=""/>
-        <p:cNvGrpSpPr/>
-        <p:nvPr/>
-      </p:nvGrpSpPr>
-      <p:grpSpPr>
-        <a:xfrm>
-          <a:off x="0" y="0"/>
-          <a:ext cx="0" cy="0"/>
-          <a:chOff x="0" y="0"/>
-          <a:chExt cx="0" cy="0"/>
-        </a:xfrm>
-      </p:grpSpPr>
-      <p:sp>
-        <p:nvSpPr>
-          <p:cNvPr id="2" name="Title 1">
-            <a:extLst>
-              <a:ext uri="{FF2B5EF4-FFF2-40B4-BE49-F238E27FC236}">
-                <a16:creationId xmlns:a16="http://schemas.microsoft.com/office/drawing/2014/main" id="{E62531BD-125F-15E9-DB94-E914FAB3400B}"/>
-              </a:ext>
-            </a:extLst>
-          </p:cNvPr>
-          <p:cNvSpPr>
-            <a:spLocks noGrp="1"/>
-          </p:cNvSpPr>
-          <p:nvPr>
-            <p:ph type="title"/>
-          </p:nvPr>
-        </p:nvSpPr>
-        <p:spPr/>
-        <p:txBody>
-          <a:bodyPr>
-            <a:normAutofit fontScale="90000"/>
-          </a:bodyPr>
-          <a:lstStyle/>
-          <a:p>
-            <a:pPr algn="ctr"/>
-            <a:r>
-              <a:rPr lang="bg-BG" dirty="0">
-                <a:latin typeface="Arial" panose="020B0604020202020204" pitchFamily="34" charset="0"/>
-                <a:cs typeface="Arial" panose="020B0604020202020204" pitchFamily="34" charset="0"/>
-              </a:rPr>
-              <a:t>От двоична към десетична бройна система</a:t>
-            </a:r>
-          </a:p>
-        </p:txBody>
-      </p:sp>
-      <p:pic>
-        <p:nvPicPr>
-          <p:cNvPr id="17" name="Content Placeholder 16" descr="A screenshot of a math game&#10;&#10;Description automatically generated">
-            <a:extLst>
-              <a:ext uri="{FF2B5EF4-FFF2-40B4-BE49-F238E27FC236}">
-                <a16:creationId xmlns:a16="http://schemas.microsoft.com/office/drawing/2014/main" id="{A2D5B17A-9784-468D-CB2B-A988C526CA00}"/>
-              </a:ext>
-            </a:extLst>
-          </p:cNvPr>
-          <p:cNvPicPr>
-            <a:picLocks noGrp="1" noChangeAspect="1"/>
-          </p:cNvPicPr>
-          <p:nvPr>
-            <p:ph idx="1"/>
-          </p:nvPr>
-        </p:nvPicPr>
-        <p:blipFill>
-          <a:blip r:embed="rId3">
-            <a:extLst>
-              <a:ext uri="{28A0092B-C50C-407E-A947-70E740481C1C}">
-                <a14:useLocalDpi xmlns:a14="http://schemas.microsoft.com/office/drawing/2010/main" val="0"/>
-              </a:ext>
-            </a:extLst>
-          </a:blip>
-          <a:stretch>
-            <a:fillRect/>
-          </a:stretch>
-        </p:blipFill>
-        <p:spPr>
-          <a:xfrm>
-            <a:off x="1199872" y="3117959"/>
-            <a:ext cx="9322093" cy="2460720"/>
-          </a:xfrm>
-        </p:spPr>
-      </p:pic>
-    </p:spTree>
-    <p:extLst>
-      <p:ext uri="{BB962C8B-B14F-4D97-AF65-F5344CB8AC3E}">
-        <p14:creationId xmlns:p14="http://schemas.microsoft.com/office/powerpoint/2010/main" val="3380909511"/>
       </p:ext>
     </p:extLst>
   </p:cSld>
@@ -43976,6 +44498,560 @@
                 <a:latin typeface="Arial" panose="020B0604020202020204" pitchFamily="34" charset="0"/>
                 <a:cs typeface="Arial" panose="020B0604020202020204" pitchFamily="34" charset="0"/>
               </a:rPr>
+              <a:t>От десетична към двоична бройна система</a:t>
+            </a:r>
+          </a:p>
+        </p:txBody>
+      </p:sp>
+      <p:pic>
+        <p:nvPicPr>
+          <p:cNvPr id="5" name="Content Placeholder 4" descr="A table with numbers and symbols&#10;&#10;Description automatically generated">
+            <a:extLst>
+              <a:ext uri="{FF2B5EF4-FFF2-40B4-BE49-F238E27FC236}">
+                <a16:creationId xmlns:a16="http://schemas.microsoft.com/office/drawing/2014/main" id="{B664799A-D75A-B636-83FF-88C175A947D4}"/>
+              </a:ext>
+            </a:extLst>
+          </p:cNvPr>
+          <p:cNvPicPr>
+            <a:picLocks noGrp="1" noChangeAspect="1"/>
+          </p:cNvPicPr>
+          <p:nvPr>
+            <p:ph idx="1"/>
+          </p:nvPr>
+        </p:nvPicPr>
+        <p:blipFill>
+          <a:blip r:embed="rId3">
+            <a:extLst>
+              <a:ext uri="{28A0092B-C50C-407E-A947-70E740481C1C}">
+                <a14:useLocalDpi xmlns:a14="http://schemas.microsoft.com/office/drawing/2010/main" val="0"/>
+              </a:ext>
+            </a:extLst>
+          </a:blip>
+          <a:stretch>
+            <a:fillRect/>
+          </a:stretch>
+        </p:blipFill>
+        <p:spPr>
+          <a:xfrm>
+            <a:off x="838200" y="2237639"/>
+            <a:ext cx="4413425" cy="4154573"/>
+          </a:xfrm>
+        </p:spPr>
+      </p:pic>
+      <p:pic>
+        <p:nvPicPr>
+          <p:cNvPr id="7" name="Picture 6" descr="A close-up of a graph&#10;&#10;Description automatically generated">
+            <a:extLst>
+              <a:ext uri="{FF2B5EF4-FFF2-40B4-BE49-F238E27FC236}">
+                <a16:creationId xmlns:a16="http://schemas.microsoft.com/office/drawing/2014/main" id="{81CC5040-7E27-8281-187E-3B26820F3084}"/>
+              </a:ext>
+            </a:extLst>
+          </p:cNvPr>
+          <p:cNvPicPr>
+            <a:picLocks noChangeAspect="1"/>
+          </p:cNvPicPr>
+          <p:nvPr/>
+        </p:nvPicPr>
+        <p:blipFill>
+          <a:blip r:embed="rId4">
+            <a:extLst>
+              <a:ext uri="{28A0092B-C50C-407E-A947-70E740481C1C}">
+                <a14:useLocalDpi xmlns:a14="http://schemas.microsoft.com/office/drawing/2010/main" val="0"/>
+              </a:ext>
+            </a:extLst>
+          </a:blip>
+          <a:stretch>
+            <a:fillRect/>
+          </a:stretch>
+        </p:blipFill>
+        <p:spPr>
+          <a:xfrm>
+            <a:off x="6096000" y="2543167"/>
+            <a:ext cx="5182948" cy="1771666"/>
+          </a:xfrm>
+          <a:prstGeom prst="rect">
+            <a:avLst/>
+          </a:prstGeom>
+        </p:spPr>
+      </p:pic>
+      <p:sp>
+        <p:nvSpPr>
+          <p:cNvPr id="10" name="TextBox 9">
+            <a:extLst>
+              <a:ext uri="{FF2B5EF4-FFF2-40B4-BE49-F238E27FC236}">
+                <a16:creationId xmlns:a16="http://schemas.microsoft.com/office/drawing/2014/main" id="{81063023-F391-7400-6DD4-3C80F97B9022}"/>
+              </a:ext>
+            </a:extLst>
+          </p:cNvPr>
+          <p:cNvSpPr txBox="1"/>
+          <p:nvPr/>
+        </p:nvSpPr>
+        <p:spPr>
+          <a:xfrm>
+            <a:off x="6095999" y="2052973"/>
+            <a:ext cx="3618452" cy="369332"/>
+          </a:xfrm>
+          <a:prstGeom prst="rect">
+            <a:avLst/>
+          </a:prstGeom>
+          <a:noFill/>
+        </p:spPr>
+        <p:txBody>
+          <a:bodyPr wrap="square" rtlCol="0">
+            <a:spAutoFit/>
+          </a:bodyPr>
+          <a:lstStyle/>
+          <a:p>
+            <a:r>
+              <a:rPr lang="en-US" dirty="0">
+                <a:solidFill>
+                  <a:srgbClr val="FFC000"/>
+                </a:solidFill>
+                <a:latin typeface="Arial" panose="020B0604020202020204" pitchFamily="34" charset="0"/>
+                <a:cs typeface="Arial" panose="020B0604020202020204" pitchFamily="34" charset="0"/>
+              </a:rPr>
+              <a:t>11</a:t>
+            </a:r>
+            <a:r>
+              <a:rPr lang="en-US" dirty="0">
+                <a:solidFill>
+                  <a:srgbClr val="92D050"/>
+                </a:solidFill>
+                <a:latin typeface="Arial" panose="020B0604020202020204" pitchFamily="34" charset="0"/>
+                <a:cs typeface="Arial" panose="020B0604020202020204" pitchFamily="34" charset="0"/>
+              </a:rPr>
+              <a:t> -&gt; </a:t>
+            </a:r>
+            <a:r>
+              <a:rPr lang="en-US" dirty="0">
+                <a:solidFill>
+                  <a:srgbClr val="FFC000"/>
+                </a:solidFill>
+                <a:latin typeface="Arial" panose="020B0604020202020204" pitchFamily="34" charset="0"/>
+                <a:cs typeface="Arial" panose="020B0604020202020204" pitchFamily="34" charset="0"/>
+              </a:rPr>
+              <a:t>1011</a:t>
+            </a:r>
+            <a:r>
+              <a:rPr lang="en-US" dirty="0">
+                <a:solidFill>
+                  <a:srgbClr val="92D050"/>
+                </a:solidFill>
+                <a:latin typeface="Arial" panose="020B0604020202020204" pitchFamily="34" charset="0"/>
+                <a:cs typeface="Arial" panose="020B0604020202020204" pitchFamily="34" charset="0"/>
+              </a:rPr>
+              <a:t> -&gt; 00001011 (</a:t>
+            </a:r>
+            <a:r>
+              <a:rPr lang="en-US" dirty="0">
+                <a:solidFill>
+                  <a:schemeClr val="tx2">
+                    <a:lumMod val="75000"/>
+                  </a:schemeClr>
+                </a:solidFill>
+                <a:latin typeface="Arial" panose="020B0604020202020204" pitchFamily="34" charset="0"/>
+                <a:cs typeface="Arial" panose="020B0604020202020204" pitchFamily="34" charset="0"/>
+              </a:rPr>
+              <a:t>8 bits</a:t>
+            </a:r>
+            <a:r>
+              <a:rPr lang="en-US" dirty="0">
+                <a:solidFill>
+                  <a:srgbClr val="92D050"/>
+                </a:solidFill>
+                <a:latin typeface="Arial" panose="020B0604020202020204" pitchFamily="34" charset="0"/>
+                <a:cs typeface="Arial" panose="020B0604020202020204" pitchFamily="34" charset="0"/>
+              </a:rPr>
+              <a:t>)</a:t>
+            </a:r>
+            <a:endParaRPr lang="bg-BG" dirty="0">
+              <a:solidFill>
+                <a:srgbClr val="92D050"/>
+              </a:solidFill>
+              <a:latin typeface="Arial" panose="020B0604020202020204" pitchFamily="34" charset="0"/>
+              <a:cs typeface="Arial" panose="020B0604020202020204" pitchFamily="34" charset="0"/>
+            </a:endParaRPr>
+          </a:p>
+        </p:txBody>
+      </p:sp>
+      <p:sp>
+        <p:nvSpPr>
+          <p:cNvPr id="11" name="TextBox 10">
+            <a:extLst>
+              <a:ext uri="{FF2B5EF4-FFF2-40B4-BE49-F238E27FC236}">
+                <a16:creationId xmlns:a16="http://schemas.microsoft.com/office/drawing/2014/main" id="{92AF663E-D0BC-F8D4-8573-5783F60E23AC}"/>
+              </a:ext>
+            </a:extLst>
+          </p:cNvPr>
+          <p:cNvSpPr txBox="1"/>
+          <p:nvPr/>
+        </p:nvSpPr>
+        <p:spPr>
+          <a:xfrm>
+            <a:off x="6171500" y="4797980"/>
+            <a:ext cx="3224170" cy="369332"/>
+          </a:xfrm>
+          <a:prstGeom prst="rect">
+            <a:avLst/>
+          </a:prstGeom>
+          <a:noFill/>
+        </p:spPr>
+        <p:txBody>
+          <a:bodyPr wrap="square" rtlCol="0">
+            <a:spAutoFit/>
+          </a:bodyPr>
+          <a:lstStyle/>
+          <a:p>
+            <a:r>
+              <a:rPr lang="en-US" dirty="0">
+                <a:solidFill>
+                  <a:srgbClr val="FFC000"/>
+                </a:solidFill>
+                <a:latin typeface="Arial" panose="020B0604020202020204" pitchFamily="34" charset="0"/>
+                <a:cs typeface="Arial" panose="020B0604020202020204" pitchFamily="34" charset="0"/>
+              </a:rPr>
+              <a:t>6 </a:t>
+            </a:r>
+            <a:r>
+              <a:rPr lang="en-US" dirty="0">
+                <a:solidFill>
+                  <a:srgbClr val="92D050"/>
+                </a:solidFill>
+                <a:latin typeface="Arial" panose="020B0604020202020204" pitchFamily="34" charset="0"/>
+                <a:cs typeface="Arial" panose="020B0604020202020204" pitchFamily="34" charset="0"/>
+              </a:rPr>
+              <a:t>-&gt; </a:t>
+            </a:r>
+            <a:r>
+              <a:rPr lang="en-US" dirty="0">
+                <a:solidFill>
+                  <a:srgbClr val="FFC000"/>
+                </a:solidFill>
+                <a:latin typeface="Arial" panose="020B0604020202020204" pitchFamily="34" charset="0"/>
+                <a:cs typeface="Arial" panose="020B0604020202020204" pitchFamily="34" charset="0"/>
+              </a:rPr>
+              <a:t>110</a:t>
+            </a:r>
+            <a:r>
+              <a:rPr lang="en-US" dirty="0">
+                <a:solidFill>
+                  <a:srgbClr val="92D050"/>
+                </a:solidFill>
+                <a:latin typeface="Arial" panose="020B0604020202020204" pitchFamily="34" charset="0"/>
+                <a:cs typeface="Arial" panose="020B0604020202020204" pitchFamily="34" charset="0"/>
+              </a:rPr>
+              <a:t> -&gt; 00000110 (</a:t>
+            </a:r>
+            <a:r>
+              <a:rPr lang="en-US" dirty="0">
+                <a:solidFill>
+                  <a:schemeClr val="tx2">
+                    <a:lumMod val="75000"/>
+                  </a:schemeClr>
+                </a:solidFill>
+                <a:latin typeface="Arial" panose="020B0604020202020204" pitchFamily="34" charset="0"/>
+                <a:cs typeface="Arial" panose="020B0604020202020204" pitchFamily="34" charset="0"/>
+              </a:rPr>
+              <a:t>8 bits</a:t>
+            </a:r>
+            <a:r>
+              <a:rPr lang="en-US" dirty="0">
+                <a:solidFill>
+                  <a:srgbClr val="92D050"/>
+                </a:solidFill>
+                <a:latin typeface="Arial" panose="020B0604020202020204" pitchFamily="34" charset="0"/>
+                <a:cs typeface="Arial" panose="020B0604020202020204" pitchFamily="34" charset="0"/>
+              </a:rPr>
+              <a:t>)</a:t>
+            </a:r>
+            <a:endParaRPr lang="bg-BG" dirty="0">
+              <a:solidFill>
+                <a:srgbClr val="92D050"/>
+              </a:solidFill>
+              <a:latin typeface="Arial" panose="020B0604020202020204" pitchFamily="34" charset="0"/>
+              <a:cs typeface="Arial" panose="020B0604020202020204" pitchFamily="34" charset="0"/>
+            </a:endParaRPr>
+          </a:p>
+        </p:txBody>
+      </p:sp>
+      <p:pic>
+        <p:nvPicPr>
+          <p:cNvPr id="8" name="Picture 7" descr="A screenshot of a math game&#10;&#10;Description automatically generated">
+            <a:extLst>
+              <a:ext uri="{FF2B5EF4-FFF2-40B4-BE49-F238E27FC236}">
+                <a16:creationId xmlns:a16="http://schemas.microsoft.com/office/drawing/2014/main" id="{E0903480-5BC2-9595-1FA3-9BAC3C31F83D}"/>
+              </a:ext>
+            </a:extLst>
+          </p:cNvPr>
+          <p:cNvPicPr>
+            <a:picLocks noChangeAspect="1"/>
+          </p:cNvPicPr>
+          <p:nvPr/>
+        </p:nvPicPr>
+        <p:blipFill>
+          <a:blip r:embed="rId5">
+            <a:extLst>
+              <a:ext uri="{28A0092B-C50C-407E-A947-70E740481C1C}">
+                <a14:useLocalDpi xmlns:a14="http://schemas.microsoft.com/office/drawing/2010/main" val="0"/>
+              </a:ext>
+            </a:extLst>
+          </a:blip>
+          <a:stretch>
+            <a:fillRect/>
+          </a:stretch>
+        </p:blipFill>
+        <p:spPr>
+          <a:xfrm>
+            <a:off x="6095999" y="5348182"/>
+            <a:ext cx="2095682" cy="1044030"/>
+          </a:xfrm>
+          <a:prstGeom prst="rect">
+            <a:avLst/>
+          </a:prstGeom>
+        </p:spPr>
+      </p:pic>
+      <p:cxnSp>
+        <p:nvCxnSpPr>
+          <p:cNvPr id="13" name="Straight Arrow Connector 12">
+            <a:extLst>
+              <a:ext uri="{FF2B5EF4-FFF2-40B4-BE49-F238E27FC236}">
+                <a16:creationId xmlns:a16="http://schemas.microsoft.com/office/drawing/2014/main" id="{13A9B6ED-36C7-6271-5D93-17C38EFE6165}"/>
+              </a:ext>
+            </a:extLst>
+          </p:cNvPr>
+          <p:cNvCxnSpPr/>
+          <p:nvPr/>
+        </p:nvCxnSpPr>
+        <p:spPr>
+          <a:xfrm flipV="1">
+            <a:off x="8338657" y="5738070"/>
+            <a:ext cx="889233" cy="132127"/>
+          </a:xfrm>
+          <a:prstGeom prst="straightConnector1">
+            <a:avLst/>
+          </a:prstGeom>
+          <a:ln>
+            <a:solidFill>
+              <a:schemeClr val="tx1"/>
+            </a:solidFill>
+            <a:tailEnd type="triangle"/>
+          </a:ln>
+        </p:spPr>
+        <p:style>
+          <a:lnRef idx="1">
+            <a:schemeClr val="accent1"/>
+          </a:lnRef>
+          <a:fillRef idx="0">
+            <a:schemeClr val="accent1"/>
+          </a:fillRef>
+          <a:effectRef idx="0">
+            <a:schemeClr val="accent1"/>
+          </a:effectRef>
+          <a:fontRef idx="minor">
+            <a:schemeClr val="tx1"/>
+          </a:fontRef>
+        </p:style>
+      </p:cxnSp>
+      <p:sp>
+        <p:nvSpPr>
+          <p:cNvPr id="14" name="TextBox 13">
+            <a:extLst>
+              <a:ext uri="{FF2B5EF4-FFF2-40B4-BE49-F238E27FC236}">
+                <a16:creationId xmlns:a16="http://schemas.microsoft.com/office/drawing/2014/main" id="{AFE5F3F6-59BF-7842-E1CD-09CB80C01602}"/>
+              </a:ext>
+            </a:extLst>
+          </p:cNvPr>
+          <p:cNvSpPr txBox="1"/>
+          <p:nvPr/>
+        </p:nvSpPr>
+        <p:spPr>
+          <a:xfrm>
+            <a:off x="9278224" y="5553404"/>
+            <a:ext cx="662730" cy="369332"/>
+          </a:xfrm>
+          <a:prstGeom prst="rect">
+            <a:avLst/>
+          </a:prstGeom>
+          <a:noFill/>
+        </p:spPr>
+        <p:txBody>
+          <a:bodyPr wrap="square" rtlCol="0">
+            <a:spAutoFit/>
+          </a:bodyPr>
+          <a:lstStyle/>
+          <a:p>
+            <a:r>
+              <a:rPr lang="en-US" dirty="0">
+                <a:latin typeface="Arial" panose="020B0604020202020204" pitchFamily="34" charset="0"/>
+                <a:cs typeface="Arial" panose="020B0604020202020204" pitchFamily="34" charset="0"/>
+              </a:rPr>
+              <a:t>110</a:t>
+            </a:r>
+            <a:endParaRPr lang="bg-BG" dirty="0">
+              <a:latin typeface="Arial" panose="020B0604020202020204" pitchFamily="34" charset="0"/>
+              <a:cs typeface="Arial" panose="020B0604020202020204" pitchFamily="34" charset="0"/>
+            </a:endParaRPr>
+          </a:p>
+        </p:txBody>
+      </p:sp>
+    </p:spTree>
+    <p:extLst>
+      <p:ext uri="{BB962C8B-B14F-4D97-AF65-F5344CB8AC3E}">
+        <p14:creationId xmlns:p14="http://schemas.microsoft.com/office/powerpoint/2010/main" val="1505226045"/>
+      </p:ext>
+    </p:extLst>
+  </p:cSld>
+  <p:clrMapOvr>
+    <a:masterClrMapping/>
+  </p:clrMapOvr>
+</p:sld>
+</file>
+
+<file path=ppt/slides/slide91.xml><?xml version="1.0" encoding="utf-8"?>
+<p:sld xmlns:a="http://schemas.openxmlformats.org/drawingml/2006/main" xmlns:r="http://schemas.openxmlformats.org/officeDocument/2006/relationships" xmlns:p="http://schemas.openxmlformats.org/presentationml/2006/main">
+  <p:cSld>
+    <p:spTree>
+      <p:nvGrpSpPr>
+        <p:cNvPr id="1" name=""/>
+        <p:cNvGrpSpPr/>
+        <p:nvPr/>
+      </p:nvGrpSpPr>
+      <p:grpSpPr>
+        <a:xfrm>
+          <a:off x="0" y="0"/>
+          <a:ext cx="0" cy="0"/>
+          <a:chOff x="0" y="0"/>
+          <a:chExt cx="0" cy="0"/>
+        </a:xfrm>
+      </p:grpSpPr>
+      <p:sp>
+        <p:nvSpPr>
+          <p:cNvPr id="2" name="Title 1">
+            <a:extLst>
+              <a:ext uri="{FF2B5EF4-FFF2-40B4-BE49-F238E27FC236}">
+                <a16:creationId xmlns:a16="http://schemas.microsoft.com/office/drawing/2014/main" id="{E62531BD-125F-15E9-DB94-E914FAB3400B}"/>
+              </a:ext>
+            </a:extLst>
+          </p:cNvPr>
+          <p:cNvSpPr>
+            <a:spLocks noGrp="1"/>
+          </p:cNvSpPr>
+          <p:nvPr>
+            <p:ph type="title"/>
+          </p:nvPr>
+        </p:nvSpPr>
+        <p:spPr/>
+        <p:txBody>
+          <a:bodyPr>
+            <a:normAutofit fontScale="90000"/>
+          </a:bodyPr>
+          <a:lstStyle/>
+          <a:p>
+            <a:pPr algn="ctr"/>
+            <a:r>
+              <a:rPr lang="bg-BG" dirty="0">
+                <a:latin typeface="Arial" panose="020B0604020202020204" pitchFamily="34" charset="0"/>
+                <a:cs typeface="Arial" panose="020B0604020202020204" pitchFamily="34" charset="0"/>
+              </a:rPr>
+              <a:t>От двоична към десетична бройна система</a:t>
+            </a:r>
+          </a:p>
+        </p:txBody>
+      </p:sp>
+      <p:pic>
+        <p:nvPicPr>
+          <p:cNvPr id="17" name="Content Placeholder 16" descr="A screenshot of a math game&#10;&#10;Description automatically generated">
+            <a:extLst>
+              <a:ext uri="{FF2B5EF4-FFF2-40B4-BE49-F238E27FC236}">
+                <a16:creationId xmlns:a16="http://schemas.microsoft.com/office/drawing/2014/main" id="{A2D5B17A-9784-468D-CB2B-A988C526CA00}"/>
+              </a:ext>
+            </a:extLst>
+          </p:cNvPr>
+          <p:cNvPicPr>
+            <a:picLocks noGrp="1" noChangeAspect="1"/>
+          </p:cNvPicPr>
+          <p:nvPr>
+            <p:ph idx="1"/>
+          </p:nvPr>
+        </p:nvPicPr>
+        <p:blipFill>
+          <a:blip r:embed="rId3">
+            <a:extLst>
+              <a:ext uri="{28A0092B-C50C-407E-A947-70E740481C1C}">
+                <a14:useLocalDpi xmlns:a14="http://schemas.microsoft.com/office/drawing/2010/main" val="0"/>
+              </a:ext>
+            </a:extLst>
+          </a:blip>
+          <a:stretch>
+            <a:fillRect/>
+          </a:stretch>
+        </p:blipFill>
+        <p:spPr>
+          <a:xfrm>
+            <a:off x="1199872" y="3117959"/>
+            <a:ext cx="9322093" cy="2460720"/>
+          </a:xfrm>
+        </p:spPr>
+      </p:pic>
+    </p:spTree>
+    <p:extLst>
+      <p:ext uri="{BB962C8B-B14F-4D97-AF65-F5344CB8AC3E}">
+        <p14:creationId xmlns:p14="http://schemas.microsoft.com/office/powerpoint/2010/main" val="3380909511"/>
+      </p:ext>
+    </p:extLst>
+  </p:cSld>
+  <p:clrMapOvr>
+    <a:masterClrMapping/>
+  </p:clrMapOvr>
+</p:sld>
+</file>
+
+<file path=ppt/slides/slide92.xml><?xml version="1.0" encoding="utf-8"?>
+<p:sld xmlns:a="http://schemas.openxmlformats.org/drawingml/2006/main" xmlns:r="http://schemas.openxmlformats.org/officeDocument/2006/relationships" xmlns:p="http://schemas.openxmlformats.org/presentationml/2006/main">
+  <p:cSld>
+    <p:spTree>
+      <p:nvGrpSpPr>
+        <p:cNvPr id="1" name=""/>
+        <p:cNvGrpSpPr/>
+        <p:nvPr/>
+      </p:nvGrpSpPr>
+      <p:grpSpPr>
+        <a:xfrm>
+          <a:off x="0" y="0"/>
+          <a:ext cx="0" cy="0"/>
+          <a:chOff x="0" y="0"/>
+          <a:chExt cx="0" cy="0"/>
+        </a:xfrm>
+      </p:grpSpPr>
+      <p:sp>
+        <p:nvSpPr>
+          <p:cNvPr id="2" name="Title 1">
+            <a:extLst>
+              <a:ext uri="{FF2B5EF4-FFF2-40B4-BE49-F238E27FC236}">
+                <a16:creationId xmlns:a16="http://schemas.microsoft.com/office/drawing/2014/main" id="{E62531BD-125F-15E9-DB94-E914FAB3400B}"/>
+              </a:ext>
+            </a:extLst>
+          </p:cNvPr>
+          <p:cNvSpPr>
+            <a:spLocks noGrp="1"/>
+          </p:cNvSpPr>
+          <p:nvPr>
+            <p:ph type="title"/>
+          </p:nvPr>
+        </p:nvSpPr>
+        <p:spPr/>
+        <p:txBody>
+          <a:bodyPr>
+            <a:normAutofit fontScale="90000"/>
+          </a:bodyPr>
+          <a:lstStyle/>
+          <a:p>
+            <a:pPr algn="ctr"/>
+            <a:r>
+              <a:rPr lang="bg-BG" dirty="0">
+                <a:latin typeface="Arial" panose="020B0604020202020204" pitchFamily="34" charset="0"/>
+                <a:cs typeface="Arial" panose="020B0604020202020204" pitchFamily="34" charset="0"/>
+              </a:rPr>
               <a:t>От десетична към шестнайсетична бройна система</a:t>
             </a:r>
           </a:p>
@@ -44029,7 +45105,531 @@
 </p:sld>
 </file>
 
-<file path=ppt/slides/slide91.xml><?xml version="1.0" encoding="utf-8"?>
+<file path=ppt/slides/slide93.xml><?xml version="1.0" encoding="utf-8"?>
+<p:sld xmlns:a="http://schemas.openxmlformats.org/drawingml/2006/main" xmlns:r="http://schemas.openxmlformats.org/officeDocument/2006/relationships" xmlns:p="http://schemas.openxmlformats.org/presentationml/2006/main">
+  <p:cSld>
+    <p:spTree>
+      <p:nvGrpSpPr>
+        <p:cNvPr id="1" name=""/>
+        <p:cNvGrpSpPr/>
+        <p:nvPr/>
+      </p:nvGrpSpPr>
+      <p:grpSpPr>
+        <a:xfrm>
+          <a:off x="0" y="0"/>
+          <a:ext cx="0" cy="0"/>
+          <a:chOff x="0" y="0"/>
+          <a:chExt cx="0" cy="0"/>
+        </a:xfrm>
+      </p:grpSpPr>
+      <p:sp>
+        <p:nvSpPr>
+          <p:cNvPr id="2" name="Title 1">
+            <a:extLst>
+              <a:ext uri="{FF2B5EF4-FFF2-40B4-BE49-F238E27FC236}">
+                <a16:creationId xmlns:a16="http://schemas.microsoft.com/office/drawing/2014/main" id="{E62531BD-125F-15E9-DB94-E914FAB3400B}"/>
+              </a:ext>
+            </a:extLst>
+          </p:cNvPr>
+          <p:cNvSpPr>
+            <a:spLocks noGrp="1"/>
+          </p:cNvSpPr>
+          <p:nvPr>
+            <p:ph type="title"/>
+          </p:nvPr>
+        </p:nvSpPr>
+        <p:spPr/>
+        <p:txBody>
+          <a:bodyPr>
+            <a:normAutofit fontScale="90000"/>
+          </a:bodyPr>
+          <a:lstStyle/>
+          <a:p>
+            <a:pPr algn="ctr"/>
+            <a:r>
+              <a:rPr lang="bg-BG" dirty="0">
+                <a:latin typeface="Arial" panose="020B0604020202020204" pitchFamily="34" charset="0"/>
+                <a:cs typeface="Arial" panose="020B0604020202020204" pitchFamily="34" charset="0"/>
+              </a:rPr>
+              <a:t>От шестнайсетична към десетична бройна система</a:t>
+            </a:r>
+          </a:p>
+        </p:txBody>
+      </p:sp>
+      <p:pic>
+        <p:nvPicPr>
+          <p:cNvPr id="7" name="Content Placeholder 6" descr="A screenshot of a calculator&#10;&#10;Description automatically generated">
+            <a:extLst>
+              <a:ext uri="{FF2B5EF4-FFF2-40B4-BE49-F238E27FC236}">
+                <a16:creationId xmlns:a16="http://schemas.microsoft.com/office/drawing/2014/main" id="{6BD36CF5-238B-9F8B-C922-3F4630E6102D}"/>
+              </a:ext>
+            </a:extLst>
+          </p:cNvPr>
+          <p:cNvPicPr>
+            <a:picLocks noGrp="1" noChangeAspect="1"/>
+          </p:cNvPicPr>
+          <p:nvPr>
+            <p:ph idx="1"/>
+          </p:nvPr>
+        </p:nvPicPr>
+        <p:blipFill>
+          <a:blip r:embed="rId3">
+            <a:extLst>
+              <a:ext uri="{28A0092B-C50C-407E-A947-70E740481C1C}">
+                <a14:useLocalDpi xmlns:a14="http://schemas.microsoft.com/office/drawing/2010/main" val="0"/>
+              </a:ext>
+            </a:extLst>
+          </a:blip>
+          <a:stretch>
+            <a:fillRect/>
+          </a:stretch>
+        </p:blipFill>
+        <p:spPr>
+          <a:xfrm>
+            <a:off x="720814" y="2967605"/>
+            <a:ext cx="10750371" cy="1896304"/>
+          </a:xfrm>
+        </p:spPr>
+      </p:pic>
+    </p:spTree>
+    <p:extLst>
+      <p:ext uri="{BB962C8B-B14F-4D97-AF65-F5344CB8AC3E}">
+        <p14:creationId xmlns:p14="http://schemas.microsoft.com/office/powerpoint/2010/main" val="621557319"/>
+      </p:ext>
+    </p:extLst>
+  </p:cSld>
+  <p:clrMapOvr>
+    <a:masterClrMapping/>
+  </p:clrMapOvr>
+</p:sld>
+</file>
+
+<file path=ppt/slides/slide94.xml><?xml version="1.0" encoding="utf-8"?>
+<p:sld xmlns:a="http://schemas.openxmlformats.org/drawingml/2006/main" xmlns:r="http://schemas.openxmlformats.org/officeDocument/2006/relationships" xmlns:p="http://schemas.openxmlformats.org/presentationml/2006/main">
+  <p:cSld>
+    <p:spTree>
+      <p:nvGrpSpPr>
+        <p:cNvPr id="1" name=""/>
+        <p:cNvGrpSpPr/>
+        <p:nvPr/>
+      </p:nvGrpSpPr>
+      <p:grpSpPr>
+        <a:xfrm>
+          <a:off x="0" y="0"/>
+          <a:ext cx="0" cy="0"/>
+          <a:chOff x="0" y="0"/>
+          <a:chExt cx="0" cy="0"/>
+        </a:xfrm>
+      </p:grpSpPr>
+      <p:sp>
+        <p:nvSpPr>
+          <p:cNvPr id="2" name="Title 1">
+            <a:extLst>
+              <a:ext uri="{FF2B5EF4-FFF2-40B4-BE49-F238E27FC236}">
+                <a16:creationId xmlns:a16="http://schemas.microsoft.com/office/drawing/2014/main" id="{E62531BD-125F-15E9-DB94-E914FAB3400B}"/>
+              </a:ext>
+            </a:extLst>
+          </p:cNvPr>
+          <p:cNvSpPr>
+            <a:spLocks noGrp="1"/>
+          </p:cNvSpPr>
+          <p:nvPr>
+            <p:ph type="title"/>
+          </p:nvPr>
+        </p:nvSpPr>
+        <p:spPr>
+          <a:xfrm>
+            <a:off x="838200" y="365125"/>
+            <a:ext cx="10515600" cy="1329451"/>
+          </a:xfrm>
+        </p:spPr>
+        <p:txBody>
+          <a:bodyPr>
+            <a:normAutofit fontScale="90000"/>
+          </a:bodyPr>
+          <a:lstStyle/>
+          <a:p>
+            <a:pPr algn="ctr"/>
+            <a:r>
+              <a:rPr lang="bg-BG" dirty="0">
+                <a:latin typeface="Arial" panose="020B0604020202020204" pitchFamily="34" charset="0"/>
+                <a:cs typeface="Arial" panose="020B0604020202020204" pitchFamily="34" charset="0"/>
+              </a:rPr>
+              <a:t>От шестнайсетична към двоична бройна система (и обратно)</a:t>
+            </a:r>
+          </a:p>
+        </p:txBody>
+      </p:sp>
+      <p:pic>
+        <p:nvPicPr>
+          <p:cNvPr id="6" name="Content Placeholder 5">
+            <a:extLst>
+              <a:ext uri="{FF2B5EF4-FFF2-40B4-BE49-F238E27FC236}">
+                <a16:creationId xmlns:a16="http://schemas.microsoft.com/office/drawing/2014/main" id="{1D209901-1B8D-4153-7B48-6466062B76F8}"/>
+              </a:ext>
+            </a:extLst>
+          </p:cNvPr>
+          <p:cNvPicPr>
+            <a:picLocks noGrp="1" noChangeAspect="1"/>
+          </p:cNvPicPr>
+          <p:nvPr>
+            <p:ph idx="1"/>
+          </p:nvPr>
+        </p:nvPicPr>
+        <p:blipFill>
+          <a:blip r:embed="rId3">
+            <a:extLst>
+              <a:ext uri="{28A0092B-C50C-407E-A947-70E740481C1C}">
+                <a14:useLocalDpi xmlns:a14="http://schemas.microsoft.com/office/drawing/2010/main" val="0"/>
+              </a:ext>
+            </a:extLst>
+          </a:blip>
+          <a:stretch>
+            <a:fillRect/>
+          </a:stretch>
+        </p:blipFill>
+        <p:spPr>
+          <a:xfrm>
+            <a:off x="1394832" y="4468761"/>
+            <a:ext cx="9727776" cy="531077"/>
+          </a:xfrm>
+        </p:spPr>
+      </p:pic>
+      <p:sp>
+        <p:nvSpPr>
+          <p:cNvPr id="8" name="TextBox 7">
+            <a:extLst>
+              <a:ext uri="{FF2B5EF4-FFF2-40B4-BE49-F238E27FC236}">
+                <a16:creationId xmlns:a16="http://schemas.microsoft.com/office/drawing/2014/main" id="{84DD4DA1-4ACD-06CB-6B41-DD821BECFE09}"/>
+              </a:ext>
+            </a:extLst>
+          </p:cNvPr>
+          <p:cNvSpPr txBox="1"/>
+          <p:nvPr/>
+        </p:nvSpPr>
+        <p:spPr>
+          <a:xfrm>
+            <a:off x="1149292" y="2787945"/>
+            <a:ext cx="9727776" cy="954107"/>
+          </a:xfrm>
+          <a:prstGeom prst="rect">
+            <a:avLst/>
+          </a:prstGeom>
+          <a:noFill/>
+        </p:spPr>
+        <p:txBody>
+          <a:bodyPr wrap="square" rtlCol="0">
+            <a:spAutoFit/>
+          </a:bodyPr>
+          <a:lstStyle/>
+          <a:p>
+            <a:r>
+              <a:rPr lang="bg-BG" sz="2800" dirty="0">
+                <a:latin typeface="Arial" panose="020B0604020202020204" pitchFamily="34" charset="0"/>
+                <a:cs typeface="Arial" panose="020B0604020202020204" pitchFamily="34" charset="0"/>
+              </a:rPr>
+              <a:t>Всяко шестнайсетично число кореспондира на 4 двоични числа.</a:t>
+            </a:r>
+          </a:p>
+        </p:txBody>
+      </p:sp>
+    </p:spTree>
+    <p:extLst>
+      <p:ext uri="{BB962C8B-B14F-4D97-AF65-F5344CB8AC3E}">
+        <p14:creationId xmlns:p14="http://schemas.microsoft.com/office/powerpoint/2010/main" val="2796068693"/>
+      </p:ext>
+    </p:extLst>
+  </p:cSld>
+  <p:clrMapOvr>
+    <a:masterClrMapping/>
+  </p:clrMapOvr>
+</p:sld>
+</file>
+
+<file path=ppt/slides/slide95.xml><?xml version="1.0" encoding="utf-8"?>
+<p:sld xmlns:a="http://schemas.openxmlformats.org/drawingml/2006/main" xmlns:r="http://schemas.openxmlformats.org/officeDocument/2006/relationships" xmlns:p="http://schemas.openxmlformats.org/presentationml/2006/main">
+  <p:cSld>
+    <p:spTree>
+      <p:nvGrpSpPr>
+        <p:cNvPr id="1" name=""/>
+        <p:cNvGrpSpPr/>
+        <p:nvPr/>
+      </p:nvGrpSpPr>
+      <p:grpSpPr>
+        <a:xfrm>
+          <a:off x="0" y="0"/>
+          <a:ext cx="0" cy="0"/>
+          <a:chOff x="0" y="0"/>
+          <a:chExt cx="0" cy="0"/>
+        </a:xfrm>
+      </p:grpSpPr>
+      <p:sp>
+        <p:nvSpPr>
+          <p:cNvPr id="2" name="Title 1">
+            <a:extLst>
+              <a:ext uri="{FF2B5EF4-FFF2-40B4-BE49-F238E27FC236}">
+                <a16:creationId xmlns:a16="http://schemas.microsoft.com/office/drawing/2014/main" id="{2CB8EB06-57F8-761F-3900-6AFBE050C404}"/>
+              </a:ext>
+            </a:extLst>
+          </p:cNvPr>
+          <p:cNvSpPr>
+            <a:spLocks noGrp="1"/>
+          </p:cNvSpPr>
+          <p:nvPr>
+            <p:ph type="title"/>
+          </p:nvPr>
+        </p:nvSpPr>
+        <p:spPr/>
+        <p:txBody>
+          <a:bodyPr>
+            <a:normAutofit fontScale="90000"/>
+          </a:bodyPr>
+          <a:lstStyle/>
+          <a:p>
+            <a:pPr algn="ctr"/>
+            <a:r>
+              <a:rPr lang="bg-BG" dirty="0">
+                <a:latin typeface="Arial" panose="020B0604020202020204" pitchFamily="34" charset="0"/>
+                <a:cs typeface="Arial" panose="020B0604020202020204" pitchFamily="34" charset="0"/>
+              </a:rPr>
+              <a:t>Употреба на описаните бройни системи</a:t>
+            </a:r>
+          </a:p>
+        </p:txBody>
+      </p:sp>
+      <p:sp>
+        <p:nvSpPr>
+          <p:cNvPr id="3" name="Content Placeholder 2">
+            <a:extLst>
+              <a:ext uri="{FF2B5EF4-FFF2-40B4-BE49-F238E27FC236}">
+                <a16:creationId xmlns:a16="http://schemas.microsoft.com/office/drawing/2014/main" id="{AFDD2F1A-A9FD-4605-1A63-712067C9CC57}"/>
+              </a:ext>
+            </a:extLst>
+          </p:cNvPr>
+          <p:cNvSpPr>
+            <a:spLocks noGrp="1"/>
+          </p:cNvSpPr>
+          <p:nvPr>
+            <p:ph idx="1"/>
+          </p:nvPr>
+        </p:nvSpPr>
+        <p:spPr/>
+        <p:txBody>
+          <a:bodyPr/>
+          <a:lstStyle/>
+          <a:p>
+            <a:r>
+              <a:rPr lang="bg-BG" dirty="0">
+                <a:solidFill>
+                  <a:srgbClr val="FFFF00"/>
+                </a:solidFill>
+                <a:latin typeface="Arial" panose="020B0604020202020204" pitchFamily="34" charset="0"/>
+                <a:cs typeface="Arial" panose="020B0604020202020204" pitchFamily="34" charset="0"/>
+              </a:rPr>
+              <a:t>Десетична бройна система </a:t>
+            </a:r>
+            <a:r>
+              <a:rPr lang="bg-BG" dirty="0">
+                <a:latin typeface="Arial" panose="020B0604020202020204" pitchFamily="34" charset="0"/>
+                <a:cs typeface="Arial" panose="020B0604020202020204" pitchFamily="34" charset="0"/>
+              </a:rPr>
+              <a:t>– Можем спокойно да я ползваме докато пишем нашите програми на съответния компютърен език. </a:t>
+            </a:r>
+          </a:p>
+          <a:p>
+            <a:r>
+              <a:rPr lang="bg-BG" dirty="0">
+                <a:solidFill>
+                  <a:srgbClr val="FFFF00"/>
+                </a:solidFill>
+                <a:latin typeface="Arial" panose="020B0604020202020204" pitchFamily="34" charset="0"/>
+                <a:cs typeface="Arial" panose="020B0604020202020204" pitchFamily="34" charset="0"/>
+              </a:rPr>
+              <a:t>Двоична бройна система </a:t>
+            </a:r>
+            <a:r>
+              <a:rPr lang="bg-BG" dirty="0">
+                <a:latin typeface="Arial" panose="020B0604020202020204" pitchFamily="34" charset="0"/>
+                <a:cs typeface="Arial" panose="020B0604020202020204" pitchFamily="34" charset="0"/>
+              </a:rPr>
+              <a:t>– Използва се изключително много в електроизчислителната техника. Има две състояния, накратко </a:t>
+            </a:r>
+            <a:r>
+              <a:rPr lang="bg-BG" dirty="0">
+                <a:solidFill>
+                  <a:srgbClr val="FFFF00"/>
+                </a:solidFill>
+                <a:latin typeface="Arial" panose="020B0604020202020204" pitchFamily="34" charset="0"/>
+                <a:cs typeface="Arial" panose="020B0604020202020204" pitchFamily="34" charset="0"/>
+              </a:rPr>
+              <a:t>0</a:t>
+            </a:r>
+            <a:r>
+              <a:rPr lang="bg-BG" dirty="0">
+                <a:latin typeface="Arial" panose="020B0604020202020204" pitchFamily="34" charset="0"/>
+                <a:cs typeface="Arial" panose="020B0604020202020204" pitchFamily="34" charset="0"/>
+              </a:rPr>
+              <a:t> (няма ток </a:t>
+            </a:r>
+            <a:r>
+              <a:rPr lang="bg-BG" dirty="0">
+                <a:solidFill>
+                  <a:srgbClr val="92D050"/>
+                </a:solidFill>
+                <a:latin typeface="Arial" panose="020B0604020202020204" pitchFamily="34" charset="0"/>
+                <a:cs typeface="Arial" panose="020B0604020202020204" pitchFamily="34" charset="0"/>
+              </a:rPr>
+              <a:t>-</a:t>
+            </a:r>
+            <a:r>
+              <a:rPr lang="en-US" dirty="0">
+                <a:solidFill>
+                  <a:srgbClr val="92D050"/>
+                </a:solidFill>
+                <a:latin typeface="Arial" panose="020B0604020202020204" pitchFamily="34" charset="0"/>
+                <a:cs typeface="Arial" panose="020B0604020202020204" pitchFamily="34" charset="0"/>
+              </a:rPr>
+              <a:t>5V</a:t>
+            </a:r>
+            <a:r>
+              <a:rPr lang="bg-BG" dirty="0">
+                <a:latin typeface="Arial" panose="020B0604020202020204" pitchFamily="34" charset="0"/>
+                <a:cs typeface="Arial" panose="020B0604020202020204" pitchFamily="34" charset="0"/>
+              </a:rPr>
+              <a:t>), </a:t>
+            </a:r>
+            <a:r>
+              <a:rPr lang="bg-BG" dirty="0">
+                <a:solidFill>
+                  <a:srgbClr val="FFFF00"/>
+                </a:solidFill>
+                <a:latin typeface="Arial" panose="020B0604020202020204" pitchFamily="34" charset="0"/>
+                <a:cs typeface="Arial" panose="020B0604020202020204" pitchFamily="34" charset="0"/>
+              </a:rPr>
+              <a:t>1</a:t>
+            </a:r>
+            <a:r>
+              <a:rPr lang="bg-BG" dirty="0">
+                <a:latin typeface="Arial" panose="020B0604020202020204" pitchFamily="34" charset="0"/>
+                <a:cs typeface="Arial" panose="020B0604020202020204" pitchFamily="34" charset="0"/>
+              </a:rPr>
+              <a:t> (има ток </a:t>
+            </a:r>
+            <a:r>
+              <a:rPr lang="bg-BG" dirty="0">
+                <a:solidFill>
+                  <a:srgbClr val="92D050"/>
+                </a:solidFill>
+                <a:latin typeface="Arial" panose="020B0604020202020204" pitchFamily="34" charset="0"/>
+                <a:cs typeface="Arial" panose="020B0604020202020204" pitchFamily="34" charset="0"/>
+              </a:rPr>
+              <a:t>+5</a:t>
+            </a:r>
+            <a:r>
+              <a:rPr lang="en-US" dirty="0">
+                <a:solidFill>
+                  <a:srgbClr val="92D050"/>
+                </a:solidFill>
+                <a:latin typeface="Arial" panose="020B0604020202020204" pitchFamily="34" charset="0"/>
+                <a:cs typeface="Arial" panose="020B0604020202020204" pitchFamily="34" charset="0"/>
+              </a:rPr>
+              <a:t>V</a:t>
+            </a:r>
+            <a:r>
+              <a:rPr lang="bg-BG" dirty="0">
+                <a:latin typeface="Arial" panose="020B0604020202020204" pitchFamily="34" charset="0"/>
+                <a:cs typeface="Arial" panose="020B0604020202020204" pitchFamily="34" charset="0"/>
+              </a:rPr>
+              <a:t>)</a:t>
+            </a:r>
+            <a:r>
+              <a:rPr lang="en-US" dirty="0">
+                <a:latin typeface="Arial" panose="020B0604020202020204" pitchFamily="34" charset="0"/>
+                <a:cs typeface="Arial" panose="020B0604020202020204" pitchFamily="34" charset="0"/>
+              </a:rPr>
+              <a:t>.</a:t>
+            </a:r>
+          </a:p>
+          <a:p>
+            <a:r>
+              <a:rPr lang="bg-BG" dirty="0">
+                <a:solidFill>
+                  <a:srgbClr val="FFFF00"/>
+                </a:solidFill>
+                <a:latin typeface="Arial" panose="020B0604020202020204" pitchFamily="34" charset="0"/>
+                <a:cs typeface="Arial" panose="020B0604020202020204" pitchFamily="34" charset="0"/>
+              </a:rPr>
+              <a:t>Шестнайсетична бройна система </a:t>
+            </a:r>
+            <a:r>
+              <a:rPr lang="bg-BG" dirty="0">
+                <a:latin typeface="Arial" panose="020B0604020202020204" pitchFamily="34" charset="0"/>
+                <a:cs typeface="Arial" panose="020B0604020202020204" pitchFamily="34" charset="0"/>
+              </a:rPr>
+              <a:t>– Използва се определяне на местоположение в паметта (</a:t>
+            </a:r>
+            <a:r>
+              <a:rPr lang="en-US" dirty="0">
+                <a:solidFill>
+                  <a:srgbClr val="FFFF00"/>
+                </a:solidFill>
+                <a:latin typeface="Arial" panose="020B0604020202020204" pitchFamily="34" charset="0"/>
+                <a:cs typeface="Arial" panose="020B0604020202020204" pitchFamily="34" charset="0"/>
+              </a:rPr>
+              <a:t>RAM</a:t>
+            </a:r>
+            <a:r>
+              <a:rPr lang="bg-BG" dirty="0">
+                <a:latin typeface="Arial" panose="020B0604020202020204" pitchFamily="34" charset="0"/>
+                <a:cs typeface="Arial" panose="020B0604020202020204" pitchFamily="34" charset="0"/>
+              </a:rPr>
+              <a:t>)</a:t>
+            </a:r>
+            <a:r>
+              <a:rPr lang="en-US" dirty="0">
+                <a:latin typeface="Arial" panose="020B0604020202020204" pitchFamily="34" charset="0"/>
+                <a:cs typeface="Arial" panose="020B0604020202020204" pitchFamily="34" charset="0"/>
+              </a:rPr>
+              <a:t>, </a:t>
+            </a:r>
+            <a:r>
+              <a:rPr lang="bg-BG" dirty="0">
+                <a:latin typeface="Arial" panose="020B0604020202020204" pitchFamily="34" charset="0"/>
+                <a:cs typeface="Arial" panose="020B0604020202020204" pitchFamily="34" charset="0"/>
+              </a:rPr>
+              <a:t>за </a:t>
+            </a:r>
+            <a:r>
+              <a:rPr lang="en-US" dirty="0">
+                <a:latin typeface="Arial" panose="020B0604020202020204" pitchFamily="34" charset="0"/>
+                <a:cs typeface="Arial" panose="020B0604020202020204" pitchFamily="34" charset="0"/>
+              </a:rPr>
+              <a:t>MAC </a:t>
+            </a:r>
+            <a:r>
+              <a:rPr lang="bg-BG" dirty="0">
+                <a:latin typeface="Arial" panose="020B0604020202020204" pitchFamily="34" charset="0"/>
+                <a:cs typeface="Arial" panose="020B0604020202020204" pitchFamily="34" charset="0"/>
+              </a:rPr>
+              <a:t>адреси, за дефиниция на цветове и др.</a:t>
+            </a:r>
+          </a:p>
+        </p:txBody>
+      </p:sp>
+    </p:spTree>
+    <p:extLst>
+      <p:ext uri="{BB962C8B-B14F-4D97-AF65-F5344CB8AC3E}">
+        <p14:creationId xmlns:p14="http://schemas.microsoft.com/office/powerpoint/2010/main" val="1616982399"/>
+      </p:ext>
+    </p:extLst>
+  </p:cSld>
+  <p:clrMapOvr>
+    <a:masterClrMapping/>
+  </p:clrMapOvr>
+</p:sld>
+</file>
+
+<file path=ppt/slides/slide96.xml><?xml version="1.0" encoding="utf-8"?>
 <p:sld xmlns:a="http://schemas.openxmlformats.org/drawingml/2006/main" xmlns:r="http://schemas.openxmlformats.org/officeDocument/2006/relationships" xmlns:p="http://schemas.openxmlformats.org/presentationml/2006/main">
   <p:cSld>
     <p:spTree>
@@ -44351,7 +45951,7 @@
 </p:sld>
 </file>
 
-<file path=ppt/slides/slide92.xml><?xml version="1.0" encoding="utf-8"?>
+<file path=ppt/slides/slide97.xml><?xml version="1.0" encoding="utf-8"?>
 <p:sld xmlns:a="http://schemas.openxmlformats.org/drawingml/2006/main" xmlns:r="http://schemas.openxmlformats.org/officeDocument/2006/relationships" xmlns:p="http://schemas.openxmlformats.org/presentationml/2006/main">
   <p:cSld>
     <p:spTree>
@@ -44755,7 +46355,7 @@
 </p:sld>
 </file>
 
-<file path=ppt/slides/slide93.xml><?xml version="1.0" encoding="utf-8"?>
+<file path=ppt/slides/slide98.xml><?xml version="1.0" encoding="utf-8"?>
 <p:sld xmlns:a="http://schemas.openxmlformats.org/drawingml/2006/main" xmlns:r="http://schemas.openxmlformats.org/officeDocument/2006/relationships" xmlns:p="http://schemas.openxmlformats.org/presentationml/2006/main">
   <p:cSld>
     <p:spTree>
@@ -44849,39 +46449,41 @@
           </a:xfrm>
         </p:spPr>
         <p:txBody>
-          <a:bodyPr/>
+          <a:bodyPr>
+            <a:normAutofit/>
+          </a:bodyPr>
           <a:lstStyle/>
           <a:p>
             <a:r>
-              <a:rPr lang="bg-BG" dirty="0">
+              <a:rPr lang="bg-BG" sz="2400" dirty="0">
                 <a:latin typeface="Arial" panose="020B0604020202020204" pitchFamily="34" charset="0"/>
                 <a:cs typeface="Arial" panose="020B0604020202020204" pitchFamily="34" charset="0"/>
               </a:rPr>
               <a:t>Това са битови (</a:t>
             </a:r>
             <a:r>
-              <a:rPr lang="en-US" dirty="0">
+              <a:rPr lang="en-US" sz="2400" dirty="0">
                 <a:latin typeface="Arial" panose="020B0604020202020204" pitchFamily="34" charset="0"/>
                 <a:cs typeface="Arial" panose="020B0604020202020204" pitchFamily="34" charset="0"/>
               </a:rPr>
               <a:t>bitwise</a:t>
             </a:r>
             <a:r>
-              <a:rPr lang="bg-BG" dirty="0">
+              <a:rPr lang="bg-BG" sz="2400" dirty="0">
                 <a:latin typeface="Arial" panose="020B0604020202020204" pitchFamily="34" charset="0"/>
                 <a:cs typeface="Arial" panose="020B0604020202020204" pitchFamily="34" charset="0"/>
               </a:rPr>
               <a:t>)</a:t>
             </a:r>
             <a:r>
-              <a:rPr lang="en-US" dirty="0">
+              <a:rPr lang="en-US" sz="2400" dirty="0">
                 <a:latin typeface="Arial" panose="020B0604020202020204" pitchFamily="34" charset="0"/>
                 <a:cs typeface="Arial" panose="020B0604020202020204" pitchFamily="34" charset="0"/>
               </a:rPr>
               <a:t> </a:t>
             </a:r>
             <a:r>
-              <a:rPr lang="bg-BG" dirty="0">
+              <a:rPr lang="bg-BG" sz="2400" dirty="0">
                 <a:latin typeface="Arial" panose="020B0604020202020204" pitchFamily="34" charset="0"/>
                 <a:cs typeface="Arial" panose="020B0604020202020204" pitchFamily="34" charset="0"/>
               </a:rPr>
@@ -44890,14 +46492,14 @@
           </a:p>
           <a:p>
             <a:r>
-              <a:rPr lang="bg-BG" dirty="0">
+              <a:rPr lang="bg-BG" sz="2400" dirty="0">
                 <a:latin typeface="Arial" panose="020B0604020202020204" pitchFamily="34" charset="0"/>
                 <a:cs typeface="Arial" panose="020B0604020202020204" pitchFamily="34" charset="0"/>
               </a:rPr>
               <a:t>Отместване наляво (</a:t>
             </a:r>
             <a:r>
-              <a:rPr lang="bg-BG" b="1" dirty="0">
+              <a:rPr lang="bg-BG" sz="2400" b="1" dirty="0">
                 <a:solidFill>
                   <a:srgbClr val="FFFF00"/>
                 </a:solidFill>
@@ -44907,7 +46509,7 @@
               <a:t>&lt;&lt;</a:t>
             </a:r>
             <a:r>
-              <a:rPr lang="bg-BG" dirty="0">
+              <a:rPr lang="bg-BG" sz="2400" dirty="0">
                 <a:latin typeface="Arial" panose="020B0604020202020204" pitchFamily="34" charset="0"/>
                 <a:cs typeface="Arial" panose="020B0604020202020204" pitchFamily="34" charset="0"/>
               </a:rPr>
@@ -44916,14 +46518,14 @@
           </a:p>
           <a:p>
             <a:r>
-              <a:rPr lang="bg-BG" dirty="0">
+              <a:rPr lang="bg-BG" sz="2400" dirty="0">
                 <a:latin typeface="Arial" panose="020B0604020202020204" pitchFamily="34" charset="0"/>
                 <a:cs typeface="Arial" panose="020B0604020202020204" pitchFamily="34" charset="0"/>
               </a:rPr>
               <a:t>Отместване надясно (</a:t>
             </a:r>
             <a:r>
-              <a:rPr lang="en-US" b="1" dirty="0">
+              <a:rPr lang="en-US" sz="2400" b="1" dirty="0">
                 <a:solidFill>
                   <a:srgbClr val="FFFF00"/>
                 </a:solidFill>
@@ -44933,18 +46535,31 @@
               <a:t>&gt;&gt;</a:t>
             </a:r>
             <a:r>
-              <a:rPr lang="en-US" dirty="0">
+              <a:rPr lang="en-US" sz="2400" dirty="0">
                 <a:latin typeface="Arial" panose="020B0604020202020204" pitchFamily="34" charset="0"/>
                 <a:cs typeface="Arial" panose="020B0604020202020204" pitchFamily="34" charset="0"/>
               </a:rPr>
               <a:t> </a:t>
             </a:r>
             <a:r>
-              <a:rPr lang="bg-BG" dirty="0">
+              <a:rPr lang="bg-BG" sz="2400" dirty="0">
                 <a:latin typeface="Arial" panose="020B0604020202020204" pitchFamily="34" charset="0"/>
                 <a:cs typeface="Arial" panose="020B0604020202020204" pitchFamily="34" charset="0"/>
               </a:rPr>
               <a:t>оператор)</a:t>
+            </a:r>
+            <a:endParaRPr lang="en-US" sz="2400" dirty="0">
+              <a:latin typeface="Arial" panose="020B0604020202020204" pitchFamily="34" charset="0"/>
+              <a:cs typeface="Arial" panose="020B0604020202020204" pitchFamily="34" charset="0"/>
+            </a:endParaRPr>
+          </a:p>
+          <a:p>
+            <a:r>
+              <a:rPr lang="bg-BG" sz="2400" dirty="0">
+                <a:latin typeface="Arial" panose="020B0604020202020204" pitchFamily="34" charset="0"/>
+                <a:cs typeface="Arial" panose="020B0604020202020204" pitchFamily="34" charset="0"/>
+              </a:rPr>
+              <a:t>Битовете, които излизат извън числото се губят и се заместват с 0-ли</a:t>
             </a:r>
           </a:p>
         </p:txBody>
@@ -44977,8 +46592,8 @@
         </p:blipFill>
         <p:spPr>
           <a:xfrm>
-            <a:off x="838200" y="4800627"/>
-            <a:ext cx="5614675" cy="1221017"/>
+            <a:off x="435529" y="4641147"/>
+            <a:ext cx="6174996" cy="1342869"/>
           </a:xfrm>
           <a:prstGeom prst="rect">
             <a:avLst/>
@@ -45013,8 +46628,8 @@
         </p:blipFill>
         <p:spPr>
           <a:xfrm>
-            <a:off x="7122686" y="4800627"/>
-            <a:ext cx="4114800" cy="1743075"/>
+            <a:off x="7240131" y="4725038"/>
+            <a:ext cx="4371292" cy="1851728"/>
           </a:xfrm>
           <a:prstGeom prst="rect">
             <a:avLst/>
@@ -45034,7 +46649,7 @@
 </p:sld>
 </file>
 
-<file path=ppt/slides/slide94.xml><?xml version="1.0" encoding="utf-8"?>
+<file path=ppt/slides/slide99.xml><?xml version="1.0" encoding="utf-8"?>
 <p:sld xmlns:a="http://schemas.openxmlformats.org/drawingml/2006/main" xmlns:r="http://schemas.openxmlformats.org/officeDocument/2006/relationships" xmlns:p="http://schemas.openxmlformats.org/presentationml/2006/main">
   <p:cSld>
     <p:spTree>
@@ -45056,7 +46671,7 @@
           <p:cNvPr id="2" name="Title 1">
             <a:extLst>
               <a:ext uri="{FF2B5EF4-FFF2-40B4-BE49-F238E27FC236}">
-                <a16:creationId xmlns:a16="http://schemas.microsoft.com/office/drawing/2014/main" id="{A11B6DA7-2FF4-320B-BB94-667D8468FD60}"/>
+                <a16:creationId xmlns:a16="http://schemas.microsoft.com/office/drawing/2014/main" id="{E218944B-51FC-EE4D-720E-2799D71E3920}"/>
               </a:ext>
             </a:extLst>
           </p:cNvPr>
@@ -45069,9 +46684,7 @@
         </p:nvSpPr>
         <p:spPr/>
         <p:txBody>
-          <a:bodyPr>
-            <a:normAutofit fontScale="90000"/>
-          </a:bodyPr>
+          <a:bodyPr/>
           <a:lstStyle/>
           <a:p>
             <a:pPr algn="ctr"/>
@@ -45080,7 +46693,7 @@
                 <a:latin typeface="Arial" panose="020B0604020202020204" pitchFamily="34" charset="0"/>
                 <a:cs typeface="Arial" panose="020B0604020202020204" pitchFamily="34" charset="0"/>
               </a:rPr>
-              <a:t>Манипулиране на битове - употреба</a:t>
+              <a:t>Битови маски</a:t>
             </a:r>
           </a:p>
         </p:txBody>
@@ -45090,7 +46703,7 @@
           <p:cNvPr id="3" name="Content Placeholder 2">
             <a:extLst>
               <a:ext uri="{FF2B5EF4-FFF2-40B4-BE49-F238E27FC236}">
-                <a16:creationId xmlns:a16="http://schemas.microsoft.com/office/drawing/2014/main" id="{9F85CD47-39DC-FC82-DD47-676C483F38AE}"/>
+                <a16:creationId xmlns:a16="http://schemas.microsoft.com/office/drawing/2014/main" id="{C917F770-10E9-A681-2E35-13D66FB2EEE7}"/>
               </a:ext>
             </a:extLst>
           </p:cNvPr>
@@ -45101,12 +46714,7 @@
             <p:ph idx="1"/>
           </p:nvPr>
         </p:nvSpPr>
-        <p:spPr>
-          <a:xfrm>
-            <a:off x="1120000" y="2063691"/>
-            <a:ext cx="10233800" cy="4113271"/>
-          </a:xfrm>
-        </p:spPr>
+        <p:spPr/>
         <p:txBody>
           <a:bodyPr/>
           <a:lstStyle/>
@@ -45116,17 +46724,17 @@
                 <a:latin typeface="Arial" panose="020B0604020202020204" pitchFamily="34" charset="0"/>
                 <a:cs typeface="Arial" panose="020B0604020202020204" pitchFamily="34" charset="0"/>
               </a:rPr>
-              <a:t>Обработката на битове е от голяма важност в много части на компютърната наука като </a:t>
-            </a:r>
-            <a:r>
-              <a:rPr lang="en-US" dirty="0">
-                <a:solidFill>
-                  <a:srgbClr val="92D050"/>
-                </a:solidFill>
-                <a:latin typeface="Arial" panose="020B0604020202020204" pitchFamily="34" charset="0"/>
-                <a:cs typeface="Arial" panose="020B0604020202020204" pitchFamily="34" charset="0"/>
-              </a:rPr>
-              <a:t>network protocols</a:t>
+              <a:t>Съвкупност от 0-ли и 1-ци, която се ползва с </a:t>
+            </a:r>
+            <a:r>
+              <a:rPr lang="en-US" dirty="0">
+                <a:solidFill>
+                  <a:srgbClr val="FFFF00"/>
+                </a:solidFill>
+                <a:latin typeface="Arial" panose="020B0604020202020204" pitchFamily="34" charset="0"/>
+                <a:cs typeface="Arial" panose="020B0604020202020204" pitchFamily="34" charset="0"/>
+              </a:rPr>
+              <a:t>AND</a:t>
             </a:r>
             <a:r>
               <a:rPr lang="en-US" dirty="0">
@@ -45138,114 +46746,12 @@
             <a:r>
               <a:rPr lang="en-US" dirty="0">
                 <a:solidFill>
-                  <a:srgbClr val="92D050"/>
-                </a:solidFill>
-                <a:latin typeface="Arial" panose="020B0604020202020204" pitchFamily="34" charset="0"/>
-                <a:cs typeface="Arial" panose="020B0604020202020204" pitchFamily="34" charset="0"/>
-              </a:rPr>
-              <a:t>data storage, file systems</a:t>
-            </a:r>
-            <a:r>
-              <a:rPr lang="en-US" dirty="0">
-                <a:latin typeface="Arial" panose="020B0604020202020204" pitchFamily="34" charset="0"/>
-                <a:cs typeface="Arial" panose="020B0604020202020204" pitchFamily="34" charset="0"/>
-              </a:rPr>
-              <a:t>, </a:t>
-            </a:r>
-            <a:r>
-              <a:rPr lang="en-US" dirty="0">
-                <a:solidFill>
-                  <a:srgbClr val="92D050"/>
-                </a:solidFill>
-                <a:latin typeface="Arial" panose="020B0604020202020204" pitchFamily="34" charset="0"/>
-                <a:cs typeface="Arial" panose="020B0604020202020204" pitchFamily="34" charset="0"/>
-              </a:rPr>
-              <a:t>memory management</a:t>
-            </a:r>
-            <a:r>
-              <a:rPr lang="en-US" dirty="0">
-                <a:latin typeface="Arial" panose="020B0604020202020204" pitchFamily="34" charset="0"/>
-                <a:cs typeface="Arial" panose="020B0604020202020204" pitchFamily="34" charset="0"/>
-              </a:rPr>
-              <a:t>, </a:t>
-            </a:r>
-            <a:r>
-              <a:rPr lang="en-US" dirty="0">
-                <a:solidFill>
-                  <a:srgbClr val="92D050"/>
-                </a:solidFill>
-                <a:latin typeface="Arial" panose="020B0604020202020204" pitchFamily="34" charset="0"/>
-                <a:cs typeface="Arial" panose="020B0604020202020204" pitchFamily="34" charset="0"/>
-              </a:rPr>
-              <a:t>video streaming</a:t>
-            </a:r>
-            <a:r>
-              <a:rPr lang="en-US" dirty="0">
-                <a:latin typeface="Arial" panose="020B0604020202020204" pitchFamily="34" charset="0"/>
-                <a:cs typeface="Arial" panose="020B0604020202020204" pitchFamily="34" charset="0"/>
-              </a:rPr>
-              <a:t>, </a:t>
-            </a:r>
-            <a:r>
-              <a:rPr lang="en-US" dirty="0">
-                <a:solidFill>
-                  <a:srgbClr val="92D050"/>
-                </a:solidFill>
-                <a:latin typeface="Arial" panose="020B0604020202020204" pitchFamily="34" charset="0"/>
-                <a:cs typeface="Arial" panose="020B0604020202020204" pitchFamily="34" charset="0"/>
-              </a:rPr>
-              <a:t>data compression</a:t>
-            </a:r>
-            <a:r>
-              <a:rPr lang="en-US" dirty="0">
-                <a:latin typeface="Arial" panose="020B0604020202020204" pitchFamily="34" charset="0"/>
-                <a:cs typeface="Arial" panose="020B0604020202020204" pitchFamily="34" charset="0"/>
-              </a:rPr>
-              <a:t>, </a:t>
-            </a:r>
-            <a:r>
-              <a:rPr lang="en-US" dirty="0">
-                <a:solidFill>
-                  <a:srgbClr val="92D050"/>
-                </a:solidFill>
-                <a:latin typeface="Arial" panose="020B0604020202020204" pitchFamily="34" charset="0"/>
-                <a:cs typeface="Arial" panose="020B0604020202020204" pitchFamily="34" charset="0"/>
-              </a:rPr>
-              <a:t>data encryption</a:t>
-            </a:r>
-            <a:r>
-              <a:rPr lang="en-US" dirty="0">
-                <a:latin typeface="Arial" panose="020B0604020202020204" pitchFamily="34" charset="0"/>
-                <a:cs typeface="Arial" panose="020B0604020202020204" pitchFamily="34" charset="0"/>
-              </a:rPr>
-              <a:t>, </a:t>
-            </a:r>
-            <a:r>
-              <a:rPr lang="en-US" dirty="0">
-                <a:solidFill>
-                  <a:srgbClr val="92D050"/>
-                </a:solidFill>
-                <a:latin typeface="Arial" panose="020B0604020202020204" pitchFamily="34" charset="0"/>
-                <a:cs typeface="Arial" panose="020B0604020202020204" pitchFamily="34" charset="0"/>
-              </a:rPr>
-              <a:t>graphics</a:t>
-            </a:r>
-            <a:r>
-              <a:rPr lang="en-US" dirty="0">
-                <a:latin typeface="Arial" panose="020B0604020202020204" pitchFamily="34" charset="0"/>
-                <a:cs typeface="Arial" panose="020B0604020202020204" pitchFamily="34" charset="0"/>
-              </a:rPr>
-              <a:t>, </a:t>
-            </a:r>
-            <a:r>
-              <a:rPr lang="en-US" dirty="0">
-                <a:solidFill>
-                  <a:srgbClr val="92D050"/>
-                </a:solidFill>
-                <a:latin typeface="Arial" panose="020B0604020202020204" pitchFamily="34" charset="0"/>
-                <a:cs typeface="Arial" panose="020B0604020202020204" pitchFamily="34" charset="0"/>
-              </a:rPr>
-              <a:t>low level programming</a:t>
+                  <a:srgbClr val="FFFF00"/>
+                </a:solidFill>
+                <a:latin typeface="Arial" panose="020B0604020202020204" pitchFamily="34" charset="0"/>
+                <a:cs typeface="Arial" panose="020B0604020202020204" pitchFamily="34" charset="0"/>
+              </a:rPr>
+              <a:t>OR</a:t>
             </a:r>
             <a:r>
               <a:rPr lang="en-US" dirty="0">
@@ -45259,15 +46765,110 @@
                 <a:latin typeface="Arial" panose="020B0604020202020204" pitchFamily="34" charset="0"/>
                 <a:cs typeface="Arial" panose="020B0604020202020204" pitchFamily="34" charset="0"/>
               </a:rPr>
-              <a:t>и много още.</a:t>
-            </a:r>
+              <a:t>или </a:t>
+            </a:r>
+            <a:r>
+              <a:rPr lang="en-US" dirty="0">
+                <a:solidFill>
+                  <a:srgbClr val="FFFF00"/>
+                </a:solidFill>
+                <a:latin typeface="Arial" panose="020B0604020202020204" pitchFamily="34" charset="0"/>
+                <a:cs typeface="Arial" panose="020B0604020202020204" pitchFamily="34" charset="0"/>
+              </a:rPr>
+              <a:t>XOR</a:t>
+            </a:r>
+            <a:r>
+              <a:rPr lang="bg-BG" dirty="0">
+                <a:latin typeface="Arial" panose="020B0604020202020204" pitchFamily="34" charset="0"/>
+                <a:cs typeface="Arial" panose="020B0604020202020204" pitchFamily="34" charset="0"/>
+              </a:rPr>
+              <a:t>, за да се направи някаква манипулация</a:t>
+            </a:r>
+            <a:r>
+              <a:rPr lang="en-US" dirty="0">
+                <a:latin typeface="Arial" panose="020B0604020202020204" pitchFamily="34" charset="0"/>
+                <a:cs typeface="Arial" panose="020B0604020202020204" pitchFamily="34" charset="0"/>
+              </a:rPr>
+              <a:t> </a:t>
+            </a:r>
+            <a:r>
+              <a:rPr lang="bg-BG" dirty="0">
+                <a:latin typeface="Arial" panose="020B0604020202020204" pitchFamily="34" charset="0"/>
+                <a:cs typeface="Arial" panose="020B0604020202020204" pitchFamily="34" charset="0"/>
+              </a:rPr>
+              <a:t>върху битовете на дадено число.</a:t>
+            </a:r>
+          </a:p>
+          <a:p>
+            <a:endParaRPr lang="bg-BG" dirty="0">
+              <a:latin typeface="Arial" panose="020B0604020202020204" pitchFamily="34" charset="0"/>
+              <a:cs typeface="Arial" panose="020B0604020202020204" pitchFamily="34" charset="0"/>
+            </a:endParaRPr>
+          </a:p>
+          <a:p>
+            <a:r>
+              <a:rPr lang="bg-BG" b="1" i="1" u="sng" dirty="0">
+                <a:latin typeface="Arial" panose="020B0604020202020204" pitchFamily="34" charset="0"/>
+                <a:cs typeface="Arial" panose="020B0604020202020204" pitchFamily="34" charset="0"/>
+              </a:rPr>
+              <a:t>Пример</a:t>
+            </a:r>
+            <a:r>
+              <a:rPr lang="bg-BG" b="1" i="1" dirty="0">
+                <a:latin typeface="Arial" panose="020B0604020202020204" pitchFamily="34" charset="0"/>
+                <a:cs typeface="Arial" panose="020B0604020202020204" pitchFamily="34" charset="0"/>
+              </a:rPr>
+              <a:t>: </a:t>
+            </a:r>
+          </a:p>
+          <a:p>
+            <a:endParaRPr lang="bg-BG" dirty="0">
+              <a:latin typeface="Arial" panose="020B0604020202020204" pitchFamily="34" charset="0"/>
+              <a:cs typeface="Arial" panose="020B0604020202020204" pitchFamily="34" charset="0"/>
+            </a:endParaRPr>
           </a:p>
         </p:txBody>
       </p:sp>
+      <p:pic>
+        <p:nvPicPr>
+          <p:cNvPr id="5" name="Picture 4" descr="A screenshot of a computer code&#10;&#10;Description automatically generated">
+            <a:extLst>
+              <a:ext uri="{FF2B5EF4-FFF2-40B4-BE49-F238E27FC236}">
+                <a16:creationId xmlns:a16="http://schemas.microsoft.com/office/drawing/2014/main" id="{B6C73087-CBD6-4B94-86A1-FF22099475A2}"/>
+              </a:ext>
+            </a:extLst>
+          </p:cNvPr>
+          <p:cNvPicPr>
+            <a:picLocks noChangeAspect="1"/>
+          </p:cNvPicPr>
+          <p:nvPr/>
+        </p:nvPicPr>
+        <p:blipFill>
+          <a:blip r:embed="rId2">
+            <a:extLst>
+              <a:ext uri="{28A0092B-C50C-407E-A947-70E740481C1C}">
+                <a14:useLocalDpi xmlns:a14="http://schemas.microsoft.com/office/drawing/2010/main" val="0"/>
+              </a:ext>
+            </a:extLst>
+          </a:blip>
+          <a:stretch>
+            <a:fillRect/>
+          </a:stretch>
+        </p:blipFill>
+        <p:spPr>
+          <a:xfrm>
+            <a:off x="3130527" y="3429000"/>
+            <a:ext cx="8755404" cy="3041351"/>
+          </a:xfrm>
+          <a:prstGeom prst="rect">
+            <a:avLst/>
+          </a:prstGeom>
+        </p:spPr>
+      </p:pic>
     </p:spTree>
     <p:extLst>
       <p:ext uri="{BB962C8B-B14F-4D97-AF65-F5344CB8AC3E}">
-        <p14:creationId xmlns:p14="http://schemas.microsoft.com/office/powerpoint/2010/main" val="2848896032"/>
+        <p14:creationId xmlns:p14="http://schemas.microsoft.com/office/powerpoint/2010/main" val="989372678"/>
       </p:ext>
     </p:extLst>
   </p:cSld>

</xml_diff>